<commit_message>
Updated ppt to chapter 5
</commit_message>
<xml_diff>
--- a/Javascript Tutorials.pptx
+++ b/Javascript Tutorials.pptx
@@ -26,6 +26,10 @@
     <p:sldId id="276" r:id="rId20"/>
     <p:sldId id="274" r:id="rId21"/>
     <p:sldId id="275" r:id="rId22"/>
+    <p:sldId id="277" r:id="rId23"/>
+    <p:sldId id="278" r:id="rId24"/>
+    <p:sldId id="279" r:id="rId25"/>
+    <p:sldId id="280" r:id="rId26"/>
   </p:sldIdLst>
   <p:sldSz cx="12192000" cy="6858000"/>
   <p:notesSz cx="6858000" cy="9144000"/>
@@ -126,7 +130,7 @@
   </p:defaultTextStyle>
   <p:extLst>
     <p:ext uri="{EFAFB233-063F-42B5-8137-9DF3F51BA10A}">
-      <p15:sldGuideLst xmlns:p15="http://schemas.microsoft.com/office/powerpoint/2012/main">
+      <p15:sldGuideLst xmlns:p15="http://schemas.microsoft.com/office/powerpoint/2012/main" xmlns="">
         <p15:guide id="1" orient="horz" pos="2160">
           <p15:clr>
             <a:srgbClr val="A4A3A4"/>
@@ -920,7 +924,7 @@
     </p:spTree>
     <p:extLst>
       <p:ext uri="{BB962C8B-B14F-4D97-AF65-F5344CB8AC3E}">
-        <p14:creationId xmlns:p14="http://schemas.microsoft.com/office/powerpoint/2010/main" val="2121369331"/>
+        <p14:creationId xmlns:p14="http://schemas.microsoft.com/office/powerpoint/2010/main" xmlns="" val="2121369331"/>
       </p:ext>
     </p:extLst>
   </p:cSld>
@@ -1173,7 +1177,7 @@
     </p:spTree>
     <p:extLst>
       <p:ext uri="{BB962C8B-B14F-4D97-AF65-F5344CB8AC3E}">
-        <p14:creationId xmlns:p14="http://schemas.microsoft.com/office/powerpoint/2010/main" val="4277845334"/>
+        <p14:creationId xmlns:p14="http://schemas.microsoft.com/office/powerpoint/2010/main" xmlns="" val="4277845334"/>
       </p:ext>
     </p:extLst>
   </p:cSld>
@@ -1565,7 +1569,7 @@
     </p:spTree>
     <p:extLst>
       <p:ext uri="{BB962C8B-B14F-4D97-AF65-F5344CB8AC3E}">
-        <p14:creationId xmlns:p14="http://schemas.microsoft.com/office/powerpoint/2010/main" val="4103336880"/>
+        <p14:creationId xmlns:p14="http://schemas.microsoft.com/office/powerpoint/2010/main" xmlns="" val="4103336880"/>
       </p:ext>
     </p:extLst>
   </p:cSld>
@@ -1818,7 +1822,7 @@
     </p:spTree>
     <p:extLst>
       <p:ext uri="{BB962C8B-B14F-4D97-AF65-F5344CB8AC3E}">
-        <p14:creationId xmlns:p14="http://schemas.microsoft.com/office/powerpoint/2010/main" val="2317848287"/>
+        <p14:creationId xmlns:p14="http://schemas.microsoft.com/office/powerpoint/2010/main" xmlns="" val="2317848287"/>
       </p:ext>
     </p:extLst>
   </p:cSld>
@@ -2210,7 +2214,7 @@
     </p:spTree>
     <p:extLst>
       <p:ext uri="{BB962C8B-B14F-4D97-AF65-F5344CB8AC3E}">
-        <p14:creationId xmlns:p14="http://schemas.microsoft.com/office/powerpoint/2010/main" val="4054754721"/>
+        <p14:creationId xmlns:p14="http://schemas.microsoft.com/office/powerpoint/2010/main" xmlns="" val="4054754721"/>
       </p:ext>
     </p:extLst>
   </p:cSld>
@@ -2523,7 +2527,7 @@
     </p:spTree>
     <p:extLst>
       <p:ext uri="{BB962C8B-B14F-4D97-AF65-F5344CB8AC3E}">
-        <p14:creationId xmlns:p14="http://schemas.microsoft.com/office/powerpoint/2010/main" val="3698809145"/>
+        <p14:creationId xmlns:p14="http://schemas.microsoft.com/office/powerpoint/2010/main" xmlns="" val="3698809145"/>
       </p:ext>
     </p:extLst>
   </p:cSld>
@@ -2695,7 +2699,7 @@
     </p:spTree>
     <p:extLst>
       <p:ext uri="{BB962C8B-B14F-4D97-AF65-F5344CB8AC3E}">
-        <p14:creationId xmlns:p14="http://schemas.microsoft.com/office/powerpoint/2010/main" val="4102912012"/>
+        <p14:creationId xmlns:p14="http://schemas.microsoft.com/office/powerpoint/2010/main" xmlns="" val="4102912012"/>
       </p:ext>
     </p:extLst>
   </p:cSld>
@@ -2877,7 +2881,7 @@
     </p:spTree>
     <p:extLst>
       <p:ext uri="{BB962C8B-B14F-4D97-AF65-F5344CB8AC3E}">
-        <p14:creationId xmlns:p14="http://schemas.microsoft.com/office/powerpoint/2010/main" val="1199620941"/>
+        <p14:creationId xmlns:p14="http://schemas.microsoft.com/office/powerpoint/2010/main" xmlns="" val="1199620941"/>
       </p:ext>
     </p:extLst>
   </p:cSld>
@@ -3055,7 +3059,7 @@
     </p:spTree>
     <p:extLst>
       <p:ext uri="{BB962C8B-B14F-4D97-AF65-F5344CB8AC3E}">
-        <p14:creationId xmlns:p14="http://schemas.microsoft.com/office/powerpoint/2010/main" val="901355798"/>
+        <p14:creationId xmlns:p14="http://schemas.microsoft.com/office/powerpoint/2010/main" xmlns="" val="901355798"/>
       </p:ext>
     </p:extLst>
   </p:cSld>
@@ -3304,7 +3308,7 @@
     </p:spTree>
     <p:extLst>
       <p:ext uri="{BB962C8B-B14F-4D97-AF65-F5344CB8AC3E}">
-        <p14:creationId xmlns:p14="http://schemas.microsoft.com/office/powerpoint/2010/main" val="351019068"/>
+        <p14:creationId xmlns:p14="http://schemas.microsoft.com/office/powerpoint/2010/main" xmlns="" val="351019068"/>
       </p:ext>
     </p:extLst>
   </p:cSld>
@@ -3538,7 +3542,7 @@
     </p:spTree>
     <p:extLst>
       <p:ext uri="{BB962C8B-B14F-4D97-AF65-F5344CB8AC3E}">
-        <p14:creationId xmlns:p14="http://schemas.microsoft.com/office/powerpoint/2010/main" val="3037334119"/>
+        <p14:creationId xmlns:p14="http://schemas.microsoft.com/office/powerpoint/2010/main" xmlns="" val="3037334119"/>
       </p:ext>
     </p:extLst>
   </p:cSld>
@@ -3914,7 +3918,7 @@
     </p:spTree>
     <p:extLst>
       <p:ext uri="{BB962C8B-B14F-4D97-AF65-F5344CB8AC3E}">
-        <p14:creationId xmlns:p14="http://schemas.microsoft.com/office/powerpoint/2010/main" val="3959179014"/>
+        <p14:creationId xmlns:p14="http://schemas.microsoft.com/office/powerpoint/2010/main" xmlns="" val="3959179014"/>
       </p:ext>
     </p:extLst>
   </p:cSld>
@@ -4039,7 +4043,7 @@
     </p:spTree>
     <p:extLst>
       <p:ext uri="{BB962C8B-B14F-4D97-AF65-F5344CB8AC3E}">
-        <p14:creationId xmlns:p14="http://schemas.microsoft.com/office/powerpoint/2010/main" val="143817896"/>
+        <p14:creationId xmlns:p14="http://schemas.microsoft.com/office/powerpoint/2010/main" xmlns="" val="143817896"/>
       </p:ext>
     </p:extLst>
   </p:cSld>
@@ -4136,7 +4140,7 @@
     </p:spTree>
     <p:extLst>
       <p:ext uri="{BB962C8B-B14F-4D97-AF65-F5344CB8AC3E}">
-        <p14:creationId xmlns:p14="http://schemas.microsoft.com/office/powerpoint/2010/main" val="1053529793"/>
+        <p14:creationId xmlns:p14="http://schemas.microsoft.com/office/powerpoint/2010/main" xmlns="" val="1053529793"/>
       </p:ext>
     </p:extLst>
   </p:cSld>
@@ -4393,7 +4397,7 @@
     </p:spTree>
     <p:extLst>
       <p:ext uri="{BB962C8B-B14F-4D97-AF65-F5344CB8AC3E}">
-        <p14:creationId xmlns:p14="http://schemas.microsoft.com/office/powerpoint/2010/main" val="1549564702"/>
+        <p14:creationId xmlns:p14="http://schemas.microsoft.com/office/powerpoint/2010/main" xmlns="" val="1549564702"/>
       </p:ext>
     </p:extLst>
   </p:cSld>
@@ -4658,7 +4662,7 @@
     </p:spTree>
     <p:extLst>
       <p:ext uri="{BB962C8B-B14F-4D97-AF65-F5344CB8AC3E}">
-        <p14:creationId xmlns:p14="http://schemas.microsoft.com/office/powerpoint/2010/main" val="1708776435"/>
+        <p14:creationId xmlns:p14="http://schemas.microsoft.com/office/powerpoint/2010/main" xmlns="" val="1708776435"/>
       </p:ext>
     </p:extLst>
   </p:cSld>
@@ -5439,7 +5443,7 @@
     </p:spTree>
     <p:extLst>
       <p:ext uri="{BB962C8B-B14F-4D97-AF65-F5344CB8AC3E}">
-        <p14:creationId xmlns:p14="http://schemas.microsoft.com/office/powerpoint/2010/main" val="121865681"/>
+        <p14:creationId xmlns:p14="http://schemas.microsoft.com/office/powerpoint/2010/main" xmlns="" val="121865681"/>
       </p:ext>
     </p:extLst>
   </p:cSld>
@@ -5883,7 +5887,7 @@
           <p:cNvPr id="2" name="Title 1">
             <a:extLst>
               <a:ext uri="{FF2B5EF4-FFF2-40B4-BE49-F238E27FC236}">
-                <a16:creationId xmlns:a16="http://schemas.microsoft.com/office/drawing/2014/main" id="{EC93423C-79E8-2701-DB3F-2D4CA67D7A87}"/>
+                <a16:creationId xmlns:a16="http://schemas.microsoft.com/office/drawing/2014/main" xmlns="" id="{EC93423C-79E8-2701-DB3F-2D4CA67D7A87}"/>
               </a:ext>
             </a:extLst>
           </p:cNvPr>
@@ -5936,7 +5940,7 @@
           <p:cNvPr id="3" name="Subtitle 2">
             <a:extLst>
               <a:ext uri="{FF2B5EF4-FFF2-40B4-BE49-F238E27FC236}">
-                <a16:creationId xmlns:a16="http://schemas.microsoft.com/office/drawing/2014/main" id="{2A629AF9-FA04-B477-0E47-5B7F12E6FC7C}"/>
+                <a16:creationId xmlns:a16="http://schemas.microsoft.com/office/drawing/2014/main" xmlns="" id="{2A629AF9-FA04-B477-0E47-5B7F12E6FC7C}"/>
               </a:ext>
             </a:extLst>
           </p:cNvPr>
@@ -5972,7 +5976,7 @@
           <p:cNvPr id="4" name="TextBox 3">
             <a:extLst>
               <a:ext uri="{FF2B5EF4-FFF2-40B4-BE49-F238E27FC236}">
-                <a16:creationId xmlns:a16="http://schemas.microsoft.com/office/drawing/2014/main" id="{4BC27C14-3D93-9CDE-B1D8-91C6ACAF4DA4}"/>
+                <a16:creationId xmlns:a16="http://schemas.microsoft.com/office/drawing/2014/main" xmlns="" id="{4BC27C14-3D93-9CDE-B1D8-91C6ACAF4DA4}"/>
               </a:ext>
             </a:extLst>
           </p:cNvPr>
@@ -6021,7 +6025,7 @@
     </p:spTree>
     <p:extLst>
       <p:ext uri="{BB962C8B-B14F-4D97-AF65-F5344CB8AC3E}">
-        <p14:creationId xmlns:p14="http://schemas.microsoft.com/office/powerpoint/2010/main" val="889777050"/>
+        <p14:creationId xmlns:p14="http://schemas.microsoft.com/office/powerpoint/2010/main" xmlns="" val="889777050"/>
       </p:ext>
     </p:extLst>
   </p:cSld>
@@ -6039,7 +6043,7 @@
         <p:cNvPr id="1" name="">
           <a:extLst>
             <a:ext uri="{FF2B5EF4-FFF2-40B4-BE49-F238E27FC236}">
-              <a16:creationId xmlns:a16="http://schemas.microsoft.com/office/drawing/2014/main" id="{253BBDB7-3E52-64BD-6E92-66253059D34C}"/>
+              <a16:creationId xmlns:a16="http://schemas.microsoft.com/office/drawing/2014/main" xmlns="" id="{253BBDB7-3E52-64BD-6E92-66253059D34C}"/>
             </a:ext>
           </a:extLst>
         </p:cNvPr>
@@ -6059,7 +6063,7 @@
           <p:cNvPr id="2" name="Title 1">
             <a:extLst>
               <a:ext uri="{FF2B5EF4-FFF2-40B4-BE49-F238E27FC236}">
-                <a16:creationId xmlns:a16="http://schemas.microsoft.com/office/drawing/2014/main" id="{E55678BE-607F-2A2B-B318-30B2DA7F29B3}"/>
+                <a16:creationId xmlns:a16="http://schemas.microsoft.com/office/drawing/2014/main" xmlns="" id="{E55678BE-607F-2A2B-B318-30B2DA7F29B3}"/>
               </a:ext>
             </a:extLst>
           </p:cNvPr>
@@ -6096,7 +6100,7 @@
           <p:cNvPr id="3" name="Content Placeholder 2">
             <a:extLst>
               <a:ext uri="{FF2B5EF4-FFF2-40B4-BE49-F238E27FC236}">
-                <a16:creationId xmlns:a16="http://schemas.microsoft.com/office/drawing/2014/main" id="{A5951AC9-1751-ACAB-8097-E6D486A5D62D}"/>
+                <a16:creationId xmlns:a16="http://schemas.microsoft.com/office/drawing/2014/main" xmlns="" id="{A5951AC9-1751-ACAB-8097-E6D486A5D62D}"/>
               </a:ext>
             </a:extLst>
           </p:cNvPr>
@@ -6151,7 +6155,7 @@
           <p:cNvPr id="5" name="Ribbon: Curved and Tilted Down 4">
             <a:extLst>
               <a:ext uri="{FF2B5EF4-FFF2-40B4-BE49-F238E27FC236}">
-                <a16:creationId xmlns:a16="http://schemas.microsoft.com/office/drawing/2014/main" id="{29648F54-4274-51BA-8F35-F8C888E0A19B}"/>
+                <a16:creationId xmlns:a16="http://schemas.microsoft.com/office/drawing/2014/main" xmlns="" id="{29648F54-4274-51BA-8F35-F8C888E0A19B}"/>
               </a:ext>
             </a:extLst>
           </p:cNvPr>
@@ -6224,7 +6228,7 @@
           <p:cNvPr id="6" name="Scroll: Vertical 5">
             <a:extLst>
               <a:ext uri="{FF2B5EF4-FFF2-40B4-BE49-F238E27FC236}">
-                <a16:creationId xmlns:a16="http://schemas.microsoft.com/office/drawing/2014/main" id="{E3C4F40D-DC8F-F75B-7F98-E5029EC432CA}"/>
+                <a16:creationId xmlns:a16="http://schemas.microsoft.com/office/drawing/2014/main" xmlns="" id="{E3C4F40D-DC8F-F75B-7F98-E5029EC432CA}"/>
               </a:ext>
             </a:extLst>
           </p:cNvPr>
@@ -6540,7 +6544,7 @@
     </p:spTree>
     <p:extLst>
       <p:ext uri="{BB962C8B-B14F-4D97-AF65-F5344CB8AC3E}">
-        <p14:creationId xmlns:p14="http://schemas.microsoft.com/office/powerpoint/2010/main" val="609828687"/>
+        <p14:creationId xmlns:p14="http://schemas.microsoft.com/office/powerpoint/2010/main" xmlns="" val="609828687"/>
       </p:ext>
     </p:extLst>
   </p:cSld>
@@ -6558,7 +6562,7 @@
         <p:cNvPr id="1" name="">
           <a:extLst>
             <a:ext uri="{FF2B5EF4-FFF2-40B4-BE49-F238E27FC236}">
-              <a16:creationId xmlns:a16="http://schemas.microsoft.com/office/drawing/2014/main" id="{4586E9D7-F5F8-14CC-9DF6-FC4AF2EA4249}"/>
+              <a16:creationId xmlns:a16="http://schemas.microsoft.com/office/drawing/2014/main" xmlns="" id="{4586E9D7-F5F8-14CC-9DF6-FC4AF2EA4249}"/>
             </a:ext>
           </a:extLst>
         </p:cNvPr>
@@ -6578,7 +6582,7 @@
           <p:cNvPr id="2" name="Title 1">
             <a:extLst>
               <a:ext uri="{FF2B5EF4-FFF2-40B4-BE49-F238E27FC236}">
-                <a16:creationId xmlns:a16="http://schemas.microsoft.com/office/drawing/2014/main" id="{D8B67155-694F-FF61-7CDD-33A20A316215}"/>
+                <a16:creationId xmlns:a16="http://schemas.microsoft.com/office/drawing/2014/main" xmlns="" id="{D8B67155-694F-FF61-7CDD-33A20A316215}"/>
               </a:ext>
             </a:extLst>
           </p:cNvPr>
@@ -6615,7 +6619,7 @@
           <p:cNvPr id="3" name="Content Placeholder 2">
             <a:extLst>
               <a:ext uri="{FF2B5EF4-FFF2-40B4-BE49-F238E27FC236}">
-                <a16:creationId xmlns:a16="http://schemas.microsoft.com/office/drawing/2014/main" id="{2A53D2DA-721D-FC7E-8E09-BCBD844B6F9F}"/>
+                <a16:creationId xmlns:a16="http://schemas.microsoft.com/office/drawing/2014/main" xmlns="" id="{2A53D2DA-721D-FC7E-8E09-BCBD844B6F9F}"/>
               </a:ext>
             </a:extLst>
           </p:cNvPr>
@@ -6723,7 +6727,7 @@
           <p:cNvPr id="5" name="Ribbon: Curved and Tilted Down 4">
             <a:extLst>
               <a:ext uri="{FF2B5EF4-FFF2-40B4-BE49-F238E27FC236}">
-                <a16:creationId xmlns:a16="http://schemas.microsoft.com/office/drawing/2014/main" id="{3FA23525-E3EA-B8CB-FD6A-53084CA847A7}"/>
+                <a16:creationId xmlns:a16="http://schemas.microsoft.com/office/drawing/2014/main" xmlns="" id="{3FA23525-E3EA-B8CB-FD6A-53084CA847A7}"/>
               </a:ext>
             </a:extLst>
           </p:cNvPr>
@@ -6796,7 +6800,7 @@
           <p:cNvPr id="6" name="Scroll: Vertical 5">
             <a:extLst>
               <a:ext uri="{FF2B5EF4-FFF2-40B4-BE49-F238E27FC236}">
-                <a16:creationId xmlns:a16="http://schemas.microsoft.com/office/drawing/2014/main" id="{1A4C732A-2840-82C8-A359-298D925E33B3}"/>
+                <a16:creationId xmlns:a16="http://schemas.microsoft.com/office/drawing/2014/main" xmlns="" id="{1A4C732A-2840-82C8-A359-298D925E33B3}"/>
               </a:ext>
             </a:extLst>
           </p:cNvPr>
@@ -7112,7 +7116,7 @@
     </p:spTree>
     <p:extLst>
       <p:ext uri="{BB962C8B-B14F-4D97-AF65-F5344CB8AC3E}">
-        <p14:creationId xmlns:p14="http://schemas.microsoft.com/office/powerpoint/2010/main" val="3002471670"/>
+        <p14:creationId xmlns:p14="http://schemas.microsoft.com/office/powerpoint/2010/main" xmlns="" val="3002471670"/>
       </p:ext>
     </p:extLst>
   </p:cSld>
@@ -7144,7 +7148,7 @@
           <p:cNvPr id="9" name="Explosion: 14 Points 8">
             <a:extLst>
               <a:ext uri="{FF2B5EF4-FFF2-40B4-BE49-F238E27FC236}">
-                <a16:creationId xmlns:a16="http://schemas.microsoft.com/office/drawing/2014/main" id="{0A2CD68B-7A56-F86D-8B6F-4A8BF99B4C9E}"/>
+                <a16:creationId xmlns:a16="http://schemas.microsoft.com/office/drawing/2014/main" xmlns="" id="{0A2CD68B-7A56-F86D-8B6F-4A8BF99B4C9E}"/>
               </a:ext>
             </a:extLst>
           </p:cNvPr>
@@ -7199,7 +7203,7 @@
           <p:cNvPr id="2" name="Title 1">
             <a:extLst>
               <a:ext uri="{FF2B5EF4-FFF2-40B4-BE49-F238E27FC236}">
-                <a16:creationId xmlns:a16="http://schemas.microsoft.com/office/drawing/2014/main" id="{62BB4F8D-44B7-9866-F7B2-6375CB902974}"/>
+                <a16:creationId xmlns:a16="http://schemas.microsoft.com/office/drawing/2014/main" xmlns="" id="{62BB4F8D-44B7-9866-F7B2-6375CB902974}"/>
               </a:ext>
             </a:extLst>
           </p:cNvPr>
@@ -7233,6 +7237,15 @@
               </a:rPr>
               <a:t>JavaScript</a:t>
             </a:r>
+            <a:r>
+              <a:rPr lang="en-US" sz="7200" b="1" dirty="0">
+                <a:solidFill>
+                  <a:schemeClr val="tx1"/>
+                </a:solidFill>
+                <a:latin typeface="Barlow Black" panose="00000A00000000000000" pitchFamily="2" charset="0"/>
+              </a:rPr>
+              <a:t/>
+            </a:r>
             <a:br>
               <a:rPr lang="en-US" sz="7200" b="1" dirty="0">
                 <a:solidFill>
@@ -7308,7 +7321,7 @@
           <p:cNvPr id="4" name="Ribbon: Curved and Tilted Down 3">
             <a:extLst>
               <a:ext uri="{FF2B5EF4-FFF2-40B4-BE49-F238E27FC236}">
-                <a16:creationId xmlns:a16="http://schemas.microsoft.com/office/drawing/2014/main" id="{909DBECF-689C-9AA7-1649-9166A578EDF9}"/>
+                <a16:creationId xmlns:a16="http://schemas.microsoft.com/office/drawing/2014/main" xmlns="" id="{909DBECF-689C-9AA7-1649-9166A578EDF9}"/>
               </a:ext>
             </a:extLst>
           </p:cNvPr>
@@ -7375,7 +7388,7 @@
           <p:cNvPr id="8" name="TextBox 7">
             <a:extLst>
               <a:ext uri="{FF2B5EF4-FFF2-40B4-BE49-F238E27FC236}">
-                <a16:creationId xmlns:a16="http://schemas.microsoft.com/office/drawing/2014/main" id="{6E6F1672-8C91-3FA6-CB80-58FD68172333}"/>
+                <a16:creationId xmlns:a16="http://schemas.microsoft.com/office/drawing/2014/main" xmlns="" id="{6E6F1672-8C91-3FA6-CB80-58FD68172333}"/>
               </a:ext>
             </a:extLst>
           </p:cNvPr>
@@ -7435,7 +7448,7 @@
           <p:cNvPr id="5" name="Scroll: Vertical 4">
             <a:extLst>
               <a:ext uri="{FF2B5EF4-FFF2-40B4-BE49-F238E27FC236}">
-                <a16:creationId xmlns:a16="http://schemas.microsoft.com/office/drawing/2014/main" id="{38EB993A-3F18-C6B7-226F-EDD62B4B31DB}"/>
+                <a16:creationId xmlns:a16="http://schemas.microsoft.com/office/drawing/2014/main" xmlns="" id="{38EB993A-3F18-C6B7-226F-EDD62B4B31DB}"/>
               </a:ext>
             </a:extLst>
           </p:cNvPr>
@@ -7591,7 +7604,7 @@
     </p:spTree>
     <p:extLst>
       <p:ext uri="{BB962C8B-B14F-4D97-AF65-F5344CB8AC3E}">
-        <p14:creationId xmlns:p14="http://schemas.microsoft.com/office/powerpoint/2010/main" val="3287175084"/>
+        <p14:creationId xmlns:p14="http://schemas.microsoft.com/office/powerpoint/2010/main" xmlns="" val="3287175084"/>
       </p:ext>
     </p:extLst>
   </p:cSld>
@@ -7609,7 +7622,7 @@
         <p:cNvPr id="1" name="">
           <a:extLst>
             <a:ext uri="{FF2B5EF4-FFF2-40B4-BE49-F238E27FC236}">
-              <a16:creationId xmlns:a16="http://schemas.microsoft.com/office/drawing/2014/main" id="{4586E9D7-F5F8-14CC-9DF6-FC4AF2EA4249}"/>
+              <a16:creationId xmlns:a16="http://schemas.microsoft.com/office/drawing/2014/main" xmlns="" id="{4586E9D7-F5F8-14CC-9DF6-FC4AF2EA4249}"/>
             </a:ext>
           </a:extLst>
         </p:cNvPr>
@@ -7629,7 +7642,7 @@
           <p:cNvPr id="2" name="Title 1">
             <a:extLst>
               <a:ext uri="{FF2B5EF4-FFF2-40B4-BE49-F238E27FC236}">
-                <a16:creationId xmlns:a16="http://schemas.microsoft.com/office/drawing/2014/main" id="{D8B67155-694F-FF61-7CDD-33A20A316215}"/>
+                <a16:creationId xmlns:a16="http://schemas.microsoft.com/office/drawing/2014/main" xmlns="" id="{D8B67155-694F-FF61-7CDD-33A20A316215}"/>
               </a:ext>
             </a:extLst>
           </p:cNvPr>
@@ -7667,7 +7680,7 @@
           <p:cNvPr id="3" name="Content Placeholder 2">
             <a:extLst>
               <a:ext uri="{FF2B5EF4-FFF2-40B4-BE49-F238E27FC236}">
-                <a16:creationId xmlns:a16="http://schemas.microsoft.com/office/drawing/2014/main" id="{2A53D2DA-721D-FC7E-8E09-BCBD844B6F9F}"/>
+                <a16:creationId xmlns:a16="http://schemas.microsoft.com/office/drawing/2014/main" xmlns="" id="{2A53D2DA-721D-FC7E-8E09-BCBD844B6F9F}"/>
               </a:ext>
             </a:extLst>
           </p:cNvPr>
@@ -7715,7 +7728,7 @@
           <p:cNvPr id="5" name="Ribbon: Curved and Tilted Down 4">
             <a:extLst>
               <a:ext uri="{FF2B5EF4-FFF2-40B4-BE49-F238E27FC236}">
-                <a16:creationId xmlns:a16="http://schemas.microsoft.com/office/drawing/2014/main" id="{3FA23525-E3EA-B8CB-FD6A-53084CA847A7}"/>
+                <a16:creationId xmlns:a16="http://schemas.microsoft.com/office/drawing/2014/main" xmlns="" id="{3FA23525-E3EA-B8CB-FD6A-53084CA847A7}"/>
               </a:ext>
             </a:extLst>
           </p:cNvPr>
@@ -7788,7 +7801,7 @@
           <p:cNvPr id="6" name="Scroll: Vertical 5">
             <a:extLst>
               <a:ext uri="{FF2B5EF4-FFF2-40B4-BE49-F238E27FC236}">
-                <a16:creationId xmlns:a16="http://schemas.microsoft.com/office/drawing/2014/main" id="{1A4C732A-2840-82C8-A359-298D925E33B3}"/>
+                <a16:creationId xmlns:a16="http://schemas.microsoft.com/office/drawing/2014/main" xmlns="" id="{1A4C732A-2840-82C8-A359-298D925E33B3}"/>
               </a:ext>
             </a:extLst>
           </p:cNvPr>
@@ -7978,7 +7991,7 @@
     </p:spTree>
     <p:extLst>
       <p:ext uri="{BB962C8B-B14F-4D97-AF65-F5344CB8AC3E}">
-        <p14:creationId xmlns:p14="http://schemas.microsoft.com/office/powerpoint/2010/main" val="3002471670"/>
+        <p14:creationId xmlns:p14="http://schemas.microsoft.com/office/powerpoint/2010/main" xmlns="" val="3002471670"/>
       </p:ext>
     </p:extLst>
   </p:cSld>
@@ -7996,7 +8009,7 @@
         <p:cNvPr id="1" name="">
           <a:extLst>
             <a:ext uri="{FF2B5EF4-FFF2-40B4-BE49-F238E27FC236}">
-              <a16:creationId xmlns:a16="http://schemas.microsoft.com/office/drawing/2014/main" id="{4586E9D7-F5F8-14CC-9DF6-FC4AF2EA4249}"/>
+              <a16:creationId xmlns:a16="http://schemas.microsoft.com/office/drawing/2014/main" xmlns="" id="{4586E9D7-F5F8-14CC-9DF6-FC4AF2EA4249}"/>
             </a:ext>
           </a:extLst>
         </p:cNvPr>
@@ -8016,7 +8029,7 @@
           <p:cNvPr id="2" name="Title 1">
             <a:extLst>
               <a:ext uri="{FF2B5EF4-FFF2-40B4-BE49-F238E27FC236}">
-                <a16:creationId xmlns:a16="http://schemas.microsoft.com/office/drawing/2014/main" id="{D8B67155-694F-FF61-7CDD-33A20A316215}"/>
+                <a16:creationId xmlns:a16="http://schemas.microsoft.com/office/drawing/2014/main" xmlns="" id="{D8B67155-694F-FF61-7CDD-33A20A316215}"/>
               </a:ext>
             </a:extLst>
           </p:cNvPr>
@@ -8054,7 +8067,7 @@
           <p:cNvPr id="3" name="Content Placeholder 2">
             <a:extLst>
               <a:ext uri="{FF2B5EF4-FFF2-40B4-BE49-F238E27FC236}">
-                <a16:creationId xmlns:a16="http://schemas.microsoft.com/office/drawing/2014/main" id="{2A53D2DA-721D-FC7E-8E09-BCBD844B6F9F}"/>
+                <a16:creationId xmlns:a16="http://schemas.microsoft.com/office/drawing/2014/main" xmlns="" id="{2A53D2DA-721D-FC7E-8E09-BCBD844B6F9F}"/>
               </a:ext>
             </a:extLst>
           </p:cNvPr>
@@ -8178,7 +8191,7 @@
           <p:cNvPr id="5" name="Ribbon: Curved and Tilted Down 4">
             <a:extLst>
               <a:ext uri="{FF2B5EF4-FFF2-40B4-BE49-F238E27FC236}">
-                <a16:creationId xmlns:a16="http://schemas.microsoft.com/office/drawing/2014/main" id="{3FA23525-E3EA-B8CB-FD6A-53084CA847A7}"/>
+                <a16:creationId xmlns:a16="http://schemas.microsoft.com/office/drawing/2014/main" xmlns="" id="{3FA23525-E3EA-B8CB-FD6A-53084CA847A7}"/>
               </a:ext>
             </a:extLst>
           </p:cNvPr>
@@ -8251,7 +8264,7 @@
           <p:cNvPr id="6" name="Scroll: Vertical 5">
             <a:extLst>
               <a:ext uri="{FF2B5EF4-FFF2-40B4-BE49-F238E27FC236}">
-                <a16:creationId xmlns:a16="http://schemas.microsoft.com/office/drawing/2014/main" id="{1A4C732A-2840-82C8-A359-298D925E33B3}"/>
+                <a16:creationId xmlns:a16="http://schemas.microsoft.com/office/drawing/2014/main" xmlns="" id="{1A4C732A-2840-82C8-A359-298D925E33B3}"/>
               </a:ext>
             </a:extLst>
           </p:cNvPr>
@@ -8441,7 +8454,7 @@
     </p:spTree>
     <p:extLst>
       <p:ext uri="{BB962C8B-B14F-4D97-AF65-F5344CB8AC3E}">
-        <p14:creationId xmlns:p14="http://schemas.microsoft.com/office/powerpoint/2010/main" val="3002471670"/>
+        <p14:creationId xmlns:p14="http://schemas.microsoft.com/office/powerpoint/2010/main" xmlns="" val="3002471670"/>
       </p:ext>
     </p:extLst>
   </p:cSld>
@@ -8459,7 +8472,7 @@
         <p:cNvPr id="1" name="">
           <a:extLst>
             <a:ext uri="{FF2B5EF4-FFF2-40B4-BE49-F238E27FC236}">
-              <a16:creationId xmlns:a16="http://schemas.microsoft.com/office/drawing/2014/main" id="{4586E9D7-F5F8-14CC-9DF6-FC4AF2EA4249}"/>
+              <a16:creationId xmlns:a16="http://schemas.microsoft.com/office/drawing/2014/main" xmlns="" id="{4586E9D7-F5F8-14CC-9DF6-FC4AF2EA4249}"/>
             </a:ext>
           </a:extLst>
         </p:cNvPr>
@@ -8479,7 +8492,7 @@
           <p:cNvPr id="2" name="Title 1">
             <a:extLst>
               <a:ext uri="{FF2B5EF4-FFF2-40B4-BE49-F238E27FC236}">
-                <a16:creationId xmlns:a16="http://schemas.microsoft.com/office/drawing/2014/main" id="{D8B67155-694F-FF61-7CDD-33A20A316215}"/>
+                <a16:creationId xmlns:a16="http://schemas.microsoft.com/office/drawing/2014/main" xmlns="" id="{D8B67155-694F-FF61-7CDD-33A20A316215}"/>
               </a:ext>
             </a:extLst>
           </p:cNvPr>
@@ -8517,7 +8530,7 @@
           <p:cNvPr id="3" name="Content Placeholder 2">
             <a:extLst>
               <a:ext uri="{FF2B5EF4-FFF2-40B4-BE49-F238E27FC236}">
-                <a16:creationId xmlns:a16="http://schemas.microsoft.com/office/drawing/2014/main" id="{2A53D2DA-721D-FC7E-8E09-BCBD844B6F9F}"/>
+                <a16:creationId xmlns:a16="http://schemas.microsoft.com/office/drawing/2014/main" xmlns="" id="{2A53D2DA-721D-FC7E-8E09-BCBD844B6F9F}"/>
               </a:ext>
             </a:extLst>
           </p:cNvPr>
@@ -8556,7 +8569,7 @@
           <p:cNvPr id="5" name="Ribbon: Curved and Tilted Down 4">
             <a:extLst>
               <a:ext uri="{FF2B5EF4-FFF2-40B4-BE49-F238E27FC236}">
-                <a16:creationId xmlns:a16="http://schemas.microsoft.com/office/drawing/2014/main" id="{3FA23525-E3EA-B8CB-FD6A-53084CA847A7}"/>
+                <a16:creationId xmlns:a16="http://schemas.microsoft.com/office/drawing/2014/main" xmlns="" id="{3FA23525-E3EA-B8CB-FD6A-53084CA847A7}"/>
               </a:ext>
             </a:extLst>
           </p:cNvPr>
@@ -8629,7 +8642,7 @@
           <p:cNvPr id="6" name="Scroll: Vertical 5">
             <a:extLst>
               <a:ext uri="{FF2B5EF4-FFF2-40B4-BE49-F238E27FC236}">
-                <a16:creationId xmlns:a16="http://schemas.microsoft.com/office/drawing/2014/main" id="{1A4C732A-2840-82C8-A359-298D925E33B3}"/>
+                <a16:creationId xmlns:a16="http://schemas.microsoft.com/office/drawing/2014/main" xmlns="" id="{1A4C732A-2840-82C8-A359-298D925E33B3}"/>
               </a:ext>
             </a:extLst>
           </p:cNvPr>
@@ -8852,7 +8865,7 @@
     </p:spTree>
     <p:extLst>
       <p:ext uri="{BB962C8B-B14F-4D97-AF65-F5344CB8AC3E}">
-        <p14:creationId xmlns:p14="http://schemas.microsoft.com/office/powerpoint/2010/main" val="3002471670"/>
+        <p14:creationId xmlns:p14="http://schemas.microsoft.com/office/powerpoint/2010/main" xmlns="" val="3002471670"/>
       </p:ext>
     </p:extLst>
   </p:cSld>
@@ -8870,7 +8883,7 @@
         <p:cNvPr id="1" name="">
           <a:extLst>
             <a:ext uri="{FF2B5EF4-FFF2-40B4-BE49-F238E27FC236}">
-              <a16:creationId xmlns:a16="http://schemas.microsoft.com/office/drawing/2014/main" id="{4586E9D7-F5F8-14CC-9DF6-FC4AF2EA4249}"/>
+              <a16:creationId xmlns:a16="http://schemas.microsoft.com/office/drawing/2014/main" xmlns="" id="{4586E9D7-F5F8-14CC-9DF6-FC4AF2EA4249}"/>
             </a:ext>
           </a:extLst>
         </p:cNvPr>
@@ -8890,7 +8903,7 @@
           <p:cNvPr id="2" name="Title 1">
             <a:extLst>
               <a:ext uri="{FF2B5EF4-FFF2-40B4-BE49-F238E27FC236}">
-                <a16:creationId xmlns:a16="http://schemas.microsoft.com/office/drawing/2014/main" id="{D8B67155-694F-FF61-7CDD-33A20A316215}"/>
+                <a16:creationId xmlns:a16="http://schemas.microsoft.com/office/drawing/2014/main" xmlns="" id="{D8B67155-694F-FF61-7CDD-33A20A316215}"/>
               </a:ext>
             </a:extLst>
           </p:cNvPr>
@@ -8928,7 +8941,7 @@
           <p:cNvPr id="3" name="Content Placeholder 2">
             <a:extLst>
               <a:ext uri="{FF2B5EF4-FFF2-40B4-BE49-F238E27FC236}">
-                <a16:creationId xmlns:a16="http://schemas.microsoft.com/office/drawing/2014/main" id="{2A53D2DA-721D-FC7E-8E09-BCBD844B6F9F}"/>
+                <a16:creationId xmlns:a16="http://schemas.microsoft.com/office/drawing/2014/main" xmlns="" id="{2A53D2DA-721D-FC7E-8E09-BCBD844B6F9F}"/>
               </a:ext>
             </a:extLst>
           </p:cNvPr>
@@ -9125,7 +9138,7 @@
           <p:cNvPr id="5" name="Ribbon: Curved and Tilted Down 4">
             <a:extLst>
               <a:ext uri="{FF2B5EF4-FFF2-40B4-BE49-F238E27FC236}">
-                <a16:creationId xmlns:a16="http://schemas.microsoft.com/office/drawing/2014/main" id="{3FA23525-E3EA-B8CB-FD6A-53084CA847A7}"/>
+                <a16:creationId xmlns:a16="http://schemas.microsoft.com/office/drawing/2014/main" xmlns="" id="{3FA23525-E3EA-B8CB-FD6A-53084CA847A7}"/>
               </a:ext>
             </a:extLst>
           </p:cNvPr>
@@ -9198,7 +9211,7 @@
           <p:cNvPr id="6" name="Scroll: Vertical 5">
             <a:extLst>
               <a:ext uri="{FF2B5EF4-FFF2-40B4-BE49-F238E27FC236}">
-                <a16:creationId xmlns:a16="http://schemas.microsoft.com/office/drawing/2014/main" id="{1A4C732A-2840-82C8-A359-298D925E33B3}"/>
+                <a16:creationId xmlns:a16="http://schemas.microsoft.com/office/drawing/2014/main" xmlns="" id="{1A4C732A-2840-82C8-A359-298D925E33B3}"/>
               </a:ext>
             </a:extLst>
           </p:cNvPr>
@@ -9388,7 +9401,7 @@
     </p:spTree>
     <p:extLst>
       <p:ext uri="{BB962C8B-B14F-4D97-AF65-F5344CB8AC3E}">
-        <p14:creationId xmlns:p14="http://schemas.microsoft.com/office/powerpoint/2010/main" val="3002471670"/>
+        <p14:creationId xmlns:p14="http://schemas.microsoft.com/office/powerpoint/2010/main" xmlns="" val="3002471670"/>
       </p:ext>
     </p:extLst>
   </p:cSld>
@@ -9420,7 +9433,7 @@
           <p:cNvPr id="9" name="Explosion: 14 Points 8">
             <a:extLst>
               <a:ext uri="{FF2B5EF4-FFF2-40B4-BE49-F238E27FC236}">
-                <a16:creationId xmlns:a16="http://schemas.microsoft.com/office/drawing/2014/main" id="{0A2CD68B-7A56-F86D-8B6F-4A8BF99B4C9E}"/>
+                <a16:creationId xmlns:a16="http://schemas.microsoft.com/office/drawing/2014/main" xmlns="" id="{0A2CD68B-7A56-F86D-8B6F-4A8BF99B4C9E}"/>
               </a:ext>
             </a:extLst>
           </p:cNvPr>
@@ -9475,7 +9488,7 @@
           <p:cNvPr id="2" name="Title 1">
             <a:extLst>
               <a:ext uri="{FF2B5EF4-FFF2-40B4-BE49-F238E27FC236}">
-                <a16:creationId xmlns:a16="http://schemas.microsoft.com/office/drawing/2014/main" id="{62BB4F8D-44B7-9866-F7B2-6375CB902974}"/>
+                <a16:creationId xmlns:a16="http://schemas.microsoft.com/office/drawing/2014/main" xmlns="" id="{62BB4F8D-44B7-9866-F7B2-6375CB902974}"/>
               </a:ext>
             </a:extLst>
           </p:cNvPr>
@@ -9509,6 +9522,15 @@
               </a:rPr>
               <a:t>JavaScript</a:t>
             </a:r>
+            <a:r>
+              <a:rPr lang="en-US" sz="7200" b="1" dirty="0">
+                <a:solidFill>
+                  <a:schemeClr val="tx1"/>
+                </a:solidFill>
+                <a:latin typeface="Barlow Black" panose="00000A00000000000000" pitchFamily="2" charset="0"/>
+              </a:rPr>
+              <a:t/>
+            </a:r>
             <a:br>
               <a:rPr lang="en-US" sz="7200" b="1" dirty="0">
                 <a:solidFill>
@@ -9584,7 +9606,7 @@
           <p:cNvPr id="4" name="Ribbon: Curved and Tilted Down 3">
             <a:extLst>
               <a:ext uri="{FF2B5EF4-FFF2-40B4-BE49-F238E27FC236}">
-                <a16:creationId xmlns:a16="http://schemas.microsoft.com/office/drawing/2014/main" id="{909DBECF-689C-9AA7-1649-9166A578EDF9}"/>
+                <a16:creationId xmlns:a16="http://schemas.microsoft.com/office/drawing/2014/main" xmlns="" id="{909DBECF-689C-9AA7-1649-9166A578EDF9}"/>
               </a:ext>
             </a:extLst>
           </p:cNvPr>
@@ -9651,7 +9673,7 @@
           <p:cNvPr id="5" name="Scroll: Vertical 4">
             <a:extLst>
               <a:ext uri="{FF2B5EF4-FFF2-40B4-BE49-F238E27FC236}">
-                <a16:creationId xmlns:a16="http://schemas.microsoft.com/office/drawing/2014/main" id="{38EB993A-3F18-C6B7-226F-EDD62B4B31DB}"/>
+                <a16:creationId xmlns:a16="http://schemas.microsoft.com/office/drawing/2014/main" xmlns="" id="{38EB993A-3F18-C6B7-226F-EDD62B4B31DB}"/>
               </a:ext>
             </a:extLst>
           </p:cNvPr>
@@ -10063,7 +10085,7 @@
           <p:cNvPr id="8" name="TextBox 7">
             <a:extLst>
               <a:ext uri="{FF2B5EF4-FFF2-40B4-BE49-F238E27FC236}">
-                <a16:creationId xmlns:a16="http://schemas.microsoft.com/office/drawing/2014/main" id="{6E6F1672-8C91-3FA6-CB80-58FD68172333}"/>
+                <a16:creationId xmlns:a16="http://schemas.microsoft.com/office/drawing/2014/main" xmlns="" id="{6E6F1672-8C91-3FA6-CB80-58FD68172333}"/>
               </a:ext>
             </a:extLst>
           </p:cNvPr>
@@ -10121,7 +10143,7 @@
     </p:spTree>
     <p:extLst>
       <p:ext uri="{BB962C8B-B14F-4D97-AF65-F5344CB8AC3E}">
-        <p14:creationId xmlns:p14="http://schemas.microsoft.com/office/powerpoint/2010/main" val="3287175084"/>
+        <p14:creationId xmlns:p14="http://schemas.microsoft.com/office/powerpoint/2010/main" xmlns="" val="3287175084"/>
       </p:ext>
     </p:extLst>
   </p:cSld>
@@ -10153,7 +10175,7 @@
           <p:cNvPr id="9" name="Explosion: 14 Points 8">
             <a:extLst>
               <a:ext uri="{FF2B5EF4-FFF2-40B4-BE49-F238E27FC236}">
-                <a16:creationId xmlns:a16="http://schemas.microsoft.com/office/drawing/2014/main" id="{0A2CD68B-7A56-F86D-8B6F-4A8BF99B4C9E}"/>
+                <a16:creationId xmlns:a16="http://schemas.microsoft.com/office/drawing/2014/main" xmlns="" id="{0A2CD68B-7A56-F86D-8B6F-4A8BF99B4C9E}"/>
               </a:ext>
             </a:extLst>
           </p:cNvPr>
@@ -10208,7 +10230,7 @@
           <p:cNvPr id="2" name="Title 1">
             <a:extLst>
               <a:ext uri="{FF2B5EF4-FFF2-40B4-BE49-F238E27FC236}">
-                <a16:creationId xmlns:a16="http://schemas.microsoft.com/office/drawing/2014/main" id="{62BB4F8D-44B7-9866-F7B2-6375CB902974}"/>
+                <a16:creationId xmlns:a16="http://schemas.microsoft.com/office/drawing/2014/main" xmlns="" id="{62BB4F8D-44B7-9866-F7B2-6375CB902974}"/>
               </a:ext>
             </a:extLst>
           </p:cNvPr>
@@ -10242,6 +10264,15 @@
               </a:rPr>
               <a:t>JavaScript</a:t>
             </a:r>
+            <a:r>
+              <a:rPr lang="en-US" sz="7200" b="1" dirty="0">
+                <a:solidFill>
+                  <a:schemeClr val="tx1"/>
+                </a:solidFill>
+                <a:latin typeface="Barlow Black" panose="00000A00000000000000" pitchFamily="2" charset="0"/>
+              </a:rPr>
+              <a:t/>
+            </a:r>
             <a:br>
               <a:rPr lang="en-US" sz="7200" b="1" dirty="0">
                 <a:solidFill>
@@ -10320,7 +10351,7 @@
           <p:cNvPr id="4" name="Ribbon: Curved and Tilted Down 3">
             <a:extLst>
               <a:ext uri="{FF2B5EF4-FFF2-40B4-BE49-F238E27FC236}">
-                <a16:creationId xmlns:a16="http://schemas.microsoft.com/office/drawing/2014/main" id="{909DBECF-689C-9AA7-1649-9166A578EDF9}"/>
+                <a16:creationId xmlns:a16="http://schemas.microsoft.com/office/drawing/2014/main" xmlns="" id="{909DBECF-689C-9AA7-1649-9166A578EDF9}"/>
               </a:ext>
             </a:extLst>
           </p:cNvPr>
@@ -10387,7 +10418,7 @@
           <p:cNvPr id="8" name="TextBox 7">
             <a:extLst>
               <a:ext uri="{FF2B5EF4-FFF2-40B4-BE49-F238E27FC236}">
-                <a16:creationId xmlns:a16="http://schemas.microsoft.com/office/drawing/2014/main" id="{6E6F1672-8C91-3FA6-CB80-58FD68172333}"/>
+                <a16:creationId xmlns:a16="http://schemas.microsoft.com/office/drawing/2014/main" xmlns="" id="{6E6F1672-8C91-3FA6-CB80-58FD68172333}"/>
               </a:ext>
             </a:extLst>
           </p:cNvPr>
@@ -10447,7 +10478,7 @@
           <p:cNvPr id="5" name="Scroll: Vertical 4">
             <a:extLst>
               <a:ext uri="{FF2B5EF4-FFF2-40B4-BE49-F238E27FC236}">
-                <a16:creationId xmlns:a16="http://schemas.microsoft.com/office/drawing/2014/main" id="{38EB993A-3F18-C6B7-226F-EDD62B4B31DB}"/>
+                <a16:creationId xmlns:a16="http://schemas.microsoft.com/office/drawing/2014/main" xmlns="" id="{38EB993A-3F18-C6B7-226F-EDD62B4B31DB}"/>
               </a:ext>
             </a:extLst>
           </p:cNvPr>
@@ -10569,7 +10600,7 @@
     </p:spTree>
     <p:extLst>
       <p:ext uri="{BB962C8B-B14F-4D97-AF65-F5344CB8AC3E}">
-        <p14:creationId xmlns:p14="http://schemas.microsoft.com/office/powerpoint/2010/main" val="3287175084"/>
+        <p14:creationId xmlns:p14="http://schemas.microsoft.com/office/powerpoint/2010/main" xmlns="" val="3287175084"/>
       </p:ext>
     </p:extLst>
   </p:cSld>
@@ -10587,7 +10618,7 @@
         <p:cNvPr id="1" name="">
           <a:extLst>
             <a:ext uri="{FF2B5EF4-FFF2-40B4-BE49-F238E27FC236}">
-              <a16:creationId xmlns:a16="http://schemas.microsoft.com/office/drawing/2014/main" id="{C5637B91-7316-D738-42FD-B6F1CC38AB90}"/>
+              <a16:creationId xmlns:a16="http://schemas.microsoft.com/office/drawing/2014/main" xmlns="" id="{C5637B91-7316-D738-42FD-B6F1CC38AB90}"/>
             </a:ext>
           </a:extLst>
         </p:cNvPr>
@@ -10607,7 +10638,7 @@
           <p:cNvPr id="2" name="Title 1">
             <a:extLst>
               <a:ext uri="{FF2B5EF4-FFF2-40B4-BE49-F238E27FC236}">
-                <a16:creationId xmlns:a16="http://schemas.microsoft.com/office/drawing/2014/main" id="{0BB42E27-7C22-C4E2-3B23-3F7F20980B00}"/>
+                <a16:creationId xmlns:a16="http://schemas.microsoft.com/office/drawing/2014/main" xmlns="" id="{0BB42E27-7C22-C4E2-3B23-3F7F20980B00}"/>
               </a:ext>
             </a:extLst>
           </p:cNvPr>
@@ -10645,7 +10676,7 @@
           <p:cNvPr id="3" name="Content Placeholder 2">
             <a:extLst>
               <a:ext uri="{FF2B5EF4-FFF2-40B4-BE49-F238E27FC236}">
-                <a16:creationId xmlns:a16="http://schemas.microsoft.com/office/drawing/2014/main" id="{514ACDD6-0D2B-0B03-F18B-91318DCF7D9A}"/>
+                <a16:creationId xmlns:a16="http://schemas.microsoft.com/office/drawing/2014/main" xmlns="" id="{514ACDD6-0D2B-0B03-F18B-91318DCF7D9A}"/>
               </a:ext>
             </a:extLst>
           </p:cNvPr>
@@ -10679,9 +10710,17 @@
               </a:rPr>
               <a:t>Single line comment</a:t>
             </a:r>
+            <a:r>
+              <a:rPr lang="en-US" sz="2000" dirty="0"/>
+              <a:t/>
+            </a:r>
             <a:br>
               <a:rPr lang="en-US" sz="2000" dirty="0"/>
             </a:br>
+            <a:r>
+              <a:rPr lang="en-US" sz="2000" dirty="0"/>
+              <a:t/>
+            </a:r>
             <a:br>
               <a:rPr lang="en-US" sz="2000" dirty="0"/>
             </a:br>
@@ -10719,6 +10758,14 @@
                 </a:solidFill>
               </a:rPr>
             </a:br>
+            <a:r>
+              <a:rPr lang="en-US" sz="2000" dirty="0">
+                <a:solidFill>
+                  <a:schemeClr val="tx1"/>
+                </a:solidFill>
+              </a:rPr>
+              <a:t/>
+            </a:r>
             <a:br>
               <a:rPr lang="en-US" sz="2000" dirty="0">
                 <a:solidFill>
@@ -10744,6 +10791,10 @@
               </a:rPr>
               <a:t>Inline comment</a:t>
             </a:r>
+            <a:r>
+              <a:rPr lang="en-US" sz="2000" dirty="0"/>
+              <a:t/>
+            </a:r>
             <a:br>
               <a:rPr lang="en-US" sz="2000" dirty="0"/>
             </a:br>
@@ -10770,6 +10821,16 @@
                 </a:solidFill>
               </a:rPr>
             </a:br>
+            <a:r>
+              <a:rPr lang="en-US" sz="2000" dirty="0">
+                <a:solidFill>
+                  <a:schemeClr val="tx1">
+                    <a:lumMod val="50000"/>
+                  </a:schemeClr>
+                </a:solidFill>
+              </a:rPr>
+              <a:t/>
+            </a:r>
             <a:br>
               <a:rPr lang="en-US" sz="2000" dirty="0">
                 <a:solidFill>
@@ -10799,6 +10860,10 @@
               </a:rPr>
               <a:t>Multiline comment</a:t>
             </a:r>
+            <a:r>
+              <a:rPr lang="en-US" sz="2000" dirty="0"/>
+              <a:t/>
+            </a:r>
             <a:br>
               <a:rPr lang="en-US" sz="2000" dirty="0"/>
             </a:br>
@@ -10913,7 +10978,7 @@
           <p:cNvPr id="5" name="Ribbon: Curved and Tilted Down 4">
             <a:extLst>
               <a:ext uri="{FF2B5EF4-FFF2-40B4-BE49-F238E27FC236}">
-                <a16:creationId xmlns:a16="http://schemas.microsoft.com/office/drawing/2014/main" id="{D1D7DB93-DBF3-0DF0-3533-AC1786837990}"/>
+                <a16:creationId xmlns:a16="http://schemas.microsoft.com/office/drawing/2014/main" xmlns="" id="{D1D7DB93-DBF3-0DF0-3533-AC1786837990}"/>
               </a:ext>
             </a:extLst>
           </p:cNvPr>
@@ -10986,7 +11051,7 @@
           <p:cNvPr id="6" name="Scroll: Vertical 5">
             <a:extLst>
               <a:ext uri="{FF2B5EF4-FFF2-40B4-BE49-F238E27FC236}">
-                <a16:creationId xmlns:a16="http://schemas.microsoft.com/office/drawing/2014/main" id="{4B810CE8-F172-ABEF-9B5B-F6C6A3F4D513}"/>
+                <a16:creationId xmlns:a16="http://schemas.microsoft.com/office/drawing/2014/main" xmlns="" id="{4B810CE8-F172-ABEF-9B5B-F6C6A3F4D513}"/>
               </a:ext>
             </a:extLst>
           </p:cNvPr>
@@ -11112,7 +11177,7 @@
           <p:cNvPr id="7" name="TextBox 6">
             <a:extLst>
               <a:ext uri="{FF2B5EF4-FFF2-40B4-BE49-F238E27FC236}">
-                <a16:creationId xmlns:a16="http://schemas.microsoft.com/office/drawing/2014/main" id="{7C7A2712-C9B9-958D-594C-39F36B75B90A}"/>
+                <a16:creationId xmlns:a16="http://schemas.microsoft.com/office/drawing/2014/main" xmlns="" id="{7C7A2712-C9B9-958D-594C-39F36B75B90A}"/>
               </a:ext>
             </a:extLst>
           </p:cNvPr>
@@ -11162,7 +11227,7 @@
     </p:spTree>
     <p:extLst>
       <p:ext uri="{BB962C8B-B14F-4D97-AF65-F5344CB8AC3E}">
-        <p14:creationId xmlns:p14="http://schemas.microsoft.com/office/powerpoint/2010/main" val="693676810"/>
+        <p14:creationId xmlns:p14="http://schemas.microsoft.com/office/powerpoint/2010/main" xmlns="" val="693676810"/>
       </p:ext>
     </p:extLst>
   </p:cSld>
@@ -11194,7 +11259,7 @@
           <p:cNvPr id="9" name="Explosion: 14 Points 8">
             <a:extLst>
               <a:ext uri="{FF2B5EF4-FFF2-40B4-BE49-F238E27FC236}">
-                <a16:creationId xmlns:a16="http://schemas.microsoft.com/office/drawing/2014/main" id="{0A2CD68B-7A56-F86D-8B6F-4A8BF99B4C9E}"/>
+                <a16:creationId xmlns:a16="http://schemas.microsoft.com/office/drawing/2014/main" xmlns="" id="{0A2CD68B-7A56-F86D-8B6F-4A8BF99B4C9E}"/>
               </a:ext>
             </a:extLst>
           </p:cNvPr>
@@ -11249,7 +11314,7 @@
           <p:cNvPr id="2" name="Title 1">
             <a:extLst>
               <a:ext uri="{FF2B5EF4-FFF2-40B4-BE49-F238E27FC236}">
-                <a16:creationId xmlns:a16="http://schemas.microsoft.com/office/drawing/2014/main" id="{62BB4F8D-44B7-9866-F7B2-6375CB902974}"/>
+                <a16:creationId xmlns:a16="http://schemas.microsoft.com/office/drawing/2014/main" xmlns="" id="{62BB4F8D-44B7-9866-F7B2-6375CB902974}"/>
               </a:ext>
             </a:extLst>
           </p:cNvPr>
@@ -11283,6 +11348,15 @@
               </a:rPr>
               <a:t>JavaScript</a:t>
             </a:r>
+            <a:r>
+              <a:rPr lang="en-US" sz="7200" b="1" dirty="0">
+                <a:solidFill>
+                  <a:schemeClr val="tx1"/>
+                </a:solidFill>
+                <a:latin typeface="Barlow Black" panose="00000A00000000000000" pitchFamily="2" charset="0"/>
+              </a:rPr>
+              <a:t/>
+            </a:r>
             <a:br>
               <a:rPr lang="en-US" sz="7200" b="1" dirty="0">
                 <a:solidFill>
@@ -11314,7 +11388,7 @@
           <p:cNvPr id="4" name="Ribbon: Curved and Tilted Down 3">
             <a:extLst>
               <a:ext uri="{FF2B5EF4-FFF2-40B4-BE49-F238E27FC236}">
-                <a16:creationId xmlns:a16="http://schemas.microsoft.com/office/drawing/2014/main" id="{909DBECF-689C-9AA7-1649-9166A578EDF9}"/>
+                <a16:creationId xmlns:a16="http://schemas.microsoft.com/office/drawing/2014/main" xmlns="" id="{909DBECF-689C-9AA7-1649-9166A578EDF9}"/>
               </a:ext>
             </a:extLst>
           </p:cNvPr>
@@ -11381,7 +11455,7 @@
           <p:cNvPr id="5" name="Scroll: Vertical 4">
             <a:extLst>
               <a:ext uri="{FF2B5EF4-FFF2-40B4-BE49-F238E27FC236}">
-                <a16:creationId xmlns:a16="http://schemas.microsoft.com/office/drawing/2014/main" id="{38EB993A-3F18-C6B7-226F-EDD62B4B31DB}"/>
+                <a16:creationId xmlns:a16="http://schemas.microsoft.com/office/drawing/2014/main" xmlns="" id="{38EB993A-3F18-C6B7-226F-EDD62B4B31DB}"/>
               </a:ext>
             </a:extLst>
           </p:cNvPr>
@@ -11641,7 +11715,7 @@
           <p:cNvPr id="8" name="TextBox 7">
             <a:extLst>
               <a:ext uri="{FF2B5EF4-FFF2-40B4-BE49-F238E27FC236}">
-                <a16:creationId xmlns:a16="http://schemas.microsoft.com/office/drawing/2014/main" id="{6E6F1672-8C91-3FA6-CB80-58FD68172333}"/>
+                <a16:creationId xmlns:a16="http://schemas.microsoft.com/office/drawing/2014/main" xmlns="" id="{6E6F1672-8C91-3FA6-CB80-58FD68172333}"/>
               </a:ext>
             </a:extLst>
           </p:cNvPr>
@@ -11699,7 +11773,7 @@
     </p:spTree>
     <p:extLst>
       <p:ext uri="{BB962C8B-B14F-4D97-AF65-F5344CB8AC3E}">
-        <p14:creationId xmlns:p14="http://schemas.microsoft.com/office/powerpoint/2010/main" val="3287175084"/>
+        <p14:creationId xmlns:p14="http://schemas.microsoft.com/office/powerpoint/2010/main" xmlns="" val="3287175084"/>
       </p:ext>
     </p:extLst>
   </p:cSld>
@@ -11731,7 +11805,7 @@
           <p:cNvPr id="9" name="Explosion: 14 Points 8">
             <a:extLst>
               <a:ext uri="{FF2B5EF4-FFF2-40B4-BE49-F238E27FC236}">
-                <a16:creationId xmlns:a16="http://schemas.microsoft.com/office/drawing/2014/main" id="{0A2CD68B-7A56-F86D-8B6F-4A8BF99B4C9E}"/>
+                <a16:creationId xmlns:a16="http://schemas.microsoft.com/office/drawing/2014/main" xmlns="" id="{0A2CD68B-7A56-F86D-8B6F-4A8BF99B4C9E}"/>
               </a:ext>
             </a:extLst>
           </p:cNvPr>
@@ -11786,7 +11860,7 @@
           <p:cNvPr id="2" name="Title 1">
             <a:extLst>
               <a:ext uri="{FF2B5EF4-FFF2-40B4-BE49-F238E27FC236}">
-                <a16:creationId xmlns:a16="http://schemas.microsoft.com/office/drawing/2014/main" id="{62BB4F8D-44B7-9866-F7B2-6375CB902974}"/>
+                <a16:creationId xmlns:a16="http://schemas.microsoft.com/office/drawing/2014/main" xmlns="" id="{62BB4F8D-44B7-9866-F7B2-6375CB902974}"/>
               </a:ext>
             </a:extLst>
           </p:cNvPr>
@@ -11820,6 +11894,15 @@
               </a:rPr>
               <a:t>JavaScript</a:t>
             </a:r>
+            <a:r>
+              <a:rPr lang="en-US" sz="7200" b="1" dirty="0">
+                <a:solidFill>
+                  <a:schemeClr val="tx1"/>
+                </a:solidFill>
+                <a:latin typeface="Barlow Black" panose="00000A00000000000000" pitchFamily="2" charset="0"/>
+              </a:rPr>
+              <a:t/>
+            </a:r>
             <a:br>
               <a:rPr lang="en-US" sz="7200" b="1" dirty="0">
                 <a:solidFill>
@@ -11898,7 +11981,7 @@
           <p:cNvPr id="4" name="Ribbon: Curved and Tilted Down 3">
             <a:extLst>
               <a:ext uri="{FF2B5EF4-FFF2-40B4-BE49-F238E27FC236}">
-                <a16:creationId xmlns:a16="http://schemas.microsoft.com/office/drawing/2014/main" id="{909DBECF-689C-9AA7-1649-9166A578EDF9}"/>
+                <a16:creationId xmlns:a16="http://schemas.microsoft.com/office/drawing/2014/main" xmlns="" id="{909DBECF-689C-9AA7-1649-9166A578EDF9}"/>
               </a:ext>
             </a:extLst>
           </p:cNvPr>
@@ -11965,7 +12048,7 @@
           <p:cNvPr id="8" name="TextBox 7">
             <a:extLst>
               <a:ext uri="{FF2B5EF4-FFF2-40B4-BE49-F238E27FC236}">
-                <a16:creationId xmlns:a16="http://schemas.microsoft.com/office/drawing/2014/main" id="{6E6F1672-8C91-3FA6-CB80-58FD68172333}"/>
+                <a16:creationId xmlns:a16="http://schemas.microsoft.com/office/drawing/2014/main" xmlns="" id="{6E6F1672-8C91-3FA6-CB80-58FD68172333}"/>
               </a:ext>
             </a:extLst>
           </p:cNvPr>
@@ -12025,7 +12108,7 @@
           <p:cNvPr id="5" name="Scroll: Vertical 4">
             <a:extLst>
               <a:ext uri="{FF2B5EF4-FFF2-40B4-BE49-F238E27FC236}">
-                <a16:creationId xmlns:a16="http://schemas.microsoft.com/office/drawing/2014/main" id="{38EB993A-3F18-C6B7-226F-EDD62B4B31DB}"/>
+                <a16:creationId xmlns:a16="http://schemas.microsoft.com/office/drawing/2014/main" xmlns="" id="{38EB993A-3F18-C6B7-226F-EDD62B4B31DB}"/>
               </a:ext>
             </a:extLst>
           </p:cNvPr>
@@ -12077,9 +12160,7 @@
             <a:r>
               <a:rPr lang="en-US" sz="3600" b="1" dirty="0">
                 <a:solidFill>
-                  <a:schemeClr val="bg1">
-                    <a:lumMod val="95000"/>
-                  </a:schemeClr>
+                  <a:schemeClr val="bg1"/>
                 </a:solidFill>
               </a:rPr>
               <a:t>Topics</a:t>
@@ -12094,22 +12175,29 @@
               <a:buChar char="o"/>
             </a:pPr>
             <a:r>
-              <a:rPr lang="en-US" sz="1600" dirty="0" err="1">
-                <a:solidFill>
-                  <a:schemeClr val="bg1">
-                    <a:lumMod val="95000"/>
-                  </a:schemeClr>
-                </a:solidFill>
-              </a:rPr>
-              <a:t>Var</a:t>
-            </a:r>
-            <a:endParaRPr lang="en-US" sz="1600" dirty="0">
-              <a:solidFill>
-                <a:schemeClr val="bg1">
-                  <a:lumMod val="95000"/>
-                </a:schemeClr>
-              </a:solidFill>
-            </a:endParaRPr>
+              <a:rPr lang="en-US" sz="1600" dirty="0" smtClean="0">
+                <a:solidFill>
+                  <a:schemeClr val="bg1"/>
+                </a:solidFill>
+              </a:rPr>
+              <a:t>What are </a:t>
+            </a:r>
+            <a:r>
+              <a:rPr lang="en-US" sz="1600" dirty="0" err="1" smtClean="0">
+                <a:solidFill>
+                  <a:schemeClr val="bg1"/>
+                </a:solidFill>
+              </a:rPr>
+              <a:t>var</a:t>
+            </a:r>
+            <a:r>
+              <a:rPr lang="en-US" sz="1600" dirty="0" smtClean="0">
+                <a:solidFill>
+                  <a:schemeClr val="bg1"/>
+                </a:solidFill>
+              </a:rPr>
+              <a:t>, let, and const?</a:t>
+            </a:r>
           </a:p>
           <a:p>
             <a:pPr marL="285750" indent="-285750">
@@ -12120,11 +12208,9 @@
               <a:buChar char="o"/>
             </a:pPr>
             <a:r>
-              <a:rPr lang="en-IN" sz="1600" dirty="0">
-                <a:solidFill>
-                  <a:schemeClr val="bg1">
-                    <a:lumMod val="95000"/>
-                  </a:schemeClr>
+              <a:rPr lang="en-IN" sz="1600" dirty="0" smtClean="0">
+                <a:solidFill>
+                  <a:schemeClr val="bg1"/>
                 </a:solidFill>
               </a:rPr>
               <a:t>What is Hoisting</a:t>
@@ -12139,31 +12225,25 @@
               <a:buChar char="o"/>
             </a:pPr>
             <a:r>
-              <a:rPr lang="en-IN" sz="1600" dirty="0">
-                <a:solidFill>
-                  <a:schemeClr val="bg1">
-                    <a:lumMod val="95000"/>
-                  </a:schemeClr>
+              <a:rPr lang="en-IN" sz="1600" dirty="0" smtClean="0">
+                <a:solidFill>
+                  <a:schemeClr val="bg1"/>
                 </a:solidFill>
               </a:rPr>
               <a:t>Undefined </a:t>
             </a:r>
             <a:r>
-              <a:rPr lang="en-IN" sz="1600" dirty="0" err="1">
-                <a:solidFill>
-                  <a:schemeClr val="bg1">
-                    <a:lumMod val="95000"/>
-                  </a:schemeClr>
+              <a:rPr lang="en-IN" sz="1600" dirty="0" err="1" smtClean="0">
+                <a:solidFill>
+                  <a:schemeClr val="bg1"/>
                 </a:solidFill>
               </a:rPr>
               <a:t>vs</a:t>
             </a:r>
             <a:r>
-              <a:rPr lang="en-IN" sz="1600" dirty="0">
-                <a:solidFill>
-                  <a:schemeClr val="bg1">
-                    <a:lumMod val="95000"/>
-                  </a:schemeClr>
+              <a:rPr lang="en-IN" sz="1600" dirty="0" smtClean="0">
+                <a:solidFill>
+                  <a:schemeClr val="bg1"/>
                 </a:solidFill>
               </a:rPr>
               <a:t> not-defined</a:t>
@@ -12178,14 +12258,20 @@
               <a:buChar char="o"/>
             </a:pPr>
             <a:r>
-              <a:rPr lang="en-IN" sz="1600" dirty="0">
-                <a:solidFill>
-                  <a:schemeClr val="bg1">
-                    <a:lumMod val="95000"/>
-                  </a:schemeClr>
-                </a:solidFill>
-              </a:rPr>
-              <a:t>With arrow function</a:t>
+              <a:rPr lang="en-IN" sz="1600" dirty="0" smtClean="0">
+                <a:solidFill>
+                  <a:schemeClr val="bg1"/>
+                </a:solidFill>
+              </a:rPr>
+              <a:t>Hoisting </a:t>
+            </a:r>
+            <a:r>
+              <a:rPr lang="en-IN" sz="1600" dirty="0" smtClean="0">
+                <a:solidFill>
+                  <a:schemeClr val="bg1"/>
+                </a:solidFill>
+              </a:rPr>
+              <a:t>arrow function</a:t>
             </a:r>
           </a:p>
           <a:p>
@@ -12197,60 +12283,25 @@
               <a:buChar char="o"/>
             </a:pPr>
             <a:r>
-              <a:rPr lang="en-IN" sz="1600" dirty="0">
-                <a:solidFill>
-                  <a:schemeClr val="bg1">
-                    <a:lumMod val="95000"/>
-                  </a:schemeClr>
-                </a:solidFill>
-              </a:rPr>
-              <a:t>What is call stack and how it works</a:t>
-            </a:r>
-          </a:p>
-          <a:p>
-            <a:pPr marL="285750" indent="-285750">
-              <a:lnSpc>
-                <a:spcPct val="150000"/>
-              </a:lnSpc>
-              <a:buFont typeface="Courier New" panose="02070309020205020404" pitchFamily="49" charset="0"/>
-              <a:buChar char="o"/>
-            </a:pPr>
-            <a:r>
-              <a:rPr lang="en-IN" sz="1600" dirty="0">
-                <a:solidFill>
-                  <a:schemeClr val="bg1">
-                    <a:lumMod val="95000"/>
-                  </a:schemeClr>
-                </a:solidFill>
-              </a:rPr>
-              <a:t>Let</a:t>
-            </a:r>
-          </a:p>
-          <a:p>
-            <a:pPr marL="285750" indent="-285750">
-              <a:lnSpc>
-                <a:spcPct val="150000"/>
-              </a:lnSpc>
-              <a:buFont typeface="Courier New" panose="02070309020205020404" pitchFamily="49" charset="0"/>
-              <a:buChar char="o"/>
-            </a:pPr>
-            <a:r>
-              <a:rPr lang="en-IN" sz="1600" dirty="0">
-                <a:solidFill>
-                  <a:schemeClr val="bg1">
-                    <a:lumMod val="95000"/>
-                  </a:schemeClr>
-                </a:solidFill>
-              </a:rPr>
-              <a:t>Const</a:t>
-            </a:r>
+              <a:rPr lang="en-IN" sz="1600" dirty="0" smtClean="0">
+                <a:solidFill>
+                  <a:schemeClr val="bg1"/>
+                </a:solidFill>
+              </a:rPr>
+              <a:t>What is the call stack and how it works</a:t>
+            </a:r>
+            <a:endParaRPr lang="en-IN" sz="1600" dirty="0">
+              <a:solidFill>
+                <a:schemeClr val="bg1"/>
+              </a:solidFill>
+            </a:endParaRPr>
           </a:p>
         </p:txBody>
       </p:sp>
     </p:spTree>
     <p:extLst>
       <p:ext uri="{BB962C8B-B14F-4D97-AF65-F5344CB8AC3E}">
-        <p14:creationId xmlns:p14="http://schemas.microsoft.com/office/powerpoint/2010/main" val="3287175084"/>
+        <p14:creationId xmlns:p14="http://schemas.microsoft.com/office/powerpoint/2010/main" xmlns="" val="3287175084"/>
       </p:ext>
     </p:extLst>
   </p:cSld>
@@ -12268,7 +12319,7 @@
         <p:cNvPr id="1" name="">
           <a:extLst>
             <a:ext uri="{FF2B5EF4-FFF2-40B4-BE49-F238E27FC236}">
-              <a16:creationId xmlns:a16="http://schemas.microsoft.com/office/drawing/2014/main" id="{4586E9D7-F5F8-14CC-9DF6-FC4AF2EA4249}"/>
+              <a16:creationId xmlns:a16="http://schemas.microsoft.com/office/drawing/2014/main" xmlns="" id="{4586E9D7-F5F8-14CC-9DF6-FC4AF2EA4249}"/>
             </a:ext>
           </a:extLst>
         </p:cNvPr>
@@ -12288,7 +12339,7 @@
           <p:cNvPr id="2" name="Title 1">
             <a:extLst>
               <a:ext uri="{FF2B5EF4-FFF2-40B4-BE49-F238E27FC236}">
-                <a16:creationId xmlns:a16="http://schemas.microsoft.com/office/drawing/2014/main" id="{D8B67155-694F-FF61-7CDD-33A20A316215}"/>
+                <a16:creationId xmlns:a16="http://schemas.microsoft.com/office/drawing/2014/main" xmlns="" id="{D8B67155-694F-FF61-7CDD-33A20A316215}"/>
               </a:ext>
             </a:extLst>
           </p:cNvPr>
@@ -12316,26 +12367,41 @@
                 </a:solidFill>
                 <a:latin typeface="Bahnschrift SemiLight" pitchFamily="34" charset="0"/>
               </a:rPr>
-              <a:t>What is </a:t>
-            </a:r>
-            <a:r>
-              <a:rPr lang="en-US" b="1" dirty="0" err="1">
+              <a:t>What </a:t>
+            </a:r>
+            <a:r>
+              <a:rPr lang="en-US" b="1" dirty="0" smtClean="0">
                 <a:solidFill>
                   <a:schemeClr val="tx1"/>
                 </a:solidFill>
                 <a:latin typeface="Bahnschrift SemiLight" pitchFamily="34" charset="0"/>
               </a:rPr>
+              <a:t>are </a:t>
+            </a:r>
+            <a:r>
+              <a:rPr lang="en-US" b="1" dirty="0" err="1" smtClean="0">
+                <a:solidFill>
+                  <a:schemeClr val="tx1"/>
+                </a:solidFill>
+                <a:latin typeface="Bahnschrift SemiLight" pitchFamily="34" charset="0"/>
+              </a:rPr>
               <a:t>var</a:t>
             </a:r>
             <a:r>
-              <a:rPr lang="en-US" b="1" dirty="0">
+              <a:rPr lang="en-US" b="1" dirty="0" smtClean="0">
                 <a:solidFill>
                   <a:schemeClr val="tx1"/>
                 </a:solidFill>
                 <a:latin typeface="Bahnschrift SemiLight" pitchFamily="34" charset="0"/>
               </a:rPr>
-              <a:t>?</a:t>
-            </a:r>
+              <a:t>, let and const?</a:t>
+            </a:r>
+            <a:endParaRPr lang="en-US" b="1" dirty="0">
+              <a:solidFill>
+                <a:schemeClr val="tx1"/>
+              </a:solidFill>
+              <a:latin typeface="Bahnschrift SemiLight" pitchFamily="34" charset="0"/>
+            </a:endParaRPr>
           </a:p>
         </p:txBody>
       </p:sp>
@@ -12344,7 +12410,7 @@
           <p:cNvPr id="3" name="Content Placeholder 2">
             <a:extLst>
               <a:ext uri="{FF2B5EF4-FFF2-40B4-BE49-F238E27FC236}">
-                <a16:creationId xmlns:a16="http://schemas.microsoft.com/office/drawing/2014/main" id="{2A53D2DA-721D-FC7E-8E09-BCBD844B6F9F}"/>
+                <a16:creationId xmlns:a16="http://schemas.microsoft.com/office/drawing/2014/main" xmlns="" id="{2A53D2DA-721D-FC7E-8E09-BCBD844B6F9F}"/>
               </a:ext>
             </a:extLst>
           </p:cNvPr>
@@ -12358,15 +12424,20 @@
         <p:spPr>
           <a:xfrm>
             <a:off x="233198" y="1259254"/>
-            <a:ext cx="7502570" cy="830804"/>
+            <a:ext cx="7502570" cy="1160096"/>
           </a:xfrm>
         </p:spPr>
         <p:txBody>
           <a:bodyPr>
-            <a:normAutofit/>
+            <a:normAutofit lnSpcReduction="10000"/>
           </a:bodyPr>
           <a:lstStyle/>
           <a:p>
+            <a:pPr>
+              <a:lnSpc>
+                <a:spcPct val="150000"/>
+              </a:lnSpc>
+            </a:pPr>
             <a:r>
               <a:rPr lang="en-US" sz="1600" dirty="0"/>
               <a:t>In JavaScript, </a:t>
@@ -12398,7 +12469,7 @@
           <p:cNvPr id="5" name="Ribbon: Curved and Tilted Down 4">
             <a:extLst>
               <a:ext uri="{FF2B5EF4-FFF2-40B4-BE49-F238E27FC236}">
-                <a16:creationId xmlns:a16="http://schemas.microsoft.com/office/drawing/2014/main" id="{3FA23525-E3EA-B8CB-FD6A-53084CA847A7}"/>
+                <a16:creationId xmlns:a16="http://schemas.microsoft.com/office/drawing/2014/main" xmlns="" id="{3FA23525-E3EA-B8CB-FD6A-53084CA847A7}"/>
               </a:ext>
             </a:extLst>
           </p:cNvPr>
@@ -12471,7 +12542,7 @@
           <p:cNvPr id="6" name="Scroll: Vertical 5">
             <a:extLst>
               <a:ext uri="{FF2B5EF4-FFF2-40B4-BE49-F238E27FC236}">
-                <a16:creationId xmlns:a16="http://schemas.microsoft.com/office/drawing/2014/main" id="{1A4C732A-2840-82C8-A359-298D925E33B3}"/>
+                <a16:creationId xmlns:a16="http://schemas.microsoft.com/office/drawing/2014/main" xmlns="" id="{1A4C732A-2840-82C8-A359-298D925E33B3}"/>
               </a:ext>
             </a:extLst>
           </p:cNvPr>
@@ -12565,7 +12636,15 @@
                   <a:schemeClr val="tx1"/>
                 </a:solidFill>
               </a:rPr>
-              <a:t>What is Hoisting</a:t>
+              <a:t>What is </a:t>
+            </a:r>
+            <a:r>
+              <a:rPr lang="en-IN" dirty="0" smtClean="0">
+                <a:solidFill>
+                  <a:schemeClr val="tx1"/>
+                </a:solidFill>
+              </a:rPr>
+              <a:t>Hoisting</a:t>
             </a:r>
           </a:p>
           <a:p>
@@ -12577,7 +12656,7 @@
               <a:buChar char="o"/>
             </a:pPr>
             <a:r>
-              <a:rPr lang="en-IN" dirty="0">
+              <a:rPr lang="en-IN" dirty="0" smtClean="0">
                 <a:solidFill>
                   <a:schemeClr val="tx1"/>
                 </a:solidFill>
@@ -12585,7 +12664,7 @@
               <a:t>Undefined </a:t>
             </a:r>
             <a:r>
-              <a:rPr lang="en-IN" dirty="0" err="1">
+              <a:rPr lang="en-IN" dirty="0" err="1" smtClean="0">
                 <a:solidFill>
                   <a:schemeClr val="tx1"/>
                 </a:solidFill>
@@ -12593,7 +12672,7 @@
               <a:t>vs</a:t>
             </a:r>
             <a:r>
-              <a:rPr lang="en-IN" dirty="0">
+              <a:rPr lang="en-IN" dirty="0" smtClean="0">
                 <a:solidFill>
                   <a:schemeClr val="tx1"/>
                 </a:solidFill>
@@ -12610,7 +12689,7 @@
               <a:buChar char="o"/>
             </a:pPr>
             <a:r>
-              <a:rPr lang="en-IN" dirty="0">
+              <a:rPr lang="en-IN" dirty="0" smtClean="0">
                 <a:solidFill>
                   <a:schemeClr val="tx1"/>
                 </a:solidFill>
@@ -12627,13 +12706,18 @@
               <a:buChar char="o"/>
             </a:pPr>
             <a:r>
-              <a:rPr lang="en-IN" dirty="0">
+              <a:rPr lang="en-IN" dirty="0" smtClean="0">
                 <a:solidFill>
                   <a:schemeClr val="tx1"/>
                 </a:solidFill>
               </a:rPr>
               <a:t>What is the call stack and how it works</a:t>
             </a:r>
+            <a:endParaRPr lang="en-IN" dirty="0">
+              <a:solidFill>
+                <a:schemeClr val="tx1"/>
+              </a:solidFill>
+            </a:endParaRPr>
           </a:p>
         </p:txBody>
       </p:sp>
@@ -12685,7 +12769,7 @@
       </p:sp>
       <p:pic>
         <p:nvPicPr>
-          <p:cNvPr id="2052" name="Picture 4" descr="C:\Users\Gautam\Downloads\Blank board - Page 1 (2).png"/>
+          <p:cNvPr id="1026" name="Picture 2" descr="C:\Users\Gautam\Downloads\Blank board - Page 1 (3).png"/>
           <p:cNvPicPr>
             <a:picLocks noChangeAspect="1" noChangeArrowheads="1"/>
           </p:cNvPicPr>
@@ -12700,8 +12784,8 @@
         </p:blipFill>
         <p:spPr bwMode="auto">
           <a:xfrm>
-            <a:off x="756743" y="2263820"/>
-            <a:ext cx="4259393" cy="3712801"/>
+            <a:off x="414294" y="2819400"/>
+            <a:ext cx="7849726" cy="2809875"/>
           </a:xfrm>
           <a:prstGeom prst="rect">
             <a:avLst/>
@@ -12712,7 +12796,2408 @@
     </p:spTree>
     <p:extLst>
       <p:ext uri="{BB962C8B-B14F-4D97-AF65-F5344CB8AC3E}">
-        <p14:creationId xmlns:p14="http://schemas.microsoft.com/office/powerpoint/2010/main" val="3002471670"/>
+        <p14:creationId xmlns:p14="http://schemas.microsoft.com/office/powerpoint/2010/main" xmlns="" val="3002471670"/>
+      </p:ext>
+    </p:extLst>
+  </p:cSld>
+  <p:clrMapOvr>
+    <a:masterClrMapping/>
+  </p:clrMapOvr>
+</p:sld>
+</file>
+
+<file path=ppt/slides/slide22.xml><?xml version="1.0" encoding="utf-8"?>
+<p:sld xmlns:a="http://schemas.openxmlformats.org/drawingml/2006/main" xmlns:r="http://schemas.openxmlformats.org/officeDocument/2006/relationships" xmlns:p="http://schemas.openxmlformats.org/presentationml/2006/main">
+  <p:cSld>
+    <p:spTree>
+      <p:nvGrpSpPr>
+        <p:cNvPr id="1" name="">
+          <a:extLst>
+            <a:ext uri="{FF2B5EF4-FFF2-40B4-BE49-F238E27FC236}">
+              <a16:creationId xmlns:a16="http://schemas.microsoft.com/office/drawing/2014/main" xmlns="" id="{4586E9D7-F5F8-14CC-9DF6-FC4AF2EA4249}"/>
+            </a:ext>
+          </a:extLst>
+        </p:cNvPr>
+        <p:cNvGrpSpPr/>
+        <p:nvPr/>
+      </p:nvGrpSpPr>
+      <p:grpSpPr>
+        <a:xfrm>
+          <a:off x="0" y="0"/>
+          <a:ext cx="0" cy="0"/>
+          <a:chOff x="0" y="0"/>
+          <a:chExt cx="0" cy="0"/>
+        </a:xfrm>
+      </p:grpSpPr>
+      <p:sp>
+        <p:nvSpPr>
+          <p:cNvPr id="2" name="Title 1">
+            <a:extLst>
+              <a:ext uri="{FF2B5EF4-FFF2-40B4-BE49-F238E27FC236}">
+                <a16:creationId xmlns:a16="http://schemas.microsoft.com/office/drawing/2014/main" xmlns="" id="{D8B67155-694F-FF61-7CDD-33A20A316215}"/>
+              </a:ext>
+            </a:extLst>
+          </p:cNvPr>
+          <p:cNvSpPr>
+            <a:spLocks noGrp="1"/>
+          </p:cNvSpPr>
+          <p:nvPr>
+            <p:ph type="title"/>
+          </p:nvPr>
+        </p:nvSpPr>
+        <p:spPr>
+          <a:xfrm>
+            <a:off x="198363" y="597199"/>
+            <a:ext cx="8596668" cy="666407"/>
+          </a:xfrm>
+        </p:spPr>
+        <p:txBody>
+          <a:bodyPr/>
+          <a:lstStyle/>
+          <a:p>
+            <a:r>
+              <a:rPr lang="en-US" b="1" dirty="0" err="1" smtClean="0">
+                <a:solidFill>
+                  <a:schemeClr val="tx1"/>
+                </a:solidFill>
+                <a:latin typeface="Bahnschrift SemiLight" pitchFamily="34" charset="0"/>
+              </a:rPr>
+              <a:t>v</a:t>
+            </a:r>
+            <a:r>
+              <a:rPr lang="en-US" b="1" dirty="0" err="1" smtClean="0">
+                <a:solidFill>
+                  <a:schemeClr val="tx1"/>
+                </a:solidFill>
+                <a:latin typeface="Bahnschrift SemiLight" pitchFamily="34" charset="0"/>
+              </a:rPr>
+              <a:t>ar</a:t>
+            </a:r>
+            <a:r>
+              <a:rPr lang="en-US" b="1" dirty="0" smtClean="0">
+                <a:solidFill>
+                  <a:schemeClr val="tx1"/>
+                </a:solidFill>
+                <a:latin typeface="Bahnschrift SemiLight" pitchFamily="34" charset="0"/>
+              </a:rPr>
+              <a:t> and let on global scope</a:t>
+            </a:r>
+            <a:endParaRPr lang="en-US" b="1" dirty="0">
+              <a:solidFill>
+                <a:schemeClr val="tx1"/>
+              </a:solidFill>
+              <a:latin typeface="Bahnschrift SemiLight" pitchFamily="34" charset="0"/>
+            </a:endParaRPr>
+          </a:p>
+        </p:txBody>
+      </p:sp>
+      <p:sp>
+        <p:nvSpPr>
+          <p:cNvPr id="3" name="Content Placeholder 2">
+            <a:extLst>
+              <a:ext uri="{FF2B5EF4-FFF2-40B4-BE49-F238E27FC236}">
+                <a16:creationId xmlns:a16="http://schemas.microsoft.com/office/drawing/2014/main" xmlns="" id="{2A53D2DA-721D-FC7E-8E09-BCBD844B6F9F}"/>
+              </a:ext>
+            </a:extLst>
+          </p:cNvPr>
+          <p:cNvSpPr>
+            <a:spLocks noGrp="1"/>
+          </p:cNvSpPr>
+          <p:nvPr>
+            <p:ph idx="1"/>
+          </p:nvPr>
+        </p:nvSpPr>
+        <p:spPr>
+          <a:xfrm>
+            <a:off x="233198" y="1259254"/>
+            <a:ext cx="7502570" cy="5389196"/>
+          </a:xfrm>
+        </p:spPr>
+        <p:txBody>
+          <a:bodyPr>
+            <a:normAutofit/>
+          </a:bodyPr>
+          <a:lstStyle/>
+          <a:p>
+            <a:r>
+              <a:rPr lang="en-US" sz="1600" dirty="0" smtClean="0"/>
+              <a:t>Global Object </a:t>
+            </a:r>
+            <a:r>
+              <a:rPr lang="en-US" sz="1600" dirty="0" smtClean="0"/>
+              <a:t>Property</a:t>
+            </a:r>
+            <a:br>
+              <a:rPr lang="en-US" sz="1600" dirty="0" smtClean="0"/>
+            </a:br>
+            <a:r>
+              <a:rPr lang="en-US" sz="1600" b="1" dirty="0" err="1" smtClean="0"/>
+              <a:t>var</a:t>
+            </a:r>
+            <a:r>
+              <a:rPr lang="en-US" sz="1600" b="1" dirty="0" smtClean="0"/>
+              <a:t>:</a:t>
+            </a:r>
+            <a:r>
+              <a:rPr lang="en-US" sz="1600" dirty="0" smtClean="0"/>
+              <a:t> When declared in the global scope (outside of any function or block), </a:t>
+            </a:r>
+            <a:r>
+              <a:rPr lang="en-US" sz="1600" dirty="0" err="1" smtClean="0"/>
+              <a:t>var</a:t>
+            </a:r>
+            <a:r>
+              <a:rPr lang="en-US" sz="1600" dirty="0" smtClean="0"/>
+              <a:t> creates a property on the global object (e.g., window in browsers, global in Node.js). This means a </a:t>
+            </a:r>
+            <a:r>
+              <a:rPr lang="en-US" sz="1600" dirty="0" err="1" smtClean="0"/>
+              <a:t>var</a:t>
+            </a:r>
+            <a:r>
+              <a:rPr lang="en-US" sz="1600" dirty="0" smtClean="0"/>
+              <a:t> declared globally can be accessed as a property of the global object</a:t>
+            </a:r>
+            <a:r>
+              <a:rPr lang="en-US" sz="1600" dirty="0" smtClean="0"/>
+              <a:t>.</a:t>
+            </a:r>
+            <a:br>
+              <a:rPr lang="en-US" sz="1600" dirty="0" smtClean="0"/>
+            </a:br>
+            <a:r>
+              <a:rPr lang="en-US" sz="1600" dirty="0" smtClean="0"/>
+              <a:t/>
+            </a:r>
+            <a:br>
+              <a:rPr lang="en-US" sz="1600" dirty="0" smtClean="0"/>
+            </a:br>
+            <a:r>
+              <a:rPr lang="en-US" sz="1600" dirty="0" smtClean="0"/>
+              <a:t/>
+            </a:r>
+            <a:br>
+              <a:rPr lang="en-US" sz="1600" dirty="0" smtClean="0"/>
+            </a:br>
+            <a:r>
+              <a:rPr lang="en-US" sz="1600" dirty="0" smtClean="0"/>
+              <a:t/>
+            </a:r>
+            <a:br>
+              <a:rPr lang="en-US" sz="1600" dirty="0" smtClean="0"/>
+            </a:br>
+            <a:r>
+              <a:rPr lang="en-US" sz="1600" b="1" dirty="0" smtClean="0"/>
+              <a:t>let:</a:t>
+            </a:r>
+            <a:r>
+              <a:rPr lang="en-US" sz="1600" dirty="0" smtClean="0"/>
+              <a:t> In contrast, let declared in the global scope does not create a property on the global object. It still exists in the global scope and is accessible, but not as a direct property of window or global.</a:t>
+            </a:r>
+          </a:p>
+          <a:p>
+            <a:endParaRPr lang="en-US" sz="1600" dirty="0" smtClean="0"/>
+          </a:p>
+          <a:p>
+            <a:pPr>
+              <a:lnSpc>
+                <a:spcPct val="150000"/>
+              </a:lnSpc>
+            </a:pPr>
+            <a:endParaRPr lang="en-US" sz="1600" dirty="0"/>
+          </a:p>
+        </p:txBody>
+      </p:sp>
+      <p:sp>
+        <p:nvSpPr>
+          <p:cNvPr id="5" name="Ribbon: Curved and Tilted Down 4">
+            <a:extLst>
+              <a:ext uri="{FF2B5EF4-FFF2-40B4-BE49-F238E27FC236}">
+                <a16:creationId xmlns:a16="http://schemas.microsoft.com/office/drawing/2014/main" xmlns="" id="{3FA23525-E3EA-B8CB-FD6A-53084CA847A7}"/>
+              </a:ext>
+            </a:extLst>
+          </p:cNvPr>
+          <p:cNvSpPr/>
+          <p:nvPr/>
+        </p:nvSpPr>
+        <p:spPr>
+          <a:xfrm>
+            <a:off x="198362" y="149779"/>
+            <a:ext cx="3337317" cy="424987"/>
+          </a:xfrm>
+          <a:prstGeom prst="ellipseRibbon">
+            <a:avLst/>
+          </a:prstGeom>
+          <a:solidFill>
+            <a:schemeClr val="bg1">
+              <a:lumMod val="85000"/>
+              <a:lumOff val="15000"/>
+            </a:schemeClr>
+          </a:solidFill>
+          <a:ln>
+            <a:noFill/>
+          </a:ln>
+        </p:spPr>
+        <p:style>
+          <a:lnRef idx="2">
+            <a:schemeClr val="accent1">
+              <a:shade val="15000"/>
+            </a:schemeClr>
+          </a:lnRef>
+          <a:fillRef idx="1">
+            <a:schemeClr val="accent1"/>
+          </a:fillRef>
+          <a:effectRef idx="0">
+            <a:schemeClr val="accent1"/>
+          </a:effectRef>
+          <a:fontRef idx="minor">
+            <a:schemeClr val="lt1"/>
+          </a:fontRef>
+        </p:style>
+        <p:txBody>
+          <a:bodyPr rtlCol="0" anchor="ctr"/>
+          <a:lstStyle/>
+          <a:p>
+            <a:pPr algn="ctr"/>
+            <a:r>
+              <a:rPr lang="en-US" sz="1100" dirty="0">
+                <a:solidFill>
+                  <a:schemeClr val="tx1">
+                    <a:lumMod val="65000"/>
+                    <a:lumOff val="35000"/>
+                  </a:schemeClr>
+                </a:solidFill>
+              </a:rPr>
+              <a:t>JavaScript Tutorials</a:t>
+            </a:r>
+            <a:endParaRPr lang="en-IN" sz="1100" dirty="0">
+              <a:solidFill>
+                <a:schemeClr val="tx1">
+                  <a:lumMod val="65000"/>
+                  <a:lumOff val="35000"/>
+                </a:schemeClr>
+              </a:solidFill>
+            </a:endParaRPr>
+          </a:p>
+        </p:txBody>
+      </p:sp>
+      <p:sp>
+        <p:nvSpPr>
+          <p:cNvPr id="6" name="Scroll: Vertical 5">
+            <a:extLst>
+              <a:ext uri="{FF2B5EF4-FFF2-40B4-BE49-F238E27FC236}">
+                <a16:creationId xmlns:a16="http://schemas.microsoft.com/office/drawing/2014/main" xmlns="" id="{1A4C732A-2840-82C8-A359-298D925E33B3}"/>
+              </a:ext>
+            </a:extLst>
+          </p:cNvPr>
+          <p:cNvSpPr/>
+          <p:nvPr/>
+        </p:nvSpPr>
+        <p:spPr>
+          <a:xfrm>
+            <a:off x="7851914" y="715617"/>
+            <a:ext cx="4240696" cy="4989444"/>
+          </a:xfrm>
+          <a:prstGeom prst="verticalScroll">
+            <a:avLst/>
+          </a:prstGeom>
+          <a:solidFill>
+            <a:schemeClr val="bg1">
+              <a:lumMod val="85000"/>
+            </a:schemeClr>
+          </a:solidFill>
+          <a:ln>
+            <a:solidFill>
+              <a:schemeClr val="bg1">
+                <a:lumMod val="75000"/>
+                <a:lumOff val="25000"/>
+              </a:schemeClr>
+            </a:solidFill>
+          </a:ln>
+        </p:spPr>
+        <p:style>
+          <a:lnRef idx="2">
+            <a:schemeClr val="accent1">
+              <a:shade val="15000"/>
+            </a:schemeClr>
+          </a:lnRef>
+          <a:fillRef idx="1">
+            <a:schemeClr val="accent1"/>
+          </a:fillRef>
+          <a:effectRef idx="0">
+            <a:schemeClr val="accent1"/>
+          </a:effectRef>
+          <a:fontRef idx="minor">
+            <a:schemeClr val="lt1"/>
+          </a:fontRef>
+        </p:style>
+        <p:txBody>
+          <a:bodyPr rtlCol="0" anchor="t"/>
+          <a:lstStyle/>
+          <a:p>
+            <a:pPr>
+              <a:lnSpc>
+                <a:spcPct val="150000"/>
+              </a:lnSpc>
+            </a:pPr>
+            <a:r>
+              <a:rPr lang="en-US" sz="2400" b="1" dirty="0">
+                <a:solidFill>
+                  <a:schemeClr val="tx1"/>
+                </a:solidFill>
+              </a:rPr>
+              <a:t>Topics</a:t>
+            </a:r>
+          </a:p>
+          <a:p>
+            <a:pPr marL="285750" indent="-285750">
+              <a:lnSpc>
+                <a:spcPct val="150000"/>
+              </a:lnSpc>
+              <a:buFont typeface="Courier New" panose="02070309020205020404" pitchFamily="49" charset="0"/>
+              <a:buChar char="o"/>
+            </a:pPr>
+            <a:r>
+              <a:rPr lang="en-US" dirty="0">
+                <a:solidFill>
+                  <a:schemeClr val="tx1"/>
+                </a:solidFill>
+              </a:rPr>
+              <a:t>What are var, let, and const?</a:t>
+            </a:r>
+          </a:p>
+          <a:p>
+            <a:pPr marL="285750" indent="-285750">
+              <a:lnSpc>
+                <a:spcPct val="150000"/>
+              </a:lnSpc>
+              <a:buFont typeface="Courier New" panose="02070309020205020404" pitchFamily="49" charset="0"/>
+              <a:buChar char="o"/>
+            </a:pPr>
+            <a:r>
+              <a:rPr lang="en-IN" dirty="0">
+                <a:solidFill>
+                  <a:schemeClr val="tx1"/>
+                </a:solidFill>
+              </a:rPr>
+              <a:t>What is </a:t>
+            </a:r>
+            <a:r>
+              <a:rPr lang="en-IN" dirty="0" smtClean="0">
+                <a:solidFill>
+                  <a:schemeClr val="tx1"/>
+                </a:solidFill>
+              </a:rPr>
+              <a:t>Hoisting</a:t>
+            </a:r>
+            <a:endParaRPr lang="en-IN" dirty="0">
+              <a:solidFill>
+                <a:schemeClr val="tx1"/>
+              </a:solidFill>
+            </a:endParaRPr>
+          </a:p>
+        </p:txBody>
+      </p:sp>
+      <p:sp>
+        <p:nvSpPr>
+          <p:cNvPr id="7" name="TextBox 6"/>
+          <p:cNvSpPr txBox="1"/>
+          <p:nvPr/>
+        </p:nvSpPr>
+        <p:spPr>
+          <a:xfrm>
+            <a:off x="9614263" y="801189"/>
+            <a:ext cx="1401346" cy="369332"/>
+          </a:xfrm>
+          <a:prstGeom prst="rect">
+            <a:avLst/>
+          </a:prstGeom>
+          <a:noFill/>
+        </p:spPr>
+        <p:txBody>
+          <a:bodyPr wrap="none" rtlCol="0">
+            <a:spAutoFit/>
+          </a:bodyPr>
+          <a:lstStyle/>
+          <a:p>
+            <a:r>
+              <a:rPr lang="en-IN" b="1" dirty="0">
+                <a:solidFill>
+                  <a:schemeClr val="accent2">
+                    <a:lumMod val="60000"/>
+                    <a:lumOff val="40000"/>
+                  </a:schemeClr>
+                </a:solidFill>
+                <a:latin typeface="Bahnschrift SemiLight" pitchFamily="34" charset="0"/>
+              </a:rPr>
+              <a:t>Chapter - 5</a:t>
+            </a:r>
+            <a:endParaRPr lang="en-US" b="1" dirty="0">
+              <a:solidFill>
+                <a:schemeClr val="accent2">
+                  <a:lumMod val="60000"/>
+                  <a:lumOff val="40000"/>
+                </a:schemeClr>
+              </a:solidFill>
+              <a:latin typeface="Bahnschrift SemiLight" pitchFamily="34" charset="0"/>
+            </a:endParaRPr>
+          </a:p>
+        </p:txBody>
+      </p:sp>
+      <p:pic>
+        <p:nvPicPr>
+          <p:cNvPr id="2050" name="Picture 2"/>
+          <p:cNvPicPr>
+            <a:picLocks noChangeAspect="1" noChangeArrowheads="1"/>
+          </p:cNvPicPr>
+          <p:nvPr/>
+        </p:nvPicPr>
+        <p:blipFill>
+          <a:blip r:embed="rId2"/>
+          <a:srcRect/>
+          <a:stretch>
+            <a:fillRect/>
+          </a:stretch>
+        </p:blipFill>
+        <p:spPr bwMode="auto">
+          <a:xfrm>
+            <a:off x="671513" y="2643188"/>
+            <a:ext cx="5133975" cy="447675"/>
+          </a:xfrm>
+          <a:prstGeom prst="rect">
+            <a:avLst/>
+          </a:prstGeom>
+          <a:noFill/>
+          <a:ln w="9525">
+            <a:noFill/>
+            <a:miter lim="800000"/>
+            <a:headEnd/>
+            <a:tailEnd/>
+          </a:ln>
+          <a:effectLst/>
+        </p:spPr>
+      </p:pic>
+      <p:pic>
+        <p:nvPicPr>
+          <p:cNvPr id="2051" name="Picture 3"/>
+          <p:cNvPicPr>
+            <a:picLocks noChangeAspect="1" noChangeArrowheads="1"/>
+          </p:cNvPicPr>
+          <p:nvPr/>
+        </p:nvPicPr>
+        <p:blipFill>
+          <a:blip r:embed="rId3"/>
+          <a:srcRect/>
+          <a:stretch>
+            <a:fillRect/>
+          </a:stretch>
+        </p:blipFill>
+        <p:spPr bwMode="auto">
+          <a:xfrm>
+            <a:off x="676275" y="4162425"/>
+            <a:ext cx="4857750" cy="457200"/>
+          </a:xfrm>
+          <a:prstGeom prst="rect">
+            <a:avLst/>
+          </a:prstGeom>
+          <a:noFill/>
+          <a:ln w="9525">
+            <a:noFill/>
+            <a:miter lim="800000"/>
+            <a:headEnd/>
+            <a:tailEnd/>
+          </a:ln>
+          <a:effectLst/>
+        </p:spPr>
+      </p:pic>
+    </p:spTree>
+    <p:extLst>
+      <p:ext uri="{BB962C8B-B14F-4D97-AF65-F5344CB8AC3E}">
+        <p14:creationId xmlns:p14="http://schemas.microsoft.com/office/powerpoint/2010/main" xmlns="" val="3002471670"/>
+      </p:ext>
+    </p:extLst>
+  </p:cSld>
+  <p:clrMapOvr>
+    <a:masterClrMapping/>
+  </p:clrMapOvr>
+</p:sld>
+</file>
+
+<file path=ppt/slides/slide23.xml><?xml version="1.0" encoding="utf-8"?>
+<p:sld xmlns:a="http://schemas.openxmlformats.org/drawingml/2006/main" xmlns:r="http://schemas.openxmlformats.org/officeDocument/2006/relationships" xmlns:p="http://schemas.openxmlformats.org/presentationml/2006/main">
+  <p:cSld>
+    <p:spTree>
+      <p:nvGrpSpPr>
+        <p:cNvPr id="1" name="">
+          <a:extLst>
+            <a:ext uri="{FF2B5EF4-FFF2-40B4-BE49-F238E27FC236}">
+              <a16:creationId xmlns:a16="http://schemas.microsoft.com/office/drawing/2014/main" xmlns="" id="{4586E9D7-F5F8-14CC-9DF6-FC4AF2EA4249}"/>
+            </a:ext>
+          </a:extLst>
+        </p:cNvPr>
+        <p:cNvGrpSpPr/>
+        <p:nvPr/>
+      </p:nvGrpSpPr>
+      <p:grpSpPr>
+        <a:xfrm>
+          <a:off x="0" y="0"/>
+          <a:ext cx="0" cy="0"/>
+          <a:chOff x="0" y="0"/>
+          <a:chExt cx="0" cy="0"/>
+        </a:xfrm>
+      </p:grpSpPr>
+      <p:sp>
+        <p:nvSpPr>
+          <p:cNvPr id="2" name="Title 1">
+            <a:extLst>
+              <a:ext uri="{FF2B5EF4-FFF2-40B4-BE49-F238E27FC236}">
+                <a16:creationId xmlns:a16="http://schemas.microsoft.com/office/drawing/2014/main" xmlns="" id="{D8B67155-694F-FF61-7CDD-33A20A316215}"/>
+              </a:ext>
+            </a:extLst>
+          </p:cNvPr>
+          <p:cNvSpPr>
+            <a:spLocks noGrp="1"/>
+          </p:cNvSpPr>
+          <p:nvPr>
+            <p:ph type="title"/>
+          </p:nvPr>
+        </p:nvSpPr>
+        <p:spPr>
+          <a:xfrm>
+            <a:off x="236463" y="901999"/>
+            <a:ext cx="8596668" cy="666407"/>
+          </a:xfrm>
+        </p:spPr>
+        <p:txBody>
+          <a:bodyPr>
+            <a:normAutofit/>
+          </a:bodyPr>
+          <a:lstStyle/>
+          <a:p>
+            <a:r>
+              <a:rPr lang="en-US" b="1" dirty="0" smtClean="0">
+                <a:solidFill>
+                  <a:schemeClr val="tx1"/>
+                </a:solidFill>
+                <a:latin typeface="Bahnschrift SemiLight" pitchFamily="34" charset="0"/>
+              </a:rPr>
+              <a:t>Re-</a:t>
+            </a:r>
+            <a:r>
+              <a:rPr lang="en-US" b="1" dirty="0" err="1" smtClean="0">
+                <a:solidFill>
+                  <a:schemeClr val="tx1"/>
+                </a:solidFill>
+                <a:latin typeface="Bahnschrift SemiLight" pitchFamily="34" charset="0"/>
+              </a:rPr>
+              <a:t>declartion</a:t>
+            </a:r>
+            <a:r>
+              <a:rPr lang="en-US" b="1" dirty="0" smtClean="0">
+                <a:solidFill>
+                  <a:schemeClr val="tx1"/>
+                </a:solidFill>
+                <a:latin typeface="Bahnschrift SemiLight" pitchFamily="34" charset="0"/>
+              </a:rPr>
+              <a:t> of </a:t>
+            </a:r>
+            <a:r>
+              <a:rPr lang="en-US" b="1" dirty="0" err="1" smtClean="0">
+                <a:solidFill>
+                  <a:schemeClr val="tx1"/>
+                </a:solidFill>
+                <a:latin typeface="Bahnschrift SemiLight" pitchFamily="34" charset="0"/>
+              </a:rPr>
+              <a:t>v</a:t>
+            </a:r>
+            <a:r>
+              <a:rPr lang="en-US" b="1" dirty="0" err="1" smtClean="0">
+                <a:solidFill>
+                  <a:schemeClr val="tx1"/>
+                </a:solidFill>
+                <a:latin typeface="Bahnschrift SemiLight" pitchFamily="34" charset="0"/>
+              </a:rPr>
+              <a:t>ar</a:t>
+            </a:r>
+            <a:r>
+              <a:rPr lang="en-US" b="1" dirty="0" smtClean="0">
+                <a:solidFill>
+                  <a:schemeClr val="tx1"/>
+                </a:solidFill>
+                <a:latin typeface="Bahnschrift SemiLight" pitchFamily="34" charset="0"/>
+              </a:rPr>
+              <a:t> and let</a:t>
+            </a:r>
+            <a:endParaRPr lang="en-US" b="1" dirty="0">
+              <a:solidFill>
+                <a:schemeClr val="tx1"/>
+              </a:solidFill>
+              <a:latin typeface="Bahnschrift SemiLight" pitchFamily="34" charset="0"/>
+            </a:endParaRPr>
+          </a:p>
+        </p:txBody>
+      </p:sp>
+      <p:sp>
+        <p:nvSpPr>
+          <p:cNvPr id="5" name="Ribbon: Curved and Tilted Down 4">
+            <a:extLst>
+              <a:ext uri="{FF2B5EF4-FFF2-40B4-BE49-F238E27FC236}">
+                <a16:creationId xmlns:a16="http://schemas.microsoft.com/office/drawing/2014/main" xmlns="" id="{3FA23525-E3EA-B8CB-FD6A-53084CA847A7}"/>
+              </a:ext>
+            </a:extLst>
+          </p:cNvPr>
+          <p:cNvSpPr/>
+          <p:nvPr/>
+        </p:nvSpPr>
+        <p:spPr>
+          <a:xfrm>
+            <a:off x="255512" y="216454"/>
+            <a:ext cx="3678313" cy="583646"/>
+          </a:xfrm>
+          <a:prstGeom prst="ellipseRibbon">
+            <a:avLst/>
+          </a:prstGeom>
+          <a:solidFill>
+            <a:schemeClr val="bg1">
+              <a:lumMod val="85000"/>
+              <a:lumOff val="15000"/>
+            </a:schemeClr>
+          </a:solidFill>
+          <a:ln>
+            <a:noFill/>
+          </a:ln>
+        </p:spPr>
+        <p:style>
+          <a:lnRef idx="2">
+            <a:schemeClr val="accent1">
+              <a:shade val="15000"/>
+            </a:schemeClr>
+          </a:lnRef>
+          <a:fillRef idx="1">
+            <a:schemeClr val="accent1"/>
+          </a:fillRef>
+          <a:effectRef idx="0">
+            <a:schemeClr val="accent1"/>
+          </a:effectRef>
+          <a:fontRef idx="minor">
+            <a:schemeClr val="lt1"/>
+          </a:fontRef>
+        </p:style>
+        <p:txBody>
+          <a:bodyPr rtlCol="0" anchor="ctr"/>
+          <a:lstStyle/>
+          <a:p>
+            <a:pPr algn="ctr"/>
+            <a:r>
+              <a:rPr lang="en-US" sz="1100" dirty="0">
+                <a:solidFill>
+                  <a:schemeClr val="tx1">
+                    <a:lumMod val="65000"/>
+                    <a:lumOff val="35000"/>
+                  </a:schemeClr>
+                </a:solidFill>
+              </a:rPr>
+              <a:t>JavaScript Tutorials</a:t>
+            </a:r>
+            <a:endParaRPr lang="en-IN" sz="1100" dirty="0">
+              <a:solidFill>
+                <a:schemeClr val="tx1">
+                  <a:lumMod val="65000"/>
+                  <a:lumOff val="35000"/>
+                </a:schemeClr>
+              </a:solidFill>
+            </a:endParaRPr>
+          </a:p>
+        </p:txBody>
+      </p:sp>
+      <p:sp>
+        <p:nvSpPr>
+          <p:cNvPr id="6" name="Scroll: Vertical 5">
+            <a:extLst>
+              <a:ext uri="{FF2B5EF4-FFF2-40B4-BE49-F238E27FC236}">
+                <a16:creationId xmlns:a16="http://schemas.microsoft.com/office/drawing/2014/main" xmlns="" id="{1A4C732A-2840-82C8-A359-298D925E33B3}"/>
+              </a:ext>
+            </a:extLst>
+          </p:cNvPr>
+          <p:cNvSpPr/>
+          <p:nvPr/>
+        </p:nvSpPr>
+        <p:spPr>
+          <a:xfrm>
+            <a:off x="7851914" y="715617"/>
+            <a:ext cx="4240696" cy="4989444"/>
+          </a:xfrm>
+          <a:prstGeom prst="verticalScroll">
+            <a:avLst/>
+          </a:prstGeom>
+          <a:solidFill>
+            <a:schemeClr val="bg1">
+              <a:lumMod val="85000"/>
+            </a:schemeClr>
+          </a:solidFill>
+          <a:ln>
+            <a:solidFill>
+              <a:schemeClr val="bg1">
+                <a:lumMod val="75000"/>
+                <a:lumOff val="25000"/>
+              </a:schemeClr>
+            </a:solidFill>
+          </a:ln>
+        </p:spPr>
+        <p:style>
+          <a:lnRef idx="2">
+            <a:schemeClr val="accent1">
+              <a:shade val="15000"/>
+            </a:schemeClr>
+          </a:lnRef>
+          <a:fillRef idx="1">
+            <a:schemeClr val="accent1"/>
+          </a:fillRef>
+          <a:effectRef idx="0">
+            <a:schemeClr val="accent1"/>
+          </a:effectRef>
+          <a:fontRef idx="minor">
+            <a:schemeClr val="lt1"/>
+          </a:fontRef>
+        </p:style>
+        <p:txBody>
+          <a:bodyPr rtlCol="0" anchor="t"/>
+          <a:lstStyle/>
+          <a:p>
+            <a:pPr>
+              <a:lnSpc>
+                <a:spcPct val="150000"/>
+              </a:lnSpc>
+            </a:pPr>
+            <a:r>
+              <a:rPr lang="en-US" sz="2400" b="1" dirty="0">
+                <a:solidFill>
+                  <a:schemeClr val="tx1"/>
+                </a:solidFill>
+              </a:rPr>
+              <a:t>Topics</a:t>
+            </a:r>
+          </a:p>
+          <a:p>
+            <a:pPr marL="285750" indent="-285750">
+              <a:lnSpc>
+                <a:spcPct val="150000"/>
+              </a:lnSpc>
+              <a:buFont typeface="Courier New" panose="02070309020205020404" pitchFamily="49" charset="0"/>
+              <a:buChar char="o"/>
+            </a:pPr>
+            <a:r>
+              <a:rPr lang="en-US" dirty="0">
+                <a:solidFill>
+                  <a:schemeClr val="tx1"/>
+                </a:solidFill>
+              </a:rPr>
+              <a:t>What are var, let, and const?</a:t>
+            </a:r>
+          </a:p>
+          <a:p>
+            <a:pPr marL="285750" indent="-285750">
+              <a:lnSpc>
+                <a:spcPct val="150000"/>
+              </a:lnSpc>
+              <a:buFont typeface="Courier New" panose="02070309020205020404" pitchFamily="49" charset="0"/>
+              <a:buChar char="o"/>
+            </a:pPr>
+            <a:r>
+              <a:rPr lang="en-IN" dirty="0">
+                <a:solidFill>
+                  <a:schemeClr val="tx1"/>
+                </a:solidFill>
+              </a:rPr>
+              <a:t>What is </a:t>
+            </a:r>
+            <a:r>
+              <a:rPr lang="en-IN" dirty="0" smtClean="0">
+                <a:solidFill>
+                  <a:schemeClr val="tx1"/>
+                </a:solidFill>
+              </a:rPr>
+              <a:t>Hoisting</a:t>
+            </a:r>
+            <a:endParaRPr lang="en-IN" dirty="0">
+              <a:solidFill>
+                <a:schemeClr val="tx1"/>
+              </a:solidFill>
+            </a:endParaRPr>
+          </a:p>
+        </p:txBody>
+      </p:sp>
+      <p:sp>
+        <p:nvSpPr>
+          <p:cNvPr id="7" name="TextBox 6"/>
+          <p:cNvSpPr txBox="1"/>
+          <p:nvPr/>
+        </p:nvSpPr>
+        <p:spPr>
+          <a:xfrm>
+            <a:off x="9614263" y="801189"/>
+            <a:ext cx="1401346" cy="369332"/>
+          </a:xfrm>
+          <a:prstGeom prst="rect">
+            <a:avLst/>
+          </a:prstGeom>
+          <a:noFill/>
+        </p:spPr>
+        <p:txBody>
+          <a:bodyPr wrap="none" rtlCol="0">
+            <a:spAutoFit/>
+          </a:bodyPr>
+          <a:lstStyle/>
+          <a:p>
+            <a:r>
+              <a:rPr lang="en-IN" b="1" dirty="0">
+                <a:solidFill>
+                  <a:schemeClr val="accent2">
+                    <a:lumMod val="60000"/>
+                    <a:lumOff val="40000"/>
+                  </a:schemeClr>
+                </a:solidFill>
+                <a:latin typeface="Bahnschrift SemiLight" pitchFamily="34" charset="0"/>
+              </a:rPr>
+              <a:t>Chapter - 5</a:t>
+            </a:r>
+            <a:endParaRPr lang="en-US" b="1" dirty="0">
+              <a:solidFill>
+                <a:schemeClr val="accent2">
+                  <a:lumMod val="60000"/>
+                  <a:lumOff val="40000"/>
+                </a:schemeClr>
+              </a:solidFill>
+              <a:latin typeface="Bahnschrift SemiLight" pitchFamily="34" charset="0"/>
+            </a:endParaRPr>
+          </a:p>
+        </p:txBody>
+      </p:sp>
+      <p:sp>
+        <p:nvSpPr>
+          <p:cNvPr id="9" name="Content Placeholder 2">
+            <a:extLst>
+              <a:ext uri="{FF2B5EF4-FFF2-40B4-BE49-F238E27FC236}">
+                <a16:creationId xmlns:a16="http://schemas.microsoft.com/office/drawing/2014/main" xmlns="" id="{2A53D2DA-721D-FC7E-8E09-BCBD844B6F9F}"/>
+              </a:ext>
+            </a:extLst>
+          </p:cNvPr>
+          <p:cNvSpPr txBox="1">
+            <a:spLocks/>
+          </p:cNvSpPr>
+          <p:nvPr/>
+        </p:nvSpPr>
+        <p:spPr>
+          <a:xfrm>
+            <a:off x="366548" y="3192829"/>
+            <a:ext cx="7502570" cy="569546"/>
+          </a:xfrm>
+          <a:prstGeom prst="rect">
+            <a:avLst/>
+          </a:prstGeom>
+        </p:spPr>
+        <p:txBody>
+          <a:bodyPr vert="horz" lIns="91440" tIns="45720" rIns="91440" bIns="45720" rtlCol="0">
+            <a:normAutofit lnSpcReduction="10000"/>
+          </a:bodyPr>
+          <a:lstStyle/>
+          <a:p>
+            <a:r>
+              <a:rPr lang="en-US" sz="1600" b="1" dirty="0" smtClean="0">
+                <a:solidFill>
+                  <a:schemeClr val="accent2">
+                    <a:lumMod val="60000"/>
+                    <a:lumOff val="40000"/>
+                  </a:schemeClr>
+                </a:solidFill>
+              </a:rPr>
+              <a:t>let:</a:t>
+            </a:r>
+            <a:r>
+              <a:rPr lang="en-US" sz="1600" dirty="0" smtClean="0"/>
+              <a:t> Does not allow re-declaration of the same variable within the same scope. Attempting to do so will result in a </a:t>
+            </a:r>
+            <a:r>
+              <a:rPr lang="en-US" sz="1600" dirty="0" err="1" smtClean="0"/>
+              <a:t>SyntaxError</a:t>
+            </a:r>
+            <a:r>
+              <a:rPr lang="en-US" sz="1600" dirty="0" smtClean="0"/>
+              <a:t>.</a:t>
+            </a:r>
+          </a:p>
+          <a:p>
+            <a:pPr marL="342900" marR="0" lvl="0" indent="-342900" algn="l" defTabSz="457200" rtl="0" eaLnBrk="1" fontAlgn="auto" latinLnBrk="0" hangingPunct="1">
+              <a:lnSpc>
+                <a:spcPct val="100000"/>
+              </a:lnSpc>
+              <a:spcBef>
+                <a:spcPts val="1000"/>
+              </a:spcBef>
+              <a:spcAft>
+                <a:spcPts val="0"/>
+              </a:spcAft>
+              <a:buClr>
+                <a:schemeClr val="accent1"/>
+              </a:buClr>
+              <a:buSzPct val="80000"/>
+              <a:buFont typeface="Wingdings 3" charset="2"/>
+              <a:buNone/>
+              <a:tabLst/>
+              <a:defRPr/>
+            </a:pPr>
+            <a:endParaRPr kumimoji="0" lang="en-US" sz="1600" b="0" i="0" u="none" strike="noStrike" kern="1200" cap="none" spc="0" normalizeH="0" baseline="0" noProof="0" dirty="0" smtClean="0">
+              <a:ln>
+                <a:noFill/>
+              </a:ln>
+              <a:solidFill>
+                <a:schemeClr val="tx1">
+                  <a:lumMod val="75000"/>
+                  <a:lumOff val="25000"/>
+                </a:schemeClr>
+              </a:solidFill>
+              <a:effectLst/>
+              <a:uLnTx/>
+              <a:uFillTx/>
+              <a:latin typeface="+mn-lt"/>
+              <a:ea typeface="+mn-ea"/>
+              <a:cs typeface="+mn-cs"/>
+            </a:endParaRPr>
+          </a:p>
+          <a:p>
+            <a:pPr marL="342900" marR="0" lvl="0" indent="-342900" algn="l" defTabSz="457200" rtl="0" eaLnBrk="1" fontAlgn="auto" latinLnBrk="0" hangingPunct="1">
+              <a:lnSpc>
+                <a:spcPct val="150000"/>
+              </a:lnSpc>
+              <a:spcBef>
+                <a:spcPts val="1000"/>
+              </a:spcBef>
+              <a:spcAft>
+                <a:spcPts val="0"/>
+              </a:spcAft>
+              <a:buClr>
+                <a:schemeClr val="accent1"/>
+              </a:buClr>
+              <a:buSzPct val="80000"/>
+              <a:buFont typeface="Wingdings 3" charset="2"/>
+              <a:buChar char=""/>
+              <a:tabLst/>
+              <a:defRPr/>
+            </a:pPr>
+            <a:endParaRPr kumimoji="0" lang="en-US" sz="1600" b="0" i="0" u="none" strike="noStrike" kern="1200" cap="none" spc="0" normalizeH="0" baseline="0" noProof="0" dirty="0">
+              <a:ln>
+                <a:noFill/>
+              </a:ln>
+              <a:solidFill>
+                <a:schemeClr val="tx1">
+                  <a:lumMod val="75000"/>
+                  <a:lumOff val="25000"/>
+                </a:schemeClr>
+              </a:solidFill>
+              <a:effectLst/>
+              <a:uLnTx/>
+              <a:uFillTx/>
+              <a:latin typeface="+mn-lt"/>
+              <a:ea typeface="+mn-ea"/>
+              <a:cs typeface="+mn-cs"/>
+            </a:endParaRPr>
+          </a:p>
+        </p:txBody>
+      </p:sp>
+      <p:sp>
+        <p:nvSpPr>
+          <p:cNvPr id="11" name="Content Placeholder 2">
+            <a:extLst>
+              <a:ext uri="{FF2B5EF4-FFF2-40B4-BE49-F238E27FC236}">
+                <a16:creationId xmlns:a16="http://schemas.microsoft.com/office/drawing/2014/main" xmlns="" id="{2A53D2DA-721D-FC7E-8E09-BCBD844B6F9F}"/>
+              </a:ext>
+            </a:extLst>
+          </p:cNvPr>
+          <p:cNvSpPr txBox="1">
+            <a:spLocks/>
+          </p:cNvSpPr>
+          <p:nvPr/>
+        </p:nvSpPr>
+        <p:spPr>
+          <a:xfrm>
+            <a:off x="299873" y="1611679"/>
+            <a:ext cx="7502570" cy="569546"/>
+          </a:xfrm>
+          <a:prstGeom prst="rect">
+            <a:avLst/>
+          </a:prstGeom>
+        </p:spPr>
+        <p:txBody>
+          <a:bodyPr vert="horz" lIns="91440" tIns="45720" rIns="91440" bIns="45720" rtlCol="0">
+            <a:normAutofit lnSpcReduction="10000"/>
+          </a:bodyPr>
+          <a:lstStyle/>
+          <a:p>
+            <a:r>
+              <a:rPr lang="en-US" sz="1600" b="1" dirty="0" err="1" smtClean="0">
+                <a:solidFill>
+                  <a:schemeClr val="accent2">
+                    <a:lumMod val="60000"/>
+                    <a:lumOff val="40000"/>
+                  </a:schemeClr>
+                </a:solidFill>
+              </a:rPr>
+              <a:t>var</a:t>
+            </a:r>
+            <a:r>
+              <a:rPr lang="en-US" sz="1600" b="1" dirty="0" smtClean="0">
+                <a:solidFill>
+                  <a:schemeClr val="accent2">
+                    <a:lumMod val="60000"/>
+                    <a:lumOff val="40000"/>
+                  </a:schemeClr>
+                </a:solidFill>
+              </a:rPr>
+              <a:t>:</a:t>
+            </a:r>
+            <a:r>
+              <a:rPr lang="en-US" sz="1600" dirty="0" smtClean="0"/>
+              <a:t> Allows re-declaration of the same variable within the same </a:t>
+            </a:r>
+            <a:r>
+              <a:rPr lang="en-US" sz="1600" dirty="0" smtClean="0"/>
+              <a:t>scope</a:t>
+            </a:r>
+            <a:br>
+              <a:rPr lang="en-US" sz="1600" dirty="0" smtClean="0"/>
+            </a:br>
+            <a:r>
+              <a:rPr lang="en-US" sz="1600" dirty="0" smtClean="0"/>
+              <a:t>without </a:t>
+            </a:r>
+            <a:r>
+              <a:rPr lang="en-US" sz="1600" dirty="0" smtClean="0"/>
+              <a:t>an error. The later declaration simply overwrites the previous one.</a:t>
+            </a:r>
+          </a:p>
+          <a:p>
+            <a:pPr marL="342900" marR="0" lvl="0" indent="-342900" algn="l" defTabSz="457200" rtl="0" eaLnBrk="1" fontAlgn="auto" latinLnBrk="0" hangingPunct="1">
+              <a:lnSpc>
+                <a:spcPct val="100000"/>
+              </a:lnSpc>
+              <a:spcBef>
+                <a:spcPts val="1000"/>
+              </a:spcBef>
+              <a:spcAft>
+                <a:spcPts val="0"/>
+              </a:spcAft>
+              <a:buClr>
+                <a:schemeClr val="accent1"/>
+              </a:buClr>
+              <a:buSzPct val="80000"/>
+              <a:buFont typeface="Wingdings 3" charset="2"/>
+              <a:buNone/>
+              <a:tabLst/>
+              <a:defRPr/>
+            </a:pPr>
+            <a:endParaRPr kumimoji="0" lang="en-US" sz="1600" b="0" i="0" u="none" strike="noStrike" kern="1200" cap="none" spc="0" normalizeH="0" baseline="0" noProof="0" dirty="0" smtClean="0">
+              <a:ln>
+                <a:noFill/>
+              </a:ln>
+              <a:solidFill>
+                <a:schemeClr val="tx1">
+                  <a:lumMod val="75000"/>
+                  <a:lumOff val="25000"/>
+                </a:schemeClr>
+              </a:solidFill>
+              <a:effectLst/>
+              <a:uLnTx/>
+              <a:uFillTx/>
+              <a:latin typeface="+mn-lt"/>
+              <a:ea typeface="+mn-ea"/>
+              <a:cs typeface="+mn-cs"/>
+            </a:endParaRPr>
+          </a:p>
+          <a:p>
+            <a:pPr marL="342900" marR="0" lvl="0" indent="-342900" algn="l" defTabSz="457200" rtl="0" eaLnBrk="1" fontAlgn="auto" latinLnBrk="0" hangingPunct="1">
+              <a:lnSpc>
+                <a:spcPct val="150000"/>
+              </a:lnSpc>
+              <a:spcBef>
+                <a:spcPts val="1000"/>
+              </a:spcBef>
+              <a:spcAft>
+                <a:spcPts val="0"/>
+              </a:spcAft>
+              <a:buClr>
+                <a:schemeClr val="accent1"/>
+              </a:buClr>
+              <a:buSzPct val="80000"/>
+              <a:buFont typeface="Wingdings 3" charset="2"/>
+              <a:buChar char=""/>
+              <a:tabLst/>
+              <a:defRPr/>
+            </a:pPr>
+            <a:endParaRPr kumimoji="0" lang="en-US" sz="1600" b="0" i="0" u="none" strike="noStrike" kern="1200" cap="none" spc="0" normalizeH="0" baseline="0" noProof="0" dirty="0">
+              <a:ln>
+                <a:noFill/>
+              </a:ln>
+              <a:solidFill>
+                <a:schemeClr val="tx1">
+                  <a:lumMod val="75000"/>
+                  <a:lumOff val="25000"/>
+                </a:schemeClr>
+              </a:solidFill>
+              <a:effectLst/>
+              <a:uLnTx/>
+              <a:uFillTx/>
+              <a:latin typeface="+mn-lt"/>
+              <a:ea typeface="+mn-ea"/>
+              <a:cs typeface="+mn-cs"/>
+            </a:endParaRPr>
+          </a:p>
+        </p:txBody>
+      </p:sp>
+      <p:pic>
+        <p:nvPicPr>
+          <p:cNvPr id="3074" name="Picture 2"/>
+          <p:cNvPicPr>
+            <a:picLocks noChangeAspect="1" noChangeArrowheads="1"/>
+          </p:cNvPicPr>
+          <p:nvPr/>
+        </p:nvPicPr>
+        <p:blipFill>
+          <a:blip r:embed="rId2"/>
+          <a:srcRect/>
+          <a:stretch>
+            <a:fillRect/>
+          </a:stretch>
+        </p:blipFill>
+        <p:spPr bwMode="auto">
+          <a:xfrm>
+            <a:off x="428625" y="2286000"/>
+            <a:ext cx="2838450" cy="457200"/>
+          </a:xfrm>
+          <a:prstGeom prst="rect">
+            <a:avLst/>
+          </a:prstGeom>
+          <a:noFill/>
+          <a:ln w="9525">
+            <a:noFill/>
+            <a:miter lim="800000"/>
+            <a:headEnd/>
+            <a:tailEnd/>
+          </a:ln>
+          <a:effectLst/>
+        </p:spPr>
+      </p:pic>
+      <p:pic>
+        <p:nvPicPr>
+          <p:cNvPr id="3076" name="Picture 4"/>
+          <p:cNvPicPr>
+            <a:picLocks noChangeAspect="1" noChangeArrowheads="1"/>
+          </p:cNvPicPr>
+          <p:nvPr/>
+        </p:nvPicPr>
+        <p:blipFill>
+          <a:blip r:embed="rId3"/>
+          <a:srcRect/>
+          <a:stretch>
+            <a:fillRect/>
+          </a:stretch>
+        </p:blipFill>
+        <p:spPr bwMode="auto">
+          <a:xfrm>
+            <a:off x="457200" y="3819525"/>
+            <a:ext cx="5334000" cy="476250"/>
+          </a:xfrm>
+          <a:prstGeom prst="rect">
+            <a:avLst/>
+          </a:prstGeom>
+          <a:noFill/>
+          <a:ln w="9525">
+            <a:noFill/>
+            <a:miter lim="800000"/>
+            <a:headEnd/>
+            <a:tailEnd/>
+          </a:ln>
+          <a:effectLst/>
+        </p:spPr>
+      </p:pic>
+    </p:spTree>
+    <p:extLst>
+      <p:ext uri="{BB962C8B-B14F-4D97-AF65-F5344CB8AC3E}">
+        <p14:creationId xmlns:p14="http://schemas.microsoft.com/office/powerpoint/2010/main" xmlns="" val="3002471670"/>
+      </p:ext>
+    </p:extLst>
+  </p:cSld>
+  <p:clrMapOvr>
+    <a:masterClrMapping/>
+  </p:clrMapOvr>
+</p:sld>
+</file>
+
+<file path=ppt/slides/slide24.xml><?xml version="1.0" encoding="utf-8"?>
+<p:sld xmlns:a="http://schemas.openxmlformats.org/drawingml/2006/main" xmlns:r="http://schemas.openxmlformats.org/officeDocument/2006/relationships" xmlns:p="http://schemas.openxmlformats.org/presentationml/2006/main">
+  <p:cSld>
+    <p:spTree>
+      <p:nvGrpSpPr>
+        <p:cNvPr id="1" name="">
+          <a:extLst>
+            <a:ext uri="{FF2B5EF4-FFF2-40B4-BE49-F238E27FC236}">
+              <a16:creationId xmlns:a16="http://schemas.microsoft.com/office/drawing/2014/main" xmlns="" id="{4586E9D7-F5F8-14CC-9DF6-FC4AF2EA4249}"/>
+            </a:ext>
+          </a:extLst>
+        </p:cNvPr>
+        <p:cNvGrpSpPr/>
+        <p:nvPr/>
+      </p:nvGrpSpPr>
+      <p:grpSpPr>
+        <a:xfrm>
+          <a:off x="0" y="0"/>
+          <a:ext cx="0" cy="0"/>
+          <a:chOff x="0" y="0"/>
+          <a:chExt cx="0" cy="0"/>
+        </a:xfrm>
+      </p:grpSpPr>
+      <p:sp>
+        <p:nvSpPr>
+          <p:cNvPr id="2" name="Title 1">
+            <a:extLst>
+              <a:ext uri="{FF2B5EF4-FFF2-40B4-BE49-F238E27FC236}">
+                <a16:creationId xmlns:a16="http://schemas.microsoft.com/office/drawing/2014/main" xmlns="" id="{D8B67155-694F-FF61-7CDD-33A20A316215}"/>
+              </a:ext>
+            </a:extLst>
+          </p:cNvPr>
+          <p:cNvSpPr>
+            <a:spLocks noGrp="1"/>
+          </p:cNvSpPr>
+          <p:nvPr>
+            <p:ph type="title"/>
+          </p:nvPr>
+        </p:nvSpPr>
+        <p:spPr>
+          <a:xfrm>
+            <a:off x="236463" y="901999"/>
+            <a:ext cx="8596668" cy="666407"/>
+          </a:xfrm>
+        </p:spPr>
+        <p:txBody>
+          <a:bodyPr>
+            <a:normAutofit/>
+          </a:bodyPr>
+          <a:lstStyle/>
+          <a:p>
+            <a:r>
+              <a:rPr lang="en-US" b="1" dirty="0" smtClean="0">
+                <a:solidFill>
+                  <a:schemeClr val="tx1"/>
+                </a:solidFill>
+                <a:latin typeface="Bahnschrift SemiLight" pitchFamily="34" charset="0"/>
+              </a:rPr>
+              <a:t>What is hoisting?</a:t>
+            </a:r>
+            <a:endParaRPr lang="en-US" b="1" dirty="0">
+              <a:solidFill>
+                <a:schemeClr val="tx1"/>
+              </a:solidFill>
+              <a:latin typeface="Bahnschrift SemiLight" pitchFamily="34" charset="0"/>
+            </a:endParaRPr>
+          </a:p>
+        </p:txBody>
+      </p:sp>
+      <p:sp>
+        <p:nvSpPr>
+          <p:cNvPr id="5" name="Ribbon: Curved and Tilted Down 4">
+            <a:extLst>
+              <a:ext uri="{FF2B5EF4-FFF2-40B4-BE49-F238E27FC236}">
+                <a16:creationId xmlns:a16="http://schemas.microsoft.com/office/drawing/2014/main" xmlns="" id="{3FA23525-E3EA-B8CB-FD6A-53084CA847A7}"/>
+              </a:ext>
+            </a:extLst>
+          </p:cNvPr>
+          <p:cNvSpPr/>
+          <p:nvPr/>
+        </p:nvSpPr>
+        <p:spPr>
+          <a:xfrm>
+            <a:off x="255512" y="216454"/>
+            <a:ext cx="3678313" cy="583646"/>
+          </a:xfrm>
+          <a:prstGeom prst="ellipseRibbon">
+            <a:avLst/>
+          </a:prstGeom>
+          <a:solidFill>
+            <a:schemeClr val="bg1">
+              <a:lumMod val="85000"/>
+              <a:lumOff val="15000"/>
+            </a:schemeClr>
+          </a:solidFill>
+          <a:ln>
+            <a:noFill/>
+          </a:ln>
+        </p:spPr>
+        <p:style>
+          <a:lnRef idx="2">
+            <a:schemeClr val="accent1">
+              <a:shade val="15000"/>
+            </a:schemeClr>
+          </a:lnRef>
+          <a:fillRef idx="1">
+            <a:schemeClr val="accent1"/>
+          </a:fillRef>
+          <a:effectRef idx="0">
+            <a:schemeClr val="accent1"/>
+          </a:effectRef>
+          <a:fontRef idx="minor">
+            <a:schemeClr val="lt1"/>
+          </a:fontRef>
+        </p:style>
+        <p:txBody>
+          <a:bodyPr rtlCol="0" anchor="ctr"/>
+          <a:lstStyle/>
+          <a:p>
+            <a:pPr algn="ctr"/>
+            <a:r>
+              <a:rPr lang="en-US" sz="1100" dirty="0">
+                <a:solidFill>
+                  <a:schemeClr val="tx1">
+                    <a:lumMod val="65000"/>
+                    <a:lumOff val="35000"/>
+                  </a:schemeClr>
+                </a:solidFill>
+              </a:rPr>
+              <a:t>JavaScript Tutorials</a:t>
+            </a:r>
+            <a:endParaRPr lang="en-IN" sz="1100" dirty="0">
+              <a:solidFill>
+                <a:schemeClr val="tx1">
+                  <a:lumMod val="65000"/>
+                  <a:lumOff val="35000"/>
+                </a:schemeClr>
+              </a:solidFill>
+            </a:endParaRPr>
+          </a:p>
+        </p:txBody>
+      </p:sp>
+      <p:sp>
+        <p:nvSpPr>
+          <p:cNvPr id="6" name="Scroll: Vertical 5">
+            <a:extLst>
+              <a:ext uri="{FF2B5EF4-FFF2-40B4-BE49-F238E27FC236}">
+                <a16:creationId xmlns:a16="http://schemas.microsoft.com/office/drawing/2014/main" xmlns="" id="{1A4C732A-2840-82C8-A359-298D925E33B3}"/>
+              </a:ext>
+            </a:extLst>
+          </p:cNvPr>
+          <p:cNvSpPr/>
+          <p:nvPr/>
+        </p:nvSpPr>
+        <p:spPr>
+          <a:xfrm>
+            <a:off x="7851914" y="715617"/>
+            <a:ext cx="4240696" cy="4989444"/>
+          </a:xfrm>
+          <a:prstGeom prst="verticalScroll">
+            <a:avLst/>
+          </a:prstGeom>
+          <a:solidFill>
+            <a:schemeClr val="bg1">
+              <a:lumMod val="85000"/>
+            </a:schemeClr>
+          </a:solidFill>
+          <a:ln>
+            <a:solidFill>
+              <a:schemeClr val="bg1">
+                <a:lumMod val="75000"/>
+                <a:lumOff val="25000"/>
+              </a:schemeClr>
+            </a:solidFill>
+          </a:ln>
+        </p:spPr>
+        <p:style>
+          <a:lnRef idx="2">
+            <a:schemeClr val="accent1">
+              <a:shade val="15000"/>
+            </a:schemeClr>
+          </a:lnRef>
+          <a:fillRef idx="1">
+            <a:schemeClr val="accent1"/>
+          </a:fillRef>
+          <a:effectRef idx="0">
+            <a:schemeClr val="accent1"/>
+          </a:effectRef>
+          <a:fontRef idx="minor">
+            <a:schemeClr val="lt1"/>
+          </a:fontRef>
+        </p:style>
+        <p:txBody>
+          <a:bodyPr rtlCol="0" anchor="t"/>
+          <a:lstStyle/>
+          <a:p>
+            <a:pPr>
+              <a:lnSpc>
+                <a:spcPct val="150000"/>
+              </a:lnSpc>
+            </a:pPr>
+            <a:r>
+              <a:rPr lang="en-US" sz="2400" b="1" dirty="0">
+                <a:solidFill>
+                  <a:schemeClr val="tx1"/>
+                </a:solidFill>
+              </a:rPr>
+              <a:t>Topics</a:t>
+            </a:r>
+          </a:p>
+          <a:p>
+            <a:pPr marL="285750" indent="-285750">
+              <a:lnSpc>
+                <a:spcPct val="150000"/>
+              </a:lnSpc>
+              <a:buFont typeface="Courier New" panose="02070309020205020404" pitchFamily="49" charset="0"/>
+              <a:buChar char="o"/>
+            </a:pPr>
+            <a:r>
+              <a:rPr lang="en-US" strike="sngStrike" dirty="0">
+                <a:solidFill>
+                  <a:schemeClr val="tx1"/>
+                </a:solidFill>
+              </a:rPr>
+              <a:t>What are var, let, and const?</a:t>
+            </a:r>
+          </a:p>
+          <a:p>
+            <a:pPr marL="285750" indent="-285750">
+              <a:lnSpc>
+                <a:spcPct val="150000"/>
+              </a:lnSpc>
+              <a:buFont typeface="Courier New" panose="02070309020205020404" pitchFamily="49" charset="0"/>
+              <a:buChar char="o"/>
+            </a:pPr>
+            <a:r>
+              <a:rPr lang="en-IN" dirty="0">
+                <a:solidFill>
+                  <a:schemeClr val="tx1"/>
+                </a:solidFill>
+              </a:rPr>
+              <a:t>What is </a:t>
+            </a:r>
+            <a:r>
+              <a:rPr lang="en-IN" dirty="0" smtClean="0">
+                <a:solidFill>
+                  <a:schemeClr val="tx1"/>
+                </a:solidFill>
+              </a:rPr>
+              <a:t>Hoisting</a:t>
+            </a:r>
+            <a:endParaRPr lang="en-IN" dirty="0">
+              <a:solidFill>
+                <a:schemeClr val="tx1"/>
+              </a:solidFill>
+            </a:endParaRPr>
+          </a:p>
+        </p:txBody>
+      </p:sp>
+      <p:sp>
+        <p:nvSpPr>
+          <p:cNvPr id="7" name="TextBox 6"/>
+          <p:cNvSpPr txBox="1"/>
+          <p:nvPr/>
+        </p:nvSpPr>
+        <p:spPr>
+          <a:xfrm>
+            <a:off x="9614263" y="801189"/>
+            <a:ext cx="1401346" cy="369332"/>
+          </a:xfrm>
+          <a:prstGeom prst="rect">
+            <a:avLst/>
+          </a:prstGeom>
+          <a:noFill/>
+        </p:spPr>
+        <p:txBody>
+          <a:bodyPr wrap="none" rtlCol="0">
+            <a:spAutoFit/>
+          </a:bodyPr>
+          <a:lstStyle/>
+          <a:p>
+            <a:r>
+              <a:rPr lang="en-IN" b="1" dirty="0">
+                <a:solidFill>
+                  <a:schemeClr val="accent2">
+                    <a:lumMod val="60000"/>
+                    <a:lumOff val="40000"/>
+                  </a:schemeClr>
+                </a:solidFill>
+                <a:latin typeface="Bahnschrift SemiLight" pitchFamily="34" charset="0"/>
+              </a:rPr>
+              <a:t>Chapter - 5</a:t>
+            </a:r>
+            <a:endParaRPr lang="en-US" b="1" dirty="0">
+              <a:solidFill>
+                <a:schemeClr val="accent2">
+                  <a:lumMod val="60000"/>
+                  <a:lumOff val="40000"/>
+                </a:schemeClr>
+              </a:solidFill>
+              <a:latin typeface="Bahnschrift SemiLight" pitchFamily="34" charset="0"/>
+            </a:endParaRPr>
+          </a:p>
+        </p:txBody>
+      </p:sp>
+      <p:sp>
+        <p:nvSpPr>
+          <p:cNvPr id="9" name="Content Placeholder 2">
+            <a:extLst>
+              <a:ext uri="{FF2B5EF4-FFF2-40B4-BE49-F238E27FC236}">
+                <a16:creationId xmlns:a16="http://schemas.microsoft.com/office/drawing/2014/main" xmlns="" id="{2A53D2DA-721D-FC7E-8E09-BCBD844B6F9F}"/>
+              </a:ext>
+            </a:extLst>
+          </p:cNvPr>
+          <p:cNvSpPr txBox="1">
+            <a:spLocks/>
+          </p:cNvSpPr>
+          <p:nvPr/>
+        </p:nvSpPr>
+        <p:spPr>
+          <a:xfrm>
+            <a:off x="376073" y="3249978"/>
+            <a:ext cx="7502570" cy="1274397"/>
+          </a:xfrm>
+          <a:prstGeom prst="rect">
+            <a:avLst/>
+          </a:prstGeom>
+        </p:spPr>
+        <p:txBody>
+          <a:bodyPr vert="horz" lIns="91440" tIns="45720" rIns="91440" bIns="45720" rtlCol="0">
+            <a:normAutofit/>
+          </a:bodyPr>
+          <a:lstStyle/>
+          <a:p>
+            <a:r>
+              <a:rPr lang="en-US" sz="1600" b="1" dirty="0" smtClean="0">
+                <a:solidFill>
+                  <a:schemeClr val="accent2">
+                    <a:lumMod val="60000"/>
+                    <a:lumOff val="40000"/>
+                  </a:schemeClr>
+                </a:solidFill>
+              </a:rPr>
+              <a:t>let:</a:t>
+            </a:r>
+            <a:r>
+              <a:rPr lang="en-US" sz="1600" dirty="0" smtClean="0"/>
+              <a:t>  Variables declared with let are also hoisted, but they are not initialized. They enter a "Temporal Dead Zone" from the beginning of their scope until their declaration line. Accessing them before their declaration will result in a </a:t>
+            </a:r>
+            <a:r>
+              <a:rPr lang="en-US" sz="1600" dirty="0" err="1" smtClean="0"/>
+              <a:t>ReferenceError</a:t>
+            </a:r>
+            <a:r>
+              <a:rPr lang="en-US" sz="1600" dirty="0" smtClean="0"/>
+              <a:t>.</a:t>
+            </a:r>
+          </a:p>
+          <a:p>
+            <a:pPr marL="342900" marR="0" lvl="0" indent="-342900" algn="l" defTabSz="457200" rtl="0" eaLnBrk="1" fontAlgn="auto" latinLnBrk="0" hangingPunct="1">
+              <a:lnSpc>
+                <a:spcPct val="100000"/>
+              </a:lnSpc>
+              <a:spcBef>
+                <a:spcPts val="1000"/>
+              </a:spcBef>
+              <a:spcAft>
+                <a:spcPts val="0"/>
+              </a:spcAft>
+              <a:buClr>
+                <a:schemeClr val="accent1"/>
+              </a:buClr>
+              <a:buSzPct val="80000"/>
+              <a:buFont typeface="Wingdings 3" charset="2"/>
+              <a:buNone/>
+              <a:tabLst/>
+              <a:defRPr/>
+            </a:pPr>
+            <a:endParaRPr kumimoji="0" lang="en-US" sz="1600" b="0" i="0" u="none" strike="noStrike" kern="1200" cap="none" spc="0" normalizeH="0" baseline="0" noProof="0" dirty="0" smtClean="0">
+              <a:ln>
+                <a:noFill/>
+              </a:ln>
+              <a:solidFill>
+                <a:schemeClr val="tx1">
+                  <a:lumMod val="75000"/>
+                  <a:lumOff val="25000"/>
+                </a:schemeClr>
+              </a:solidFill>
+              <a:effectLst/>
+              <a:uLnTx/>
+              <a:uFillTx/>
+              <a:latin typeface="+mn-lt"/>
+              <a:ea typeface="+mn-ea"/>
+              <a:cs typeface="+mn-cs"/>
+            </a:endParaRPr>
+          </a:p>
+          <a:p>
+            <a:pPr marL="342900" marR="0" lvl="0" indent="-342900" algn="l" defTabSz="457200" rtl="0" eaLnBrk="1" fontAlgn="auto" latinLnBrk="0" hangingPunct="1">
+              <a:lnSpc>
+                <a:spcPct val="150000"/>
+              </a:lnSpc>
+              <a:spcBef>
+                <a:spcPts val="1000"/>
+              </a:spcBef>
+              <a:spcAft>
+                <a:spcPts val="0"/>
+              </a:spcAft>
+              <a:buClr>
+                <a:schemeClr val="accent1"/>
+              </a:buClr>
+              <a:buSzPct val="80000"/>
+              <a:buFont typeface="Wingdings 3" charset="2"/>
+              <a:buChar char=""/>
+              <a:tabLst/>
+              <a:defRPr/>
+            </a:pPr>
+            <a:endParaRPr kumimoji="0" lang="en-US" sz="1600" b="0" i="0" u="none" strike="noStrike" kern="1200" cap="none" spc="0" normalizeH="0" baseline="0" noProof="0" dirty="0">
+              <a:ln>
+                <a:noFill/>
+              </a:ln>
+              <a:solidFill>
+                <a:schemeClr val="tx1">
+                  <a:lumMod val="75000"/>
+                  <a:lumOff val="25000"/>
+                </a:schemeClr>
+              </a:solidFill>
+              <a:effectLst/>
+              <a:uLnTx/>
+              <a:uFillTx/>
+              <a:latin typeface="+mn-lt"/>
+              <a:ea typeface="+mn-ea"/>
+              <a:cs typeface="+mn-cs"/>
+            </a:endParaRPr>
+          </a:p>
+        </p:txBody>
+      </p:sp>
+      <p:sp>
+        <p:nvSpPr>
+          <p:cNvPr id="11" name="Content Placeholder 2">
+            <a:extLst>
+              <a:ext uri="{FF2B5EF4-FFF2-40B4-BE49-F238E27FC236}">
+                <a16:creationId xmlns:a16="http://schemas.microsoft.com/office/drawing/2014/main" xmlns="" id="{2A53D2DA-721D-FC7E-8E09-BCBD844B6F9F}"/>
+              </a:ext>
+            </a:extLst>
+          </p:cNvPr>
+          <p:cNvSpPr txBox="1">
+            <a:spLocks/>
+          </p:cNvSpPr>
+          <p:nvPr/>
+        </p:nvSpPr>
+        <p:spPr>
+          <a:xfrm>
+            <a:off x="299873" y="1611678"/>
+            <a:ext cx="7502570" cy="941022"/>
+          </a:xfrm>
+          <a:prstGeom prst="rect">
+            <a:avLst/>
+          </a:prstGeom>
+        </p:spPr>
+        <p:txBody>
+          <a:bodyPr vert="horz" lIns="91440" tIns="45720" rIns="91440" bIns="45720" rtlCol="0">
+            <a:normAutofit/>
+          </a:bodyPr>
+          <a:lstStyle/>
+          <a:p>
+            <a:r>
+              <a:rPr lang="en-US" sz="1600" b="1" dirty="0" err="1" smtClean="0">
+                <a:solidFill>
+                  <a:schemeClr val="accent2">
+                    <a:lumMod val="60000"/>
+                    <a:lumOff val="40000"/>
+                  </a:schemeClr>
+                </a:solidFill>
+              </a:rPr>
+              <a:t>var</a:t>
+            </a:r>
+            <a:r>
+              <a:rPr lang="en-US" sz="1600" b="1" dirty="0" smtClean="0">
+                <a:solidFill>
+                  <a:schemeClr val="accent2">
+                    <a:lumMod val="60000"/>
+                    <a:lumOff val="40000"/>
+                  </a:schemeClr>
+                </a:solidFill>
+              </a:rPr>
+              <a:t>:</a:t>
+            </a:r>
+            <a:r>
+              <a:rPr lang="en-US" sz="1600" dirty="0" smtClean="0"/>
+              <a:t> </a:t>
+            </a:r>
+            <a:r>
+              <a:rPr lang="en-US" sz="1600" dirty="0" smtClean="0"/>
+              <a:t>Variables </a:t>
+            </a:r>
+            <a:r>
+              <a:rPr lang="en-US" sz="1600" dirty="0" smtClean="0"/>
+              <a:t>declared with </a:t>
+            </a:r>
+            <a:r>
+              <a:rPr lang="en-US" sz="1600" dirty="0" err="1" smtClean="0"/>
+              <a:t>var</a:t>
+            </a:r>
+            <a:r>
+              <a:rPr lang="en-US" sz="1600" dirty="0" smtClean="0"/>
+              <a:t> are hoisted to the top of their scope and are initialized with undefined. This means they can be accessed before their declaration line, although their value will be undefined. </a:t>
+            </a:r>
+          </a:p>
+          <a:p>
+            <a:endParaRPr lang="en-US" sz="1600" dirty="0" smtClean="0"/>
+          </a:p>
+          <a:p>
+            <a:pPr marL="342900" marR="0" lvl="0" indent="-342900" algn="l" defTabSz="457200" rtl="0" eaLnBrk="1" fontAlgn="auto" latinLnBrk="0" hangingPunct="1">
+              <a:lnSpc>
+                <a:spcPct val="100000"/>
+              </a:lnSpc>
+              <a:spcBef>
+                <a:spcPts val="1000"/>
+              </a:spcBef>
+              <a:spcAft>
+                <a:spcPts val="0"/>
+              </a:spcAft>
+              <a:buClr>
+                <a:schemeClr val="accent1"/>
+              </a:buClr>
+              <a:buSzPct val="80000"/>
+              <a:buFont typeface="Wingdings 3" charset="2"/>
+              <a:buNone/>
+              <a:tabLst/>
+              <a:defRPr/>
+            </a:pPr>
+            <a:endParaRPr kumimoji="0" lang="en-US" sz="1600" b="0" i="0" u="none" strike="noStrike" kern="1200" cap="none" spc="0" normalizeH="0" baseline="0" noProof="0" dirty="0" smtClean="0">
+              <a:ln>
+                <a:noFill/>
+              </a:ln>
+              <a:solidFill>
+                <a:schemeClr val="tx1">
+                  <a:lumMod val="75000"/>
+                  <a:lumOff val="25000"/>
+                </a:schemeClr>
+              </a:solidFill>
+              <a:effectLst/>
+              <a:uLnTx/>
+              <a:uFillTx/>
+              <a:latin typeface="+mn-lt"/>
+              <a:ea typeface="+mn-ea"/>
+              <a:cs typeface="+mn-cs"/>
+            </a:endParaRPr>
+          </a:p>
+          <a:p>
+            <a:pPr marL="342900" marR="0" lvl="0" indent="-342900" algn="l" defTabSz="457200" rtl="0" eaLnBrk="1" fontAlgn="auto" latinLnBrk="0" hangingPunct="1">
+              <a:lnSpc>
+                <a:spcPct val="150000"/>
+              </a:lnSpc>
+              <a:spcBef>
+                <a:spcPts val="1000"/>
+              </a:spcBef>
+              <a:spcAft>
+                <a:spcPts val="0"/>
+              </a:spcAft>
+              <a:buClr>
+                <a:schemeClr val="accent1"/>
+              </a:buClr>
+              <a:buSzPct val="80000"/>
+              <a:tabLst/>
+              <a:defRPr/>
+            </a:pPr>
+            <a:endParaRPr kumimoji="0" lang="en-US" sz="1600" b="0" i="0" u="none" strike="noStrike" kern="1200" cap="none" spc="0" normalizeH="0" baseline="0" noProof="0" dirty="0">
+              <a:ln>
+                <a:noFill/>
+              </a:ln>
+              <a:solidFill>
+                <a:schemeClr val="tx1">
+                  <a:lumMod val="75000"/>
+                  <a:lumOff val="25000"/>
+                </a:schemeClr>
+              </a:solidFill>
+              <a:effectLst/>
+              <a:uLnTx/>
+              <a:uFillTx/>
+              <a:latin typeface="+mn-lt"/>
+              <a:ea typeface="+mn-ea"/>
+              <a:cs typeface="+mn-cs"/>
+            </a:endParaRPr>
+          </a:p>
+        </p:txBody>
+      </p:sp>
+      <p:pic>
+        <p:nvPicPr>
+          <p:cNvPr id="4098" name="Picture 2"/>
+          <p:cNvPicPr>
+            <a:picLocks noChangeAspect="1" noChangeArrowheads="1"/>
+          </p:cNvPicPr>
+          <p:nvPr/>
+        </p:nvPicPr>
+        <p:blipFill>
+          <a:blip r:embed="rId2"/>
+          <a:srcRect/>
+          <a:stretch>
+            <a:fillRect/>
+          </a:stretch>
+        </p:blipFill>
+        <p:spPr bwMode="auto">
+          <a:xfrm>
+            <a:off x="381000" y="2643188"/>
+            <a:ext cx="2857500" cy="447675"/>
+          </a:xfrm>
+          <a:prstGeom prst="rect">
+            <a:avLst/>
+          </a:prstGeom>
+          <a:noFill/>
+          <a:ln w="9525">
+            <a:noFill/>
+            <a:miter lim="800000"/>
+            <a:headEnd/>
+            <a:tailEnd/>
+          </a:ln>
+          <a:effectLst/>
+        </p:spPr>
+      </p:pic>
+      <p:pic>
+        <p:nvPicPr>
+          <p:cNvPr id="4099" name="Picture 3"/>
+          <p:cNvPicPr>
+            <a:picLocks noChangeAspect="1" noChangeArrowheads="1"/>
+          </p:cNvPicPr>
+          <p:nvPr/>
+        </p:nvPicPr>
+        <p:blipFill>
+          <a:blip r:embed="rId3"/>
+          <a:srcRect/>
+          <a:stretch>
+            <a:fillRect/>
+          </a:stretch>
+        </p:blipFill>
+        <p:spPr bwMode="auto">
+          <a:xfrm>
+            <a:off x="460375" y="4443413"/>
+            <a:ext cx="5745163" cy="466725"/>
+          </a:xfrm>
+          <a:prstGeom prst="rect">
+            <a:avLst/>
+          </a:prstGeom>
+          <a:noFill/>
+          <a:ln w="9525">
+            <a:noFill/>
+            <a:miter lim="800000"/>
+            <a:headEnd/>
+            <a:tailEnd/>
+          </a:ln>
+          <a:effectLst/>
+        </p:spPr>
+      </p:pic>
+      <p:sp>
+        <p:nvSpPr>
+          <p:cNvPr id="12" name="TextBox 11"/>
+          <p:cNvSpPr txBox="1"/>
+          <p:nvPr/>
+        </p:nvSpPr>
+        <p:spPr>
+          <a:xfrm>
+            <a:off x="447676" y="5172075"/>
+            <a:ext cx="6972300" cy="1077218"/>
+          </a:xfrm>
+          <a:prstGeom prst="rect">
+            <a:avLst/>
+          </a:prstGeom>
+          <a:noFill/>
+          <a:ln>
+            <a:solidFill>
+              <a:schemeClr val="accent1">
+                <a:lumMod val="20000"/>
+                <a:lumOff val="80000"/>
+              </a:schemeClr>
+            </a:solidFill>
+            <a:prstDash val="sysDash"/>
+          </a:ln>
+        </p:spPr>
+        <p:txBody>
+          <a:bodyPr wrap="square" rtlCol="0">
+            <a:spAutoFit/>
+          </a:bodyPr>
+          <a:lstStyle/>
+          <a:p>
+            <a:r>
+              <a:rPr lang="en-US" sz="1600" dirty="0" smtClean="0">
+                <a:solidFill>
+                  <a:schemeClr val="accent2">
+                    <a:lumMod val="20000"/>
+                    <a:lumOff val="80000"/>
+                  </a:schemeClr>
+                </a:solidFill>
+              </a:rPr>
+              <a:t>In summary, while both </a:t>
+            </a:r>
+            <a:r>
+              <a:rPr lang="en-US" sz="1600" dirty="0" err="1" smtClean="0">
+                <a:solidFill>
+                  <a:schemeClr val="accent2">
+                    <a:lumMod val="20000"/>
+                    <a:lumOff val="80000"/>
+                  </a:schemeClr>
+                </a:solidFill>
+              </a:rPr>
+              <a:t>var</a:t>
+            </a:r>
+            <a:r>
+              <a:rPr lang="en-US" sz="1600" dirty="0" smtClean="0">
+                <a:solidFill>
+                  <a:schemeClr val="accent2">
+                    <a:lumMod val="20000"/>
+                    <a:lumOff val="80000"/>
+                  </a:schemeClr>
+                </a:solidFill>
+              </a:rPr>
+              <a:t> and let can declare global variables, let offers more predictable and safer behavior by enforcing stricter rules regarding re-declaration and access before initialization, and by avoiding pollution of the global object.</a:t>
+            </a:r>
+            <a:endParaRPr lang="en-US" sz="1600" dirty="0">
+              <a:solidFill>
+                <a:schemeClr val="accent2">
+                  <a:lumMod val="20000"/>
+                  <a:lumOff val="80000"/>
+                </a:schemeClr>
+              </a:solidFill>
+            </a:endParaRPr>
+          </a:p>
+        </p:txBody>
+      </p:sp>
+    </p:spTree>
+    <p:extLst>
+      <p:ext uri="{BB962C8B-B14F-4D97-AF65-F5344CB8AC3E}">
+        <p14:creationId xmlns:p14="http://schemas.microsoft.com/office/powerpoint/2010/main" xmlns="" val="3002471670"/>
+      </p:ext>
+    </p:extLst>
+  </p:cSld>
+  <p:clrMapOvr>
+    <a:masterClrMapping/>
+  </p:clrMapOvr>
+</p:sld>
+</file>
+
+<file path=ppt/slides/slide25.xml><?xml version="1.0" encoding="utf-8"?>
+<p:sld xmlns:a="http://schemas.openxmlformats.org/drawingml/2006/main" xmlns:r="http://schemas.openxmlformats.org/officeDocument/2006/relationships" xmlns:p="http://schemas.openxmlformats.org/presentationml/2006/main">
+  <p:cSld>
+    <p:spTree>
+      <p:nvGrpSpPr>
+        <p:cNvPr id="1" name="">
+          <a:extLst>
+            <a:ext uri="{FF2B5EF4-FFF2-40B4-BE49-F238E27FC236}">
+              <a16:creationId xmlns:a16="http://schemas.microsoft.com/office/drawing/2014/main" xmlns="" id="{4586E9D7-F5F8-14CC-9DF6-FC4AF2EA4249}"/>
+            </a:ext>
+          </a:extLst>
+        </p:cNvPr>
+        <p:cNvGrpSpPr/>
+        <p:nvPr/>
+      </p:nvGrpSpPr>
+      <p:grpSpPr>
+        <a:xfrm>
+          <a:off x="0" y="0"/>
+          <a:ext cx="0" cy="0"/>
+          <a:chOff x="0" y="0"/>
+          <a:chExt cx="0" cy="0"/>
+        </a:xfrm>
+      </p:grpSpPr>
+      <p:sp>
+        <p:nvSpPr>
+          <p:cNvPr id="2" name="Title 1">
+            <a:extLst>
+              <a:ext uri="{FF2B5EF4-FFF2-40B4-BE49-F238E27FC236}">
+                <a16:creationId xmlns:a16="http://schemas.microsoft.com/office/drawing/2014/main" xmlns="" id="{D8B67155-694F-FF61-7CDD-33A20A316215}"/>
+              </a:ext>
+            </a:extLst>
+          </p:cNvPr>
+          <p:cNvSpPr>
+            <a:spLocks noGrp="1"/>
+          </p:cNvSpPr>
+          <p:nvPr>
+            <p:ph type="title"/>
+          </p:nvPr>
+        </p:nvSpPr>
+        <p:spPr>
+          <a:xfrm>
+            <a:off x="334435" y="1057275"/>
+            <a:ext cx="8596668" cy="742950"/>
+          </a:xfrm>
+        </p:spPr>
+        <p:txBody>
+          <a:bodyPr>
+            <a:normAutofit fontScale="90000"/>
+          </a:bodyPr>
+          <a:lstStyle/>
+          <a:p>
+            <a:r>
+              <a:rPr lang="en-US" b="1" dirty="0" smtClean="0">
+                <a:solidFill>
+                  <a:schemeClr val="tx1"/>
+                </a:solidFill>
+                <a:latin typeface="Bahnschrift SemiLight" pitchFamily="34" charset="0"/>
+              </a:rPr>
+              <a:t>What is hoisting? </a:t>
+            </a:r>
+            <a:r>
+              <a:rPr lang="en-US" dirty="0" smtClean="0">
+                <a:solidFill>
+                  <a:schemeClr val="bg1">
+                    <a:lumMod val="65000"/>
+                    <a:lumOff val="35000"/>
+                  </a:schemeClr>
+                </a:solidFill>
+                <a:latin typeface="Bahnschrift Light Condensed" pitchFamily="34" charset="0"/>
+              </a:rPr>
+              <a:t>- continues</a:t>
+            </a:r>
+            <a:endParaRPr lang="en-US" dirty="0">
+              <a:solidFill>
+                <a:schemeClr val="bg1">
+                  <a:lumMod val="65000"/>
+                  <a:lumOff val="35000"/>
+                </a:schemeClr>
+              </a:solidFill>
+              <a:latin typeface="Bahnschrift Light Condensed" pitchFamily="34" charset="0"/>
+            </a:endParaRPr>
+          </a:p>
+        </p:txBody>
+      </p:sp>
+      <p:sp>
+        <p:nvSpPr>
+          <p:cNvPr id="13" name="Text Placeholder 12"/>
+          <p:cNvSpPr>
+            <a:spLocks noGrp="1"/>
+          </p:cNvSpPr>
+          <p:nvPr>
+            <p:ph type="body" idx="1"/>
+          </p:nvPr>
+        </p:nvSpPr>
+        <p:spPr>
+          <a:xfrm>
+            <a:off x="410635" y="1889124"/>
+            <a:ext cx="5275790" cy="1968501"/>
+          </a:xfrm>
+        </p:spPr>
+        <p:txBody>
+          <a:bodyPr>
+            <a:normAutofit/>
+          </a:bodyPr>
+          <a:lstStyle/>
+          <a:p>
+            <a:pPr marL="285750" indent="-285750">
+              <a:lnSpc>
+                <a:spcPct val="150000"/>
+              </a:lnSpc>
+              <a:buFont typeface="Wingdings" pitchFamily="2" charset="2"/>
+              <a:buChar char="v"/>
+            </a:pPr>
+            <a:r>
+              <a:rPr lang="en-IN" dirty="0" smtClean="0">
+                <a:solidFill>
+                  <a:schemeClr val="tx1"/>
+                </a:solidFill>
+              </a:rPr>
+              <a:t>Undefined </a:t>
+            </a:r>
+            <a:r>
+              <a:rPr lang="en-IN" dirty="0" err="1" smtClean="0">
+                <a:solidFill>
+                  <a:schemeClr val="tx1"/>
+                </a:solidFill>
+              </a:rPr>
+              <a:t>vs</a:t>
+            </a:r>
+            <a:r>
+              <a:rPr lang="en-IN" dirty="0" smtClean="0">
+                <a:solidFill>
+                  <a:schemeClr val="tx1"/>
+                </a:solidFill>
+              </a:rPr>
+              <a:t> not-defined</a:t>
+            </a:r>
+          </a:p>
+          <a:p>
+            <a:pPr marL="285750" indent="-285750">
+              <a:lnSpc>
+                <a:spcPct val="150000"/>
+              </a:lnSpc>
+              <a:buFont typeface="Wingdings" pitchFamily="2" charset="2"/>
+              <a:buChar char="v"/>
+            </a:pPr>
+            <a:r>
+              <a:rPr lang="en-IN" dirty="0" smtClean="0">
+                <a:solidFill>
+                  <a:schemeClr val="tx1"/>
+                </a:solidFill>
+              </a:rPr>
+              <a:t>Variable with arrow </a:t>
+            </a:r>
+            <a:r>
+              <a:rPr lang="en-IN" dirty="0" smtClean="0">
+                <a:solidFill>
+                  <a:schemeClr val="tx1"/>
+                </a:solidFill>
+              </a:rPr>
+              <a:t>function</a:t>
+            </a:r>
+          </a:p>
+          <a:p>
+            <a:pPr marL="285750" indent="-285750">
+              <a:lnSpc>
+                <a:spcPct val="150000"/>
+              </a:lnSpc>
+              <a:buFont typeface="Wingdings" pitchFamily="2" charset="2"/>
+              <a:buChar char="v"/>
+            </a:pPr>
+            <a:r>
+              <a:rPr lang="en-IN" dirty="0" smtClean="0">
+                <a:solidFill>
+                  <a:schemeClr val="tx1"/>
+                </a:solidFill>
+              </a:rPr>
+              <a:t>What is the call stack and how it works</a:t>
+            </a:r>
+          </a:p>
+          <a:p>
+            <a:endParaRPr lang="en-US" dirty="0"/>
+          </a:p>
+        </p:txBody>
+      </p:sp>
+      <p:sp>
+        <p:nvSpPr>
+          <p:cNvPr id="5" name="Ribbon: Curved and Tilted Down 4">
+            <a:extLst>
+              <a:ext uri="{FF2B5EF4-FFF2-40B4-BE49-F238E27FC236}">
+                <a16:creationId xmlns:a16="http://schemas.microsoft.com/office/drawing/2014/main" xmlns="" id="{3FA23525-E3EA-B8CB-FD6A-53084CA847A7}"/>
+              </a:ext>
+            </a:extLst>
+          </p:cNvPr>
+          <p:cNvSpPr/>
+          <p:nvPr/>
+        </p:nvSpPr>
+        <p:spPr>
+          <a:xfrm>
+            <a:off x="255512" y="216454"/>
+            <a:ext cx="3678313" cy="583646"/>
+          </a:xfrm>
+          <a:prstGeom prst="ellipseRibbon">
+            <a:avLst/>
+          </a:prstGeom>
+          <a:solidFill>
+            <a:schemeClr val="bg1">
+              <a:lumMod val="85000"/>
+              <a:lumOff val="15000"/>
+            </a:schemeClr>
+          </a:solidFill>
+          <a:ln>
+            <a:noFill/>
+          </a:ln>
+        </p:spPr>
+        <p:style>
+          <a:lnRef idx="2">
+            <a:schemeClr val="accent1">
+              <a:shade val="15000"/>
+            </a:schemeClr>
+          </a:lnRef>
+          <a:fillRef idx="1">
+            <a:schemeClr val="accent1"/>
+          </a:fillRef>
+          <a:effectRef idx="0">
+            <a:schemeClr val="accent1"/>
+          </a:effectRef>
+          <a:fontRef idx="minor">
+            <a:schemeClr val="lt1"/>
+          </a:fontRef>
+        </p:style>
+        <p:txBody>
+          <a:bodyPr rtlCol="0" anchor="ctr"/>
+          <a:lstStyle/>
+          <a:p>
+            <a:pPr algn="ctr"/>
+            <a:r>
+              <a:rPr lang="en-US" sz="1100" dirty="0">
+                <a:solidFill>
+                  <a:schemeClr val="tx1">
+                    <a:lumMod val="65000"/>
+                    <a:lumOff val="35000"/>
+                  </a:schemeClr>
+                </a:solidFill>
+              </a:rPr>
+              <a:t>JavaScript Tutorials</a:t>
+            </a:r>
+            <a:endParaRPr lang="en-IN" sz="1100" dirty="0">
+              <a:solidFill>
+                <a:schemeClr val="tx1">
+                  <a:lumMod val="65000"/>
+                  <a:lumOff val="35000"/>
+                </a:schemeClr>
+              </a:solidFill>
+            </a:endParaRPr>
+          </a:p>
+        </p:txBody>
+      </p:sp>
+      <p:sp>
+        <p:nvSpPr>
+          <p:cNvPr id="6" name="Scroll: Vertical 5">
+            <a:extLst>
+              <a:ext uri="{FF2B5EF4-FFF2-40B4-BE49-F238E27FC236}">
+                <a16:creationId xmlns:a16="http://schemas.microsoft.com/office/drawing/2014/main" xmlns="" id="{1A4C732A-2840-82C8-A359-298D925E33B3}"/>
+              </a:ext>
+            </a:extLst>
+          </p:cNvPr>
+          <p:cNvSpPr/>
+          <p:nvPr/>
+        </p:nvSpPr>
+        <p:spPr>
+          <a:xfrm>
+            <a:off x="7851914" y="715617"/>
+            <a:ext cx="4240696" cy="4989444"/>
+          </a:xfrm>
+          <a:prstGeom prst="verticalScroll">
+            <a:avLst/>
+          </a:prstGeom>
+          <a:solidFill>
+            <a:schemeClr val="bg1">
+              <a:lumMod val="85000"/>
+            </a:schemeClr>
+          </a:solidFill>
+          <a:ln>
+            <a:solidFill>
+              <a:schemeClr val="bg1">
+                <a:lumMod val="75000"/>
+                <a:lumOff val="25000"/>
+              </a:schemeClr>
+            </a:solidFill>
+          </a:ln>
+        </p:spPr>
+        <p:style>
+          <a:lnRef idx="2">
+            <a:schemeClr val="accent1">
+              <a:shade val="15000"/>
+            </a:schemeClr>
+          </a:lnRef>
+          <a:fillRef idx="1">
+            <a:schemeClr val="accent1"/>
+          </a:fillRef>
+          <a:effectRef idx="0">
+            <a:schemeClr val="accent1"/>
+          </a:effectRef>
+          <a:fontRef idx="minor">
+            <a:schemeClr val="lt1"/>
+          </a:fontRef>
+        </p:style>
+        <p:txBody>
+          <a:bodyPr rtlCol="0" anchor="t"/>
+          <a:lstStyle/>
+          <a:p>
+            <a:pPr>
+              <a:lnSpc>
+                <a:spcPct val="150000"/>
+              </a:lnSpc>
+            </a:pPr>
+            <a:r>
+              <a:rPr lang="en-US" sz="2400" b="1" dirty="0">
+                <a:solidFill>
+                  <a:schemeClr val="tx1"/>
+                </a:solidFill>
+              </a:rPr>
+              <a:t>Topics</a:t>
+            </a:r>
+          </a:p>
+          <a:p>
+            <a:pPr marL="285750" indent="-285750">
+              <a:lnSpc>
+                <a:spcPct val="150000"/>
+              </a:lnSpc>
+              <a:buFont typeface="Courier New" panose="02070309020205020404" pitchFamily="49" charset="0"/>
+              <a:buChar char="o"/>
+            </a:pPr>
+            <a:r>
+              <a:rPr lang="en-US" strike="sngStrike" dirty="0">
+                <a:solidFill>
+                  <a:schemeClr val="tx1"/>
+                </a:solidFill>
+              </a:rPr>
+              <a:t>What are var, let, and const?</a:t>
+            </a:r>
+          </a:p>
+          <a:p>
+            <a:pPr marL="285750" indent="-285750">
+              <a:lnSpc>
+                <a:spcPct val="150000"/>
+              </a:lnSpc>
+              <a:buFont typeface="Courier New" panose="02070309020205020404" pitchFamily="49" charset="0"/>
+              <a:buChar char="o"/>
+            </a:pPr>
+            <a:r>
+              <a:rPr lang="en-IN" dirty="0">
+                <a:solidFill>
+                  <a:schemeClr val="tx1"/>
+                </a:solidFill>
+              </a:rPr>
+              <a:t>What is </a:t>
+            </a:r>
+            <a:r>
+              <a:rPr lang="en-IN" dirty="0" smtClean="0">
+                <a:solidFill>
+                  <a:schemeClr val="tx1"/>
+                </a:solidFill>
+              </a:rPr>
+              <a:t>Hoisting</a:t>
+            </a:r>
+            <a:endParaRPr lang="en-IN" dirty="0">
+              <a:solidFill>
+                <a:schemeClr val="tx1"/>
+              </a:solidFill>
+            </a:endParaRPr>
+          </a:p>
+        </p:txBody>
+      </p:sp>
+      <p:sp>
+        <p:nvSpPr>
+          <p:cNvPr id="7" name="TextBox 6"/>
+          <p:cNvSpPr txBox="1"/>
+          <p:nvPr/>
+        </p:nvSpPr>
+        <p:spPr>
+          <a:xfrm>
+            <a:off x="9614263" y="801189"/>
+            <a:ext cx="1401346" cy="369332"/>
+          </a:xfrm>
+          <a:prstGeom prst="rect">
+            <a:avLst/>
+          </a:prstGeom>
+          <a:noFill/>
+        </p:spPr>
+        <p:txBody>
+          <a:bodyPr wrap="none" rtlCol="0">
+            <a:spAutoFit/>
+          </a:bodyPr>
+          <a:lstStyle/>
+          <a:p>
+            <a:r>
+              <a:rPr lang="en-IN" b="1" dirty="0">
+                <a:solidFill>
+                  <a:schemeClr val="accent2">
+                    <a:lumMod val="60000"/>
+                    <a:lumOff val="40000"/>
+                  </a:schemeClr>
+                </a:solidFill>
+                <a:latin typeface="Bahnschrift SemiLight" pitchFamily="34" charset="0"/>
+              </a:rPr>
+              <a:t>Chapter - 5</a:t>
+            </a:r>
+            <a:endParaRPr lang="en-US" b="1" dirty="0">
+              <a:solidFill>
+                <a:schemeClr val="accent2">
+                  <a:lumMod val="60000"/>
+                  <a:lumOff val="40000"/>
+                </a:schemeClr>
+              </a:solidFill>
+              <a:latin typeface="Bahnschrift SemiLight" pitchFamily="34" charset="0"/>
+            </a:endParaRPr>
+          </a:p>
+        </p:txBody>
+      </p:sp>
+    </p:spTree>
+    <p:extLst>
+      <p:ext uri="{BB962C8B-B14F-4D97-AF65-F5344CB8AC3E}">
+        <p14:creationId xmlns:p14="http://schemas.microsoft.com/office/powerpoint/2010/main" xmlns="" val="3002471670"/>
       </p:ext>
     </p:extLst>
   </p:cSld>
@@ -12730,7 +15215,7 @@
         <p:cNvPr id="1" name="">
           <a:extLst>
             <a:ext uri="{FF2B5EF4-FFF2-40B4-BE49-F238E27FC236}">
-              <a16:creationId xmlns:a16="http://schemas.microsoft.com/office/drawing/2014/main" id="{D210C62D-BA73-7142-9269-B229A82A227F}"/>
+              <a16:creationId xmlns:a16="http://schemas.microsoft.com/office/drawing/2014/main" xmlns="" id="{D210C62D-BA73-7142-9269-B229A82A227F}"/>
             </a:ext>
           </a:extLst>
         </p:cNvPr>
@@ -12750,7 +15235,7 @@
           <p:cNvPr id="2" name="Title 1">
             <a:extLst>
               <a:ext uri="{FF2B5EF4-FFF2-40B4-BE49-F238E27FC236}">
-                <a16:creationId xmlns:a16="http://schemas.microsoft.com/office/drawing/2014/main" id="{D5018557-B8C1-B1F3-960D-C1C68708243B}"/>
+                <a16:creationId xmlns:a16="http://schemas.microsoft.com/office/drawing/2014/main" xmlns="" id="{D5018557-B8C1-B1F3-960D-C1C68708243B}"/>
               </a:ext>
             </a:extLst>
           </p:cNvPr>
@@ -12790,7 +15275,7 @@
           <p:cNvPr id="3" name="Content Placeholder 2">
             <a:extLst>
               <a:ext uri="{FF2B5EF4-FFF2-40B4-BE49-F238E27FC236}">
-                <a16:creationId xmlns:a16="http://schemas.microsoft.com/office/drawing/2014/main" id="{24415AF3-2B9F-42C3-52C5-51254FAF8249}"/>
+                <a16:creationId xmlns:a16="http://schemas.microsoft.com/office/drawing/2014/main" xmlns="" id="{24415AF3-2B9F-42C3-52C5-51254FAF8249}"/>
               </a:ext>
             </a:extLst>
           </p:cNvPr>
@@ -12856,7 +15341,7 @@
           <p:cNvPr id="6" name="Ribbon: Curved and Tilted Down 5">
             <a:extLst>
               <a:ext uri="{FF2B5EF4-FFF2-40B4-BE49-F238E27FC236}">
-                <a16:creationId xmlns:a16="http://schemas.microsoft.com/office/drawing/2014/main" id="{7BEA6FE3-CC31-4B69-44C6-04DF1B8559E4}"/>
+                <a16:creationId xmlns:a16="http://schemas.microsoft.com/office/drawing/2014/main" xmlns="" id="{7BEA6FE3-CC31-4B69-44C6-04DF1B8559E4}"/>
               </a:ext>
             </a:extLst>
           </p:cNvPr>
@@ -12929,7 +15414,7 @@
           <p:cNvPr id="8" name="Scroll: Vertical 7">
             <a:extLst>
               <a:ext uri="{FF2B5EF4-FFF2-40B4-BE49-F238E27FC236}">
-                <a16:creationId xmlns:a16="http://schemas.microsoft.com/office/drawing/2014/main" id="{2D8E823F-54F9-1A01-E3EF-B3211339B30B}"/>
+                <a16:creationId xmlns:a16="http://schemas.microsoft.com/office/drawing/2014/main" xmlns="" id="{2D8E823F-54F9-1A01-E3EF-B3211339B30B}"/>
               </a:ext>
             </a:extLst>
           </p:cNvPr>
@@ -13199,7 +15684,7 @@
     </p:spTree>
     <p:extLst>
       <p:ext uri="{BB962C8B-B14F-4D97-AF65-F5344CB8AC3E}">
-        <p14:creationId xmlns:p14="http://schemas.microsoft.com/office/powerpoint/2010/main" val="3274136203"/>
+        <p14:creationId xmlns:p14="http://schemas.microsoft.com/office/powerpoint/2010/main" xmlns="" val="3274136203"/>
       </p:ext>
     </p:extLst>
   </p:cSld>
@@ -13217,7 +15702,7 @@
         <p:cNvPr id="1" name="">
           <a:extLst>
             <a:ext uri="{FF2B5EF4-FFF2-40B4-BE49-F238E27FC236}">
-              <a16:creationId xmlns:a16="http://schemas.microsoft.com/office/drawing/2014/main" id="{7139B82A-D876-79BD-D559-707BFDC5D481}"/>
+              <a16:creationId xmlns:a16="http://schemas.microsoft.com/office/drawing/2014/main" xmlns="" id="{7139B82A-D876-79BD-D559-707BFDC5D481}"/>
             </a:ext>
           </a:extLst>
         </p:cNvPr>
@@ -13237,7 +15722,7 @@
           <p:cNvPr id="8" name="Title 1">
             <a:extLst>
               <a:ext uri="{FF2B5EF4-FFF2-40B4-BE49-F238E27FC236}">
-                <a16:creationId xmlns:a16="http://schemas.microsoft.com/office/drawing/2014/main" id="{4C8D5637-E45A-11BE-1BA4-F40373E8D014}"/>
+                <a16:creationId xmlns:a16="http://schemas.microsoft.com/office/drawing/2014/main" xmlns="" id="{4C8D5637-E45A-11BE-1BA4-F40373E8D014}"/>
               </a:ext>
             </a:extLst>
           </p:cNvPr>
@@ -13274,7 +15759,7 @@
           <p:cNvPr id="3" name="Content Placeholder 2">
             <a:extLst>
               <a:ext uri="{FF2B5EF4-FFF2-40B4-BE49-F238E27FC236}">
-                <a16:creationId xmlns:a16="http://schemas.microsoft.com/office/drawing/2014/main" id="{86EB63D1-C74F-75B0-CE48-A95AEA2A21A1}"/>
+                <a16:creationId xmlns:a16="http://schemas.microsoft.com/office/drawing/2014/main" xmlns="" id="{86EB63D1-C74F-75B0-CE48-A95AEA2A21A1}"/>
               </a:ext>
             </a:extLst>
           </p:cNvPr>
@@ -13335,7 +15820,7 @@
           <p:cNvPr id="5" name="Ribbon: Curved and Tilted Down 4">
             <a:extLst>
               <a:ext uri="{FF2B5EF4-FFF2-40B4-BE49-F238E27FC236}">
-                <a16:creationId xmlns:a16="http://schemas.microsoft.com/office/drawing/2014/main" id="{75419B56-A4AB-830D-A49F-7700EED8C0FA}"/>
+                <a16:creationId xmlns:a16="http://schemas.microsoft.com/office/drawing/2014/main" xmlns="" id="{75419B56-A4AB-830D-A49F-7700EED8C0FA}"/>
               </a:ext>
             </a:extLst>
           </p:cNvPr>
@@ -13408,7 +15893,7 @@
           <p:cNvPr id="10" name="Scroll: Vertical 9">
             <a:extLst>
               <a:ext uri="{FF2B5EF4-FFF2-40B4-BE49-F238E27FC236}">
-                <a16:creationId xmlns:a16="http://schemas.microsoft.com/office/drawing/2014/main" id="{CD6C5744-A805-1655-2B2A-4D4D0DD0695E}"/>
+                <a16:creationId xmlns:a16="http://schemas.microsoft.com/office/drawing/2014/main" xmlns="" id="{CD6C5744-A805-1655-2B2A-4D4D0DD0695E}"/>
               </a:ext>
             </a:extLst>
           </p:cNvPr>
@@ -13724,7 +16209,7 @@
     </p:spTree>
     <p:extLst>
       <p:ext uri="{BB962C8B-B14F-4D97-AF65-F5344CB8AC3E}">
-        <p14:creationId xmlns:p14="http://schemas.microsoft.com/office/powerpoint/2010/main" val="3157857213"/>
+        <p14:creationId xmlns:p14="http://schemas.microsoft.com/office/powerpoint/2010/main" xmlns="" val="3157857213"/>
       </p:ext>
     </p:extLst>
   </p:cSld>
@@ -13742,7 +16227,7 @@
         <p:cNvPr id="1" name="">
           <a:extLst>
             <a:ext uri="{FF2B5EF4-FFF2-40B4-BE49-F238E27FC236}">
-              <a16:creationId xmlns:a16="http://schemas.microsoft.com/office/drawing/2014/main" id="{53D929B9-0FF5-B5F7-0DB4-914C4F4A1BB2}"/>
+              <a16:creationId xmlns:a16="http://schemas.microsoft.com/office/drawing/2014/main" xmlns="" id="{53D929B9-0FF5-B5F7-0DB4-914C4F4A1BB2}"/>
             </a:ext>
           </a:extLst>
         </p:cNvPr>
@@ -13762,7 +16247,7 @@
           <p:cNvPr id="7" name="Title 1">
             <a:extLst>
               <a:ext uri="{FF2B5EF4-FFF2-40B4-BE49-F238E27FC236}">
-                <a16:creationId xmlns:a16="http://schemas.microsoft.com/office/drawing/2014/main" id="{2D810556-B3F2-D67B-C5C6-43963FC8DAE7}"/>
+                <a16:creationId xmlns:a16="http://schemas.microsoft.com/office/drawing/2014/main" xmlns="" id="{2D810556-B3F2-D67B-C5C6-43963FC8DAE7}"/>
               </a:ext>
             </a:extLst>
           </p:cNvPr>
@@ -13799,7 +16284,7 @@
           <p:cNvPr id="3" name="Content Placeholder 2">
             <a:extLst>
               <a:ext uri="{FF2B5EF4-FFF2-40B4-BE49-F238E27FC236}">
-                <a16:creationId xmlns:a16="http://schemas.microsoft.com/office/drawing/2014/main" id="{8F0952B2-F12D-991D-3EC9-9526D8EDED87}"/>
+                <a16:creationId xmlns:a16="http://schemas.microsoft.com/office/drawing/2014/main" xmlns="" id="{8F0952B2-F12D-991D-3EC9-9526D8EDED87}"/>
               </a:ext>
             </a:extLst>
           </p:cNvPr>
@@ -13874,7 +16359,7 @@
           <p:cNvPr id="8" name="Ribbon: Curved and Tilted Down 7">
             <a:extLst>
               <a:ext uri="{FF2B5EF4-FFF2-40B4-BE49-F238E27FC236}">
-                <a16:creationId xmlns:a16="http://schemas.microsoft.com/office/drawing/2014/main" id="{C9C1F804-0CF6-A2DC-646C-9B9441D8EBB0}"/>
+                <a16:creationId xmlns:a16="http://schemas.microsoft.com/office/drawing/2014/main" xmlns="" id="{C9C1F804-0CF6-A2DC-646C-9B9441D8EBB0}"/>
               </a:ext>
             </a:extLst>
           </p:cNvPr>
@@ -13947,7 +16432,7 @@
           <p:cNvPr id="9" name="Scroll: Vertical 8">
             <a:extLst>
               <a:ext uri="{FF2B5EF4-FFF2-40B4-BE49-F238E27FC236}">
-                <a16:creationId xmlns:a16="http://schemas.microsoft.com/office/drawing/2014/main" id="{94613FC4-1176-9125-467B-B6CE33BB59CD}"/>
+                <a16:creationId xmlns:a16="http://schemas.microsoft.com/office/drawing/2014/main" xmlns="" id="{94613FC4-1176-9125-467B-B6CE33BB59CD}"/>
               </a:ext>
             </a:extLst>
           </p:cNvPr>
@@ -14263,7 +16748,7 @@
     </p:spTree>
     <p:extLst>
       <p:ext uri="{BB962C8B-B14F-4D97-AF65-F5344CB8AC3E}">
-        <p14:creationId xmlns:p14="http://schemas.microsoft.com/office/powerpoint/2010/main" val="2302025808"/>
+        <p14:creationId xmlns:p14="http://schemas.microsoft.com/office/powerpoint/2010/main" xmlns="" val="2302025808"/>
       </p:ext>
     </p:extLst>
   </p:cSld>
@@ -14281,7 +16766,7 @@
         <p:cNvPr id="1" name="">
           <a:extLst>
             <a:ext uri="{FF2B5EF4-FFF2-40B4-BE49-F238E27FC236}">
-              <a16:creationId xmlns:a16="http://schemas.microsoft.com/office/drawing/2014/main" id="{744B94CD-0809-14B6-E79F-D0C06F89CA15}"/>
+              <a16:creationId xmlns:a16="http://schemas.microsoft.com/office/drawing/2014/main" xmlns="" id="{744B94CD-0809-14B6-E79F-D0C06F89CA15}"/>
             </a:ext>
           </a:extLst>
         </p:cNvPr>
@@ -14301,7 +16786,7 @@
           <p:cNvPr id="9" name="Title 8">
             <a:extLst>
               <a:ext uri="{FF2B5EF4-FFF2-40B4-BE49-F238E27FC236}">
-                <a16:creationId xmlns:a16="http://schemas.microsoft.com/office/drawing/2014/main" id="{F3A13225-B875-57E9-5CCB-88427D8711E0}"/>
+                <a16:creationId xmlns:a16="http://schemas.microsoft.com/office/drawing/2014/main" xmlns="" id="{F3A13225-B875-57E9-5CCB-88427D8711E0}"/>
               </a:ext>
             </a:extLst>
           </p:cNvPr>
@@ -14341,7 +16826,7 @@
           <p:cNvPr id="3" name="Content Placeholder 2">
             <a:extLst>
               <a:ext uri="{FF2B5EF4-FFF2-40B4-BE49-F238E27FC236}">
-                <a16:creationId xmlns:a16="http://schemas.microsoft.com/office/drawing/2014/main" id="{29D21329-5AAF-6358-9761-2C4901A09C8C}"/>
+                <a16:creationId xmlns:a16="http://schemas.microsoft.com/office/drawing/2014/main" xmlns="" id="{29D21329-5AAF-6358-9761-2C4901A09C8C}"/>
               </a:ext>
             </a:extLst>
           </p:cNvPr>
@@ -14388,7 +16873,7 @@
           <p:cNvPr id="5" name="Title 1">
             <a:extLst>
               <a:ext uri="{FF2B5EF4-FFF2-40B4-BE49-F238E27FC236}">
-                <a16:creationId xmlns:a16="http://schemas.microsoft.com/office/drawing/2014/main" id="{23B0E81A-A704-BABA-7779-F926A6BFCB35}"/>
+                <a16:creationId xmlns:a16="http://schemas.microsoft.com/office/drawing/2014/main" xmlns="" id="{23B0E81A-A704-BABA-7779-F926A6BFCB35}"/>
               </a:ext>
             </a:extLst>
           </p:cNvPr>
@@ -14496,7 +16981,7 @@
           <p:cNvPr id="10" name="Ribbon: Curved and Tilted Down 9">
             <a:extLst>
               <a:ext uri="{FF2B5EF4-FFF2-40B4-BE49-F238E27FC236}">
-                <a16:creationId xmlns:a16="http://schemas.microsoft.com/office/drawing/2014/main" id="{3DBA1B1D-2AF2-C619-7353-1037498CD788}"/>
+                <a16:creationId xmlns:a16="http://schemas.microsoft.com/office/drawing/2014/main" xmlns="" id="{3DBA1B1D-2AF2-C619-7353-1037498CD788}"/>
               </a:ext>
             </a:extLst>
           </p:cNvPr>
@@ -14569,7 +17054,7 @@
           <p:cNvPr id="11" name="Scroll: Vertical 10">
             <a:extLst>
               <a:ext uri="{FF2B5EF4-FFF2-40B4-BE49-F238E27FC236}">
-                <a16:creationId xmlns:a16="http://schemas.microsoft.com/office/drawing/2014/main" id="{BE18EA22-49FD-59C7-DB0C-3006A91F02E6}"/>
+                <a16:creationId xmlns:a16="http://schemas.microsoft.com/office/drawing/2014/main" xmlns="" id="{BE18EA22-49FD-59C7-DB0C-3006A91F02E6}"/>
               </a:ext>
             </a:extLst>
           </p:cNvPr>
@@ -14885,7 +17370,7 @@
     </p:spTree>
     <p:extLst>
       <p:ext uri="{BB962C8B-B14F-4D97-AF65-F5344CB8AC3E}">
-        <p14:creationId xmlns:p14="http://schemas.microsoft.com/office/powerpoint/2010/main" val="1090188544"/>
+        <p14:creationId xmlns:p14="http://schemas.microsoft.com/office/powerpoint/2010/main" xmlns="" val="1090188544"/>
       </p:ext>
     </p:extLst>
   </p:cSld>
@@ -14903,7 +17388,7 @@
         <p:cNvPr id="1" name="">
           <a:extLst>
             <a:ext uri="{FF2B5EF4-FFF2-40B4-BE49-F238E27FC236}">
-              <a16:creationId xmlns:a16="http://schemas.microsoft.com/office/drawing/2014/main" id="{DFFF01F8-A8CD-88AB-42C3-C2E632C5474A}"/>
+              <a16:creationId xmlns:a16="http://schemas.microsoft.com/office/drawing/2014/main" xmlns="" id="{DFFF01F8-A8CD-88AB-42C3-C2E632C5474A}"/>
             </a:ext>
           </a:extLst>
         </p:cNvPr>
@@ -14923,7 +17408,7 @@
           <p:cNvPr id="7" name="Title 8">
             <a:extLst>
               <a:ext uri="{FF2B5EF4-FFF2-40B4-BE49-F238E27FC236}">
-                <a16:creationId xmlns:a16="http://schemas.microsoft.com/office/drawing/2014/main" id="{2CFF87A5-7472-22DC-030C-A3CCBBC3E824}"/>
+                <a16:creationId xmlns:a16="http://schemas.microsoft.com/office/drawing/2014/main" xmlns="" id="{2CFF87A5-7472-22DC-030C-A3CCBBC3E824}"/>
               </a:ext>
             </a:extLst>
           </p:cNvPr>
@@ -14963,7 +17448,7 @@
           <p:cNvPr id="3" name="Content Placeholder 2">
             <a:extLst>
               <a:ext uri="{FF2B5EF4-FFF2-40B4-BE49-F238E27FC236}">
-                <a16:creationId xmlns:a16="http://schemas.microsoft.com/office/drawing/2014/main" id="{1702553A-B321-D7AA-C0CD-A58D1C15FC38}"/>
+                <a16:creationId xmlns:a16="http://schemas.microsoft.com/office/drawing/2014/main" xmlns="" id="{1702553A-B321-D7AA-C0CD-A58D1C15FC38}"/>
               </a:ext>
             </a:extLst>
           </p:cNvPr>
@@ -15036,7 +17521,7 @@
           <p:cNvPr id="8" name="Ribbon: Curved and Tilted Down 7">
             <a:extLst>
               <a:ext uri="{FF2B5EF4-FFF2-40B4-BE49-F238E27FC236}">
-                <a16:creationId xmlns:a16="http://schemas.microsoft.com/office/drawing/2014/main" id="{C52AE18F-E34C-AFB6-7EA6-F589DEF7B3D0}"/>
+                <a16:creationId xmlns:a16="http://schemas.microsoft.com/office/drawing/2014/main" xmlns="" id="{C52AE18F-E34C-AFB6-7EA6-F589DEF7B3D0}"/>
               </a:ext>
             </a:extLst>
           </p:cNvPr>
@@ -15109,7 +17594,7 @@
           <p:cNvPr id="9" name="Scroll: Vertical 8">
             <a:extLst>
               <a:ext uri="{FF2B5EF4-FFF2-40B4-BE49-F238E27FC236}">
-                <a16:creationId xmlns:a16="http://schemas.microsoft.com/office/drawing/2014/main" id="{18A95ECD-6D24-C669-0CF8-39F3FBCDDA47}"/>
+                <a16:creationId xmlns:a16="http://schemas.microsoft.com/office/drawing/2014/main" xmlns="" id="{18A95ECD-6D24-C669-0CF8-39F3FBCDDA47}"/>
               </a:ext>
             </a:extLst>
           </p:cNvPr>
@@ -15425,7 +17910,7 @@
     </p:spTree>
     <p:extLst>
       <p:ext uri="{BB962C8B-B14F-4D97-AF65-F5344CB8AC3E}">
-        <p14:creationId xmlns:p14="http://schemas.microsoft.com/office/powerpoint/2010/main" val="1870717373"/>
+        <p14:creationId xmlns:p14="http://schemas.microsoft.com/office/powerpoint/2010/main" xmlns="" val="1870717373"/>
       </p:ext>
     </p:extLst>
   </p:cSld>
@@ -15443,7 +17928,7 @@
         <p:cNvPr id="1" name="">
           <a:extLst>
             <a:ext uri="{FF2B5EF4-FFF2-40B4-BE49-F238E27FC236}">
-              <a16:creationId xmlns:a16="http://schemas.microsoft.com/office/drawing/2014/main" id="{D224F207-D856-6E6D-9995-159800F589CD}"/>
+              <a16:creationId xmlns:a16="http://schemas.microsoft.com/office/drawing/2014/main" xmlns="" id="{D224F207-D856-6E6D-9995-159800F589CD}"/>
             </a:ext>
           </a:extLst>
         </p:cNvPr>
@@ -15463,7 +17948,7 @@
           <p:cNvPr id="5" name="Title 8">
             <a:extLst>
               <a:ext uri="{FF2B5EF4-FFF2-40B4-BE49-F238E27FC236}">
-                <a16:creationId xmlns:a16="http://schemas.microsoft.com/office/drawing/2014/main" id="{2773E7F4-011C-1186-0E83-1852CC157898}"/>
+                <a16:creationId xmlns:a16="http://schemas.microsoft.com/office/drawing/2014/main" xmlns="" id="{2773E7F4-011C-1186-0E83-1852CC157898}"/>
               </a:ext>
             </a:extLst>
           </p:cNvPr>
@@ -15503,7 +17988,7 @@
           <p:cNvPr id="3" name="Content Placeholder 2">
             <a:extLst>
               <a:ext uri="{FF2B5EF4-FFF2-40B4-BE49-F238E27FC236}">
-                <a16:creationId xmlns:a16="http://schemas.microsoft.com/office/drawing/2014/main" id="{9466D7CB-A484-F4DC-1247-3B0F9708D05F}"/>
+                <a16:creationId xmlns:a16="http://schemas.microsoft.com/office/drawing/2014/main" xmlns="" id="{9466D7CB-A484-F4DC-1247-3B0F9708D05F}"/>
               </a:ext>
             </a:extLst>
           </p:cNvPr>
@@ -15550,7 +18035,7 @@
           <p:cNvPr id="6" name="Ribbon: Curved and Tilted Down 5">
             <a:extLst>
               <a:ext uri="{FF2B5EF4-FFF2-40B4-BE49-F238E27FC236}">
-                <a16:creationId xmlns:a16="http://schemas.microsoft.com/office/drawing/2014/main" id="{DA6F4F8F-5ABC-21EF-A2AB-B0F4B5058194}"/>
+                <a16:creationId xmlns:a16="http://schemas.microsoft.com/office/drawing/2014/main" xmlns="" id="{DA6F4F8F-5ABC-21EF-A2AB-B0F4B5058194}"/>
               </a:ext>
             </a:extLst>
           </p:cNvPr>
@@ -15623,7 +18108,7 @@
           <p:cNvPr id="7" name="Scroll: Vertical 6">
             <a:extLst>
               <a:ext uri="{FF2B5EF4-FFF2-40B4-BE49-F238E27FC236}">
-                <a16:creationId xmlns:a16="http://schemas.microsoft.com/office/drawing/2014/main" id="{694A0A23-21B4-6D65-E96A-AD1A0AC04FCC}"/>
+                <a16:creationId xmlns:a16="http://schemas.microsoft.com/office/drawing/2014/main" xmlns="" id="{694A0A23-21B4-6D65-E96A-AD1A0AC04FCC}"/>
               </a:ext>
             </a:extLst>
           </p:cNvPr>
@@ -15939,7 +18424,7 @@
     </p:spTree>
     <p:extLst>
       <p:ext uri="{BB962C8B-B14F-4D97-AF65-F5344CB8AC3E}">
-        <p14:creationId xmlns:p14="http://schemas.microsoft.com/office/powerpoint/2010/main" val="755787835"/>
+        <p14:creationId xmlns:p14="http://schemas.microsoft.com/office/powerpoint/2010/main" xmlns="" val="755787835"/>
       </p:ext>
     </p:extLst>
   </p:cSld>
@@ -15957,7 +18442,7 @@
         <p:cNvPr id="1" name="">
           <a:extLst>
             <a:ext uri="{FF2B5EF4-FFF2-40B4-BE49-F238E27FC236}">
-              <a16:creationId xmlns:a16="http://schemas.microsoft.com/office/drawing/2014/main" id="{517DE5E6-801F-A2FD-C03F-6F5486821075}"/>
+              <a16:creationId xmlns:a16="http://schemas.microsoft.com/office/drawing/2014/main" xmlns="" id="{517DE5E6-801F-A2FD-C03F-6F5486821075}"/>
             </a:ext>
           </a:extLst>
         </p:cNvPr>
@@ -15977,7 +18462,7 @@
           <p:cNvPr id="2" name="Title 1">
             <a:extLst>
               <a:ext uri="{FF2B5EF4-FFF2-40B4-BE49-F238E27FC236}">
-                <a16:creationId xmlns:a16="http://schemas.microsoft.com/office/drawing/2014/main" id="{5F9D859A-CC6B-038D-5AE0-901278C3F6CE}"/>
+                <a16:creationId xmlns:a16="http://schemas.microsoft.com/office/drawing/2014/main" xmlns="" id="{5F9D859A-CC6B-038D-5AE0-901278C3F6CE}"/>
               </a:ext>
             </a:extLst>
           </p:cNvPr>
@@ -16015,7 +18500,7 @@
           <p:cNvPr id="3" name="Content Placeholder 2">
             <a:extLst>
               <a:ext uri="{FF2B5EF4-FFF2-40B4-BE49-F238E27FC236}">
-                <a16:creationId xmlns:a16="http://schemas.microsoft.com/office/drawing/2014/main" id="{E5BE3A65-ADA6-AEAF-69B6-B9779A59851F}"/>
+                <a16:creationId xmlns:a16="http://schemas.microsoft.com/office/drawing/2014/main" xmlns="" id="{E5BE3A65-ADA6-AEAF-69B6-B9779A59851F}"/>
               </a:ext>
             </a:extLst>
           </p:cNvPr>
@@ -16056,7 +18541,7 @@
           <p:cNvPr id="6" name="Ribbon: Curved and Tilted Down 5">
             <a:extLst>
               <a:ext uri="{FF2B5EF4-FFF2-40B4-BE49-F238E27FC236}">
-                <a16:creationId xmlns:a16="http://schemas.microsoft.com/office/drawing/2014/main" id="{571A9BAF-7164-4534-E0BD-EE0EDF7090A3}"/>
+                <a16:creationId xmlns:a16="http://schemas.microsoft.com/office/drawing/2014/main" xmlns="" id="{571A9BAF-7164-4534-E0BD-EE0EDF7090A3}"/>
               </a:ext>
             </a:extLst>
           </p:cNvPr>
@@ -16129,7 +18614,7 @@
           <p:cNvPr id="7" name="Scroll: Vertical 6">
             <a:extLst>
               <a:ext uri="{FF2B5EF4-FFF2-40B4-BE49-F238E27FC236}">
-                <a16:creationId xmlns:a16="http://schemas.microsoft.com/office/drawing/2014/main" id="{82B3A4DF-1DDB-DA3D-C01E-CA4956EC89D7}"/>
+                <a16:creationId xmlns:a16="http://schemas.microsoft.com/office/drawing/2014/main" xmlns="" id="{82B3A4DF-1DDB-DA3D-C01E-CA4956EC89D7}"/>
               </a:ext>
             </a:extLst>
           </p:cNvPr>
@@ -16445,7 +18930,7 @@
     </p:spTree>
     <p:extLst>
       <p:ext uri="{BB962C8B-B14F-4D97-AF65-F5344CB8AC3E}">
-        <p14:creationId xmlns:p14="http://schemas.microsoft.com/office/powerpoint/2010/main" val="3160480842"/>
+        <p14:creationId xmlns:p14="http://schemas.microsoft.com/office/powerpoint/2010/main" xmlns="" val="3160480842"/>
       </p:ext>
     </p:extLst>
   </p:cSld>
@@ -16706,7 +19191,7 @@
   <a:extraClrSchemeLst/>
   <a:extLst>
     <a:ext uri="{05A4C25C-085E-4340-85A3-A5531E510DB2}">
-      <thm15:themeFamily xmlns:thm15="http://schemas.microsoft.com/office/thememl/2012/main" name="Facet" id="{C0C680CD-088A-49FC-A102-D699147F32B2}" vid="{8C59B386-999D-4CB6-B907-9F3997C027CC}"/>
+      <thm15:themeFamily xmlns:thm15="http://schemas.microsoft.com/office/thememl/2012/main" xmlns="" name="Facet" id="{C0C680CD-088A-49FC-A102-D699147F32B2}" vid="{8C59B386-999D-4CB6-B907-9F3997C027CC}"/>
     </a:ext>
   </a:extLst>
 </a:theme>

</xml_diff>

<commit_message>
Added till chapter 7
</commit_message>
<xml_diff>
--- a/Javascript Tutorials.pptx
+++ b/Javascript Tutorials.pptx
@@ -30,6 +30,11 @@
     <p:sldId id="278" r:id="rId24"/>
     <p:sldId id="279" r:id="rId25"/>
     <p:sldId id="280" r:id="rId26"/>
+    <p:sldId id="281" r:id="rId27"/>
+    <p:sldId id="282" r:id="rId28"/>
+    <p:sldId id="283" r:id="rId29"/>
+    <p:sldId id="284" r:id="rId30"/>
+    <p:sldId id="285" r:id="rId31"/>
   </p:sldIdLst>
   <p:sldSz cx="12192000" cy="6858000"/>
   <p:notesSz cx="6858000" cy="9144000"/>
@@ -130,7 +135,7 @@
   </p:defaultTextStyle>
   <p:extLst>
     <p:ext uri="{EFAFB233-063F-42B5-8137-9DF3F51BA10A}">
-      <p15:sldGuideLst xmlns:p15="http://schemas.microsoft.com/office/powerpoint/2012/main">
+      <p15:sldGuideLst xmlns:p15="http://schemas.microsoft.com/office/powerpoint/2012/main" xmlns="">
         <p15:guide id="1" orient="horz" pos="2160">
           <p15:clr>
             <a:srgbClr val="A4A3A4"/>
@@ -924,7 +929,7 @@
     </p:spTree>
     <p:extLst>
       <p:ext uri="{BB962C8B-B14F-4D97-AF65-F5344CB8AC3E}">
-        <p14:creationId xmlns:p14="http://schemas.microsoft.com/office/powerpoint/2010/main" val="2121369331"/>
+        <p14:creationId xmlns:p14="http://schemas.microsoft.com/office/powerpoint/2010/main" xmlns="" val="2121369331"/>
       </p:ext>
     </p:extLst>
   </p:cSld>
@@ -1177,7 +1182,7 @@
     </p:spTree>
     <p:extLst>
       <p:ext uri="{BB962C8B-B14F-4D97-AF65-F5344CB8AC3E}">
-        <p14:creationId xmlns:p14="http://schemas.microsoft.com/office/powerpoint/2010/main" val="4277845334"/>
+        <p14:creationId xmlns:p14="http://schemas.microsoft.com/office/powerpoint/2010/main" xmlns="" val="4277845334"/>
       </p:ext>
     </p:extLst>
   </p:cSld>
@@ -1569,7 +1574,7 @@
     </p:spTree>
     <p:extLst>
       <p:ext uri="{BB962C8B-B14F-4D97-AF65-F5344CB8AC3E}">
-        <p14:creationId xmlns:p14="http://schemas.microsoft.com/office/powerpoint/2010/main" val="4103336880"/>
+        <p14:creationId xmlns:p14="http://schemas.microsoft.com/office/powerpoint/2010/main" xmlns="" val="4103336880"/>
       </p:ext>
     </p:extLst>
   </p:cSld>
@@ -1822,7 +1827,7 @@
     </p:spTree>
     <p:extLst>
       <p:ext uri="{BB962C8B-B14F-4D97-AF65-F5344CB8AC3E}">
-        <p14:creationId xmlns:p14="http://schemas.microsoft.com/office/powerpoint/2010/main" val="2317848287"/>
+        <p14:creationId xmlns:p14="http://schemas.microsoft.com/office/powerpoint/2010/main" xmlns="" val="2317848287"/>
       </p:ext>
     </p:extLst>
   </p:cSld>
@@ -2214,7 +2219,7 @@
     </p:spTree>
     <p:extLst>
       <p:ext uri="{BB962C8B-B14F-4D97-AF65-F5344CB8AC3E}">
-        <p14:creationId xmlns:p14="http://schemas.microsoft.com/office/powerpoint/2010/main" val="4054754721"/>
+        <p14:creationId xmlns:p14="http://schemas.microsoft.com/office/powerpoint/2010/main" xmlns="" val="4054754721"/>
       </p:ext>
     </p:extLst>
   </p:cSld>
@@ -2527,7 +2532,7 @@
     </p:spTree>
     <p:extLst>
       <p:ext uri="{BB962C8B-B14F-4D97-AF65-F5344CB8AC3E}">
-        <p14:creationId xmlns:p14="http://schemas.microsoft.com/office/powerpoint/2010/main" val="3698809145"/>
+        <p14:creationId xmlns:p14="http://schemas.microsoft.com/office/powerpoint/2010/main" xmlns="" val="3698809145"/>
       </p:ext>
     </p:extLst>
   </p:cSld>
@@ -2699,7 +2704,7 @@
     </p:spTree>
     <p:extLst>
       <p:ext uri="{BB962C8B-B14F-4D97-AF65-F5344CB8AC3E}">
-        <p14:creationId xmlns:p14="http://schemas.microsoft.com/office/powerpoint/2010/main" val="4102912012"/>
+        <p14:creationId xmlns:p14="http://schemas.microsoft.com/office/powerpoint/2010/main" xmlns="" val="4102912012"/>
       </p:ext>
     </p:extLst>
   </p:cSld>
@@ -2881,7 +2886,7 @@
     </p:spTree>
     <p:extLst>
       <p:ext uri="{BB962C8B-B14F-4D97-AF65-F5344CB8AC3E}">
-        <p14:creationId xmlns:p14="http://schemas.microsoft.com/office/powerpoint/2010/main" val="1199620941"/>
+        <p14:creationId xmlns:p14="http://schemas.microsoft.com/office/powerpoint/2010/main" xmlns="" val="1199620941"/>
       </p:ext>
     </p:extLst>
   </p:cSld>
@@ -3059,7 +3064,7 @@
     </p:spTree>
     <p:extLst>
       <p:ext uri="{BB962C8B-B14F-4D97-AF65-F5344CB8AC3E}">
-        <p14:creationId xmlns:p14="http://schemas.microsoft.com/office/powerpoint/2010/main" val="901355798"/>
+        <p14:creationId xmlns:p14="http://schemas.microsoft.com/office/powerpoint/2010/main" xmlns="" val="901355798"/>
       </p:ext>
     </p:extLst>
   </p:cSld>
@@ -3308,7 +3313,7 @@
     </p:spTree>
     <p:extLst>
       <p:ext uri="{BB962C8B-B14F-4D97-AF65-F5344CB8AC3E}">
-        <p14:creationId xmlns:p14="http://schemas.microsoft.com/office/powerpoint/2010/main" val="351019068"/>
+        <p14:creationId xmlns:p14="http://schemas.microsoft.com/office/powerpoint/2010/main" xmlns="" val="351019068"/>
       </p:ext>
     </p:extLst>
   </p:cSld>
@@ -3542,7 +3547,7 @@
     </p:spTree>
     <p:extLst>
       <p:ext uri="{BB962C8B-B14F-4D97-AF65-F5344CB8AC3E}">
-        <p14:creationId xmlns:p14="http://schemas.microsoft.com/office/powerpoint/2010/main" val="3037334119"/>
+        <p14:creationId xmlns:p14="http://schemas.microsoft.com/office/powerpoint/2010/main" xmlns="" val="3037334119"/>
       </p:ext>
     </p:extLst>
   </p:cSld>
@@ -3918,7 +3923,7 @@
     </p:spTree>
     <p:extLst>
       <p:ext uri="{BB962C8B-B14F-4D97-AF65-F5344CB8AC3E}">
-        <p14:creationId xmlns:p14="http://schemas.microsoft.com/office/powerpoint/2010/main" val="3959179014"/>
+        <p14:creationId xmlns:p14="http://schemas.microsoft.com/office/powerpoint/2010/main" xmlns="" val="3959179014"/>
       </p:ext>
     </p:extLst>
   </p:cSld>
@@ -4043,7 +4048,7 @@
     </p:spTree>
     <p:extLst>
       <p:ext uri="{BB962C8B-B14F-4D97-AF65-F5344CB8AC3E}">
-        <p14:creationId xmlns:p14="http://schemas.microsoft.com/office/powerpoint/2010/main" val="143817896"/>
+        <p14:creationId xmlns:p14="http://schemas.microsoft.com/office/powerpoint/2010/main" xmlns="" val="143817896"/>
       </p:ext>
     </p:extLst>
   </p:cSld>
@@ -4140,7 +4145,7 @@
     </p:spTree>
     <p:extLst>
       <p:ext uri="{BB962C8B-B14F-4D97-AF65-F5344CB8AC3E}">
-        <p14:creationId xmlns:p14="http://schemas.microsoft.com/office/powerpoint/2010/main" val="1053529793"/>
+        <p14:creationId xmlns:p14="http://schemas.microsoft.com/office/powerpoint/2010/main" xmlns="" val="1053529793"/>
       </p:ext>
     </p:extLst>
   </p:cSld>
@@ -4397,7 +4402,7 @@
     </p:spTree>
     <p:extLst>
       <p:ext uri="{BB962C8B-B14F-4D97-AF65-F5344CB8AC3E}">
-        <p14:creationId xmlns:p14="http://schemas.microsoft.com/office/powerpoint/2010/main" val="1549564702"/>
+        <p14:creationId xmlns:p14="http://schemas.microsoft.com/office/powerpoint/2010/main" xmlns="" val="1549564702"/>
       </p:ext>
     </p:extLst>
   </p:cSld>
@@ -4662,7 +4667,7 @@
     </p:spTree>
     <p:extLst>
       <p:ext uri="{BB962C8B-B14F-4D97-AF65-F5344CB8AC3E}">
-        <p14:creationId xmlns:p14="http://schemas.microsoft.com/office/powerpoint/2010/main" val="1708776435"/>
+        <p14:creationId xmlns:p14="http://schemas.microsoft.com/office/powerpoint/2010/main" xmlns="" val="1708776435"/>
       </p:ext>
     </p:extLst>
   </p:cSld>
@@ -5443,7 +5448,7 @@
     </p:spTree>
     <p:extLst>
       <p:ext uri="{BB962C8B-B14F-4D97-AF65-F5344CB8AC3E}">
-        <p14:creationId xmlns:p14="http://schemas.microsoft.com/office/powerpoint/2010/main" val="121865681"/>
+        <p14:creationId xmlns:p14="http://schemas.microsoft.com/office/powerpoint/2010/main" xmlns="" val="121865681"/>
       </p:ext>
     </p:extLst>
   </p:cSld>
@@ -5887,7 +5892,7 @@
           <p:cNvPr id="2" name="Title 1">
             <a:extLst>
               <a:ext uri="{FF2B5EF4-FFF2-40B4-BE49-F238E27FC236}">
-                <a16:creationId xmlns:a16="http://schemas.microsoft.com/office/drawing/2014/main" id="{EC93423C-79E8-2701-DB3F-2D4CA67D7A87}"/>
+                <a16:creationId xmlns:a16="http://schemas.microsoft.com/office/drawing/2014/main" xmlns="" id="{EC93423C-79E8-2701-DB3F-2D4CA67D7A87}"/>
               </a:ext>
             </a:extLst>
           </p:cNvPr>
@@ -5940,7 +5945,7 @@
           <p:cNvPr id="3" name="Subtitle 2">
             <a:extLst>
               <a:ext uri="{FF2B5EF4-FFF2-40B4-BE49-F238E27FC236}">
-                <a16:creationId xmlns:a16="http://schemas.microsoft.com/office/drawing/2014/main" id="{2A629AF9-FA04-B477-0E47-5B7F12E6FC7C}"/>
+                <a16:creationId xmlns:a16="http://schemas.microsoft.com/office/drawing/2014/main" xmlns="" id="{2A629AF9-FA04-B477-0E47-5B7F12E6FC7C}"/>
               </a:ext>
             </a:extLst>
           </p:cNvPr>
@@ -5976,7 +5981,7 @@
           <p:cNvPr id="4" name="TextBox 3">
             <a:extLst>
               <a:ext uri="{FF2B5EF4-FFF2-40B4-BE49-F238E27FC236}">
-                <a16:creationId xmlns:a16="http://schemas.microsoft.com/office/drawing/2014/main" id="{4BC27C14-3D93-9CDE-B1D8-91C6ACAF4DA4}"/>
+                <a16:creationId xmlns:a16="http://schemas.microsoft.com/office/drawing/2014/main" xmlns="" id="{4BC27C14-3D93-9CDE-B1D8-91C6ACAF4DA4}"/>
               </a:ext>
             </a:extLst>
           </p:cNvPr>
@@ -6025,7 +6030,7 @@
     </p:spTree>
     <p:extLst>
       <p:ext uri="{BB962C8B-B14F-4D97-AF65-F5344CB8AC3E}">
-        <p14:creationId xmlns:p14="http://schemas.microsoft.com/office/powerpoint/2010/main" val="889777050"/>
+        <p14:creationId xmlns:p14="http://schemas.microsoft.com/office/powerpoint/2010/main" xmlns="" val="889777050"/>
       </p:ext>
     </p:extLst>
   </p:cSld>
@@ -6043,7 +6048,7 @@
         <p:cNvPr id="1" name="">
           <a:extLst>
             <a:ext uri="{FF2B5EF4-FFF2-40B4-BE49-F238E27FC236}">
-              <a16:creationId xmlns:a16="http://schemas.microsoft.com/office/drawing/2014/main" id="{253BBDB7-3E52-64BD-6E92-66253059D34C}"/>
+              <a16:creationId xmlns:a16="http://schemas.microsoft.com/office/drawing/2014/main" xmlns="" id="{253BBDB7-3E52-64BD-6E92-66253059D34C}"/>
             </a:ext>
           </a:extLst>
         </p:cNvPr>
@@ -6063,7 +6068,7 @@
           <p:cNvPr id="2" name="Title 1">
             <a:extLst>
               <a:ext uri="{FF2B5EF4-FFF2-40B4-BE49-F238E27FC236}">
-                <a16:creationId xmlns:a16="http://schemas.microsoft.com/office/drawing/2014/main" id="{E55678BE-607F-2A2B-B318-30B2DA7F29B3}"/>
+                <a16:creationId xmlns:a16="http://schemas.microsoft.com/office/drawing/2014/main" xmlns="" id="{E55678BE-607F-2A2B-B318-30B2DA7F29B3}"/>
               </a:ext>
             </a:extLst>
           </p:cNvPr>
@@ -6100,7 +6105,7 @@
           <p:cNvPr id="3" name="Content Placeholder 2">
             <a:extLst>
               <a:ext uri="{FF2B5EF4-FFF2-40B4-BE49-F238E27FC236}">
-                <a16:creationId xmlns:a16="http://schemas.microsoft.com/office/drawing/2014/main" id="{A5951AC9-1751-ACAB-8097-E6D486A5D62D}"/>
+                <a16:creationId xmlns:a16="http://schemas.microsoft.com/office/drawing/2014/main" xmlns="" id="{A5951AC9-1751-ACAB-8097-E6D486A5D62D}"/>
               </a:ext>
             </a:extLst>
           </p:cNvPr>
@@ -6155,7 +6160,7 @@
           <p:cNvPr id="5" name="Ribbon: Curved and Tilted Down 4">
             <a:extLst>
               <a:ext uri="{FF2B5EF4-FFF2-40B4-BE49-F238E27FC236}">
-                <a16:creationId xmlns:a16="http://schemas.microsoft.com/office/drawing/2014/main" id="{29648F54-4274-51BA-8F35-F8C888E0A19B}"/>
+                <a16:creationId xmlns:a16="http://schemas.microsoft.com/office/drawing/2014/main" xmlns="" id="{29648F54-4274-51BA-8F35-F8C888E0A19B}"/>
               </a:ext>
             </a:extLst>
           </p:cNvPr>
@@ -6228,7 +6233,7 @@
           <p:cNvPr id="6" name="Scroll: Vertical 5">
             <a:extLst>
               <a:ext uri="{FF2B5EF4-FFF2-40B4-BE49-F238E27FC236}">
-                <a16:creationId xmlns:a16="http://schemas.microsoft.com/office/drawing/2014/main" id="{E3C4F40D-DC8F-F75B-7F98-E5029EC432CA}"/>
+                <a16:creationId xmlns:a16="http://schemas.microsoft.com/office/drawing/2014/main" xmlns="" id="{E3C4F40D-DC8F-F75B-7F98-E5029EC432CA}"/>
               </a:ext>
             </a:extLst>
           </p:cNvPr>
@@ -6544,7 +6549,7 @@
     </p:spTree>
     <p:extLst>
       <p:ext uri="{BB962C8B-B14F-4D97-AF65-F5344CB8AC3E}">
-        <p14:creationId xmlns:p14="http://schemas.microsoft.com/office/powerpoint/2010/main" val="609828687"/>
+        <p14:creationId xmlns:p14="http://schemas.microsoft.com/office/powerpoint/2010/main" xmlns="" val="609828687"/>
       </p:ext>
     </p:extLst>
   </p:cSld>
@@ -6562,7 +6567,7 @@
         <p:cNvPr id="1" name="">
           <a:extLst>
             <a:ext uri="{FF2B5EF4-FFF2-40B4-BE49-F238E27FC236}">
-              <a16:creationId xmlns:a16="http://schemas.microsoft.com/office/drawing/2014/main" id="{4586E9D7-F5F8-14CC-9DF6-FC4AF2EA4249}"/>
+              <a16:creationId xmlns:a16="http://schemas.microsoft.com/office/drawing/2014/main" xmlns="" id="{4586E9D7-F5F8-14CC-9DF6-FC4AF2EA4249}"/>
             </a:ext>
           </a:extLst>
         </p:cNvPr>
@@ -6582,7 +6587,7 @@
           <p:cNvPr id="2" name="Title 1">
             <a:extLst>
               <a:ext uri="{FF2B5EF4-FFF2-40B4-BE49-F238E27FC236}">
-                <a16:creationId xmlns:a16="http://schemas.microsoft.com/office/drawing/2014/main" id="{D8B67155-694F-FF61-7CDD-33A20A316215}"/>
+                <a16:creationId xmlns:a16="http://schemas.microsoft.com/office/drawing/2014/main" xmlns="" id="{D8B67155-694F-FF61-7CDD-33A20A316215}"/>
               </a:ext>
             </a:extLst>
           </p:cNvPr>
@@ -6619,7 +6624,7 @@
           <p:cNvPr id="3" name="Content Placeholder 2">
             <a:extLst>
               <a:ext uri="{FF2B5EF4-FFF2-40B4-BE49-F238E27FC236}">
-                <a16:creationId xmlns:a16="http://schemas.microsoft.com/office/drawing/2014/main" id="{2A53D2DA-721D-FC7E-8E09-BCBD844B6F9F}"/>
+                <a16:creationId xmlns:a16="http://schemas.microsoft.com/office/drawing/2014/main" xmlns="" id="{2A53D2DA-721D-FC7E-8E09-BCBD844B6F9F}"/>
               </a:ext>
             </a:extLst>
           </p:cNvPr>
@@ -6727,7 +6732,7 @@
           <p:cNvPr id="5" name="Ribbon: Curved and Tilted Down 4">
             <a:extLst>
               <a:ext uri="{FF2B5EF4-FFF2-40B4-BE49-F238E27FC236}">
-                <a16:creationId xmlns:a16="http://schemas.microsoft.com/office/drawing/2014/main" id="{3FA23525-E3EA-B8CB-FD6A-53084CA847A7}"/>
+                <a16:creationId xmlns:a16="http://schemas.microsoft.com/office/drawing/2014/main" xmlns="" id="{3FA23525-E3EA-B8CB-FD6A-53084CA847A7}"/>
               </a:ext>
             </a:extLst>
           </p:cNvPr>
@@ -6800,7 +6805,7 @@
           <p:cNvPr id="6" name="Scroll: Vertical 5">
             <a:extLst>
               <a:ext uri="{FF2B5EF4-FFF2-40B4-BE49-F238E27FC236}">
-                <a16:creationId xmlns:a16="http://schemas.microsoft.com/office/drawing/2014/main" id="{1A4C732A-2840-82C8-A359-298D925E33B3}"/>
+                <a16:creationId xmlns:a16="http://schemas.microsoft.com/office/drawing/2014/main" xmlns="" id="{1A4C732A-2840-82C8-A359-298D925E33B3}"/>
               </a:ext>
             </a:extLst>
           </p:cNvPr>
@@ -7116,7 +7121,7 @@
     </p:spTree>
     <p:extLst>
       <p:ext uri="{BB962C8B-B14F-4D97-AF65-F5344CB8AC3E}">
-        <p14:creationId xmlns:p14="http://schemas.microsoft.com/office/powerpoint/2010/main" val="3002471670"/>
+        <p14:creationId xmlns:p14="http://schemas.microsoft.com/office/powerpoint/2010/main" xmlns="" val="3002471670"/>
       </p:ext>
     </p:extLst>
   </p:cSld>
@@ -7148,7 +7153,7 @@
           <p:cNvPr id="9" name="Explosion: 14 Points 8">
             <a:extLst>
               <a:ext uri="{FF2B5EF4-FFF2-40B4-BE49-F238E27FC236}">
-                <a16:creationId xmlns:a16="http://schemas.microsoft.com/office/drawing/2014/main" id="{0A2CD68B-7A56-F86D-8B6F-4A8BF99B4C9E}"/>
+                <a16:creationId xmlns:a16="http://schemas.microsoft.com/office/drawing/2014/main" xmlns="" id="{0A2CD68B-7A56-F86D-8B6F-4A8BF99B4C9E}"/>
               </a:ext>
             </a:extLst>
           </p:cNvPr>
@@ -7203,7 +7208,7 @@
           <p:cNvPr id="4" name="Ribbon: Curved and Tilted Down 3">
             <a:extLst>
               <a:ext uri="{FF2B5EF4-FFF2-40B4-BE49-F238E27FC236}">
-                <a16:creationId xmlns:a16="http://schemas.microsoft.com/office/drawing/2014/main" id="{909DBECF-689C-9AA7-1649-9166A578EDF9}"/>
+                <a16:creationId xmlns:a16="http://schemas.microsoft.com/office/drawing/2014/main" xmlns="" id="{909DBECF-689C-9AA7-1649-9166A578EDF9}"/>
               </a:ext>
             </a:extLst>
           </p:cNvPr>
@@ -7270,7 +7275,7 @@
           <p:cNvPr id="5" name="Scroll: Vertical 4">
             <a:extLst>
               <a:ext uri="{FF2B5EF4-FFF2-40B4-BE49-F238E27FC236}">
-                <a16:creationId xmlns:a16="http://schemas.microsoft.com/office/drawing/2014/main" id="{38EB993A-3F18-C6B7-226F-EDD62B4B31DB}"/>
+                <a16:creationId xmlns:a16="http://schemas.microsoft.com/office/drawing/2014/main" xmlns="" id="{38EB993A-3F18-C6B7-226F-EDD62B4B31DB}"/>
               </a:ext>
             </a:extLst>
           </p:cNvPr>
@@ -7428,7 +7433,7 @@
           <p:cNvPr id="3" name="TextBox 2">
             <a:extLst>
               <a:ext uri="{FF2B5EF4-FFF2-40B4-BE49-F238E27FC236}">
-                <a16:creationId xmlns:a16="http://schemas.microsoft.com/office/drawing/2014/main" id="{97CE9E2B-4371-68F6-75AF-957039BA75DC}"/>
+                <a16:creationId xmlns:a16="http://schemas.microsoft.com/office/drawing/2014/main" xmlns="" id="{97CE9E2B-4371-68F6-75AF-957039BA75DC}"/>
               </a:ext>
             </a:extLst>
           </p:cNvPr>
@@ -7483,7 +7488,7 @@
           <p:cNvPr id="7" name="Title 6">
             <a:extLst>
               <a:ext uri="{FF2B5EF4-FFF2-40B4-BE49-F238E27FC236}">
-                <a16:creationId xmlns:a16="http://schemas.microsoft.com/office/drawing/2014/main" id="{77434EED-AEE3-6743-9008-B43A222A1CE2}"/>
+                <a16:creationId xmlns:a16="http://schemas.microsoft.com/office/drawing/2014/main" xmlns="" id="{77434EED-AEE3-6743-9008-B43A222A1CE2}"/>
               </a:ext>
             </a:extLst>
           </p:cNvPr>
@@ -7508,7 +7513,7 @@
           <p:cNvPr id="10" name="Title 1">
             <a:extLst>
               <a:ext uri="{FF2B5EF4-FFF2-40B4-BE49-F238E27FC236}">
-                <a16:creationId xmlns:a16="http://schemas.microsoft.com/office/drawing/2014/main" id="{6D70E990-115A-D697-159B-C41288490798}"/>
+                <a16:creationId xmlns:a16="http://schemas.microsoft.com/office/drawing/2014/main" xmlns="" id="{6D70E990-115A-D697-159B-C41288490798}"/>
               </a:ext>
             </a:extLst>
           </p:cNvPr>
@@ -7614,6 +7619,15 @@
               </a:rPr>
               <a:t>JavaScript</a:t>
             </a:r>
+            <a:r>
+              <a:rPr lang="en-US" sz="7200" b="1" dirty="0">
+                <a:solidFill>
+                  <a:schemeClr val="tx1"/>
+                </a:solidFill>
+                <a:latin typeface="Barlow Black" panose="00000A00000000000000" pitchFamily="2" charset="0"/>
+              </a:rPr>
+              <a:t/>
+            </a:r>
             <a:br>
               <a:rPr lang="en-US" sz="7200" b="1" dirty="0">
                 <a:solidFill>
@@ -7643,7 +7657,7 @@
     </p:spTree>
     <p:extLst>
       <p:ext uri="{BB962C8B-B14F-4D97-AF65-F5344CB8AC3E}">
-        <p14:creationId xmlns:p14="http://schemas.microsoft.com/office/powerpoint/2010/main" val="3287175084"/>
+        <p14:creationId xmlns:p14="http://schemas.microsoft.com/office/powerpoint/2010/main" xmlns="" val="3287175084"/>
       </p:ext>
     </p:extLst>
   </p:cSld>
@@ -7661,7 +7675,7 @@
         <p:cNvPr id="1" name="">
           <a:extLst>
             <a:ext uri="{FF2B5EF4-FFF2-40B4-BE49-F238E27FC236}">
-              <a16:creationId xmlns:a16="http://schemas.microsoft.com/office/drawing/2014/main" id="{4586E9D7-F5F8-14CC-9DF6-FC4AF2EA4249}"/>
+              <a16:creationId xmlns:a16="http://schemas.microsoft.com/office/drawing/2014/main" xmlns="" id="{4586E9D7-F5F8-14CC-9DF6-FC4AF2EA4249}"/>
             </a:ext>
           </a:extLst>
         </p:cNvPr>
@@ -7681,7 +7695,7 @@
           <p:cNvPr id="2" name="Title 1">
             <a:extLst>
               <a:ext uri="{FF2B5EF4-FFF2-40B4-BE49-F238E27FC236}">
-                <a16:creationId xmlns:a16="http://schemas.microsoft.com/office/drawing/2014/main" id="{D8B67155-694F-FF61-7CDD-33A20A316215}"/>
+                <a16:creationId xmlns:a16="http://schemas.microsoft.com/office/drawing/2014/main" xmlns="" id="{D8B67155-694F-FF61-7CDD-33A20A316215}"/>
               </a:ext>
             </a:extLst>
           </p:cNvPr>
@@ -7719,7 +7733,7 @@
           <p:cNvPr id="3" name="Content Placeholder 2">
             <a:extLst>
               <a:ext uri="{FF2B5EF4-FFF2-40B4-BE49-F238E27FC236}">
-                <a16:creationId xmlns:a16="http://schemas.microsoft.com/office/drawing/2014/main" id="{2A53D2DA-721D-FC7E-8E09-BCBD844B6F9F}"/>
+                <a16:creationId xmlns:a16="http://schemas.microsoft.com/office/drawing/2014/main" xmlns="" id="{2A53D2DA-721D-FC7E-8E09-BCBD844B6F9F}"/>
               </a:ext>
             </a:extLst>
           </p:cNvPr>
@@ -7767,7 +7781,7 @@
           <p:cNvPr id="5" name="Ribbon: Curved and Tilted Down 4">
             <a:extLst>
               <a:ext uri="{FF2B5EF4-FFF2-40B4-BE49-F238E27FC236}">
-                <a16:creationId xmlns:a16="http://schemas.microsoft.com/office/drawing/2014/main" id="{3FA23525-E3EA-B8CB-FD6A-53084CA847A7}"/>
+                <a16:creationId xmlns:a16="http://schemas.microsoft.com/office/drawing/2014/main" xmlns="" id="{3FA23525-E3EA-B8CB-FD6A-53084CA847A7}"/>
               </a:ext>
             </a:extLst>
           </p:cNvPr>
@@ -7840,7 +7854,7 @@
           <p:cNvPr id="6" name="Scroll: Vertical 5">
             <a:extLst>
               <a:ext uri="{FF2B5EF4-FFF2-40B4-BE49-F238E27FC236}">
-                <a16:creationId xmlns:a16="http://schemas.microsoft.com/office/drawing/2014/main" id="{1A4C732A-2840-82C8-A359-298D925E33B3}"/>
+                <a16:creationId xmlns:a16="http://schemas.microsoft.com/office/drawing/2014/main" xmlns="" id="{1A4C732A-2840-82C8-A359-298D925E33B3}"/>
               </a:ext>
             </a:extLst>
           </p:cNvPr>
@@ -8030,7 +8044,7 @@
     </p:spTree>
     <p:extLst>
       <p:ext uri="{BB962C8B-B14F-4D97-AF65-F5344CB8AC3E}">
-        <p14:creationId xmlns:p14="http://schemas.microsoft.com/office/powerpoint/2010/main" val="3002471670"/>
+        <p14:creationId xmlns:p14="http://schemas.microsoft.com/office/powerpoint/2010/main" xmlns="" val="3002471670"/>
       </p:ext>
     </p:extLst>
   </p:cSld>
@@ -8048,7 +8062,7 @@
         <p:cNvPr id="1" name="">
           <a:extLst>
             <a:ext uri="{FF2B5EF4-FFF2-40B4-BE49-F238E27FC236}">
-              <a16:creationId xmlns:a16="http://schemas.microsoft.com/office/drawing/2014/main" id="{4586E9D7-F5F8-14CC-9DF6-FC4AF2EA4249}"/>
+              <a16:creationId xmlns:a16="http://schemas.microsoft.com/office/drawing/2014/main" xmlns="" id="{4586E9D7-F5F8-14CC-9DF6-FC4AF2EA4249}"/>
             </a:ext>
           </a:extLst>
         </p:cNvPr>
@@ -8068,7 +8082,7 @@
           <p:cNvPr id="2" name="Title 1">
             <a:extLst>
               <a:ext uri="{FF2B5EF4-FFF2-40B4-BE49-F238E27FC236}">
-                <a16:creationId xmlns:a16="http://schemas.microsoft.com/office/drawing/2014/main" id="{D8B67155-694F-FF61-7CDD-33A20A316215}"/>
+                <a16:creationId xmlns:a16="http://schemas.microsoft.com/office/drawing/2014/main" xmlns="" id="{D8B67155-694F-FF61-7CDD-33A20A316215}"/>
               </a:ext>
             </a:extLst>
           </p:cNvPr>
@@ -8106,7 +8120,7 @@
           <p:cNvPr id="3" name="Content Placeholder 2">
             <a:extLst>
               <a:ext uri="{FF2B5EF4-FFF2-40B4-BE49-F238E27FC236}">
-                <a16:creationId xmlns:a16="http://schemas.microsoft.com/office/drawing/2014/main" id="{2A53D2DA-721D-FC7E-8E09-BCBD844B6F9F}"/>
+                <a16:creationId xmlns:a16="http://schemas.microsoft.com/office/drawing/2014/main" xmlns="" id="{2A53D2DA-721D-FC7E-8E09-BCBD844B6F9F}"/>
               </a:ext>
             </a:extLst>
           </p:cNvPr>
@@ -8230,7 +8244,7 @@
           <p:cNvPr id="5" name="Ribbon: Curved and Tilted Down 4">
             <a:extLst>
               <a:ext uri="{FF2B5EF4-FFF2-40B4-BE49-F238E27FC236}">
-                <a16:creationId xmlns:a16="http://schemas.microsoft.com/office/drawing/2014/main" id="{3FA23525-E3EA-B8CB-FD6A-53084CA847A7}"/>
+                <a16:creationId xmlns:a16="http://schemas.microsoft.com/office/drawing/2014/main" xmlns="" id="{3FA23525-E3EA-B8CB-FD6A-53084CA847A7}"/>
               </a:ext>
             </a:extLst>
           </p:cNvPr>
@@ -8303,7 +8317,7 @@
           <p:cNvPr id="6" name="Scroll: Vertical 5">
             <a:extLst>
               <a:ext uri="{FF2B5EF4-FFF2-40B4-BE49-F238E27FC236}">
-                <a16:creationId xmlns:a16="http://schemas.microsoft.com/office/drawing/2014/main" id="{1A4C732A-2840-82C8-A359-298D925E33B3}"/>
+                <a16:creationId xmlns:a16="http://schemas.microsoft.com/office/drawing/2014/main" xmlns="" id="{1A4C732A-2840-82C8-A359-298D925E33B3}"/>
               </a:ext>
             </a:extLst>
           </p:cNvPr>
@@ -8493,7 +8507,7 @@
     </p:spTree>
     <p:extLst>
       <p:ext uri="{BB962C8B-B14F-4D97-AF65-F5344CB8AC3E}">
-        <p14:creationId xmlns:p14="http://schemas.microsoft.com/office/powerpoint/2010/main" val="3002471670"/>
+        <p14:creationId xmlns:p14="http://schemas.microsoft.com/office/powerpoint/2010/main" xmlns="" val="3002471670"/>
       </p:ext>
     </p:extLst>
   </p:cSld>
@@ -8511,7 +8525,7 @@
         <p:cNvPr id="1" name="">
           <a:extLst>
             <a:ext uri="{FF2B5EF4-FFF2-40B4-BE49-F238E27FC236}">
-              <a16:creationId xmlns:a16="http://schemas.microsoft.com/office/drawing/2014/main" id="{4586E9D7-F5F8-14CC-9DF6-FC4AF2EA4249}"/>
+              <a16:creationId xmlns:a16="http://schemas.microsoft.com/office/drawing/2014/main" xmlns="" id="{4586E9D7-F5F8-14CC-9DF6-FC4AF2EA4249}"/>
             </a:ext>
           </a:extLst>
         </p:cNvPr>
@@ -8531,7 +8545,7 @@
           <p:cNvPr id="2" name="Title 1">
             <a:extLst>
               <a:ext uri="{FF2B5EF4-FFF2-40B4-BE49-F238E27FC236}">
-                <a16:creationId xmlns:a16="http://schemas.microsoft.com/office/drawing/2014/main" id="{D8B67155-694F-FF61-7CDD-33A20A316215}"/>
+                <a16:creationId xmlns:a16="http://schemas.microsoft.com/office/drawing/2014/main" xmlns="" id="{D8B67155-694F-FF61-7CDD-33A20A316215}"/>
               </a:ext>
             </a:extLst>
           </p:cNvPr>
@@ -8569,7 +8583,7 @@
           <p:cNvPr id="3" name="Content Placeholder 2">
             <a:extLst>
               <a:ext uri="{FF2B5EF4-FFF2-40B4-BE49-F238E27FC236}">
-                <a16:creationId xmlns:a16="http://schemas.microsoft.com/office/drawing/2014/main" id="{2A53D2DA-721D-FC7E-8E09-BCBD844B6F9F}"/>
+                <a16:creationId xmlns:a16="http://schemas.microsoft.com/office/drawing/2014/main" xmlns="" id="{2A53D2DA-721D-FC7E-8E09-BCBD844B6F9F}"/>
               </a:ext>
             </a:extLst>
           </p:cNvPr>
@@ -8608,7 +8622,7 @@
           <p:cNvPr id="5" name="Ribbon: Curved and Tilted Down 4">
             <a:extLst>
               <a:ext uri="{FF2B5EF4-FFF2-40B4-BE49-F238E27FC236}">
-                <a16:creationId xmlns:a16="http://schemas.microsoft.com/office/drawing/2014/main" id="{3FA23525-E3EA-B8CB-FD6A-53084CA847A7}"/>
+                <a16:creationId xmlns:a16="http://schemas.microsoft.com/office/drawing/2014/main" xmlns="" id="{3FA23525-E3EA-B8CB-FD6A-53084CA847A7}"/>
               </a:ext>
             </a:extLst>
           </p:cNvPr>
@@ -8681,7 +8695,7 @@
           <p:cNvPr id="6" name="Scroll: Vertical 5">
             <a:extLst>
               <a:ext uri="{FF2B5EF4-FFF2-40B4-BE49-F238E27FC236}">
-                <a16:creationId xmlns:a16="http://schemas.microsoft.com/office/drawing/2014/main" id="{1A4C732A-2840-82C8-A359-298D925E33B3}"/>
+                <a16:creationId xmlns:a16="http://schemas.microsoft.com/office/drawing/2014/main" xmlns="" id="{1A4C732A-2840-82C8-A359-298D925E33B3}"/>
               </a:ext>
             </a:extLst>
           </p:cNvPr>
@@ -8904,7 +8918,7 @@
     </p:spTree>
     <p:extLst>
       <p:ext uri="{BB962C8B-B14F-4D97-AF65-F5344CB8AC3E}">
-        <p14:creationId xmlns:p14="http://schemas.microsoft.com/office/powerpoint/2010/main" val="3002471670"/>
+        <p14:creationId xmlns:p14="http://schemas.microsoft.com/office/powerpoint/2010/main" xmlns="" val="3002471670"/>
       </p:ext>
     </p:extLst>
   </p:cSld>
@@ -8922,7 +8936,7 @@
         <p:cNvPr id="1" name="">
           <a:extLst>
             <a:ext uri="{FF2B5EF4-FFF2-40B4-BE49-F238E27FC236}">
-              <a16:creationId xmlns:a16="http://schemas.microsoft.com/office/drawing/2014/main" id="{4586E9D7-F5F8-14CC-9DF6-FC4AF2EA4249}"/>
+              <a16:creationId xmlns:a16="http://schemas.microsoft.com/office/drawing/2014/main" xmlns="" id="{4586E9D7-F5F8-14CC-9DF6-FC4AF2EA4249}"/>
             </a:ext>
           </a:extLst>
         </p:cNvPr>
@@ -8942,7 +8956,7 @@
           <p:cNvPr id="2" name="Title 1">
             <a:extLst>
               <a:ext uri="{FF2B5EF4-FFF2-40B4-BE49-F238E27FC236}">
-                <a16:creationId xmlns:a16="http://schemas.microsoft.com/office/drawing/2014/main" id="{D8B67155-694F-FF61-7CDD-33A20A316215}"/>
+                <a16:creationId xmlns:a16="http://schemas.microsoft.com/office/drawing/2014/main" xmlns="" id="{D8B67155-694F-FF61-7CDD-33A20A316215}"/>
               </a:ext>
             </a:extLst>
           </p:cNvPr>
@@ -8980,7 +8994,7 @@
           <p:cNvPr id="3" name="Content Placeholder 2">
             <a:extLst>
               <a:ext uri="{FF2B5EF4-FFF2-40B4-BE49-F238E27FC236}">
-                <a16:creationId xmlns:a16="http://schemas.microsoft.com/office/drawing/2014/main" id="{2A53D2DA-721D-FC7E-8E09-BCBD844B6F9F}"/>
+                <a16:creationId xmlns:a16="http://schemas.microsoft.com/office/drawing/2014/main" xmlns="" id="{2A53D2DA-721D-FC7E-8E09-BCBD844B6F9F}"/>
               </a:ext>
             </a:extLst>
           </p:cNvPr>
@@ -9177,7 +9191,7 @@
           <p:cNvPr id="5" name="Ribbon: Curved and Tilted Down 4">
             <a:extLst>
               <a:ext uri="{FF2B5EF4-FFF2-40B4-BE49-F238E27FC236}">
-                <a16:creationId xmlns:a16="http://schemas.microsoft.com/office/drawing/2014/main" id="{3FA23525-E3EA-B8CB-FD6A-53084CA847A7}"/>
+                <a16:creationId xmlns:a16="http://schemas.microsoft.com/office/drawing/2014/main" xmlns="" id="{3FA23525-E3EA-B8CB-FD6A-53084CA847A7}"/>
               </a:ext>
             </a:extLst>
           </p:cNvPr>
@@ -9250,7 +9264,7 @@
           <p:cNvPr id="6" name="Scroll: Vertical 5">
             <a:extLst>
               <a:ext uri="{FF2B5EF4-FFF2-40B4-BE49-F238E27FC236}">
-                <a16:creationId xmlns:a16="http://schemas.microsoft.com/office/drawing/2014/main" id="{1A4C732A-2840-82C8-A359-298D925E33B3}"/>
+                <a16:creationId xmlns:a16="http://schemas.microsoft.com/office/drawing/2014/main" xmlns="" id="{1A4C732A-2840-82C8-A359-298D925E33B3}"/>
               </a:ext>
             </a:extLst>
           </p:cNvPr>
@@ -9440,7 +9454,7 @@
     </p:spTree>
     <p:extLst>
       <p:ext uri="{BB962C8B-B14F-4D97-AF65-F5344CB8AC3E}">
-        <p14:creationId xmlns:p14="http://schemas.microsoft.com/office/powerpoint/2010/main" val="3002471670"/>
+        <p14:creationId xmlns:p14="http://schemas.microsoft.com/office/powerpoint/2010/main" xmlns="" val="3002471670"/>
       </p:ext>
     </p:extLst>
   </p:cSld>
@@ -9472,7 +9486,7 @@
           <p:cNvPr id="9" name="Explosion: 14 Points 8">
             <a:extLst>
               <a:ext uri="{FF2B5EF4-FFF2-40B4-BE49-F238E27FC236}">
-                <a16:creationId xmlns:a16="http://schemas.microsoft.com/office/drawing/2014/main" id="{0A2CD68B-7A56-F86D-8B6F-4A8BF99B4C9E}"/>
+                <a16:creationId xmlns:a16="http://schemas.microsoft.com/office/drawing/2014/main" xmlns="" id="{0A2CD68B-7A56-F86D-8B6F-4A8BF99B4C9E}"/>
               </a:ext>
             </a:extLst>
           </p:cNvPr>
@@ -9527,7 +9541,7 @@
           <p:cNvPr id="2" name="Title 1">
             <a:extLst>
               <a:ext uri="{FF2B5EF4-FFF2-40B4-BE49-F238E27FC236}">
-                <a16:creationId xmlns:a16="http://schemas.microsoft.com/office/drawing/2014/main" id="{62BB4F8D-44B7-9866-F7B2-6375CB902974}"/>
+                <a16:creationId xmlns:a16="http://schemas.microsoft.com/office/drawing/2014/main" xmlns="" id="{62BB4F8D-44B7-9866-F7B2-6375CB902974}"/>
               </a:ext>
             </a:extLst>
           </p:cNvPr>
@@ -9561,6 +9575,15 @@
               </a:rPr>
               <a:t>JavaScript</a:t>
             </a:r>
+            <a:r>
+              <a:rPr lang="en-US" sz="7200" b="1" dirty="0">
+                <a:solidFill>
+                  <a:schemeClr val="tx1"/>
+                </a:solidFill>
+                <a:latin typeface="Barlow Black" panose="00000A00000000000000" pitchFamily="2" charset="0"/>
+              </a:rPr>
+              <a:t/>
+            </a:r>
             <a:br>
               <a:rPr lang="en-US" sz="7200" b="1" dirty="0">
                 <a:solidFill>
@@ -9636,7 +9659,7 @@
           <p:cNvPr id="4" name="Ribbon: Curved and Tilted Down 3">
             <a:extLst>
               <a:ext uri="{FF2B5EF4-FFF2-40B4-BE49-F238E27FC236}">
-                <a16:creationId xmlns:a16="http://schemas.microsoft.com/office/drawing/2014/main" id="{909DBECF-689C-9AA7-1649-9166A578EDF9}"/>
+                <a16:creationId xmlns:a16="http://schemas.microsoft.com/office/drawing/2014/main" xmlns="" id="{909DBECF-689C-9AA7-1649-9166A578EDF9}"/>
               </a:ext>
             </a:extLst>
           </p:cNvPr>
@@ -9703,7 +9726,7 @@
           <p:cNvPr id="5" name="Scroll: Vertical 4">
             <a:extLst>
               <a:ext uri="{FF2B5EF4-FFF2-40B4-BE49-F238E27FC236}">
-                <a16:creationId xmlns:a16="http://schemas.microsoft.com/office/drawing/2014/main" id="{38EB993A-3F18-C6B7-226F-EDD62B4B31DB}"/>
+                <a16:creationId xmlns:a16="http://schemas.microsoft.com/office/drawing/2014/main" xmlns="" id="{38EB993A-3F18-C6B7-226F-EDD62B4B31DB}"/>
               </a:ext>
             </a:extLst>
           </p:cNvPr>
@@ -10115,7 +10138,7 @@
           <p:cNvPr id="3" name="TextBox 2">
             <a:extLst>
               <a:ext uri="{FF2B5EF4-FFF2-40B4-BE49-F238E27FC236}">
-                <a16:creationId xmlns:a16="http://schemas.microsoft.com/office/drawing/2014/main" id="{17C06F8A-D1E5-957B-796C-892968B95A50}"/>
+                <a16:creationId xmlns:a16="http://schemas.microsoft.com/office/drawing/2014/main" xmlns="" id="{17C06F8A-D1E5-957B-796C-892968B95A50}"/>
               </a:ext>
             </a:extLst>
           </p:cNvPr>
@@ -10168,7 +10191,7 @@
     </p:spTree>
     <p:extLst>
       <p:ext uri="{BB962C8B-B14F-4D97-AF65-F5344CB8AC3E}">
-        <p14:creationId xmlns:p14="http://schemas.microsoft.com/office/powerpoint/2010/main" val="3287175084"/>
+        <p14:creationId xmlns:p14="http://schemas.microsoft.com/office/powerpoint/2010/main" xmlns="" val="3287175084"/>
       </p:ext>
     </p:extLst>
   </p:cSld>
@@ -10200,7 +10223,7 @@
           <p:cNvPr id="9" name="Explosion: 14 Points 8">
             <a:extLst>
               <a:ext uri="{FF2B5EF4-FFF2-40B4-BE49-F238E27FC236}">
-                <a16:creationId xmlns:a16="http://schemas.microsoft.com/office/drawing/2014/main" id="{0A2CD68B-7A56-F86D-8B6F-4A8BF99B4C9E}"/>
+                <a16:creationId xmlns:a16="http://schemas.microsoft.com/office/drawing/2014/main" xmlns="" id="{0A2CD68B-7A56-F86D-8B6F-4A8BF99B4C9E}"/>
               </a:ext>
             </a:extLst>
           </p:cNvPr>
@@ -10255,7 +10278,7 @@
           <p:cNvPr id="2" name="Title 1">
             <a:extLst>
               <a:ext uri="{FF2B5EF4-FFF2-40B4-BE49-F238E27FC236}">
-                <a16:creationId xmlns:a16="http://schemas.microsoft.com/office/drawing/2014/main" id="{62BB4F8D-44B7-9866-F7B2-6375CB902974}"/>
+                <a16:creationId xmlns:a16="http://schemas.microsoft.com/office/drawing/2014/main" xmlns="" id="{62BB4F8D-44B7-9866-F7B2-6375CB902974}"/>
               </a:ext>
             </a:extLst>
           </p:cNvPr>
@@ -10289,6 +10312,15 @@
               </a:rPr>
               <a:t>JavaScript</a:t>
             </a:r>
+            <a:r>
+              <a:rPr lang="en-US" sz="7200" b="1" dirty="0">
+                <a:solidFill>
+                  <a:schemeClr val="tx1"/>
+                </a:solidFill>
+                <a:latin typeface="Barlow Black" panose="00000A00000000000000" pitchFamily="2" charset="0"/>
+              </a:rPr>
+              <a:t/>
+            </a:r>
             <a:br>
               <a:rPr lang="en-US" sz="7200" b="1" dirty="0">
                 <a:solidFill>
@@ -10367,7 +10399,7 @@
           <p:cNvPr id="4" name="Ribbon: Curved and Tilted Down 3">
             <a:extLst>
               <a:ext uri="{FF2B5EF4-FFF2-40B4-BE49-F238E27FC236}">
-                <a16:creationId xmlns:a16="http://schemas.microsoft.com/office/drawing/2014/main" id="{909DBECF-689C-9AA7-1649-9166A578EDF9}"/>
+                <a16:creationId xmlns:a16="http://schemas.microsoft.com/office/drawing/2014/main" xmlns="" id="{909DBECF-689C-9AA7-1649-9166A578EDF9}"/>
               </a:ext>
             </a:extLst>
           </p:cNvPr>
@@ -10434,7 +10466,7 @@
           <p:cNvPr id="5" name="Scroll: Vertical 4">
             <a:extLst>
               <a:ext uri="{FF2B5EF4-FFF2-40B4-BE49-F238E27FC236}">
-                <a16:creationId xmlns:a16="http://schemas.microsoft.com/office/drawing/2014/main" id="{38EB993A-3F18-C6B7-226F-EDD62B4B31DB}"/>
+                <a16:creationId xmlns:a16="http://schemas.microsoft.com/office/drawing/2014/main" xmlns="" id="{38EB993A-3F18-C6B7-226F-EDD62B4B31DB}"/>
               </a:ext>
             </a:extLst>
           </p:cNvPr>
@@ -10558,7 +10590,7 @@
           <p:cNvPr id="3" name="TextBox 2">
             <a:extLst>
               <a:ext uri="{FF2B5EF4-FFF2-40B4-BE49-F238E27FC236}">
-                <a16:creationId xmlns:a16="http://schemas.microsoft.com/office/drawing/2014/main" id="{3D319B42-23F8-5263-DE6F-22326C838292}"/>
+                <a16:creationId xmlns:a16="http://schemas.microsoft.com/office/drawing/2014/main" xmlns="" id="{3D319B42-23F8-5263-DE6F-22326C838292}"/>
               </a:ext>
             </a:extLst>
           </p:cNvPr>
@@ -10611,7 +10643,7 @@
     </p:spTree>
     <p:extLst>
       <p:ext uri="{BB962C8B-B14F-4D97-AF65-F5344CB8AC3E}">
-        <p14:creationId xmlns:p14="http://schemas.microsoft.com/office/powerpoint/2010/main" val="3287175084"/>
+        <p14:creationId xmlns:p14="http://schemas.microsoft.com/office/powerpoint/2010/main" xmlns="" val="3287175084"/>
       </p:ext>
     </p:extLst>
   </p:cSld>
@@ -10629,7 +10661,7 @@
         <p:cNvPr id="1" name="">
           <a:extLst>
             <a:ext uri="{FF2B5EF4-FFF2-40B4-BE49-F238E27FC236}">
-              <a16:creationId xmlns:a16="http://schemas.microsoft.com/office/drawing/2014/main" id="{C5637B91-7316-D738-42FD-B6F1CC38AB90}"/>
+              <a16:creationId xmlns:a16="http://schemas.microsoft.com/office/drawing/2014/main" xmlns="" id="{C5637B91-7316-D738-42FD-B6F1CC38AB90}"/>
             </a:ext>
           </a:extLst>
         </p:cNvPr>
@@ -10649,7 +10681,7 @@
           <p:cNvPr id="2" name="Title 1">
             <a:extLst>
               <a:ext uri="{FF2B5EF4-FFF2-40B4-BE49-F238E27FC236}">
-                <a16:creationId xmlns:a16="http://schemas.microsoft.com/office/drawing/2014/main" id="{0BB42E27-7C22-C4E2-3B23-3F7F20980B00}"/>
+                <a16:creationId xmlns:a16="http://schemas.microsoft.com/office/drawing/2014/main" xmlns="" id="{0BB42E27-7C22-C4E2-3B23-3F7F20980B00}"/>
               </a:ext>
             </a:extLst>
           </p:cNvPr>
@@ -10687,7 +10719,7 @@
           <p:cNvPr id="3" name="Content Placeholder 2">
             <a:extLst>
               <a:ext uri="{FF2B5EF4-FFF2-40B4-BE49-F238E27FC236}">
-                <a16:creationId xmlns:a16="http://schemas.microsoft.com/office/drawing/2014/main" id="{514ACDD6-0D2B-0B03-F18B-91318DCF7D9A}"/>
+                <a16:creationId xmlns:a16="http://schemas.microsoft.com/office/drawing/2014/main" xmlns="" id="{514ACDD6-0D2B-0B03-F18B-91318DCF7D9A}"/>
               </a:ext>
             </a:extLst>
           </p:cNvPr>
@@ -10721,9 +10753,17 @@
               </a:rPr>
               <a:t>Single line comment</a:t>
             </a:r>
+            <a:r>
+              <a:rPr lang="en-US" sz="2000" dirty="0"/>
+              <a:t/>
+            </a:r>
             <a:br>
               <a:rPr lang="en-US" sz="2000" dirty="0"/>
             </a:br>
+            <a:r>
+              <a:rPr lang="en-US" sz="2000" dirty="0"/>
+              <a:t/>
+            </a:r>
             <a:br>
               <a:rPr lang="en-US" sz="2000" dirty="0"/>
             </a:br>
@@ -10761,6 +10801,14 @@
                 </a:solidFill>
               </a:rPr>
             </a:br>
+            <a:r>
+              <a:rPr lang="en-US" sz="2000" dirty="0">
+                <a:solidFill>
+                  <a:schemeClr val="tx1"/>
+                </a:solidFill>
+              </a:rPr>
+              <a:t/>
+            </a:r>
             <a:br>
               <a:rPr lang="en-US" sz="2000" dirty="0">
                 <a:solidFill>
@@ -10786,6 +10834,10 @@
               </a:rPr>
               <a:t>Inline comment</a:t>
             </a:r>
+            <a:r>
+              <a:rPr lang="en-US" sz="2000" dirty="0"/>
+              <a:t/>
+            </a:r>
             <a:br>
               <a:rPr lang="en-US" sz="2000" dirty="0"/>
             </a:br>
@@ -10812,6 +10864,16 @@
                 </a:solidFill>
               </a:rPr>
             </a:br>
+            <a:r>
+              <a:rPr lang="en-US" sz="2000" dirty="0">
+                <a:solidFill>
+                  <a:schemeClr val="tx1">
+                    <a:lumMod val="50000"/>
+                  </a:schemeClr>
+                </a:solidFill>
+              </a:rPr>
+              <a:t/>
+            </a:r>
             <a:br>
               <a:rPr lang="en-US" sz="2000" dirty="0">
                 <a:solidFill>
@@ -10841,6 +10903,10 @@
               </a:rPr>
               <a:t>Multiline comment</a:t>
             </a:r>
+            <a:r>
+              <a:rPr lang="en-US" sz="2000" dirty="0"/>
+              <a:t/>
+            </a:r>
             <a:br>
               <a:rPr lang="en-US" sz="2000" dirty="0"/>
             </a:br>
@@ -10955,7 +11021,7 @@
           <p:cNvPr id="5" name="Ribbon: Curved and Tilted Down 4">
             <a:extLst>
               <a:ext uri="{FF2B5EF4-FFF2-40B4-BE49-F238E27FC236}">
-                <a16:creationId xmlns:a16="http://schemas.microsoft.com/office/drawing/2014/main" id="{D1D7DB93-DBF3-0DF0-3533-AC1786837990}"/>
+                <a16:creationId xmlns:a16="http://schemas.microsoft.com/office/drawing/2014/main" xmlns="" id="{D1D7DB93-DBF3-0DF0-3533-AC1786837990}"/>
               </a:ext>
             </a:extLst>
           </p:cNvPr>
@@ -11028,7 +11094,7 @@
           <p:cNvPr id="6" name="Scroll: Vertical 5">
             <a:extLst>
               <a:ext uri="{FF2B5EF4-FFF2-40B4-BE49-F238E27FC236}">
-                <a16:creationId xmlns:a16="http://schemas.microsoft.com/office/drawing/2014/main" id="{4B810CE8-F172-ABEF-9B5B-F6C6A3F4D513}"/>
+                <a16:creationId xmlns:a16="http://schemas.microsoft.com/office/drawing/2014/main" xmlns="" id="{4B810CE8-F172-ABEF-9B5B-F6C6A3F4D513}"/>
               </a:ext>
             </a:extLst>
           </p:cNvPr>
@@ -11154,7 +11220,7 @@
           <p:cNvPr id="7" name="TextBox 6">
             <a:extLst>
               <a:ext uri="{FF2B5EF4-FFF2-40B4-BE49-F238E27FC236}">
-                <a16:creationId xmlns:a16="http://schemas.microsoft.com/office/drawing/2014/main" id="{7C7A2712-C9B9-958D-594C-39F36B75B90A}"/>
+                <a16:creationId xmlns:a16="http://schemas.microsoft.com/office/drawing/2014/main" xmlns="" id="{7C7A2712-C9B9-958D-594C-39F36B75B90A}"/>
               </a:ext>
             </a:extLst>
           </p:cNvPr>
@@ -11204,7 +11270,7 @@
     </p:spTree>
     <p:extLst>
       <p:ext uri="{BB962C8B-B14F-4D97-AF65-F5344CB8AC3E}">
-        <p14:creationId xmlns:p14="http://schemas.microsoft.com/office/powerpoint/2010/main" val="693676810"/>
+        <p14:creationId xmlns:p14="http://schemas.microsoft.com/office/powerpoint/2010/main" xmlns="" val="693676810"/>
       </p:ext>
     </p:extLst>
   </p:cSld>
@@ -11236,7 +11302,7 @@
           <p:cNvPr id="9" name="Explosion: 14 Points 8">
             <a:extLst>
               <a:ext uri="{FF2B5EF4-FFF2-40B4-BE49-F238E27FC236}">
-                <a16:creationId xmlns:a16="http://schemas.microsoft.com/office/drawing/2014/main" id="{0A2CD68B-7A56-F86D-8B6F-4A8BF99B4C9E}"/>
+                <a16:creationId xmlns:a16="http://schemas.microsoft.com/office/drawing/2014/main" xmlns="" id="{0A2CD68B-7A56-F86D-8B6F-4A8BF99B4C9E}"/>
               </a:ext>
             </a:extLst>
           </p:cNvPr>
@@ -11291,7 +11357,7 @@
           <p:cNvPr id="2" name="Title 1">
             <a:extLst>
               <a:ext uri="{FF2B5EF4-FFF2-40B4-BE49-F238E27FC236}">
-                <a16:creationId xmlns:a16="http://schemas.microsoft.com/office/drawing/2014/main" id="{62BB4F8D-44B7-9866-F7B2-6375CB902974}"/>
+                <a16:creationId xmlns:a16="http://schemas.microsoft.com/office/drawing/2014/main" xmlns="" id="{62BB4F8D-44B7-9866-F7B2-6375CB902974}"/>
               </a:ext>
             </a:extLst>
           </p:cNvPr>
@@ -11325,6 +11391,15 @@
               </a:rPr>
               <a:t>JavaScript</a:t>
             </a:r>
+            <a:r>
+              <a:rPr lang="en-US" sz="7200" b="1" dirty="0">
+                <a:solidFill>
+                  <a:schemeClr val="tx1"/>
+                </a:solidFill>
+                <a:latin typeface="Barlow Black" panose="00000A00000000000000" pitchFamily="2" charset="0"/>
+              </a:rPr>
+              <a:t/>
+            </a:r>
             <a:br>
               <a:rPr lang="en-US" sz="7200" b="1" dirty="0">
                 <a:solidFill>
@@ -11356,7 +11431,7 @@
           <p:cNvPr id="4" name="Ribbon: Curved and Tilted Down 3">
             <a:extLst>
               <a:ext uri="{FF2B5EF4-FFF2-40B4-BE49-F238E27FC236}">
-                <a16:creationId xmlns:a16="http://schemas.microsoft.com/office/drawing/2014/main" id="{909DBECF-689C-9AA7-1649-9166A578EDF9}"/>
+                <a16:creationId xmlns:a16="http://schemas.microsoft.com/office/drawing/2014/main" xmlns="" id="{909DBECF-689C-9AA7-1649-9166A578EDF9}"/>
               </a:ext>
             </a:extLst>
           </p:cNvPr>
@@ -11423,7 +11498,7 @@
           <p:cNvPr id="5" name="Scroll: Vertical 4">
             <a:extLst>
               <a:ext uri="{FF2B5EF4-FFF2-40B4-BE49-F238E27FC236}">
-                <a16:creationId xmlns:a16="http://schemas.microsoft.com/office/drawing/2014/main" id="{38EB993A-3F18-C6B7-226F-EDD62B4B31DB}"/>
+                <a16:creationId xmlns:a16="http://schemas.microsoft.com/office/drawing/2014/main" xmlns="" id="{38EB993A-3F18-C6B7-226F-EDD62B4B31DB}"/>
               </a:ext>
             </a:extLst>
           </p:cNvPr>
@@ -11683,7 +11758,7 @@
           <p:cNvPr id="3" name="TextBox 2">
             <a:extLst>
               <a:ext uri="{FF2B5EF4-FFF2-40B4-BE49-F238E27FC236}">
-                <a16:creationId xmlns:a16="http://schemas.microsoft.com/office/drawing/2014/main" id="{3BE32085-0497-60C5-6142-8DF6C2C12813}"/>
+                <a16:creationId xmlns:a16="http://schemas.microsoft.com/office/drawing/2014/main" xmlns="" id="{3BE32085-0497-60C5-6142-8DF6C2C12813}"/>
               </a:ext>
             </a:extLst>
           </p:cNvPr>
@@ -11736,7 +11811,7 @@
     </p:spTree>
     <p:extLst>
       <p:ext uri="{BB962C8B-B14F-4D97-AF65-F5344CB8AC3E}">
-        <p14:creationId xmlns:p14="http://schemas.microsoft.com/office/powerpoint/2010/main" val="3287175084"/>
+        <p14:creationId xmlns:p14="http://schemas.microsoft.com/office/powerpoint/2010/main" xmlns="" val="3287175084"/>
       </p:ext>
     </p:extLst>
   </p:cSld>
@@ -11768,7 +11843,7 @@
           <p:cNvPr id="9" name="Explosion: 14 Points 8">
             <a:extLst>
               <a:ext uri="{FF2B5EF4-FFF2-40B4-BE49-F238E27FC236}">
-                <a16:creationId xmlns:a16="http://schemas.microsoft.com/office/drawing/2014/main" id="{0A2CD68B-7A56-F86D-8B6F-4A8BF99B4C9E}"/>
+                <a16:creationId xmlns:a16="http://schemas.microsoft.com/office/drawing/2014/main" xmlns="" id="{0A2CD68B-7A56-F86D-8B6F-4A8BF99B4C9E}"/>
               </a:ext>
             </a:extLst>
           </p:cNvPr>
@@ -11823,7 +11898,7 @@
           <p:cNvPr id="2" name="Title 1">
             <a:extLst>
               <a:ext uri="{FF2B5EF4-FFF2-40B4-BE49-F238E27FC236}">
-                <a16:creationId xmlns:a16="http://schemas.microsoft.com/office/drawing/2014/main" id="{62BB4F8D-44B7-9866-F7B2-6375CB902974}"/>
+                <a16:creationId xmlns:a16="http://schemas.microsoft.com/office/drawing/2014/main" xmlns="" id="{62BB4F8D-44B7-9866-F7B2-6375CB902974}"/>
               </a:ext>
             </a:extLst>
           </p:cNvPr>
@@ -11857,6 +11932,15 @@
               </a:rPr>
               <a:t>JavaScript</a:t>
             </a:r>
+            <a:r>
+              <a:rPr lang="en-US" sz="7200" b="1" dirty="0">
+                <a:solidFill>
+                  <a:schemeClr val="tx1"/>
+                </a:solidFill>
+                <a:latin typeface="Barlow Black" panose="00000A00000000000000" pitchFamily="2" charset="0"/>
+              </a:rPr>
+              <a:t/>
+            </a:r>
             <a:br>
               <a:rPr lang="en-US" sz="7200" b="1" dirty="0">
                 <a:solidFill>
@@ -11935,7 +12019,7 @@
           <p:cNvPr id="4" name="Ribbon: Curved and Tilted Down 3">
             <a:extLst>
               <a:ext uri="{FF2B5EF4-FFF2-40B4-BE49-F238E27FC236}">
-                <a16:creationId xmlns:a16="http://schemas.microsoft.com/office/drawing/2014/main" id="{909DBECF-689C-9AA7-1649-9166A578EDF9}"/>
+                <a16:creationId xmlns:a16="http://schemas.microsoft.com/office/drawing/2014/main" xmlns="" id="{909DBECF-689C-9AA7-1649-9166A578EDF9}"/>
               </a:ext>
             </a:extLst>
           </p:cNvPr>
@@ -12002,7 +12086,7 @@
           <p:cNvPr id="8" name="TextBox 7">
             <a:extLst>
               <a:ext uri="{FF2B5EF4-FFF2-40B4-BE49-F238E27FC236}">
-                <a16:creationId xmlns:a16="http://schemas.microsoft.com/office/drawing/2014/main" id="{6E6F1672-8C91-3FA6-CB80-58FD68172333}"/>
+                <a16:creationId xmlns:a16="http://schemas.microsoft.com/office/drawing/2014/main" xmlns="" id="{6E6F1672-8C91-3FA6-CB80-58FD68172333}"/>
               </a:ext>
             </a:extLst>
           </p:cNvPr>
@@ -12057,7 +12141,7 @@
           <p:cNvPr id="5" name="Scroll: Vertical 4">
             <a:extLst>
               <a:ext uri="{FF2B5EF4-FFF2-40B4-BE49-F238E27FC236}">
-                <a16:creationId xmlns:a16="http://schemas.microsoft.com/office/drawing/2014/main" id="{38EB993A-3F18-C6B7-226F-EDD62B4B31DB}"/>
+                <a16:creationId xmlns:a16="http://schemas.microsoft.com/office/drawing/2014/main" xmlns="" id="{38EB993A-3F18-C6B7-226F-EDD62B4B31DB}"/>
               </a:ext>
             </a:extLst>
           </p:cNvPr>
@@ -12237,7 +12321,7 @@
     </p:spTree>
     <p:extLst>
       <p:ext uri="{BB962C8B-B14F-4D97-AF65-F5344CB8AC3E}">
-        <p14:creationId xmlns:p14="http://schemas.microsoft.com/office/powerpoint/2010/main" val="3287175084"/>
+        <p14:creationId xmlns:p14="http://schemas.microsoft.com/office/powerpoint/2010/main" xmlns="" val="3287175084"/>
       </p:ext>
     </p:extLst>
   </p:cSld>
@@ -12255,7 +12339,7 @@
         <p:cNvPr id="1" name="">
           <a:extLst>
             <a:ext uri="{FF2B5EF4-FFF2-40B4-BE49-F238E27FC236}">
-              <a16:creationId xmlns:a16="http://schemas.microsoft.com/office/drawing/2014/main" id="{4586E9D7-F5F8-14CC-9DF6-FC4AF2EA4249}"/>
+              <a16:creationId xmlns:a16="http://schemas.microsoft.com/office/drawing/2014/main" xmlns="" id="{4586E9D7-F5F8-14CC-9DF6-FC4AF2EA4249}"/>
             </a:ext>
           </a:extLst>
         </p:cNvPr>
@@ -12275,7 +12359,7 @@
           <p:cNvPr id="2" name="Title 1">
             <a:extLst>
               <a:ext uri="{FF2B5EF4-FFF2-40B4-BE49-F238E27FC236}">
-                <a16:creationId xmlns:a16="http://schemas.microsoft.com/office/drawing/2014/main" id="{D8B67155-694F-FF61-7CDD-33A20A316215}"/>
+                <a16:creationId xmlns:a16="http://schemas.microsoft.com/office/drawing/2014/main" xmlns="" id="{D8B67155-694F-FF61-7CDD-33A20A316215}"/>
               </a:ext>
             </a:extLst>
           </p:cNvPr>
@@ -12331,7 +12415,7 @@
           <p:cNvPr id="3" name="Content Placeholder 2">
             <a:extLst>
               <a:ext uri="{FF2B5EF4-FFF2-40B4-BE49-F238E27FC236}">
-                <a16:creationId xmlns:a16="http://schemas.microsoft.com/office/drawing/2014/main" id="{2A53D2DA-721D-FC7E-8E09-BCBD844B6F9F}"/>
+                <a16:creationId xmlns:a16="http://schemas.microsoft.com/office/drawing/2014/main" xmlns="" id="{2A53D2DA-721D-FC7E-8E09-BCBD844B6F9F}"/>
               </a:ext>
             </a:extLst>
           </p:cNvPr>
@@ -12377,8 +12461,13 @@
             </a:r>
             <a:r>
               <a:rPr lang="en-US" sz="1600" dirty="0"/>
-              <a:t> 2015</a:t>
-            </a:r>
+              <a:t> </a:t>
+            </a:r>
+            <a:r>
+              <a:rPr lang="en-US" sz="1600" dirty="0" smtClean="0"/>
+              <a:t>2015)</a:t>
+            </a:r>
+            <a:endParaRPr lang="en-US" sz="1600" dirty="0"/>
           </a:p>
           <a:p>
             <a:endParaRPr lang="en-US" sz="1600" dirty="0"/>
@@ -12390,7 +12479,7 @@
           <p:cNvPr id="5" name="Ribbon: Curved and Tilted Down 4">
             <a:extLst>
               <a:ext uri="{FF2B5EF4-FFF2-40B4-BE49-F238E27FC236}">
-                <a16:creationId xmlns:a16="http://schemas.microsoft.com/office/drawing/2014/main" id="{3FA23525-E3EA-B8CB-FD6A-53084CA847A7}"/>
+                <a16:creationId xmlns:a16="http://schemas.microsoft.com/office/drawing/2014/main" xmlns="" id="{3FA23525-E3EA-B8CB-FD6A-53084CA847A7}"/>
               </a:ext>
             </a:extLst>
           </p:cNvPr>
@@ -12463,7 +12552,7 @@
           <p:cNvPr id="6" name="Scroll: Vertical 5">
             <a:extLst>
               <a:ext uri="{FF2B5EF4-FFF2-40B4-BE49-F238E27FC236}">
-                <a16:creationId xmlns:a16="http://schemas.microsoft.com/office/drawing/2014/main" id="{1A4C732A-2840-82C8-A359-298D925E33B3}"/>
+                <a16:creationId xmlns:a16="http://schemas.microsoft.com/office/drawing/2014/main" xmlns="" id="{1A4C732A-2840-82C8-A359-298D925E33B3}"/>
               </a:ext>
             </a:extLst>
           </p:cNvPr>
@@ -12704,7 +12793,7 @@
     </p:spTree>
     <p:extLst>
       <p:ext uri="{BB962C8B-B14F-4D97-AF65-F5344CB8AC3E}">
-        <p14:creationId xmlns:p14="http://schemas.microsoft.com/office/powerpoint/2010/main" val="3002471670"/>
+        <p14:creationId xmlns:p14="http://schemas.microsoft.com/office/powerpoint/2010/main" xmlns="" val="3002471670"/>
       </p:ext>
     </p:extLst>
   </p:cSld>
@@ -12722,7 +12811,7 @@
         <p:cNvPr id="1" name="">
           <a:extLst>
             <a:ext uri="{FF2B5EF4-FFF2-40B4-BE49-F238E27FC236}">
-              <a16:creationId xmlns:a16="http://schemas.microsoft.com/office/drawing/2014/main" id="{4586E9D7-F5F8-14CC-9DF6-FC4AF2EA4249}"/>
+              <a16:creationId xmlns:a16="http://schemas.microsoft.com/office/drawing/2014/main" xmlns="" id="{4586E9D7-F5F8-14CC-9DF6-FC4AF2EA4249}"/>
             </a:ext>
           </a:extLst>
         </p:cNvPr>
@@ -12742,7 +12831,7 @@
           <p:cNvPr id="2" name="Title 1">
             <a:extLst>
               <a:ext uri="{FF2B5EF4-FFF2-40B4-BE49-F238E27FC236}">
-                <a16:creationId xmlns:a16="http://schemas.microsoft.com/office/drawing/2014/main" id="{D8B67155-694F-FF61-7CDD-33A20A316215}"/>
+                <a16:creationId xmlns:a16="http://schemas.microsoft.com/office/drawing/2014/main" xmlns="" id="{D8B67155-694F-FF61-7CDD-33A20A316215}"/>
               </a:ext>
             </a:extLst>
           </p:cNvPr>
@@ -12789,7 +12878,7 @@
           <p:cNvPr id="3" name="Content Placeholder 2">
             <a:extLst>
               <a:ext uri="{FF2B5EF4-FFF2-40B4-BE49-F238E27FC236}">
-                <a16:creationId xmlns:a16="http://schemas.microsoft.com/office/drawing/2014/main" id="{2A53D2DA-721D-FC7E-8E09-BCBD844B6F9F}"/>
+                <a16:creationId xmlns:a16="http://schemas.microsoft.com/office/drawing/2014/main" xmlns="" id="{2A53D2DA-721D-FC7E-8E09-BCBD844B6F9F}"/>
               </a:ext>
             </a:extLst>
           </p:cNvPr>
@@ -12850,12 +12939,24 @@
             <a:br>
               <a:rPr lang="en-US" sz="1600" dirty="0"/>
             </a:br>
+            <a:r>
+              <a:rPr lang="en-US" sz="1600" dirty="0"/>
+              <a:t/>
+            </a:r>
             <a:br>
               <a:rPr lang="en-US" sz="1600" dirty="0"/>
             </a:br>
+            <a:r>
+              <a:rPr lang="en-US" sz="1600" dirty="0"/>
+              <a:t/>
+            </a:r>
             <a:br>
               <a:rPr lang="en-US" sz="1600" dirty="0"/>
             </a:br>
+            <a:r>
+              <a:rPr lang="en-US" sz="1600" dirty="0"/>
+              <a:t/>
+            </a:r>
             <a:br>
               <a:rPr lang="en-US" sz="1600" dirty="0"/>
             </a:br>
@@ -12886,7 +12987,7 @@
           <p:cNvPr id="5" name="Ribbon: Curved and Tilted Down 4">
             <a:extLst>
               <a:ext uri="{FF2B5EF4-FFF2-40B4-BE49-F238E27FC236}">
-                <a16:creationId xmlns:a16="http://schemas.microsoft.com/office/drawing/2014/main" id="{3FA23525-E3EA-B8CB-FD6A-53084CA847A7}"/>
+                <a16:creationId xmlns:a16="http://schemas.microsoft.com/office/drawing/2014/main" xmlns="" id="{3FA23525-E3EA-B8CB-FD6A-53084CA847A7}"/>
               </a:ext>
             </a:extLst>
           </p:cNvPr>
@@ -12959,7 +13060,7 @@
           <p:cNvPr id="6" name="Scroll: Vertical 5">
             <a:extLst>
               <a:ext uri="{FF2B5EF4-FFF2-40B4-BE49-F238E27FC236}">
-                <a16:creationId xmlns:a16="http://schemas.microsoft.com/office/drawing/2014/main" id="{1A4C732A-2840-82C8-A359-298D925E33B3}"/>
+                <a16:creationId xmlns:a16="http://schemas.microsoft.com/office/drawing/2014/main" xmlns="" id="{1A4C732A-2840-82C8-A359-298D925E33B3}"/>
               </a:ext>
             </a:extLst>
           </p:cNvPr>
@@ -13173,7 +13274,7 @@
     </p:spTree>
     <p:extLst>
       <p:ext uri="{BB962C8B-B14F-4D97-AF65-F5344CB8AC3E}">
-        <p14:creationId xmlns:p14="http://schemas.microsoft.com/office/powerpoint/2010/main" val="3002471670"/>
+        <p14:creationId xmlns:p14="http://schemas.microsoft.com/office/powerpoint/2010/main" xmlns="" val="3002471670"/>
       </p:ext>
     </p:extLst>
   </p:cSld>
@@ -13191,7 +13292,7 @@
         <p:cNvPr id="1" name="">
           <a:extLst>
             <a:ext uri="{FF2B5EF4-FFF2-40B4-BE49-F238E27FC236}">
-              <a16:creationId xmlns:a16="http://schemas.microsoft.com/office/drawing/2014/main" id="{4586E9D7-F5F8-14CC-9DF6-FC4AF2EA4249}"/>
+              <a16:creationId xmlns:a16="http://schemas.microsoft.com/office/drawing/2014/main" xmlns="" id="{4586E9D7-F5F8-14CC-9DF6-FC4AF2EA4249}"/>
             </a:ext>
           </a:extLst>
         </p:cNvPr>
@@ -13211,7 +13312,7 @@
           <p:cNvPr id="2" name="Title 1">
             <a:extLst>
               <a:ext uri="{FF2B5EF4-FFF2-40B4-BE49-F238E27FC236}">
-                <a16:creationId xmlns:a16="http://schemas.microsoft.com/office/drawing/2014/main" id="{D8B67155-694F-FF61-7CDD-33A20A316215}"/>
+                <a16:creationId xmlns:a16="http://schemas.microsoft.com/office/drawing/2014/main" xmlns="" id="{D8B67155-694F-FF61-7CDD-33A20A316215}"/>
               </a:ext>
             </a:extLst>
           </p:cNvPr>
@@ -13287,7 +13388,7 @@
           <p:cNvPr id="5" name="Ribbon: Curved and Tilted Down 4">
             <a:extLst>
               <a:ext uri="{FF2B5EF4-FFF2-40B4-BE49-F238E27FC236}">
-                <a16:creationId xmlns:a16="http://schemas.microsoft.com/office/drawing/2014/main" id="{3FA23525-E3EA-B8CB-FD6A-53084CA847A7}"/>
+                <a16:creationId xmlns:a16="http://schemas.microsoft.com/office/drawing/2014/main" xmlns="" id="{3FA23525-E3EA-B8CB-FD6A-53084CA847A7}"/>
               </a:ext>
             </a:extLst>
           </p:cNvPr>
@@ -13360,7 +13461,7 @@
           <p:cNvPr id="6" name="Scroll: Vertical 5">
             <a:extLst>
               <a:ext uri="{FF2B5EF4-FFF2-40B4-BE49-F238E27FC236}">
-                <a16:creationId xmlns:a16="http://schemas.microsoft.com/office/drawing/2014/main" id="{1A4C732A-2840-82C8-A359-298D925E33B3}"/>
+                <a16:creationId xmlns:a16="http://schemas.microsoft.com/office/drawing/2014/main" xmlns="" id="{1A4C732A-2840-82C8-A359-298D925E33B3}"/>
               </a:ext>
             </a:extLst>
           </p:cNvPr>
@@ -13510,7 +13611,7 @@
           <p:cNvPr id="9" name="Content Placeholder 2">
             <a:extLst>
               <a:ext uri="{FF2B5EF4-FFF2-40B4-BE49-F238E27FC236}">
-                <a16:creationId xmlns:a16="http://schemas.microsoft.com/office/drawing/2014/main" id="{2A53D2DA-721D-FC7E-8E09-BCBD844B6F9F}"/>
+                <a16:creationId xmlns:a16="http://schemas.microsoft.com/office/drawing/2014/main" xmlns="" id="{2A53D2DA-721D-FC7E-8E09-BCBD844B6F9F}"/>
               </a:ext>
             </a:extLst>
           </p:cNvPr>
@@ -13641,7 +13742,7 @@
           <p:cNvPr id="11" name="Content Placeholder 2">
             <a:extLst>
               <a:ext uri="{FF2B5EF4-FFF2-40B4-BE49-F238E27FC236}">
-                <a16:creationId xmlns:a16="http://schemas.microsoft.com/office/drawing/2014/main" id="{2A53D2DA-721D-FC7E-8E09-BCBD844B6F9F}"/>
+                <a16:creationId xmlns:a16="http://schemas.microsoft.com/office/drawing/2014/main" xmlns="" id="{2A53D2DA-721D-FC7E-8E09-BCBD844B6F9F}"/>
               </a:ext>
             </a:extLst>
           </p:cNvPr>
@@ -13846,7 +13947,7 @@
     </p:spTree>
     <p:extLst>
       <p:ext uri="{BB962C8B-B14F-4D97-AF65-F5344CB8AC3E}">
-        <p14:creationId xmlns:p14="http://schemas.microsoft.com/office/powerpoint/2010/main" val="3002471670"/>
+        <p14:creationId xmlns:p14="http://schemas.microsoft.com/office/powerpoint/2010/main" xmlns="" val="3002471670"/>
       </p:ext>
     </p:extLst>
   </p:cSld>
@@ -13864,7 +13965,7 @@
         <p:cNvPr id="1" name="">
           <a:extLst>
             <a:ext uri="{FF2B5EF4-FFF2-40B4-BE49-F238E27FC236}">
-              <a16:creationId xmlns:a16="http://schemas.microsoft.com/office/drawing/2014/main" id="{4586E9D7-F5F8-14CC-9DF6-FC4AF2EA4249}"/>
+              <a16:creationId xmlns:a16="http://schemas.microsoft.com/office/drawing/2014/main" xmlns="" id="{4586E9D7-F5F8-14CC-9DF6-FC4AF2EA4249}"/>
             </a:ext>
           </a:extLst>
         </p:cNvPr>
@@ -13884,7 +13985,7 @@
           <p:cNvPr id="2" name="Title 1">
             <a:extLst>
               <a:ext uri="{FF2B5EF4-FFF2-40B4-BE49-F238E27FC236}">
-                <a16:creationId xmlns:a16="http://schemas.microsoft.com/office/drawing/2014/main" id="{D8B67155-694F-FF61-7CDD-33A20A316215}"/>
+                <a16:creationId xmlns:a16="http://schemas.microsoft.com/office/drawing/2014/main" xmlns="" id="{D8B67155-694F-FF61-7CDD-33A20A316215}"/>
               </a:ext>
             </a:extLst>
           </p:cNvPr>
@@ -13924,7 +14025,7 @@
           <p:cNvPr id="5" name="Ribbon: Curved and Tilted Down 4">
             <a:extLst>
               <a:ext uri="{FF2B5EF4-FFF2-40B4-BE49-F238E27FC236}">
-                <a16:creationId xmlns:a16="http://schemas.microsoft.com/office/drawing/2014/main" id="{3FA23525-E3EA-B8CB-FD6A-53084CA847A7}"/>
+                <a16:creationId xmlns:a16="http://schemas.microsoft.com/office/drawing/2014/main" xmlns="" id="{3FA23525-E3EA-B8CB-FD6A-53084CA847A7}"/>
               </a:ext>
             </a:extLst>
           </p:cNvPr>
@@ -13997,7 +14098,7 @@
           <p:cNvPr id="6" name="Scroll: Vertical 5">
             <a:extLst>
               <a:ext uri="{FF2B5EF4-FFF2-40B4-BE49-F238E27FC236}">
-                <a16:creationId xmlns:a16="http://schemas.microsoft.com/office/drawing/2014/main" id="{1A4C732A-2840-82C8-A359-298D925E33B3}"/>
+                <a16:creationId xmlns:a16="http://schemas.microsoft.com/office/drawing/2014/main" xmlns="" id="{1A4C732A-2840-82C8-A359-298D925E33B3}"/>
               </a:ext>
             </a:extLst>
           </p:cNvPr>
@@ -14147,7 +14248,7 @@
           <p:cNvPr id="9" name="Content Placeholder 2">
             <a:extLst>
               <a:ext uri="{FF2B5EF4-FFF2-40B4-BE49-F238E27FC236}">
-                <a16:creationId xmlns:a16="http://schemas.microsoft.com/office/drawing/2014/main" id="{2A53D2DA-721D-FC7E-8E09-BCBD844B6F9F}"/>
+                <a16:creationId xmlns:a16="http://schemas.microsoft.com/office/drawing/2014/main" xmlns="" id="{2A53D2DA-721D-FC7E-8E09-BCBD844B6F9F}"/>
               </a:ext>
             </a:extLst>
           </p:cNvPr>
@@ -14278,7 +14379,7 @@
           <p:cNvPr id="11" name="Content Placeholder 2">
             <a:extLst>
               <a:ext uri="{FF2B5EF4-FFF2-40B4-BE49-F238E27FC236}">
-                <a16:creationId xmlns:a16="http://schemas.microsoft.com/office/drawing/2014/main" id="{2A53D2DA-721D-FC7E-8E09-BCBD844B6F9F}"/>
+                <a16:creationId xmlns:a16="http://schemas.microsoft.com/office/drawing/2014/main" xmlns="" id="{2A53D2DA-721D-FC7E-8E09-BCBD844B6F9F}"/>
               </a:ext>
             </a:extLst>
           </p:cNvPr>
@@ -14552,7 +14653,7 @@
     </p:spTree>
     <p:extLst>
       <p:ext uri="{BB962C8B-B14F-4D97-AF65-F5344CB8AC3E}">
-        <p14:creationId xmlns:p14="http://schemas.microsoft.com/office/powerpoint/2010/main" val="3002471670"/>
+        <p14:creationId xmlns:p14="http://schemas.microsoft.com/office/powerpoint/2010/main" xmlns="" val="3002471670"/>
       </p:ext>
     </p:extLst>
   </p:cSld>
@@ -14570,7 +14671,7 @@
         <p:cNvPr id="1" name="">
           <a:extLst>
             <a:ext uri="{FF2B5EF4-FFF2-40B4-BE49-F238E27FC236}">
-              <a16:creationId xmlns:a16="http://schemas.microsoft.com/office/drawing/2014/main" id="{4586E9D7-F5F8-14CC-9DF6-FC4AF2EA4249}"/>
+              <a16:creationId xmlns:a16="http://schemas.microsoft.com/office/drawing/2014/main" xmlns="" id="{4586E9D7-F5F8-14CC-9DF6-FC4AF2EA4249}"/>
             </a:ext>
           </a:extLst>
         </p:cNvPr>
@@ -14590,7 +14691,7 @@
           <p:cNvPr id="2" name="Title 1">
             <a:extLst>
               <a:ext uri="{FF2B5EF4-FFF2-40B4-BE49-F238E27FC236}">
-                <a16:creationId xmlns:a16="http://schemas.microsoft.com/office/drawing/2014/main" id="{D8B67155-694F-FF61-7CDD-33A20A316215}"/>
+                <a16:creationId xmlns:a16="http://schemas.microsoft.com/office/drawing/2014/main" xmlns="" id="{D8B67155-694F-FF61-7CDD-33A20A316215}"/>
               </a:ext>
             </a:extLst>
           </p:cNvPr>
@@ -14735,7 +14836,7 @@
           <p:cNvPr id="5" name="Ribbon: Curved and Tilted Down 4">
             <a:extLst>
               <a:ext uri="{FF2B5EF4-FFF2-40B4-BE49-F238E27FC236}">
-                <a16:creationId xmlns:a16="http://schemas.microsoft.com/office/drawing/2014/main" id="{3FA23525-E3EA-B8CB-FD6A-53084CA847A7}"/>
+                <a16:creationId xmlns:a16="http://schemas.microsoft.com/office/drawing/2014/main" xmlns="" id="{3FA23525-E3EA-B8CB-FD6A-53084CA847A7}"/>
               </a:ext>
             </a:extLst>
           </p:cNvPr>
@@ -14808,7 +14909,7 @@
           <p:cNvPr id="6" name="Scroll: Vertical 5">
             <a:extLst>
               <a:ext uri="{FF2B5EF4-FFF2-40B4-BE49-F238E27FC236}">
-                <a16:creationId xmlns:a16="http://schemas.microsoft.com/office/drawing/2014/main" id="{1A4C732A-2840-82C8-A359-298D925E33B3}"/>
+                <a16:creationId xmlns:a16="http://schemas.microsoft.com/office/drawing/2014/main" xmlns="" id="{1A4C732A-2840-82C8-A359-298D925E33B3}"/>
               </a:ext>
             </a:extLst>
           </p:cNvPr>
@@ -14956,7 +15057,1578 @@
     </p:spTree>
     <p:extLst>
       <p:ext uri="{BB962C8B-B14F-4D97-AF65-F5344CB8AC3E}">
-        <p14:creationId xmlns:p14="http://schemas.microsoft.com/office/powerpoint/2010/main" val="3002471670"/>
+        <p14:creationId xmlns:p14="http://schemas.microsoft.com/office/powerpoint/2010/main" xmlns="" val="3002471670"/>
+      </p:ext>
+    </p:extLst>
+  </p:cSld>
+  <p:clrMapOvr>
+    <a:masterClrMapping/>
+  </p:clrMapOvr>
+</p:sld>
+</file>
+
+<file path=ppt/slides/slide26.xml><?xml version="1.0" encoding="utf-8"?>
+<p:sld xmlns:a="http://schemas.openxmlformats.org/drawingml/2006/main" xmlns:r="http://schemas.openxmlformats.org/officeDocument/2006/relationships" xmlns:p="http://schemas.openxmlformats.org/presentationml/2006/main">
+  <p:cSld>
+    <p:spTree>
+      <p:nvGrpSpPr>
+        <p:cNvPr id="1" name=""/>
+        <p:cNvGrpSpPr/>
+        <p:nvPr/>
+      </p:nvGrpSpPr>
+      <p:grpSpPr>
+        <a:xfrm>
+          <a:off x="0" y="0"/>
+          <a:ext cx="0" cy="0"/>
+          <a:chOff x="0" y="0"/>
+          <a:chExt cx="0" cy="0"/>
+        </a:xfrm>
+      </p:grpSpPr>
+      <p:sp>
+        <p:nvSpPr>
+          <p:cNvPr id="9" name="Explosion: 14 Points 8">
+            <a:extLst>
+              <a:ext uri="{FF2B5EF4-FFF2-40B4-BE49-F238E27FC236}">
+                <a16:creationId xmlns:a16="http://schemas.microsoft.com/office/drawing/2014/main" xmlns="" id="{0A2CD68B-7A56-F86D-8B6F-4A8BF99B4C9E}"/>
+              </a:ext>
+            </a:extLst>
+          </p:cNvPr>
+          <p:cNvSpPr/>
+          <p:nvPr/>
+        </p:nvSpPr>
+        <p:spPr>
+          <a:xfrm>
+            <a:off x="1440796" y="2058655"/>
+            <a:ext cx="3985591" cy="3985591"/>
+          </a:xfrm>
+          <a:prstGeom prst="irregularSeal2">
+            <a:avLst/>
+          </a:prstGeom>
+          <a:solidFill>
+            <a:schemeClr val="bg1">
+              <a:lumMod val="75000"/>
+              <a:lumOff val="25000"/>
+            </a:schemeClr>
+          </a:solidFill>
+          <a:ln>
+            <a:noFill/>
+          </a:ln>
+        </p:spPr>
+        <p:style>
+          <a:lnRef idx="2">
+            <a:schemeClr val="accent1">
+              <a:shade val="15000"/>
+            </a:schemeClr>
+          </a:lnRef>
+          <a:fillRef idx="1">
+            <a:schemeClr val="accent1"/>
+          </a:fillRef>
+          <a:effectRef idx="0">
+            <a:schemeClr val="accent1"/>
+          </a:effectRef>
+          <a:fontRef idx="minor">
+            <a:schemeClr val="lt1"/>
+          </a:fontRef>
+        </p:style>
+        <p:txBody>
+          <a:bodyPr rtlCol="0" anchor="ctr"/>
+          <a:lstStyle/>
+          <a:p>
+            <a:pPr algn="ctr"/>
+            <a:endParaRPr lang="en-IN"/>
+          </a:p>
+        </p:txBody>
+      </p:sp>
+      <p:sp>
+        <p:nvSpPr>
+          <p:cNvPr id="2" name="Title 1">
+            <a:extLst>
+              <a:ext uri="{FF2B5EF4-FFF2-40B4-BE49-F238E27FC236}">
+                <a16:creationId xmlns:a16="http://schemas.microsoft.com/office/drawing/2014/main" xmlns="" id="{62BB4F8D-44B7-9866-F7B2-6375CB902974}"/>
+              </a:ext>
+            </a:extLst>
+          </p:cNvPr>
+          <p:cNvSpPr>
+            <a:spLocks noGrp="1"/>
+          </p:cNvSpPr>
+          <p:nvPr>
+            <p:ph type="title"/>
+          </p:nvPr>
+        </p:nvSpPr>
+        <p:spPr>
+          <a:xfrm>
+            <a:off x="0" y="1913287"/>
+            <a:ext cx="6271589" cy="3810095"/>
+          </a:xfrm>
+          <a:noFill/>
+        </p:spPr>
+        <p:txBody>
+          <a:bodyPr anchor="ctr">
+            <a:normAutofit/>
+          </a:bodyPr>
+          <a:lstStyle/>
+          <a:p>
+            <a:pPr algn="ctr"/>
+            <a:r>
+              <a:rPr lang="en-US" sz="7200" b="1" dirty="0">
+                <a:solidFill>
+                  <a:schemeClr val="tx1"/>
+                </a:solidFill>
+                <a:latin typeface="Barlow Condensed ExtraLight" panose="00000306000000000000" pitchFamily="2" charset="0"/>
+              </a:rPr>
+              <a:t>JavaScript</a:t>
+            </a:r>
+            <a:r>
+              <a:rPr lang="en-US" sz="7200" b="1" dirty="0">
+                <a:solidFill>
+                  <a:schemeClr val="tx1"/>
+                </a:solidFill>
+                <a:latin typeface="Barlow Black" panose="00000A00000000000000" pitchFamily="2" charset="0"/>
+              </a:rPr>
+              <a:t/>
+            </a:r>
+            <a:br>
+              <a:rPr lang="en-US" sz="7200" b="1" dirty="0">
+                <a:solidFill>
+                  <a:schemeClr val="tx1"/>
+                </a:solidFill>
+                <a:latin typeface="Barlow Black" panose="00000A00000000000000" pitchFamily="2" charset="0"/>
+              </a:rPr>
+            </a:br>
+            <a:r>
+              <a:rPr lang="en-US" sz="7200" b="1" dirty="0">
+                <a:solidFill>
+                  <a:schemeClr val="tx1"/>
+                </a:solidFill>
+                <a:latin typeface="Barlow Black" panose="00000A00000000000000" pitchFamily="2" charset="0"/>
+              </a:rPr>
+              <a:t>Chapter – </a:t>
+            </a:r>
+            <a:r>
+              <a:rPr lang="en-US" sz="7200" b="1" dirty="0" smtClean="0">
+                <a:solidFill>
+                  <a:schemeClr val="tx1"/>
+                </a:solidFill>
+                <a:latin typeface="Barlow Black" panose="00000A00000000000000" pitchFamily="2" charset="0"/>
+              </a:rPr>
+              <a:t>6</a:t>
+            </a:r>
+            <a:r>
+              <a:rPr lang="en-US" sz="7200" b="1" dirty="0">
+                <a:solidFill>
+                  <a:schemeClr val="tx1"/>
+                </a:solidFill>
+                <a:latin typeface="Barlow Black" panose="00000A00000000000000" pitchFamily="2" charset="0"/>
+              </a:rPr>
+              <a:t/>
+            </a:r>
+            <a:br>
+              <a:rPr lang="en-US" sz="7200" b="1" dirty="0">
+                <a:solidFill>
+                  <a:schemeClr val="tx1"/>
+                </a:solidFill>
+                <a:latin typeface="Barlow Black" panose="00000A00000000000000" pitchFamily="2" charset="0"/>
+              </a:rPr>
+            </a:br>
+            <a:r>
+              <a:rPr lang="en-US" sz="2800" dirty="0" smtClean="0">
+                <a:solidFill>
+                  <a:schemeClr val="accent2">
+                    <a:lumMod val="60000"/>
+                    <a:lumOff val="40000"/>
+                  </a:schemeClr>
+                </a:solidFill>
+                <a:latin typeface="Bahnschrift Light Condensed" pitchFamily="34" charset="0"/>
+              </a:rPr>
+              <a:t>(</a:t>
+            </a:r>
+            <a:r>
+              <a:rPr lang="en-US" dirty="0" smtClean="0">
+                <a:solidFill>
+                  <a:schemeClr val="accent2">
+                    <a:lumMod val="60000"/>
+                    <a:lumOff val="40000"/>
+                  </a:schemeClr>
+                </a:solidFill>
+                <a:latin typeface="Bahnschrift Light Condensed" pitchFamily="34" charset="0"/>
+              </a:rPr>
+              <a:t>data types</a:t>
+            </a:r>
+            <a:r>
+              <a:rPr lang="en-US" sz="2800" dirty="0" smtClean="0">
+                <a:solidFill>
+                  <a:schemeClr val="accent2">
+                    <a:lumMod val="60000"/>
+                    <a:lumOff val="40000"/>
+                  </a:schemeClr>
+                </a:solidFill>
+                <a:latin typeface="Bahnschrift Light Condensed" pitchFamily="34" charset="0"/>
+              </a:rPr>
+              <a:t>)</a:t>
+            </a:r>
+            <a:endParaRPr lang="en-IN" sz="2800" dirty="0">
+              <a:solidFill>
+                <a:schemeClr val="accent2">
+                  <a:lumMod val="60000"/>
+                  <a:lumOff val="40000"/>
+                </a:schemeClr>
+              </a:solidFill>
+              <a:latin typeface="Bahnschrift Light Condensed" pitchFamily="34" charset="0"/>
+            </a:endParaRPr>
+          </a:p>
+        </p:txBody>
+      </p:sp>
+      <p:sp>
+        <p:nvSpPr>
+          <p:cNvPr id="4" name="Ribbon: Curved and Tilted Down 3">
+            <a:extLst>
+              <a:ext uri="{FF2B5EF4-FFF2-40B4-BE49-F238E27FC236}">
+                <a16:creationId xmlns:a16="http://schemas.microsoft.com/office/drawing/2014/main" xmlns="" id="{909DBECF-689C-9AA7-1649-9166A578EDF9}"/>
+              </a:ext>
+            </a:extLst>
+          </p:cNvPr>
+          <p:cNvSpPr/>
+          <p:nvPr/>
+        </p:nvSpPr>
+        <p:spPr>
+          <a:xfrm>
+            <a:off x="1124594" y="1134618"/>
+            <a:ext cx="4823349" cy="778670"/>
+          </a:xfrm>
+          <a:prstGeom prst="ellipseRibbon">
+            <a:avLst/>
+          </a:prstGeom>
+          <a:solidFill>
+            <a:schemeClr val="bg1">
+              <a:lumMod val="65000"/>
+              <a:lumOff val="35000"/>
+            </a:schemeClr>
+          </a:solidFill>
+          <a:ln>
+            <a:noFill/>
+          </a:ln>
+        </p:spPr>
+        <p:style>
+          <a:lnRef idx="2">
+            <a:schemeClr val="accent1">
+              <a:shade val="15000"/>
+            </a:schemeClr>
+          </a:lnRef>
+          <a:fillRef idx="1">
+            <a:schemeClr val="accent1"/>
+          </a:fillRef>
+          <a:effectRef idx="0">
+            <a:schemeClr val="accent1"/>
+          </a:effectRef>
+          <a:fontRef idx="minor">
+            <a:schemeClr val="lt1"/>
+          </a:fontRef>
+        </p:style>
+        <p:txBody>
+          <a:bodyPr rtlCol="0" anchor="ctr"/>
+          <a:lstStyle/>
+          <a:p>
+            <a:pPr algn="ctr"/>
+            <a:r>
+              <a:rPr lang="en-US" dirty="0">
+                <a:solidFill>
+                  <a:schemeClr val="tx1"/>
+                </a:solidFill>
+              </a:rPr>
+              <a:t>JavaScript Tutorials</a:t>
+            </a:r>
+            <a:endParaRPr lang="en-IN" dirty="0">
+              <a:solidFill>
+                <a:schemeClr val="tx1"/>
+              </a:solidFill>
+            </a:endParaRPr>
+          </a:p>
+        </p:txBody>
+      </p:sp>
+      <p:sp>
+        <p:nvSpPr>
+          <p:cNvPr id="8" name="TextBox 7">
+            <a:extLst>
+              <a:ext uri="{FF2B5EF4-FFF2-40B4-BE49-F238E27FC236}">
+                <a16:creationId xmlns:a16="http://schemas.microsoft.com/office/drawing/2014/main" xmlns="" id="{6E6F1672-8C91-3FA6-CB80-58FD68172333}"/>
+              </a:ext>
+            </a:extLst>
+          </p:cNvPr>
+          <p:cNvSpPr txBox="1"/>
+          <p:nvPr/>
+        </p:nvSpPr>
+        <p:spPr>
+          <a:xfrm>
+            <a:off x="-1" y="6060338"/>
+            <a:ext cx="6271591" cy="369332"/>
+          </a:xfrm>
+          <a:prstGeom prst="rect">
+            <a:avLst/>
+          </a:prstGeom>
+          <a:noFill/>
+        </p:spPr>
+        <p:txBody>
+          <a:bodyPr wrap="square" rtlCol="0">
+            <a:spAutoFit/>
+          </a:bodyPr>
+          <a:lstStyle/>
+          <a:p>
+            <a:pPr algn="ctr"/>
+            <a:r>
+              <a:rPr lang="en-US" b="1" dirty="0"/>
+              <a:t>Gautam Kumar- </a:t>
+            </a:r>
+            <a:r>
+              <a:rPr lang="en-US" dirty="0">
+                <a:solidFill>
+                  <a:schemeClr val="tx1">
+                    <a:lumMod val="50000"/>
+                    <a:lumOff val="50000"/>
+                  </a:schemeClr>
+                </a:solidFill>
+              </a:rPr>
+              <a:t>uidhtml.com</a:t>
+            </a:r>
+            <a:endParaRPr lang="en-IN" dirty="0">
+              <a:solidFill>
+                <a:schemeClr val="tx1">
+                  <a:lumMod val="50000"/>
+                  <a:lumOff val="50000"/>
+                </a:schemeClr>
+              </a:solidFill>
+            </a:endParaRPr>
+          </a:p>
+        </p:txBody>
+      </p:sp>
+      <p:sp>
+        <p:nvSpPr>
+          <p:cNvPr id="5" name="Scroll: Vertical 4">
+            <a:extLst>
+              <a:ext uri="{FF2B5EF4-FFF2-40B4-BE49-F238E27FC236}">
+                <a16:creationId xmlns:a16="http://schemas.microsoft.com/office/drawing/2014/main" xmlns="" id="{38EB993A-3F18-C6B7-226F-EDD62B4B31DB}"/>
+              </a:ext>
+            </a:extLst>
+          </p:cNvPr>
+          <p:cNvSpPr/>
+          <p:nvPr/>
+        </p:nvSpPr>
+        <p:spPr>
+          <a:xfrm>
+            <a:off x="5561640" y="477079"/>
+            <a:ext cx="5616326" cy="6122504"/>
+          </a:xfrm>
+          <a:prstGeom prst="verticalScroll">
+            <a:avLst/>
+          </a:prstGeom>
+          <a:solidFill>
+            <a:schemeClr val="tx1">
+              <a:lumMod val="65000"/>
+              <a:lumOff val="35000"/>
+            </a:schemeClr>
+          </a:solidFill>
+          <a:ln>
+            <a:solidFill>
+              <a:schemeClr val="bg1">
+                <a:lumMod val="95000"/>
+              </a:schemeClr>
+            </a:solidFill>
+          </a:ln>
+        </p:spPr>
+        <p:style>
+          <a:lnRef idx="2">
+            <a:schemeClr val="accent1">
+              <a:shade val="15000"/>
+            </a:schemeClr>
+          </a:lnRef>
+          <a:fillRef idx="1">
+            <a:schemeClr val="accent1"/>
+          </a:fillRef>
+          <a:effectRef idx="0">
+            <a:schemeClr val="accent1"/>
+          </a:effectRef>
+          <a:fontRef idx="minor">
+            <a:schemeClr val="lt1"/>
+          </a:fontRef>
+        </p:style>
+        <p:txBody>
+          <a:bodyPr rtlCol="0" anchor="t"/>
+          <a:lstStyle/>
+          <a:p>
+            <a:r>
+              <a:rPr lang="en-US" sz="3600" b="1" dirty="0">
+                <a:solidFill>
+                  <a:schemeClr val="bg1"/>
+                </a:solidFill>
+              </a:rPr>
+              <a:t>Topics</a:t>
+            </a:r>
+          </a:p>
+          <a:p>
+            <a:pPr marL="285750" indent="-285750">
+              <a:lnSpc>
+                <a:spcPct val="150000"/>
+              </a:lnSpc>
+              <a:buFont typeface="Courier New" panose="02070309020205020404" pitchFamily="49" charset="0"/>
+              <a:buChar char="o"/>
+            </a:pPr>
+            <a:r>
+              <a:rPr lang="en-IN" sz="1600" dirty="0" smtClean="0">
+                <a:solidFill>
+                  <a:schemeClr val="bg1"/>
+                </a:solidFill>
+              </a:rPr>
+              <a:t>Primitive </a:t>
+            </a:r>
+            <a:r>
+              <a:rPr lang="en-IN" sz="1600" dirty="0" smtClean="0">
+                <a:solidFill>
+                  <a:schemeClr val="bg1"/>
+                </a:solidFill>
+              </a:rPr>
+              <a:t>d</a:t>
+            </a:r>
+            <a:r>
+              <a:rPr lang="en-IN" sz="1600" dirty="0" smtClean="0">
+                <a:solidFill>
+                  <a:schemeClr val="bg1"/>
+                </a:solidFill>
+              </a:rPr>
+              <a:t>ata types</a:t>
+            </a:r>
+          </a:p>
+          <a:p>
+            <a:pPr marL="285750" indent="-285750">
+              <a:lnSpc>
+                <a:spcPct val="150000"/>
+              </a:lnSpc>
+              <a:buFont typeface="Courier New" panose="02070309020205020404" pitchFamily="49" charset="0"/>
+              <a:buChar char="o"/>
+            </a:pPr>
+            <a:r>
+              <a:rPr lang="en-IN" sz="1600" dirty="0" smtClean="0">
+                <a:solidFill>
+                  <a:schemeClr val="bg1"/>
+                </a:solidFill>
+              </a:rPr>
+              <a:t>Composite data types</a:t>
+            </a:r>
+            <a:endParaRPr lang="en-IN" sz="1600" dirty="0">
+              <a:solidFill>
+                <a:schemeClr val="bg1"/>
+              </a:solidFill>
+            </a:endParaRPr>
+          </a:p>
+        </p:txBody>
+      </p:sp>
+    </p:spTree>
+    <p:extLst>
+      <p:ext uri="{BB962C8B-B14F-4D97-AF65-F5344CB8AC3E}">
+        <p14:creationId xmlns:p14="http://schemas.microsoft.com/office/powerpoint/2010/main" xmlns="" val="3287175084"/>
+      </p:ext>
+    </p:extLst>
+  </p:cSld>
+  <p:clrMapOvr>
+    <a:masterClrMapping/>
+  </p:clrMapOvr>
+</p:sld>
+</file>
+
+<file path=ppt/slides/slide27.xml><?xml version="1.0" encoding="utf-8"?>
+<p:sld xmlns:a="http://schemas.openxmlformats.org/drawingml/2006/main" xmlns:r="http://schemas.openxmlformats.org/officeDocument/2006/relationships" xmlns:p="http://schemas.openxmlformats.org/presentationml/2006/main">
+  <p:cSld>
+    <p:spTree>
+      <p:nvGrpSpPr>
+        <p:cNvPr id="1" name="">
+          <a:extLst>
+            <a:ext uri="{FF2B5EF4-FFF2-40B4-BE49-F238E27FC236}">
+              <a16:creationId xmlns:a16="http://schemas.microsoft.com/office/drawing/2014/main" xmlns="" id="{4586E9D7-F5F8-14CC-9DF6-FC4AF2EA4249}"/>
+            </a:ext>
+          </a:extLst>
+        </p:cNvPr>
+        <p:cNvGrpSpPr/>
+        <p:nvPr/>
+      </p:nvGrpSpPr>
+      <p:grpSpPr>
+        <a:xfrm>
+          <a:off x="0" y="0"/>
+          <a:ext cx="0" cy="0"/>
+          <a:chOff x="0" y="0"/>
+          <a:chExt cx="0" cy="0"/>
+        </a:xfrm>
+      </p:grpSpPr>
+      <p:sp>
+        <p:nvSpPr>
+          <p:cNvPr id="2" name="Title 1">
+            <a:extLst>
+              <a:ext uri="{FF2B5EF4-FFF2-40B4-BE49-F238E27FC236}">
+                <a16:creationId xmlns:a16="http://schemas.microsoft.com/office/drawing/2014/main" xmlns="" id="{D8B67155-694F-FF61-7CDD-33A20A316215}"/>
+              </a:ext>
+            </a:extLst>
+          </p:cNvPr>
+          <p:cNvSpPr>
+            <a:spLocks noGrp="1"/>
+          </p:cNvSpPr>
+          <p:nvPr>
+            <p:ph type="title"/>
+          </p:nvPr>
+        </p:nvSpPr>
+        <p:spPr>
+          <a:xfrm>
+            <a:off x="334435" y="1057275"/>
+            <a:ext cx="8596668" cy="742950"/>
+          </a:xfrm>
+        </p:spPr>
+        <p:txBody>
+          <a:bodyPr>
+            <a:normAutofit fontScale="90000"/>
+          </a:bodyPr>
+          <a:lstStyle/>
+          <a:p>
+            <a:r>
+              <a:rPr lang="en-US" b="1" dirty="0">
+                <a:solidFill>
+                  <a:schemeClr val="tx1"/>
+                </a:solidFill>
+                <a:latin typeface="Bahnschrift SemiLight" pitchFamily="34" charset="0"/>
+              </a:rPr>
+              <a:t>What </a:t>
+            </a:r>
+            <a:r>
+              <a:rPr lang="en-US" b="1" dirty="0" smtClean="0">
+                <a:solidFill>
+                  <a:schemeClr val="tx1"/>
+                </a:solidFill>
+                <a:latin typeface="Bahnschrift SemiLight" pitchFamily="34" charset="0"/>
+              </a:rPr>
+              <a:t>are primitive data types?</a:t>
+            </a:r>
+            <a:endParaRPr lang="en-US" dirty="0">
+              <a:solidFill>
+                <a:schemeClr val="bg1">
+                  <a:lumMod val="65000"/>
+                  <a:lumOff val="35000"/>
+                </a:schemeClr>
+              </a:solidFill>
+              <a:latin typeface="Bahnschrift Light Condensed" pitchFamily="34" charset="0"/>
+            </a:endParaRPr>
+          </a:p>
+        </p:txBody>
+      </p:sp>
+      <p:sp>
+        <p:nvSpPr>
+          <p:cNvPr id="5" name="Ribbon: Curved and Tilted Down 4">
+            <a:extLst>
+              <a:ext uri="{FF2B5EF4-FFF2-40B4-BE49-F238E27FC236}">
+                <a16:creationId xmlns:a16="http://schemas.microsoft.com/office/drawing/2014/main" xmlns="" id="{3FA23525-E3EA-B8CB-FD6A-53084CA847A7}"/>
+              </a:ext>
+            </a:extLst>
+          </p:cNvPr>
+          <p:cNvSpPr/>
+          <p:nvPr/>
+        </p:nvSpPr>
+        <p:spPr>
+          <a:xfrm>
+            <a:off x="255512" y="216454"/>
+            <a:ext cx="3678313" cy="583646"/>
+          </a:xfrm>
+          <a:prstGeom prst="ellipseRibbon">
+            <a:avLst/>
+          </a:prstGeom>
+          <a:solidFill>
+            <a:schemeClr val="bg1">
+              <a:lumMod val="85000"/>
+              <a:lumOff val="15000"/>
+            </a:schemeClr>
+          </a:solidFill>
+          <a:ln>
+            <a:noFill/>
+          </a:ln>
+        </p:spPr>
+        <p:style>
+          <a:lnRef idx="2">
+            <a:schemeClr val="accent1">
+              <a:shade val="15000"/>
+            </a:schemeClr>
+          </a:lnRef>
+          <a:fillRef idx="1">
+            <a:schemeClr val="accent1"/>
+          </a:fillRef>
+          <a:effectRef idx="0">
+            <a:schemeClr val="accent1"/>
+          </a:effectRef>
+          <a:fontRef idx="minor">
+            <a:schemeClr val="lt1"/>
+          </a:fontRef>
+        </p:style>
+        <p:txBody>
+          <a:bodyPr rtlCol="0" anchor="ctr"/>
+          <a:lstStyle/>
+          <a:p>
+            <a:pPr algn="ctr"/>
+            <a:r>
+              <a:rPr lang="en-US" sz="1100" dirty="0">
+                <a:solidFill>
+                  <a:schemeClr val="tx1">
+                    <a:lumMod val="65000"/>
+                    <a:lumOff val="35000"/>
+                  </a:schemeClr>
+                </a:solidFill>
+              </a:rPr>
+              <a:t>JavaScript Tutorials</a:t>
+            </a:r>
+            <a:endParaRPr lang="en-IN" sz="1100" dirty="0">
+              <a:solidFill>
+                <a:schemeClr val="tx1">
+                  <a:lumMod val="65000"/>
+                  <a:lumOff val="35000"/>
+                </a:schemeClr>
+              </a:solidFill>
+            </a:endParaRPr>
+          </a:p>
+        </p:txBody>
+      </p:sp>
+      <p:sp>
+        <p:nvSpPr>
+          <p:cNvPr id="6" name="Scroll: Vertical 5">
+            <a:extLst>
+              <a:ext uri="{FF2B5EF4-FFF2-40B4-BE49-F238E27FC236}">
+                <a16:creationId xmlns:a16="http://schemas.microsoft.com/office/drawing/2014/main" xmlns="" id="{1A4C732A-2840-82C8-A359-298D925E33B3}"/>
+              </a:ext>
+            </a:extLst>
+          </p:cNvPr>
+          <p:cNvSpPr/>
+          <p:nvPr/>
+        </p:nvSpPr>
+        <p:spPr>
+          <a:xfrm>
+            <a:off x="7851914" y="715617"/>
+            <a:ext cx="4240696" cy="4989444"/>
+          </a:xfrm>
+          <a:prstGeom prst="verticalScroll">
+            <a:avLst/>
+          </a:prstGeom>
+          <a:solidFill>
+            <a:schemeClr val="bg1">
+              <a:lumMod val="85000"/>
+            </a:schemeClr>
+          </a:solidFill>
+          <a:ln>
+            <a:solidFill>
+              <a:schemeClr val="bg1">
+                <a:lumMod val="75000"/>
+                <a:lumOff val="25000"/>
+              </a:schemeClr>
+            </a:solidFill>
+          </a:ln>
+        </p:spPr>
+        <p:style>
+          <a:lnRef idx="2">
+            <a:schemeClr val="accent1">
+              <a:shade val="15000"/>
+            </a:schemeClr>
+          </a:lnRef>
+          <a:fillRef idx="1">
+            <a:schemeClr val="accent1"/>
+          </a:fillRef>
+          <a:effectRef idx="0">
+            <a:schemeClr val="accent1"/>
+          </a:effectRef>
+          <a:fontRef idx="minor">
+            <a:schemeClr val="lt1"/>
+          </a:fontRef>
+        </p:style>
+        <p:txBody>
+          <a:bodyPr rtlCol="0" anchor="t"/>
+          <a:lstStyle/>
+          <a:p>
+            <a:pPr>
+              <a:lnSpc>
+                <a:spcPct val="150000"/>
+              </a:lnSpc>
+            </a:pPr>
+            <a:r>
+              <a:rPr lang="en-US" sz="2400" b="1" dirty="0">
+                <a:solidFill>
+                  <a:schemeClr val="tx1"/>
+                </a:solidFill>
+              </a:rPr>
+              <a:t>Topics</a:t>
+            </a:r>
+          </a:p>
+          <a:p>
+            <a:pPr marL="285750" indent="-285750">
+              <a:lnSpc>
+                <a:spcPct val="150000"/>
+              </a:lnSpc>
+              <a:buFont typeface="Courier New" panose="02070309020205020404" pitchFamily="49" charset="0"/>
+              <a:buChar char="o"/>
+            </a:pPr>
+            <a:r>
+              <a:rPr lang="en-US" dirty="0" smtClean="0">
+                <a:solidFill>
+                  <a:schemeClr val="tx1"/>
+                </a:solidFill>
+              </a:rPr>
+              <a:t>Primitive data types</a:t>
+            </a:r>
+            <a:endParaRPr lang="en-US" dirty="0">
+              <a:solidFill>
+                <a:schemeClr val="tx1"/>
+              </a:solidFill>
+            </a:endParaRPr>
+          </a:p>
+          <a:p>
+            <a:pPr marL="285750" indent="-285750">
+              <a:lnSpc>
+                <a:spcPct val="150000"/>
+              </a:lnSpc>
+              <a:buFont typeface="Courier New" panose="02070309020205020404" pitchFamily="49" charset="0"/>
+              <a:buChar char="o"/>
+            </a:pPr>
+            <a:r>
+              <a:rPr lang="en-IN" dirty="0" smtClean="0">
+                <a:solidFill>
+                  <a:schemeClr val="tx1"/>
+                </a:solidFill>
+              </a:rPr>
+              <a:t>Composite data types</a:t>
+            </a:r>
+            <a:endParaRPr lang="en-IN" dirty="0">
+              <a:solidFill>
+                <a:schemeClr val="tx1"/>
+              </a:solidFill>
+            </a:endParaRPr>
+          </a:p>
+        </p:txBody>
+      </p:sp>
+      <p:sp>
+        <p:nvSpPr>
+          <p:cNvPr id="7" name="TextBox 6"/>
+          <p:cNvSpPr txBox="1"/>
+          <p:nvPr/>
+        </p:nvSpPr>
+        <p:spPr>
+          <a:xfrm>
+            <a:off x="9614263" y="801189"/>
+            <a:ext cx="1401346" cy="369332"/>
+          </a:xfrm>
+          <a:prstGeom prst="rect">
+            <a:avLst/>
+          </a:prstGeom>
+          <a:noFill/>
+        </p:spPr>
+        <p:txBody>
+          <a:bodyPr wrap="none" rtlCol="0">
+            <a:spAutoFit/>
+          </a:bodyPr>
+          <a:lstStyle/>
+          <a:p>
+            <a:r>
+              <a:rPr lang="en-IN" b="1" dirty="0">
+                <a:solidFill>
+                  <a:schemeClr val="accent2">
+                    <a:lumMod val="60000"/>
+                    <a:lumOff val="40000"/>
+                  </a:schemeClr>
+                </a:solidFill>
+                <a:latin typeface="Bahnschrift SemiLight" pitchFamily="34" charset="0"/>
+              </a:rPr>
+              <a:t>Chapter - </a:t>
+            </a:r>
+            <a:r>
+              <a:rPr lang="en-IN" b="1" dirty="0" smtClean="0">
+                <a:solidFill>
+                  <a:schemeClr val="accent2">
+                    <a:lumMod val="60000"/>
+                    <a:lumOff val="40000"/>
+                  </a:schemeClr>
+                </a:solidFill>
+                <a:latin typeface="Bahnschrift SemiLight" pitchFamily="34" charset="0"/>
+              </a:rPr>
+              <a:t>6</a:t>
+            </a:r>
+            <a:endParaRPr lang="en-US" b="1" dirty="0">
+              <a:solidFill>
+                <a:schemeClr val="accent2">
+                  <a:lumMod val="60000"/>
+                  <a:lumOff val="40000"/>
+                </a:schemeClr>
+              </a:solidFill>
+              <a:latin typeface="Bahnschrift SemiLight" pitchFamily="34" charset="0"/>
+            </a:endParaRPr>
+          </a:p>
+        </p:txBody>
+      </p:sp>
+      <p:sp>
+        <p:nvSpPr>
+          <p:cNvPr id="8" name="Text Placeholder 7"/>
+          <p:cNvSpPr>
+            <a:spLocks noGrp="1"/>
+          </p:cNvSpPr>
+          <p:nvPr>
+            <p:ph type="body" idx="1"/>
+          </p:nvPr>
+        </p:nvSpPr>
+        <p:spPr>
+          <a:xfrm>
+            <a:off x="416078" y="1796869"/>
+            <a:ext cx="7134253" cy="989874"/>
+          </a:xfrm>
+        </p:spPr>
+        <p:txBody>
+          <a:bodyPr anchor="t"/>
+          <a:lstStyle/>
+          <a:p>
+            <a:r>
+              <a:rPr lang="en-US" dirty="0" smtClean="0"/>
+              <a:t>In JavaScript, a primitive data type (or primitive value) is a piece of data that is not an object and has no methods or properties. All primitive values are immutable, meaning they cannot be altered. </a:t>
+            </a:r>
+            <a:endParaRPr lang="en-US" dirty="0"/>
+          </a:p>
+        </p:txBody>
+      </p:sp>
+      <p:pic>
+        <p:nvPicPr>
+          <p:cNvPr id="1027" name="Picture 3" descr="C:\Users\Gautam\Downloads\Blank board - Page 1.png"/>
+          <p:cNvPicPr>
+            <a:picLocks noChangeAspect="1" noChangeArrowheads="1"/>
+          </p:cNvPicPr>
+          <p:nvPr/>
+        </p:nvPicPr>
+        <p:blipFill>
+          <a:blip r:embed="rId2"/>
+          <a:srcRect/>
+          <a:stretch>
+            <a:fillRect/>
+          </a:stretch>
+        </p:blipFill>
+        <p:spPr bwMode="auto">
+          <a:xfrm>
+            <a:off x="570870" y="2939833"/>
+            <a:ext cx="6663762" cy="3399328"/>
+          </a:xfrm>
+          <a:prstGeom prst="rect">
+            <a:avLst/>
+          </a:prstGeom>
+          <a:noFill/>
+        </p:spPr>
+      </p:pic>
+    </p:spTree>
+    <p:extLst>
+      <p:ext uri="{BB962C8B-B14F-4D97-AF65-F5344CB8AC3E}">
+        <p14:creationId xmlns:p14="http://schemas.microsoft.com/office/powerpoint/2010/main" xmlns="" val="3002471670"/>
+      </p:ext>
+    </p:extLst>
+  </p:cSld>
+  <p:clrMapOvr>
+    <a:masterClrMapping/>
+  </p:clrMapOvr>
+</p:sld>
+</file>
+
+<file path=ppt/slides/slide28.xml><?xml version="1.0" encoding="utf-8"?>
+<p:sld xmlns:a="http://schemas.openxmlformats.org/drawingml/2006/main" xmlns:r="http://schemas.openxmlformats.org/officeDocument/2006/relationships" xmlns:p="http://schemas.openxmlformats.org/presentationml/2006/main">
+  <p:cSld>
+    <p:spTree>
+      <p:nvGrpSpPr>
+        <p:cNvPr id="1" name="">
+          <a:extLst>
+            <a:ext uri="{FF2B5EF4-FFF2-40B4-BE49-F238E27FC236}">
+              <a16:creationId xmlns:a16="http://schemas.microsoft.com/office/drawing/2014/main" xmlns="" id="{4586E9D7-F5F8-14CC-9DF6-FC4AF2EA4249}"/>
+            </a:ext>
+          </a:extLst>
+        </p:cNvPr>
+        <p:cNvGrpSpPr/>
+        <p:nvPr/>
+      </p:nvGrpSpPr>
+      <p:grpSpPr>
+        <a:xfrm>
+          <a:off x="0" y="0"/>
+          <a:ext cx="0" cy="0"/>
+          <a:chOff x="0" y="0"/>
+          <a:chExt cx="0" cy="0"/>
+        </a:xfrm>
+      </p:grpSpPr>
+      <p:sp>
+        <p:nvSpPr>
+          <p:cNvPr id="2" name="Title 1">
+            <a:extLst>
+              <a:ext uri="{FF2B5EF4-FFF2-40B4-BE49-F238E27FC236}">
+                <a16:creationId xmlns:a16="http://schemas.microsoft.com/office/drawing/2014/main" xmlns="" id="{D8B67155-694F-FF61-7CDD-33A20A316215}"/>
+              </a:ext>
+            </a:extLst>
+          </p:cNvPr>
+          <p:cNvSpPr>
+            <a:spLocks noGrp="1"/>
+          </p:cNvSpPr>
+          <p:nvPr>
+            <p:ph type="title"/>
+          </p:nvPr>
+        </p:nvSpPr>
+        <p:spPr>
+          <a:xfrm>
+            <a:off x="334435" y="1057275"/>
+            <a:ext cx="8596668" cy="742950"/>
+          </a:xfrm>
+        </p:spPr>
+        <p:txBody>
+          <a:bodyPr>
+            <a:normAutofit fontScale="90000"/>
+          </a:bodyPr>
+          <a:lstStyle/>
+          <a:p>
+            <a:r>
+              <a:rPr lang="en-US" b="1" dirty="0">
+                <a:solidFill>
+                  <a:schemeClr val="tx1"/>
+                </a:solidFill>
+                <a:latin typeface="Bahnschrift SemiLight" pitchFamily="34" charset="0"/>
+              </a:rPr>
+              <a:t>What </a:t>
+            </a:r>
+            <a:r>
+              <a:rPr lang="en-US" b="1" dirty="0" smtClean="0">
+                <a:solidFill>
+                  <a:schemeClr val="tx1"/>
+                </a:solidFill>
+                <a:latin typeface="Bahnschrift SemiLight" pitchFamily="34" charset="0"/>
+              </a:rPr>
+              <a:t>are composite data types?</a:t>
+            </a:r>
+            <a:endParaRPr lang="en-US" dirty="0">
+              <a:solidFill>
+                <a:schemeClr val="bg1">
+                  <a:lumMod val="65000"/>
+                  <a:lumOff val="35000"/>
+                </a:schemeClr>
+              </a:solidFill>
+              <a:latin typeface="Bahnschrift Light Condensed" pitchFamily="34" charset="0"/>
+            </a:endParaRPr>
+          </a:p>
+        </p:txBody>
+      </p:sp>
+      <p:sp>
+        <p:nvSpPr>
+          <p:cNvPr id="13" name="Text Placeholder 12"/>
+          <p:cNvSpPr>
+            <a:spLocks noGrp="1"/>
+          </p:cNvSpPr>
+          <p:nvPr>
+            <p:ph type="body" idx="1"/>
+          </p:nvPr>
+        </p:nvSpPr>
+        <p:spPr>
+          <a:xfrm>
+            <a:off x="410634" y="1889124"/>
+            <a:ext cx="7453205" cy="1506009"/>
+          </a:xfrm>
+        </p:spPr>
+        <p:txBody>
+          <a:bodyPr anchor="t">
+            <a:normAutofit/>
+          </a:bodyPr>
+          <a:lstStyle/>
+          <a:p>
+            <a:pPr marL="285750" indent="-285750">
+              <a:buFont typeface="Arial" pitchFamily="34" charset="0"/>
+              <a:buChar char="•"/>
+            </a:pPr>
+            <a:r>
+              <a:rPr lang="en-US" dirty="0" smtClean="0"/>
+              <a:t>In JavaScript, composite data types, also known as non-primitive or reference types, can store collections of values and more complex entities. These types do not hold the actual value directly in the variable; instead, they store a reference to the memory location where the data is stored</a:t>
+            </a:r>
+            <a:r>
+              <a:rPr lang="en-US" dirty="0" smtClean="0"/>
+              <a:t>.</a:t>
+            </a:r>
+            <a:endParaRPr lang="en-IN" dirty="0" smtClean="0">
+              <a:solidFill>
+                <a:schemeClr val="tx1"/>
+              </a:solidFill>
+            </a:endParaRPr>
+          </a:p>
+        </p:txBody>
+      </p:sp>
+      <p:sp>
+        <p:nvSpPr>
+          <p:cNvPr id="5" name="Ribbon: Curved and Tilted Down 4">
+            <a:extLst>
+              <a:ext uri="{FF2B5EF4-FFF2-40B4-BE49-F238E27FC236}">
+                <a16:creationId xmlns:a16="http://schemas.microsoft.com/office/drawing/2014/main" xmlns="" id="{3FA23525-E3EA-B8CB-FD6A-53084CA847A7}"/>
+              </a:ext>
+            </a:extLst>
+          </p:cNvPr>
+          <p:cNvSpPr/>
+          <p:nvPr/>
+        </p:nvSpPr>
+        <p:spPr>
+          <a:xfrm>
+            <a:off x="255512" y="216454"/>
+            <a:ext cx="3678313" cy="583646"/>
+          </a:xfrm>
+          <a:prstGeom prst="ellipseRibbon">
+            <a:avLst/>
+          </a:prstGeom>
+          <a:solidFill>
+            <a:schemeClr val="bg1">
+              <a:lumMod val="85000"/>
+              <a:lumOff val="15000"/>
+            </a:schemeClr>
+          </a:solidFill>
+          <a:ln>
+            <a:noFill/>
+          </a:ln>
+        </p:spPr>
+        <p:style>
+          <a:lnRef idx="2">
+            <a:schemeClr val="accent1">
+              <a:shade val="15000"/>
+            </a:schemeClr>
+          </a:lnRef>
+          <a:fillRef idx="1">
+            <a:schemeClr val="accent1"/>
+          </a:fillRef>
+          <a:effectRef idx="0">
+            <a:schemeClr val="accent1"/>
+          </a:effectRef>
+          <a:fontRef idx="minor">
+            <a:schemeClr val="lt1"/>
+          </a:fontRef>
+        </p:style>
+        <p:txBody>
+          <a:bodyPr rtlCol="0" anchor="ctr"/>
+          <a:lstStyle/>
+          <a:p>
+            <a:pPr algn="ctr"/>
+            <a:r>
+              <a:rPr lang="en-US" sz="1100" dirty="0">
+                <a:solidFill>
+                  <a:schemeClr val="tx1">
+                    <a:lumMod val="65000"/>
+                    <a:lumOff val="35000"/>
+                  </a:schemeClr>
+                </a:solidFill>
+              </a:rPr>
+              <a:t>JavaScript Tutorials</a:t>
+            </a:r>
+            <a:endParaRPr lang="en-IN" sz="1100" dirty="0">
+              <a:solidFill>
+                <a:schemeClr val="tx1">
+                  <a:lumMod val="65000"/>
+                  <a:lumOff val="35000"/>
+                </a:schemeClr>
+              </a:solidFill>
+            </a:endParaRPr>
+          </a:p>
+        </p:txBody>
+      </p:sp>
+      <p:sp>
+        <p:nvSpPr>
+          <p:cNvPr id="6" name="Scroll: Vertical 5">
+            <a:extLst>
+              <a:ext uri="{FF2B5EF4-FFF2-40B4-BE49-F238E27FC236}">
+                <a16:creationId xmlns:a16="http://schemas.microsoft.com/office/drawing/2014/main" xmlns="" id="{1A4C732A-2840-82C8-A359-298D925E33B3}"/>
+              </a:ext>
+            </a:extLst>
+          </p:cNvPr>
+          <p:cNvSpPr/>
+          <p:nvPr/>
+        </p:nvSpPr>
+        <p:spPr>
+          <a:xfrm>
+            <a:off x="7851914" y="715617"/>
+            <a:ext cx="4240696" cy="4989444"/>
+          </a:xfrm>
+          <a:prstGeom prst="verticalScroll">
+            <a:avLst/>
+          </a:prstGeom>
+          <a:solidFill>
+            <a:schemeClr val="bg1">
+              <a:lumMod val="85000"/>
+            </a:schemeClr>
+          </a:solidFill>
+          <a:ln>
+            <a:solidFill>
+              <a:schemeClr val="bg1">
+                <a:lumMod val="75000"/>
+                <a:lumOff val="25000"/>
+              </a:schemeClr>
+            </a:solidFill>
+          </a:ln>
+        </p:spPr>
+        <p:style>
+          <a:lnRef idx="2">
+            <a:schemeClr val="accent1">
+              <a:shade val="15000"/>
+            </a:schemeClr>
+          </a:lnRef>
+          <a:fillRef idx="1">
+            <a:schemeClr val="accent1"/>
+          </a:fillRef>
+          <a:effectRef idx="0">
+            <a:schemeClr val="accent1"/>
+          </a:effectRef>
+          <a:fontRef idx="minor">
+            <a:schemeClr val="lt1"/>
+          </a:fontRef>
+        </p:style>
+        <p:txBody>
+          <a:bodyPr rtlCol="0" anchor="t"/>
+          <a:lstStyle/>
+          <a:p>
+            <a:pPr>
+              <a:lnSpc>
+                <a:spcPct val="150000"/>
+              </a:lnSpc>
+            </a:pPr>
+            <a:r>
+              <a:rPr lang="en-US" sz="2400" b="1" dirty="0">
+                <a:solidFill>
+                  <a:schemeClr val="tx1"/>
+                </a:solidFill>
+              </a:rPr>
+              <a:t>Topics</a:t>
+            </a:r>
+          </a:p>
+          <a:p>
+            <a:pPr marL="285750" indent="-285750">
+              <a:lnSpc>
+                <a:spcPct val="150000"/>
+              </a:lnSpc>
+              <a:buFont typeface="Courier New" panose="02070309020205020404" pitchFamily="49" charset="0"/>
+              <a:buChar char="o"/>
+            </a:pPr>
+            <a:r>
+              <a:rPr lang="en-US" strike="sngStrike" dirty="0" smtClean="0">
+                <a:solidFill>
+                  <a:schemeClr val="tx1"/>
+                </a:solidFill>
+              </a:rPr>
+              <a:t>Primitive data types</a:t>
+            </a:r>
+            <a:endParaRPr lang="en-US" strike="sngStrike" dirty="0">
+              <a:solidFill>
+                <a:schemeClr val="tx1"/>
+              </a:solidFill>
+            </a:endParaRPr>
+          </a:p>
+          <a:p>
+            <a:pPr marL="285750" indent="-285750">
+              <a:lnSpc>
+                <a:spcPct val="150000"/>
+              </a:lnSpc>
+              <a:buFont typeface="Courier New" panose="02070309020205020404" pitchFamily="49" charset="0"/>
+              <a:buChar char="o"/>
+            </a:pPr>
+            <a:r>
+              <a:rPr lang="en-IN" dirty="0" smtClean="0">
+                <a:solidFill>
+                  <a:schemeClr val="tx1"/>
+                </a:solidFill>
+              </a:rPr>
+              <a:t>Composite data types</a:t>
+            </a:r>
+            <a:endParaRPr lang="en-IN" dirty="0">
+              <a:solidFill>
+                <a:schemeClr val="tx1"/>
+              </a:solidFill>
+            </a:endParaRPr>
+          </a:p>
+        </p:txBody>
+      </p:sp>
+      <p:sp>
+        <p:nvSpPr>
+          <p:cNvPr id="7" name="TextBox 6"/>
+          <p:cNvSpPr txBox="1"/>
+          <p:nvPr/>
+        </p:nvSpPr>
+        <p:spPr>
+          <a:xfrm>
+            <a:off x="9614263" y="801189"/>
+            <a:ext cx="1401346" cy="369332"/>
+          </a:xfrm>
+          <a:prstGeom prst="rect">
+            <a:avLst/>
+          </a:prstGeom>
+          <a:noFill/>
+        </p:spPr>
+        <p:txBody>
+          <a:bodyPr wrap="none" rtlCol="0">
+            <a:spAutoFit/>
+          </a:bodyPr>
+          <a:lstStyle/>
+          <a:p>
+            <a:r>
+              <a:rPr lang="en-IN" b="1" dirty="0">
+                <a:solidFill>
+                  <a:schemeClr val="accent2">
+                    <a:lumMod val="60000"/>
+                    <a:lumOff val="40000"/>
+                  </a:schemeClr>
+                </a:solidFill>
+                <a:latin typeface="Bahnschrift SemiLight" pitchFamily="34" charset="0"/>
+              </a:rPr>
+              <a:t>Chapter - </a:t>
+            </a:r>
+            <a:r>
+              <a:rPr lang="en-IN" b="1" dirty="0" smtClean="0">
+                <a:solidFill>
+                  <a:schemeClr val="accent2">
+                    <a:lumMod val="60000"/>
+                    <a:lumOff val="40000"/>
+                  </a:schemeClr>
+                </a:solidFill>
+                <a:latin typeface="Bahnschrift SemiLight" pitchFamily="34" charset="0"/>
+              </a:rPr>
+              <a:t>6</a:t>
+            </a:r>
+            <a:endParaRPr lang="en-US" b="1" dirty="0">
+              <a:solidFill>
+                <a:schemeClr val="accent2">
+                  <a:lumMod val="60000"/>
+                  <a:lumOff val="40000"/>
+                </a:schemeClr>
+              </a:solidFill>
+              <a:latin typeface="Bahnschrift SemiLight" pitchFamily="34" charset="0"/>
+            </a:endParaRPr>
+          </a:p>
+        </p:txBody>
+      </p:sp>
+      <p:pic>
+        <p:nvPicPr>
+          <p:cNvPr id="2052" name="Picture 4" descr="C:\Users\Gautam\Downloads\Blank board - Page 1 (1).png"/>
+          <p:cNvPicPr>
+            <a:picLocks noChangeAspect="1" noChangeArrowheads="1"/>
+          </p:cNvPicPr>
+          <p:nvPr/>
+        </p:nvPicPr>
+        <p:blipFill>
+          <a:blip r:embed="rId2"/>
+          <a:srcRect/>
+          <a:stretch>
+            <a:fillRect/>
+          </a:stretch>
+        </p:blipFill>
+        <p:spPr bwMode="auto">
+          <a:xfrm>
+            <a:off x="954190" y="3238501"/>
+            <a:ext cx="6159638" cy="3294882"/>
+          </a:xfrm>
+          <a:prstGeom prst="rect">
+            <a:avLst/>
+          </a:prstGeom>
+          <a:noFill/>
+        </p:spPr>
+      </p:pic>
+    </p:spTree>
+    <p:extLst>
+      <p:ext uri="{BB962C8B-B14F-4D97-AF65-F5344CB8AC3E}">
+        <p14:creationId xmlns:p14="http://schemas.microsoft.com/office/powerpoint/2010/main" xmlns="" val="3002471670"/>
+      </p:ext>
+    </p:extLst>
+  </p:cSld>
+  <p:clrMapOvr>
+    <a:masterClrMapping/>
+  </p:clrMapOvr>
+</p:sld>
+</file>
+
+<file path=ppt/slides/slide29.xml><?xml version="1.0" encoding="utf-8"?>
+<p:sld xmlns:a="http://schemas.openxmlformats.org/drawingml/2006/main" xmlns:r="http://schemas.openxmlformats.org/officeDocument/2006/relationships" xmlns:p="http://schemas.openxmlformats.org/presentationml/2006/main">
+  <p:cSld>
+    <p:spTree>
+      <p:nvGrpSpPr>
+        <p:cNvPr id="1" name=""/>
+        <p:cNvGrpSpPr/>
+        <p:nvPr/>
+      </p:nvGrpSpPr>
+      <p:grpSpPr>
+        <a:xfrm>
+          <a:off x="0" y="0"/>
+          <a:ext cx="0" cy="0"/>
+          <a:chOff x="0" y="0"/>
+          <a:chExt cx="0" cy="0"/>
+        </a:xfrm>
+      </p:grpSpPr>
+      <p:sp>
+        <p:nvSpPr>
+          <p:cNvPr id="9" name="Explosion: 14 Points 8">
+            <a:extLst>
+              <a:ext uri="{FF2B5EF4-FFF2-40B4-BE49-F238E27FC236}">
+                <a16:creationId xmlns:a16="http://schemas.microsoft.com/office/drawing/2014/main" xmlns="" id="{0A2CD68B-7A56-F86D-8B6F-4A8BF99B4C9E}"/>
+              </a:ext>
+            </a:extLst>
+          </p:cNvPr>
+          <p:cNvSpPr/>
+          <p:nvPr/>
+        </p:nvSpPr>
+        <p:spPr>
+          <a:xfrm>
+            <a:off x="4336395" y="0"/>
+            <a:ext cx="3669087" cy="3707684"/>
+          </a:xfrm>
+          <a:prstGeom prst="irregularSeal2">
+            <a:avLst/>
+          </a:prstGeom>
+          <a:solidFill>
+            <a:schemeClr val="bg1">
+              <a:lumMod val="75000"/>
+              <a:lumOff val="25000"/>
+            </a:schemeClr>
+          </a:solidFill>
+          <a:ln>
+            <a:noFill/>
+          </a:ln>
+        </p:spPr>
+        <p:style>
+          <a:lnRef idx="2">
+            <a:schemeClr val="accent1">
+              <a:shade val="15000"/>
+            </a:schemeClr>
+          </a:lnRef>
+          <a:fillRef idx="1">
+            <a:schemeClr val="accent1"/>
+          </a:fillRef>
+          <a:effectRef idx="0">
+            <a:schemeClr val="accent1"/>
+          </a:effectRef>
+          <a:fontRef idx="minor">
+            <a:schemeClr val="lt1"/>
+          </a:fontRef>
+        </p:style>
+        <p:txBody>
+          <a:bodyPr rtlCol="0" anchor="ctr"/>
+          <a:lstStyle/>
+          <a:p>
+            <a:pPr algn="ctr"/>
+            <a:endParaRPr lang="en-IN"/>
+          </a:p>
+        </p:txBody>
+      </p:sp>
+      <p:sp>
+        <p:nvSpPr>
+          <p:cNvPr id="2" name="Title 1">
+            <a:extLst>
+              <a:ext uri="{FF2B5EF4-FFF2-40B4-BE49-F238E27FC236}">
+                <a16:creationId xmlns:a16="http://schemas.microsoft.com/office/drawing/2014/main" xmlns="" id="{62BB4F8D-44B7-9866-F7B2-6375CB902974}"/>
+              </a:ext>
+            </a:extLst>
+          </p:cNvPr>
+          <p:cNvSpPr>
+            <a:spLocks noGrp="1"/>
+          </p:cNvSpPr>
+          <p:nvPr>
+            <p:ph type="title"/>
+          </p:nvPr>
+        </p:nvSpPr>
+        <p:spPr>
+          <a:xfrm>
+            <a:off x="0" y="-134470"/>
+            <a:ext cx="12192000" cy="3630705"/>
+          </a:xfrm>
+          <a:noFill/>
+        </p:spPr>
+        <p:txBody>
+          <a:bodyPr anchor="ctr">
+            <a:normAutofit/>
+          </a:bodyPr>
+          <a:lstStyle/>
+          <a:p>
+            <a:pPr algn="ctr"/>
+            <a:r>
+              <a:rPr lang="en-US" sz="7200" b="1" dirty="0">
+                <a:solidFill>
+                  <a:schemeClr val="tx1"/>
+                </a:solidFill>
+                <a:latin typeface="Barlow Condensed ExtraLight" panose="00000306000000000000" pitchFamily="2" charset="0"/>
+              </a:rPr>
+              <a:t>JavaScript</a:t>
+            </a:r>
+            <a:r>
+              <a:rPr lang="en-US" sz="7200" b="1" dirty="0">
+                <a:solidFill>
+                  <a:schemeClr val="tx1"/>
+                </a:solidFill>
+                <a:latin typeface="Barlow Black" panose="00000A00000000000000" pitchFamily="2" charset="0"/>
+              </a:rPr>
+              <a:t/>
+            </a:r>
+            <a:br>
+              <a:rPr lang="en-US" sz="7200" b="1" dirty="0">
+                <a:solidFill>
+                  <a:schemeClr val="tx1"/>
+                </a:solidFill>
+                <a:latin typeface="Barlow Black" panose="00000A00000000000000" pitchFamily="2" charset="0"/>
+              </a:rPr>
+            </a:br>
+            <a:r>
+              <a:rPr lang="en-US" sz="7200" b="1" dirty="0">
+                <a:solidFill>
+                  <a:schemeClr val="tx1"/>
+                </a:solidFill>
+                <a:latin typeface="Barlow Black" panose="00000A00000000000000" pitchFamily="2" charset="0"/>
+              </a:rPr>
+              <a:t>Chapter – </a:t>
+            </a:r>
+            <a:r>
+              <a:rPr lang="en-US" sz="7200" b="1" dirty="0" smtClean="0">
+                <a:solidFill>
+                  <a:schemeClr val="tx1"/>
+                </a:solidFill>
+                <a:latin typeface="Barlow Black" panose="00000A00000000000000" pitchFamily="2" charset="0"/>
+              </a:rPr>
+              <a:t>6</a:t>
+            </a:r>
+            <a:r>
+              <a:rPr lang="en-US" sz="7200" b="1" dirty="0">
+                <a:solidFill>
+                  <a:schemeClr val="tx1"/>
+                </a:solidFill>
+                <a:latin typeface="Barlow Black" panose="00000A00000000000000" pitchFamily="2" charset="0"/>
+              </a:rPr>
+              <a:t/>
+            </a:r>
+            <a:br>
+              <a:rPr lang="en-US" sz="7200" b="1" dirty="0">
+                <a:solidFill>
+                  <a:schemeClr val="tx1"/>
+                </a:solidFill>
+                <a:latin typeface="Barlow Black" panose="00000A00000000000000" pitchFamily="2" charset="0"/>
+              </a:rPr>
+            </a:br>
+            <a:r>
+              <a:rPr lang="en-US" sz="2800" dirty="0" smtClean="0">
+                <a:solidFill>
+                  <a:schemeClr val="accent2">
+                    <a:lumMod val="60000"/>
+                    <a:lumOff val="40000"/>
+                  </a:schemeClr>
+                </a:solidFill>
+                <a:latin typeface="Bahnschrift Light Condensed" pitchFamily="34" charset="0"/>
+              </a:rPr>
+              <a:t>(</a:t>
+            </a:r>
+            <a:r>
+              <a:rPr lang="en-US" dirty="0" smtClean="0">
+                <a:solidFill>
+                  <a:schemeClr val="accent2">
+                    <a:lumMod val="60000"/>
+                    <a:lumOff val="40000"/>
+                  </a:schemeClr>
+                </a:solidFill>
+                <a:latin typeface="Bahnschrift Light Condensed" pitchFamily="34" charset="0"/>
+              </a:rPr>
+              <a:t>Type conversion</a:t>
+            </a:r>
+            <a:r>
+              <a:rPr lang="en-US" sz="2800" dirty="0" smtClean="0">
+                <a:solidFill>
+                  <a:schemeClr val="accent2">
+                    <a:lumMod val="60000"/>
+                    <a:lumOff val="40000"/>
+                  </a:schemeClr>
+                </a:solidFill>
+                <a:latin typeface="Bahnschrift Light Condensed" pitchFamily="34" charset="0"/>
+              </a:rPr>
+              <a:t>)</a:t>
+            </a:r>
+            <a:endParaRPr lang="en-IN" sz="2800" dirty="0">
+              <a:solidFill>
+                <a:schemeClr val="accent2">
+                  <a:lumMod val="60000"/>
+                  <a:lumOff val="40000"/>
+                </a:schemeClr>
+              </a:solidFill>
+              <a:latin typeface="Bahnschrift Light Condensed" pitchFamily="34" charset="0"/>
+            </a:endParaRPr>
+          </a:p>
+        </p:txBody>
+      </p:sp>
+      <p:sp>
+        <p:nvSpPr>
+          <p:cNvPr id="8" name="TextBox 7">
+            <a:extLst>
+              <a:ext uri="{FF2B5EF4-FFF2-40B4-BE49-F238E27FC236}">
+                <a16:creationId xmlns:a16="http://schemas.microsoft.com/office/drawing/2014/main" xmlns="" id="{6E6F1672-8C91-3FA6-CB80-58FD68172333}"/>
+              </a:ext>
+            </a:extLst>
+          </p:cNvPr>
+          <p:cNvSpPr txBox="1"/>
+          <p:nvPr/>
+        </p:nvSpPr>
+        <p:spPr>
+          <a:xfrm>
+            <a:off x="0" y="6013537"/>
+            <a:ext cx="12192000" cy="369332"/>
+          </a:xfrm>
+          <a:prstGeom prst="rect">
+            <a:avLst/>
+          </a:prstGeom>
+          <a:noFill/>
+        </p:spPr>
+        <p:txBody>
+          <a:bodyPr wrap="square" rtlCol="0">
+            <a:spAutoFit/>
+          </a:bodyPr>
+          <a:lstStyle/>
+          <a:p>
+            <a:pPr algn="ctr"/>
+            <a:r>
+              <a:rPr lang="en-US" b="1" dirty="0"/>
+              <a:t>Gautam Kumar- </a:t>
+            </a:r>
+            <a:r>
+              <a:rPr lang="en-US" dirty="0">
+                <a:solidFill>
+                  <a:schemeClr val="tx1">
+                    <a:lumMod val="50000"/>
+                    <a:lumOff val="50000"/>
+                  </a:schemeClr>
+                </a:solidFill>
+              </a:rPr>
+              <a:t>uidhtml.com</a:t>
+            </a:r>
+            <a:endParaRPr lang="en-IN" dirty="0">
+              <a:solidFill>
+                <a:schemeClr val="tx1">
+                  <a:lumMod val="50000"/>
+                  <a:lumOff val="50000"/>
+                </a:schemeClr>
+              </a:solidFill>
+            </a:endParaRPr>
+          </a:p>
+        </p:txBody>
+      </p:sp>
+      <p:pic>
+        <p:nvPicPr>
+          <p:cNvPr id="3074" name="Picture 2" descr="C:\Users\Gautam\Downloads\Blank board - Page 1 (2).png"/>
+          <p:cNvPicPr>
+            <a:picLocks noChangeAspect="1" noChangeArrowheads="1"/>
+          </p:cNvPicPr>
+          <p:nvPr/>
+        </p:nvPicPr>
+        <p:blipFill>
+          <a:blip r:embed="rId2"/>
+          <a:srcRect/>
+          <a:stretch>
+            <a:fillRect/>
+          </a:stretch>
+        </p:blipFill>
+        <p:spPr bwMode="auto">
+          <a:xfrm>
+            <a:off x="1947226" y="3818966"/>
+            <a:ext cx="8172052" cy="1568821"/>
+          </a:xfrm>
+          <a:prstGeom prst="rect">
+            <a:avLst/>
+          </a:prstGeom>
+          <a:noFill/>
+        </p:spPr>
+      </p:pic>
+    </p:spTree>
+    <p:extLst>
+      <p:ext uri="{BB962C8B-B14F-4D97-AF65-F5344CB8AC3E}">
+        <p14:creationId xmlns:p14="http://schemas.microsoft.com/office/powerpoint/2010/main" xmlns="" val="3287175084"/>
       </p:ext>
     </p:extLst>
   </p:cSld>
@@ -14974,7 +16646,7 @@
         <p:cNvPr id="1" name="">
           <a:extLst>
             <a:ext uri="{FF2B5EF4-FFF2-40B4-BE49-F238E27FC236}">
-              <a16:creationId xmlns:a16="http://schemas.microsoft.com/office/drawing/2014/main" id="{D210C62D-BA73-7142-9269-B229A82A227F}"/>
+              <a16:creationId xmlns:a16="http://schemas.microsoft.com/office/drawing/2014/main" xmlns="" id="{D210C62D-BA73-7142-9269-B229A82A227F}"/>
             </a:ext>
           </a:extLst>
         </p:cNvPr>
@@ -14994,7 +16666,7 @@
           <p:cNvPr id="2" name="Title 1">
             <a:extLst>
               <a:ext uri="{FF2B5EF4-FFF2-40B4-BE49-F238E27FC236}">
-                <a16:creationId xmlns:a16="http://schemas.microsoft.com/office/drawing/2014/main" id="{D5018557-B8C1-B1F3-960D-C1C68708243B}"/>
+                <a16:creationId xmlns:a16="http://schemas.microsoft.com/office/drawing/2014/main" xmlns="" id="{D5018557-B8C1-B1F3-960D-C1C68708243B}"/>
               </a:ext>
             </a:extLst>
           </p:cNvPr>
@@ -15034,7 +16706,7 @@
           <p:cNvPr id="3" name="Content Placeholder 2">
             <a:extLst>
               <a:ext uri="{FF2B5EF4-FFF2-40B4-BE49-F238E27FC236}">
-                <a16:creationId xmlns:a16="http://schemas.microsoft.com/office/drawing/2014/main" id="{24415AF3-2B9F-42C3-52C5-51254FAF8249}"/>
+                <a16:creationId xmlns:a16="http://schemas.microsoft.com/office/drawing/2014/main" xmlns="" id="{24415AF3-2B9F-42C3-52C5-51254FAF8249}"/>
               </a:ext>
             </a:extLst>
           </p:cNvPr>
@@ -15100,7 +16772,7 @@
           <p:cNvPr id="6" name="Ribbon: Curved and Tilted Down 5">
             <a:extLst>
               <a:ext uri="{FF2B5EF4-FFF2-40B4-BE49-F238E27FC236}">
-                <a16:creationId xmlns:a16="http://schemas.microsoft.com/office/drawing/2014/main" id="{7BEA6FE3-CC31-4B69-44C6-04DF1B8559E4}"/>
+                <a16:creationId xmlns:a16="http://schemas.microsoft.com/office/drawing/2014/main" xmlns="" id="{7BEA6FE3-CC31-4B69-44C6-04DF1B8559E4}"/>
               </a:ext>
             </a:extLst>
           </p:cNvPr>
@@ -15173,7 +16845,7 @@
           <p:cNvPr id="8" name="Scroll: Vertical 7">
             <a:extLst>
               <a:ext uri="{FF2B5EF4-FFF2-40B4-BE49-F238E27FC236}">
-                <a16:creationId xmlns:a16="http://schemas.microsoft.com/office/drawing/2014/main" id="{2D8E823F-54F9-1A01-E3EF-B3211339B30B}"/>
+                <a16:creationId xmlns:a16="http://schemas.microsoft.com/office/drawing/2014/main" xmlns="" id="{2D8E823F-54F9-1A01-E3EF-B3211339B30B}"/>
               </a:ext>
             </a:extLst>
           </p:cNvPr>
@@ -15443,7 +17115,623 @@
     </p:spTree>
     <p:extLst>
       <p:ext uri="{BB962C8B-B14F-4D97-AF65-F5344CB8AC3E}">
-        <p14:creationId xmlns:p14="http://schemas.microsoft.com/office/powerpoint/2010/main" val="3274136203"/>
+        <p14:creationId xmlns:p14="http://schemas.microsoft.com/office/powerpoint/2010/main" xmlns="" val="3274136203"/>
+      </p:ext>
+    </p:extLst>
+  </p:cSld>
+  <p:clrMapOvr>
+    <a:masterClrMapping/>
+  </p:clrMapOvr>
+</p:sld>
+</file>
+
+<file path=ppt/slides/slide30.xml><?xml version="1.0" encoding="utf-8"?>
+<p:sld xmlns:a="http://schemas.openxmlformats.org/drawingml/2006/main" xmlns:r="http://schemas.openxmlformats.org/officeDocument/2006/relationships" xmlns:p="http://schemas.openxmlformats.org/presentationml/2006/main">
+  <p:cSld>
+    <p:spTree>
+      <p:nvGrpSpPr>
+        <p:cNvPr id="1" name="">
+          <a:extLst>
+            <a:ext uri="{FF2B5EF4-FFF2-40B4-BE49-F238E27FC236}">
+              <a16:creationId xmlns:a16="http://schemas.microsoft.com/office/drawing/2014/main" xmlns="" id="{4586E9D7-F5F8-14CC-9DF6-FC4AF2EA4249}"/>
+            </a:ext>
+          </a:extLst>
+        </p:cNvPr>
+        <p:cNvGrpSpPr/>
+        <p:nvPr/>
+      </p:nvGrpSpPr>
+      <p:grpSpPr>
+        <a:xfrm>
+          <a:off x="0" y="0"/>
+          <a:ext cx="0" cy="0"/>
+          <a:chOff x="0" y="0"/>
+          <a:chExt cx="0" cy="0"/>
+        </a:xfrm>
+      </p:grpSpPr>
+      <p:sp>
+        <p:nvSpPr>
+          <p:cNvPr id="2" name="Title 1">
+            <a:extLst>
+              <a:ext uri="{FF2B5EF4-FFF2-40B4-BE49-F238E27FC236}">
+                <a16:creationId xmlns:a16="http://schemas.microsoft.com/office/drawing/2014/main" xmlns="" id="{D8B67155-694F-FF61-7CDD-33A20A316215}"/>
+              </a:ext>
+            </a:extLst>
+          </p:cNvPr>
+          <p:cNvSpPr>
+            <a:spLocks noGrp="1"/>
+          </p:cNvSpPr>
+          <p:nvPr>
+            <p:ph type="title"/>
+          </p:nvPr>
+        </p:nvSpPr>
+        <p:spPr>
+          <a:xfrm>
+            <a:off x="334435" y="1057275"/>
+            <a:ext cx="8596668" cy="742950"/>
+          </a:xfrm>
+        </p:spPr>
+        <p:txBody>
+          <a:bodyPr>
+            <a:normAutofit fontScale="90000"/>
+          </a:bodyPr>
+          <a:lstStyle/>
+          <a:p>
+            <a:r>
+              <a:rPr lang="en-US" b="1" dirty="0" smtClean="0">
+                <a:solidFill>
+                  <a:schemeClr val="tx1"/>
+                </a:solidFill>
+                <a:latin typeface="Bahnschrift SemiLight" pitchFamily="34" charset="0"/>
+              </a:rPr>
+              <a:t>Implicit data type conversion</a:t>
+            </a:r>
+            <a:endParaRPr lang="en-US" dirty="0">
+              <a:solidFill>
+                <a:schemeClr val="bg1">
+                  <a:lumMod val="65000"/>
+                  <a:lumOff val="35000"/>
+                </a:schemeClr>
+              </a:solidFill>
+              <a:latin typeface="Bahnschrift Light Condensed" pitchFamily="34" charset="0"/>
+            </a:endParaRPr>
+          </a:p>
+        </p:txBody>
+      </p:sp>
+      <p:sp>
+        <p:nvSpPr>
+          <p:cNvPr id="6" name="Scroll: Vertical 5">
+            <a:extLst>
+              <a:ext uri="{FF2B5EF4-FFF2-40B4-BE49-F238E27FC236}">
+                <a16:creationId xmlns:a16="http://schemas.microsoft.com/office/drawing/2014/main" xmlns="" id="{1A4C732A-2840-82C8-A359-298D925E33B3}"/>
+              </a:ext>
+            </a:extLst>
+          </p:cNvPr>
+          <p:cNvSpPr/>
+          <p:nvPr/>
+        </p:nvSpPr>
+        <p:spPr>
+          <a:xfrm>
+            <a:off x="7851914" y="715617"/>
+            <a:ext cx="4240696" cy="4989444"/>
+          </a:xfrm>
+          <a:prstGeom prst="verticalScroll">
+            <a:avLst/>
+          </a:prstGeom>
+          <a:solidFill>
+            <a:schemeClr val="bg2">
+              <a:lumMod val="75000"/>
+            </a:schemeClr>
+          </a:solidFill>
+          <a:ln>
+            <a:solidFill>
+              <a:schemeClr val="bg1">
+                <a:lumMod val="75000"/>
+                <a:lumOff val="25000"/>
+              </a:schemeClr>
+            </a:solidFill>
+          </a:ln>
+        </p:spPr>
+        <p:style>
+          <a:lnRef idx="2">
+            <a:schemeClr val="accent1">
+              <a:shade val="15000"/>
+            </a:schemeClr>
+          </a:lnRef>
+          <a:fillRef idx="1">
+            <a:schemeClr val="accent1"/>
+          </a:fillRef>
+          <a:effectRef idx="0">
+            <a:schemeClr val="accent1"/>
+          </a:effectRef>
+          <a:fontRef idx="minor">
+            <a:schemeClr val="lt1"/>
+          </a:fontRef>
+        </p:style>
+        <p:txBody>
+          <a:bodyPr rtlCol="0" anchor="t"/>
+          <a:lstStyle/>
+          <a:p>
+            <a:pPr>
+              <a:lnSpc>
+                <a:spcPct val="150000"/>
+              </a:lnSpc>
+            </a:pPr>
+            <a:r>
+              <a:rPr lang="en-US" sz="2400" b="1" dirty="0" smtClean="0">
+                <a:solidFill>
+                  <a:schemeClr val="tx1"/>
+                </a:solidFill>
+              </a:rPr>
+              <a:t>Type conversion </a:t>
+            </a:r>
+            <a:br>
+              <a:rPr lang="en-US" sz="2400" b="1" dirty="0" smtClean="0">
+                <a:solidFill>
+                  <a:schemeClr val="tx1"/>
+                </a:solidFill>
+              </a:rPr>
+            </a:br>
+            <a:r>
+              <a:rPr lang="en-US" b="1" dirty="0" smtClean="0">
+                <a:solidFill>
+                  <a:schemeClr val="accent1">
+                    <a:lumMod val="60000"/>
+                    <a:lumOff val="40000"/>
+                  </a:schemeClr>
+                </a:solidFill>
+              </a:rPr>
+              <a:t>Topics</a:t>
+            </a:r>
+            <a:endParaRPr lang="en-US" b="1" dirty="0">
+              <a:solidFill>
+                <a:schemeClr val="accent1">
+                  <a:lumMod val="60000"/>
+                  <a:lumOff val="40000"/>
+                </a:schemeClr>
+              </a:solidFill>
+            </a:endParaRPr>
+          </a:p>
+          <a:p>
+            <a:pPr marL="285750" indent="-285750">
+              <a:lnSpc>
+                <a:spcPct val="150000"/>
+              </a:lnSpc>
+              <a:buFont typeface="Courier New" panose="02070309020205020404" pitchFamily="49" charset="0"/>
+              <a:buChar char="o"/>
+            </a:pPr>
+            <a:r>
+              <a:rPr lang="en-US" sz="1400" dirty="0" smtClean="0"/>
+              <a:t>Implicit Conversion (Coercion)</a:t>
+            </a:r>
+            <a:endParaRPr lang="en-US" sz="1400" dirty="0">
+              <a:solidFill>
+                <a:schemeClr val="tx1">
+                  <a:lumMod val="85000"/>
+                </a:schemeClr>
+              </a:solidFill>
+            </a:endParaRPr>
+          </a:p>
+          <a:p>
+            <a:pPr marL="285750" indent="-285750">
+              <a:lnSpc>
+                <a:spcPct val="150000"/>
+              </a:lnSpc>
+              <a:buFont typeface="Courier New" panose="02070309020205020404" pitchFamily="49" charset="0"/>
+              <a:buChar char="o"/>
+            </a:pPr>
+            <a:r>
+              <a:rPr lang="en-US" sz="1400" dirty="0" smtClean="0"/>
+              <a:t>Explicit Conversion (Casting)</a:t>
+            </a:r>
+            <a:endParaRPr lang="en-IN" sz="1400" dirty="0">
+              <a:solidFill>
+                <a:schemeClr val="tx1">
+                  <a:lumMod val="85000"/>
+                </a:schemeClr>
+              </a:solidFill>
+            </a:endParaRPr>
+          </a:p>
+        </p:txBody>
+      </p:sp>
+      <p:sp>
+        <p:nvSpPr>
+          <p:cNvPr id="7" name="TextBox 6"/>
+          <p:cNvSpPr txBox="1"/>
+          <p:nvPr/>
+        </p:nvSpPr>
+        <p:spPr>
+          <a:xfrm>
+            <a:off x="9614263" y="801189"/>
+            <a:ext cx="1401346" cy="369332"/>
+          </a:xfrm>
+          <a:prstGeom prst="rect">
+            <a:avLst/>
+          </a:prstGeom>
+          <a:noFill/>
+        </p:spPr>
+        <p:txBody>
+          <a:bodyPr wrap="none" rtlCol="0">
+            <a:spAutoFit/>
+          </a:bodyPr>
+          <a:lstStyle/>
+          <a:p>
+            <a:r>
+              <a:rPr lang="en-IN" b="1" dirty="0">
+                <a:solidFill>
+                  <a:schemeClr val="accent2">
+                    <a:lumMod val="60000"/>
+                    <a:lumOff val="40000"/>
+                  </a:schemeClr>
+                </a:solidFill>
+                <a:latin typeface="Bahnschrift SemiLight" pitchFamily="34" charset="0"/>
+              </a:rPr>
+              <a:t>Chapter - </a:t>
+            </a:r>
+            <a:r>
+              <a:rPr lang="en-IN" b="1" dirty="0" smtClean="0">
+                <a:solidFill>
+                  <a:schemeClr val="accent2">
+                    <a:lumMod val="60000"/>
+                    <a:lumOff val="40000"/>
+                  </a:schemeClr>
+                </a:solidFill>
+                <a:latin typeface="Bahnschrift SemiLight" pitchFamily="34" charset="0"/>
+              </a:rPr>
+              <a:t>6</a:t>
+            </a:r>
+            <a:endParaRPr lang="en-US" b="1" dirty="0">
+              <a:solidFill>
+                <a:schemeClr val="accent2">
+                  <a:lumMod val="60000"/>
+                  <a:lumOff val="40000"/>
+                </a:schemeClr>
+              </a:solidFill>
+              <a:latin typeface="Bahnschrift SemiLight" pitchFamily="34" charset="0"/>
+            </a:endParaRPr>
+          </a:p>
+        </p:txBody>
+      </p:sp>
+      <p:sp>
+        <p:nvSpPr>
+          <p:cNvPr id="8" name="Text Placeholder 7"/>
+          <p:cNvSpPr>
+            <a:spLocks noGrp="1"/>
+          </p:cNvSpPr>
+          <p:nvPr>
+            <p:ph type="body" idx="1"/>
+          </p:nvPr>
+        </p:nvSpPr>
+        <p:spPr>
+          <a:xfrm>
+            <a:off x="416078" y="1796868"/>
+            <a:ext cx="7134253" cy="1618685"/>
+          </a:xfrm>
+        </p:spPr>
+        <p:txBody>
+          <a:bodyPr anchor="t">
+            <a:normAutofit/>
+          </a:bodyPr>
+          <a:lstStyle/>
+          <a:p>
+            <a:r>
+              <a:rPr lang="en-US" dirty="0" smtClean="0"/>
+              <a:t>When type conversion is done by JavaScript automatically, it is called </a:t>
+            </a:r>
+            <a:r>
+              <a:rPr lang="en-US" b="1" dirty="0" smtClean="0"/>
+              <a:t>implicit type</a:t>
+            </a:r>
+            <a:r>
+              <a:rPr lang="en-US" dirty="0" smtClean="0"/>
+              <a:t> conversion. For example, when we use the '</a:t>
+            </a:r>
+            <a:r>
+              <a:rPr lang="en-US" b="1" dirty="0" smtClean="0"/>
+              <a:t>+</a:t>
+            </a:r>
+            <a:r>
+              <a:rPr lang="en-US" dirty="0" smtClean="0"/>
+              <a:t>' operator with the </a:t>
+            </a:r>
+            <a:r>
+              <a:rPr lang="en-US" b="1" dirty="0" smtClean="0"/>
+              <a:t>string</a:t>
+            </a:r>
+            <a:r>
+              <a:rPr lang="en-US" dirty="0" smtClean="0"/>
+              <a:t> and </a:t>
+            </a:r>
+            <a:r>
+              <a:rPr lang="en-US" b="1" dirty="0" smtClean="0"/>
+              <a:t>number</a:t>
+            </a:r>
+            <a:r>
+              <a:rPr lang="en-US" dirty="0" smtClean="0"/>
+              <a:t> operands, JavaScript converts the </a:t>
+            </a:r>
+            <a:r>
+              <a:rPr lang="en-US" b="1" dirty="0" smtClean="0"/>
+              <a:t>number</a:t>
+            </a:r>
+            <a:r>
+              <a:rPr lang="en-US" dirty="0" smtClean="0"/>
+              <a:t> to a </a:t>
+            </a:r>
+            <a:r>
+              <a:rPr lang="en-US" b="1" dirty="0" smtClean="0"/>
+              <a:t>string</a:t>
+            </a:r>
+            <a:r>
+              <a:rPr lang="en-US" dirty="0" smtClean="0"/>
+              <a:t> and concatenates it with the string.</a:t>
+            </a:r>
+            <a:endParaRPr lang="en-US" dirty="0"/>
+          </a:p>
+        </p:txBody>
+      </p:sp>
+      <p:sp>
+        <p:nvSpPr>
+          <p:cNvPr id="9" name="TextBox 8"/>
+          <p:cNvSpPr txBox="1"/>
+          <p:nvPr/>
+        </p:nvSpPr>
+        <p:spPr>
+          <a:xfrm>
+            <a:off x="322729" y="493057"/>
+            <a:ext cx="2991525" cy="584775"/>
+          </a:xfrm>
+          <a:prstGeom prst="rect">
+            <a:avLst/>
+          </a:prstGeom>
+          <a:noFill/>
+        </p:spPr>
+        <p:txBody>
+          <a:bodyPr wrap="none" rtlCol="0">
+            <a:spAutoFit/>
+          </a:bodyPr>
+          <a:lstStyle/>
+          <a:p>
+            <a:r>
+              <a:rPr lang="en-US" sz="3200" dirty="0" smtClean="0">
+                <a:solidFill>
+                  <a:schemeClr val="tx1">
+                    <a:lumMod val="65000"/>
+                    <a:lumOff val="35000"/>
+                  </a:schemeClr>
+                </a:solidFill>
+                <a:latin typeface="Barlow Condensed" pitchFamily="2" charset="0"/>
+              </a:rPr>
+              <a:t>JavaScript </a:t>
+            </a:r>
+            <a:r>
+              <a:rPr lang="en-US" sz="3200" dirty="0" smtClean="0">
+                <a:solidFill>
+                  <a:schemeClr val="tx1">
+                    <a:lumMod val="65000"/>
+                    <a:lumOff val="35000"/>
+                  </a:schemeClr>
+                </a:solidFill>
+                <a:latin typeface="Barlow Condensed" pitchFamily="2" charset="0"/>
+              </a:rPr>
+              <a:t>Tutorials</a:t>
+            </a:r>
+            <a:endParaRPr lang="en-IN" sz="3200" dirty="0" smtClean="0">
+              <a:solidFill>
+                <a:schemeClr val="tx1">
+                  <a:lumMod val="65000"/>
+                  <a:lumOff val="35000"/>
+                </a:schemeClr>
+              </a:solidFill>
+              <a:latin typeface="Barlow Condensed" pitchFamily="2" charset="0"/>
+            </a:endParaRPr>
+          </a:p>
+        </p:txBody>
+      </p:sp>
+      <p:sp>
+        <p:nvSpPr>
+          <p:cNvPr id="10" name="Title 1">
+            <a:extLst>
+              <a:ext uri="{FF2B5EF4-FFF2-40B4-BE49-F238E27FC236}">
+                <a16:creationId xmlns:a16="http://schemas.microsoft.com/office/drawing/2014/main" xmlns="" id="{D8B67155-694F-FF61-7CDD-33A20A316215}"/>
+              </a:ext>
+            </a:extLst>
+          </p:cNvPr>
+          <p:cNvSpPr txBox="1">
+            <a:spLocks/>
+          </p:cNvSpPr>
+          <p:nvPr/>
+        </p:nvSpPr>
+        <p:spPr>
+          <a:xfrm>
+            <a:off x="343400" y="3540499"/>
+            <a:ext cx="8596668" cy="742950"/>
+          </a:xfrm>
+          <a:prstGeom prst="rect">
+            <a:avLst/>
+          </a:prstGeom>
+        </p:spPr>
+        <p:txBody>
+          <a:bodyPr vert="horz" lIns="91440" tIns="45720" rIns="91440" bIns="45720" rtlCol="0" anchor="ctr">
+            <a:normAutofit fontScale="97500" lnSpcReduction="10000"/>
+          </a:bodyPr>
+          <a:lstStyle/>
+          <a:p>
+            <a:pPr marL="0" marR="0" lvl="0" indent="0" algn="l" defTabSz="457200" rtl="0" eaLnBrk="1" fontAlgn="auto" latinLnBrk="0" hangingPunct="1">
+              <a:lnSpc>
+                <a:spcPct val="100000"/>
+              </a:lnSpc>
+              <a:spcBef>
+                <a:spcPct val="0"/>
+              </a:spcBef>
+              <a:spcAft>
+                <a:spcPts val="0"/>
+              </a:spcAft>
+              <a:buClrTx/>
+              <a:buSzTx/>
+              <a:buFontTx/>
+              <a:buNone/>
+              <a:tabLst/>
+              <a:defRPr/>
+            </a:pPr>
+            <a:r>
+              <a:rPr kumimoji="0" lang="en-US" sz="4400" b="1" i="0" u="none" strike="noStrike" kern="1200" cap="none" spc="0" normalizeH="0" baseline="0" noProof="0" dirty="0" smtClean="0">
+                <a:ln>
+                  <a:noFill/>
+                </a:ln>
+                <a:solidFill>
+                  <a:schemeClr val="tx1"/>
+                </a:solidFill>
+                <a:effectLst/>
+                <a:uLnTx/>
+                <a:uFillTx/>
+                <a:latin typeface="Bahnschrift SemiLight" pitchFamily="34" charset="0"/>
+                <a:ea typeface="+mj-ea"/>
+                <a:cs typeface="+mj-cs"/>
+              </a:rPr>
+              <a:t>Explicit data type conversion</a:t>
+            </a:r>
+            <a:endParaRPr kumimoji="0" lang="en-US" sz="4400" b="0" i="0" u="none" strike="noStrike" kern="1200" cap="none" spc="0" normalizeH="0" baseline="0" noProof="0" dirty="0">
+              <a:ln>
+                <a:noFill/>
+              </a:ln>
+              <a:solidFill>
+                <a:schemeClr val="bg1">
+                  <a:lumMod val="65000"/>
+                  <a:lumOff val="35000"/>
+                </a:schemeClr>
+              </a:solidFill>
+              <a:effectLst/>
+              <a:uLnTx/>
+              <a:uFillTx/>
+              <a:latin typeface="Bahnschrift Light Condensed" pitchFamily="34" charset="0"/>
+              <a:ea typeface="+mj-ea"/>
+              <a:cs typeface="+mj-cs"/>
+            </a:endParaRPr>
+          </a:p>
+        </p:txBody>
+      </p:sp>
+      <p:sp>
+        <p:nvSpPr>
+          <p:cNvPr id="11" name="Text Placeholder 7"/>
+          <p:cNvSpPr txBox="1">
+            <a:spLocks/>
+          </p:cNvSpPr>
+          <p:nvPr/>
+        </p:nvSpPr>
+        <p:spPr>
+          <a:xfrm>
+            <a:off x="478831" y="4351809"/>
+            <a:ext cx="7134253" cy="1618685"/>
+          </a:xfrm>
+          <a:prstGeom prst="rect">
+            <a:avLst/>
+          </a:prstGeom>
+        </p:spPr>
+        <p:txBody>
+          <a:bodyPr vert="horz" lIns="91440" tIns="45720" rIns="91440" bIns="45720" rtlCol="0" anchor="t">
+            <a:normAutofit/>
+          </a:bodyPr>
+          <a:lstStyle/>
+          <a:p>
+            <a:pPr lvl="0">
+              <a:spcBef>
+                <a:spcPts val="1000"/>
+              </a:spcBef>
+              <a:buClr>
+                <a:schemeClr val="accent1"/>
+              </a:buClr>
+              <a:buSzPct val="80000"/>
+            </a:pPr>
+            <a:r>
+              <a:rPr lang="en-US" dirty="0" smtClean="0"/>
+              <a:t>In many cases, programmers are required to convert the data type of the variable manually. It is called the </a:t>
+            </a:r>
+            <a:r>
+              <a:rPr lang="en-US" b="1" dirty="0" smtClean="0"/>
+              <a:t>explicit type</a:t>
+            </a:r>
+            <a:r>
+              <a:rPr lang="en-US" dirty="0" smtClean="0"/>
+              <a:t> conversion</a:t>
+            </a:r>
+            <a:r>
+              <a:rPr lang="en-US" dirty="0" smtClean="0"/>
+              <a:t>.</a:t>
+            </a:r>
+            <a:br>
+              <a:rPr lang="en-US" dirty="0" smtClean="0"/>
+            </a:br>
+            <a:r>
+              <a:rPr lang="en-US" dirty="0" smtClean="0"/>
+              <a:t/>
+            </a:r>
+            <a:br>
+              <a:rPr lang="en-US" dirty="0" smtClean="0"/>
+            </a:br>
+            <a:r>
+              <a:rPr lang="en-US" dirty="0" smtClean="0"/>
+              <a:t>String(), </a:t>
+            </a:r>
+            <a:r>
+              <a:rPr lang="en-US" dirty="0" err="1" smtClean="0"/>
+              <a:t>toString</a:t>
+            </a:r>
+            <a:r>
+              <a:rPr lang="en-US" dirty="0" smtClean="0"/>
+              <a:t>(), </a:t>
+            </a:r>
+            <a:r>
+              <a:rPr lang="en-US" smtClean="0"/>
+              <a:t>number(), + sign, </a:t>
+            </a:r>
+            <a:r>
+              <a:rPr lang="en-US" dirty="0" err="1" smtClean="0"/>
+              <a:t>parseInt</a:t>
+            </a:r>
+            <a:r>
+              <a:rPr lang="en-US" dirty="0" smtClean="0"/>
+              <a:t>(), </a:t>
+            </a:r>
+            <a:r>
+              <a:rPr lang="en-US" dirty="0" err="1" smtClean="0"/>
+              <a:t>parseFloat</a:t>
+            </a:r>
+            <a:r>
+              <a:rPr lang="en-US" dirty="0" smtClean="0"/>
+              <a:t>(), </a:t>
+            </a:r>
+            <a:r>
+              <a:rPr lang="en-US" dirty="0" err="1" smtClean="0"/>
+              <a:t>boolean</a:t>
+            </a:r>
+            <a:r>
+              <a:rPr lang="en-US" dirty="0" smtClean="0"/>
+              <a:t>(), !! sign </a:t>
+            </a:r>
+            <a:endParaRPr kumimoji="0" lang="en-US" sz="1800" b="0" i="0" u="none" strike="noStrike" kern="1200" cap="none" spc="0" normalizeH="0" baseline="0" noProof="0" dirty="0">
+              <a:ln>
+                <a:noFill/>
+              </a:ln>
+              <a:solidFill>
+                <a:schemeClr val="tx1">
+                  <a:lumMod val="75000"/>
+                  <a:lumOff val="25000"/>
+                </a:schemeClr>
+              </a:solidFill>
+              <a:effectLst/>
+              <a:uLnTx/>
+              <a:uFillTx/>
+              <a:latin typeface="+mn-lt"/>
+              <a:ea typeface="+mn-ea"/>
+              <a:cs typeface="+mn-cs"/>
+            </a:endParaRPr>
+          </a:p>
+        </p:txBody>
+      </p:sp>
+    </p:spTree>
+    <p:extLst>
+      <p:ext uri="{BB962C8B-B14F-4D97-AF65-F5344CB8AC3E}">
+        <p14:creationId xmlns:p14="http://schemas.microsoft.com/office/powerpoint/2010/main" xmlns="" val="3002471670"/>
       </p:ext>
     </p:extLst>
   </p:cSld>
@@ -15461,7 +17749,7 @@
         <p:cNvPr id="1" name="">
           <a:extLst>
             <a:ext uri="{FF2B5EF4-FFF2-40B4-BE49-F238E27FC236}">
-              <a16:creationId xmlns:a16="http://schemas.microsoft.com/office/drawing/2014/main" id="{7139B82A-D876-79BD-D559-707BFDC5D481}"/>
+              <a16:creationId xmlns:a16="http://schemas.microsoft.com/office/drawing/2014/main" xmlns="" id="{7139B82A-D876-79BD-D559-707BFDC5D481}"/>
             </a:ext>
           </a:extLst>
         </p:cNvPr>
@@ -15481,7 +17769,7 @@
           <p:cNvPr id="8" name="Title 1">
             <a:extLst>
               <a:ext uri="{FF2B5EF4-FFF2-40B4-BE49-F238E27FC236}">
-                <a16:creationId xmlns:a16="http://schemas.microsoft.com/office/drawing/2014/main" id="{4C8D5637-E45A-11BE-1BA4-F40373E8D014}"/>
+                <a16:creationId xmlns:a16="http://schemas.microsoft.com/office/drawing/2014/main" xmlns="" id="{4C8D5637-E45A-11BE-1BA4-F40373E8D014}"/>
               </a:ext>
             </a:extLst>
           </p:cNvPr>
@@ -15518,7 +17806,7 @@
           <p:cNvPr id="3" name="Content Placeholder 2">
             <a:extLst>
               <a:ext uri="{FF2B5EF4-FFF2-40B4-BE49-F238E27FC236}">
-                <a16:creationId xmlns:a16="http://schemas.microsoft.com/office/drawing/2014/main" id="{86EB63D1-C74F-75B0-CE48-A95AEA2A21A1}"/>
+                <a16:creationId xmlns:a16="http://schemas.microsoft.com/office/drawing/2014/main" xmlns="" id="{86EB63D1-C74F-75B0-CE48-A95AEA2A21A1}"/>
               </a:ext>
             </a:extLst>
           </p:cNvPr>
@@ -15579,7 +17867,7 @@
           <p:cNvPr id="5" name="Ribbon: Curved and Tilted Down 4">
             <a:extLst>
               <a:ext uri="{FF2B5EF4-FFF2-40B4-BE49-F238E27FC236}">
-                <a16:creationId xmlns:a16="http://schemas.microsoft.com/office/drawing/2014/main" id="{75419B56-A4AB-830D-A49F-7700EED8C0FA}"/>
+                <a16:creationId xmlns:a16="http://schemas.microsoft.com/office/drawing/2014/main" xmlns="" id="{75419B56-A4AB-830D-A49F-7700EED8C0FA}"/>
               </a:ext>
             </a:extLst>
           </p:cNvPr>
@@ -15652,7 +17940,7 @@
           <p:cNvPr id="10" name="Scroll: Vertical 9">
             <a:extLst>
               <a:ext uri="{FF2B5EF4-FFF2-40B4-BE49-F238E27FC236}">
-                <a16:creationId xmlns:a16="http://schemas.microsoft.com/office/drawing/2014/main" id="{CD6C5744-A805-1655-2B2A-4D4D0DD0695E}"/>
+                <a16:creationId xmlns:a16="http://schemas.microsoft.com/office/drawing/2014/main" xmlns="" id="{CD6C5744-A805-1655-2B2A-4D4D0DD0695E}"/>
               </a:ext>
             </a:extLst>
           </p:cNvPr>
@@ -15968,7 +18256,7 @@
     </p:spTree>
     <p:extLst>
       <p:ext uri="{BB962C8B-B14F-4D97-AF65-F5344CB8AC3E}">
-        <p14:creationId xmlns:p14="http://schemas.microsoft.com/office/powerpoint/2010/main" val="3157857213"/>
+        <p14:creationId xmlns:p14="http://schemas.microsoft.com/office/powerpoint/2010/main" xmlns="" val="3157857213"/>
       </p:ext>
     </p:extLst>
   </p:cSld>
@@ -15986,7 +18274,7 @@
         <p:cNvPr id="1" name="">
           <a:extLst>
             <a:ext uri="{FF2B5EF4-FFF2-40B4-BE49-F238E27FC236}">
-              <a16:creationId xmlns:a16="http://schemas.microsoft.com/office/drawing/2014/main" id="{53D929B9-0FF5-B5F7-0DB4-914C4F4A1BB2}"/>
+              <a16:creationId xmlns:a16="http://schemas.microsoft.com/office/drawing/2014/main" xmlns="" id="{53D929B9-0FF5-B5F7-0DB4-914C4F4A1BB2}"/>
             </a:ext>
           </a:extLst>
         </p:cNvPr>
@@ -16006,7 +18294,7 @@
           <p:cNvPr id="7" name="Title 1">
             <a:extLst>
               <a:ext uri="{FF2B5EF4-FFF2-40B4-BE49-F238E27FC236}">
-                <a16:creationId xmlns:a16="http://schemas.microsoft.com/office/drawing/2014/main" id="{2D810556-B3F2-D67B-C5C6-43963FC8DAE7}"/>
+                <a16:creationId xmlns:a16="http://schemas.microsoft.com/office/drawing/2014/main" xmlns="" id="{2D810556-B3F2-D67B-C5C6-43963FC8DAE7}"/>
               </a:ext>
             </a:extLst>
           </p:cNvPr>
@@ -16043,7 +18331,7 @@
           <p:cNvPr id="3" name="Content Placeholder 2">
             <a:extLst>
               <a:ext uri="{FF2B5EF4-FFF2-40B4-BE49-F238E27FC236}">
-                <a16:creationId xmlns:a16="http://schemas.microsoft.com/office/drawing/2014/main" id="{8F0952B2-F12D-991D-3EC9-9526D8EDED87}"/>
+                <a16:creationId xmlns:a16="http://schemas.microsoft.com/office/drawing/2014/main" xmlns="" id="{8F0952B2-F12D-991D-3EC9-9526D8EDED87}"/>
               </a:ext>
             </a:extLst>
           </p:cNvPr>
@@ -16118,7 +18406,7 @@
           <p:cNvPr id="8" name="Ribbon: Curved and Tilted Down 7">
             <a:extLst>
               <a:ext uri="{FF2B5EF4-FFF2-40B4-BE49-F238E27FC236}">
-                <a16:creationId xmlns:a16="http://schemas.microsoft.com/office/drawing/2014/main" id="{C9C1F804-0CF6-A2DC-646C-9B9441D8EBB0}"/>
+                <a16:creationId xmlns:a16="http://schemas.microsoft.com/office/drawing/2014/main" xmlns="" id="{C9C1F804-0CF6-A2DC-646C-9B9441D8EBB0}"/>
               </a:ext>
             </a:extLst>
           </p:cNvPr>
@@ -16191,7 +18479,7 @@
           <p:cNvPr id="9" name="Scroll: Vertical 8">
             <a:extLst>
               <a:ext uri="{FF2B5EF4-FFF2-40B4-BE49-F238E27FC236}">
-                <a16:creationId xmlns:a16="http://schemas.microsoft.com/office/drawing/2014/main" id="{94613FC4-1176-9125-467B-B6CE33BB59CD}"/>
+                <a16:creationId xmlns:a16="http://schemas.microsoft.com/office/drawing/2014/main" xmlns="" id="{94613FC4-1176-9125-467B-B6CE33BB59CD}"/>
               </a:ext>
             </a:extLst>
           </p:cNvPr>
@@ -16507,7 +18795,7 @@
     </p:spTree>
     <p:extLst>
       <p:ext uri="{BB962C8B-B14F-4D97-AF65-F5344CB8AC3E}">
-        <p14:creationId xmlns:p14="http://schemas.microsoft.com/office/powerpoint/2010/main" val="2302025808"/>
+        <p14:creationId xmlns:p14="http://schemas.microsoft.com/office/powerpoint/2010/main" xmlns="" val="2302025808"/>
       </p:ext>
     </p:extLst>
   </p:cSld>
@@ -16525,7 +18813,7 @@
         <p:cNvPr id="1" name="">
           <a:extLst>
             <a:ext uri="{FF2B5EF4-FFF2-40B4-BE49-F238E27FC236}">
-              <a16:creationId xmlns:a16="http://schemas.microsoft.com/office/drawing/2014/main" id="{744B94CD-0809-14B6-E79F-D0C06F89CA15}"/>
+              <a16:creationId xmlns:a16="http://schemas.microsoft.com/office/drawing/2014/main" xmlns="" id="{744B94CD-0809-14B6-E79F-D0C06F89CA15}"/>
             </a:ext>
           </a:extLst>
         </p:cNvPr>
@@ -16545,7 +18833,7 @@
           <p:cNvPr id="9" name="Title 8">
             <a:extLst>
               <a:ext uri="{FF2B5EF4-FFF2-40B4-BE49-F238E27FC236}">
-                <a16:creationId xmlns:a16="http://schemas.microsoft.com/office/drawing/2014/main" id="{F3A13225-B875-57E9-5CCB-88427D8711E0}"/>
+                <a16:creationId xmlns:a16="http://schemas.microsoft.com/office/drawing/2014/main" xmlns="" id="{F3A13225-B875-57E9-5CCB-88427D8711E0}"/>
               </a:ext>
             </a:extLst>
           </p:cNvPr>
@@ -16585,7 +18873,7 @@
           <p:cNvPr id="3" name="Content Placeholder 2">
             <a:extLst>
               <a:ext uri="{FF2B5EF4-FFF2-40B4-BE49-F238E27FC236}">
-                <a16:creationId xmlns:a16="http://schemas.microsoft.com/office/drawing/2014/main" id="{29D21329-5AAF-6358-9761-2C4901A09C8C}"/>
+                <a16:creationId xmlns:a16="http://schemas.microsoft.com/office/drawing/2014/main" xmlns="" id="{29D21329-5AAF-6358-9761-2C4901A09C8C}"/>
               </a:ext>
             </a:extLst>
           </p:cNvPr>
@@ -16632,7 +18920,7 @@
           <p:cNvPr id="5" name="Title 1">
             <a:extLst>
               <a:ext uri="{FF2B5EF4-FFF2-40B4-BE49-F238E27FC236}">
-                <a16:creationId xmlns:a16="http://schemas.microsoft.com/office/drawing/2014/main" id="{23B0E81A-A704-BABA-7779-F926A6BFCB35}"/>
+                <a16:creationId xmlns:a16="http://schemas.microsoft.com/office/drawing/2014/main" xmlns="" id="{23B0E81A-A704-BABA-7779-F926A6BFCB35}"/>
               </a:ext>
             </a:extLst>
           </p:cNvPr>
@@ -16740,7 +19028,7 @@
           <p:cNvPr id="10" name="Ribbon: Curved and Tilted Down 9">
             <a:extLst>
               <a:ext uri="{FF2B5EF4-FFF2-40B4-BE49-F238E27FC236}">
-                <a16:creationId xmlns:a16="http://schemas.microsoft.com/office/drawing/2014/main" id="{3DBA1B1D-2AF2-C619-7353-1037498CD788}"/>
+                <a16:creationId xmlns:a16="http://schemas.microsoft.com/office/drawing/2014/main" xmlns="" id="{3DBA1B1D-2AF2-C619-7353-1037498CD788}"/>
               </a:ext>
             </a:extLst>
           </p:cNvPr>
@@ -16813,7 +19101,7 @@
           <p:cNvPr id="11" name="Scroll: Vertical 10">
             <a:extLst>
               <a:ext uri="{FF2B5EF4-FFF2-40B4-BE49-F238E27FC236}">
-                <a16:creationId xmlns:a16="http://schemas.microsoft.com/office/drawing/2014/main" id="{BE18EA22-49FD-59C7-DB0C-3006A91F02E6}"/>
+                <a16:creationId xmlns:a16="http://schemas.microsoft.com/office/drawing/2014/main" xmlns="" id="{BE18EA22-49FD-59C7-DB0C-3006A91F02E6}"/>
               </a:ext>
             </a:extLst>
           </p:cNvPr>
@@ -17129,7 +19417,7 @@
     </p:spTree>
     <p:extLst>
       <p:ext uri="{BB962C8B-B14F-4D97-AF65-F5344CB8AC3E}">
-        <p14:creationId xmlns:p14="http://schemas.microsoft.com/office/powerpoint/2010/main" val="1090188544"/>
+        <p14:creationId xmlns:p14="http://schemas.microsoft.com/office/powerpoint/2010/main" xmlns="" val="1090188544"/>
       </p:ext>
     </p:extLst>
   </p:cSld>
@@ -17147,7 +19435,7 @@
         <p:cNvPr id="1" name="">
           <a:extLst>
             <a:ext uri="{FF2B5EF4-FFF2-40B4-BE49-F238E27FC236}">
-              <a16:creationId xmlns:a16="http://schemas.microsoft.com/office/drawing/2014/main" id="{DFFF01F8-A8CD-88AB-42C3-C2E632C5474A}"/>
+              <a16:creationId xmlns:a16="http://schemas.microsoft.com/office/drawing/2014/main" xmlns="" id="{DFFF01F8-A8CD-88AB-42C3-C2E632C5474A}"/>
             </a:ext>
           </a:extLst>
         </p:cNvPr>
@@ -17167,7 +19455,7 @@
           <p:cNvPr id="7" name="Title 8">
             <a:extLst>
               <a:ext uri="{FF2B5EF4-FFF2-40B4-BE49-F238E27FC236}">
-                <a16:creationId xmlns:a16="http://schemas.microsoft.com/office/drawing/2014/main" id="{2CFF87A5-7472-22DC-030C-A3CCBBC3E824}"/>
+                <a16:creationId xmlns:a16="http://schemas.microsoft.com/office/drawing/2014/main" xmlns="" id="{2CFF87A5-7472-22DC-030C-A3CCBBC3E824}"/>
               </a:ext>
             </a:extLst>
           </p:cNvPr>
@@ -17207,7 +19495,7 @@
           <p:cNvPr id="3" name="Content Placeholder 2">
             <a:extLst>
               <a:ext uri="{FF2B5EF4-FFF2-40B4-BE49-F238E27FC236}">
-                <a16:creationId xmlns:a16="http://schemas.microsoft.com/office/drawing/2014/main" id="{1702553A-B321-D7AA-C0CD-A58D1C15FC38}"/>
+                <a16:creationId xmlns:a16="http://schemas.microsoft.com/office/drawing/2014/main" xmlns="" id="{1702553A-B321-D7AA-C0CD-A58D1C15FC38}"/>
               </a:ext>
             </a:extLst>
           </p:cNvPr>
@@ -17280,7 +19568,7 @@
           <p:cNvPr id="8" name="Ribbon: Curved and Tilted Down 7">
             <a:extLst>
               <a:ext uri="{FF2B5EF4-FFF2-40B4-BE49-F238E27FC236}">
-                <a16:creationId xmlns:a16="http://schemas.microsoft.com/office/drawing/2014/main" id="{C52AE18F-E34C-AFB6-7EA6-F589DEF7B3D0}"/>
+                <a16:creationId xmlns:a16="http://schemas.microsoft.com/office/drawing/2014/main" xmlns="" id="{C52AE18F-E34C-AFB6-7EA6-F589DEF7B3D0}"/>
               </a:ext>
             </a:extLst>
           </p:cNvPr>
@@ -17353,7 +19641,7 @@
           <p:cNvPr id="9" name="Scroll: Vertical 8">
             <a:extLst>
               <a:ext uri="{FF2B5EF4-FFF2-40B4-BE49-F238E27FC236}">
-                <a16:creationId xmlns:a16="http://schemas.microsoft.com/office/drawing/2014/main" id="{18A95ECD-6D24-C669-0CF8-39F3FBCDDA47}"/>
+                <a16:creationId xmlns:a16="http://schemas.microsoft.com/office/drawing/2014/main" xmlns="" id="{18A95ECD-6D24-C669-0CF8-39F3FBCDDA47}"/>
               </a:ext>
             </a:extLst>
           </p:cNvPr>
@@ -17669,7 +19957,7 @@
     </p:spTree>
     <p:extLst>
       <p:ext uri="{BB962C8B-B14F-4D97-AF65-F5344CB8AC3E}">
-        <p14:creationId xmlns:p14="http://schemas.microsoft.com/office/powerpoint/2010/main" val="1870717373"/>
+        <p14:creationId xmlns:p14="http://schemas.microsoft.com/office/powerpoint/2010/main" xmlns="" val="1870717373"/>
       </p:ext>
     </p:extLst>
   </p:cSld>
@@ -17687,7 +19975,7 @@
         <p:cNvPr id="1" name="">
           <a:extLst>
             <a:ext uri="{FF2B5EF4-FFF2-40B4-BE49-F238E27FC236}">
-              <a16:creationId xmlns:a16="http://schemas.microsoft.com/office/drawing/2014/main" id="{D224F207-D856-6E6D-9995-159800F589CD}"/>
+              <a16:creationId xmlns:a16="http://schemas.microsoft.com/office/drawing/2014/main" xmlns="" id="{D224F207-D856-6E6D-9995-159800F589CD}"/>
             </a:ext>
           </a:extLst>
         </p:cNvPr>
@@ -17707,7 +19995,7 @@
           <p:cNvPr id="5" name="Title 8">
             <a:extLst>
               <a:ext uri="{FF2B5EF4-FFF2-40B4-BE49-F238E27FC236}">
-                <a16:creationId xmlns:a16="http://schemas.microsoft.com/office/drawing/2014/main" id="{2773E7F4-011C-1186-0E83-1852CC157898}"/>
+                <a16:creationId xmlns:a16="http://schemas.microsoft.com/office/drawing/2014/main" xmlns="" id="{2773E7F4-011C-1186-0E83-1852CC157898}"/>
               </a:ext>
             </a:extLst>
           </p:cNvPr>
@@ -17747,7 +20035,7 @@
           <p:cNvPr id="3" name="Content Placeholder 2">
             <a:extLst>
               <a:ext uri="{FF2B5EF4-FFF2-40B4-BE49-F238E27FC236}">
-                <a16:creationId xmlns:a16="http://schemas.microsoft.com/office/drawing/2014/main" id="{9466D7CB-A484-F4DC-1247-3B0F9708D05F}"/>
+                <a16:creationId xmlns:a16="http://schemas.microsoft.com/office/drawing/2014/main" xmlns="" id="{9466D7CB-A484-F4DC-1247-3B0F9708D05F}"/>
               </a:ext>
             </a:extLst>
           </p:cNvPr>
@@ -17794,7 +20082,7 @@
           <p:cNvPr id="6" name="Ribbon: Curved and Tilted Down 5">
             <a:extLst>
               <a:ext uri="{FF2B5EF4-FFF2-40B4-BE49-F238E27FC236}">
-                <a16:creationId xmlns:a16="http://schemas.microsoft.com/office/drawing/2014/main" id="{DA6F4F8F-5ABC-21EF-A2AB-B0F4B5058194}"/>
+                <a16:creationId xmlns:a16="http://schemas.microsoft.com/office/drawing/2014/main" xmlns="" id="{DA6F4F8F-5ABC-21EF-A2AB-B0F4B5058194}"/>
               </a:ext>
             </a:extLst>
           </p:cNvPr>
@@ -17867,7 +20155,7 @@
           <p:cNvPr id="7" name="Scroll: Vertical 6">
             <a:extLst>
               <a:ext uri="{FF2B5EF4-FFF2-40B4-BE49-F238E27FC236}">
-                <a16:creationId xmlns:a16="http://schemas.microsoft.com/office/drawing/2014/main" id="{694A0A23-21B4-6D65-E96A-AD1A0AC04FCC}"/>
+                <a16:creationId xmlns:a16="http://schemas.microsoft.com/office/drawing/2014/main" xmlns="" id="{694A0A23-21B4-6D65-E96A-AD1A0AC04FCC}"/>
               </a:ext>
             </a:extLst>
           </p:cNvPr>
@@ -18183,7 +20471,7 @@
     </p:spTree>
     <p:extLst>
       <p:ext uri="{BB962C8B-B14F-4D97-AF65-F5344CB8AC3E}">
-        <p14:creationId xmlns:p14="http://schemas.microsoft.com/office/powerpoint/2010/main" val="755787835"/>
+        <p14:creationId xmlns:p14="http://schemas.microsoft.com/office/powerpoint/2010/main" xmlns="" val="755787835"/>
       </p:ext>
     </p:extLst>
   </p:cSld>
@@ -18201,7 +20489,7 @@
         <p:cNvPr id="1" name="">
           <a:extLst>
             <a:ext uri="{FF2B5EF4-FFF2-40B4-BE49-F238E27FC236}">
-              <a16:creationId xmlns:a16="http://schemas.microsoft.com/office/drawing/2014/main" id="{517DE5E6-801F-A2FD-C03F-6F5486821075}"/>
+              <a16:creationId xmlns:a16="http://schemas.microsoft.com/office/drawing/2014/main" xmlns="" id="{517DE5E6-801F-A2FD-C03F-6F5486821075}"/>
             </a:ext>
           </a:extLst>
         </p:cNvPr>
@@ -18221,7 +20509,7 @@
           <p:cNvPr id="2" name="Title 1">
             <a:extLst>
               <a:ext uri="{FF2B5EF4-FFF2-40B4-BE49-F238E27FC236}">
-                <a16:creationId xmlns:a16="http://schemas.microsoft.com/office/drawing/2014/main" id="{5F9D859A-CC6B-038D-5AE0-901278C3F6CE}"/>
+                <a16:creationId xmlns:a16="http://schemas.microsoft.com/office/drawing/2014/main" xmlns="" id="{5F9D859A-CC6B-038D-5AE0-901278C3F6CE}"/>
               </a:ext>
             </a:extLst>
           </p:cNvPr>
@@ -18259,7 +20547,7 @@
           <p:cNvPr id="3" name="Content Placeholder 2">
             <a:extLst>
               <a:ext uri="{FF2B5EF4-FFF2-40B4-BE49-F238E27FC236}">
-                <a16:creationId xmlns:a16="http://schemas.microsoft.com/office/drawing/2014/main" id="{E5BE3A65-ADA6-AEAF-69B6-B9779A59851F}"/>
+                <a16:creationId xmlns:a16="http://schemas.microsoft.com/office/drawing/2014/main" xmlns="" id="{E5BE3A65-ADA6-AEAF-69B6-B9779A59851F}"/>
               </a:ext>
             </a:extLst>
           </p:cNvPr>
@@ -18300,7 +20588,7 @@
           <p:cNvPr id="6" name="Ribbon: Curved and Tilted Down 5">
             <a:extLst>
               <a:ext uri="{FF2B5EF4-FFF2-40B4-BE49-F238E27FC236}">
-                <a16:creationId xmlns:a16="http://schemas.microsoft.com/office/drawing/2014/main" id="{571A9BAF-7164-4534-E0BD-EE0EDF7090A3}"/>
+                <a16:creationId xmlns:a16="http://schemas.microsoft.com/office/drawing/2014/main" xmlns="" id="{571A9BAF-7164-4534-E0BD-EE0EDF7090A3}"/>
               </a:ext>
             </a:extLst>
           </p:cNvPr>
@@ -18373,7 +20661,7 @@
           <p:cNvPr id="7" name="Scroll: Vertical 6">
             <a:extLst>
               <a:ext uri="{FF2B5EF4-FFF2-40B4-BE49-F238E27FC236}">
-                <a16:creationId xmlns:a16="http://schemas.microsoft.com/office/drawing/2014/main" id="{82B3A4DF-1DDB-DA3D-C01E-CA4956EC89D7}"/>
+                <a16:creationId xmlns:a16="http://schemas.microsoft.com/office/drawing/2014/main" xmlns="" id="{82B3A4DF-1DDB-DA3D-C01E-CA4956EC89D7}"/>
               </a:ext>
             </a:extLst>
           </p:cNvPr>
@@ -18689,7 +20977,7 @@
     </p:spTree>
     <p:extLst>
       <p:ext uri="{BB962C8B-B14F-4D97-AF65-F5344CB8AC3E}">
-        <p14:creationId xmlns:p14="http://schemas.microsoft.com/office/powerpoint/2010/main" val="3160480842"/>
+        <p14:creationId xmlns:p14="http://schemas.microsoft.com/office/powerpoint/2010/main" xmlns="" val="3160480842"/>
       </p:ext>
     </p:extLst>
   </p:cSld>
@@ -18950,7 +21238,7 @@
   <a:extraClrSchemeLst/>
   <a:extLst>
     <a:ext uri="{05A4C25C-085E-4340-85A3-A5531E510DB2}">
-      <thm15:themeFamily xmlns:thm15="http://schemas.microsoft.com/office/thememl/2012/main" name="Facet" id="{C0C680CD-088A-49FC-A102-D699147F32B2}" vid="{8C59B386-999D-4CB6-B907-9F3997C027CC}"/>
+      <thm15:themeFamily xmlns:thm15="http://schemas.microsoft.com/office/thememl/2012/main" xmlns="" name="Facet" id="{C0C680CD-088A-49FC-A102-D699147F32B2}" vid="{8C59B386-999D-4CB6-B907-9F3997C027CC}"/>
     </a:ext>
   </a:extLst>
 </a:theme>

</xml_diff>

<commit_message>
Updated till 10th chapter
</commit_message>
<xml_diff>
--- a/Javascript Tutorials.pptx
+++ b/Javascript Tutorials.pptx
@@ -143,7 +143,7 @@
   </p:defaultTextStyle>
   <p:extLst>
     <p:ext uri="{EFAFB233-063F-42B5-8137-9DF3F51BA10A}">
-      <p15:sldGuideLst xmlns:p15="http://schemas.microsoft.com/office/powerpoint/2012/main" xmlns="">
+      <p15:sldGuideLst xmlns="" xmlns:p15="http://schemas.microsoft.com/office/powerpoint/2012/main">
         <p15:guide id="1" orient="horz" pos="2160">
           <p15:clr>
             <a:srgbClr val="A4A3A4"/>
@@ -242,7 +242,8 @@
           <a:p>
             <a:fld id="{792F6C33-F1A2-419B-BA2F-6679E9D9EF00}" type="datetimeFigureOut">
               <a:rPr lang="en-US" smtClean="0"/>
-              <a:t>9/12/2025</a:t>
+              <a:pPr/>
+              <a:t>9/14/2025</a:t>
             </a:fld>
             <a:endParaRPr lang="en-US"/>
           </a:p>
@@ -403,6 +404,7 @@
           <a:p>
             <a:fld id="{319BE468-75AD-472B-90AC-B0CB707E0D7A}" type="slidenum">
               <a:rPr lang="en-US" smtClean="0"/>
+              <a:pPr/>
               <a:t>‹#›</a:t>
             </a:fld>
             <a:endParaRPr lang="en-US"/>
@@ -574,6 +576,7 @@
           <a:p>
             <a:fld id="{319BE468-75AD-472B-90AC-B0CB707E0D7A}" type="slidenum">
               <a:rPr lang="en-US" smtClean="0"/>
+              <a:pPr/>
               <a:t>32</a:t>
             </a:fld>
             <a:endParaRPr lang="en-US"/>
@@ -655,6 +658,7 @@
           <a:p>
             <a:fld id="{319BE468-75AD-472B-90AC-B0CB707E0D7A}" type="slidenum">
               <a:rPr lang="en-US" smtClean="0"/>
+              <a:pPr/>
               <a:t>33</a:t>
             </a:fld>
             <a:endParaRPr lang="en-US"/>
@@ -736,6 +740,7 @@
           <a:p>
             <a:fld id="{319BE468-75AD-472B-90AC-B0CB707E0D7A}" type="slidenum">
               <a:rPr lang="en-US" smtClean="0"/>
+              <a:pPr/>
               <a:t>34</a:t>
             </a:fld>
             <a:endParaRPr lang="en-US"/>
@@ -817,6 +822,7 @@
           <a:p>
             <a:fld id="{319BE468-75AD-472B-90AC-B0CB707E0D7A}" type="slidenum">
               <a:rPr lang="en-US" smtClean="0"/>
+              <a:pPr/>
               <a:t>35</a:t>
             </a:fld>
             <a:endParaRPr lang="en-US"/>
@@ -1556,7 +1562,7 @@
             <a:fld id="{48A87A34-81AB-432B-8DAE-1953F412C126}" type="datetimeFigureOut">
               <a:rPr lang="en-US" smtClean="0"/>
               <a:pPr/>
-              <a:t>9/12/2025</a:t>
+              <a:t>9/14/2025</a:t>
             </a:fld>
             <a:endParaRPr lang="en-US" dirty="0"/>
           </a:p>
@@ -1608,7 +1614,7 @@
     </p:spTree>
     <p:extLst>
       <p:ext uri="{BB962C8B-B14F-4D97-AF65-F5344CB8AC3E}">
-        <p14:creationId xmlns:p14="http://schemas.microsoft.com/office/powerpoint/2010/main" xmlns="" val="2121369331"/>
+        <p14:creationId xmlns="" xmlns:p14="http://schemas.microsoft.com/office/powerpoint/2010/main" val="2121369331"/>
       </p:ext>
     </p:extLst>
   </p:cSld>
@@ -1809,7 +1815,7 @@
             <a:fld id="{48A87A34-81AB-432B-8DAE-1953F412C126}" type="datetimeFigureOut">
               <a:rPr lang="en-US" smtClean="0"/>
               <a:pPr/>
-              <a:t>9/12/2025</a:t>
+              <a:t>9/14/2025</a:t>
             </a:fld>
             <a:endParaRPr lang="en-US" dirty="0"/>
           </a:p>
@@ -1861,7 +1867,7 @@
     </p:spTree>
     <p:extLst>
       <p:ext uri="{BB962C8B-B14F-4D97-AF65-F5344CB8AC3E}">
-        <p14:creationId xmlns:p14="http://schemas.microsoft.com/office/powerpoint/2010/main" xmlns="" val="4277845334"/>
+        <p14:creationId xmlns="" xmlns:p14="http://schemas.microsoft.com/office/powerpoint/2010/main" val="4277845334"/>
       </p:ext>
     </p:extLst>
   </p:cSld>
@@ -2125,7 +2131,7 @@
             <a:fld id="{48A87A34-81AB-432B-8DAE-1953F412C126}" type="datetimeFigureOut">
               <a:rPr lang="en-US" smtClean="0"/>
               <a:pPr/>
-              <a:t>9/12/2025</a:t>
+              <a:t>9/14/2025</a:t>
             </a:fld>
             <a:endParaRPr lang="en-US" dirty="0"/>
           </a:p>
@@ -2253,7 +2259,7 @@
     </p:spTree>
     <p:extLst>
       <p:ext uri="{BB962C8B-B14F-4D97-AF65-F5344CB8AC3E}">
-        <p14:creationId xmlns:p14="http://schemas.microsoft.com/office/powerpoint/2010/main" xmlns="" val="4103336880"/>
+        <p14:creationId xmlns="" xmlns:p14="http://schemas.microsoft.com/office/powerpoint/2010/main" val="4103336880"/>
       </p:ext>
     </p:extLst>
   </p:cSld>
@@ -2454,7 +2460,7 @@
             <a:fld id="{48A87A34-81AB-432B-8DAE-1953F412C126}" type="datetimeFigureOut">
               <a:rPr lang="en-US" smtClean="0"/>
               <a:pPr/>
-              <a:t>9/12/2025</a:t>
+              <a:t>9/14/2025</a:t>
             </a:fld>
             <a:endParaRPr lang="en-US" dirty="0"/>
           </a:p>
@@ -2506,7 +2512,7 @@
     </p:spTree>
     <p:extLst>
       <p:ext uri="{BB962C8B-B14F-4D97-AF65-F5344CB8AC3E}">
-        <p14:creationId xmlns:p14="http://schemas.microsoft.com/office/powerpoint/2010/main" xmlns="" val="2317848287"/>
+        <p14:creationId xmlns="" xmlns:p14="http://schemas.microsoft.com/office/powerpoint/2010/main" val="2317848287"/>
       </p:ext>
     </p:extLst>
   </p:cSld>
@@ -2770,7 +2776,7 @@
             <a:fld id="{48A87A34-81AB-432B-8DAE-1953F412C126}" type="datetimeFigureOut">
               <a:rPr lang="en-US" smtClean="0"/>
               <a:pPr/>
-              <a:t>9/12/2025</a:t>
+              <a:t>9/14/2025</a:t>
             </a:fld>
             <a:endParaRPr lang="en-US" dirty="0"/>
           </a:p>
@@ -2898,7 +2904,7 @@
     </p:spTree>
     <p:extLst>
       <p:ext uri="{BB962C8B-B14F-4D97-AF65-F5344CB8AC3E}">
-        <p14:creationId xmlns:p14="http://schemas.microsoft.com/office/powerpoint/2010/main" xmlns="" val="4054754721"/>
+        <p14:creationId xmlns="" xmlns:p14="http://schemas.microsoft.com/office/powerpoint/2010/main" val="4054754721"/>
       </p:ext>
     </p:extLst>
   </p:cSld>
@@ -3159,7 +3165,7 @@
             <a:fld id="{48A87A34-81AB-432B-8DAE-1953F412C126}" type="datetimeFigureOut">
               <a:rPr lang="en-US" smtClean="0"/>
               <a:pPr/>
-              <a:t>9/12/2025</a:t>
+              <a:t>9/14/2025</a:t>
             </a:fld>
             <a:endParaRPr lang="en-US" dirty="0"/>
           </a:p>
@@ -3211,7 +3217,7 @@
     </p:spTree>
     <p:extLst>
       <p:ext uri="{BB962C8B-B14F-4D97-AF65-F5344CB8AC3E}">
-        <p14:creationId xmlns:p14="http://schemas.microsoft.com/office/powerpoint/2010/main" xmlns="" val="3698809145"/>
+        <p14:creationId xmlns="" xmlns:p14="http://schemas.microsoft.com/office/powerpoint/2010/main" val="3698809145"/>
       </p:ext>
     </p:extLst>
   </p:cSld>
@@ -3331,7 +3337,7 @@
             <a:fld id="{48A87A34-81AB-432B-8DAE-1953F412C126}" type="datetimeFigureOut">
               <a:rPr lang="en-US" smtClean="0"/>
               <a:pPr/>
-              <a:t>9/12/2025</a:t>
+              <a:t>9/14/2025</a:t>
             </a:fld>
             <a:endParaRPr lang="en-US" dirty="0"/>
           </a:p>
@@ -3383,7 +3389,7 @@
     </p:spTree>
     <p:extLst>
       <p:ext uri="{BB962C8B-B14F-4D97-AF65-F5344CB8AC3E}">
-        <p14:creationId xmlns:p14="http://schemas.microsoft.com/office/powerpoint/2010/main" xmlns="" val="4102912012"/>
+        <p14:creationId xmlns="" xmlns:p14="http://schemas.microsoft.com/office/powerpoint/2010/main" val="4102912012"/>
       </p:ext>
     </p:extLst>
   </p:cSld>
@@ -3513,7 +3519,7 @@
             <a:fld id="{48A87A34-81AB-432B-8DAE-1953F412C126}" type="datetimeFigureOut">
               <a:rPr lang="en-US" smtClean="0"/>
               <a:pPr/>
-              <a:t>9/12/2025</a:t>
+              <a:t>9/14/2025</a:t>
             </a:fld>
             <a:endParaRPr lang="en-US" dirty="0"/>
           </a:p>
@@ -3565,7 +3571,7 @@
     </p:spTree>
     <p:extLst>
       <p:ext uri="{BB962C8B-B14F-4D97-AF65-F5344CB8AC3E}">
-        <p14:creationId xmlns:p14="http://schemas.microsoft.com/office/powerpoint/2010/main" xmlns="" val="1199620941"/>
+        <p14:creationId xmlns="" xmlns:p14="http://schemas.microsoft.com/office/powerpoint/2010/main" val="1199620941"/>
       </p:ext>
     </p:extLst>
   </p:cSld>
@@ -3691,7 +3697,7 @@
             <a:fld id="{48A87A34-81AB-432B-8DAE-1953F412C126}" type="datetimeFigureOut">
               <a:rPr lang="en-US" smtClean="0"/>
               <a:pPr/>
-              <a:t>9/12/2025</a:t>
+              <a:t>9/14/2025</a:t>
             </a:fld>
             <a:endParaRPr lang="en-US" dirty="0"/>
           </a:p>
@@ -3743,7 +3749,7 @@
     </p:spTree>
     <p:extLst>
       <p:ext uri="{BB962C8B-B14F-4D97-AF65-F5344CB8AC3E}">
-        <p14:creationId xmlns:p14="http://schemas.microsoft.com/office/powerpoint/2010/main" xmlns="" val="901355798"/>
+        <p14:creationId xmlns="" xmlns:p14="http://schemas.microsoft.com/office/powerpoint/2010/main" val="901355798"/>
       </p:ext>
     </p:extLst>
   </p:cSld>
@@ -3940,7 +3946,7 @@
             <a:fld id="{48A87A34-81AB-432B-8DAE-1953F412C126}" type="datetimeFigureOut">
               <a:rPr lang="en-US" smtClean="0"/>
               <a:pPr/>
-              <a:t>9/12/2025</a:t>
+              <a:t>9/14/2025</a:t>
             </a:fld>
             <a:endParaRPr lang="en-US" dirty="0"/>
           </a:p>
@@ -3992,7 +3998,7 @@
     </p:spTree>
     <p:extLst>
       <p:ext uri="{BB962C8B-B14F-4D97-AF65-F5344CB8AC3E}">
-        <p14:creationId xmlns:p14="http://schemas.microsoft.com/office/powerpoint/2010/main" xmlns="" val="351019068"/>
+        <p14:creationId xmlns="" xmlns:p14="http://schemas.microsoft.com/office/powerpoint/2010/main" val="351019068"/>
       </p:ext>
     </p:extLst>
   </p:cSld>
@@ -4174,7 +4180,7 @@
             <a:fld id="{48A87A34-81AB-432B-8DAE-1953F412C126}" type="datetimeFigureOut">
               <a:rPr lang="en-US" smtClean="0"/>
               <a:pPr/>
-              <a:t>9/12/2025</a:t>
+              <a:t>9/14/2025</a:t>
             </a:fld>
             <a:endParaRPr lang="en-US" dirty="0"/>
           </a:p>
@@ -4226,7 +4232,7 @@
     </p:spTree>
     <p:extLst>
       <p:ext uri="{BB962C8B-B14F-4D97-AF65-F5344CB8AC3E}">
-        <p14:creationId xmlns:p14="http://schemas.microsoft.com/office/powerpoint/2010/main" xmlns="" val="3037334119"/>
+        <p14:creationId xmlns="" xmlns:p14="http://schemas.microsoft.com/office/powerpoint/2010/main" val="3037334119"/>
       </p:ext>
     </p:extLst>
   </p:cSld>
@@ -4550,7 +4556,7 @@
             <a:fld id="{48A87A34-81AB-432B-8DAE-1953F412C126}" type="datetimeFigureOut">
               <a:rPr lang="en-US" smtClean="0"/>
               <a:pPr/>
-              <a:t>9/12/2025</a:t>
+              <a:t>9/14/2025</a:t>
             </a:fld>
             <a:endParaRPr lang="en-US" dirty="0"/>
           </a:p>
@@ -4602,7 +4608,7 @@
     </p:spTree>
     <p:extLst>
       <p:ext uri="{BB962C8B-B14F-4D97-AF65-F5344CB8AC3E}">
-        <p14:creationId xmlns:p14="http://schemas.microsoft.com/office/powerpoint/2010/main" xmlns="" val="3959179014"/>
+        <p14:creationId xmlns="" xmlns:p14="http://schemas.microsoft.com/office/powerpoint/2010/main" val="3959179014"/>
       </p:ext>
     </p:extLst>
   </p:cSld>
@@ -4675,7 +4681,7 @@
             <a:fld id="{48A87A34-81AB-432B-8DAE-1953F412C126}" type="datetimeFigureOut">
               <a:rPr lang="en-US" smtClean="0"/>
               <a:pPr/>
-              <a:t>9/12/2025</a:t>
+              <a:t>9/14/2025</a:t>
             </a:fld>
             <a:endParaRPr lang="en-US" dirty="0"/>
           </a:p>
@@ -4727,7 +4733,7 @@
     </p:spTree>
     <p:extLst>
       <p:ext uri="{BB962C8B-B14F-4D97-AF65-F5344CB8AC3E}">
-        <p14:creationId xmlns:p14="http://schemas.microsoft.com/office/powerpoint/2010/main" xmlns="" val="143817896"/>
+        <p14:creationId xmlns="" xmlns:p14="http://schemas.microsoft.com/office/powerpoint/2010/main" val="143817896"/>
       </p:ext>
     </p:extLst>
   </p:cSld>
@@ -4772,7 +4778,7 @@
             <a:fld id="{48A87A34-81AB-432B-8DAE-1953F412C126}" type="datetimeFigureOut">
               <a:rPr lang="en-US" smtClean="0"/>
               <a:pPr/>
-              <a:t>9/12/2025</a:t>
+              <a:t>9/14/2025</a:t>
             </a:fld>
             <a:endParaRPr lang="en-US" dirty="0"/>
           </a:p>
@@ -4824,7 +4830,7 @@
     </p:spTree>
     <p:extLst>
       <p:ext uri="{BB962C8B-B14F-4D97-AF65-F5344CB8AC3E}">
-        <p14:creationId xmlns:p14="http://schemas.microsoft.com/office/powerpoint/2010/main" xmlns="" val="1053529793"/>
+        <p14:creationId xmlns="" xmlns:p14="http://schemas.microsoft.com/office/powerpoint/2010/main" val="1053529793"/>
       </p:ext>
     </p:extLst>
   </p:cSld>
@@ -5029,7 +5035,7 @@
             <a:fld id="{48A87A34-81AB-432B-8DAE-1953F412C126}" type="datetimeFigureOut">
               <a:rPr lang="en-US" smtClean="0"/>
               <a:pPr/>
-              <a:t>9/12/2025</a:t>
+              <a:t>9/14/2025</a:t>
             </a:fld>
             <a:endParaRPr lang="en-US" dirty="0"/>
           </a:p>
@@ -5081,7 +5087,7 @@
     </p:spTree>
     <p:extLst>
       <p:ext uri="{BB962C8B-B14F-4D97-AF65-F5344CB8AC3E}">
-        <p14:creationId xmlns:p14="http://schemas.microsoft.com/office/powerpoint/2010/main" xmlns="" val="1549564702"/>
+        <p14:creationId xmlns="" xmlns:p14="http://schemas.microsoft.com/office/powerpoint/2010/main" val="1549564702"/>
       </p:ext>
     </p:extLst>
   </p:cSld>
@@ -5294,7 +5300,7 @@
             <a:fld id="{48A87A34-81AB-432B-8DAE-1953F412C126}" type="datetimeFigureOut">
               <a:rPr lang="en-US" smtClean="0"/>
               <a:pPr/>
-              <a:t>9/12/2025</a:t>
+              <a:t>9/14/2025</a:t>
             </a:fld>
             <a:endParaRPr lang="en-US" dirty="0"/>
           </a:p>
@@ -5346,7 +5352,7 @@
     </p:spTree>
     <p:extLst>
       <p:ext uri="{BB962C8B-B14F-4D97-AF65-F5344CB8AC3E}">
-        <p14:creationId xmlns:p14="http://schemas.microsoft.com/office/powerpoint/2010/main" xmlns="" val="1708776435"/>
+        <p14:creationId xmlns="" xmlns:p14="http://schemas.microsoft.com/office/powerpoint/2010/main" val="1708776435"/>
       </p:ext>
     </p:extLst>
   </p:cSld>
@@ -6041,7 +6047,7 @@
             <a:fld id="{48A87A34-81AB-432B-8DAE-1953F412C126}" type="datetimeFigureOut">
               <a:rPr lang="en-US" smtClean="0"/>
               <a:pPr/>
-              <a:t>9/12/2025</a:t>
+              <a:t>9/14/2025</a:t>
             </a:fld>
             <a:endParaRPr lang="en-US" dirty="0"/>
           </a:p>
@@ -6127,7 +6133,7 @@
     </p:spTree>
     <p:extLst>
       <p:ext uri="{BB962C8B-B14F-4D97-AF65-F5344CB8AC3E}">
-        <p14:creationId xmlns:p14="http://schemas.microsoft.com/office/powerpoint/2010/main" xmlns="" val="121865681"/>
+        <p14:creationId xmlns="" xmlns:p14="http://schemas.microsoft.com/office/powerpoint/2010/main" val="121865681"/>
       </p:ext>
     </p:extLst>
   </p:cSld>
@@ -6571,7 +6577,7 @@
           <p:cNvPr id="2" name="Title 1">
             <a:extLst>
               <a:ext uri="{FF2B5EF4-FFF2-40B4-BE49-F238E27FC236}">
-                <a16:creationId xmlns:a16="http://schemas.microsoft.com/office/drawing/2014/main" xmlns="" id="{EC93423C-79E8-2701-DB3F-2D4CA67D7A87}"/>
+                <a16:creationId xmlns="" xmlns:a16="http://schemas.microsoft.com/office/drawing/2014/main" id="{EC93423C-79E8-2701-DB3F-2D4CA67D7A87}"/>
               </a:ext>
             </a:extLst>
           </p:cNvPr>
@@ -6624,7 +6630,7 @@
           <p:cNvPr id="3" name="Subtitle 2">
             <a:extLst>
               <a:ext uri="{FF2B5EF4-FFF2-40B4-BE49-F238E27FC236}">
-                <a16:creationId xmlns:a16="http://schemas.microsoft.com/office/drawing/2014/main" xmlns="" id="{2A629AF9-FA04-B477-0E47-5B7F12E6FC7C}"/>
+                <a16:creationId xmlns="" xmlns:a16="http://schemas.microsoft.com/office/drawing/2014/main" id="{2A629AF9-FA04-B477-0E47-5B7F12E6FC7C}"/>
               </a:ext>
             </a:extLst>
           </p:cNvPr>
@@ -6660,7 +6666,7 @@
           <p:cNvPr id="4" name="TextBox 3">
             <a:extLst>
               <a:ext uri="{FF2B5EF4-FFF2-40B4-BE49-F238E27FC236}">
-                <a16:creationId xmlns:a16="http://schemas.microsoft.com/office/drawing/2014/main" xmlns="" id="{4BC27C14-3D93-9CDE-B1D8-91C6ACAF4DA4}"/>
+                <a16:creationId xmlns="" xmlns:a16="http://schemas.microsoft.com/office/drawing/2014/main" id="{4BC27C14-3D93-9CDE-B1D8-91C6ACAF4DA4}"/>
               </a:ext>
             </a:extLst>
           </p:cNvPr>
@@ -6709,7 +6715,7 @@
     </p:spTree>
     <p:extLst>
       <p:ext uri="{BB962C8B-B14F-4D97-AF65-F5344CB8AC3E}">
-        <p14:creationId xmlns:p14="http://schemas.microsoft.com/office/powerpoint/2010/main" xmlns="" val="889777050"/>
+        <p14:creationId xmlns="" xmlns:p14="http://schemas.microsoft.com/office/powerpoint/2010/main" val="889777050"/>
       </p:ext>
     </p:extLst>
   </p:cSld>
@@ -6727,7 +6733,7 @@
         <p:cNvPr id="1" name="">
           <a:extLst>
             <a:ext uri="{FF2B5EF4-FFF2-40B4-BE49-F238E27FC236}">
-              <a16:creationId xmlns:a16="http://schemas.microsoft.com/office/drawing/2014/main" xmlns="" id="{253BBDB7-3E52-64BD-6E92-66253059D34C}"/>
+              <a16:creationId xmlns="" xmlns:a16="http://schemas.microsoft.com/office/drawing/2014/main" id="{253BBDB7-3E52-64BD-6E92-66253059D34C}"/>
             </a:ext>
           </a:extLst>
         </p:cNvPr>
@@ -6747,7 +6753,7 @@
           <p:cNvPr id="2" name="Title 1">
             <a:extLst>
               <a:ext uri="{FF2B5EF4-FFF2-40B4-BE49-F238E27FC236}">
-                <a16:creationId xmlns:a16="http://schemas.microsoft.com/office/drawing/2014/main" xmlns="" id="{E55678BE-607F-2A2B-B318-30B2DA7F29B3}"/>
+                <a16:creationId xmlns="" xmlns:a16="http://schemas.microsoft.com/office/drawing/2014/main" id="{E55678BE-607F-2A2B-B318-30B2DA7F29B3}"/>
               </a:ext>
             </a:extLst>
           </p:cNvPr>
@@ -6784,7 +6790,7 @@
           <p:cNvPr id="3" name="Content Placeholder 2">
             <a:extLst>
               <a:ext uri="{FF2B5EF4-FFF2-40B4-BE49-F238E27FC236}">
-                <a16:creationId xmlns:a16="http://schemas.microsoft.com/office/drawing/2014/main" xmlns="" id="{A5951AC9-1751-ACAB-8097-E6D486A5D62D}"/>
+                <a16:creationId xmlns="" xmlns:a16="http://schemas.microsoft.com/office/drawing/2014/main" id="{A5951AC9-1751-ACAB-8097-E6D486A5D62D}"/>
               </a:ext>
             </a:extLst>
           </p:cNvPr>
@@ -6839,7 +6845,7 @@
           <p:cNvPr id="5" name="Ribbon: Curved and Tilted Down 4">
             <a:extLst>
               <a:ext uri="{FF2B5EF4-FFF2-40B4-BE49-F238E27FC236}">
-                <a16:creationId xmlns:a16="http://schemas.microsoft.com/office/drawing/2014/main" xmlns="" id="{29648F54-4274-51BA-8F35-F8C888E0A19B}"/>
+                <a16:creationId xmlns="" xmlns:a16="http://schemas.microsoft.com/office/drawing/2014/main" id="{29648F54-4274-51BA-8F35-F8C888E0A19B}"/>
               </a:ext>
             </a:extLst>
           </p:cNvPr>
@@ -6912,7 +6918,7 @@
           <p:cNvPr id="6" name="Scroll: Vertical 5">
             <a:extLst>
               <a:ext uri="{FF2B5EF4-FFF2-40B4-BE49-F238E27FC236}">
-                <a16:creationId xmlns:a16="http://schemas.microsoft.com/office/drawing/2014/main" xmlns="" id="{E3C4F40D-DC8F-F75B-7F98-E5029EC432CA}"/>
+                <a16:creationId xmlns="" xmlns:a16="http://schemas.microsoft.com/office/drawing/2014/main" id="{E3C4F40D-DC8F-F75B-7F98-E5029EC432CA}"/>
               </a:ext>
             </a:extLst>
           </p:cNvPr>
@@ -7228,7 +7234,7 @@
     </p:spTree>
     <p:extLst>
       <p:ext uri="{BB962C8B-B14F-4D97-AF65-F5344CB8AC3E}">
-        <p14:creationId xmlns:p14="http://schemas.microsoft.com/office/powerpoint/2010/main" xmlns="" val="609828687"/>
+        <p14:creationId xmlns="" xmlns:p14="http://schemas.microsoft.com/office/powerpoint/2010/main" val="609828687"/>
       </p:ext>
     </p:extLst>
   </p:cSld>
@@ -7246,7 +7252,7 @@
         <p:cNvPr id="1" name="">
           <a:extLst>
             <a:ext uri="{FF2B5EF4-FFF2-40B4-BE49-F238E27FC236}">
-              <a16:creationId xmlns:a16="http://schemas.microsoft.com/office/drawing/2014/main" xmlns="" id="{4586E9D7-F5F8-14CC-9DF6-FC4AF2EA4249}"/>
+              <a16:creationId xmlns="" xmlns:a16="http://schemas.microsoft.com/office/drawing/2014/main" id="{4586E9D7-F5F8-14CC-9DF6-FC4AF2EA4249}"/>
             </a:ext>
           </a:extLst>
         </p:cNvPr>
@@ -7266,7 +7272,7 @@
           <p:cNvPr id="2" name="Title 1">
             <a:extLst>
               <a:ext uri="{FF2B5EF4-FFF2-40B4-BE49-F238E27FC236}">
-                <a16:creationId xmlns:a16="http://schemas.microsoft.com/office/drawing/2014/main" xmlns="" id="{D8B67155-694F-FF61-7CDD-33A20A316215}"/>
+                <a16:creationId xmlns="" xmlns:a16="http://schemas.microsoft.com/office/drawing/2014/main" id="{D8B67155-694F-FF61-7CDD-33A20A316215}"/>
               </a:ext>
             </a:extLst>
           </p:cNvPr>
@@ -7303,7 +7309,7 @@
           <p:cNvPr id="3" name="Content Placeholder 2">
             <a:extLst>
               <a:ext uri="{FF2B5EF4-FFF2-40B4-BE49-F238E27FC236}">
-                <a16:creationId xmlns:a16="http://schemas.microsoft.com/office/drawing/2014/main" xmlns="" id="{2A53D2DA-721D-FC7E-8E09-BCBD844B6F9F}"/>
+                <a16:creationId xmlns="" xmlns:a16="http://schemas.microsoft.com/office/drawing/2014/main" id="{2A53D2DA-721D-FC7E-8E09-BCBD844B6F9F}"/>
               </a:ext>
             </a:extLst>
           </p:cNvPr>
@@ -7411,7 +7417,7 @@
           <p:cNvPr id="5" name="Ribbon: Curved and Tilted Down 4">
             <a:extLst>
               <a:ext uri="{FF2B5EF4-FFF2-40B4-BE49-F238E27FC236}">
-                <a16:creationId xmlns:a16="http://schemas.microsoft.com/office/drawing/2014/main" xmlns="" id="{3FA23525-E3EA-B8CB-FD6A-53084CA847A7}"/>
+                <a16:creationId xmlns="" xmlns:a16="http://schemas.microsoft.com/office/drawing/2014/main" id="{3FA23525-E3EA-B8CB-FD6A-53084CA847A7}"/>
               </a:ext>
             </a:extLst>
           </p:cNvPr>
@@ -7484,7 +7490,7 @@
           <p:cNvPr id="6" name="Scroll: Vertical 5">
             <a:extLst>
               <a:ext uri="{FF2B5EF4-FFF2-40B4-BE49-F238E27FC236}">
-                <a16:creationId xmlns:a16="http://schemas.microsoft.com/office/drawing/2014/main" xmlns="" id="{1A4C732A-2840-82C8-A359-298D925E33B3}"/>
+                <a16:creationId xmlns="" xmlns:a16="http://schemas.microsoft.com/office/drawing/2014/main" id="{1A4C732A-2840-82C8-A359-298D925E33B3}"/>
               </a:ext>
             </a:extLst>
           </p:cNvPr>
@@ -7800,7 +7806,7 @@
     </p:spTree>
     <p:extLst>
       <p:ext uri="{BB962C8B-B14F-4D97-AF65-F5344CB8AC3E}">
-        <p14:creationId xmlns:p14="http://schemas.microsoft.com/office/powerpoint/2010/main" xmlns="" val="3002471670"/>
+        <p14:creationId xmlns="" xmlns:p14="http://schemas.microsoft.com/office/powerpoint/2010/main" val="3002471670"/>
       </p:ext>
     </p:extLst>
   </p:cSld>
@@ -7832,7 +7838,7 @@
           <p:cNvPr id="9" name="Explosion: 14 Points 8">
             <a:extLst>
               <a:ext uri="{FF2B5EF4-FFF2-40B4-BE49-F238E27FC236}">
-                <a16:creationId xmlns:a16="http://schemas.microsoft.com/office/drawing/2014/main" xmlns="" id="{0A2CD68B-7A56-F86D-8B6F-4A8BF99B4C9E}"/>
+                <a16:creationId xmlns="" xmlns:a16="http://schemas.microsoft.com/office/drawing/2014/main" id="{0A2CD68B-7A56-F86D-8B6F-4A8BF99B4C9E}"/>
               </a:ext>
             </a:extLst>
           </p:cNvPr>
@@ -7887,7 +7893,7 @@
           <p:cNvPr id="4" name="Ribbon: Curved and Tilted Down 3">
             <a:extLst>
               <a:ext uri="{FF2B5EF4-FFF2-40B4-BE49-F238E27FC236}">
-                <a16:creationId xmlns:a16="http://schemas.microsoft.com/office/drawing/2014/main" xmlns="" id="{909DBECF-689C-9AA7-1649-9166A578EDF9}"/>
+                <a16:creationId xmlns="" xmlns:a16="http://schemas.microsoft.com/office/drawing/2014/main" id="{909DBECF-689C-9AA7-1649-9166A578EDF9}"/>
               </a:ext>
             </a:extLst>
           </p:cNvPr>
@@ -7954,7 +7960,7 @@
           <p:cNvPr id="5" name="Scroll: Vertical 4">
             <a:extLst>
               <a:ext uri="{FF2B5EF4-FFF2-40B4-BE49-F238E27FC236}">
-                <a16:creationId xmlns:a16="http://schemas.microsoft.com/office/drawing/2014/main" xmlns="" id="{38EB993A-3F18-C6B7-226F-EDD62B4B31DB}"/>
+                <a16:creationId xmlns="" xmlns:a16="http://schemas.microsoft.com/office/drawing/2014/main" id="{38EB993A-3F18-C6B7-226F-EDD62B4B31DB}"/>
               </a:ext>
             </a:extLst>
           </p:cNvPr>
@@ -8112,7 +8118,7 @@
           <p:cNvPr id="3" name="TextBox 2">
             <a:extLst>
               <a:ext uri="{FF2B5EF4-FFF2-40B4-BE49-F238E27FC236}">
-                <a16:creationId xmlns:a16="http://schemas.microsoft.com/office/drawing/2014/main" xmlns="" id="{97CE9E2B-4371-68F6-75AF-957039BA75DC}"/>
+                <a16:creationId xmlns="" xmlns:a16="http://schemas.microsoft.com/office/drawing/2014/main" id="{97CE9E2B-4371-68F6-75AF-957039BA75DC}"/>
               </a:ext>
             </a:extLst>
           </p:cNvPr>
@@ -8167,7 +8173,7 @@
           <p:cNvPr id="7" name="Title 6">
             <a:extLst>
               <a:ext uri="{FF2B5EF4-FFF2-40B4-BE49-F238E27FC236}">
-                <a16:creationId xmlns:a16="http://schemas.microsoft.com/office/drawing/2014/main" xmlns="" id="{77434EED-AEE3-6743-9008-B43A222A1CE2}"/>
+                <a16:creationId xmlns="" xmlns:a16="http://schemas.microsoft.com/office/drawing/2014/main" id="{77434EED-AEE3-6743-9008-B43A222A1CE2}"/>
               </a:ext>
             </a:extLst>
           </p:cNvPr>
@@ -8192,7 +8198,7 @@
           <p:cNvPr id="10" name="Title 1">
             <a:extLst>
               <a:ext uri="{FF2B5EF4-FFF2-40B4-BE49-F238E27FC236}">
-                <a16:creationId xmlns:a16="http://schemas.microsoft.com/office/drawing/2014/main" xmlns="" id="{6D70E990-115A-D697-159B-C41288490798}"/>
+                <a16:creationId xmlns="" xmlns:a16="http://schemas.microsoft.com/office/drawing/2014/main" id="{6D70E990-115A-D697-159B-C41288490798}"/>
               </a:ext>
             </a:extLst>
           </p:cNvPr>
@@ -8336,7 +8342,7 @@
     </p:spTree>
     <p:extLst>
       <p:ext uri="{BB962C8B-B14F-4D97-AF65-F5344CB8AC3E}">
-        <p14:creationId xmlns:p14="http://schemas.microsoft.com/office/powerpoint/2010/main" xmlns="" val="3287175084"/>
+        <p14:creationId xmlns="" xmlns:p14="http://schemas.microsoft.com/office/powerpoint/2010/main" val="3287175084"/>
       </p:ext>
     </p:extLst>
   </p:cSld>
@@ -8354,7 +8360,7 @@
         <p:cNvPr id="1" name="">
           <a:extLst>
             <a:ext uri="{FF2B5EF4-FFF2-40B4-BE49-F238E27FC236}">
-              <a16:creationId xmlns:a16="http://schemas.microsoft.com/office/drawing/2014/main" xmlns="" id="{4586E9D7-F5F8-14CC-9DF6-FC4AF2EA4249}"/>
+              <a16:creationId xmlns="" xmlns:a16="http://schemas.microsoft.com/office/drawing/2014/main" id="{4586E9D7-F5F8-14CC-9DF6-FC4AF2EA4249}"/>
             </a:ext>
           </a:extLst>
         </p:cNvPr>
@@ -8374,7 +8380,7 @@
           <p:cNvPr id="2" name="Title 1">
             <a:extLst>
               <a:ext uri="{FF2B5EF4-FFF2-40B4-BE49-F238E27FC236}">
-                <a16:creationId xmlns:a16="http://schemas.microsoft.com/office/drawing/2014/main" xmlns="" id="{D8B67155-694F-FF61-7CDD-33A20A316215}"/>
+                <a16:creationId xmlns="" xmlns:a16="http://schemas.microsoft.com/office/drawing/2014/main" id="{D8B67155-694F-FF61-7CDD-33A20A316215}"/>
               </a:ext>
             </a:extLst>
           </p:cNvPr>
@@ -8412,7 +8418,7 @@
           <p:cNvPr id="3" name="Content Placeholder 2">
             <a:extLst>
               <a:ext uri="{FF2B5EF4-FFF2-40B4-BE49-F238E27FC236}">
-                <a16:creationId xmlns:a16="http://schemas.microsoft.com/office/drawing/2014/main" xmlns="" id="{2A53D2DA-721D-FC7E-8E09-BCBD844B6F9F}"/>
+                <a16:creationId xmlns="" xmlns:a16="http://schemas.microsoft.com/office/drawing/2014/main" id="{2A53D2DA-721D-FC7E-8E09-BCBD844B6F9F}"/>
               </a:ext>
             </a:extLst>
           </p:cNvPr>
@@ -8460,7 +8466,7 @@
           <p:cNvPr id="5" name="Ribbon: Curved and Tilted Down 4">
             <a:extLst>
               <a:ext uri="{FF2B5EF4-FFF2-40B4-BE49-F238E27FC236}">
-                <a16:creationId xmlns:a16="http://schemas.microsoft.com/office/drawing/2014/main" xmlns="" id="{3FA23525-E3EA-B8CB-FD6A-53084CA847A7}"/>
+                <a16:creationId xmlns="" xmlns:a16="http://schemas.microsoft.com/office/drawing/2014/main" id="{3FA23525-E3EA-B8CB-FD6A-53084CA847A7}"/>
               </a:ext>
             </a:extLst>
           </p:cNvPr>
@@ -8533,7 +8539,7 @@
           <p:cNvPr id="6" name="Scroll: Vertical 5">
             <a:extLst>
               <a:ext uri="{FF2B5EF4-FFF2-40B4-BE49-F238E27FC236}">
-                <a16:creationId xmlns:a16="http://schemas.microsoft.com/office/drawing/2014/main" xmlns="" id="{1A4C732A-2840-82C8-A359-298D925E33B3}"/>
+                <a16:creationId xmlns="" xmlns:a16="http://schemas.microsoft.com/office/drawing/2014/main" id="{1A4C732A-2840-82C8-A359-298D925E33B3}"/>
               </a:ext>
             </a:extLst>
           </p:cNvPr>
@@ -8723,7 +8729,7 @@
     </p:spTree>
     <p:extLst>
       <p:ext uri="{BB962C8B-B14F-4D97-AF65-F5344CB8AC3E}">
-        <p14:creationId xmlns:p14="http://schemas.microsoft.com/office/powerpoint/2010/main" xmlns="" val="3002471670"/>
+        <p14:creationId xmlns="" xmlns:p14="http://schemas.microsoft.com/office/powerpoint/2010/main" val="3002471670"/>
       </p:ext>
     </p:extLst>
   </p:cSld>
@@ -8741,7 +8747,7 @@
         <p:cNvPr id="1" name="">
           <a:extLst>
             <a:ext uri="{FF2B5EF4-FFF2-40B4-BE49-F238E27FC236}">
-              <a16:creationId xmlns:a16="http://schemas.microsoft.com/office/drawing/2014/main" xmlns="" id="{4586E9D7-F5F8-14CC-9DF6-FC4AF2EA4249}"/>
+              <a16:creationId xmlns="" xmlns:a16="http://schemas.microsoft.com/office/drawing/2014/main" id="{4586E9D7-F5F8-14CC-9DF6-FC4AF2EA4249}"/>
             </a:ext>
           </a:extLst>
         </p:cNvPr>
@@ -8761,7 +8767,7 @@
           <p:cNvPr id="2" name="Title 1">
             <a:extLst>
               <a:ext uri="{FF2B5EF4-FFF2-40B4-BE49-F238E27FC236}">
-                <a16:creationId xmlns:a16="http://schemas.microsoft.com/office/drawing/2014/main" xmlns="" id="{D8B67155-694F-FF61-7CDD-33A20A316215}"/>
+                <a16:creationId xmlns="" xmlns:a16="http://schemas.microsoft.com/office/drawing/2014/main" id="{D8B67155-694F-FF61-7CDD-33A20A316215}"/>
               </a:ext>
             </a:extLst>
           </p:cNvPr>
@@ -8799,7 +8805,7 @@
           <p:cNvPr id="3" name="Content Placeholder 2">
             <a:extLst>
               <a:ext uri="{FF2B5EF4-FFF2-40B4-BE49-F238E27FC236}">
-                <a16:creationId xmlns:a16="http://schemas.microsoft.com/office/drawing/2014/main" xmlns="" id="{2A53D2DA-721D-FC7E-8E09-BCBD844B6F9F}"/>
+                <a16:creationId xmlns="" xmlns:a16="http://schemas.microsoft.com/office/drawing/2014/main" id="{2A53D2DA-721D-FC7E-8E09-BCBD844B6F9F}"/>
               </a:ext>
             </a:extLst>
           </p:cNvPr>
@@ -8923,7 +8929,7 @@
           <p:cNvPr id="5" name="Ribbon: Curved and Tilted Down 4">
             <a:extLst>
               <a:ext uri="{FF2B5EF4-FFF2-40B4-BE49-F238E27FC236}">
-                <a16:creationId xmlns:a16="http://schemas.microsoft.com/office/drawing/2014/main" xmlns="" id="{3FA23525-E3EA-B8CB-FD6A-53084CA847A7}"/>
+                <a16:creationId xmlns="" xmlns:a16="http://schemas.microsoft.com/office/drawing/2014/main" id="{3FA23525-E3EA-B8CB-FD6A-53084CA847A7}"/>
               </a:ext>
             </a:extLst>
           </p:cNvPr>
@@ -8996,7 +9002,7 @@
           <p:cNvPr id="6" name="Scroll: Vertical 5">
             <a:extLst>
               <a:ext uri="{FF2B5EF4-FFF2-40B4-BE49-F238E27FC236}">
-                <a16:creationId xmlns:a16="http://schemas.microsoft.com/office/drawing/2014/main" xmlns="" id="{1A4C732A-2840-82C8-A359-298D925E33B3}"/>
+                <a16:creationId xmlns="" xmlns:a16="http://schemas.microsoft.com/office/drawing/2014/main" id="{1A4C732A-2840-82C8-A359-298D925E33B3}"/>
               </a:ext>
             </a:extLst>
           </p:cNvPr>
@@ -9186,7 +9192,7 @@
     </p:spTree>
     <p:extLst>
       <p:ext uri="{BB962C8B-B14F-4D97-AF65-F5344CB8AC3E}">
-        <p14:creationId xmlns:p14="http://schemas.microsoft.com/office/powerpoint/2010/main" xmlns="" val="3002471670"/>
+        <p14:creationId xmlns="" xmlns:p14="http://schemas.microsoft.com/office/powerpoint/2010/main" val="3002471670"/>
       </p:ext>
     </p:extLst>
   </p:cSld>
@@ -9204,7 +9210,7 @@
         <p:cNvPr id="1" name="">
           <a:extLst>
             <a:ext uri="{FF2B5EF4-FFF2-40B4-BE49-F238E27FC236}">
-              <a16:creationId xmlns:a16="http://schemas.microsoft.com/office/drawing/2014/main" xmlns="" id="{4586E9D7-F5F8-14CC-9DF6-FC4AF2EA4249}"/>
+              <a16:creationId xmlns="" xmlns:a16="http://schemas.microsoft.com/office/drawing/2014/main" id="{4586E9D7-F5F8-14CC-9DF6-FC4AF2EA4249}"/>
             </a:ext>
           </a:extLst>
         </p:cNvPr>
@@ -9224,7 +9230,7 @@
           <p:cNvPr id="2" name="Title 1">
             <a:extLst>
               <a:ext uri="{FF2B5EF4-FFF2-40B4-BE49-F238E27FC236}">
-                <a16:creationId xmlns:a16="http://schemas.microsoft.com/office/drawing/2014/main" xmlns="" id="{D8B67155-694F-FF61-7CDD-33A20A316215}"/>
+                <a16:creationId xmlns="" xmlns:a16="http://schemas.microsoft.com/office/drawing/2014/main" id="{D8B67155-694F-FF61-7CDD-33A20A316215}"/>
               </a:ext>
             </a:extLst>
           </p:cNvPr>
@@ -9262,7 +9268,7 @@
           <p:cNvPr id="3" name="Content Placeholder 2">
             <a:extLst>
               <a:ext uri="{FF2B5EF4-FFF2-40B4-BE49-F238E27FC236}">
-                <a16:creationId xmlns:a16="http://schemas.microsoft.com/office/drawing/2014/main" xmlns="" id="{2A53D2DA-721D-FC7E-8E09-BCBD844B6F9F}"/>
+                <a16:creationId xmlns="" xmlns:a16="http://schemas.microsoft.com/office/drawing/2014/main" id="{2A53D2DA-721D-FC7E-8E09-BCBD844B6F9F}"/>
               </a:ext>
             </a:extLst>
           </p:cNvPr>
@@ -9301,7 +9307,7 @@
           <p:cNvPr id="5" name="Ribbon: Curved and Tilted Down 4">
             <a:extLst>
               <a:ext uri="{FF2B5EF4-FFF2-40B4-BE49-F238E27FC236}">
-                <a16:creationId xmlns:a16="http://schemas.microsoft.com/office/drawing/2014/main" xmlns="" id="{3FA23525-E3EA-B8CB-FD6A-53084CA847A7}"/>
+                <a16:creationId xmlns="" xmlns:a16="http://schemas.microsoft.com/office/drawing/2014/main" id="{3FA23525-E3EA-B8CB-FD6A-53084CA847A7}"/>
               </a:ext>
             </a:extLst>
           </p:cNvPr>
@@ -9374,7 +9380,7 @@
           <p:cNvPr id="6" name="Scroll: Vertical 5">
             <a:extLst>
               <a:ext uri="{FF2B5EF4-FFF2-40B4-BE49-F238E27FC236}">
-                <a16:creationId xmlns:a16="http://schemas.microsoft.com/office/drawing/2014/main" xmlns="" id="{1A4C732A-2840-82C8-A359-298D925E33B3}"/>
+                <a16:creationId xmlns="" xmlns:a16="http://schemas.microsoft.com/office/drawing/2014/main" id="{1A4C732A-2840-82C8-A359-298D925E33B3}"/>
               </a:ext>
             </a:extLst>
           </p:cNvPr>
@@ -9597,7 +9603,7 @@
     </p:spTree>
     <p:extLst>
       <p:ext uri="{BB962C8B-B14F-4D97-AF65-F5344CB8AC3E}">
-        <p14:creationId xmlns:p14="http://schemas.microsoft.com/office/powerpoint/2010/main" xmlns="" val="3002471670"/>
+        <p14:creationId xmlns="" xmlns:p14="http://schemas.microsoft.com/office/powerpoint/2010/main" val="3002471670"/>
       </p:ext>
     </p:extLst>
   </p:cSld>
@@ -9615,7 +9621,7 @@
         <p:cNvPr id="1" name="">
           <a:extLst>
             <a:ext uri="{FF2B5EF4-FFF2-40B4-BE49-F238E27FC236}">
-              <a16:creationId xmlns:a16="http://schemas.microsoft.com/office/drawing/2014/main" xmlns="" id="{4586E9D7-F5F8-14CC-9DF6-FC4AF2EA4249}"/>
+              <a16:creationId xmlns="" xmlns:a16="http://schemas.microsoft.com/office/drawing/2014/main" id="{4586E9D7-F5F8-14CC-9DF6-FC4AF2EA4249}"/>
             </a:ext>
           </a:extLst>
         </p:cNvPr>
@@ -9635,7 +9641,7 @@
           <p:cNvPr id="2" name="Title 1">
             <a:extLst>
               <a:ext uri="{FF2B5EF4-FFF2-40B4-BE49-F238E27FC236}">
-                <a16:creationId xmlns:a16="http://schemas.microsoft.com/office/drawing/2014/main" xmlns="" id="{D8B67155-694F-FF61-7CDD-33A20A316215}"/>
+                <a16:creationId xmlns="" xmlns:a16="http://schemas.microsoft.com/office/drawing/2014/main" id="{D8B67155-694F-FF61-7CDD-33A20A316215}"/>
               </a:ext>
             </a:extLst>
           </p:cNvPr>
@@ -9673,7 +9679,7 @@
           <p:cNvPr id="3" name="Content Placeholder 2">
             <a:extLst>
               <a:ext uri="{FF2B5EF4-FFF2-40B4-BE49-F238E27FC236}">
-                <a16:creationId xmlns:a16="http://schemas.microsoft.com/office/drawing/2014/main" xmlns="" id="{2A53D2DA-721D-FC7E-8E09-BCBD844B6F9F}"/>
+                <a16:creationId xmlns="" xmlns:a16="http://schemas.microsoft.com/office/drawing/2014/main" id="{2A53D2DA-721D-FC7E-8E09-BCBD844B6F9F}"/>
               </a:ext>
             </a:extLst>
           </p:cNvPr>
@@ -9870,7 +9876,7 @@
           <p:cNvPr id="5" name="Ribbon: Curved and Tilted Down 4">
             <a:extLst>
               <a:ext uri="{FF2B5EF4-FFF2-40B4-BE49-F238E27FC236}">
-                <a16:creationId xmlns:a16="http://schemas.microsoft.com/office/drawing/2014/main" xmlns="" id="{3FA23525-E3EA-B8CB-FD6A-53084CA847A7}"/>
+                <a16:creationId xmlns="" xmlns:a16="http://schemas.microsoft.com/office/drawing/2014/main" id="{3FA23525-E3EA-B8CB-FD6A-53084CA847A7}"/>
               </a:ext>
             </a:extLst>
           </p:cNvPr>
@@ -9943,7 +9949,7 @@
           <p:cNvPr id="6" name="Scroll: Vertical 5">
             <a:extLst>
               <a:ext uri="{FF2B5EF4-FFF2-40B4-BE49-F238E27FC236}">
-                <a16:creationId xmlns:a16="http://schemas.microsoft.com/office/drawing/2014/main" xmlns="" id="{1A4C732A-2840-82C8-A359-298D925E33B3}"/>
+                <a16:creationId xmlns="" xmlns:a16="http://schemas.microsoft.com/office/drawing/2014/main" id="{1A4C732A-2840-82C8-A359-298D925E33B3}"/>
               </a:ext>
             </a:extLst>
           </p:cNvPr>
@@ -10133,7 +10139,7 @@
     </p:spTree>
     <p:extLst>
       <p:ext uri="{BB962C8B-B14F-4D97-AF65-F5344CB8AC3E}">
-        <p14:creationId xmlns:p14="http://schemas.microsoft.com/office/powerpoint/2010/main" xmlns="" val="3002471670"/>
+        <p14:creationId xmlns="" xmlns:p14="http://schemas.microsoft.com/office/powerpoint/2010/main" val="3002471670"/>
       </p:ext>
     </p:extLst>
   </p:cSld>
@@ -10165,7 +10171,7 @@
           <p:cNvPr id="9" name="Explosion: 14 Points 8">
             <a:extLst>
               <a:ext uri="{FF2B5EF4-FFF2-40B4-BE49-F238E27FC236}">
-                <a16:creationId xmlns:a16="http://schemas.microsoft.com/office/drawing/2014/main" xmlns="" id="{0A2CD68B-7A56-F86D-8B6F-4A8BF99B4C9E}"/>
+                <a16:creationId xmlns="" xmlns:a16="http://schemas.microsoft.com/office/drawing/2014/main" id="{0A2CD68B-7A56-F86D-8B6F-4A8BF99B4C9E}"/>
               </a:ext>
             </a:extLst>
           </p:cNvPr>
@@ -10220,7 +10226,7 @@
           <p:cNvPr id="2" name="Title 1">
             <a:extLst>
               <a:ext uri="{FF2B5EF4-FFF2-40B4-BE49-F238E27FC236}">
-                <a16:creationId xmlns:a16="http://schemas.microsoft.com/office/drawing/2014/main" xmlns="" id="{62BB4F8D-44B7-9866-F7B2-6375CB902974}"/>
+                <a16:creationId xmlns="" xmlns:a16="http://schemas.microsoft.com/office/drawing/2014/main" id="{62BB4F8D-44B7-9866-F7B2-6375CB902974}"/>
               </a:ext>
             </a:extLst>
           </p:cNvPr>
@@ -10338,7 +10344,7 @@
           <p:cNvPr id="4" name="Ribbon: Curved and Tilted Down 3">
             <a:extLst>
               <a:ext uri="{FF2B5EF4-FFF2-40B4-BE49-F238E27FC236}">
-                <a16:creationId xmlns:a16="http://schemas.microsoft.com/office/drawing/2014/main" xmlns="" id="{909DBECF-689C-9AA7-1649-9166A578EDF9}"/>
+                <a16:creationId xmlns="" xmlns:a16="http://schemas.microsoft.com/office/drawing/2014/main" id="{909DBECF-689C-9AA7-1649-9166A578EDF9}"/>
               </a:ext>
             </a:extLst>
           </p:cNvPr>
@@ -10405,7 +10411,7 @@
           <p:cNvPr id="5" name="Scroll: Vertical 4">
             <a:extLst>
               <a:ext uri="{FF2B5EF4-FFF2-40B4-BE49-F238E27FC236}">
-                <a16:creationId xmlns:a16="http://schemas.microsoft.com/office/drawing/2014/main" xmlns="" id="{38EB993A-3F18-C6B7-226F-EDD62B4B31DB}"/>
+                <a16:creationId xmlns="" xmlns:a16="http://schemas.microsoft.com/office/drawing/2014/main" id="{38EB993A-3F18-C6B7-226F-EDD62B4B31DB}"/>
               </a:ext>
             </a:extLst>
           </p:cNvPr>
@@ -10846,7 +10852,7 @@
           <p:cNvPr id="3" name="TextBox 2">
             <a:extLst>
               <a:ext uri="{FF2B5EF4-FFF2-40B4-BE49-F238E27FC236}">
-                <a16:creationId xmlns:a16="http://schemas.microsoft.com/office/drawing/2014/main" xmlns="" id="{17C06F8A-D1E5-957B-796C-892968B95A50}"/>
+                <a16:creationId xmlns="" xmlns:a16="http://schemas.microsoft.com/office/drawing/2014/main" id="{17C06F8A-D1E5-957B-796C-892968B95A50}"/>
               </a:ext>
             </a:extLst>
           </p:cNvPr>
@@ -10899,7 +10905,7 @@
     </p:spTree>
     <p:extLst>
       <p:ext uri="{BB962C8B-B14F-4D97-AF65-F5344CB8AC3E}">
-        <p14:creationId xmlns:p14="http://schemas.microsoft.com/office/powerpoint/2010/main" xmlns="" val="3287175084"/>
+        <p14:creationId xmlns="" xmlns:p14="http://schemas.microsoft.com/office/powerpoint/2010/main" val="3287175084"/>
       </p:ext>
     </p:extLst>
   </p:cSld>
@@ -10931,7 +10937,7 @@
           <p:cNvPr id="9" name="Explosion: 14 Points 8">
             <a:extLst>
               <a:ext uri="{FF2B5EF4-FFF2-40B4-BE49-F238E27FC236}">
-                <a16:creationId xmlns:a16="http://schemas.microsoft.com/office/drawing/2014/main" xmlns="" id="{0A2CD68B-7A56-F86D-8B6F-4A8BF99B4C9E}"/>
+                <a16:creationId xmlns="" xmlns:a16="http://schemas.microsoft.com/office/drawing/2014/main" id="{0A2CD68B-7A56-F86D-8B6F-4A8BF99B4C9E}"/>
               </a:ext>
             </a:extLst>
           </p:cNvPr>
@@ -10986,7 +10992,7 @@
           <p:cNvPr id="2" name="Title 1">
             <a:extLst>
               <a:ext uri="{FF2B5EF4-FFF2-40B4-BE49-F238E27FC236}">
-                <a16:creationId xmlns:a16="http://schemas.microsoft.com/office/drawing/2014/main" xmlns="" id="{62BB4F8D-44B7-9866-F7B2-6375CB902974}"/>
+                <a16:creationId xmlns="" xmlns:a16="http://schemas.microsoft.com/office/drawing/2014/main" id="{62BB4F8D-44B7-9866-F7B2-6375CB902974}"/>
               </a:ext>
             </a:extLst>
           </p:cNvPr>
@@ -11122,7 +11128,7 @@
           <p:cNvPr id="4" name="Ribbon: Curved and Tilted Down 3">
             <a:extLst>
               <a:ext uri="{FF2B5EF4-FFF2-40B4-BE49-F238E27FC236}">
-                <a16:creationId xmlns:a16="http://schemas.microsoft.com/office/drawing/2014/main" xmlns="" id="{909DBECF-689C-9AA7-1649-9166A578EDF9}"/>
+                <a16:creationId xmlns="" xmlns:a16="http://schemas.microsoft.com/office/drawing/2014/main" id="{909DBECF-689C-9AA7-1649-9166A578EDF9}"/>
               </a:ext>
             </a:extLst>
           </p:cNvPr>
@@ -11189,7 +11195,7 @@
           <p:cNvPr id="5" name="Scroll: Vertical 4">
             <a:extLst>
               <a:ext uri="{FF2B5EF4-FFF2-40B4-BE49-F238E27FC236}">
-                <a16:creationId xmlns:a16="http://schemas.microsoft.com/office/drawing/2014/main" xmlns="" id="{38EB993A-3F18-C6B7-226F-EDD62B4B31DB}"/>
+                <a16:creationId xmlns="" xmlns:a16="http://schemas.microsoft.com/office/drawing/2014/main" id="{38EB993A-3F18-C6B7-226F-EDD62B4B31DB}"/>
               </a:ext>
             </a:extLst>
           </p:cNvPr>
@@ -11370,7 +11376,7 @@
           <p:cNvPr id="3" name="TextBox 2">
             <a:extLst>
               <a:ext uri="{FF2B5EF4-FFF2-40B4-BE49-F238E27FC236}">
-                <a16:creationId xmlns:a16="http://schemas.microsoft.com/office/drawing/2014/main" xmlns="" id="{17C06F8A-D1E5-957B-796C-892968B95A50}"/>
+                <a16:creationId xmlns="" xmlns:a16="http://schemas.microsoft.com/office/drawing/2014/main" id="{17C06F8A-D1E5-957B-796C-892968B95A50}"/>
               </a:ext>
             </a:extLst>
           </p:cNvPr>
@@ -11425,7 +11431,7 @@
           <p:cNvPr id="7" name="Picture 6">
             <a:extLst>
               <a:ext uri="{FF2B5EF4-FFF2-40B4-BE49-F238E27FC236}">
-                <a16:creationId xmlns:a16="http://schemas.microsoft.com/office/drawing/2014/main" xmlns="" id="{45A84455-06EA-2224-C377-E67CDC7D7497}"/>
+                <a16:creationId xmlns="" xmlns:a16="http://schemas.microsoft.com/office/drawing/2014/main" id="{45A84455-06EA-2224-C377-E67CDC7D7497}"/>
               </a:ext>
             </a:extLst>
           </p:cNvPr>
@@ -11453,7 +11459,7 @@
     </p:spTree>
     <p:extLst>
       <p:ext uri="{BB962C8B-B14F-4D97-AF65-F5344CB8AC3E}">
-        <p14:creationId xmlns:p14="http://schemas.microsoft.com/office/powerpoint/2010/main" xmlns="" val="3287175084"/>
+        <p14:creationId xmlns="" xmlns:p14="http://schemas.microsoft.com/office/powerpoint/2010/main" val="3287175084"/>
       </p:ext>
     </p:extLst>
   </p:cSld>
@@ -11478,7 +11484,7 @@
         <p:cNvPr id="1" name="">
           <a:extLst>
             <a:ext uri="{FF2B5EF4-FFF2-40B4-BE49-F238E27FC236}">
-              <a16:creationId xmlns:a16="http://schemas.microsoft.com/office/drawing/2014/main" xmlns="" id="{C5637B91-7316-D738-42FD-B6F1CC38AB90}"/>
+              <a16:creationId xmlns="" xmlns:a16="http://schemas.microsoft.com/office/drawing/2014/main" id="{C5637B91-7316-D738-42FD-B6F1CC38AB90}"/>
             </a:ext>
           </a:extLst>
         </p:cNvPr>
@@ -11498,7 +11504,7 @@
           <p:cNvPr id="2" name="Title 1">
             <a:extLst>
               <a:ext uri="{FF2B5EF4-FFF2-40B4-BE49-F238E27FC236}">
-                <a16:creationId xmlns:a16="http://schemas.microsoft.com/office/drawing/2014/main" xmlns="" id="{0BB42E27-7C22-C4E2-3B23-3F7F20980B00}"/>
+                <a16:creationId xmlns="" xmlns:a16="http://schemas.microsoft.com/office/drawing/2014/main" id="{0BB42E27-7C22-C4E2-3B23-3F7F20980B00}"/>
               </a:ext>
             </a:extLst>
           </p:cNvPr>
@@ -11536,7 +11542,7 @@
           <p:cNvPr id="3" name="Content Placeholder 2">
             <a:extLst>
               <a:ext uri="{FF2B5EF4-FFF2-40B4-BE49-F238E27FC236}">
-                <a16:creationId xmlns:a16="http://schemas.microsoft.com/office/drawing/2014/main" xmlns="" id="{514ACDD6-0D2B-0B03-F18B-91318DCF7D9A}"/>
+                <a16:creationId xmlns="" xmlns:a16="http://schemas.microsoft.com/office/drawing/2014/main" id="{514ACDD6-0D2B-0B03-F18B-91318DCF7D9A}"/>
               </a:ext>
             </a:extLst>
           </p:cNvPr>
@@ -11838,7 +11844,7 @@
           <p:cNvPr id="5" name="Ribbon: Curved and Tilted Down 4">
             <a:extLst>
               <a:ext uri="{FF2B5EF4-FFF2-40B4-BE49-F238E27FC236}">
-                <a16:creationId xmlns:a16="http://schemas.microsoft.com/office/drawing/2014/main" xmlns="" id="{D1D7DB93-DBF3-0DF0-3533-AC1786837990}"/>
+                <a16:creationId xmlns="" xmlns:a16="http://schemas.microsoft.com/office/drawing/2014/main" id="{D1D7DB93-DBF3-0DF0-3533-AC1786837990}"/>
               </a:ext>
             </a:extLst>
           </p:cNvPr>
@@ -11911,7 +11917,7 @@
           <p:cNvPr id="6" name="Scroll: Vertical 5">
             <a:extLst>
               <a:ext uri="{FF2B5EF4-FFF2-40B4-BE49-F238E27FC236}">
-                <a16:creationId xmlns:a16="http://schemas.microsoft.com/office/drawing/2014/main" xmlns="" id="{4B810CE8-F172-ABEF-9B5B-F6C6A3F4D513}"/>
+                <a16:creationId xmlns="" xmlns:a16="http://schemas.microsoft.com/office/drawing/2014/main" id="{4B810CE8-F172-ABEF-9B5B-F6C6A3F4D513}"/>
               </a:ext>
             </a:extLst>
           </p:cNvPr>
@@ -12037,7 +12043,7 @@
           <p:cNvPr id="7" name="TextBox 6">
             <a:extLst>
               <a:ext uri="{FF2B5EF4-FFF2-40B4-BE49-F238E27FC236}">
-                <a16:creationId xmlns:a16="http://schemas.microsoft.com/office/drawing/2014/main" xmlns="" id="{7C7A2712-C9B9-958D-594C-39F36B75B90A}"/>
+                <a16:creationId xmlns="" xmlns:a16="http://schemas.microsoft.com/office/drawing/2014/main" id="{7C7A2712-C9B9-958D-594C-39F36B75B90A}"/>
               </a:ext>
             </a:extLst>
           </p:cNvPr>
@@ -12087,7 +12093,7 @@
     </p:spTree>
     <p:extLst>
       <p:ext uri="{BB962C8B-B14F-4D97-AF65-F5344CB8AC3E}">
-        <p14:creationId xmlns:p14="http://schemas.microsoft.com/office/powerpoint/2010/main" xmlns="" val="693676810"/>
+        <p14:creationId xmlns="" xmlns:p14="http://schemas.microsoft.com/office/powerpoint/2010/main" val="693676810"/>
       </p:ext>
     </p:extLst>
   </p:cSld>
@@ -12126,7 +12132,7 @@
           <p:cNvPr id="9" name="Explosion: 14 Points 8">
             <a:extLst>
               <a:ext uri="{FF2B5EF4-FFF2-40B4-BE49-F238E27FC236}">
-                <a16:creationId xmlns:a16="http://schemas.microsoft.com/office/drawing/2014/main" xmlns="" id="{0A2CD68B-7A56-F86D-8B6F-4A8BF99B4C9E}"/>
+                <a16:creationId xmlns="" xmlns:a16="http://schemas.microsoft.com/office/drawing/2014/main" id="{0A2CD68B-7A56-F86D-8B6F-4A8BF99B4C9E}"/>
               </a:ext>
             </a:extLst>
           </p:cNvPr>
@@ -12181,7 +12187,7 @@
           <p:cNvPr id="2" name="Title 1">
             <a:extLst>
               <a:ext uri="{FF2B5EF4-FFF2-40B4-BE49-F238E27FC236}">
-                <a16:creationId xmlns:a16="http://schemas.microsoft.com/office/drawing/2014/main" xmlns="" id="{62BB4F8D-44B7-9866-F7B2-6375CB902974}"/>
+                <a16:creationId xmlns="" xmlns:a16="http://schemas.microsoft.com/office/drawing/2014/main" id="{62BB4F8D-44B7-9866-F7B2-6375CB902974}"/>
               </a:ext>
             </a:extLst>
           </p:cNvPr>
@@ -12255,7 +12261,7 @@
           <p:cNvPr id="4" name="Ribbon: Curved and Tilted Down 3">
             <a:extLst>
               <a:ext uri="{FF2B5EF4-FFF2-40B4-BE49-F238E27FC236}">
-                <a16:creationId xmlns:a16="http://schemas.microsoft.com/office/drawing/2014/main" xmlns="" id="{909DBECF-689C-9AA7-1649-9166A578EDF9}"/>
+                <a16:creationId xmlns="" xmlns:a16="http://schemas.microsoft.com/office/drawing/2014/main" id="{909DBECF-689C-9AA7-1649-9166A578EDF9}"/>
               </a:ext>
             </a:extLst>
           </p:cNvPr>
@@ -12322,7 +12328,7 @@
           <p:cNvPr id="5" name="Scroll: Vertical 4">
             <a:extLst>
               <a:ext uri="{FF2B5EF4-FFF2-40B4-BE49-F238E27FC236}">
-                <a16:creationId xmlns:a16="http://schemas.microsoft.com/office/drawing/2014/main" xmlns="" id="{38EB993A-3F18-C6B7-226F-EDD62B4B31DB}"/>
+                <a16:creationId xmlns="" xmlns:a16="http://schemas.microsoft.com/office/drawing/2014/main" id="{38EB993A-3F18-C6B7-226F-EDD62B4B31DB}"/>
               </a:ext>
             </a:extLst>
           </p:cNvPr>
@@ -12582,7 +12588,7 @@
           <p:cNvPr id="3" name="TextBox 2">
             <a:extLst>
               <a:ext uri="{FF2B5EF4-FFF2-40B4-BE49-F238E27FC236}">
-                <a16:creationId xmlns:a16="http://schemas.microsoft.com/office/drawing/2014/main" xmlns="" id="{3BE32085-0497-60C5-6142-8DF6C2C12813}"/>
+                <a16:creationId xmlns="" xmlns:a16="http://schemas.microsoft.com/office/drawing/2014/main" id="{3BE32085-0497-60C5-6142-8DF6C2C12813}"/>
               </a:ext>
             </a:extLst>
           </p:cNvPr>
@@ -12635,7 +12641,7 @@
     </p:spTree>
     <p:extLst>
       <p:ext uri="{BB962C8B-B14F-4D97-AF65-F5344CB8AC3E}">
-        <p14:creationId xmlns:p14="http://schemas.microsoft.com/office/powerpoint/2010/main" xmlns="" val="3287175084"/>
+        <p14:creationId xmlns="" xmlns:p14="http://schemas.microsoft.com/office/powerpoint/2010/main" val="3287175084"/>
       </p:ext>
     </p:extLst>
   </p:cSld>
@@ -12667,7 +12673,7 @@
           <p:cNvPr id="9" name="Explosion: 14 Points 8">
             <a:extLst>
               <a:ext uri="{FF2B5EF4-FFF2-40B4-BE49-F238E27FC236}">
-                <a16:creationId xmlns:a16="http://schemas.microsoft.com/office/drawing/2014/main" xmlns="" id="{0A2CD68B-7A56-F86D-8B6F-4A8BF99B4C9E}"/>
+                <a16:creationId xmlns="" xmlns:a16="http://schemas.microsoft.com/office/drawing/2014/main" id="{0A2CD68B-7A56-F86D-8B6F-4A8BF99B4C9E}"/>
               </a:ext>
             </a:extLst>
           </p:cNvPr>
@@ -12722,7 +12728,7 @@
           <p:cNvPr id="2" name="Title 1">
             <a:extLst>
               <a:ext uri="{FF2B5EF4-FFF2-40B4-BE49-F238E27FC236}">
-                <a16:creationId xmlns:a16="http://schemas.microsoft.com/office/drawing/2014/main" xmlns="" id="{62BB4F8D-44B7-9866-F7B2-6375CB902974}"/>
+                <a16:creationId xmlns="" xmlns:a16="http://schemas.microsoft.com/office/drawing/2014/main" id="{62BB4F8D-44B7-9866-F7B2-6375CB902974}"/>
               </a:ext>
             </a:extLst>
           </p:cNvPr>
@@ -12870,7 +12876,7 @@
           <p:cNvPr id="4" name="Ribbon: Curved and Tilted Down 3">
             <a:extLst>
               <a:ext uri="{FF2B5EF4-FFF2-40B4-BE49-F238E27FC236}">
-                <a16:creationId xmlns:a16="http://schemas.microsoft.com/office/drawing/2014/main" xmlns="" id="{909DBECF-689C-9AA7-1649-9166A578EDF9}"/>
+                <a16:creationId xmlns="" xmlns:a16="http://schemas.microsoft.com/office/drawing/2014/main" id="{909DBECF-689C-9AA7-1649-9166A578EDF9}"/>
               </a:ext>
             </a:extLst>
           </p:cNvPr>
@@ -12937,7 +12943,7 @@
           <p:cNvPr id="5" name="Scroll: Vertical 4">
             <a:extLst>
               <a:ext uri="{FF2B5EF4-FFF2-40B4-BE49-F238E27FC236}">
-                <a16:creationId xmlns:a16="http://schemas.microsoft.com/office/drawing/2014/main" xmlns="" id="{38EB993A-3F18-C6B7-226F-EDD62B4B31DB}"/>
+                <a16:creationId xmlns="" xmlns:a16="http://schemas.microsoft.com/office/drawing/2014/main" id="{38EB993A-3F18-C6B7-226F-EDD62B4B31DB}"/>
               </a:ext>
             </a:extLst>
           </p:cNvPr>
@@ -13217,7 +13223,7 @@
           <p:cNvPr id="3" name="TextBox 2">
             <a:extLst>
               <a:ext uri="{FF2B5EF4-FFF2-40B4-BE49-F238E27FC236}">
-                <a16:creationId xmlns:a16="http://schemas.microsoft.com/office/drawing/2014/main" xmlns="" id="{17C06F8A-D1E5-957B-796C-892968B95A50}"/>
+                <a16:creationId xmlns="" xmlns:a16="http://schemas.microsoft.com/office/drawing/2014/main" id="{17C06F8A-D1E5-957B-796C-892968B95A50}"/>
               </a:ext>
             </a:extLst>
           </p:cNvPr>
@@ -13270,7 +13276,7 @@
     </p:spTree>
     <p:extLst>
       <p:ext uri="{BB962C8B-B14F-4D97-AF65-F5344CB8AC3E}">
-        <p14:creationId xmlns:p14="http://schemas.microsoft.com/office/powerpoint/2010/main" xmlns="" val="3287175084"/>
+        <p14:creationId xmlns="" xmlns:p14="http://schemas.microsoft.com/office/powerpoint/2010/main" val="3287175084"/>
       </p:ext>
     </p:extLst>
   </p:cSld>
@@ -13295,7 +13301,7 @@
         <p:cNvPr id="1" name="">
           <a:extLst>
             <a:ext uri="{FF2B5EF4-FFF2-40B4-BE49-F238E27FC236}">
-              <a16:creationId xmlns:a16="http://schemas.microsoft.com/office/drawing/2014/main" xmlns="" id="{4586E9D7-F5F8-14CC-9DF6-FC4AF2EA4249}"/>
+              <a16:creationId xmlns="" xmlns:a16="http://schemas.microsoft.com/office/drawing/2014/main" id="{4586E9D7-F5F8-14CC-9DF6-FC4AF2EA4249}"/>
             </a:ext>
           </a:extLst>
         </p:cNvPr>
@@ -13315,7 +13321,7 @@
           <p:cNvPr id="2" name="Title 1">
             <a:extLst>
               <a:ext uri="{FF2B5EF4-FFF2-40B4-BE49-F238E27FC236}">
-                <a16:creationId xmlns:a16="http://schemas.microsoft.com/office/drawing/2014/main" xmlns="" id="{D8B67155-694F-FF61-7CDD-33A20A316215}"/>
+                <a16:creationId xmlns="" xmlns:a16="http://schemas.microsoft.com/office/drawing/2014/main" id="{D8B67155-694F-FF61-7CDD-33A20A316215}"/>
               </a:ext>
             </a:extLst>
           </p:cNvPr>
@@ -13371,7 +13377,7 @@
           <p:cNvPr id="3" name="Content Placeholder 2">
             <a:extLst>
               <a:ext uri="{FF2B5EF4-FFF2-40B4-BE49-F238E27FC236}">
-                <a16:creationId xmlns:a16="http://schemas.microsoft.com/office/drawing/2014/main" xmlns="" id="{2A53D2DA-721D-FC7E-8E09-BCBD844B6F9F}"/>
+                <a16:creationId xmlns="" xmlns:a16="http://schemas.microsoft.com/office/drawing/2014/main" id="{2A53D2DA-721D-FC7E-8E09-BCBD844B6F9F}"/>
               </a:ext>
             </a:extLst>
           </p:cNvPr>
@@ -13430,7 +13436,7 @@
           <p:cNvPr id="5" name="Ribbon: Curved and Tilted Down 4">
             <a:extLst>
               <a:ext uri="{FF2B5EF4-FFF2-40B4-BE49-F238E27FC236}">
-                <a16:creationId xmlns:a16="http://schemas.microsoft.com/office/drawing/2014/main" xmlns="" id="{3FA23525-E3EA-B8CB-FD6A-53084CA847A7}"/>
+                <a16:creationId xmlns="" xmlns:a16="http://schemas.microsoft.com/office/drawing/2014/main" id="{3FA23525-E3EA-B8CB-FD6A-53084CA847A7}"/>
               </a:ext>
             </a:extLst>
           </p:cNvPr>
@@ -13503,7 +13509,7 @@
           <p:cNvPr id="6" name="Scroll: Vertical 5">
             <a:extLst>
               <a:ext uri="{FF2B5EF4-FFF2-40B4-BE49-F238E27FC236}">
-                <a16:creationId xmlns:a16="http://schemas.microsoft.com/office/drawing/2014/main" xmlns="" id="{1A4C732A-2840-82C8-A359-298D925E33B3}"/>
+                <a16:creationId xmlns="" xmlns:a16="http://schemas.microsoft.com/office/drawing/2014/main" id="{1A4C732A-2840-82C8-A359-298D925E33B3}"/>
               </a:ext>
             </a:extLst>
           </p:cNvPr>
@@ -13744,7 +13750,7 @@
     </p:spTree>
     <p:extLst>
       <p:ext uri="{BB962C8B-B14F-4D97-AF65-F5344CB8AC3E}">
-        <p14:creationId xmlns:p14="http://schemas.microsoft.com/office/powerpoint/2010/main" xmlns="" val="3002471670"/>
+        <p14:creationId xmlns="" xmlns:p14="http://schemas.microsoft.com/office/powerpoint/2010/main" val="3002471670"/>
       </p:ext>
     </p:extLst>
   </p:cSld>
@@ -13762,7 +13768,7 @@
         <p:cNvPr id="1" name="">
           <a:extLst>
             <a:ext uri="{FF2B5EF4-FFF2-40B4-BE49-F238E27FC236}">
-              <a16:creationId xmlns:a16="http://schemas.microsoft.com/office/drawing/2014/main" xmlns="" id="{4586E9D7-F5F8-14CC-9DF6-FC4AF2EA4249}"/>
+              <a16:creationId xmlns="" xmlns:a16="http://schemas.microsoft.com/office/drawing/2014/main" id="{4586E9D7-F5F8-14CC-9DF6-FC4AF2EA4249}"/>
             </a:ext>
           </a:extLst>
         </p:cNvPr>
@@ -13782,7 +13788,7 @@
           <p:cNvPr id="2" name="Title 1">
             <a:extLst>
               <a:ext uri="{FF2B5EF4-FFF2-40B4-BE49-F238E27FC236}">
-                <a16:creationId xmlns:a16="http://schemas.microsoft.com/office/drawing/2014/main" xmlns="" id="{D8B67155-694F-FF61-7CDD-33A20A316215}"/>
+                <a16:creationId xmlns="" xmlns:a16="http://schemas.microsoft.com/office/drawing/2014/main" id="{D8B67155-694F-FF61-7CDD-33A20A316215}"/>
               </a:ext>
             </a:extLst>
           </p:cNvPr>
@@ -13829,7 +13835,7 @@
           <p:cNvPr id="3" name="Content Placeholder 2">
             <a:extLst>
               <a:ext uri="{FF2B5EF4-FFF2-40B4-BE49-F238E27FC236}">
-                <a16:creationId xmlns:a16="http://schemas.microsoft.com/office/drawing/2014/main" xmlns="" id="{2A53D2DA-721D-FC7E-8E09-BCBD844B6F9F}"/>
+                <a16:creationId xmlns="" xmlns:a16="http://schemas.microsoft.com/office/drawing/2014/main" id="{2A53D2DA-721D-FC7E-8E09-BCBD844B6F9F}"/>
               </a:ext>
             </a:extLst>
           </p:cNvPr>
@@ -13938,7 +13944,7 @@
           <p:cNvPr id="5" name="Ribbon: Curved and Tilted Down 4">
             <a:extLst>
               <a:ext uri="{FF2B5EF4-FFF2-40B4-BE49-F238E27FC236}">
-                <a16:creationId xmlns:a16="http://schemas.microsoft.com/office/drawing/2014/main" xmlns="" id="{3FA23525-E3EA-B8CB-FD6A-53084CA847A7}"/>
+                <a16:creationId xmlns="" xmlns:a16="http://schemas.microsoft.com/office/drawing/2014/main" id="{3FA23525-E3EA-B8CB-FD6A-53084CA847A7}"/>
               </a:ext>
             </a:extLst>
           </p:cNvPr>
@@ -14011,7 +14017,7 @@
           <p:cNvPr id="6" name="Scroll: Vertical 5">
             <a:extLst>
               <a:ext uri="{FF2B5EF4-FFF2-40B4-BE49-F238E27FC236}">
-                <a16:creationId xmlns:a16="http://schemas.microsoft.com/office/drawing/2014/main" xmlns="" id="{1A4C732A-2840-82C8-A359-298D925E33B3}"/>
+                <a16:creationId xmlns="" xmlns:a16="http://schemas.microsoft.com/office/drawing/2014/main" id="{1A4C732A-2840-82C8-A359-298D925E33B3}"/>
               </a:ext>
             </a:extLst>
           </p:cNvPr>
@@ -14225,7 +14231,7 @@
     </p:spTree>
     <p:extLst>
       <p:ext uri="{BB962C8B-B14F-4D97-AF65-F5344CB8AC3E}">
-        <p14:creationId xmlns:p14="http://schemas.microsoft.com/office/powerpoint/2010/main" xmlns="" val="3002471670"/>
+        <p14:creationId xmlns="" xmlns:p14="http://schemas.microsoft.com/office/powerpoint/2010/main" val="3002471670"/>
       </p:ext>
     </p:extLst>
   </p:cSld>
@@ -14243,7 +14249,7 @@
         <p:cNvPr id="1" name="">
           <a:extLst>
             <a:ext uri="{FF2B5EF4-FFF2-40B4-BE49-F238E27FC236}">
-              <a16:creationId xmlns:a16="http://schemas.microsoft.com/office/drawing/2014/main" xmlns="" id="{4586E9D7-F5F8-14CC-9DF6-FC4AF2EA4249}"/>
+              <a16:creationId xmlns="" xmlns:a16="http://schemas.microsoft.com/office/drawing/2014/main" id="{4586E9D7-F5F8-14CC-9DF6-FC4AF2EA4249}"/>
             </a:ext>
           </a:extLst>
         </p:cNvPr>
@@ -14263,7 +14269,7 @@
           <p:cNvPr id="2" name="Title 1">
             <a:extLst>
               <a:ext uri="{FF2B5EF4-FFF2-40B4-BE49-F238E27FC236}">
-                <a16:creationId xmlns:a16="http://schemas.microsoft.com/office/drawing/2014/main" xmlns="" id="{D8B67155-694F-FF61-7CDD-33A20A316215}"/>
+                <a16:creationId xmlns="" xmlns:a16="http://schemas.microsoft.com/office/drawing/2014/main" id="{D8B67155-694F-FF61-7CDD-33A20A316215}"/>
               </a:ext>
             </a:extLst>
           </p:cNvPr>
@@ -14339,7 +14345,7 @@
           <p:cNvPr id="5" name="Ribbon: Curved and Tilted Down 4">
             <a:extLst>
               <a:ext uri="{FF2B5EF4-FFF2-40B4-BE49-F238E27FC236}">
-                <a16:creationId xmlns:a16="http://schemas.microsoft.com/office/drawing/2014/main" xmlns="" id="{3FA23525-E3EA-B8CB-FD6A-53084CA847A7}"/>
+                <a16:creationId xmlns="" xmlns:a16="http://schemas.microsoft.com/office/drawing/2014/main" id="{3FA23525-E3EA-B8CB-FD6A-53084CA847A7}"/>
               </a:ext>
             </a:extLst>
           </p:cNvPr>
@@ -14412,7 +14418,7 @@
           <p:cNvPr id="6" name="Scroll: Vertical 5">
             <a:extLst>
               <a:ext uri="{FF2B5EF4-FFF2-40B4-BE49-F238E27FC236}">
-                <a16:creationId xmlns:a16="http://schemas.microsoft.com/office/drawing/2014/main" xmlns="" id="{1A4C732A-2840-82C8-A359-298D925E33B3}"/>
+                <a16:creationId xmlns="" xmlns:a16="http://schemas.microsoft.com/office/drawing/2014/main" id="{1A4C732A-2840-82C8-A359-298D925E33B3}"/>
               </a:ext>
             </a:extLst>
           </p:cNvPr>
@@ -14562,7 +14568,7 @@
           <p:cNvPr id="9" name="Content Placeholder 2">
             <a:extLst>
               <a:ext uri="{FF2B5EF4-FFF2-40B4-BE49-F238E27FC236}">
-                <a16:creationId xmlns:a16="http://schemas.microsoft.com/office/drawing/2014/main" xmlns="" id="{2A53D2DA-721D-FC7E-8E09-BCBD844B6F9F}"/>
+                <a16:creationId xmlns="" xmlns:a16="http://schemas.microsoft.com/office/drawing/2014/main" id="{2A53D2DA-721D-FC7E-8E09-BCBD844B6F9F}"/>
               </a:ext>
             </a:extLst>
           </p:cNvPr>
@@ -14693,7 +14699,7 @@
           <p:cNvPr id="11" name="Content Placeholder 2">
             <a:extLst>
               <a:ext uri="{FF2B5EF4-FFF2-40B4-BE49-F238E27FC236}">
-                <a16:creationId xmlns:a16="http://schemas.microsoft.com/office/drawing/2014/main" xmlns="" id="{2A53D2DA-721D-FC7E-8E09-BCBD844B6F9F}"/>
+                <a16:creationId xmlns="" xmlns:a16="http://schemas.microsoft.com/office/drawing/2014/main" id="{2A53D2DA-721D-FC7E-8E09-BCBD844B6F9F}"/>
               </a:ext>
             </a:extLst>
           </p:cNvPr>
@@ -14898,7 +14904,7 @@
     </p:spTree>
     <p:extLst>
       <p:ext uri="{BB962C8B-B14F-4D97-AF65-F5344CB8AC3E}">
-        <p14:creationId xmlns:p14="http://schemas.microsoft.com/office/powerpoint/2010/main" xmlns="" val="3002471670"/>
+        <p14:creationId xmlns="" xmlns:p14="http://schemas.microsoft.com/office/powerpoint/2010/main" val="3002471670"/>
       </p:ext>
     </p:extLst>
   </p:cSld>
@@ -14916,7 +14922,7 @@
         <p:cNvPr id="1" name="">
           <a:extLst>
             <a:ext uri="{FF2B5EF4-FFF2-40B4-BE49-F238E27FC236}">
-              <a16:creationId xmlns:a16="http://schemas.microsoft.com/office/drawing/2014/main" xmlns="" id="{4586E9D7-F5F8-14CC-9DF6-FC4AF2EA4249}"/>
+              <a16:creationId xmlns="" xmlns:a16="http://schemas.microsoft.com/office/drawing/2014/main" id="{4586E9D7-F5F8-14CC-9DF6-FC4AF2EA4249}"/>
             </a:ext>
           </a:extLst>
         </p:cNvPr>
@@ -14936,7 +14942,7 @@
           <p:cNvPr id="2" name="Title 1">
             <a:extLst>
               <a:ext uri="{FF2B5EF4-FFF2-40B4-BE49-F238E27FC236}">
-                <a16:creationId xmlns:a16="http://schemas.microsoft.com/office/drawing/2014/main" xmlns="" id="{D8B67155-694F-FF61-7CDD-33A20A316215}"/>
+                <a16:creationId xmlns="" xmlns:a16="http://schemas.microsoft.com/office/drawing/2014/main" id="{D8B67155-694F-FF61-7CDD-33A20A316215}"/>
               </a:ext>
             </a:extLst>
           </p:cNvPr>
@@ -14976,7 +14982,7 @@
           <p:cNvPr id="5" name="Ribbon: Curved and Tilted Down 4">
             <a:extLst>
               <a:ext uri="{FF2B5EF4-FFF2-40B4-BE49-F238E27FC236}">
-                <a16:creationId xmlns:a16="http://schemas.microsoft.com/office/drawing/2014/main" xmlns="" id="{3FA23525-E3EA-B8CB-FD6A-53084CA847A7}"/>
+                <a16:creationId xmlns="" xmlns:a16="http://schemas.microsoft.com/office/drawing/2014/main" id="{3FA23525-E3EA-B8CB-FD6A-53084CA847A7}"/>
               </a:ext>
             </a:extLst>
           </p:cNvPr>
@@ -15049,7 +15055,7 @@
           <p:cNvPr id="6" name="Scroll: Vertical 5">
             <a:extLst>
               <a:ext uri="{FF2B5EF4-FFF2-40B4-BE49-F238E27FC236}">
-                <a16:creationId xmlns:a16="http://schemas.microsoft.com/office/drawing/2014/main" xmlns="" id="{1A4C732A-2840-82C8-A359-298D925E33B3}"/>
+                <a16:creationId xmlns="" xmlns:a16="http://schemas.microsoft.com/office/drawing/2014/main" id="{1A4C732A-2840-82C8-A359-298D925E33B3}"/>
               </a:ext>
             </a:extLst>
           </p:cNvPr>
@@ -15199,7 +15205,7 @@
           <p:cNvPr id="9" name="Content Placeholder 2">
             <a:extLst>
               <a:ext uri="{FF2B5EF4-FFF2-40B4-BE49-F238E27FC236}">
-                <a16:creationId xmlns:a16="http://schemas.microsoft.com/office/drawing/2014/main" xmlns="" id="{2A53D2DA-721D-FC7E-8E09-BCBD844B6F9F}"/>
+                <a16:creationId xmlns="" xmlns:a16="http://schemas.microsoft.com/office/drawing/2014/main" id="{2A53D2DA-721D-FC7E-8E09-BCBD844B6F9F}"/>
               </a:ext>
             </a:extLst>
           </p:cNvPr>
@@ -15330,7 +15336,7 @@
           <p:cNvPr id="11" name="Content Placeholder 2">
             <a:extLst>
               <a:ext uri="{FF2B5EF4-FFF2-40B4-BE49-F238E27FC236}">
-                <a16:creationId xmlns:a16="http://schemas.microsoft.com/office/drawing/2014/main" xmlns="" id="{2A53D2DA-721D-FC7E-8E09-BCBD844B6F9F}"/>
+                <a16:creationId xmlns="" xmlns:a16="http://schemas.microsoft.com/office/drawing/2014/main" id="{2A53D2DA-721D-FC7E-8E09-BCBD844B6F9F}"/>
               </a:ext>
             </a:extLst>
           </p:cNvPr>
@@ -15604,7 +15610,7 @@
     </p:spTree>
     <p:extLst>
       <p:ext uri="{BB962C8B-B14F-4D97-AF65-F5344CB8AC3E}">
-        <p14:creationId xmlns:p14="http://schemas.microsoft.com/office/powerpoint/2010/main" xmlns="" val="3002471670"/>
+        <p14:creationId xmlns="" xmlns:p14="http://schemas.microsoft.com/office/powerpoint/2010/main" val="3002471670"/>
       </p:ext>
     </p:extLst>
   </p:cSld>
@@ -15622,7 +15628,7 @@
         <p:cNvPr id="1" name="">
           <a:extLst>
             <a:ext uri="{FF2B5EF4-FFF2-40B4-BE49-F238E27FC236}">
-              <a16:creationId xmlns:a16="http://schemas.microsoft.com/office/drawing/2014/main" xmlns="" id="{4586E9D7-F5F8-14CC-9DF6-FC4AF2EA4249}"/>
+              <a16:creationId xmlns="" xmlns:a16="http://schemas.microsoft.com/office/drawing/2014/main" id="{4586E9D7-F5F8-14CC-9DF6-FC4AF2EA4249}"/>
             </a:ext>
           </a:extLst>
         </p:cNvPr>
@@ -15642,7 +15648,7 @@
           <p:cNvPr id="2" name="Title 1">
             <a:extLst>
               <a:ext uri="{FF2B5EF4-FFF2-40B4-BE49-F238E27FC236}">
-                <a16:creationId xmlns:a16="http://schemas.microsoft.com/office/drawing/2014/main" xmlns="" id="{D8B67155-694F-FF61-7CDD-33A20A316215}"/>
+                <a16:creationId xmlns="" xmlns:a16="http://schemas.microsoft.com/office/drawing/2014/main" id="{D8B67155-694F-FF61-7CDD-33A20A316215}"/>
               </a:ext>
             </a:extLst>
           </p:cNvPr>
@@ -15787,7 +15793,7 @@
           <p:cNvPr id="5" name="Ribbon: Curved and Tilted Down 4">
             <a:extLst>
               <a:ext uri="{FF2B5EF4-FFF2-40B4-BE49-F238E27FC236}">
-                <a16:creationId xmlns:a16="http://schemas.microsoft.com/office/drawing/2014/main" xmlns="" id="{3FA23525-E3EA-B8CB-FD6A-53084CA847A7}"/>
+                <a16:creationId xmlns="" xmlns:a16="http://schemas.microsoft.com/office/drawing/2014/main" id="{3FA23525-E3EA-B8CB-FD6A-53084CA847A7}"/>
               </a:ext>
             </a:extLst>
           </p:cNvPr>
@@ -15860,7 +15866,7 @@
           <p:cNvPr id="6" name="Scroll: Vertical 5">
             <a:extLst>
               <a:ext uri="{FF2B5EF4-FFF2-40B4-BE49-F238E27FC236}">
-                <a16:creationId xmlns:a16="http://schemas.microsoft.com/office/drawing/2014/main" xmlns="" id="{1A4C732A-2840-82C8-A359-298D925E33B3}"/>
+                <a16:creationId xmlns="" xmlns:a16="http://schemas.microsoft.com/office/drawing/2014/main" id="{1A4C732A-2840-82C8-A359-298D925E33B3}"/>
               </a:ext>
             </a:extLst>
           </p:cNvPr>
@@ -16008,7 +16014,7 @@
     </p:spTree>
     <p:extLst>
       <p:ext uri="{BB962C8B-B14F-4D97-AF65-F5344CB8AC3E}">
-        <p14:creationId xmlns:p14="http://schemas.microsoft.com/office/powerpoint/2010/main" xmlns="" val="3002471670"/>
+        <p14:creationId xmlns="" xmlns:p14="http://schemas.microsoft.com/office/powerpoint/2010/main" val="3002471670"/>
       </p:ext>
     </p:extLst>
   </p:cSld>
@@ -16040,7 +16046,7 @@
           <p:cNvPr id="9" name="Explosion: 14 Points 8">
             <a:extLst>
               <a:ext uri="{FF2B5EF4-FFF2-40B4-BE49-F238E27FC236}">
-                <a16:creationId xmlns:a16="http://schemas.microsoft.com/office/drawing/2014/main" xmlns="" id="{0A2CD68B-7A56-F86D-8B6F-4A8BF99B4C9E}"/>
+                <a16:creationId xmlns="" xmlns:a16="http://schemas.microsoft.com/office/drawing/2014/main" id="{0A2CD68B-7A56-F86D-8B6F-4A8BF99B4C9E}"/>
               </a:ext>
             </a:extLst>
           </p:cNvPr>
@@ -16095,7 +16101,7 @@
           <p:cNvPr id="2" name="Title 1">
             <a:extLst>
               <a:ext uri="{FF2B5EF4-FFF2-40B4-BE49-F238E27FC236}">
-                <a16:creationId xmlns:a16="http://schemas.microsoft.com/office/drawing/2014/main" xmlns="" id="{62BB4F8D-44B7-9866-F7B2-6375CB902974}"/>
+                <a16:creationId xmlns="" xmlns:a16="http://schemas.microsoft.com/office/drawing/2014/main" id="{62BB4F8D-44B7-9866-F7B2-6375CB902974}"/>
               </a:ext>
             </a:extLst>
           </p:cNvPr>
@@ -16216,7 +16222,7 @@
           <p:cNvPr id="4" name="Ribbon: Curved and Tilted Down 3">
             <a:extLst>
               <a:ext uri="{FF2B5EF4-FFF2-40B4-BE49-F238E27FC236}">
-                <a16:creationId xmlns:a16="http://schemas.microsoft.com/office/drawing/2014/main" xmlns="" id="{909DBECF-689C-9AA7-1649-9166A578EDF9}"/>
+                <a16:creationId xmlns="" xmlns:a16="http://schemas.microsoft.com/office/drawing/2014/main" id="{909DBECF-689C-9AA7-1649-9166A578EDF9}"/>
               </a:ext>
             </a:extLst>
           </p:cNvPr>
@@ -16283,7 +16289,7 @@
           <p:cNvPr id="8" name="TextBox 7">
             <a:extLst>
               <a:ext uri="{FF2B5EF4-FFF2-40B4-BE49-F238E27FC236}">
-                <a16:creationId xmlns:a16="http://schemas.microsoft.com/office/drawing/2014/main" xmlns="" id="{6E6F1672-8C91-3FA6-CB80-58FD68172333}"/>
+                <a16:creationId xmlns="" xmlns:a16="http://schemas.microsoft.com/office/drawing/2014/main" id="{6E6F1672-8C91-3FA6-CB80-58FD68172333}"/>
               </a:ext>
             </a:extLst>
           </p:cNvPr>
@@ -16338,7 +16344,7 @@
           <p:cNvPr id="5" name="Scroll: Vertical 4">
             <a:extLst>
               <a:ext uri="{FF2B5EF4-FFF2-40B4-BE49-F238E27FC236}">
-                <a16:creationId xmlns:a16="http://schemas.microsoft.com/office/drawing/2014/main" xmlns="" id="{38EB993A-3F18-C6B7-226F-EDD62B4B31DB}"/>
+                <a16:creationId xmlns="" xmlns:a16="http://schemas.microsoft.com/office/drawing/2014/main" id="{38EB993A-3F18-C6B7-226F-EDD62B4B31DB}"/>
               </a:ext>
             </a:extLst>
           </p:cNvPr>
@@ -16633,7 +16639,7 @@
     </p:spTree>
     <p:extLst>
       <p:ext uri="{BB962C8B-B14F-4D97-AF65-F5344CB8AC3E}">
-        <p14:creationId xmlns:p14="http://schemas.microsoft.com/office/powerpoint/2010/main" xmlns="" val="3287175084"/>
+        <p14:creationId xmlns="" xmlns:p14="http://schemas.microsoft.com/office/powerpoint/2010/main" val="3287175084"/>
       </p:ext>
     </p:extLst>
   </p:cSld>
@@ -16651,7 +16657,7 @@
         <p:cNvPr id="1" name="">
           <a:extLst>
             <a:ext uri="{FF2B5EF4-FFF2-40B4-BE49-F238E27FC236}">
-              <a16:creationId xmlns:a16="http://schemas.microsoft.com/office/drawing/2014/main" xmlns="" id="{4586E9D7-F5F8-14CC-9DF6-FC4AF2EA4249}"/>
+              <a16:creationId xmlns="" xmlns:a16="http://schemas.microsoft.com/office/drawing/2014/main" id="{4586E9D7-F5F8-14CC-9DF6-FC4AF2EA4249}"/>
             </a:ext>
           </a:extLst>
         </p:cNvPr>
@@ -16671,7 +16677,7 @@
           <p:cNvPr id="2" name="Title 1">
             <a:extLst>
               <a:ext uri="{FF2B5EF4-FFF2-40B4-BE49-F238E27FC236}">
-                <a16:creationId xmlns:a16="http://schemas.microsoft.com/office/drawing/2014/main" xmlns="" id="{D8B67155-694F-FF61-7CDD-33A20A316215}"/>
+                <a16:creationId xmlns="" xmlns:a16="http://schemas.microsoft.com/office/drawing/2014/main" id="{D8B67155-694F-FF61-7CDD-33A20A316215}"/>
               </a:ext>
             </a:extLst>
           </p:cNvPr>
@@ -16749,7 +16755,7 @@
           <p:cNvPr id="5" name="Ribbon: Curved and Tilted Down 4">
             <a:extLst>
               <a:ext uri="{FF2B5EF4-FFF2-40B4-BE49-F238E27FC236}">
-                <a16:creationId xmlns:a16="http://schemas.microsoft.com/office/drawing/2014/main" xmlns="" id="{3FA23525-E3EA-B8CB-FD6A-53084CA847A7}"/>
+                <a16:creationId xmlns="" xmlns:a16="http://schemas.microsoft.com/office/drawing/2014/main" id="{3FA23525-E3EA-B8CB-FD6A-53084CA847A7}"/>
               </a:ext>
             </a:extLst>
           </p:cNvPr>
@@ -16822,7 +16828,7 @@
           <p:cNvPr id="6" name="Scroll: Vertical 5">
             <a:extLst>
               <a:ext uri="{FF2B5EF4-FFF2-40B4-BE49-F238E27FC236}">
-                <a16:creationId xmlns:a16="http://schemas.microsoft.com/office/drawing/2014/main" xmlns="" id="{1A4C732A-2840-82C8-A359-298D925E33B3}"/>
+                <a16:creationId xmlns="" xmlns:a16="http://schemas.microsoft.com/office/drawing/2014/main" id="{1A4C732A-2840-82C8-A359-298D925E33B3}"/>
               </a:ext>
             </a:extLst>
           </p:cNvPr>
@@ -16996,7 +17002,7 @@
     </p:spTree>
     <p:extLst>
       <p:ext uri="{BB962C8B-B14F-4D97-AF65-F5344CB8AC3E}">
-        <p14:creationId xmlns:p14="http://schemas.microsoft.com/office/powerpoint/2010/main" xmlns="" val="3002471670"/>
+        <p14:creationId xmlns="" xmlns:p14="http://schemas.microsoft.com/office/powerpoint/2010/main" val="3002471670"/>
       </p:ext>
     </p:extLst>
   </p:cSld>
@@ -17014,7 +17020,7 @@
         <p:cNvPr id="1" name="">
           <a:extLst>
             <a:ext uri="{FF2B5EF4-FFF2-40B4-BE49-F238E27FC236}">
-              <a16:creationId xmlns:a16="http://schemas.microsoft.com/office/drawing/2014/main" xmlns="" id="{4586E9D7-F5F8-14CC-9DF6-FC4AF2EA4249}"/>
+              <a16:creationId xmlns="" xmlns:a16="http://schemas.microsoft.com/office/drawing/2014/main" id="{4586E9D7-F5F8-14CC-9DF6-FC4AF2EA4249}"/>
             </a:ext>
           </a:extLst>
         </p:cNvPr>
@@ -17034,7 +17040,7 @@
           <p:cNvPr id="2" name="Title 1">
             <a:extLst>
               <a:ext uri="{FF2B5EF4-FFF2-40B4-BE49-F238E27FC236}">
-                <a16:creationId xmlns:a16="http://schemas.microsoft.com/office/drawing/2014/main" xmlns="" id="{D8B67155-694F-FF61-7CDD-33A20A316215}"/>
+                <a16:creationId xmlns="" xmlns:a16="http://schemas.microsoft.com/office/drawing/2014/main" id="{D8B67155-694F-FF61-7CDD-33A20A316215}"/>
               </a:ext>
             </a:extLst>
           </p:cNvPr>
@@ -17121,7 +17127,7 @@
           <p:cNvPr id="5" name="Ribbon: Curved and Tilted Down 4">
             <a:extLst>
               <a:ext uri="{FF2B5EF4-FFF2-40B4-BE49-F238E27FC236}">
-                <a16:creationId xmlns:a16="http://schemas.microsoft.com/office/drawing/2014/main" xmlns="" id="{3FA23525-E3EA-B8CB-FD6A-53084CA847A7}"/>
+                <a16:creationId xmlns="" xmlns:a16="http://schemas.microsoft.com/office/drawing/2014/main" id="{3FA23525-E3EA-B8CB-FD6A-53084CA847A7}"/>
               </a:ext>
             </a:extLst>
           </p:cNvPr>
@@ -17194,7 +17200,7 @@
           <p:cNvPr id="6" name="Scroll: Vertical 5">
             <a:extLst>
               <a:ext uri="{FF2B5EF4-FFF2-40B4-BE49-F238E27FC236}">
-                <a16:creationId xmlns:a16="http://schemas.microsoft.com/office/drawing/2014/main" xmlns="" id="{1A4C732A-2840-82C8-A359-298D925E33B3}"/>
+                <a16:creationId xmlns="" xmlns:a16="http://schemas.microsoft.com/office/drawing/2014/main" id="{1A4C732A-2840-82C8-A359-298D925E33B3}"/>
               </a:ext>
             </a:extLst>
           </p:cNvPr>
@@ -17368,7 +17374,7 @@
     </p:spTree>
     <p:extLst>
       <p:ext uri="{BB962C8B-B14F-4D97-AF65-F5344CB8AC3E}">
-        <p14:creationId xmlns:p14="http://schemas.microsoft.com/office/powerpoint/2010/main" xmlns="" val="3002471670"/>
+        <p14:creationId xmlns="" xmlns:p14="http://schemas.microsoft.com/office/powerpoint/2010/main" val="3002471670"/>
       </p:ext>
     </p:extLst>
   </p:cSld>
@@ -17400,7 +17406,7 @@
           <p:cNvPr id="9" name="Explosion: 14 Points 8">
             <a:extLst>
               <a:ext uri="{FF2B5EF4-FFF2-40B4-BE49-F238E27FC236}">
-                <a16:creationId xmlns:a16="http://schemas.microsoft.com/office/drawing/2014/main" xmlns="" id="{0A2CD68B-7A56-F86D-8B6F-4A8BF99B4C9E}"/>
+                <a16:creationId xmlns="" xmlns:a16="http://schemas.microsoft.com/office/drawing/2014/main" id="{0A2CD68B-7A56-F86D-8B6F-4A8BF99B4C9E}"/>
               </a:ext>
             </a:extLst>
           </p:cNvPr>
@@ -17455,7 +17461,7 @@
           <p:cNvPr id="2" name="Title 1">
             <a:extLst>
               <a:ext uri="{FF2B5EF4-FFF2-40B4-BE49-F238E27FC236}">
-                <a16:creationId xmlns:a16="http://schemas.microsoft.com/office/drawing/2014/main" xmlns="" id="{62BB4F8D-44B7-9866-F7B2-6375CB902974}"/>
+                <a16:creationId xmlns="" xmlns:a16="http://schemas.microsoft.com/office/drawing/2014/main" id="{62BB4F8D-44B7-9866-F7B2-6375CB902974}"/>
               </a:ext>
             </a:extLst>
           </p:cNvPr>
@@ -17594,7 +17600,7 @@
           <p:cNvPr id="8" name="TextBox 7">
             <a:extLst>
               <a:ext uri="{FF2B5EF4-FFF2-40B4-BE49-F238E27FC236}">
-                <a16:creationId xmlns:a16="http://schemas.microsoft.com/office/drawing/2014/main" xmlns="" id="{6E6F1672-8C91-3FA6-CB80-58FD68172333}"/>
+                <a16:creationId xmlns="" xmlns:a16="http://schemas.microsoft.com/office/drawing/2014/main" id="{6E6F1672-8C91-3FA6-CB80-58FD68172333}"/>
               </a:ext>
             </a:extLst>
           </p:cNvPr>
@@ -17673,7 +17679,7 @@
     </p:spTree>
     <p:extLst>
       <p:ext uri="{BB962C8B-B14F-4D97-AF65-F5344CB8AC3E}">
-        <p14:creationId xmlns:p14="http://schemas.microsoft.com/office/powerpoint/2010/main" xmlns="" val="3287175084"/>
+        <p14:creationId xmlns="" xmlns:p14="http://schemas.microsoft.com/office/powerpoint/2010/main" val="3287175084"/>
       </p:ext>
     </p:extLst>
   </p:cSld>
@@ -17698,7 +17704,7 @@
         <p:cNvPr id="1" name="">
           <a:extLst>
             <a:ext uri="{FF2B5EF4-FFF2-40B4-BE49-F238E27FC236}">
-              <a16:creationId xmlns:a16="http://schemas.microsoft.com/office/drawing/2014/main" xmlns="" id="{D210C62D-BA73-7142-9269-B229A82A227F}"/>
+              <a16:creationId xmlns="" xmlns:a16="http://schemas.microsoft.com/office/drawing/2014/main" id="{D210C62D-BA73-7142-9269-B229A82A227F}"/>
             </a:ext>
           </a:extLst>
         </p:cNvPr>
@@ -17718,7 +17724,7 @@
           <p:cNvPr id="2" name="Title 1">
             <a:extLst>
               <a:ext uri="{FF2B5EF4-FFF2-40B4-BE49-F238E27FC236}">
-                <a16:creationId xmlns:a16="http://schemas.microsoft.com/office/drawing/2014/main" xmlns="" id="{D5018557-B8C1-B1F3-960D-C1C68708243B}"/>
+                <a16:creationId xmlns="" xmlns:a16="http://schemas.microsoft.com/office/drawing/2014/main" id="{D5018557-B8C1-B1F3-960D-C1C68708243B}"/>
               </a:ext>
             </a:extLst>
           </p:cNvPr>
@@ -17758,7 +17764,7 @@
           <p:cNvPr id="3" name="Content Placeholder 2">
             <a:extLst>
               <a:ext uri="{FF2B5EF4-FFF2-40B4-BE49-F238E27FC236}">
-                <a16:creationId xmlns:a16="http://schemas.microsoft.com/office/drawing/2014/main" xmlns="" id="{24415AF3-2B9F-42C3-52C5-51254FAF8249}"/>
+                <a16:creationId xmlns="" xmlns:a16="http://schemas.microsoft.com/office/drawing/2014/main" id="{24415AF3-2B9F-42C3-52C5-51254FAF8249}"/>
               </a:ext>
             </a:extLst>
           </p:cNvPr>
@@ -17824,7 +17830,7 @@
           <p:cNvPr id="6" name="Ribbon: Curved and Tilted Down 5">
             <a:extLst>
               <a:ext uri="{FF2B5EF4-FFF2-40B4-BE49-F238E27FC236}">
-                <a16:creationId xmlns:a16="http://schemas.microsoft.com/office/drawing/2014/main" xmlns="" id="{7BEA6FE3-CC31-4B69-44C6-04DF1B8559E4}"/>
+                <a16:creationId xmlns="" xmlns:a16="http://schemas.microsoft.com/office/drawing/2014/main" id="{7BEA6FE3-CC31-4B69-44C6-04DF1B8559E4}"/>
               </a:ext>
             </a:extLst>
           </p:cNvPr>
@@ -17897,7 +17903,7 @@
           <p:cNvPr id="8" name="Scroll: Vertical 7">
             <a:extLst>
               <a:ext uri="{FF2B5EF4-FFF2-40B4-BE49-F238E27FC236}">
-                <a16:creationId xmlns:a16="http://schemas.microsoft.com/office/drawing/2014/main" xmlns="" id="{2D8E823F-54F9-1A01-E3EF-B3211339B30B}"/>
+                <a16:creationId xmlns="" xmlns:a16="http://schemas.microsoft.com/office/drawing/2014/main" id="{2D8E823F-54F9-1A01-E3EF-B3211339B30B}"/>
               </a:ext>
             </a:extLst>
           </p:cNvPr>
@@ -18167,7 +18173,7 @@
     </p:spTree>
     <p:extLst>
       <p:ext uri="{BB962C8B-B14F-4D97-AF65-F5344CB8AC3E}">
-        <p14:creationId xmlns:p14="http://schemas.microsoft.com/office/powerpoint/2010/main" xmlns="" val="3274136203"/>
+        <p14:creationId xmlns="" xmlns:p14="http://schemas.microsoft.com/office/powerpoint/2010/main" val="3274136203"/>
       </p:ext>
     </p:extLst>
   </p:cSld>
@@ -18185,7 +18191,7 @@
         <p:cNvPr id="1" name="">
           <a:extLst>
             <a:ext uri="{FF2B5EF4-FFF2-40B4-BE49-F238E27FC236}">
-              <a16:creationId xmlns:a16="http://schemas.microsoft.com/office/drawing/2014/main" xmlns="" id="{4586E9D7-F5F8-14CC-9DF6-FC4AF2EA4249}"/>
+              <a16:creationId xmlns="" xmlns:a16="http://schemas.microsoft.com/office/drawing/2014/main" id="{4586E9D7-F5F8-14CC-9DF6-FC4AF2EA4249}"/>
             </a:ext>
           </a:extLst>
         </p:cNvPr>
@@ -18205,7 +18211,7 @@
           <p:cNvPr id="2" name="Title 1">
             <a:extLst>
               <a:ext uri="{FF2B5EF4-FFF2-40B4-BE49-F238E27FC236}">
-                <a16:creationId xmlns:a16="http://schemas.microsoft.com/office/drawing/2014/main" xmlns="" id="{D8B67155-694F-FF61-7CDD-33A20A316215}"/>
+                <a16:creationId xmlns="" xmlns:a16="http://schemas.microsoft.com/office/drawing/2014/main" id="{D8B67155-694F-FF61-7CDD-33A20A316215}"/>
               </a:ext>
             </a:extLst>
           </p:cNvPr>
@@ -18331,7 +18337,7 @@
           <p:cNvPr id="6" name="Scroll: Vertical 5">
             <a:extLst>
               <a:ext uri="{FF2B5EF4-FFF2-40B4-BE49-F238E27FC236}">
-                <a16:creationId xmlns:a16="http://schemas.microsoft.com/office/drawing/2014/main" xmlns="" id="{1A4C732A-2840-82C8-A359-298D925E33B3}"/>
+                <a16:creationId xmlns="" xmlns:a16="http://schemas.microsoft.com/office/drawing/2014/main" id="{1A4C732A-2840-82C8-A359-298D925E33B3}"/>
               </a:ext>
             </a:extLst>
           </p:cNvPr>
@@ -18551,7 +18557,7 @@
           <p:cNvPr id="10" name="Title 1">
             <a:extLst>
               <a:ext uri="{FF2B5EF4-FFF2-40B4-BE49-F238E27FC236}">
-                <a16:creationId xmlns:a16="http://schemas.microsoft.com/office/drawing/2014/main" xmlns="" id="{D8B67155-694F-FF61-7CDD-33A20A316215}"/>
+                <a16:creationId xmlns="" xmlns:a16="http://schemas.microsoft.com/office/drawing/2014/main" id="{D8B67155-694F-FF61-7CDD-33A20A316215}"/>
               </a:ext>
             </a:extLst>
           </p:cNvPr>
@@ -18746,7 +18752,7 @@
     </p:spTree>
     <p:extLst>
       <p:ext uri="{BB962C8B-B14F-4D97-AF65-F5344CB8AC3E}">
-        <p14:creationId xmlns:p14="http://schemas.microsoft.com/office/powerpoint/2010/main" xmlns="" val="3002471670"/>
+        <p14:creationId xmlns="" xmlns:p14="http://schemas.microsoft.com/office/powerpoint/2010/main" val="3002471670"/>
       </p:ext>
     </p:extLst>
   </p:cSld>
@@ -18785,7 +18791,7 @@
           <p:cNvPr id="9" name="Explosion: 14 Points 8">
             <a:extLst>
               <a:ext uri="{FF2B5EF4-FFF2-40B4-BE49-F238E27FC236}">
-                <a16:creationId xmlns:a16="http://schemas.microsoft.com/office/drawing/2014/main" xmlns="" id="{0A2CD68B-7A56-F86D-8B6F-4A8BF99B4C9E}"/>
+                <a16:creationId xmlns="" xmlns:a16="http://schemas.microsoft.com/office/drawing/2014/main" id="{0A2CD68B-7A56-F86D-8B6F-4A8BF99B4C9E}"/>
               </a:ext>
             </a:extLst>
           </p:cNvPr>
@@ -18840,7 +18846,7 @@
           <p:cNvPr id="2" name="Title 1">
             <a:extLst>
               <a:ext uri="{FF2B5EF4-FFF2-40B4-BE49-F238E27FC236}">
-                <a16:creationId xmlns:a16="http://schemas.microsoft.com/office/drawing/2014/main" xmlns="" id="{62BB4F8D-44B7-9866-F7B2-6375CB902974}"/>
+                <a16:creationId xmlns="" xmlns:a16="http://schemas.microsoft.com/office/drawing/2014/main" id="{62BB4F8D-44B7-9866-F7B2-6375CB902974}"/>
               </a:ext>
             </a:extLst>
           </p:cNvPr>
@@ -18962,7 +18968,7 @@
           <p:cNvPr id="8" name="TextBox 7">
             <a:extLst>
               <a:ext uri="{FF2B5EF4-FFF2-40B4-BE49-F238E27FC236}">
-                <a16:creationId xmlns:a16="http://schemas.microsoft.com/office/drawing/2014/main" xmlns="" id="{6E6F1672-8C91-3FA6-CB80-58FD68172333}"/>
+                <a16:creationId xmlns="" xmlns:a16="http://schemas.microsoft.com/office/drawing/2014/main" id="{6E6F1672-8C91-3FA6-CB80-58FD68172333}"/>
               </a:ext>
             </a:extLst>
           </p:cNvPr>
@@ -19099,7 +19105,7 @@
     </p:spTree>
     <p:extLst>
       <p:ext uri="{BB962C8B-B14F-4D97-AF65-F5344CB8AC3E}">
-        <p14:creationId xmlns:p14="http://schemas.microsoft.com/office/powerpoint/2010/main" xmlns="" val="3287175084"/>
+        <p14:creationId xmlns="" xmlns:p14="http://schemas.microsoft.com/office/powerpoint/2010/main" val="3287175084"/>
       </p:ext>
     </p:extLst>
   </p:cSld>
@@ -19186,7 +19192,7 @@
           <p:cNvPr id="9" name="Explosion: 14 Points 8">
             <a:extLst>
               <a:ext uri="{FF2B5EF4-FFF2-40B4-BE49-F238E27FC236}">
-                <a16:creationId xmlns:a16="http://schemas.microsoft.com/office/drawing/2014/main" xmlns="" id="{0A2CD68B-7A56-F86D-8B6F-4A8BF99B4C9E}"/>
+                <a16:creationId xmlns="" xmlns:a16="http://schemas.microsoft.com/office/drawing/2014/main" id="{0A2CD68B-7A56-F86D-8B6F-4A8BF99B4C9E}"/>
               </a:ext>
             </a:extLst>
           </p:cNvPr>
@@ -19240,7 +19246,7 @@
           <p:cNvPr id="2" name="Title 1">
             <a:extLst>
               <a:ext uri="{FF2B5EF4-FFF2-40B4-BE49-F238E27FC236}">
-                <a16:creationId xmlns:a16="http://schemas.microsoft.com/office/drawing/2014/main" xmlns="" id="{62BB4F8D-44B7-9866-F7B2-6375CB902974}"/>
+                <a16:creationId xmlns="" xmlns:a16="http://schemas.microsoft.com/office/drawing/2014/main" id="{62BB4F8D-44B7-9866-F7B2-6375CB902974}"/>
               </a:ext>
             </a:extLst>
           </p:cNvPr>
@@ -19322,19 +19328,7 @@
                 </a:solidFill>
                 <a:latin typeface="Bahnschrift Light Condensed" pitchFamily="34" charset="0"/>
               </a:rPr>
-              <a:t>Arithmetic </a:t>
-            </a:r>
-            <a:r>
-              <a:rPr lang="en-US" sz="8800" b="1" dirty="0" smtClean="0">
-                <a:solidFill>
-                  <a:schemeClr val="accent2">
-                    <a:lumMod val="60000"/>
-                    <a:lumOff val="40000"/>
-                  </a:schemeClr>
-                </a:solidFill>
-                <a:latin typeface="Bahnschrift Light Condensed" pitchFamily="34" charset="0"/>
-              </a:rPr>
-              <a:t>Operators</a:t>
+              <a:t>Arithmetic Operators</a:t>
             </a:r>
             <a:r>
               <a:rPr lang="en-US" sz="6600" b="1" dirty="0" smtClean="0">
@@ -19365,7 +19359,7 @@
           <p:cNvPr id="8" name="TextBox 7">
             <a:extLst>
               <a:ext uri="{FF2B5EF4-FFF2-40B4-BE49-F238E27FC236}">
-                <a16:creationId xmlns:a16="http://schemas.microsoft.com/office/drawing/2014/main" xmlns="" id="{6E6F1672-8C91-3FA6-CB80-58FD68172333}"/>
+                <a16:creationId xmlns="" xmlns:a16="http://schemas.microsoft.com/office/drawing/2014/main" id="{6E6F1672-8C91-3FA6-CB80-58FD68172333}"/>
               </a:ext>
             </a:extLst>
           </p:cNvPr>
@@ -19990,7 +19984,7 @@
                     </a:outerShdw>
                   </a:effectLst>
                 </a:rPr>
-                <a:t>\</a:t>
+                <a:t>/</a:t>
               </a:r>
               <a:endParaRPr lang="en-US" sz="9600" b="1" cap="none" spc="0" dirty="0">
                 <a:ln w="12700">
@@ -20544,7 +20538,7 @@
     </p:spTree>
     <p:extLst>
       <p:ext uri="{BB962C8B-B14F-4D97-AF65-F5344CB8AC3E}">
-        <p14:creationId xmlns:p14="http://schemas.microsoft.com/office/powerpoint/2010/main" xmlns="" val="3287175084"/>
+        <p14:creationId xmlns="" xmlns:p14="http://schemas.microsoft.com/office/powerpoint/2010/main" val="3287175084"/>
       </p:ext>
     </p:extLst>
   </p:cSld>
@@ -20631,7 +20625,7 @@
           <p:cNvPr id="9" name="Explosion: 14 Points 8">
             <a:extLst>
               <a:ext uri="{FF2B5EF4-FFF2-40B4-BE49-F238E27FC236}">
-                <a16:creationId xmlns:a16="http://schemas.microsoft.com/office/drawing/2014/main" xmlns="" id="{0A2CD68B-7A56-F86D-8B6F-4A8BF99B4C9E}"/>
+                <a16:creationId xmlns="" xmlns:a16="http://schemas.microsoft.com/office/drawing/2014/main" id="{0A2CD68B-7A56-F86D-8B6F-4A8BF99B4C9E}"/>
               </a:ext>
             </a:extLst>
           </p:cNvPr>
@@ -20685,7 +20679,7 @@
           <p:cNvPr id="2" name="Title 1">
             <a:extLst>
               <a:ext uri="{FF2B5EF4-FFF2-40B4-BE49-F238E27FC236}">
-                <a16:creationId xmlns:a16="http://schemas.microsoft.com/office/drawing/2014/main" xmlns="" id="{62BB4F8D-44B7-9866-F7B2-6375CB902974}"/>
+                <a16:creationId xmlns="" xmlns:a16="http://schemas.microsoft.com/office/drawing/2014/main" id="{62BB4F8D-44B7-9866-F7B2-6375CB902974}"/>
               </a:ext>
             </a:extLst>
           </p:cNvPr>
@@ -20726,7 +20720,7 @@
                 </a:solidFill>
                 <a:latin typeface="Bahnschrift SemiLight" pitchFamily="34" charset="0"/>
               </a:rPr>
-              <a:t>10</a:t>
+              <a:t>9</a:t>
             </a:r>
             <a:r>
               <a:rPr lang="en-US" sz="7200" b="1" dirty="0" smtClean="0">
@@ -20798,7 +20792,7 @@
           <p:cNvPr id="8" name="TextBox 7">
             <a:extLst>
               <a:ext uri="{FF2B5EF4-FFF2-40B4-BE49-F238E27FC236}">
-                <a16:creationId xmlns:a16="http://schemas.microsoft.com/office/drawing/2014/main" xmlns="" id="{6E6F1672-8C91-3FA6-CB80-58FD68172333}"/>
+                <a16:creationId xmlns="" xmlns:a16="http://schemas.microsoft.com/office/drawing/2014/main" id="{6E6F1672-8C91-3FA6-CB80-58FD68172333}"/>
               </a:ext>
             </a:extLst>
           </p:cNvPr>
@@ -22146,7 +22140,7 @@
     </p:spTree>
     <p:extLst>
       <p:ext uri="{BB962C8B-B14F-4D97-AF65-F5344CB8AC3E}">
-        <p14:creationId xmlns:p14="http://schemas.microsoft.com/office/powerpoint/2010/main" xmlns="" val="3287175084"/>
+        <p14:creationId xmlns="" xmlns:p14="http://schemas.microsoft.com/office/powerpoint/2010/main" val="3287175084"/>
       </p:ext>
     </p:extLst>
   </p:cSld>
@@ -22233,7 +22227,7 @@
           <p:cNvPr id="9" name="Explosion: 14 Points 8">
             <a:extLst>
               <a:ext uri="{FF2B5EF4-FFF2-40B4-BE49-F238E27FC236}">
-                <a16:creationId xmlns:a16="http://schemas.microsoft.com/office/drawing/2014/main" xmlns="" id="{0A2CD68B-7A56-F86D-8B6F-4A8BF99B4C9E}"/>
+                <a16:creationId xmlns="" xmlns:a16="http://schemas.microsoft.com/office/drawing/2014/main" id="{0A2CD68B-7A56-F86D-8B6F-4A8BF99B4C9E}"/>
               </a:ext>
             </a:extLst>
           </p:cNvPr>
@@ -22287,7 +22281,7 @@
           <p:cNvPr id="2" name="Title 1">
             <a:extLst>
               <a:ext uri="{FF2B5EF4-FFF2-40B4-BE49-F238E27FC236}">
-                <a16:creationId xmlns:a16="http://schemas.microsoft.com/office/drawing/2014/main" xmlns="" id="{62BB4F8D-44B7-9866-F7B2-6375CB902974}"/>
+                <a16:creationId xmlns="" xmlns:a16="http://schemas.microsoft.com/office/drawing/2014/main" id="{62BB4F8D-44B7-9866-F7B2-6375CB902974}"/>
               </a:ext>
             </a:extLst>
           </p:cNvPr>
@@ -22328,7 +22322,7 @@
                 </a:solidFill>
                 <a:latin typeface="Bahnschrift SemiLight" pitchFamily="34" charset="0"/>
               </a:rPr>
-              <a:t>11</a:t>
+              <a:t>10</a:t>
             </a:r>
             <a:r>
               <a:rPr lang="en-US" sz="7200" b="1" dirty="0" smtClean="0">
@@ -22400,7 +22394,7 @@
           <p:cNvPr id="8" name="TextBox 7">
             <a:extLst>
               <a:ext uri="{FF2B5EF4-FFF2-40B4-BE49-F238E27FC236}">
-                <a16:creationId xmlns:a16="http://schemas.microsoft.com/office/drawing/2014/main" xmlns="" id="{6E6F1672-8C91-3FA6-CB80-58FD68172333}"/>
+                <a16:creationId xmlns="" xmlns:a16="http://schemas.microsoft.com/office/drawing/2014/main" id="{6E6F1672-8C91-3FA6-CB80-58FD68172333}"/>
               </a:ext>
             </a:extLst>
           </p:cNvPr>
@@ -22995,7 +22989,7 @@
     </p:spTree>
     <p:extLst>
       <p:ext uri="{BB962C8B-B14F-4D97-AF65-F5344CB8AC3E}">
-        <p14:creationId xmlns:p14="http://schemas.microsoft.com/office/powerpoint/2010/main" xmlns="" val="3287175084"/>
+        <p14:creationId xmlns="" xmlns:p14="http://schemas.microsoft.com/office/powerpoint/2010/main" val="3287175084"/>
       </p:ext>
     </p:extLst>
   </p:cSld>
@@ -23082,7 +23076,7 @@
           <p:cNvPr id="9" name="Explosion: 14 Points 8">
             <a:extLst>
               <a:ext uri="{FF2B5EF4-FFF2-40B4-BE49-F238E27FC236}">
-                <a16:creationId xmlns:a16="http://schemas.microsoft.com/office/drawing/2014/main" xmlns="" id="{0A2CD68B-7A56-F86D-8B6F-4A8BF99B4C9E}"/>
+                <a16:creationId xmlns="" xmlns:a16="http://schemas.microsoft.com/office/drawing/2014/main" id="{0A2CD68B-7A56-F86D-8B6F-4A8BF99B4C9E}"/>
               </a:ext>
             </a:extLst>
           </p:cNvPr>
@@ -23136,7 +23130,7 @@
           <p:cNvPr id="2" name="Title 1">
             <a:extLst>
               <a:ext uri="{FF2B5EF4-FFF2-40B4-BE49-F238E27FC236}">
-                <a16:creationId xmlns:a16="http://schemas.microsoft.com/office/drawing/2014/main" xmlns="" id="{62BB4F8D-44B7-9866-F7B2-6375CB902974}"/>
+                <a16:creationId xmlns="" xmlns:a16="http://schemas.microsoft.com/office/drawing/2014/main" id="{62BB4F8D-44B7-9866-F7B2-6375CB902974}"/>
               </a:ext>
             </a:extLst>
           </p:cNvPr>
@@ -23177,7 +23171,7 @@
                 </a:solidFill>
                 <a:latin typeface="Bahnschrift SemiLight" pitchFamily="34" charset="0"/>
               </a:rPr>
-              <a:t>11</a:t>
+              <a:t>10</a:t>
             </a:r>
             <a:r>
               <a:rPr lang="en-US" sz="7200" b="1" dirty="0" smtClean="0">
@@ -23206,31 +23200,7 @@
                 </a:solidFill>
                 <a:latin typeface="Bahnschrift Light Condensed" pitchFamily="34" charset="0"/>
               </a:rPr>
-              <a:t>(</a:t>
-            </a:r>
-            <a:r>
-              <a:rPr lang="en-US" sz="4800" dirty="0" smtClean="0">
-                <a:solidFill>
-                  <a:schemeClr val="accent2">
-                    <a:lumMod val="60000"/>
-                    <a:lumOff val="40000"/>
-                  </a:schemeClr>
-                </a:solidFill>
-                <a:latin typeface="Bahnschrift Light Condensed" pitchFamily="34" charset="0"/>
-              </a:rPr>
-              <a:t>Conditional/Ternary Operator</a:t>
-            </a:r>
-            <a:r>
-              <a:rPr lang="en-US" sz="4800" dirty="0" smtClean="0">
-                <a:solidFill>
-                  <a:schemeClr val="accent2">
-                    <a:lumMod val="60000"/>
-                    <a:lumOff val="40000"/>
-                  </a:schemeClr>
-                </a:solidFill>
-                <a:latin typeface="Bahnschrift Light Condensed" pitchFamily="34" charset="0"/>
-              </a:rPr>
-              <a:t>)</a:t>
+              <a:t>(Conditional/Ternary Operator)</a:t>
             </a:r>
             <a:endParaRPr lang="en-IN" sz="4800" dirty="0">
               <a:solidFill>
@@ -23249,7 +23219,7 @@
           <p:cNvPr id="8" name="TextBox 7">
             <a:extLst>
               <a:ext uri="{FF2B5EF4-FFF2-40B4-BE49-F238E27FC236}">
-                <a16:creationId xmlns:a16="http://schemas.microsoft.com/office/drawing/2014/main" xmlns="" id="{6E6F1672-8C91-3FA6-CB80-58FD68172333}"/>
+                <a16:creationId xmlns="" xmlns:a16="http://schemas.microsoft.com/office/drawing/2014/main" id="{6E6F1672-8C91-3FA6-CB80-58FD68172333}"/>
               </a:ext>
             </a:extLst>
           </p:cNvPr>
@@ -23613,7 +23583,7 @@
     </p:spTree>
     <p:extLst>
       <p:ext uri="{BB962C8B-B14F-4D97-AF65-F5344CB8AC3E}">
-        <p14:creationId xmlns:p14="http://schemas.microsoft.com/office/powerpoint/2010/main" xmlns="" val="3287175084"/>
+        <p14:creationId xmlns="" xmlns:p14="http://schemas.microsoft.com/office/powerpoint/2010/main" val="3287175084"/>
       </p:ext>
     </p:extLst>
   </p:cSld>
@@ -23638,7 +23608,7 @@
         <p:cNvPr id="1" name="">
           <a:extLst>
             <a:ext uri="{FF2B5EF4-FFF2-40B4-BE49-F238E27FC236}">
-              <a16:creationId xmlns:a16="http://schemas.microsoft.com/office/drawing/2014/main" xmlns="" id="{7139B82A-D876-79BD-D559-707BFDC5D481}"/>
+              <a16:creationId xmlns="" xmlns:a16="http://schemas.microsoft.com/office/drawing/2014/main" id="{7139B82A-D876-79BD-D559-707BFDC5D481}"/>
             </a:ext>
           </a:extLst>
         </p:cNvPr>
@@ -23658,7 +23628,7 @@
           <p:cNvPr id="8" name="Title 1">
             <a:extLst>
               <a:ext uri="{FF2B5EF4-FFF2-40B4-BE49-F238E27FC236}">
-                <a16:creationId xmlns:a16="http://schemas.microsoft.com/office/drawing/2014/main" xmlns="" id="{4C8D5637-E45A-11BE-1BA4-F40373E8D014}"/>
+                <a16:creationId xmlns="" xmlns:a16="http://schemas.microsoft.com/office/drawing/2014/main" id="{4C8D5637-E45A-11BE-1BA4-F40373E8D014}"/>
               </a:ext>
             </a:extLst>
           </p:cNvPr>
@@ -23695,7 +23665,7 @@
           <p:cNvPr id="3" name="Content Placeholder 2">
             <a:extLst>
               <a:ext uri="{FF2B5EF4-FFF2-40B4-BE49-F238E27FC236}">
-                <a16:creationId xmlns:a16="http://schemas.microsoft.com/office/drawing/2014/main" xmlns="" id="{86EB63D1-C74F-75B0-CE48-A95AEA2A21A1}"/>
+                <a16:creationId xmlns="" xmlns:a16="http://schemas.microsoft.com/office/drawing/2014/main" id="{86EB63D1-C74F-75B0-CE48-A95AEA2A21A1}"/>
               </a:ext>
             </a:extLst>
           </p:cNvPr>
@@ -23756,7 +23726,7 @@
           <p:cNvPr id="5" name="Ribbon: Curved and Tilted Down 4">
             <a:extLst>
               <a:ext uri="{FF2B5EF4-FFF2-40B4-BE49-F238E27FC236}">
-                <a16:creationId xmlns:a16="http://schemas.microsoft.com/office/drawing/2014/main" xmlns="" id="{75419B56-A4AB-830D-A49F-7700EED8C0FA}"/>
+                <a16:creationId xmlns="" xmlns:a16="http://schemas.microsoft.com/office/drawing/2014/main" id="{75419B56-A4AB-830D-A49F-7700EED8C0FA}"/>
               </a:ext>
             </a:extLst>
           </p:cNvPr>
@@ -23829,7 +23799,7 @@
           <p:cNvPr id="10" name="Scroll: Vertical 9">
             <a:extLst>
               <a:ext uri="{FF2B5EF4-FFF2-40B4-BE49-F238E27FC236}">
-                <a16:creationId xmlns:a16="http://schemas.microsoft.com/office/drawing/2014/main" xmlns="" id="{CD6C5744-A805-1655-2B2A-4D4D0DD0695E}"/>
+                <a16:creationId xmlns="" xmlns:a16="http://schemas.microsoft.com/office/drawing/2014/main" id="{CD6C5744-A805-1655-2B2A-4D4D0DD0695E}"/>
               </a:ext>
             </a:extLst>
           </p:cNvPr>
@@ -24145,7 +24115,7 @@
     </p:spTree>
     <p:extLst>
       <p:ext uri="{BB962C8B-B14F-4D97-AF65-F5344CB8AC3E}">
-        <p14:creationId xmlns:p14="http://schemas.microsoft.com/office/powerpoint/2010/main" xmlns="" val="3157857213"/>
+        <p14:creationId xmlns="" xmlns:p14="http://schemas.microsoft.com/office/powerpoint/2010/main" val="3157857213"/>
       </p:ext>
     </p:extLst>
   </p:cSld>
@@ -24163,7 +24133,7 @@
         <p:cNvPr id="1" name="">
           <a:extLst>
             <a:ext uri="{FF2B5EF4-FFF2-40B4-BE49-F238E27FC236}">
-              <a16:creationId xmlns:a16="http://schemas.microsoft.com/office/drawing/2014/main" xmlns="" id="{53D929B9-0FF5-B5F7-0DB4-914C4F4A1BB2}"/>
+              <a16:creationId xmlns="" xmlns:a16="http://schemas.microsoft.com/office/drawing/2014/main" id="{53D929B9-0FF5-B5F7-0DB4-914C4F4A1BB2}"/>
             </a:ext>
           </a:extLst>
         </p:cNvPr>
@@ -24183,7 +24153,7 @@
           <p:cNvPr id="7" name="Title 1">
             <a:extLst>
               <a:ext uri="{FF2B5EF4-FFF2-40B4-BE49-F238E27FC236}">
-                <a16:creationId xmlns:a16="http://schemas.microsoft.com/office/drawing/2014/main" xmlns="" id="{2D810556-B3F2-D67B-C5C6-43963FC8DAE7}"/>
+                <a16:creationId xmlns="" xmlns:a16="http://schemas.microsoft.com/office/drawing/2014/main" id="{2D810556-B3F2-D67B-C5C6-43963FC8DAE7}"/>
               </a:ext>
             </a:extLst>
           </p:cNvPr>
@@ -24220,7 +24190,7 @@
           <p:cNvPr id="3" name="Content Placeholder 2">
             <a:extLst>
               <a:ext uri="{FF2B5EF4-FFF2-40B4-BE49-F238E27FC236}">
-                <a16:creationId xmlns:a16="http://schemas.microsoft.com/office/drawing/2014/main" xmlns="" id="{8F0952B2-F12D-991D-3EC9-9526D8EDED87}"/>
+                <a16:creationId xmlns="" xmlns:a16="http://schemas.microsoft.com/office/drawing/2014/main" id="{8F0952B2-F12D-991D-3EC9-9526D8EDED87}"/>
               </a:ext>
             </a:extLst>
           </p:cNvPr>
@@ -24295,7 +24265,7 @@
           <p:cNvPr id="8" name="Ribbon: Curved and Tilted Down 7">
             <a:extLst>
               <a:ext uri="{FF2B5EF4-FFF2-40B4-BE49-F238E27FC236}">
-                <a16:creationId xmlns:a16="http://schemas.microsoft.com/office/drawing/2014/main" xmlns="" id="{C9C1F804-0CF6-A2DC-646C-9B9441D8EBB0}"/>
+                <a16:creationId xmlns="" xmlns:a16="http://schemas.microsoft.com/office/drawing/2014/main" id="{C9C1F804-0CF6-A2DC-646C-9B9441D8EBB0}"/>
               </a:ext>
             </a:extLst>
           </p:cNvPr>
@@ -24368,7 +24338,7 @@
           <p:cNvPr id="9" name="Scroll: Vertical 8">
             <a:extLst>
               <a:ext uri="{FF2B5EF4-FFF2-40B4-BE49-F238E27FC236}">
-                <a16:creationId xmlns:a16="http://schemas.microsoft.com/office/drawing/2014/main" xmlns="" id="{94613FC4-1176-9125-467B-B6CE33BB59CD}"/>
+                <a16:creationId xmlns="" xmlns:a16="http://schemas.microsoft.com/office/drawing/2014/main" id="{94613FC4-1176-9125-467B-B6CE33BB59CD}"/>
               </a:ext>
             </a:extLst>
           </p:cNvPr>
@@ -24684,7 +24654,7 @@
     </p:spTree>
     <p:extLst>
       <p:ext uri="{BB962C8B-B14F-4D97-AF65-F5344CB8AC3E}">
-        <p14:creationId xmlns:p14="http://schemas.microsoft.com/office/powerpoint/2010/main" xmlns="" val="2302025808"/>
+        <p14:creationId xmlns="" xmlns:p14="http://schemas.microsoft.com/office/powerpoint/2010/main" val="2302025808"/>
       </p:ext>
     </p:extLst>
   </p:cSld>
@@ -24702,7 +24672,7 @@
         <p:cNvPr id="1" name="">
           <a:extLst>
             <a:ext uri="{FF2B5EF4-FFF2-40B4-BE49-F238E27FC236}">
-              <a16:creationId xmlns:a16="http://schemas.microsoft.com/office/drawing/2014/main" xmlns="" id="{744B94CD-0809-14B6-E79F-D0C06F89CA15}"/>
+              <a16:creationId xmlns="" xmlns:a16="http://schemas.microsoft.com/office/drawing/2014/main" id="{744B94CD-0809-14B6-E79F-D0C06F89CA15}"/>
             </a:ext>
           </a:extLst>
         </p:cNvPr>
@@ -24722,7 +24692,7 @@
           <p:cNvPr id="9" name="Title 8">
             <a:extLst>
               <a:ext uri="{FF2B5EF4-FFF2-40B4-BE49-F238E27FC236}">
-                <a16:creationId xmlns:a16="http://schemas.microsoft.com/office/drawing/2014/main" xmlns="" id="{F3A13225-B875-57E9-5CCB-88427D8711E0}"/>
+                <a16:creationId xmlns="" xmlns:a16="http://schemas.microsoft.com/office/drawing/2014/main" id="{F3A13225-B875-57E9-5CCB-88427D8711E0}"/>
               </a:ext>
             </a:extLst>
           </p:cNvPr>
@@ -24762,7 +24732,7 @@
           <p:cNvPr id="3" name="Content Placeholder 2">
             <a:extLst>
               <a:ext uri="{FF2B5EF4-FFF2-40B4-BE49-F238E27FC236}">
-                <a16:creationId xmlns:a16="http://schemas.microsoft.com/office/drawing/2014/main" xmlns="" id="{29D21329-5AAF-6358-9761-2C4901A09C8C}"/>
+                <a16:creationId xmlns="" xmlns:a16="http://schemas.microsoft.com/office/drawing/2014/main" id="{29D21329-5AAF-6358-9761-2C4901A09C8C}"/>
               </a:ext>
             </a:extLst>
           </p:cNvPr>
@@ -24809,7 +24779,7 @@
           <p:cNvPr id="5" name="Title 1">
             <a:extLst>
               <a:ext uri="{FF2B5EF4-FFF2-40B4-BE49-F238E27FC236}">
-                <a16:creationId xmlns:a16="http://schemas.microsoft.com/office/drawing/2014/main" xmlns="" id="{23B0E81A-A704-BABA-7779-F926A6BFCB35}"/>
+                <a16:creationId xmlns="" xmlns:a16="http://schemas.microsoft.com/office/drawing/2014/main" id="{23B0E81A-A704-BABA-7779-F926A6BFCB35}"/>
               </a:ext>
             </a:extLst>
           </p:cNvPr>
@@ -24917,7 +24887,7 @@
           <p:cNvPr id="10" name="Ribbon: Curved and Tilted Down 9">
             <a:extLst>
               <a:ext uri="{FF2B5EF4-FFF2-40B4-BE49-F238E27FC236}">
-                <a16:creationId xmlns:a16="http://schemas.microsoft.com/office/drawing/2014/main" xmlns="" id="{3DBA1B1D-2AF2-C619-7353-1037498CD788}"/>
+                <a16:creationId xmlns="" xmlns:a16="http://schemas.microsoft.com/office/drawing/2014/main" id="{3DBA1B1D-2AF2-C619-7353-1037498CD788}"/>
               </a:ext>
             </a:extLst>
           </p:cNvPr>
@@ -24990,7 +24960,7 @@
           <p:cNvPr id="11" name="Scroll: Vertical 10">
             <a:extLst>
               <a:ext uri="{FF2B5EF4-FFF2-40B4-BE49-F238E27FC236}">
-                <a16:creationId xmlns:a16="http://schemas.microsoft.com/office/drawing/2014/main" xmlns="" id="{BE18EA22-49FD-59C7-DB0C-3006A91F02E6}"/>
+                <a16:creationId xmlns="" xmlns:a16="http://schemas.microsoft.com/office/drawing/2014/main" id="{BE18EA22-49FD-59C7-DB0C-3006A91F02E6}"/>
               </a:ext>
             </a:extLst>
           </p:cNvPr>
@@ -25306,7 +25276,7 @@
     </p:spTree>
     <p:extLst>
       <p:ext uri="{BB962C8B-B14F-4D97-AF65-F5344CB8AC3E}">
-        <p14:creationId xmlns:p14="http://schemas.microsoft.com/office/powerpoint/2010/main" xmlns="" val="1090188544"/>
+        <p14:creationId xmlns="" xmlns:p14="http://schemas.microsoft.com/office/powerpoint/2010/main" val="1090188544"/>
       </p:ext>
     </p:extLst>
   </p:cSld>
@@ -25324,7 +25294,7 @@
         <p:cNvPr id="1" name="">
           <a:extLst>
             <a:ext uri="{FF2B5EF4-FFF2-40B4-BE49-F238E27FC236}">
-              <a16:creationId xmlns:a16="http://schemas.microsoft.com/office/drawing/2014/main" xmlns="" id="{DFFF01F8-A8CD-88AB-42C3-C2E632C5474A}"/>
+              <a16:creationId xmlns="" xmlns:a16="http://schemas.microsoft.com/office/drawing/2014/main" id="{DFFF01F8-A8CD-88AB-42C3-C2E632C5474A}"/>
             </a:ext>
           </a:extLst>
         </p:cNvPr>
@@ -25344,7 +25314,7 @@
           <p:cNvPr id="7" name="Title 8">
             <a:extLst>
               <a:ext uri="{FF2B5EF4-FFF2-40B4-BE49-F238E27FC236}">
-                <a16:creationId xmlns:a16="http://schemas.microsoft.com/office/drawing/2014/main" xmlns="" id="{2CFF87A5-7472-22DC-030C-A3CCBBC3E824}"/>
+                <a16:creationId xmlns="" xmlns:a16="http://schemas.microsoft.com/office/drawing/2014/main" id="{2CFF87A5-7472-22DC-030C-A3CCBBC3E824}"/>
               </a:ext>
             </a:extLst>
           </p:cNvPr>
@@ -25384,7 +25354,7 @@
           <p:cNvPr id="3" name="Content Placeholder 2">
             <a:extLst>
               <a:ext uri="{FF2B5EF4-FFF2-40B4-BE49-F238E27FC236}">
-                <a16:creationId xmlns:a16="http://schemas.microsoft.com/office/drawing/2014/main" xmlns="" id="{1702553A-B321-D7AA-C0CD-A58D1C15FC38}"/>
+                <a16:creationId xmlns="" xmlns:a16="http://schemas.microsoft.com/office/drawing/2014/main" id="{1702553A-B321-D7AA-C0CD-A58D1C15FC38}"/>
               </a:ext>
             </a:extLst>
           </p:cNvPr>
@@ -25457,7 +25427,7 @@
           <p:cNvPr id="8" name="Ribbon: Curved and Tilted Down 7">
             <a:extLst>
               <a:ext uri="{FF2B5EF4-FFF2-40B4-BE49-F238E27FC236}">
-                <a16:creationId xmlns:a16="http://schemas.microsoft.com/office/drawing/2014/main" xmlns="" id="{C52AE18F-E34C-AFB6-7EA6-F589DEF7B3D0}"/>
+                <a16:creationId xmlns="" xmlns:a16="http://schemas.microsoft.com/office/drawing/2014/main" id="{C52AE18F-E34C-AFB6-7EA6-F589DEF7B3D0}"/>
               </a:ext>
             </a:extLst>
           </p:cNvPr>
@@ -25530,7 +25500,7 @@
           <p:cNvPr id="9" name="Scroll: Vertical 8">
             <a:extLst>
               <a:ext uri="{FF2B5EF4-FFF2-40B4-BE49-F238E27FC236}">
-                <a16:creationId xmlns:a16="http://schemas.microsoft.com/office/drawing/2014/main" xmlns="" id="{18A95ECD-6D24-C669-0CF8-39F3FBCDDA47}"/>
+                <a16:creationId xmlns="" xmlns:a16="http://schemas.microsoft.com/office/drawing/2014/main" id="{18A95ECD-6D24-C669-0CF8-39F3FBCDDA47}"/>
               </a:ext>
             </a:extLst>
           </p:cNvPr>
@@ -25846,7 +25816,7 @@
     </p:spTree>
     <p:extLst>
       <p:ext uri="{BB962C8B-B14F-4D97-AF65-F5344CB8AC3E}">
-        <p14:creationId xmlns:p14="http://schemas.microsoft.com/office/powerpoint/2010/main" xmlns="" val="1870717373"/>
+        <p14:creationId xmlns="" xmlns:p14="http://schemas.microsoft.com/office/powerpoint/2010/main" val="1870717373"/>
       </p:ext>
     </p:extLst>
   </p:cSld>
@@ -25864,7 +25834,7 @@
         <p:cNvPr id="1" name="">
           <a:extLst>
             <a:ext uri="{FF2B5EF4-FFF2-40B4-BE49-F238E27FC236}">
-              <a16:creationId xmlns:a16="http://schemas.microsoft.com/office/drawing/2014/main" xmlns="" id="{D224F207-D856-6E6D-9995-159800F589CD}"/>
+              <a16:creationId xmlns="" xmlns:a16="http://schemas.microsoft.com/office/drawing/2014/main" id="{D224F207-D856-6E6D-9995-159800F589CD}"/>
             </a:ext>
           </a:extLst>
         </p:cNvPr>
@@ -25884,7 +25854,7 @@
           <p:cNvPr id="5" name="Title 8">
             <a:extLst>
               <a:ext uri="{FF2B5EF4-FFF2-40B4-BE49-F238E27FC236}">
-                <a16:creationId xmlns:a16="http://schemas.microsoft.com/office/drawing/2014/main" xmlns="" id="{2773E7F4-011C-1186-0E83-1852CC157898}"/>
+                <a16:creationId xmlns="" xmlns:a16="http://schemas.microsoft.com/office/drawing/2014/main" id="{2773E7F4-011C-1186-0E83-1852CC157898}"/>
               </a:ext>
             </a:extLst>
           </p:cNvPr>
@@ -25924,7 +25894,7 @@
           <p:cNvPr id="3" name="Content Placeholder 2">
             <a:extLst>
               <a:ext uri="{FF2B5EF4-FFF2-40B4-BE49-F238E27FC236}">
-                <a16:creationId xmlns:a16="http://schemas.microsoft.com/office/drawing/2014/main" xmlns="" id="{9466D7CB-A484-F4DC-1247-3B0F9708D05F}"/>
+                <a16:creationId xmlns="" xmlns:a16="http://schemas.microsoft.com/office/drawing/2014/main" id="{9466D7CB-A484-F4DC-1247-3B0F9708D05F}"/>
               </a:ext>
             </a:extLst>
           </p:cNvPr>
@@ -25971,7 +25941,7 @@
           <p:cNvPr id="6" name="Ribbon: Curved and Tilted Down 5">
             <a:extLst>
               <a:ext uri="{FF2B5EF4-FFF2-40B4-BE49-F238E27FC236}">
-                <a16:creationId xmlns:a16="http://schemas.microsoft.com/office/drawing/2014/main" xmlns="" id="{DA6F4F8F-5ABC-21EF-A2AB-B0F4B5058194}"/>
+                <a16:creationId xmlns="" xmlns:a16="http://schemas.microsoft.com/office/drawing/2014/main" id="{DA6F4F8F-5ABC-21EF-A2AB-B0F4B5058194}"/>
               </a:ext>
             </a:extLst>
           </p:cNvPr>
@@ -26044,7 +26014,7 @@
           <p:cNvPr id="7" name="Scroll: Vertical 6">
             <a:extLst>
               <a:ext uri="{FF2B5EF4-FFF2-40B4-BE49-F238E27FC236}">
-                <a16:creationId xmlns:a16="http://schemas.microsoft.com/office/drawing/2014/main" xmlns="" id="{694A0A23-21B4-6D65-E96A-AD1A0AC04FCC}"/>
+                <a16:creationId xmlns="" xmlns:a16="http://schemas.microsoft.com/office/drawing/2014/main" id="{694A0A23-21B4-6D65-E96A-AD1A0AC04FCC}"/>
               </a:ext>
             </a:extLst>
           </p:cNvPr>
@@ -26360,7 +26330,7 @@
     </p:spTree>
     <p:extLst>
       <p:ext uri="{BB962C8B-B14F-4D97-AF65-F5344CB8AC3E}">
-        <p14:creationId xmlns:p14="http://schemas.microsoft.com/office/powerpoint/2010/main" xmlns="" val="755787835"/>
+        <p14:creationId xmlns="" xmlns:p14="http://schemas.microsoft.com/office/powerpoint/2010/main" val="755787835"/>
       </p:ext>
     </p:extLst>
   </p:cSld>
@@ -26378,7 +26348,7 @@
         <p:cNvPr id="1" name="">
           <a:extLst>
             <a:ext uri="{FF2B5EF4-FFF2-40B4-BE49-F238E27FC236}">
-              <a16:creationId xmlns:a16="http://schemas.microsoft.com/office/drawing/2014/main" xmlns="" id="{517DE5E6-801F-A2FD-C03F-6F5486821075}"/>
+              <a16:creationId xmlns="" xmlns:a16="http://schemas.microsoft.com/office/drawing/2014/main" id="{517DE5E6-801F-A2FD-C03F-6F5486821075}"/>
             </a:ext>
           </a:extLst>
         </p:cNvPr>
@@ -26398,7 +26368,7 @@
           <p:cNvPr id="2" name="Title 1">
             <a:extLst>
               <a:ext uri="{FF2B5EF4-FFF2-40B4-BE49-F238E27FC236}">
-                <a16:creationId xmlns:a16="http://schemas.microsoft.com/office/drawing/2014/main" xmlns="" id="{5F9D859A-CC6B-038D-5AE0-901278C3F6CE}"/>
+                <a16:creationId xmlns="" xmlns:a16="http://schemas.microsoft.com/office/drawing/2014/main" id="{5F9D859A-CC6B-038D-5AE0-901278C3F6CE}"/>
               </a:ext>
             </a:extLst>
           </p:cNvPr>
@@ -26436,7 +26406,7 @@
           <p:cNvPr id="3" name="Content Placeholder 2">
             <a:extLst>
               <a:ext uri="{FF2B5EF4-FFF2-40B4-BE49-F238E27FC236}">
-                <a16:creationId xmlns:a16="http://schemas.microsoft.com/office/drawing/2014/main" xmlns="" id="{E5BE3A65-ADA6-AEAF-69B6-B9779A59851F}"/>
+                <a16:creationId xmlns="" xmlns:a16="http://schemas.microsoft.com/office/drawing/2014/main" id="{E5BE3A65-ADA6-AEAF-69B6-B9779A59851F}"/>
               </a:ext>
             </a:extLst>
           </p:cNvPr>
@@ -26477,7 +26447,7 @@
           <p:cNvPr id="6" name="Ribbon: Curved and Tilted Down 5">
             <a:extLst>
               <a:ext uri="{FF2B5EF4-FFF2-40B4-BE49-F238E27FC236}">
-                <a16:creationId xmlns:a16="http://schemas.microsoft.com/office/drawing/2014/main" xmlns="" id="{571A9BAF-7164-4534-E0BD-EE0EDF7090A3}"/>
+                <a16:creationId xmlns="" xmlns:a16="http://schemas.microsoft.com/office/drawing/2014/main" id="{571A9BAF-7164-4534-E0BD-EE0EDF7090A3}"/>
               </a:ext>
             </a:extLst>
           </p:cNvPr>
@@ -26550,7 +26520,7 @@
           <p:cNvPr id="7" name="Scroll: Vertical 6">
             <a:extLst>
               <a:ext uri="{FF2B5EF4-FFF2-40B4-BE49-F238E27FC236}">
-                <a16:creationId xmlns:a16="http://schemas.microsoft.com/office/drawing/2014/main" xmlns="" id="{82B3A4DF-1DDB-DA3D-C01E-CA4956EC89D7}"/>
+                <a16:creationId xmlns="" xmlns:a16="http://schemas.microsoft.com/office/drawing/2014/main" id="{82B3A4DF-1DDB-DA3D-C01E-CA4956EC89D7}"/>
               </a:ext>
             </a:extLst>
           </p:cNvPr>
@@ -26866,7 +26836,7 @@
     </p:spTree>
     <p:extLst>
       <p:ext uri="{BB962C8B-B14F-4D97-AF65-F5344CB8AC3E}">
-        <p14:creationId xmlns:p14="http://schemas.microsoft.com/office/powerpoint/2010/main" xmlns="" val="3160480842"/>
+        <p14:creationId xmlns="" xmlns:p14="http://schemas.microsoft.com/office/powerpoint/2010/main" val="3160480842"/>
       </p:ext>
     </p:extLst>
   </p:cSld>
@@ -27127,7 +27097,7 @@
   <a:extraClrSchemeLst/>
   <a:extLst>
     <a:ext uri="{05A4C25C-085E-4340-85A3-A5531E510DB2}">
-      <thm15:themeFamily xmlns:thm15="http://schemas.microsoft.com/office/thememl/2012/main" xmlns="" name="Facet" id="{C0C680CD-088A-49FC-A102-D699147F32B2}" vid="{8C59B386-999D-4CB6-B907-9F3997C027CC}"/>
+      <thm15:themeFamily xmlns="" xmlns:thm15="http://schemas.microsoft.com/office/thememl/2012/main" name="Facet" id="{C0C680CD-088A-49FC-A102-D699147F32B2}" vid="{8C59B386-999D-4CB6-B907-9F3997C027CC}"/>
     </a:ext>
   </a:extLst>
 </a:theme>

</xml_diff>

<commit_message>
Added till chapter 12
</commit_message>
<xml_diff>
--- a/Javascript Tutorials.pptx
+++ b/Javascript Tutorials.pptx
@@ -251,7 +251,7 @@
             <a:fld id="{792F6C33-F1A2-419B-BA2F-6679E9D9EF00}" type="datetimeFigureOut">
               <a:rPr lang="en-US" smtClean="0"/>
               <a:pPr/>
-              <a:t>9/15/2025</a:t>
+              <a:t>9/21/2025</a:t>
             </a:fld>
             <a:endParaRPr lang="en-US"/>
           </a:p>
@@ -2457,7 +2457,7 @@
             <a:fld id="{48A87A34-81AB-432B-8DAE-1953F412C126}" type="datetimeFigureOut">
               <a:rPr lang="en-US" smtClean="0"/>
               <a:pPr/>
-              <a:t>9/15/2025</a:t>
+              <a:t>9/21/2025</a:t>
             </a:fld>
             <a:endParaRPr lang="en-US" dirty="0"/>
           </a:p>
@@ -2710,7 +2710,7 @@
             <a:fld id="{48A87A34-81AB-432B-8DAE-1953F412C126}" type="datetimeFigureOut">
               <a:rPr lang="en-US" smtClean="0"/>
               <a:pPr/>
-              <a:t>9/15/2025</a:t>
+              <a:t>9/21/2025</a:t>
             </a:fld>
             <a:endParaRPr lang="en-US" dirty="0"/>
           </a:p>
@@ -3026,7 +3026,7 @@
             <a:fld id="{48A87A34-81AB-432B-8DAE-1953F412C126}" type="datetimeFigureOut">
               <a:rPr lang="en-US" smtClean="0"/>
               <a:pPr/>
-              <a:t>9/15/2025</a:t>
+              <a:t>9/21/2025</a:t>
             </a:fld>
             <a:endParaRPr lang="en-US" dirty="0"/>
           </a:p>
@@ -3355,7 +3355,7 @@
             <a:fld id="{48A87A34-81AB-432B-8DAE-1953F412C126}" type="datetimeFigureOut">
               <a:rPr lang="en-US" smtClean="0"/>
               <a:pPr/>
-              <a:t>9/15/2025</a:t>
+              <a:t>9/21/2025</a:t>
             </a:fld>
             <a:endParaRPr lang="en-US" dirty="0"/>
           </a:p>
@@ -3671,7 +3671,7 @@
             <a:fld id="{48A87A34-81AB-432B-8DAE-1953F412C126}" type="datetimeFigureOut">
               <a:rPr lang="en-US" smtClean="0"/>
               <a:pPr/>
-              <a:t>9/15/2025</a:t>
+              <a:t>9/21/2025</a:t>
             </a:fld>
             <a:endParaRPr lang="en-US" dirty="0"/>
           </a:p>
@@ -4060,7 +4060,7 @@
             <a:fld id="{48A87A34-81AB-432B-8DAE-1953F412C126}" type="datetimeFigureOut">
               <a:rPr lang="en-US" smtClean="0"/>
               <a:pPr/>
-              <a:t>9/15/2025</a:t>
+              <a:t>9/21/2025</a:t>
             </a:fld>
             <a:endParaRPr lang="en-US" dirty="0"/>
           </a:p>
@@ -4232,7 +4232,7 @@
             <a:fld id="{48A87A34-81AB-432B-8DAE-1953F412C126}" type="datetimeFigureOut">
               <a:rPr lang="en-US" smtClean="0"/>
               <a:pPr/>
-              <a:t>9/15/2025</a:t>
+              <a:t>9/21/2025</a:t>
             </a:fld>
             <a:endParaRPr lang="en-US" dirty="0"/>
           </a:p>
@@ -4414,7 +4414,7 @@
             <a:fld id="{48A87A34-81AB-432B-8DAE-1953F412C126}" type="datetimeFigureOut">
               <a:rPr lang="en-US" smtClean="0"/>
               <a:pPr/>
-              <a:t>9/15/2025</a:t>
+              <a:t>9/21/2025</a:t>
             </a:fld>
             <a:endParaRPr lang="en-US" dirty="0"/>
           </a:p>
@@ -4592,7 +4592,7 @@
             <a:fld id="{48A87A34-81AB-432B-8DAE-1953F412C126}" type="datetimeFigureOut">
               <a:rPr lang="en-US" smtClean="0"/>
               <a:pPr/>
-              <a:t>9/15/2025</a:t>
+              <a:t>9/21/2025</a:t>
             </a:fld>
             <a:endParaRPr lang="en-US" dirty="0"/>
           </a:p>
@@ -4841,7 +4841,7 @@
             <a:fld id="{48A87A34-81AB-432B-8DAE-1953F412C126}" type="datetimeFigureOut">
               <a:rPr lang="en-US" smtClean="0"/>
               <a:pPr/>
-              <a:t>9/15/2025</a:t>
+              <a:t>9/21/2025</a:t>
             </a:fld>
             <a:endParaRPr lang="en-US" dirty="0"/>
           </a:p>
@@ -5075,7 +5075,7 @@
             <a:fld id="{48A87A34-81AB-432B-8DAE-1953F412C126}" type="datetimeFigureOut">
               <a:rPr lang="en-US" smtClean="0"/>
               <a:pPr/>
-              <a:t>9/15/2025</a:t>
+              <a:t>9/21/2025</a:t>
             </a:fld>
             <a:endParaRPr lang="en-US" dirty="0"/>
           </a:p>
@@ -5451,7 +5451,7 @@
             <a:fld id="{48A87A34-81AB-432B-8DAE-1953F412C126}" type="datetimeFigureOut">
               <a:rPr lang="en-US" smtClean="0"/>
               <a:pPr/>
-              <a:t>9/15/2025</a:t>
+              <a:t>9/21/2025</a:t>
             </a:fld>
             <a:endParaRPr lang="en-US" dirty="0"/>
           </a:p>
@@ -5576,7 +5576,7 @@
             <a:fld id="{48A87A34-81AB-432B-8DAE-1953F412C126}" type="datetimeFigureOut">
               <a:rPr lang="en-US" smtClean="0"/>
               <a:pPr/>
-              <a:t>9/15/2025</a:t>
+              <a:t>9/21/2025</a:t>
             </a:fld>
             <a:endParaRPr lang="en-US" dirty="0"/>
           </a:p>
@@ -5673,7 +5673,7 @@
             <a:fld id="{48A87A34-81AB-432B-8DAE-1953F412C126}" type="datetimeFigureOut">
               <a:rPr lang="en-US" smtClean="0"/>
               <a:pPr/>
-              <a:t>9/15/2025</a:t>
+              <a:t>9/21/2025</a:t>
             </a:fld>
             <a:endParaRPr lang="en-US" dirty="0"/>
           </a:p>
@@ -5930,7 +5930,7 @@
             <a:fld id="{48A87A34-81AB-432B-8DAE-1953F412C126}" type="datetimeFigureOut">
               <a:rPr lang="en-US" smtClean="0"/>
               <a:pPr/>
-              <a:t>9/15/2025</a:t>
+              <a:t>9/21/2025</a:t>
             </a:fld>
             <a:endParaRPr lang="en-US" dirty="0"/>
           </a:p>
@@ -6195,7 +6195,7 @@
             <a:fld id="{48A87A34-81AB-432B-8DAE-1953F412C126}" type="datetimeFigureOut">
               <a:rPr lang="en-US" smtClean="0"/>
               <a:pPr/>
-              <a:t>9/15/2025</a:t>
+              <a:t>9/21/2025</a:t>
             </a:fld>
             <a:endParaRPr lang="en-US" dirty="0"/>
           </a:p>
@@ -6942,7 +6942,7 @@
             <a:fld id="{48A87A34-81AB-432B-8DAE-1953F412C126}" type="datetimeFigureOut">
               <a:rPr lang="en-US" smtClean="0"/>
               <a:pPr/>
-              <a:t>9/15/2025</a:t>
+              <a:t>9/21/2025</a:t>
             </a:fld>
             <a:endParaRPr lang="en-US" dirty="0"/>
           </a:p>
@@ -27597,6 +27597,376 @@
           </a:p>
         </p:txBody>
       </p:sp>
+      <p:grpSp>
+        <p:nvGrpSpPr>
+          <p:cNvPr id="3" name="Group 30">
+            <a:extLst>
+              <a:ext uri="{FF2B5EF4-FFF2-40B4-BE49-F238E27FC236}">
+                <a16:creationId xmlns:a16="http://schemas.microsoft.com/office/drawing/2014/main" id="{E2089919-C4EC-FB8C-A3AA-E347808CE00C}"/>
+              </a:ext>
+            </a:extLst>
+          </p:cNvPr>
+          <p:cNvGrpSpPr/>
+          <p:nvPr/>
+        </p:nvGrpSpPr>
+        <p:grpSpPr>
+          <a:xfrm>
+            <a:off x="477079" y="887116"/>
+            <a:ext cx="2325756" cy="1636158"/>
+            <a:chOff x="487846" y="3362324"/>
+            <a:chExt cx="2325756" cy="1636158"/>
+          </a:xfrm>
+        </p:grpSpPr>
+        <p:sp>
+          <p:nvSpPr>
+            <p:cNvPr id="4" name="Rectangle 3">
+              <a:extLst>
+                <a:ext uri="{FF2B5EF4-FFF2-40B4-BE49-F238E27FC236}">
+                  <a16:creationId xmlns:a16="http://schemas.microsoft.com/office/drawing/2014/main" id="{9BBA336F-8DF0-23D8-64F2-3A6EEFF50F6D}"/>
+                </a:ext>
+              </a:extLst>
+            </p:cNvPr>
+            <p:cNvSpPr/>
+            <p:nvPr/>
+          </p:nvSpPr>
+          <p:spPr>
+            <a:xfrm>
+              <a:off x="589427" y="3362324"/>
+              <a:ext cx="2144248" cy="1569660"/>
+            </a:xfrm>
+            <a:prstGeom prst="rect">
+              <a:avLst/>
+            </a:prstGeom>
+            <a:noFill/>
+          </p:spPr>
+          <p:txBody>
+            <a:bodyPr wrap="square" lIns="91440" tIns="45720" rIns="91440" bIns="45720">
+              <a:spAutoFit/>
+            </a:bodyPr>
+            <a:lstStyle/>
+            <a:p>
+              <a:pPr algn="ctr"/>
+              <a:r>
+                <a:rPr lang="en-US" sz="9600" b="1" cap="none" spc="0" dirty="0">
+                  <a:ln w="12700">
+                    <a:solidFill>
+                      <a:schemeClr val="tx2">
+                        <a:satMod val="155000"/>
+                      </a:schemeClr>
+                    </a:solidFill>
+                    <a:prstDash val="solid"/>
+                  </a:ln>
+                  <a:solidFill>
+                    <a:schemeClr val="bg2">
+                      <a:tint val="85000"/>
+                      <a:satMod val="155000"/>
+                    </a:schemeClr>
+                  </a:solidFill>
+                  <a:effectLst>
+                    <a:outerShdw blurRad="41275" dist="20320" dir="1800000" algn="tl" rotWithShape="0">
+                      <a:srgbClr val="000000">
+                        <a:alpha val="40000"/>
+                      </a:srgbClr>
+                    </a:outerShdw>
+                  </a:effectLst>
+                  <a:latin typeface="Arial" pitchFamily="34" charset="0"/>
+                  <a:cs typeface="Arial" pitchFamily="34" charset="0"/>
+                </a:rPr>
+                <a:t>?</a:t>
+              </a:r>
+              <a:endParaRPr lang="en-US" b="1" cap="none" spc="0" dirty="0">
+                <a:ln w="12700">
+                  <a:solidFill>
+                    <a:schemeClr val="tx2">
+                      <a:satMod val="155000"/>
+                    </a:schemeClr>
+                  </a:solidFill>
+                  <a:prstDash val="solid"/>
+                </a:ln>
+                <a:solidFill>
+                  <a:schemeClr val="accent1">
+                    <a:lumMod val="40000"/>
+                    <a:lumOff val="60000"/>
+                  </a:schemeClr>
+                </a:solidFill>
+                <a:effectLst>
+                  <a:outerShdw blurRad="41275" dist="20320" dir="1800000" algn="tl" rotWithShape="0">
+                    <a:srgbClr val="000000">
+                      <a:alpha val="40000"/>
+                    </a:srgbClr>
+                  </a:outerShdw>
+                </a:effectLst>
+                <a:latin typeface="Arial" pitchFamily="34" charset="0"/>
+                <a:cs typeface="Arial" pitchFamily="34" charset="0"/>
+              </a:endParaRPr>
+            </a:p>
+          </p:txBody>
+        </p:sp>
+        <p:sp>
+          <p:nvSpPr>
+            <p:cNvPr id="5" name="TextBox 4">
+              <a:extLst>
+                <a:ext uri="{FF2B5EF4-FFF2-40B4-BE49-F238E27FC236}">
+                  <a16:creationId xmlns:a16="http://schemas.microsoft.com/office/drawing/2014/main" id="{B8A8D8FB-EFBE-CB3B-7D5C-45B70C8FA4B2}"/>
+                </a:ext>
+              </a:extLst>
+            </p:cNvPr>
+            <p:cNvSpPr txBox="1"/>
+            <p:nvPr/>
+          </p:nvSpPr>
+          <p:spPr>
+            <a:xfrm>
+              <a:off x="487846" y="4629150"/>
+              <a:ext cx="2325756" cy="369332"/>
+            </a:xfrm>
+            <a:prstGeom prst="rect">
+              <a:avLst/>
+            </a:prstGeom>
+            <a:noFill/>
+          </p:spPr>
+          <p:txBody>
+            <a:bodyPr wrap="square" rtlCol="0">
+              <a:spAutoFit/>
+            </a:bodyPr>
+            <a:lstStyle/>
+            <a:p>
+              <a:pPr algn="ctr"/>
+              <a:r>
+                <a:rPr lang="en-IN" dirty="0">
+                  <a:ln w="12700">
+                    <a:solidFill>
+                      <a:schemeClr val="tx2">
+                        <a:satMod val="155000"/>
+                      </a:schemeClr>
+                    </a:solidFill>
+                    <a:prstDash val="solid"/>
+                  </a:ln>
+                  <a:solidFill>
+                    <a:schemeClr val="accent1">
+                      <a:lumMod val="40000"/>
+                      <a:lumOff val="60000"/>
+                    </a:schemeClr>
+                  </a:solidFill>
+                  <a:latin typeface="Bahnschrift Light" pitchFamily="34" charset="0"/>
+                </a:rPr>
+                <a:t>Conditional/Ternary</a:t>
+              </a:r>
+              <a:endParaRPr lang="en-US" dirty="0">
+                <a:ln w="12700">
+                  <a:solidFill>
+                    <a:schemeClr val="tx2">
+                      <a:satMod val="155000"/>
+                    </a:schemeClr>
+                  </a:solidFill>
+                  <a:prstDash val="solid"/>
+                </a:ln>
+                <a:solidFill>
+                  <a:schemeClr val="accent1">
+                    <a:lumMod val="40000"/>
+                    <a:lumOff val="60000"/>
+                  </a:schemeClr>
+                </a:solidFill>
+                <a:latin typeface="Bahnschrift Light" pitchFamily="34" charset="0"/>
+              </a:endParaRPr>
+            </a:p>
+          </p:txBody>
+        </p:sp>
+      </p:grpSp>
+      <p:grpSp>
+        <p:nvGrpSpPr>
+          <p:cNvPr id="6" name="Group 30">
+            <a:extLst>
+              <a:ext uri="{FF2B5EF4-FFF2-40B4-BE49-F238E27FC236}">
+                <a16:creationId xmlns:a16="http://schemas.microsoft.com/office/drawing/2014/main" id="{3BFDCEFE-2911-D9DC-277F-7348D29CFECA}"/>
+              </a:ext>
+            </a:extLst>
+          </p:cNvPr>
+          <p:cNvGrpSpPr/>
+          <p:nvPr/>
+        </p:nvGrpSpPr>
+        <p:grpSpPr>
+          <a:xfrm>
+            <a:off x="9782372" y="659655"/>
+            <a:ext cx="2144248" cy="1913157"/>
+            <a:chOff x="589427" y="3362324"/>
+            <a:chExt cx="2144248" cy="1913157"/>
+          </a:xfrm>
+        </p:grpSpPr>
+        <p:sp>
+          <p:nvSpPr>
+            <p:cNvPr id="11" name="Rectangle 10">
+              <a:extLst>
+                <a:ext uri="{FF2B5EF4-FFF2-40B4-BE49-F238E27FC236}">
+                  <a16:creationId xmlns:a16="http://schemas.microsoft.com/office/drawing/2014/main" id="{5D297C90-5F9B-0663-CAD6-E35290601960}"/>
+                </a:ext>
+              </a:extLst>
+            </p:cNvPr>
+            <p:cNvSpPr/>
+            <p:nvPr/>
+          </p:nvSpPr>
+          <p:spPr>
+            <a:xfrm>
+              <a:off x="589427" y="3362324"/>
+              <a:ext cx="2144248" cy="1569660"/>
+            </a:xfrm>
+            <a:prstGeom prst="rect">
+              <a:avLst/>
+            </a:prstGeom>
+            <a:noFill/>
+          </p:spPr>
+          <p:txBody>
+            <a:bodyPr wrap="square" lIns="91440" tIns="45720" rIns="91440" bIns="45720">
+              <a:spAutoFit/>
+            </a:bodyPr>
+            <a:lstStyle/>
+            <a:p>
+              <a:pPr algn="ctr"/>
+              <a:r>
+                <a:rPr lang="en-US" sz="9600" b="1" cap="none" spc="0" dirty="0">
+                  <a:ln w="12700">
+                    <a:solidFill>
+                      <a:schemeClr val="tx2">
+                        <a:satMod val="155000"/>
+                      </a:schemeClr>
+                    </a:solidFill>
+                    <a:prstDash val="solid"/>
+                  </a:ln>
+                  <a:solidFill>
+                    <a:schemeClr val="bg2">
+                      <a:tint val="85000"/>
+                      <a:satMod val="155000"/>
+                    </a:schemeClr>
+                  </a:solidFill>
+                  <a:effectLst>
+                    <a:outerShdw blurRad="41275" dist="20320" dir="1800000" algn="tl" rotWithShape="0">
+                      <a:srgbClr val="000000">
+                        <a:alpha val="40000"/>
+                      </a:srgbClr>
+                    </a:outerShdw>
+                  </a:effectLst>
+                  <a:latin typeface="Arial" pitchFamily="34" charset="0"/>
+                  <a:cs typeface="Arial" pitchFamily="34" charset="0"/>
+                </a:rPr>
+                <a:t>??</a:t>
+              </a:r>
+              <a:endParaRPr lang="en-US" b="1" cap="none" spc="0" dirty="0">
+                <a:ln w="12700">
+                  <a:solidFill>
+                    <a:schemeClr val="tx2">
+                      <a:satMod val="155000"/>
+                    </a:schemeClr>
+                  </a:solidFill>
+                  <a:prstDash val="solid"/>
+                </a:ln>
+                <a:solidFill>
+                  <a:schemeClr val="accent1">
+                    <a:lumMod val="40000"/>
+                    <a:lumOff val="60000"/>
+                  </a:schemeClr>
+                </a:solidFill>
+                <a:effectLst>
+                  <a:outerShdw blurRad="41275" dist="20320" dir="1800000" algn="tl" rotWithShape="0">
+                    <a:srgbClr val="000000">
+                      <a:alpha val="40000"/>
+                    </a:srgbClr>
+                  </a:outerShdw>
+                </a:effectLst>
+                <a:latin typeface="Arial" pitchFamily="34" charset="0"/>
+                <a:cs typeface="Arial" pitchFamily="34" charset="0"/>
+              </a:endParaRPr>
+            </a:p>
+          </p:txBody>
+        </p:sp>
+        <p:sp>
+          <p:nvSpPr>
+            <p:cNvPr id="12" name="TextBox 11">
+              <a:extLst>
+                <a:ext uri="{FF2B5EF4-FFF2-40B4-BE49-F238E27FC236}">
+                  <a16:creationId xmlns:a16="http://schemas.microsoft.com/office/drawing/2014/main" id="{2AFD57DA-78FB-887A-9DFC-0F9A22CAD25A}"/>
+                </a:ext>
+              </a:extLst>
+            </p:cNvPr>
+            <p:cNvSpPr txBox="1"/>
+            <p:nvPr/>
+          </p:nvSpPr>
+          <p:spPr>
+            <a:xfrm>
+              <a:off x="971549" y="4629150"/>
+              <a:ext cx="1457325" cy="646331"/>
+            </a:xfrm>
+            <a:prstGeom prst="rect">
+              <a:avLst/>
+            </a:prstGeom>
+            <a:noFill/>
+          </p:spPr>
+          <p:txBody>
+            <a:bodyPr wrap="square" rtlCol="0">
+              <a:spAutoFit/>
+            </a:bodyPr>
+            <a:lstStyle/>
+            <a:p>
+              <a:pPr algn="ctr"/>
+              <a:r>
+                <a:rPr lang="en-IN" dirty="0" err="1">
+                  <a:ln w="12700">
+                    <a:solidFill>
+                      <a:schemeClr val="tx2">
+                        <a:satMod val="155000"/>
+                      </a:schemeClr>
+                    </a:solidFill>
+                    <a:prstDash val="solid"/>
+                  </a:ln>
+                  <a:solidFill>
+                    <a:schemeClr val="accent1">
+                      <a:lumMod val="40000"/>
+                      <a:lumOff val="60000"/>
+                    </a:schemeClr>
+                  </a:solidFill>
+                  <a:latin typeface="Bahnschrift Light" pitchFamily="34" charset="0"/>
+                </a:rPr>
+                <a:t>Nullish</a:t>
+              </a:r>
+              <a:r>
+                <a:rPr lang="en-IN" dirty="0">
+                  <a:ln w="12700">
+                    <a:solidFill>
+                      <a:schemeClr val="tx2">
+                        <a:satMod val="155000"/>
+                      </a:schemeClr>
+                    </a:solidFill>
+                    <a:prstDash val="solid"/>
+                  </a:ln>
+                  <a:solidFill>
+                    <a:schemeClr val="accent1">
+                      <a:lumMod val="40000"/>
+                      <a:lumOff val="60000"/>
+                    </a:schemeClr>
+                  </a:solidFill>
+                  <a:latin typeface="Bahnschrift Light" pitchFamily="34" charset="0"/>
+                </a:rPr>
+                <a:t> Operator</a:t>
+              </a:r>
+              <a:endParaRPr lang="en-US" dirty="0">
+                <a:ln w="12700">
+                  <a:solidFill>
+                    <a:schemeClr val="tx2">
+                      <a:satMod val="155000"/>
+                    </a:schemeClr>
+                  </a:solidFill>
+                  <a:prstDash val="solid"/>
+                </a:ln>
+                <a:solidFill>
+                  <a:schemeClr val="accent1">
+                    <a:lumMod val="40000"/>
+                    <a:lumOff val="60000"/>
+                  </a:schemeClr>
+                </a:solidFill>
+                <a:latin typeface="Bahnschrift Light" pitchFamily="34" charset="0"/>
+              </a:endParaRPr>
+            </a:p>
+          </p:txBody>
+        </p:sp>
+      </p:grpSp>
     </p:spTree>
     <p:extLst>
       <p:ext uri="{BB962C8B-B14F-4D97-AF65-F5344CB8AC3E}">

</xml_diff>

<commit_message>
Added chapter 15 video
</commit_message>
<xml_diff>
--- a/Javascript Tutorials.pptx
+++ b/Javascript Tutorials.pptx
@@ -5,7 +5,7 @@
     <p:sldMasterId id="2147483686" r:id="rId1"/>
   </p:sldMasterIdLst>
   <p:notesMasterIdLst>
-    <p:notesMasterId r:id="rId45"/>
+    <p:notesMasterId r:id="rId50"/>
   </p:notesMasterIdLst>
   <p:sldIdLst>
     <p:sldId id="256" r:id="rId2"/>
@@ -51,6 +51,11 @@
     <p:sldId id="301" r:id="rId42"/>
     <p:sldId id="292" r:id="rId43"/>
     <p:sldId id="293" r:id="rId44"/>
+    <p:sldId id="302" r:id="rId45"/>
+    <p:sldId id="303" r:id="rId46"/>
+    <p:sldId id="304" r:id="rId47"/>
+    <p:sldId id="305" r:id="rId48"/>
+    <p:sldId id="306" r:id="rId49"/>
   </p:sldIdLst>
   <p:sldSz cx="12192000" cy="6858000"/>
   <p:notesSz cx="6858000" cy="9144000"/>
@@ -251,7 +256,7 @@
             <a:fld id="{792F6C33-F1A2-419B-BA2F-6679E9D9EF00}" type="datetimeFigureOut">
               <a:rPr lang="en-US" smtClean="0"/>
               <a:pPr/>
-              <a:t>9/21/2025</a:t>
+              <a:t>9/24/2025</a:t>
             </a:fld>
             <a:endParaRPr lang="en-US"/>
           </a:p>
@@ -866,6 +871,561 @@
         </p:txBody>
       </p:sp>
     </p:spTree>
+  </p:cSld>
+  <p:clrMapOvr>
+    <a:masterClrMapping/>
+  </p:clrMapOvr>
+</p:notes>
+</file>
+
+<file path=ppt/notesSlides/notesSlide13.xml><?xml version="1.0" encoding="utf-8"?>
+<p:notes xmlns:a="http://schemas.openxmlformats.org/drawingml/2006/main" xmlns:r="http://schemas.openxmlformats.org/officeDocument/2006/relationships" xmlns:p="http://schemas.openxmlformats.org/presentationml/2006/main">
+  <p:cSld>
+    <p:spTree>
+      <p:nvGrpSpPr>
+        <p:cNvPr id="1" name="">
+          <a:extLst>
+            <a:ext uri="{FF2B5EF4-FFF2-40B4-BE49-F238E27FC236}">
+              <a16:creationId xmlns:a16="http://schemas.microsoft.com/office/drawing/2014/main" id="{8AB121F1-D57B-E183-35A6-1F7480EFAD66}"/>
+            </a:ext>
+          </a:extLst>
+        </p:cNvPr>
+        <p:cNvGrpSpPr/>
+        <p:nvPr/>
+      </p:nvGrpSpPr>
+      <p:grpSpPr>
+        <a:xfrm>
+          <a:off x="0" y="0"/>
+          <a:ext cx="0" cy="0"/>
+          <a:chOff x="0" y="0"/>
+          <a:chExt cx="0" cy="0"/>
+        </a:xfrm>
+      </p:grpSpPr>
+      <p:sp>
+        <p:nvSpPr>
+          <p:cNvPr id="2" name="Slide Image Placeholder 1">
+            <a:extLst>
+              <a:ext uri="{FF2B5EF4-FFF2-40B4-BE49-F238E27FC236}">
+                <a16:creationId xmlns:a16="http://schemas.microsoft.com/office/drawing/2014/main" id="{BAC0568F-42D9-40EE-08F2-22A50422A624}"/>
+              </a:ext>
+            </a:extLst>
+          </p:cNvPr>
+          <p:cNvSpPr>
+            <a:spLocks noGrp="1" noRot="1" noChangeAspect="1"/>
+          </p:cNvSpPr>
+          <p:nvPr>
+            <p:ph type="sldImg"/>
+          </p:nvPr>
+        </p:nvSpPr>
+        <p:spPr/>
+      </p:sp>
+      <p:sp>
+        <p:nvSpPr>
+          <p:cNvPr id="3" name="Notes Placeholder 2">
+            <a:extLst>
+              <a:ext uri="{FF2B5EF4-FFF2-40B4-BE49-F238E27FC236}">
+                <a16:creationId xmlns:a16="http://schemas.microsoft.com/office/drawing/2014/main" id="{62950922-EE82-0006-E213-30C83E615AA0}"/>
+              </a:ext>
+            </a:extLst>
+          </p:cNvPr>
+          <p:cNvSpPr>
+            <a:spLocks noGrp="1"/>
+          </p:cNvSpPr>
+          <p:nvPr>
+            <p:ph type="body" idx="1"/>
+          </p:nvPr>
+        </p:nvSpPr>
+        <p:spPr/>
+        <p:txBody>
+          <a:bodyPr>
+            <a:normAutofit/>
+          </a:bodyPr>
+          <a:lstStyle/>
+          <a:p>
+            <a:endParaRPr lang="en-US" dirty="0"/>
+          </a:p>
+        </p:txBody>
+      </p:sp>
+      <p:sp>
+        <p:nvSpPr>
+          <p:cNvPr id="4" name="Slide Number Placeholder 3">
+            <a:extLst>
+              <a:ext uri="{FF2B5EF4-FFF2-40B4-BE49-F238E27FC236}">
+                <a16:creationId xmlns:a16="http://schemas.microsoft.com/office/drawing/2014/main" id="{47D8DFD2-383C-184F-639E-B38D0F9BCB13}"/>
+              </a:ext>
+            </a:extLst>
+          </p:cNvPr>
+          <p:cNvSpPr>
+            <a:spLocks noGrp="1"/>
+          </p:cNvSpPr>
+          <p:nvPr>
+            <p:ph type="sldNum" sz="quarter" idx="10"/>
+          </p:nvPr>
+        </p:nvSpPr>
+        <p:spPr/>
+        <p:txBody>
+          <a:bodyPr/>
+          <a:lstStyle/>
+          <a:p>
+            <a:fld id="{319BE468-75AD-472B-90AC-B0CB707E0D7A}" type="slidenum">
+              <a:rPr lang="en-US" smtClean="0"/>
+              <a:pPr/>
+              <a:t>44</a:t>
+            </a:fld>
+            <a:endParaRPr lang="en-US"/>
+          </a:p>
+        </p:txBody>
+      </p:sp>
+    </p:spTree>
+    <p:extLst>
+      <p:ext uri="{BB962C8B-B14F-4D97-AF65-F5344CB8AC3E}">
+        <p14:creationId xmlns:p14="http://schemas.microsoft.com/office/powerpoint/2010/main" val="2069606323"/>
+      </p:ext>
+    </p:extLst>
+  </p:cSld>
+  <p:clrMapOvr>
+    <a:masterClrMapping/>
+  </p:clrMapOvr>
+</p:notes>
+</file>
+
+<file path=ppt/notesSlides/notesSlide14.xml><?xml version="1.0" encoding="utf-8"?>
+<p:notes xmlns:a="http://schemas.openxmlformats.org/drawingml/2006/main" xmlns:r="http://schemas.openxmlformats.org/officeDocument/2006/relationships" xmlns:p="http://schemas.openxmlformats.org/presentationml/2006/main">
+  <p:cSld>
+    <p:spTree>
+      <p:nvGrpSpPr>
+        <p:cNvPr id="1" name="">
+          <a:extLst>
+            <a:ext uri="{FF2B5EF4-FFF2-40B4-BE49-F238E27FC236}">
+              <a16:creationId xmlns:a16="http://schemas.microsoft.com/office/drawing/2014/main" id="{21E720A5-1D11-A9FA-A068-29072EE15F9D}"/>
+            </a:ext>
+          </a:extLst>
+        </p:cNvPr>
+        <p:cNvGrpSpPr/>
+        <p:nvPr/>
+      </p:nvGrpSpPr>
+      <p:grpSpPr>
+        <a:xfrm>
+          <a:off x="0" y="0"/>
+          <a:ext cx="0" cy="0"/>
+          <a:chOff x="0" y="0"/>
+          <a:chExt cx="0" cy="0"/>
+        </a:xfrm>
+      </p:grpSpPr>
+      <p:sp>
+        <p:nvSpPr>
+          <p:cNvPr id="2" name="Slide Image Placeholder 1">
+            <a:extLst>
+              <a:ext uri="{FF2B5EF4-FFF2-40B4-BE49-F238E27FC236}">
+                <a16:creationId xmlns:a16="http://schemas.microsoft.com/office/drawing/2014/main" id="{01E1A407-92FD-2B94-0C18-B452A2F7496B}"/>
+              </a:ext>
+            </a:extLst>
+          </p:cNvPr>
+          <p:cNvSpPr>
+            <a:spLocks noGrp="1" noRot="1" noChangeAspect="1"/>
+          </p:cNvSpPr>
+          <p:nvPr>
+            <p:ph type="sldImg"/>
+          </p:nvPr>
+        </p:nvSpPr>
+        <p:spPr/>
+      </p:sp>
+      <p:sp>
+        <p:nvSpPr>
+          <p:cNvPr id="3" name="Notes Placeholder 2">
+            <a:extLst>
+              <a:ext uri="{FF2B5EF4-FFF2-40B4-BE49-F238E27FC236}">
+                <a16:creationId xmlns:a16="http://schemas.microsoft.com/office/drawing/2014/main" id="{92DB66F7-9131-6444-4D50-7E63E31DA80F}"/>
+              </a:ext>
+            </a:extLst>
+          </p:cNvPr>
+          <p:cNvSpPr>
+            <a:spLocks noGrp="1"/>
+          </p:cNvSpPr>
+          <p:nvPr>
+            <p:ph type="body" idx="1"/>
+          </p:nvPr>
+        </p:nvSpPr>
+        <p:spPr/>
+        <p:txBody>
+          <a:bodyPr>
+            <a:normAutofit/>
+          </a:bodyPr>
+          <a:lstStyle/>
+          <a:p>
+            <a:endParaRPr lang="en-US" dirty="0"/>
+          </a:p>
+        </p:txBody>
+      </p:sp>
+      <p:sp>
+        <p:nvSpPr>
+          <p:cNvPr id="4" name="Slide Number Placeholder 3">
+            <a:extLst>
+              <a:ext uri="{FF2B5EF4-FFF2-40B4-BE49-F238E27FC236}">
+                <a16:creationId xmlns:a16="http://schemas.microsoft.com/office/drawing/2014/main" id="{DA029B22-A78E-D1AF-9448-BBEBFA0C81FA}"/>
+              </a:ext>
+            </a:extLst>
+          </p:cNvPr>
+          <p:cNvSpPr>
+            <a:spLocks noGrp="1"/>
+          </p:cNvSpPr>
+          <p:nvPr>
+            <p:ph type="sldNum" sz="quarter" idx="10"/>
+          </p:nvPr>
+        </p:nvSpPr>
+        <p:spPr/>
+        <p:txBody>
+          <a:bodyPr/>
+          <a:lstStyle/>
+          <a:p>
+            <a:fld id="{319BE468-75AD-472B-90AC-B0CB707E0D7A}" type="slidenum">
+              <a:rPr lang="en-US" smtClean="0"/>
+              <a:pPr/>
+              <a:t>45</a:t>
+            </a:fld>
+            <a:endParaRPr lang="en-US"/>
+          </a:p>
+        </p:txBody>
+      </p:sp>
+    </p:spTree>
+    <p:extLst>
+      <p:ext uri="{BB962C8B-B14F-4D97-AF65-F5344CB8AC3E}">
+        <p14:creationId xmlns:p14="http://schemas.microsoft.com/office/powerpoint/2010/main" val="1614916715"/>
+      </p:ext>
+    </p:extLst>
+  </p:cSld>
+  <p:clrMapOvr>
+    <a:masterClrMapping/>
+  </p:clrMapOvr>
+</p:notes>
+</file>
+
+<file path=ppt/notesSlides/notesSlide15.xml><?xml version="1.0" encoding="utf-8"?>
+<p:notes xmlns:a="http://schemas.openxmlformats.org/drawingml/2006/main" xmlns:r="http://schemas.openxmlformats.org/officeDocument/2006/relationships" xmlns:p="http://schemas.openxmlformats.org/presentationml/2006/main">
+  <p:cSld>
+    <p:spTree>
+      <p:nvGrpSpPr>
+        <p:cNvPr id="1" name="">
+          <a:extLst>
+            <a:ext uri="{FF2B5EF4-FFF2-40B4-BE49-F238E27FC236}">
+              <a16:creationId xmlns:a16="http://schemas.microsoft.com/office/drawing/2014/main" id="{BD584C02-1AF9-265A-1666-B59CB425961B}"/>
+            </a:ext>
+          </a:extLst>
+        </p:cNvPr>
+        <p:cNvGrpSpPr/>
+        <p:nvPr/>
+      </p:nvGrpSpPr>
+      <p:grpSpPr>
+        <a:xfrm>
+          <a:off x="0" y="0"/>
+          <a:ext cx="0" cy="0"/>
+          <a:chOff x="0" y="0"/>
+          <a:chExt cx="0" cy="0"/>
+        </a:xfrm>
+      </p:grpSpPr>
+      <p:sp>
+        <p:nvSpPr>
+          <p:cNvPr id="2" name="Slide Image Placeholder 1">
+            <a:extLst>
+              <a:ext uri="{FF2B5EF4-FFF2-40B4-BE49-F238E27FC236}">
+                <a16:creationId xmlns:a16="http://schemas.microsoft.com/office/drawing/2014/main" id="{62442BE0-90E9-B79E-C6DC-020235B13FF3}"/>
+              </a:ext>
+            </a:extLst>
+          </p:cNvPr>
+          <p:cNvSpPr>
+            <a:spLocks noGrp="1" noRot="1" noChangeAspect="1"/>
+          </p:cNvSpPr>
+          <p:nvPr>
+            <p:ph type="sldImg"/>
+          </p:nvPr>
+        </p:nvSpPr>
+        <p:spPr/>
+      </p:sp>
+      <p:sp>
+        <p:nvSpPr>
+          <p:cNvPr id="3" name="Notes Placeholder 2">
+            <a:extLst>
+              <a:ext uri="{FF2B5EF4-FFF2-40B4-BE49-F238E27FC236}">
+                <a16:creationId xmlns:a16="http://schemas.microsoft.com/office/drawing/2014/main" id="{F5EE6693-0C05-408D-7034-B6F2EB6147B4}"/>
+              </a:ext>
+            </a:extLst>
+          </p:cNvPr>
+          <p:cNvSpPr>
+            <a:spLocks noGrp="1"/>
+          </p:cNvSpPr>
+          <p:nvPr>
+            <p:ph type="body" idx="1"/>
+          </p:nvPr>
+        </p:nvSpPr>
+        <p:spPr/>
+        <p:txBody>
+          <a:bodyPr>
+            <a:normAutofit/>
+          </a:bodyPr>
+          <a:lstStyle/>
+          <a:p>
+            <a:endParaRPr lang="en-US" dirty="0"/>
+          </a:p>
+        </p:txBody>
+      </p:sp>
+      <p:sp>
+        <p:nvSpPr>
+          <p:cNvPr id="4" name="Slide Number Placeholder 3">
+            <a:extLst>
+              <a:ext uri="{FF2B5EF4-FFF2-40B4-BE49-F238E27FC236}">
+                <a16:creationId xmlns:a16="http://schemas.microsoft.com/office/drawing/2014/main" id="{BE6E9325-C266-45E8-BE43-3A32B4A27167}"/>
+              </a:ext>
+            </a:extLst>
+          </p:cNvPr>
+          <p:cNvSpPr>
+            <a:spLocks noGrp="1"/>
+          </p:cNvSpPr>
+          <p:nvPr>
+            <p:ph type="sldNum" sz="quarter" idx="10"/>
+          </p:nvPr>
+        </p:nvSpPr>
+        <p:spPr/>
+        <p:txBody>
+          <a:bodyPr/>
+          <a:lstStyle/>
+          <a:p>
+            <a:fld id="{319BE468-75AD-472B-90AC-B0CB707E0D7A}" type="slidenum">
+              <a:rPr lang="en-US" smtClean="0"/>
+              <a:pPr/>
+              <a:t>46</a:t>
+            </a:fld>
+            <a:endParaRPr lang="en-US"/>
+          </a:p>
+        </p:txBody>
+      </p:sp>
+    </p:spTree>
+    <p:extLst>
+      <p:ext uri="{BB962C8B-B14F-4D97-AF65-F5344CB8AC3E}">
+        <p14:creationId xmlns:p14="http://schemas.microsoft.com/office/powerpoint/2010/main" val="3343264826"/>
+      </p:ext>
+    </p:extLst>
+  </p:cSld>
+  <p:clrMapOvr>
+    <a:masterClrMapping/>
+  </p:clrMapOvr>
+</p:notes>
+</file>
+
+<file path=ppt/notesSlides/notesSlide16.xml><?xml version="1.0" encoding="utf-8"?>
+<p:notes xmlns:a="http://schemas.openxmlformats.org/drawingml/2006/main" xmlns:r="http://schemas.openxmlformats.org/officeDocument/2006/relationships" xmlns:p="http://schemas.openxmlformats.org/presentationml/2006/main">
+  <p:cSld>
+    <p:spTree>
+      <p:nvGrpSpPr>
+        <p:cNvPr id="1" name="">
+          <a:extLst>
+            <a:ext uri="{FF2B5EF4-FFF2-40B4-BE49-F238E27FC236}">
+              <a16:creationId xmlns:a16="http://schemas.microsoft.com/office/drawing/2014/main" id="{FFDFC5C8-F11A-DBB2-4E1B-7BAD3FF8F9DB}"/>
+            </a:ext>
+          </a:extLst>
+        </p:cNvPr>
+        <p:cNvGrpSpPr/>
+        <p:nvPr/>
+      </p:nvGrpSpPr>
+      <p:grpSpPr>
+        <a:xfrm>
+          <a:off x="0" y="0"/>
+          <a:ext cx="0" cy="0"/>
+          <a:chOff x="0" y="0"/>
+          <a:chExt cx="0" cy="0"/>
+        </a:xfrm>
+      </p:grpSpPr>
+      <p:sp>
+        <p:nvSpPr>
+          <p:cNvPr id="2" name="Slide Image Placeholder 1">
+            <a:extLst>
+              <a:ext uri="{FF2B5EF4-FFF2-40B4-BE49-F238E27FC236}">
+                <a16:creationId xmlns:a16="http://schemas.microsoft.com/office/drawing/2014/main" id="{2E34B5C4-0300-72B8-D740-3D4A4E5D6AEA}"/>
+              </a:ext>
+            </a:extLst>
+          </p:cNvPr>
+          <p:cNvSpPr>
+            <a:spLocks noGrp="1" noRot="1" noChangeAspect="1"/>
+          </p:cNvSpPr>
+          <p:nvPr>
+            <p:ph type="sldImg"/>
+          </p:nvPr>
+        </p:nvSpPr>
+        <p:spPr/>
+      </p:sp>
+      <p:sp>
+        <p:nvSpPr>
+          <p:cNvPr id="3" name="Notes Placeholder 2">
+            <a:extLst>
+              <a:ext uri="{FF2B5EF4-FFF2-40B4-BE49-F238E27FC236}">
+                <a16:creationId xmlns:a16="http://schemas.microsoft.com/office/drawing/2014/main" id="{2C5B3BAE-8669-CE80-2FC2-E1EA4A51CE95}"/>
+              </a:ext>
+            </a:extLst>
+          </p:cNvPr>
+          <p:cNvSpPr>
+            <a:spLocks noGrp="1"/>
+          </p:cNvSpPr>
+          <p:nvPr>
+            <p:ph type="body" idx="1"/>
+          </p:nvPr>
+        </p:nvSpPr>
+        <p:spPr/>
+        <p:txBody>
+          <a:bodyPr>
+            <a:normAutofit/>
+          </a:bodyPr>
+          <a:lstStyle/>
+          <a:p>
+            <a:endParaRPr lang="en-US" dirty="0"/>
+          </a:p>
+        </p:txBody>
+      </p:sp>
+      <p:sp>
+        <p:nvSpPr>
+          <p:cNvPr id="4" name="Slide Number Placeholder 3">
+            <a:extLst>
+              <a:ext uri="{FF2B5EF4-FFF2-40B4-BE49-F238E27FC236}">
+                <a16:creationId xmlns:a16="http://schemas.microsoft.com/office/drawing/2014/main" id="{10CDA95E-B250-2323-9F83-B1AB9E110B45}"/>
+              </a:ext>
+            </a:extLst>
+          </p:cNvPr>
+          <p:cNvSpPr>
+            <a:spLocks noGrp="1"/>
+          </p:cNvSpPr>
+          <p:nvPr>
+            <p:ph type="sldNum" sz="quarter" idx="10"/>
+          </p:nvPr>
+        </p:nvSpPr>
+        <p:spPr/>
+        <p:txBody>
+          <a:bodyPr/>
+          <a:lstStyle/>
+          <a:p>
+            <a:fld id="{319BE468-75AD-472B-90AC-B0CB707E0D7A}" type="slidenum">
+              <a:rPr lang="en-US" smtClean="0"/>
+              <a:pPr/>
+              <a:t>47</a:t>
+            </a:fld>
+            <a:endParaRPr lang="en-US"/>
+          </a:p>
+        </p:txBody>
+      </p:sp>
+    </p:spTree>
+    <p:extLst>
+      <p:ext uri="{BB962C8B-B14F-4D97-AF65-F5344CB8AC3E}">
+        <p14:creationId xmlns:p14="http://schemas.microsoft.com/office/powerpoint/2010/main" val="2120733897"/>
+      </p:ext>
+    </p:extLst>
+  </p:cSld>
+  <p:clrMapOvr>
+    <a:masterClrMapping/>
+  </p:clrMapOvr>
+</p:notes>
+</file>
+
+<file path=ppt/notesSlides/notesSlide17.xml><?xml version="1.0" encoding="utf-8"?>
+<p:notes xmlns:a="http://schemas.openxmlformats.org/drawingml/2006/main" xmlns:r="http://schemas.openxmlformats.org/officeDocument/2006/relationships" xmlns:p="http://schemas.openxmlformats.org/presentationml/2006/main">
+  <p:cSld>
+    <p:spTree>
+      <p:nvGrpSpPr>
+        <p:cNvPr id="1" name="">
+          <a:extLst>
+            <a:ext uri="{FF2B5EF4-FFF2-40B4-BE49-F238E27FC236}">
+              <a16:creationId xmlns:a16="http://schemas.microsoft.com/office/drawing/2014/main" id="{45D70808-5D9D-B48D-34C8-150141FEF960}"/>
+            </a:ext>
+          </a:extLst>
+        </p:cNvPr>
+        <p:cNvGrpSpPr/>
+        <p:nvPr/>
+      </p:nvGrpSpPr>
+      <p:grpSpPr>
+        <a:xfrm>
+          <a:off x="0" y="0"/>
+          <a:ext cx="0" cy="0"/>
+          <a:chOff x="0" y="0"/>
+          <a:chExt cx="0" cy="0"/>
+        </a:xfrm>
+      </p:grpSpPr>
+      <p:sp>
+        <p:nvSpPr>
+          <p:cNvPr id="2" name="Slide Image Placeholder 1">
+            <a:extLst>
+              <a:ext uri="{FF2B5EF4-FFF2-40B4-BE49-F238E27FC236}">
+                <a16:creationId xmlns:a16="http://schemas.microsoft.com/office/drawing/2014/main" id="{D0E70D3E-83C5-34CF-3364-3FCD627D3B28}"/>
+              </a:ext>
+            </a:extLst>
+          </p:cNvPr>
+          <p:cNvSpPr>
+            <a:spLocks noGrp="1" noRot="1" noChangeAspect="1"/>
+          </p:cNvSpPr>
+          <p:nvPr>
+            <p:ph type="sldImg"/>
+          </p:nvPr>
+        </p:nvSpPr>
+        <p:spPr/>
+      </p:sp>
+      <p:sp>
+        <p:nvSpPr>
+          <p:cNvPr id="3" name="Notes Placeholder 2">
+            <a:extLst>
+              <a:ext uri="{FF2B5EF4-FFF2-40B4-BE49-F238E27FC236}">
+                <a16:creationId xmlns:a16="http://schemas.microsoft.com/office/drawing/2014/main" id="{85B66180-E0B9-B010-C95E-FD3DEAD60C35}"/>
+              </a:ext>
+            </a:extLst>
+          </p:cNvPr>
+          <p:cNvSpPr>
+            <a:spLocks noGrp="1"/>
+          </p:cNvSpPr>
+          <p:nvPr>
+            <p:ph type="body" idx="1"/>
+          </p:nvPr>
+        </p:nvSpPr>
+        <p:spPr/>
+        <p:txBody>
+          <a:bodyPr>
+            <a:normAutofit/>
+          </a:bodyPr>
+          <a:lstStyle/>
+          <a:p>
+            <a:endParaRPr lang="en-US" dirty="0"/>
+          </a:p>
+        </p:txBody>
+      </p:sp>
+      <p:sp>
+        <p:nvSpPr>
+          <p:cNvPr id="4" name="Slide Number Placeholder 3">
+            <a:extLst>
+              <a:ext uri="{FF2B5EF4-FFF2-40B4-BE49-F238E27FC236}">
+                <a16:creationId xmlns:a16="http://schemas.microsoft.com/office/drawing/2014/main" id="{38A1C9CB-D75F-16C0-65E3-FEE1ADC5B007}"/>
+              </a:ext>
+            </a:extLst>
+          </p:cNvPr>
+          <p:cNvSpPr>
+            <a:spLocks noGrp="1"/>
+          </p:cNvSpPr>
+          <p:nvPr>
+            <p:ph type="sldNum" sz="quarter" idx="10"/>
+          </p:nvPr>
+        </p:nvSpPr>
+        <p:spPr/>
+        <p:txBody>
+          <a:bodyPr/>
+          <a:lstStyle/>
+          <a:p>
+            <a:fld id="{319BE468-75AD-472B-90AC-B0CB707E0D7A}" type="slidenum">
+              <a:rPr lang="en-US" smtClean="0"/>
+              <a:pPr/>
+              <a:t>48</a:t>
+            </a:fld>
+            <a:endParaRPr lang="en-US"/>
+          </a:p>
+        </p:txBody>
+      </p:sp>
+    </p:spTree>
+    <p:extLst>
+      <p:ext uri="{BB962C8B-B14F-4D97-AF65-F5344CB8AC3E}">
+        <p14:creationId xmlns:p14="http://schemas.microsoft.com/office/powerpoint/2010/main" val="1197296488"/>
+      </p:ext>
+    </p:extLst>
   </p:cSld>
   <p:clrMapOvr>
     <a:masterClrMapping/>
@@ -2457,7 +3017,7 @@
             <a:fld id="{48A87A34-81AB-432B-8DAE-1953F412C126}" type="datetimeFigureOut">
               <a:rPr lang="en-US" smtClean="0"/>
               <a:pPr/>
-              <a:t>9/21/2025</a:t>
+              <a:t>9/24/2025</a:t>
             </a:fld>
             <a:endParaRPr lang="en-US" dirty="0"/>
           </a:p>
@@ -2710,7 +3270,7 @@
             <a:fld id="{48A87A34-81AB-432B-8DAE-1953F412C126}" type="datetimeFigureOut">
               <a:rPr lang="en-US" smtClean="0"/>
               <a:pPr/>
-              <a:t>9/21/2025</a:t>
+              <a:t>9/24/2025</a:t>
             </a:fld>
             <a:endParaRPr lang="en-US" dirty="0"/>
           </a:p>
@@ -3026,7 +3586,7 @@
             <a:fld id="{48A87A34-81AB-432B-8DAE-1953F412C126}" type="datetimeFigureOut">
               <a:rPr lang="en-US" smtClean="0"/>
               <a:pPr/>
-              <a:t>9/21/2025</a:t>
+              <a:t>9/24/2025</a:t>
             </a:fld>
             <a:endParaRPr lang="en-US" dirty="0"/>
           </a:p>
@@ -3355,7 +3915,7 @@
             <a:fld id="{48A87A34-81AB-432B-8DAE-1953F412C126}" type="datetimeFigureOut">
               <a:rPr lang="en-US" smtClean="0"/>
               <a:pPr/>
-              <a:t>9/21/2025</a:t>
+              <a:t>9/24/2025</a:t>
             </a:fld>
             <a:endParaRPr lang="en-US" dirty="0"/>
           </a:p>
@@ -3671,7 +4231,7 @@
             <a:fld id="{48A87A34-81AB-432B-8DAE-1953F412C126}" type="datetimeFigureOut">
               <a:rPr lang="en-US" smtClean="0"/>
               <a:pPr/>
-              <a:t>9/21/2025</a:t>
+              <a:t>9/24/2025</a:t>
             </a:fld>
             <a:endParaRPr lang="en-US" dirty="0"/>
           </a:p>
@@ -4060,7 +4620,7 @@
             <a:fld id="{48A87A34-81AB-432B-8DAE-1953F412C126}" type="datetimeFigureOut">
               <a:rPr lang="en-US" smtClean="0"/>
               <a:pPr/>
-              <a:t>9/21/2025</a:t>
+              <a:t>9/24/2025</a:t>
             </a:fld>
             <a:endParaRPr lang="en-US" dirty="0"/>
           </a:p>
@@ -4232,7 +4792,7 @@
             <a:fld id="{48A87A34-81AB-432B-8DAE-1953F412C126}" type="datetimeFigureOut">
               <a:rPr lang="en-US" smtClean="0"/>
               <a:pPr/>
-              <a:t>9/21/2025</a:t>
+              <a:t>9/24/2025</a:t>
             </a:fld>
             <a:endParaRPr lang="en-US" dirty="0"/>
           </a:p>
@@ -4414,7 +4974,7 @@
             <a:fld id="{48A87A34-81AB-432B-8DAE-1953F412C126}" type="datetimeFigureOut">
               <a:rPr lang="en-US" smtClean="0"/>
               <a:pPr/>
-              <a:t>9/21/2025</a:t>
+              <a:t>9/24/2025</a:t>
             </a:fld>
             <a:endParaRPr lang="en-US" dirty="0"/>
           </a:p>
@@ -4592,7 +5152,7 @@
             <a:fld id="{48A87A34-81AB-432B-8DAE-1953F412C126}" type="datetimeFigureOut">
               <a:rPr lang="en-US" smtClean="0"/>
               <a:pPr/>
-              <a:t>9/21/2025</a:t>
+              <a:t>9/24/2025</a:t>
             </a:fld>
             <a:endParaRPr lang="en-US" dirty="0"/>
           </a:p>
@@ -4841,7 +5401,7 @@
             <a:fld id="{48A87A34-81AB-432B-8DAE-1953F412C126}" type="datetimeFigureOut">
               <a:rPr lang="en-US" smtClean="0"/>
               <a:pPr/>
-              <a:t>9/21/2025</a:t>
+              <a:t>9/24/2025</a:t>
             </a:fld>
             <a:endParaRPr lang="en-US" dirty="0"/>
           </a:p>
@@ -5075,7 +5635,7 @@
             <a:fld id="{48A87A34-81AB-432B-8DAE-1953F412C126}" type="datetimeFigureOut">
               <a:rPr lang="en-US" smtClean="0"/>
               <a:pPr/>
-              <a:t>9/21/2025</a:t>
+              <a:t>9/24/2025</a:t>
             </a:fld>
             <a:endParaRPr lang="en-US" dirty="0"/>
           </a:p>
@@ -5451,7 +6011,7 @@
             <a:fld id="{48A87A34-81AB-432B-8DAE-1953F412C126}" type="datetimeFigureOut">
               <a:rPr lang="en-US" smtClean="0"/>
               <a:pPr/>
-              <a:t>9/21/2025</a:t>
+              <a:t>9/24/2025</a:t>
             </a:fld>
             <a:endParaRPr lang="en-US" dirty="0"/>
           </a:p>
@@ -5576,7 +6136,7 @@
             <a:fld id="{48A87A34-81AB-432B-8DAE-1953F412C126}" type="datetimeFigureOut">
               <a:rPr lang="en-US" smtClean="0"/>
               <a:pPr/>
-              <a:t>9/21/2025</a:t>
+              <a:t>9/24/2025</a:t>
             </a:fld>
             <a:endParaRPr lang="en-US" dirty="0"/>
           </a:p>
@@ -5673,7 +6233,7 @@
             <a:fld id="{48A87A34-81AB-432B-8DAE-1953F412C126}" type="datetimeFigureOut">
               <a:rPr lang="en-US" smtClean="0"/>
               <a:pPr/>
-              <a:t>9/21/2025</a:t>
+              <a:t>9/24/2025</a:t>
             </a:fld>
             <a:endParaRPr lang="en-US" dirty="0"/>
           </a:p>
@@ -5930,7 +6490,7 @@
             <a:fld id="{48A87A34-81AB-432B-8DAE-1953F412C126}" type="datetimeFigureOut">
               <a:rPr lang="en-US" smtClean="0"/>
               <a:pPr/>
-              <a:t>9/21/2025</a:t>
+              <a:t>9/24/2025</a:t>
             </a:fld>
             <a:endParaRPr lang="en-US" dirty="0"/>
           </a:p>
@@ -6195,7 +6755,7 @@
             <a:fld id="{48A87A34-81AB-432B-8DAE-1953F412C126}" type="datetimeFigureOut">
               <a:rPr lang="en-US" smtClean="0"/>
               <a:pPr/>
-              <a:t>9/21/2025</a:t>
+              <a:t>9/24/2025</a:t>
             </a:fld>
             <a:endParaRPr lang="en-US" dirty="0"/>
           </a:p>
@@ -6942,7 +7502,7 @@
             <a:fld id="{48A87A34-81AB-432B-8DAE-1953F412C126}" type="datetimeFigureOut">
               <a:rPr lang="en-US" smtClean="0"/>
               <a:pPr/>
-              <a:t>9/21/2025</a:t>
+              <a:t>9/24/2025</a:t>
             </a:fld>
             <a:endParaRPr lang="en-US" dirty="0"/>
           </a:p>
@@ -27971,6 +28531,1944 @@
     <p:extLst>
       <p:ext uri="{BB962C8B-B14F-4D97-AF65-F5344CB8AC3E}">
         <p14:creationId xmlns:p14="http://schemas.microsoft.com/office/powerpoint/2010/main" val="3287175084"/>
+      </p:ext>
+    </p:extLst>
+  </p:cSld>
+  <p:clrMapOvr>
+    <a:masterClrMapping/>
+  </p:clrMapOvr>
+</p:sld>
+</file>
+
+<file path=ppt/slides/slide44.xml><?xml version="1.0" encoding="utf-8"?>
+<p:sld xmlns:a="http://schemas.openxmlformats.org/drawingml/2006/main" xmlns:r="http://schemas.openxmlformats.org/officeDocument/2006/relationships" xmlns:p="http://schemas.openxmlformats.org/presentationml/2006/main">
+  <p:cSld>
+    <p:spTree>
+      <p:nvGrpSpPr>
+        <p:cNvPr id="1" name="">
+          <a:extLst>
+            <a:ext uri="{FF2B5EF4-FFF2-40B4-BE49-F238E27FC236}">
+              <a16:creationId xmlns:a16="http://schemas.microsoft.com/office/drawing/2014/main" id="{20AC190F-78F5-516A-D15D-D00C150D240D}"/>
+            </a:ext>
+          </a:extLst>
+        </p:cNvPr>
+        <p:cNvGrpSpPr/>
+        <p:nvPr/>
+      </p:nvGrpSpPr>
+      <p:grpSpPr>
+        <a:xfrm>
+          <a:off x="0" y="0"/>
+          <a:ext cx="0" cy="0"/>
+          <a:chOff x="0" y="0"/>
+          <a:chExt cx="0" cy="0"/>
+        </a:xfrm>
+      </p:grpSpPr>
+      <p:sp>
+        <p:nvSpPr>
+          <p:cNvPr id="10" name="Rectangle 9">
+            <a:extLst>
+              <a:ext uri="{FF2B5EF4-FFF2-40B4-BE49-F238E27FC236}">
+                <a16:creationId xmlns:a16="http://schemas.microsoft.com/office/drawing/2014/main" id="{98A0C316-A1EB-5436-BD7B-6432E4348AE8}"/>
+              </a:ext>
+            </a:extLst>
+          </p:cNvPr>
+          <p:cNvSpPr/>
+          <p:nvPr/>
+        </p:nvSpPr>
+        <p:spPr>
+          <a:xfrm>
+            <a:off x="0" y="0"/>
+            <a:ext cx="12192000" cy="6858000"/>
+          </a:xfrm>
+          <a:prstGeom prst="rect">
+            <a:avLst/>
+          </a:prstGeom>
+          <a:solidFill>
+            <a:schemeClr val="bg2">
+              <a:lumMod val="50000"/>
+            </a:schemeClr>
+          </a:solidFill>
+          <a:ln>
+            <a:noFill/>
+          </a:ln>
+        </p:spPr>
+        <p:style>
+          <a:lnRef idx="2">
+            <a:schemeClr val="accent1">
+              <a:shade val="50000"/>
+            </a:schemeClr>
+          </a:lnRef>
+          <a:fillRef idx="1">
+            <a:schemeClr val="accent1"/>
+          </a:fillRef>
+          <a:effectRef idx="0">
+            <a:schemeClr val="accent1"/>
+          </a:effectRef>
+          <a:fontRef idx="minor">
+            <a:schemeClr val="lt1"/>
+          </a:fontRef>
+        </p:style>
+        <p:txBody>
+          <a:bodyPr rtlCol="0" anchor="ctr"/>
+          <a:lstStyle/>
+          <a:p>
+            <a:pPr algn="ctr"/>
+            <a:endParaRPr lang="en-US" dirty="0"/>
+          </a:p>
+        </p:txBody>
+      </p:sp>
+      <p:sp>
+        <p:nvSpPr>
+          <p:cNvPr id="9" name="Explosion: 14 Points 8">
+            <a:extLst>
+              <a:ext uri="{FF2B5EF4-FFF2-40B4-BE49-F238E27FC236}">
+                <a16:creationId xmlns:a16="http://schemas.microsoft.com/office/drawing/2014/main" id="{6510C8B3-7AAF-187C-794A-340DBC141494}"/>
+              </a:ext>
+            </a:extLst>
+          </p:cNvPr>
+          <p:cNvSpPr/>
+          <p:nvPr/>
+        </p:nvSpPr>
+        <p:spPr>
+          <a:xfrm>
+            <a:off x="4336395" y="0"/>
+            <a:ext cx="3669087" cy="3707684"/>
+          </a:xfrm>
+          <a:prstGeom prst="irregularSeal2">
+            <a:avLst/>
+          </a:prstGeom>
+          <a:solidFill>
+            <a:schemeClr val="bg2">
+              <a:lumMod val="75000"/>
+            </a:schemeClr>
+          </a:solidFill>
+          <a:ln>
+            <a:noFill/>
+          </a:ln>
+        </p:spPr>
+        <p:style>
+          <a:lnRef idx="2">
+            <a:schemeClr val="accent1">
+              <a:shade val="15000"/>
+            </a:schemeClr>
+          </a:lnRef>
+          <a:fillRef idx="1">
+            <a:schemeClr val="accent1"/>
+          </a:fillRef>
+          <a:effectRef idx="0">
+            <a:schemeClr val="accent1"/>
+          </a:effectRef>
+          <a:fontRef idx="minor">
+            <a:schemeClr val="lt1"/>
+          </a:fontRef>
+        </p:style>
+        <p:txBody>
+          <a:bodyPr rtlCol="0" anchor="ctr"/>
+          <a:lstStyle/>
+          <a:p>
+            <a:pPr algn="ctr"/>
+            <a:endParaRPr lang="en-IN"/>
+          </a:p>
+        </p:txBody>
+      </p:sp>
+      <p:sp>
+        <p:nvSpPr>
+          <p:cNvPr id="2" name="Title 1">
+            <a:extLst>
+              <a:ext uri="{FF2B5EF4-FFF2-40B4-BE49-F238E27FC236}">
+                <a16:creationId xmlns:a16="http://schemas.microsoft.com/office/drawing/2014/main" id="{C94BAEC9-4810-3554-B028-DA508B602B6F}"/>
+              </a:ext>
+            </a:extLst>
+          </p:cNvPr>
+          <p:cNvSpPr>
+            <a:spLocks noGrp="1"/>
+          </p:cNvSpPr>
+          <p:nvPr>
+            <p:ph type="title"/>
+          </p:nvPr>
+        </p:nvSpPr>
+        <p:spPr>
+          <a:xfrm>
+            <a:off x="0" y="-134470"/>
+            <a:ext cx="12192000" cy="3725396"/>
+          </a:xfrm>
+          <a:noFill/>
+        </p:spPr>
+        <p:txBody>
+          <a:bodyPr anchor="ctr">
+            <a:normAutofit/>
+          </a:bodyPr>
+          <a:lstStyle/>
+          <a:p>
+            <a:pPr algn="ctr"/>
+            <a:r>
+              <a:rPr lang="en-US" sz="7200" b="1" dirty="0">
+                <a:solidFill>
+                  <a:schemeClr val="tx1"/>
+                </a:solidFill>
+                <a:latin typeface="Barlow Black" panose="00000A00000000000000" pitchFamily="2" charset="0"/>
+              </a:rPr>
+              <a:t>Chapter – </a:t>
+            </a:r>
+            <a:r>
+              <a:rPr lang="en-US" sz="7200" dirty="0">
+                <a:solidFill>
+                  <a:schemeClr val="tx1"/>
+                </a:solidFill>
+                <a:latin typeface="Bahnschrift SemiLight" pitchFamily="34" charset="0"/>
+              </a:rPr>
+              <a:t>13</a:t>
+            </a:r>
+            <a:br>
+              <a:rPr lang="en-US" sz="7200" b="1" dirty="0">
+                <a:solidFill>
+                  <a:schemeClr val="tx1"/>
+                </a:solidFill>
+                <a:latin typeface="Barlow Black" panose="00000A00000000000000" pitchFamily="2" charset="0"/>
+              </a:rPr>
+            </a:br>
+            <a:r>
+              <a:rPr lang="en-US" sz="4800" dirty="0">
+                <a:solidFill>
+                  <a:schemeClr val="accent2">
+                    <a:lumMod val="60000"/>
+                    <a:lumOff val="40000"/>
+                  </a:schemeClr>
+                </a:solidFill>
+                <a:latin typeface="Bahnschrift Light Condensed" pitchFamily="34" charset="0"/>
+              </a:rPr>
+              <a:t>(More on </a:t>
+            </a:r>
+            <a:r>
+              <a:rPr lang="en-US" sz="4800" dirty="0" err="1">
+                <a:solidFill>
+                  <a:schemeClr val="accent2">
+                    <a:lumMod val="60000"/>
+                    <a:lumOff val="40000"/>
+                  </a:schemeClr>
+                </a:solidFill>
+                <a:latin typeface="Bahnschrift Light Condensed" pitchFamily="34" charset="0"/>
+              </a:rPr>
+              <a:t>Nullish</a:t>
+            </a:r>
+            <a:r>
+              <a:rPr lang="en-US" sz="4800" dirty="0">
+                <a:solidFill>
+                  <a:schemeClr val="accent2">
+                    <a:lumMod val="60000"/>
+                    <a:lumOff val="40000"/>
+                  </a:schemeClr>
+                </a:solidFill>
+                <a:latin typeface="Bahnschrift Light Condensed" pitchFamily="34" charset="0"/>
+              </a:rPr>
+              <a:t> Coalescing Operator)</a:t>
+            </a:r>
+            <a:endParaRPr lang="en-IN" sz="4800" b="1" dirty="0">
+              <a:solidFill>
+                <a:schemeClr val="accent2">
+                  <a:lumMod val="60000"/>
+                  <a:lumOff val="40000"/>
+                </a:schemeClr>
+              </a:solidFill>
+              <a:latin typeface="Bahnschrift Light Condensed" pitchFamily="34" charset="0"/>
+            </a:endParaRPr>
+          </a:p>
+        </p:txBody>
+      </p:sp>
+      <p:sp>
+        <p:nvSpPr>
+          <p:cNvPr id="8" name="TextBox 7">
+            <a:extLst>
+              <a:ext uri="{FF2B5EF4-FFF2-40B4-BE49-F238E27FC236}">
+                <a16:creationId xmlns:a16="http://schemas.microsoft.com/office/drawing/2014/main" id="{83115FE1-DE2E-E38E-5107-6A35961EE971}"/>
+              </a:ext>
+            </a:extLst>
+          </p:cNvPr>
+          <p:cNvSpPr txBox="1"/>
+          <p:nvPr/>
+        </p:nvSpPr>
+        <p:spPr>
+          <a:xfrm>
+            <a:off x="6057900" y="6308812"/>
+            <a:ext cx="6134100" cy="369332"/>
+          </a:xfrm>
+          <a:prstGeom prst="rect">
+            <a:avLst/>
+          </a:prstGeom>
+          <a:noFill/>
+        </p:spPr>
+        <p:txBody>
+          <a:bodyPr wrap="square" rtlCol="0">
+            <a:spAutoFit/>
+          </a:bodyPr>
+          <a:lstStyle/>
+          <a:p>
+            <a:pPr algn="ctr"/>
+            <a:r>
+              <a:rPr lang="en-US" b="1" dirty="0"/>
+              <a:t>Gautam Kumar- </a:t>
+            </a:r>
+            <a:r>
+              <a:rPr lang="en-US" dirty="0">
+                <a:solidFill>
+                  <a:schemeClr val="tx1">
+                    <a:lumMod val="50000"/>
+                    <a:lumOff val="50000"/>
+                  </a:schemeClr>
+                </a:solidFill>
+              </a:rPr>
+              <a:t>uidhtml.com</a:t>
+            </a:r>
+            <a:endParaRPr lang="en-IN" dirty="0">
+              <a:solidFill>
+                <a:schemeClr val="tx1">
+                  <a:lumMod val="50000"/>
+                  <a:lumOff val="50000"/>
+                </a:schemeClr>
+              </a:solidFill>
+            </a:endParaRPr>
+          </a:p>
+        </p:txBody>
+      </p:sp>
+      <p:sp>
+        <p:nvSpPr>
+          <p:cNvPr id="7" name="TextBox 6">
+            <a:extLst>
+              <a:ext uri="{FF2B5EF4-FFF2-40B4-BE49-F238E27FC236}">
+                <a16:creationId xmlns:a16="http://schemas.microsoft.com/office/drawing/2014/main" id="{2B92A286-3B45-6C9E-4731-78503F1246A1}"/>
+              </a:ext>
+            </a:extLst>
+          </p:cNvPr>
+          <p:cNvSpPr txBox="1"/>
+          <p:nvPr/>
+        </p:nvSpPr>
+        <p:spPr>
+          <a:xfrm>
+            <a:off x="241300" y="228600"/>
+            <a:ext cx="3190297" cy="584775"/>
+          </a:xfrm>
+          <a:prstGeom prst="rect">
+            <a:avLst/>
+          </a:prstGeom>
+          <a:noFill/>
+        </p:spPr>
+        <p:txBody>
+          <a:bodyPr wrap="none" rtlCol="0">
+            <a:spAutoFit/>
+          </a:bodyPr>
+          <a:lstStyle/>
+          <a:p>
+            <a:r>
+              <a:rPr lang="en-US" sz="3200" b="1" dirty="0">
+                <a:latin typeface="Barlow Condensed ExtraLight" panose="00000306000000000000" pitchFamily="2" charset="0"/>
+              </a:rPr>
+              <a:t>JavaScript - </a:t>
+            </a:r>
+            <a:r>
+              <a:rPr lang="en-US" sz="3200" b="1" dirty="0">
+                <a:solidFill>
+                  <a:srgbClr val="FFFF00"/>
+                </a:solidFill>
+                <a:latin typeface="Barlow Condensed ExtraLight" panose="00000306000000000000" pitchFamily="2" charset="0"/>
+              </a:rPr>
+              <a:t>Operators</a:t>
+            </a:r>
+            <a:endParaRPr lang="en-US" sz="3200" dirty="0">
+              <a:solidFill>
+                <a:srgbClr val="FFFF00"/>
+              </a:solidFill>
+            </a:endParaRPr>
+          </a:p>
+        </p:txBody>
+      </p:sp>
+      <p:pic>
+        <p:nvPicPr>
+          <p:cNvPr id="1027" name="Picture 3" descr="K:\github-repo\javascript-tutorials\tutorials\chapter-7-data-conversion\assets\images\javascript-logo.png">
+            <a:extLst>
+              <a:ext uri="{FF2B5EF4-FFF2-40B4-BE49-F238E27FC236}">
+                <a16:creationId xmlns:a16="http://schemas.microsoft.com/office/drawing/2014/main" id="{79547C80-23B8-28ED-215F-7543DC92154C}"/>
+              </a:ext>
+            </a:extLst>
+          </p:cNvPr>
+          <p:cNvPicPr>
+            <a:picLocks noChangeAspect="1" noChangeArrowheads="1"/>
+          </p:cNvPicPr>
+          <p:nvPr/>
+        </p:nvPicPr>
+        <p:blipFill>
+          <a:blip r:embed="rId3"/>
+          <a:srcRect/>
+          <a:stretch>
+            <a:fillRect/>
+          </a:stretch>
+        </p:blipFill>
+        <p:spPr bwMode="auto">
+          <a:xfrm>
+            <a:off x="10712450" y="5353050"/>
+            <a:ext cx="1314450" cy="1314450"/>
+          </a:xfrm>
+          <a:prstGeom prst="rect">
+            <a:avLst/>
+          </a:prstGeom>
+          <a:noFill/>
+        </p:spPr>
+      </p:pic>
+      <p:sp>
+        <p:nvSpPr>
+          <p:cNvPr id="32" name="TextBox 31">
+            <a:extLst>
+              <a:ext uri="{FF2B5EF4-FFF2-40B4-BE49-F238E27FC236}">
+                <a16:creationId xmlns:a16="http://schemas.microsoft.com/office/drawing/2014/main" id="{ADA30B64-EB13-F4D8-3DB9-57BB6A29677B}"/>
+              </a:ext>
+            </a:extLst>
+          </p:cNvPr>
+          <p:cNvSpPr txBox="1"/>
+          <p:nvPr/>
+        </p:nvSpPr>
+        <p:spPr>
+          <a:xfrm>
+            <a:off x="74938" y="3346943"/>
+            <a:ext cx="12191999" cy="2400657"/>
+          </a:xfrm>
+          <a:prstGeom prst="rect">
+            <a:avLst/>
+          </a:prstGeom>
+          <a:noFill/>
+        </p:spPr>
+        <p:txBody>
+          <a:bodyPr wrap="square" rtlCol="0">
+            <a:spAutoFit/>
+          </a:bodyPr>
+          <a:lstStyle/>
+          <a:p>
+            <a:pPr algn="ctr"/>
+            <a:r>
+              <a:rPr lang="en-IN" sz="15000" dirty="0">
+                <a:latin typeface="Arial Black" panose="020B0A04020102020204" pitchFamily="34" charset="0"/>
+              </a:rPr>
+              <a:t>??=</a:t>
+            </a:r>
+            <a:endParaRPr lang="en-US" sz="15000" dirty="0">
+              <a:solidFill>
+                <a:schemeClr val="bg2">
+                  <a:lumMod val="60000"/>
+                  <a:lumOff val="40000"/>
+                </a:schemeClr>
+              </a:solidFill>
+              <a:latin typeface="Arial Black" panose="020B0A04020102020204" pitchFamily="34" charset="0"/>
+            </a:endParaRPr>
+          </a:p>
+        </p:txBody>
+      </p:sp>
+    </p:spTree>
+    <p:extLst>
+      <p:ext uri="{BB962C8B-B14F-4D97-AF65-F5344CB8AC3E}">
+        <p14:creationId xmlns:p14="http://schemas.microsoft.com/office/powerpoint/2010/main" val="1240549947"/>
+      </p:ext>
+    </p:extLst>
+  </p:cSld>
+  <p:clrMapOvr>
+    <a:masterClrMapping/>
+  </p:clrMapOvr>
+</p:sld>
+</file>
+
+<file path=ppt/slides/slide45.xml><?xml version="1.0" encoding="utf-8"?>
+<p:sld xmlns:a="http://schemas.openxmlformats.org/drawingml/2006/main" xmlns:r="http://schemas.openxmlformats.org/officeDocument/2006/relationships" xmlns:p="http://schemas.openxmlformats.org/presentationml/2006/main">
+  <p:cSld>
+    <p:spTree>
+      <p:nvGrpSpPr>
+        <p:cNvPr id="1" name="">
+          <a:extLst>
+            <a:ext uri="{FF2B5EF4-FFF2-40B4-BE49-F238E27FC236}">
+              <a16:creationId xmlns:a16="http://schemas.microsoft.com/office/drawing/2014/main" id="{C09E25A9-BD55-7B4C-7673-8D3BA004282B}"/>
+            </a:ext>
+          </a:extLst>
+        </p:cNvPr>
+        <p:cNvGrpSpPr/>
+        <p:nvPr/>
+      </p:nvGrpSpPr>
+      <p:grpSpPr>
+        <a:xfrm>
+          <a:off x="0" y="0"/>
+          <a:ext cx="0" cy="0"/>
+          <a:chOff x="0" y="0"/>
+          <a:chExt cx="0" cy="0"/>
+        </a:xfrm>
+      </p:grpSpPr>
+      <p:sp>
+        <p:nvSpPr>
+          <p:cNvPr id="10" name="Rectangle 9">
+            <a:extLst>
+              <a:ext uri="{FF2B5EF4-FFF2-40B4-BE49-F238E27FC236}">
+                <a16:creationId xmlns:a16="http://schemas.microsoft.com/office/drawing/2014/main" id="{C22915B0-01E8-48DC-AA22-65CD0A63F70B}"/>
+              </a:ext>
+            </a:extLst>
+          </p:cNvPr>
+          <p:cNvSpPr/>
+          <p:nvPr/>
+        </p:nvSpPr>
+        <p:spPr>
+          <a:xfrm>
+            <a:off x="0" y="0"/>
+            <a:ext cx="12192000" cy="6858000"/>
+          </a:xfrm>
+          <a:prstGeom prst="rect">
+            <a:avLst/>
+          </a:prstGeom>
+          <a:solidFill>
+            <a:schemeClr val="bg2">
+              <a:lumMod val="50000"/>
+            </a:schemeClr>
+          </a:solidFill>
+          <a:ln>
+            <a:noFill/>
+          </a:ln>
+        </p:spPr>
+        <p:style>
+          <a:lnRef idx="2">
+            <a:schemeClr val="accent1">
+              <a:shade val="50000"/>
+            </a:schemeClr>
+          </a:lnRef>
+          <a:fillRef idx="1">
+            <a:schemeClr val="accent1"/>
+          </a:fillRef>
+          <a:effectRef idx="0">
+            <a:schemeClr val="accent1"/>
+          </a:effectRef>
+          <a:fontRef idx="minor">
+            <a:schemeClr val="lt1"/>
+          </a:fontRef>
+        </p:style>
+        <p:txBody>
+          <a:bodyPr rtlCol="0" anchor="ctr"/>
+          <a:lstStyle/>
+          <a:p>
+            <a:pPr algn="ctr"/>
+            <a:endParaRPr lang="en-US" dirty="0"/>
+          </a:p>
+        </p:txBody>
+      </p:sp>
+      <p:sp>
+        <p:nvSpPr>
+          <p:cNvPr id="9" name="Explosion: 14 Points 8">
+            <a:extLst>
+              <a:ext uri="{FF2B5EF4-FFF2-40B4-BE49-F238E27FC236}">
+                <a16:creationId xmlns:a16="http://schemas.microsoft.com/office/drawing/2014/main" id="{30292A10-9779-2CF8-3EA9-AD12D4DFA726}"/>
+              </a:ext>
+            </a:extLst>
+          </p:cNvPr>
+          <p:cNvSpPr/>
+          <p:nvPr/>
+        </p:nvSpPr>
+        <p:spPr>
+          <a:xfrm>
+            <a:off x="4336395" y="0"/>
+            <a:ext cx="3669087" cy="3707684"/>
+          </a:xfrm>
+          <a:prstGeom prst="irregularSeal2">
+            <a:avLst/>
+          </a:prstGeom>
+          <a:solidFill>
+            <a:schemeClr val="bg2">
+              <a:lumMod val="75000"/>
+            </a:schemeClr>
+          </a:solidFill>
+          <a:ln>
+            <a:noFill/>
+          </a:ln>
+        </p:spPr>
+        <p:style>
+          <a:lnRef idx="2">
+            <a:schemeClr val="accent1">
+              <a:shade val="15000"/>
+            </a:schemeClr>
+          </a:lnRef>
+          <a:fillRef idx="1">
+            <a:schemeClr val="accent1"/>
+          </a:fillRef>
+          <a:effectRef idx="0">
+            <a:schemeClr val="accent1"/>
+          </a:effectRef>
+          <a:fontRef idx="minor">
+            <a:schemeClr val="lt1"/>
+          </a:fontRef>
+        </p:style>
+        <p:txBody>
+          <a:bodyPr rtlCol="0" anchor="ctr"/>
+          <a:lstStyle/>
+          <a:p>
+            <a:pPr algn="ctr"/>
+            <a:endParaRPr lang="en-IN"/>
+          </a:p>
+        </p:txBody>
+      </p:sp>
+      <p:sp>
+        <p:nvSpPr>
+          <p:cNvPr id="2" name="Title 1">
+            <a:extLst>
+              <a:ext uri="{FF2B5EF4-FFF2-40B4-BE49-F238E27FC236}">
+                <a16:creationId xmlns:a16="http://schemas.microsoft.com/office/drawing/2014/main" id="{1DCC0952-1087-8609-4963-FC63619A9EA3}"/>
+              </a:ext>
+            </a:extLst>
+          </p:cNvPr>
+          <p:cNvSpPr>
+            <a:spLocks noGrp="1"/>
+          </p:cNvSpPr>
+          <p:nvPr>
+            <p:ph type="title"/>
+          </p:nvPr>
+        </p:nvSpPr>
+        <p:spPr>
+          <a:xfrm>
+            <a:off x="0" y="-134470"/>
+            <a:ext cx="12192000" cy="3725396"/>
+          </a:xfrm>
+          <a:noFill/>
+        </p:spPr>
+        <p:txBody>
+          <a:bodyPr anchor="ctr">
+            <a:normAutofit/>
+          </a:bodyPr>
+          <a:lstStyle/>
+          <a:p>
+            <a:pPr algn="ctr"/>
+            <a:r>
+              <a:rPr lang="en-US" sz="7200" b="1" dirty="0">
+                <a:solidFill>
+                  <a:schemeClr val="tx1"/>
+                </a:solidFill>
+                <a:latin typeface="Barlow Black" panose="00000A00000000000000" pitchFamily="2" charset="0"/>
+              </a:rPr>
+              <a:t>Chapter – </a:t>
+            </a:r>
+            <a:r>
+              <a:rPr lang="en-US" sz="7200" dirty="0">
+                <a:solidFill>
+                  <a:schemeClr val="tx1"/>
+                </a:solidFill>
+                <a:latin typeface="Bahnschrift SemiLight" pitchFamily="34" charset="0"/>
+              </a:rPr>
+              <a:t>14</a:t>
+            </a:r>
+            <a:br>
+              <a:rPr lang="en-US" sz="7200" b="1" dirty="0">
+                <a:solidFill>
+                  <a:schemeClr val="tx1"/>
+                </a:solidFill>
+                <a:latin typeface="Barlow Black" panose="00000A00000000000000" pitchFamily="2" charset="0"/>
+              </a:rPr>
+            </a:br>
+            <a:r>
+              <a:rPr lang="en-US" sz="4800" dirty="0">
+                <a:solidFill>
+                  <a:schemeClr val="accent2">
+                    <a:lumMod val="60000"/>
+                    <a:lumOff val="40000"/>
+                  </a:schemeClr>
+                </a:solidFill>
+                <a:latin typeface="Bahnschrift Light Condensed" pitchFamily="34" charset="0"/>
+              </a:rPr>
+              <a:t>(Exponential Operator)</a:t>
+            </a:r>
+            <a:endParaRPr lang="en-IN" sz="4800" b="1" dirty="0">
+              <a:solidFill>
+                <a:schemeClr val="accent2">
+                  <a:lumMod val="60000"/>
+                  <a:lumOff val="40000"/>
+                </a:schemeClr>
+              </a:solidFill>
+              <a:latin typeface="Bahnschrift Light Condensed" pitchFamily="34" charset="0"/>
+            </a:endParaRPr>
+          </a:p>
+        </p:txBody>
+      </p:sp>
+      <p:sp>
+        <p:nvSpPr>
+          <p:cNvPr id="8" name="TextBox 7">
+            <a:extLst>
+              <a:ext uri="{FF2B5EF4-FFF2-40B4-BE49-F238E27FC236}">
+                <a16:creationId xmlns:a16="http://schemas.microsoft.com/office/drawing/2014/main" id="{24EA6CC0-7091-371D-B7E5-DF0D7585636D}"/>
+              </a:ext>
+            </a:extLst>
+          </p:cNvPr>
+          <p:cNvSpPr txBox="1"/>
+          <p:nvPr/>
+        </p:nvSpPr>
+        <p:spPr>
+          <a:xfrm>
+            <a:off x="6057900" y="6308812"/>
+            <a:ext cx="6134100" cy="369332"/>
+          </a:xfrm>
+          <a:prstGeom prst="rect">
+            <a:avLst/>
+          </a:prstGeom>
+          <a:noFill/>
+        </p:spPr>
+        <p:txBody>
+          <a:bodyPr wrap="square" rtlCol="0">
+            <a:spAutoFit/>
+          </a:bodyPr>
+          <a:lstStyle/>
+          <a:p>
+            <a:pPr algn="ctr"/>
+            <a:r>
+              <a:rPr lang="en-US" b="1" dirty="0"/>
+              <a:t>Gautam Kumar- </a:t>
+            </a:r>
+            <a:r>
+              <a:rPr lang="en-US" dirty="0">
+                <a:solidFill>
+                  <a:schemeClr val="tx1">
+                    <a:lumMod val="50000"/>
+                    <a:lumOff val="50000"/>
+                  </a:schemeClr>
+                </a:solidFill>
+              </a:rPr>
+              <a:t>uidhtml.com</a:t>
+            </a:r>
+            <a:endParaRPr lang="en-IN" dirty="0">
+              <a:solidFill>
+                <a:schemeClr val="tx1">
+                  <a:lumMod val="50000"/>
+                  <a:lumOff val="50000"/>
+                </a:schemeClr>
+              </a:solidFill>
+            </a:endParaRPr>
+          </a:p>
+        </p:txBody>
+      </p:sp>
+      <p:sp>
+        <p:nvSpPr>
+          <p:cNvPr id="7" name="TextBox 6">
+            <a:extLst>
+              <a:ext uri="{FF2B5EF4-FFF2-40B4-BE49-F238E27FC236}">
+                <a16:creationId xmlns:a16="http://schemas.microsoft.com/office/drawing/2014/main" id="{A2D7518C-2ADD-95A8-ED69-512121D47060}"/>
+              </a:ext>
+            </a:extLst>
+          </p:cNvPr>
+          <p:cNvSpPr txBox="1"/>
+          <p:nvPr/>
+        </p:nvSpPr>
+        <p:spPr>
+          <a:xfrm>
+            <a:off x="241300" y="228600"/>
+            <a:ext cx="3190297" cy="584775"/>
+          </a:xfrm>
+          <a:prstGeom prst="rect">
+            <a:avLst/>
+          </a:prstGeom>
+          <a:noFill/>
+        </p:spPr>
+        <p:txBody>
+          <a:bodyPr wrap="none" rtlCol="0">
+            <a:spAutoFit/>
+          </a:bodyPr>
+          <a:lstStyle/>
+          <a:p>
+            <a:r>
+              <a:rPr lang="en-US" sz="3200" b="1" dirty="0">
+                <a:latin typeface="Barlow Condensed ExtraLight" panose="00000306000000000000" pitchFamily="2" charset="0"/>
+              </a:rPr>
+              <a:t>JavaScript - </a:t>
+            </a:r>
+            <a:r>
+              <a:rPr lang="en-US" sz="3200" b="1" dirty="0">
+                <a:solidFill>
+                  <a:srgbClr val="FFFF00"/>
+                </a:solidFill>
+                <a:latin typeface="Barlow Condensed ExtraLight" panose="00000306000000000000" pitchFamily="2" charset="0"/>
+              </a:rPr>
+              <a:t>Operators</a:t>
+            </a:r>
+            <a:endParaRPr lang="en-US" sz="3200" dirty="0">
+              <a:solidFill>
+                <a:srgbClr val="FFFF00"/>
+              </a:solidFill>
+            </a:endParaRPr>
+          </a:p>
+        </p:txBody>
+      </p:sp>
+      <p:pic>
+        <p:nvPicPr>
+          <p:cNvPr id="1027" name="Picture 3" descr="K:\github-repo\javascript-tutorials\tutorials\chapter-7-data-conversion\assets\images\javascript-logo.png">
+            <a:extLst>
+              <a:ext uri="{FF2B5EF4-FFF2-40B4-BE49-F238E27FC236}">
+                <a16:creationId xmlns:a16="http://schemas.microsoft.com/office/drawing/2014/main" id="{C3962D3C-E935-F4F9-DA5B-95CE428A28BE}"/>
+              </a:ext>
+            </a:extLst>
+          </p:cNvPr>
+          <p:cNvPicPr>
+            <a:picLocks noChangeAspect="1" noChangeArrowheads="1"/>
+          </p:cNvPicPr>
+          <p:nvPr/>
+        </p:nvPicPr>
+        <p:blipFill>
+          <a:blip r:embed="rId3"/>
+          <a:srcRect/>
+          <a:stretch>
+            <a:fillRect/>
+          </a:stretch>
+        </p:blipFill>
+        <p:spPr bwMode="auto">
+          <a:xfrm>
+            <a:off x="10712450" y="5353050"/>
+            <a:ext cx="1314450" cy="1314450"/>
+          </a:xfrm>
+          <a:prstGeom prst="rect">
+            <a:avLst/>
+          </a:prstGeom>
+          <a:noFill/>
+        </p:spPr>
+      </p:pic>
+      <p:pic>
+        <p:nvPicPr>
+          <p:cNvPr id="4" name="Picture 3">
+            <a:extLst>
+              <a:ext uri="{FF2B5EF4-FFF2-40B4-BE49-F238E27FC236}">
+                <a16:creationId xmlns:a16="http://schemas.microsoft.com/office/drawing/2014/main" id="{5EFA941C-F360-7430-20CD-DC0ECAA69C15}"/>
+              </a:ext>
+            </a:extLst>
+          </p:cNvPr>
+          <p:cNvPicPr>
+            <a:picLocks noChangeAspect="1"/>
+          </p:cNvPicPr>
+          <p:nvPr/>
+        </p:nvPicPr>
+        <p:blipFill>
+          <a:blip r:embed="rId4"/>
+          <a:stretch>
+            <a:fillRect/>
+          </a:stretch>
+        </p:blipFill>
+        <p:spPr>
+          <a:xfrm>
+            <a:off x="1910726" y="2946972"/>
+            <a:ext cx="8294348" cy="3294605"/>
+          </a:xfrm>
+          <a:prstGeom prst="rect">
+            <a:avLst/>
+          </a:prstGeom>
+        </p:spPr>
+      </p:pic>
+    </p:spTree>
+    <p:extLst>
+      <p:ext uri="{BB962C8B-B14F-4D97-AF65-F5344CB8AC3E}">
+        <p14:creationId xmlns:p14="http://schemas.microsoft.com/office/powerpoint/2010/main" val="4207175670"/>
+      </p:ext>
+    </p:extLst>
+  </p:cSld>
+  <p:clrMapOvr>
+    <a:masterClrMapping/>
+  </p:clrMapOvr>
+</p:sld>
+</file>
+
+<file path=ppt/slides/slide46.xml><?xml version="1.0" encoding="utf-8"?>
+<p:sld xmlns:a="http://schemas.openxmlformats.org/drawingml/2006/main" xmlns:r="http://schemas.openxmlformats.org/officeDocument/2006/relationships" xmlns:p="http://schemas.openxmlformats.org/presentationml/2006/main">
+  <p:cSld>
+    <p:spTree>
+      <p:nvGrpSpPr>
+        <p:cNvPr id="1" name="">
+          <a:extLst>
+            <a:ext uri="{FF2B5EF4-FFF2-40B4-BE49-F238E27FC236}">
+              <a16:creationId xmlns:a16="http://schemas.microsoft.com/office/drawing/2014/main" id="{F0DAF3FE-A05B-30AB-0204-29693E911E9D}"/>
+            </a:ext>
+          </a:extLst>
+        </p:cNvPr>
+        <p:cNvGrpSpPr/>
+        <p:nvPr/>
+      </p:nvGrpSpPr>
+      <p:grpSpPr>
+        <a:xfrm>
+          <a:off x="0" y="0"/>
+          <a:ext cx="0" cy="0"/>
+          <a:chOff x="0" y="0"/>
+          <a:chExt cx="0" cy="0"/>
+        </a:xfrm>
+      </p:grpSpPr>
+      <p:sp>
+        <p:nvSpPr>
+          <p:cNvPr id="10" name="Rectangle 9">
+            <a:extLst>
+              <a:ext uri="{FF2B5EF4-FFF2-40B4-BE49-F238E27FC236}">
+                <a16:creationId xmlns:a16="http://schemas.microsoft.com/office/drawing/2014/main" id="{2BE26D25-FDA5-5956-068A-9BBA0900E524}"/>
+              </a:ext>
+            </a:extLst>
+          </p:cNvPr>
+          <p:cNvSpPr/>
+          <p:nvPr/>
+        </p:nvSpPr>
+        <p:spPr>
+          <a:xfrm>
+            <a:off x="0" y="0"/>
+            <a:ext cx="12192000" cy="6858000"/>
+          </a:xfrm>
+          <a:prstGeom prst="rect">
+            <a:avLst/>
+          </a:prstGeom>
+          <a:solidFill>
+            <a:schemeClr val="bg2">
+              <a:lumMod val="50000"/>
+            </a:schemeClr>
+          </a:solidFill>
+          <a:ln>
+            <a:noFill/>
+          </a:ln>
+        </p:spPr>
+        <p:style>
+          <a:lnRef idx="2">
+            <a:schemeClr val="accent1">
+              <a:shade val="50000"/>
+            </a:schemeClr>
+          </a:lnRef>
+          <a:fillRef idx="1">
+            <a:schemeClr val="accent1"/>
+          </a:fillRef>
+          <a:effectRef idx="0">
+            <a:schemeClr val="accent1"/>
+          </a:effectRef>
+          <a:fontRef idx="minor">
+            <a:schemeClr val="lt1"/>
+          </a:fontRef>
+        </p:style>
+        <p:txBody>
+          <a:bodyPr rtlCol="0" anchor="ctr"/>
+          <a:lstStyle/>
+          <a:p>
+            <a:pPr algn="ctr"/>
+            <a:endParaRPr lang="en-US" dirty="0"/>
+          </a:p>
+        </p:txBody>
+      </p:sp>
+      <p:sp>
+        <p:nvSpPr>
+          <p:cNvPr id="9" name="Explosion: 14 Points 8">
+            <a:extLst>
+              <a:ext uri="{FF2B5EF4-FFF2-40B4-BE49-F238E27FC236}">
+                <a16:creationId xmlns:a16="http://schemas.microsoft.com/office/drawing/2014/main" id="{A00858B9-2FA5-D70D-78F6-65BE05D3842D}"/>
+              </a:ext>
+            </a:extLst>
+          </p:cNvPr>
+          <p:cNvSpPr/>
+          <p:nvPr/>
+        </p:nvSpPr>
+        <p:spPr>
+          <a:xfrm>
+            <a:off x="3893709" y="-646043"/>
+            <a:ext cx="3669087" cy="3707684"/>
+          </a:xfrm>
+          <a:prstGeom prst="irregularSeal2">
+            <a:avLst/>
+          </a:prstGeom>
+          <a:solidFill>
+            <a:schemeClr val="bg2">
+              <a:lumMod val="75000"/>
+            </a:schemeClr>
+          </a:solidFill>
+          <a:ln>
+            <a:noFill/>
+          </a:ln>
+        </p:spPr>
+        <p:style>
+          <a:lnRef idx="2">
+            <a:schemeClr val="accent1">
+              <a:shade val="15000"/>
+            </a:schemeClr>
+          </a:lnRef>
+          <a:fillRef idx="1">
+            <a:schemeClr val="accent1"/>
+          </a:fillRef>
+          <a:effectRef idx="0">
+            <a:schemeClr val="accent1"/>
+          </a:effectRef>
+          <a:fontRef idx="minor">
+            <a:schemeClr val="lt1"/>
+          </a:fontRef>
+        </p:style>
+        <p:txBody>
+          <a:bodyPr rtlCol="0" anchor="ctr"/>
+          <a:lstStyle/>
+          <a:p>
+            <a:pPr algn="ctr"/>
+            <a:endParaRPr lang="en-IN"/>
+          </a:p>
+        </p:txBody>
+      </p:sp>
+      <p:sp>
+        <p:nvSpPr>
+          <p:cNvPr id="2" name="Title 1">
+            <a:extLst>
+              <a:ext uri="{FF2B5EF4-FFF2-40B4-BE49-F238E27FC236}">
+                <a16:creationId xmlns:a16="http://schemas.microsoft.com/office/drawing/2014/main" id="{2A76F0B8-6110-A6B9-A6A4-882BA9571BCD}"/>
+              </a:ext>
+            </a:extLst>
+          </p:cNvPr>
+          <p:cNvSpPr>
+            <a:spLocks noGrp="1"/>
+          </p:cNvSpPr>
+          <p:nvPr>
+            <p:ph type="title"/>
+          </p:nvPr>
+        </p:nvSpPr>
+        <p:spPr>
+          <a:xfrm>
+            <a:off x="0" y="-134470"/>
+            <a:ext cx="12192000" cy="2947244"/>
+          </a:xfrm>
+          <a:noFill/>
+        </p:spPr>
+        <p:txBody>
+          <a:bodyPr anchor="ctr">
+            <a:normAutofit/>
+          </a:bodyPr>
+          <a:lstStyle/>
+          <a:p>
+            <a:pPr algn="ctr"/>
+            <a:r>
+              <a:rPr lang="en-US" sz="7200" b="1" dirty="0">
+                <a:solidFill>
+                  <a:schemeClr val="tx1"/>
+                </a:solidFill>
+                <a:latin typeface="Barlow Black" panose="00000A00000000000000" pitchFamily="2" charset="0"/>
+              </a:rPr>
+              <a:t>Chapter – </a:t>
+            </a:r>
+            <a:r>
+              <a:rPr lang="en-US" sz="7200" dirty="0">
+                <a:solidFill>
+                  <a:schemeClr val="tx1"/>
+                </a:solidFill>
+                <a:latin typeface="Bahnschrift SemiLight" pitchFamily="34" charset="0"/>
+              </a:rPr>
+              <a:t>15</a:t>
+            </a:r>
+            <a:br>
+              <a:rPr lang="en-US" sz="7200" b="1" dirty="0">
+                <a:solidFill>
+                  <a:schemeClr val="tx1"/>
+                </a:solidFill>
+                <a:latin typeface="Barlow Black" panose="00000A00000000000000" pitchFamily="2" charset="0"/>
+              </a:rPr>
+            </a:br>
+            <a:endParaRPr lang="en-IN" sz="4800" b="1" dirty="0">
+              <a:solidFill>
+                <a:schemeClr val="accent2">
+                  <a:lumMod val="60000"/>
+                  <a:lumOff val="40000"/>
+                </a:schemeClr>
+              </a:solidFill>
+              <a:latin typeface="Bahnschrift Light Condensed" pitchFamily="34" charset="0"/>
+            </a:endParaRPr>
+          </a:p>
+        </p:txBody>
+      </p:sp>
+      <p:sp>
+        <p:nvSpPr>
+          <p:cNvPr id="8" name="TextBox 7">
+            <a:extLst>
+              <a:ext uri="{FF2B5EF4-FFF2-40B4-BE49-F238E27FC236}">
+                <a16:creationId xmlns:a16="http://schemas.microsoft.com/office/drawing/2014/main" id="{049F8ADA-F28D-9C30-7B72-113663BB5A0A}"/>
+              </a:ext>
+            </a:extLst>
+          </p:cNvPr>
+          <p:cNvSpPr txBox="1"/>
+          <p:nvPr/>
+        </p:nvSpPr>
+        <p:spPr>
+          <a:xfrm>
+            <a:off x="6057900" y="6308812"/>
+            <a:ext cx="6134100" cy="369332"/>
+          </a:xfrm>
+          <a:prstGeom prst="rect">
+            <a:avLst/>
+          </a:prstGeom>
+          <a:noFill/>
+        </p:spPr>
+        <p:txBody>
+          <a:bodyPr wrap="square" rtlCol="0">
+            <a:spAutoFit/>
+          </a:bodyPr>
+          <a:lstStyle/>
+          <a:p>
+            <a:pPr algn="ctr"/>
+            <a:r>
+              <a:rPr lang="en-US" b="1" dirty="0"/>
+              <a:t>Gautam Kumar- </a:t>
+            </a:r>
+            <a:r>
+              <a:rPr lang="en-US" dirty="0">
+                <a:solidFill>
+                  <a:schemeClr val="tx1">
+                    <a:lumMod val="50000"/>
+                    <a:lumOff val="50000"/>
+                  </a:schemeClr>
+                </a:solidFill>
+              </a:rPr>
+              <a:t>uidhtml.com</a:t>
+            </a:r>
+            <a:endParaRPr lang="en-IN" dirty="0">
+              <a:solidFill>
+                <a:schemeClr val="tx1">
+                  <a:lumMod val="50000"/>
+                  <a:lumOff val="50000"/>
+                </a:schemeClr>
+              </a:solidFill>
+            </a:endParaRPr>
+          </a:p>
+        </p:txBody>
+      </p:sp>
+      <p:sp>
+        <p:nvSpPr>
+          <p:cNvPr id="7" name="TextBox 6">
+            <a:extLst>
+              <a:ext uri="{FF2B5EF4-FFF2-40B4-BE49-F238E27FC236}">
+                <a16:creationId xmlns:a16="http://schemas.microsoft.com/office/drawing/2014/main" id="{46EE57A9-DC54-6F02-CE31-4D932CAC7055}"/>
+              </a:ext>
+            </a:extLst>
+          </p:cNvPr>
+          <p:cNvSpPr txBox="1"/>
+          <p:nvPr/>
+        </p:nvSpPr>
+        <p:spPr>
+          <a:xfrm>
+            <a:off x="241300" y="228600"/>
+            <a:ext cx="1601721" cy="584775"/>
+          </a:xfrm>
+          <a:prstGeom prst="rect">
+            <a:avLst/>
+          </a:prstGeom>
+          <a:noFill/>
+        </p:spPr>
+        <p:txBody>
+          <a:bodyPr wrap="none" rtlCol="0">
+            <a:spAutoFit/>
+          </a:bodyPr>
+          <a:lstStyle/>
+          <a:p>
+            <a:r>
+              <a:rPr lang="en-US" sz="3200" b="1" dirty="0">
+                <a:latin typeface="Barlow Condensed ExtraLight" panose="00000306000000000000" pitchFamily="2" charset="0"/>
+              </a:rPr>
+              <a:t>JavaScript</a:t>
+            </a:r>
+            <a:endParaRPr lang="en-US" sz="3200" dirty="0">
+              <a:solidFill>
+                <a:srgbClr val="FFFF00"/>
+              </a:solidFill>
+            </a:endParaRPr>
+          </a:p>
+        </p:txBody>
+      </p:sp>
+      <p:pic>
+        <p:nvPicPr>
+          <p:cNvPr id="1027" name="Picture 3" descr="K:\github-repo\javascript-tutorials\tutorials\chapter-7-data-conversion\assets\images\javascript-logo.png">
+            <a:extLst>
+              <a:ext uri="{FF2B5EF4-FFF2-40B4-BE49-F238E27FC236}">
+                <a16:creationId xmlns:a16="http://schemas.microsoft.com/office/drawing/2014/main" id="{446514F3-2698-522D-BBB4-DD678AA18C3B}"/>
+              </a:ext>
+            </a:extLst>
+          </p:cNvPr>
+          <p:cNvPicPr>
+            <a:picLocks noChangeAspect="1" noChangeArrowheads="1"/>
+          </p:cNvPicPr>
+          <p:nvPr/>
+        </p:nvPicPr>
+        <p:blipFill>
+          <a:blip r:embed="rId3"/>
+          <a:srcRect/>
+          <a:stretch>
+            <a:fillRect/>
+          </a:stretch>
+        </p:blipFill>
+        <p:spPr bwMode="auto">
+          <a:xfrm>
+            <a:off x="10712450" y="5353050"/>
+            <a:ext cx="1314450" cy="1314450"/>
+          </a:xfrm>
+          <a:prstGeom prst="rect">
+            <a:avLst/>
+          </a:prstGeom>
+          <a:noFill/>
+        </p:spPr>
+      </p:pic>
+      <p:pic>
+        <p:nvPicPr>
+          <p:cNvPr id="15" name="Picture 14">
+            <a:extLst>
+              <a:ext uri="{FF2B5EF4-FFF2-40B4-BE49-F238E27FC236}">
+                <a16:creationId xmlns:a16="http://schemas.microsoft.com/office/drawing/2014/main" id="{C89C3E04-F44E-D945-F710-07733906067E}"/>
+              </a:ext>
+            </a:extLst>
+          </p:cNvPr>
+          <p:cNvPicPr>
+            <a:picLocks noChangeAspect="1"/>
+          </p:cNvPicPr>
+          <p:nvPr/>
+        </p:nvPicPr>
+        <p:blipFill>
+          <a:blip r:embed="rId4"/>
+          <a:stretch>
+            <a:fillRect/>
+          </a:stretch>
+        </p:blipFill>
+        <p:spPr>
+          <a:xfrm>
+            <a:off x="1042160" y="1888435"/>
+            <a:ext cx="10764148" cy="3942496"/>
+          </a:xfrm>
+          <a:prstGeom prst="rect">
+            <a:avLst/>
+          </a:prstGeom>
+        </p:spPr>
+      </p:pic>
+    </p:spTree>
+    <p:extLst>
+      <p:ext uri="{BB962C8B-B14F-4D97-AF65-F5344CB8AC3E}">
+        <p14:creationId xmlns:p14="http://schemas.microsoft.com/office/powerpoint/2010/main" val="554206652"/>
+      </p:ext>
+    </p:extLst>
+  </p:cSld>
+  <p:clrMapOvr>
+    <a:masterClrMapping/>
+  </p:clrMapOvr>
+</p:sld>
+</file>
+
+<file path=ppt/slides/slide47.xml><?xml version="1.0" encoding="utf-8"?>
+<p:sld xmlns:a="http://schemas.openxmlformats.org/drawingml/2006/main" xmlns:r="http://schemas.openxmlformats.org/officeDocument/2006/relationships" xmlns:p="http://schemas.openxmlformats.org/presentationml/2006/main">
+  <p:cSld>
+    <p:spTree>
+      <p:nvGrpSpPr>
+        <p:cNvPr id="1" name="">
+          <a:extLst>
+            <a:ext uri="{FF2B5EF4-FFF2-40B4-BE49-F238E27FC236}">
+              <a16:creationId xmlns:a16="http://schemas.microsoft.com/office/drawing/2014/main" id="{C96EA25E-B7B6-AFE4-9CB2-B523965008FB}"/>
+            </a:ext>
+          </a:extLst>
+        </p:cNvPr>
+        <p:cNvGrpSpPr/>
+        <p:nvPr/>
+      </p:nvGrpSpPr>
+      <p:grpSpPr>
+        <a:xfrm>
+          <a:off x="0" y="0"/>
+          <a:ext cx="0" cy="0"/>
+          <a:chOff x="0" y="0"/>
+          <a:chExt cx="0" cy="0"/>
+        </a:xfrm>
+      </p:grpSpPr>
+      <p:sp>
+        <p:nvSpPr>
+          <p:cNvPr id="10" name="Rectangle 9">
+            <a:extLst>
+              <a:ext uri="{FF2B5EF4-FFF2-40B4-BE49-F238E27FC236}">
+                <a16:creationId xmlns:a16="http://schemas.microsoft.com/office/drawing/2014/main" id="{9A2E596B-B685-B4DD-A28D-3D66208836C7}"/>
+              </a:ext>
+            </a:extLst>
+          </p:cNvPr>
+          <p:cNvSpPr/>
+          <p:nvPr/>
+        </p:nvSpPr>
+        <p:spPr>
+          <a:xfrm>
+            <a:off x="0" y="0"/>
+            <a:ext cx="12192000" cy="6858000"/>
+          </a:xfrm>
+          <a:prstGeom prst="rect">
+            <a:avLst/>
+          </a:prstGeom>
+          <a:solidFill>
+            <a:schemeClr val="bg2">
+              <a:lumMod val="50000"/>
+            </a:schemeClr>
+          </a:solidFill>
+          <a:ln>
+            <a:noFill/>
+          </a:ln>
+        </p:spPr>
+        <p:style>
+          <a:lnRef idx="2">
+            <a:schemeClr val="accent1">
+              <a:shade val="50000"/>
+            </a:schemeClr>
+          </a:lnRef>
+          <a:fillRef idx="1">
+            <a:schemeClr val="accent1"/>
+          </a:fillRef>
+          <a:effectRef idx="0">
+            <a:schemeClr val="accent1"/>
+          </a:effectRef>
+          <a:fontRef idx="minor">
+            <a:schemeClr val="lt1"/>
+          </a:fontRef>
+        </p:style>
+        <p:txBody>
+          <a:bodyPr rtlCol="0" anchor="ctr"/>
+          <a:lstStyle/>
+          <a:p>
+            <a:pPr algn="ctr"/>
+            <a:endParaRPr lang="en-US" dirty="0"/>
+          </a:p>
+        </p:txBody>
+      </p:sp>
+      <p:sp>
+        <p:nvSpPr>
+          <p:cNvPr id="9" name="Explosion: 14 Points 8">
+            <a:extLst>
+              <a:ext uri="{FF2B5EF4-FFF2-40B4-BE49-F238E27FC236}">
+                <a16:creationId xmlns:a16="http://schemas.microsoft.com/office/drawing/2014/main" id="{D4212688-E0F9-96D2-1559-6079A3420258}"/>
+              </a:ext>
+            </a:extLst>
+          </p:cNvPr>
+          <p:cNvSpPr/>
+          <p:nvPr/>
+        </p:nvSpPr>
+        <p:spPr>
+          <a:xfrm>
+            <a:off x="3893709" y="-646043"/>
+            <a:ext cx="3669087" cy="3707684"/>
+          </a:xfrm>
+          <a:prstGeom prst="irregularSeal2">
+            <a:avLst/>
+          </a:prstGeom>
+          <a:solidFill>
+            <a:schemeClr val="bg2">
+              <a:lumMod val="75000"/>
+            </a:schemeClr>
+          </a:solidFill>
+          <a:ln>
+            <a:noFill/>
+          </a:ln>
+        </p:spPr>
+        <p:style>
+          <a:lnRef idx="2">
+            <a:schemeClr val="accent1">
+              <a:shade val="15000"/>
+            </a:schemeClr>
+          </a:lnRef>
+          <a:fillRef idx="1">
+            <a:schemeClr val="accent1"/>
+          </a:fillRef>
+          <a:effectRef idx="0">
+            <a:schemeClr val="accent1"/>
+          </a:effectRef>
+          <a:fontRef idx="minor">
+            <a:schemeClr val="lt1"/>
+          </a:fontRef>
+        </p:style>
+        <p:txBody>
+          <a:bodyPr rtlCol="0" anchor="ctr"/>
+          <a:lstStyle/>
+          <a:p>
+            <a:pPr algn="ctr"/>
+            <a:endParaRPr lang="en-IN"/>
+          </a:p>
+        </p:txBody>
+      </p:sp>
+      <p:sp>
+        <p:nvSpPr>
+          <p:cNvPr id="2" name="Title 1">
+            <a:extLst>
+              <a:ext uri="{FF2B5EF4-FFF2-40B4-BE49-F238E27FC236}">
+                <a16:creationId xmlns:a16="http://schemas.microsoft.com/office/drawing/2014/main" id="{9EB53FF3-0528-E0F0-B9E2-A97A8FCDDF06}"/>
+              </a:ext>
+            </a:extLst>
+          </p:cNvPr>
+          <p:cNvSpPr>
+            <a:spLocks noGrp="1"/>
+          </p:cNvSpPr>
+          <p:nvPr>
+            <p:ph type="title"/>
+          </p:nvPr>
+        </p:nvSpPr>
+        <p:spPr>
+          <a:xfrm>
+            <a:off x="0" y="-134470"/>
+            <a:ext cx="12192000" cy="2947244"/>
+          </a:xfrm>
+          <a:noFill/>
+        </p:spPr>
+        <p:txBody>
+          <a:bodyPr anchor="ctr">
+            <a:normAutofit/>
+          </a:bodyPr>
+          <a:lstStyle/>
+          <a:p>
+            <a:pPr algn="ctr"/>
+            <a:r>
+              <a:rPr lang="en-US" sz="7200" b="1" dirty="0">
+                <a:solidFill>
+                  <a:schemeClr val="tx1"/>
+                </a:solidFill>
+                <a:latin typeface="Barlow Black" panose="00000A00000000000000" pitchFamily="2" charset="0"/>
+              </a:rPr>
+              <a:t>Chapter – </a:t>
+            </a:r>
+            <a:r>
+              <a:rPr lang="en-US" sz="7200" dirty="0">
+                <a:solidFill>
+                  <a:schemeClr val="tx1"/>
+                </a:solidFill>
+                <a:latin typeface="Bahnschrift SemiLight" pitchFamily="34" charset="0"/>
+              </a:rPr>
+              <a:t>16</a:t>
+            </a:r>
+            <a:br>
+              <a:rPr lang="en-US" sz="7200" b="1" dirty="0">
+                <a:solidFill>
+                  <a:schemeClr val="tx1"/>
+                </a:solidFill>
+                <a:latin typeface="Barlow Black" panose="00000A00000000000000" pitchFamily="2" charset="0"/>
+              </a:rPr>
+            </a:br>
+            <a:endParaRPr lang="en-IN" sz="4800" b="1" dirty="0">
+              <a:solidFill>
+                <a:schemeClr val="accent2">
+                  <a:lumMod val="60000"/>
+                  <a:lumOff val="40000"/>
+                </a:schemeClr>
+              </a:solidFill>
+              <a:latin typeface="Bahnschrift Light Condensed" pitchFamily="34" charset="0"/>
+            </a:endParaRPr>
+          </a:p>
+        </p:txBody>
+      </p:sp>
+      <p:sp>
+        <p:nvSpPr>
+          <p:cNvPr id="8" name="TextBox 7">
+            <a:extLst>
+              <a:ext uri="{FF2B5EF4-FFF2-40B4-BE49-F238E27FC236}">
+                <a16:creationId xmlns:a16="http://schemas.microsoft.com/office/drawing/2014/main" id="{82D7B218-8639-D994-E795-932DBB28C51A}"/>
+              </a:ext>
+            </a:extLst>
+          </p:cNvPr>
+          <p:cNvSpPr txBox="1"/>
+          <p:nvPr/>
+        </p:nvSpPr>
+        <p:spPr>
+          <a:xfrm>
+            <a:off x="6057900" y="6308812"/>
+            <a:ext cx="6134100" cy="369332"/>
+          </a:xfrm>
+          <a:prstGeom prst="rect">
+            <a:avLst/>
+          </a:prstGeom>
+          <a:noFill/>
+        </p:spPr>
+        <p:txBody>
+          <a:bodyPr wrap="square" rtlCol="0">
+            <a:spAutoFit/>
+          </a:bodyPr>
+          <a:lstStyle/>
+          <a:p>
+            <a:pPr algn="ctr"/>
+            <a:r>
+              <a:rPr lang="en-US" b="1" dirty="0"/>
+              <a:t>Gautam Kumar- </a:t>
+            </a:r>
+            <a:r>
+              <a:rPr lang="en-US" dirty="0">
+                <a:solidFill>
+                  <a:schemeClr val="tx1">
+                    <a:lumMod val="50000"/>
+                    <a:lumOff val="50000"/>
+                  </a:schemeClr>
+                </a:solidFill>
+              </a:rPr>
+              <a:t>uidhtml.com</a:t>
+            </a:r>
+            <a:endParaRPr lang="en-IN" dirty="0">
+              <a:solidFill>
+                <a:schemeClr val="tx1">
+                  <a:lumMod val="50000"/>
+                  <a:lumOff val="50000"/>
+                </a:schemeClr>
+              </a:solidFill>
+            </a:endParaRPr>
+          </a:p>
+        </p:txBody>
+      </p:sp>
+      <p:sp>
+        <p:nvSpPr>
+          <p:cNvPr id="7" name="TextBox 6">
+            <a:extLst>
+              <a:ext uri="{FF2B5EF4-FFF2-40B4-BE49-F238E27FC236}">
+                <a16:creationId xmlns:a16="http://schemas.microsoft.com/office/drawing/2014/main" id="{4C26228F-9626-435D-1055-F46809E39D1A}"/>
+              </a:ext>
+            </a:extLst>
+          </p:cNvPr>
+          <p:cNvSpPr txBox="1"/>
+          <p:nvPr/>
+        </p:nvSpPr>
+        <p:spPr>
+          <a:xfrm>
+            <a:off x="241300" y="228600"/>
+            <a:ext cx="1601721" cy="584775"/>
+          </a:xfrm>
+          <a:prstGeom prst="rect">
+            <a:avLst/>
+          </a:prstGeom>
+          <a:noFill/>
+        </p:spPr>
+        <p:txBody>
+          <a:bodyPr wrap="none" rtlCol="0">
+            <a:spAutoFit/>
+          </a:bodyPr>
+          <a:lstStyle/>
+          <a:p>
+            <a:r>
+              <a:rPr lang="en-US" sz="3200" b="1" dirty="0">
+                <a:latin typeface="Barlow Condensed ExtraLight" panose="00000306000000000000" pitchFamily="2" charset="0"/>
+              </a:rPr>
+              <a:t>JavaScript</a:t>
+            </a:r>
+            <a:endParaRPr lang="en-US" sz="3200" dirty="0">
+              <a:solidFill>
+                <a:srgbClr val="FFFF00"/>
+              </a:solidFill>
+            </a:endParaRPr>
+          </a:p>
+        </p:txBody>
+      </p:sp>
+      <p:pic>
+        <p:nvPicPr>
+          <p:cNvPr id="1027" name="Picture 3" descr="K:\github-repo\javascript-tutorials\tutorials\chapter-7-data-conversion\assets\images\javascript-logo.png">
+            <a:extLst>
+              <a:ext uri="{FF2B5EF4-FFF2-40B4-BE49-F238E27FC236}">
+                <a16:creationId xmlns:a16="http://schemas.microsoft.com/office/drawing/2014/main" id="{C2F8F36E-4274-8697-0F7B-F5EE2554021A}"/>
+              </a:ext>
+            </a:extLst>
+          </p:cNvPr>
+          <p:cNvPicPr>
+            <a:picLocks noChangeAspect="1" noChangeArrowheads="1"/>
+          </p:cNvPicPr>
+          <p:nvPr/>
+        </p:nvPicPr>
+        <p:blipFill>
+          <a:blip r:embed="rId3"/>
+          <a:srcRect/>
+          <a:stretch>
+            <a:fillRect/>
+          </a:stretch>
+        </p:blipFill>
+        <p:spPr bwMode="auto">
+          <a:xfrm>
+            <a:off x="10712450" y="5353050"/>
+            <a:ext cx="1314450" cy="1314450"/>
+          </a:xfrm>
+          <a:prstGeom prst="rect">
+            <a:avLst/>
+          </a:prstGeom>
+          <a:noFill/>
+        </p:spPr>
+      </p:pic>
+      <p:pic>
+        <p:nvPicPr>
+          <p:cNvPr id="6" name="Picture 5">
+            <a:extLst>
+              <a:ext uri="{FF2B5EF4-FFF2-40B4-BE49-F238E27FC236}">
+                <a16:creationId xmlns:a16="http://schemas.microsoft.com/office/drawing/2014/main" id="{D55B4B4C-9E67-F138-377F-364CDE0E4958}"/>
+              </a:ext>
+            </a:extLst>
+          </p:cNvPr>
+          <p:cNvPicPr>
+            <a:picLocks noChangeAspect="1"/>
+          </p:cNvPicPr>
+          <p:nvPr/>
+        </p:nvPicPr>
+        <p:blipFill>
+          <a:blip r:embed="rId4"/>
+          <a:stretch>
+            <a:fillRect/>
+          </a:stretch>
+        </p:blipFill>
+        <p:spPr>
+          <a:xfrm>
+            <a:off x="1113182" y="1590718"/>
+            <a:ext cx="9230139" cy="4355635"/>
+          </a:xfrm>
+          <a:prstGeom prst="rect">
+            <a:avLst/>
+          </a:prstGeom>
+        </p:spPr>
+      </p:pic>
+    </p:spTree>
+    <p:extLst>
+      <p:ext uri="{BB962C8B-B14F-4D97-AF65-F5344CB8AC3E}">
+        <p14:creationId xmlns:p14="http://schemas.microsoft.com/office/powerpoint/2010/main" val="1012258063"/>
+      </p:ext>
+    </p:extLst>
+  </p:cSld>
+  <p:clrMapOvr>
+    <a:masterClrMapping/>
+  </p:clrMapOvr>
+</p:sld>
+</file>
+
+<file path=ppt/slides/slide48.xml><?xml version="1.0" encoding="utf-8"?>
+<p:sld xmlns:a="http://schemas.openxmlformats.org/drawingml/2006/main" xmlns:r="http://schemas.openxmlformats.org/officeDocument/2006/relationships" xmlns:p="http://schemas.openxmlformats.org/presentationml/2006/main">
+  <p:cSld>
+    <p:spTree>
+      <p:nvGrpSpPr>
+        <p:cNvPr id="1" name="">
+          <a:extLst>
+            <a:ext uri="{FF2B5EF4-FFF2-40B4-BE49-F238E27FC236}">
+              <a16:creationId xmlns:a16="http://schemas.microsoft.com/office/drawing/2014/main" id="{83F16C9D-4BE8-BE1D-4457-AF77BC59F108}"/>
+            </a:ext>
+          </a:extLst>
+        </p:cNvPr>
+        <p:cNvGrpSpPr/>
+        <p:nvPr/>
+      </p:nvGrpSpPr>
+      <p:grpSpPr>
+        <a:xfrm>
+          <a:off x="0" y="0"/>
+          <a:ext cx="0" cy="0"/>
+          <a:chOff x="0" y="0"/>
+          <a:chExt cx="0" cy="0"/>
+        </a:xfrm>
+      </p:grpSpPr>
+      <p:sp>
+        <p:nvSpPr>
+          <p:cNvPr id="10" name="Rectangle 9">
+            <a:extLst>
+              <a:ext uri="{FF2B5EF4-FFF2-40B4-BE49-F238E27FC236}">
+                <a16:creationId xmlns:a16="http://schemas.microsoft.com/office/drawing/2014/main" id="{49CCD31C-4E10-ADDB-9F54-6C6BE2422F88}"/>
+              </a:ext>
+            </a:extLst>
+          </p:cNvPr>
+          <p:cNvSpPr/>
+          <p:nvPr/>
+        </p:nvSpPr>
+        <p:spPr>
+          <a:xfrm>
+            <a:off x="0" y="0"/>
+            <a:ext cx="12192000" cy="6858000"/>
+          </a:xfrm>
+          <a:prstGeom prst="rect">
+            <a:avLst/>
+          </a:prstGeom>
+          <a:solidFill>
+            <a:schemeClr val="bg2">
+              <a:lumMod val="50000"/>
+            </a:schemeClr>
+          </a:solidFill>
+          <a:ln>
+            <a:noFill/>
+          </a:ln>
+        </p:spPr>
+        <p:style>
+          <a:lnRef idx="2">
+            <a:schemeClr val="accent1">
+              <a:shade val="50000"/>
+            </a:schemeClr>
+          </a:lnRef>
+          <a:fillRef idx="1">
+            <a:schemeClr val="accent1"/>
+          </a:fillRef>
+          <a:effectRef idx="0">
+            <a:schemeClr val="accent1"/>
+          </a:effectRef>
+          <a:fontRef idx="minor">
+            <a:schemeClr val="lt1"/>
+          </a:fontRef>
+        </p:style>
+        <p:txBody>
+          <a:bodyPr rtlCol="0" anchor="ctr"/>
+          <a:lstStyle/>
+          <a:p>
+            <a:pPr algn="ctr"/>
+            <a:endParaRPr lang="en-US" dirty="0"/>
+          </a:p>
+        </p:txBody>
+      </p:sp>
+      <p:sp>
+        <p:nvSpPr>
+          <p:cNvPr id="9" name="Explosion: 14 Points 8">
+            <a:extLst>
+              <a:ext uri="{FF2B5EF4-FFF2-40B4-BE49-F238E27FC236}">
+                <a16:creationId xmlns:a16="http://schemas.microsoft.com/office/drawing/2014/main" id="{B01A1988-E2B2-BC44-4C10-975B5A1AE35D}"/>
+              </a:ext>
+            </a:extLst>
+          </p:cNvPr>
+          <p:cNvSpPr/>
+          <p:nvPr/>
+        </p:nvSpPr>
+        <p:spPr>
+          <a:xfrm>
+            <a:off x="3893709" y="-646043"/>
+            <a:ext cx="3669087" cy="3707684"/>
+          </a:xfrm>
+          <a:prstGeom prst="irregularSeal2">
+            <a:avLst/>
+          </a:prstGeom>
+          <a:solidFill>
+            <a:schemeClr val="bg2">
+              <a:lumMod val="75000"/>
+            </a:schemeClr>
+          </a:solidFill>
+          <a:ln>
+            <a:noFill/>
+          </a:ln>
+        </p:spPr>
+        <p:style>
+          <a:lnRef idx="2">
+            <a:schemeClr val="accent1">
+              <a:shade val="15000"/>
+            </a:schemeClr>
+          </a:lnRef>
+          <a:fillRef idx="1">
+            <a:schemeClr val="accent1"/>
+          </a:fillRef>
+          <a:effectRef idx="0">
+            <a:schemeClr val="accent1"/>
+          </a:effectRef>
+          <a:fontRef idx="minor">
+            <a:schemeClr val="lt1"/>
+          </a:fontRef>
+        </p:style>
+        <p:txBody>
+          <a:bodyPr rtlCol="0" anchor="ctr"/>
+          <a:lstStyle/>
+          <a:p>
+            <a:pPr algn="ctr"/>
+            <a:endParaRPr lang="en-IN"/>
+          </a:p>
+        </p:txBody>
+      </p:sp>
+      <p:sp>
+        <p:nvSpPr>
+          <p:cNvPr id="2" name="Title 1">
+            <a:extLst>
+              <a:ext uri="{FF2B5EF4-FFF2-40B4-BE49-F238E27FC236}">
+                <a16:creationId xmlns:a16="http://schemas.microsoft.com/office/drawing/2014/main" id="{8C00363E-73A8-6B0E-E0ED-740D8A98F55C}"/>
+              </a:ext>
+            </a:extLst>
+          </p:cNvPr>
+          <p:cNvSpPr>
+            <a:spLocks noGrp="1"/>
+          </p:cNvSpPr>
+          <p:nvPr>
+            <p:ph type="title"/>
+          </p:nvPr>
+        </p:nvSpPr>
+        <p:spPr>
+          <a:xfrm>
+            <a:off x="0" y="-134470"/>
+            <a:ext cx="12192000" cy="2947244"/>
+          </a:xfrm>
+          <a:noFill/>
+        </p:spPr>
+        <p:txBody>
+          <a:bodyPr anchor="ctr">
+            <a:normAutofit/>
+          </a:bodyPr>
+          <a:lstStyle/>
+          <a:p>
+            <a:pPr algn="ctr"/>
+            <a:r>
+              <a:rPr lang="en-US" sz="7200" b="1" dirty="0">
+                <a:solidFill>
+                  <a:schemeClr val="tx1"/>
+                </a:solidFill>
+                <a:latin typeface="Barlow Black" panose="00000A00000000000000" pitchFamily="2" charset="0"/>
+              </a:rPr>
+              <a:t>Chapter – </a:t>
+            </a:r>
+            <a:r>
+              <a:rPr lang="en-US" sz="7200" dirty="0">
+                <a:solidFill>
+                  <a:schemeClr val="tx1"/>
+                </a:solidFill>
+                <a:latin typeface="Bahnschrift SemiLight" pitchFamily="34" charset="0"/>
+              </a:rPr>
+              <a:t>17</a:t>
+            </a:r>
+            <a:br>
+              <a:rPr lang="en-US" sz="7200" b="1" dirty="0">
+                <a:solidFill>
+                  <a:schemeClr val="tx1"/>
+                </a:solidFill>
+                <a:latin typeface="Barlow Black" panose="00000A00000000000000" pitchFamily="2" charset="0"/>
+              </a:rPr>
+            </a:br>
+            <a:endParaRPr lang="en-IN" sz="4800" b="1" dirty="0">
+              <a:solidFill>
+                <a:schemeClr val="accent2">
+                  <a:lumMod val="60000"/>
+                  <a:lumOff val="40000"/>
+                </a:schemeClr>
+              </a:solidFill>
+              <a:latin typeface="Bahnschrift Light Condensed" pitchFamily="34" charset="0"/>
+            </a:endParaRPr>
+          </a:p>
+        </p:txBody>
+      </p:sp>
+      <p:sp>
+        <p:nvSpPr>
+          <p:cNvPr id="8" name="TextBox 7">
+            <a:extLst>
+              <a:ext uri="{FF2B5EF4-FFF2-40B4-BE49-F238E27FC236}">
+                <a16:creationId xmlns:a16="http://schemas.microsoft.com/office/drawing/2014/main" id="{03EE1217-C057-25C5-6526-D02BC6C2B247}"/>
+              </a:ext>
+            </a:extLst>
+          </p:cNvPr>
+          <p:cNvSpPr txBox="1"/>
+          <p:nvPr/>
+        </p:nvSpPr>
+        <p:spPr>
+          <a:xfrm>
+            <a:off x="6057900" y="6308812"/>
+            <a:ext cx="6134100" cy="369332"/>
+          </a:xfrm>
+          <a:prstGeom prst="rect">
+            <a:avLst/>
+          </a:prstGeom>
+          <a:noFill/>
+        </p:spPr>
+        <p:txBody>
+          <a:bodyPr wrap="square" rtlCol="0">
+            <a:spAutoFit/>
+          </a:bodyPr>
+          <a:lstStyle/>
+          <a:p>
+            <a:pPr algn="ctr"/>
+            <a:r>
+              <a:rPr lang="en-US" b="1" dirty="0"/>
+              <a:t>Gautam Kumar- </a:t>
+            </a:r>
+            <a:r>
+              <a:rPr lang="en-US" dirty="0">
+                <a:solidFill>
+                  <a:schemeClr val="tx1">
+                    <a:lumMod val="50000"/>
+                    <a:lumOff val="50000"/>
+                  </a:schemeClr>
+                </a:solidFill>
+              </a:rPr>
+              <a:t>uidhtml.com</a:t>
+            </a:r>
+            <a:endParaRPr lang="en-IN" dirty="0">
+              <a:solidFill>
+                <a:schemeClr val="tx1">
+                  <a:lumMod val="50000"/>
+                  <a:lumOff val="50000"/>
+                </a:schemeClr>
+              </a:solidFill>
+            </a:endParaRPr>
+          </a:p>
+        </p:txBody>
+      </p:sp>
+      <p:sp>
+        <p:nvSpPr>
+          <p:cNvPr id="7" name="TextBox 6">
+            <a:extLst>
+              <a:ext uri="{FF2B5EF4-FFF2-40B4-BE49-F238E27FC236}">
+                <a16:creationId xmlns:a16="http://schemas.microsoft.com/office/drawing/2014/main" id="{1C13E8E4-1AF6-D344-1A6E-2EE10D21E4EF}"/>
+              </a:ext>
+            </a:extLst>
+          </p:cNvPr>
+          <p:cNvSpPr txBox="1"/>
+          <p:nvPr/>
+        </p:nvSpPr>
+        <p:spPr>
+          <a:xfrm>
+            <a:off x="241300" y="228600"/>
+            <a:ext cx="1601721" cy="584775"/>
+          </a:xfrm>
+          <a:prstGeom prst="rect">
+            <a:avLst/>
+          </a:prstGeom>
+          <a:noFill/>
+        </p:spPr>
+        <p:txBody>
+          <a:bodyPr wrap="none" rtlCol="0">
+            <a:spAutoFit/>
+          </a:bodyPr>
+          <a:lstStyle/>
+          <a:p>
+            <a:r>
+              <a:rPr lang="en-US" sz="3200" b="1" dirty="0">
+                <a:latin typeface="Barlow Condensed ExtraLight" panose="00000306000000000000" pitchFamily="2" charset="0"/>
+              </a:rPr>
+              <a:t>JavaScript</a:t>
+            </a:r>
+            <a:endParaRPr lang="en-US" sz="3200" dirty="0">
+              <a:solidFill>
+                <a:srgbClr val="FFFF00"/>
+              </a:solidFill>
+            </a:endParaRPr>
+          </a:p>
+        </p:txBody>
+      </p:sp>
+      <p:pic>
+        <p:nvPicPr>
+          <p:cNvPr id="1027" name="Picture 3" descr="K:\github-repo\javascript-tutorials\tutorials\chapter-7-data-conversion\assets\images\javascript-logo.png">
+            <a:extLst>
+              <a:ext uri="{FF2B5EF4-FFF2-40B4-BE49-F238E27FC236}">
+                <a16:creationId xmlns:a16="http://schemas.microsoft.com/office/drawing/2014/main" id="{3AF065EC-3729-BE67-B3F0-C03395FD045A}"/>
+              </a:ext>
+            </a:extLst>
+          </p:cNvPr>
+          <p:cNvPicPr>
+            <a:picLocks noChangeAspect="1" noChangeArrowheads="1"/>
+          </p:cNvPicPr>
+          <p:nvPr/>
+        </p:nvPicPr>
+        <p:blipFill>
+          <a:blip r:embed="rId3"/>
+          <a:srcRect/>
+          <a:stretch>
+            <a:fillRect/>
+          </a:stretch>
+        </p:blipFill>
+        <p:spPr bwMode="auto">
+          <a:xfrm>
+            <a:off x="10712450" y="5353050"/>
+            <a:ext cx="1314450" cy="1314450"/>
+          </a:xfrm>
+          <a:prstGeom prst="rect">
+            <a:avLst/>
+          </a:prstGeom>
+          <a:noFill/>
+        </p:spPr>
+      </p:pic>
+      <p:pic>
+        <p:nvPicPr>
+          <p:cNvPr id="4" name="Picture 3">
+            <a:extLst>
+              <a:ext uri="{FF2B5EF4-FFF2-40B4-BE49-F238E27FC236}">
+                <a16:creationId xmlns:a16="http://schemas.microsoft.com/office/drawing/2014/main" id="{CE11F2F2-0144-D7F2-9651-03A4585C5BEE}"/>
+              </a:ext>
+            </a:extLst>
+          </p:cNvPr>
+          <p:cNvPicPr>
+            <a:picLocks noChangeAspect="1"/>
+          </p:cNvPicPr>
+          <p:nvPr/>
+        </p:nvPicPr>
+        <p:blipFill>
+          <a:blip r:embed="rId4"/>
+          <a:stretch>
+            <a:fillRect/>
+          </a:stretch>
+        </p:blipFill>
+        <p:spPr>
+          <a:xfrm>
+            <a:off x="1428534" y="1477296"/>
+            <a:ext cx="8855152" cy="4191835"/>
+          </a:xfrm>
+          <a:prstGeom prst="rect">
+            <a:avLst/>
+          </a:prstGeom>
+        </p:spPr>
+      </p:pic>
+    </p:spTree>
+    <p:extLst>
+      <p:ext uri="{BB962C8B-B14F-4D97-AF65-F5344CB8AC3E}">
+        <p14:creationId xmlns:p14="http://schemas.microsoft.com/office/powerpoint/2010/main" val="953331994"/>
       </p:ext>
     </p:extLst>
   </p:cSld>

</xml_diff>

<commit_message>
Added chapter 20 traditional loops
</commit_message>
<xml_diff>
--- a/Javascript Tutorials.pptx
+++ b/Javascript Tutorials.pptx
@@ -5,7 +5,7 @@
     <p:sldMasterId id="2147483686" r:id="rId1"/>
   </p:sldMasterIdLst>
   <p:notesMasterIdLst>
-    <p:notesMasterId r:id="rId77"/>
+    <p:notesMasterId r:id="rId81"/>
   </p:notesMasterIdLst>
   <p:sldIdLst>
     <p:sldId id="256" r:id="rId2"/>
@@ -79,10 +79,14 @@
     <p:sldId id="332" r:id="rId70"/>
     <p:sldId id="326" r:id="rId71"/>
     <p:sldId id="327" r:id="rId72"/>
-    <p:sldId id="328" r:id="rId73"/>
-    <p:sldId id="329" r:id="rId74"/>
-    <p:sldId id="330" r:id="rId75"/>
-    <p:sldId id="331" r:id="rId76"/>
+    <p:sldId id="337" r:id="rId73"/>
+    <p:sldId id="338" r:id="rId74"/>
+    <p:sldId id="336" r:id="rId75"/>
+    <p:sldId id="335" r:id="rId76"/>
+    <p:sldId id="328" r:id="rId77"/>
+    <p:sldId id="329" r:id="rId78"/>
+    <p:sldId id="330" r:id="rId79"/>
+    <p:sldId id="331" r:id="rId80"/>
   </p:sldIdLst>
   <p:sldSz cx="12192000" cy="6858000"/>
   <p:notesSz cx="6858000" cy="9144000"/>
@@ -4325,6 +4329,450 @@
         <p:cNvPr id="1" name="">
           <a:extLst>
             <a:ext uri="{FF2B5EF4-FFF2-40B4-BE49-F238E27FC236}">
+              <a16:creationId xmlns:a16="http://schemas.microsoft.com/office/drawing/2014/main" id="{C987CDD0-9513-6527-5FC9-B183C3487CD5}"/>
+            </a:ext>
+          </a:extLst>
+        </p:cNvPr>
+        <p:cNvGrpSpPr/>
+        <p:nvPr/>
+      </p:nvGrpSpPr>
+      <p:grpSpPr>
+        <a:xfrm>
+          <a:off x="0" y="0"/>
+          <a:ext cx="0" cy="0"/>
+          <a:chOff x="0" y="0"/>
+          <a:chExt cx="0" cy="0"/>
+        </a:xfrm>
+      </p:grpSpPr>
+      <p:sp>
+        <p:nvSpPr>
+          <p:cNvPr id="2" name="Slide Image Placeholder 1">
+            <a:extLst>
+              <a:ext uri="{FF2B5EF4-FFF2-40B4-BE49-F238E27FC236}">
+                <a16:creationId xmlns:a16="http://schemas.microsoft.com/office/drawing/2014/main" id="{A4F4E110-64DB-3939-E01A-5E8B8EA38B5D}"/>
+              </a:ext>
+            </a:extLst>
+          </p:cNvPr>
+          <p:cNvSpPr>
+            <a:spLocks noGrp="1" noRot="1" noChangeAspect="1"/>
+          </p:cNvSpPr>
+          <p:nvPr>
+            <p:ph type="sldImg"/>
+          </p:nvPr>
+        </p:nvSpPr>
+        <p:spPr/>
+      </p:sp>
+      <p:sp>
+        <p:nvSpPr>
+          <p:cNvPr id="3" name="Notes Placeholder 2">
+            <a:extLst>
+              <a:ext uri="{FF2B5EF4-FFF2-40B4-BE49-F238E27FC236}">
+                <a16:creationId xmlns:a16="http://schemas.microsoft.com/office/drawing/2014/main" id="{46BBBF6B-905A-B2D3-AEC7-B5AA5152E6BD}"/>
+              </a:ext>
+            </a:extLst>
+          </p:cNvPr>
+          <p:cNvSpPr>
+            <a:spLocks noGrp="1"/>
+          </p:cNvSpPr>
+          <p:nvPr>
+            <p:ph type="body" idx="1"/>
+          </p:nvPr>
+        </p:nvSpPr>
+        <p:spPr/>
+        <p:txBody>
+          <a:bodyPr>
+            <a:normAutofit/>
+          </a:bodyPr>
+          <a:lstStyle/>
+          <a:p>
+            <a:endParaRPr lang="en-US" dirty="0"/>
+          </a:p>
+        </p:txBody>
+      </p:sp>
+      <p:sp>
+        <p:nvSpPr>
+          <p:cNvPr id="4" name="Slide Number Placeholder 3">
+            <a:extLst>
+              <a:ext uri="{FF2B5EF4-FFF2-40B4-BE49-F238E27FC236}">
+                <a16:creationId xmlns:a16="http://schemas.microsoft.com/office/drawing/2014/main" id="{120D1638-4F82-154E-0B27-F7D2903EF543}"/>
+              </a:ext>
+            </a:extLst>
+          </p:cNvPr>
+          <p:cNvSpPr>
+            <a:spLocks noGrp="1"/>
+          </p:cNvSpPr>
+          <p:nvPr>
+            <p:ph type="sldNum" sz="quarter" idx="10"/>
+          </p:nvPr>
+        </p:nvSpPr>
+        <p:spPr/>
+        <p:txBody>
+          <a:bodyPr/>
+          <a:lstStyle/>
+          <a:p>
+            <a:fld id="{319BE468-75AD-472B-90AC-B0CB707E0D7A}" type="slidenum">
+              <a:rPr lang="en-US" smtClean="0"/>
+              <a:pPr/>
+              <a:t>72</a:t>
+            </a:fld>
+            <a:endParaRPr lang="en-US"/>
+          </a:p>
+        </p:txBody>
+      </p:sp>
+    </p:spTree>
+    <p:extLst>
+      <p:ext uri="{BB962C8B-B14F-4D97-AF65-F5344CB8AC3E}">
+        <p14:creationId xmlns:p14="http://schemas.microsoft.com/office/powerpoint/2010/main" val="2104672982"/>
+      </p:ext>
+    </p:extLst>
+  </p:cSld>
+  <p:clrMapOvr>
+    <a:masterClrMapping/>
+  </p:clrMapOvr>
+</p:notes>
+</file>
+
+<file path=ppt/notesSlides/notesSlide42.xml><?xml version="1.0" encoding="utf-8"?>
+<p:notes xmlns:a="http://schemas.openxmlformats.org/drawingml/2006/main" xmlns:r="http://schemas.openxmlformats.org/officeDocument/2006/relationships" xmlns:p="http://schemas.openxmlformats.org/presentationml/2006/main">
+  <p:cSld>
+    <p:spTree>
+      <p:nvGrpSpPr>
+        <p:cNvPr id="1" name="">
+          <a:extLst>
+            <a:ext uri="{FF2B5EF4-FFF2-40B4-BE49-F238E27FC236}">
+              <a16:creationId xmlns:a16="http://schemas.microsoft.com/office/drawing/2014/main" id="{FC02397C-8826-BAD8-48C9-08D50335176E}"/>
+            </a:ext>
+          </a:extLst>
+        </p:cNvPr>
+        <p:cNvGrpSpPr/>
+        <p:nvPr/>
+      </p:nvGrpSpPr>
+      <p:grpSpPr>
+        <a:xfrm>
+          <a:off x="0" y="0"/>
+          <a:ext cx="0" cy="0"/>
+          <a:chOff x="0" y="0"/>
+          <a:chExt cx="0" cy="0"/>
+        </a:xfrm>
+      </p:grpSpPr>
+      <p:sp>
+        <p:nvSpPr>
+          <p:cNvPr id="2" name="Slide Image Placeholder 1">
+            <a:extLst>
+              <a:ext uri="{FF2B5EF4-FFF2-40B4-BE49-F238E27FC236}">
+                <a16:creationId xmlns:a16="http://schemas.microsoft.com/office/drawing/2014/main" id="{D1029122-B48F-C7CA-892F-FBE04AF05CAE}"/>
+              </a:ext>
+            </a:extLst>
+          </p:cNvPr>
+          <p:cNvSpPr>
+            <a:spLocks noGrp="1" noRot="1" noChangeAspect="1"/>
+          </p:cNvSpPr>
+          <p:nvPr>
+            <p:ph type="sldImg"/>
+          </p:nvPr>
+        </p:nvSpPr>
+        <p:spPr/>
+      </p:sp>
+      <p:sp>
+        <p:nvSpPr>
+          <p:cNvPr id="3" name="Notes Placeholder 2">
+            <a:extLst>
+              <a:ext uri="{FF2B5EF4-FFF2-40B4-BE49-F238E27FC236}">
+                <a16:creationId xmlns:a16="http://schemas.microsoft.com/office/drawing/2014/main" id="{9EDDEE6D-4EC6-8238-73F0-D44A7EDA2263}"/>
+              </a:ext>
+            </a:extLst>
+          </p:cNvPr>
+          <p:cNvSpPr>
+            <a:spLocks noGrp="1"/>
+          </p:cNvSpPr>
+          <p:nvPr>
+            <p:ph type="body" idx="1"/>
+          </p:nvPr>
+        </p:nvSpPr>
+        <p:spPr/>
+        <p:txBody>
+          <a:bodyPr>
+            <a:normAutofit/>
+          </a:bodyPr>
+          <a:lstStyle/>
+          <a:p>
+            <a:endParaRPr lang="en-US" dirty="0"/>
+          </a:p>
+        </p:txBody>
+      </p:sp>
+      <p:sp>
+        <p:nvSpPr>
+          <p:cNvPr id="4" name="Slide Number Placeholder 3">
+            <a:extLst>
+              <a:ext uri="{FF2B5EF4-FFF2-40B4-BE49-F238E27FC236}">
+                <a16:creationId xmlns:a16="http://schemas.microsoft.com/office/drawing/2014/main" id="{50FB5894-4842-7C0D-5F1A-7C6804A81EC9}"/>
+              </a:ext>
+            </a:extLst>
+          </p:cNvPr>
+          <p:cNvSpPr>
+            <a:spLocks noGrp="1"/>
+          </p:cNvSpPr>
+          <p:nvPr>
+            <p:ph type="sldNum" sz="quarter" idx="10"/>
+          </p:nvPr>
+        </p:nvSpPr>
+        <p:spPr/>
+        <p:txBody>
+          <a:bodyPr/>
+          <a:lstStyle/>
+          <a:p>
+            <a:fld id="{319BE468-75AD-472B-90AC-B0CB707E0D7A}" type="slidenum">
+              <a:rPr lang="en-US" smtClean="0"/>
+              <a:pPr/>
+              <a:t>73</a:t>
+            </a:fld>
+            <a:endParaRPr lang="en-US"/>
+          </a:p>
+        </p:txBody>
+      </p:sp>
+    </p:spTree>
+    <p:extLst>
+      <p:ext uri="{BB962C8B-B14F-4D97-AF65-F5344CB8AC3E}">
+        <p14:creationId xmlns:p14="http://schemas.microsoft.com/office/powerpoint/2010/main" val="1009734546"/>
+      </p:ext>
+    </p:extLst>
+  </p:cSld>
+  <p:clrMapOvr>
+    <a:masterClrMapping/>
+  </p:clrMapOvr>
+</p:notes>
+</file>
+
+<file path=ppt/notesSlides/notesSlide43.xml><?xml version="1.0" encoding="utf-8"?>
+<p:notes xmlns:a="http://schemas.openxmlformats.org/drawingml/2006/main" xmlns:r="http://schemas.openxmlformats.org/officeDocument/2006/relationships" xmlns:p="http://schemas.openxmlformats.org/presentationml/2006/main">
+  <p:cSld>
+    <p:spTree>
+      <p:nvGrpSpPr>
+        <p:cNvPr id="1" name="">
+          <a:extLst>
+            <a:ext uri="{FF2B5EF4-FFF2-40B4-BE49-F238E27FC236}">
+              <a16:creationId xmlns:a16="http://schemas.microsoft.com/office/drawing/2014/main" id="{CB4CDAEB-D19D-531A-950B-E3428610DEA9}"/>
+            </a:ext>
+          </a:extLst>
+        </p:cNvPr>
+        <p:cNvGrpSpPr/>
+        <p:nvPr/>
+      </p:nvGrpSpPr>
+      <p:grpSpPr>
+        <a:xfrm>
+          <a:off x="0" y="0"/>
+          <a:ext cx="0" cy="0"/>
+          <a:chOff x="0" y="0"/>
+          <a:chExt cx="0" cy="0"/>
+        </a:xfrm>
+      </p:grpSpPr>
+      <p:sp>
+        <p:nvSpPr>
+          <p:cNvPr id="2" name="Slide Image Placeholder 1">
+            <a:extLst>
+              <a:ext uri="{FF2B5EF4-FFF2-40B4-BE49-F238E27FC236}">
+                <a16:creationId xmlns:a16="http://schemas.microsoft.com/office/drawing/2014/main" id="{D0F2A90E-D498-333B-568F-003B8096195E}"/>
+              </a:ext>
+            </a:extLst>
+          </p:cNvPr>
+          <p:cNvSpPr>
+            <a:spLocks noGrp="1" noRot="1" noChangeAspect="1"/>
+          </p:cNvSpPr>
+          <p:nvPr>
+            <p:ph type="sldImg"/>
+          </p:nvPr>
+        </p:nvSpPr>
+        <p:spPr/>
+      </p:sp>
+      <p:sp>
+        <p:nvSpPr>
+          <p:cNvPr id="3" name="Notes Placeholder 2">
+            <a:extLst>
+              <a:ext uri="{FF2B5EF4-FFF2-40B4-BE49-F238E27FC236}">
+                <a16:creationId xmlns:a16="http://schemas.microsoft.com/office/drawing/2014/main" id="{27B03AF4-4F46-8F2D-D47B-472FDBD542C7}"/>
+              </a:ext>
+            </a:extLst>
+          </p:cNvPr>
+          <p:cNvSpPr>
+            <a:spLocks noGrp="1"/>
+          </p:cNvSpPr>
+          <p:nvPr>
+            <p:ph type="body" idx="1"/>
+          </p:nvPr>
+        </p:nvSpPr>
+        <p:spPr/>
+        <p:txBody>
+          <a:bodyPr>
+            <a:normAutofit/>
+          </a:bodyPr>
+          <a:lstStyle/>
+          <a:p>
+            <a:endParaRPr lang="en-US" dirty="0"/>
+          </a:p>
+        </p:txBody>
+      </p:sp>
+      <p:sp>
+        <p:nvSpPr>
+          <p:cNvPr id="4" name="Slide Number Placeholder 3">
+            <a:extLst>
+              <a:ext uri="{FF2B5EF4-FFF2-40B4-BE49-F238E27FC236}">
+                <a16:creationId xmlns:a16="http://schemas.microsoft.com/office/drawing/2014/main" id="{0DA00E1E-235E-270B-5736-A33E0A8BDAC7}"/>
+              </a:ext>
+            </a:extLst>
+          </p:cNvPr>
+          <p:cNvSpPr>
+            <a:spLocks noGrp="1"/>
+          </p:cNvSpPr>
+          <p:nvPr>
+            <p:ph type="sldNum" sz="quarter" idx="10"/>
+          </p:nvPr>
+        </p:nvSpPr>
+        <p:spPr/>
+        <p:txBody>
+          <a:bodyPr/>
+          <a:lstStyle/>
+          <a:p>
+            <a:fld id="{319BE468-75AD-472B-90AC-B0CB707E0D7A}" type="slidenum">
+              <a:rPr lang="en-US" smtClean="0"/>
+              <a:pPr/>
+              <a:t>74</a:t>
+            </a:fld>
+            <a:endParaRPr lang="en-US"/>
+          </a:p>
+        </p:txBody>
+      </p:sp>
+    </p:spTree>
+    <p:extLst>
+      <p:ext uri="{BB962C8B-B14F-4D97-AF65-F5344CB8AC3E}">
+        <p14:creationId xmlns:p14="http://schemas.microsoft.com/office/powerpoint/2010/main" val="2772731020"/>
+      </p:ext>
+    </p:extLst>
+  </p:cSld>
+  <p:clrMapOvr>
+    <a:masterClrMapping/>
+  </p:clrMapOvr>
+</p:notes>
+</file>
+
+<file path=ppt/notesSlides/notesSlide44.xml><?xml version="1.0" encoding="utf-8"?>
+<p:notes xmlns:a="http://schemas.openxmlformats.org/drawingml/2006/main" xmlns:r="http://schemas.openxmlformats.org/officeDocument/2006/relationships" xmlns:p="http://schemas.openxmlformats.org/presentationml/2006/main">
+  <p:cSld>
+    <p:spTree>
+      <p:nvGrpSpPr>
+        <p:cNvPr id="1" name="">
+          <a:extLst>
+            <a:ext uri="{FF2B5EF4-FFF2-40B4-BE49-F238E27FC236}">
+              <a16:creationId xmlns:a16="http://schemas.microsoft.com/office/drawing/2014/main" id="{F658BEF0-0554-633B-A7A9-3D9CD60A60EF}"/>
+            </a:ext>
+          </a:extLst>
+        </p:cNvPr>
+        <p:cNvGrpSpPr/>
+        <p:nvPr/>
+      </p:nvGrpSpPr>
+      <p:grpSpPr>
+        <a:xfrm>
+          <a:off x="0" y="0"/>
+          <a:ext cx="0" cy="0"/>
+          <a:chOff x="0" y="0"/>
+          <a:chExt cx="0" cy="0"/>
+        </a:xfrm>
+      </p:grpSpPr>
+      <p:sp>
+        <p:nvSpPr>
+          <p:cNvPr id="2" name="Slide Image Placeholder 1">
+            <a:extLst>
+              <a:ext uri="{FF2B5EF4-FFF2-40B4-BE49-F238E27FC236}">
+                <a16:creationId xmlns:a16="http://schemas.microsoft.com/office/drawing/2014/main" id="{D62F1781-E73D-491B-C6E2-E9DD1AFCC801}"/>
+              </a:ext>
+            </a:extLst>
+          </p:cNvPr>
+          <p:cNvSpPr>
+            <a:spLocks noGrp="1" noRot="1" noChangeAspect="1"/>
+          </p:cNvSpPr>
+          <p:nvPr>
+            <p:ph type="sldImg"/>
+          </p:nvPr>
+        </p:nvSpPr>
+        <p:spPr/>
+      </p:sp>
+      <p:sp>
+        <p:nvSpPr>
+          <p:cNvPr id="3" name="Notes Placeholder 2">
+            <a:extLst>
+              <a:ext uri="{FF2B5EF4-FFF2-40B4-BE49-F238E27FC236}">
+                <a16:creationId xmlns:a16="http://schemas.microsoft.com/office/drawing/2014/main" id="{9A2B8EF2-311F-2121-0BC1-3886B1E0286D}"/>
+              </a:ext>
+            </a:extLst>
+          </p:cNvPr>
+          <p:cNvSpPr>
+            <a:spLocks noGrp="1"/>
+          </p:cNvSpPr>
+          <p:nvPr>
+            <p:ph type="body" idx="1"/>
+          </p:nvPr>
+        </p:nvSpPr>
+        <p:spPr/>
+        <p:txBody>
+          <a:bodyPr>
+            <a:normAutofit/>
+          </a:bodyPr>
+          <a:lstStyle/>
+          <a:p>
+            <a:endParaRPr lang="en-US" dirty="0"/>
+          </a:p>
+        </p:txBody>
+      </p:sp>
+      <p:sp>
+        <p:nvSpPr>
+          <p:cNvPr id="4" name="Slide Number Placeholder 3">
+            <a:extLst>
+              <a:ext uri="{FF2B5EF4-FFF2-40B4-BE49-F238E27FC236}">
+                <a16:creationId xmlns:a16="http://schemas.microsoft.com/office/drawing/2014/main" id="{7D7640B1-2D91-5881-5F07-E620B7C2439F}"/>
+              </a:ext>
+            </a:extLst>
+          </p:cNvPr>
+          <p:cNvSpPr>
+            <a:spLocks noGrp="1"/>
+          </p:cNvSpPr>
+          <p:nvPr>
+            <p:ph type="sldNum" sz="quarter" idx="10"/>
+          </p:nvPr>
+        </p:nvSpPr>
+        <p:spPr/>
+        <p:txBody>
+          <a:bodyPr/>
+          <a:lstStyle/>
+          <a:p>
+            <a:fld id="{319BE468-75AD-472B-90AC-B0CB707E0D7A}" type="slidenum">
+              <a:rPr lang="en-US" smtClean="0"/>
+              <a:pPr/>
+              <a:t>75</a:t>
+            </a:fld>
+            <a:endParaRPr lang="en-US"/>
+          </a:p>
+        </p:txBody>
+      </p:sp>
+    </p:spTree>
+    <p:extLst>
+      <p:ext uri="{BB962C8B-B14F-4D97-AF65-F5344CB8AC3E}">
+        <p14:creationId xmlns:p14="http://schemas.microsoft.com/office/powerpoint/2010/main" val="4127824593"/>
+      </p:ext>
+    </p:extLst>
+  </p:cSld>
+  <p:clrMapOvr>
+    <a:masterClrMapping/>
+  </p:clrMapOvr>
+</p:notes>
+</file>
+
+<file path=ppt/notesSlides/notesSlide45.xml><?xml version="1.0" encoding="utf-8"?>
+<p:notes xmlns:a="http://schemas.openxmlformats.org/drawingml/2006/main" xmlns:r="http://schemas.openxmlformats.org/officeDocument/2006/relationships" xmlns:p="http://schemas.openxmlformats.org/presentationml/2006/main">
+  <p:cSld>
+    <p:spTree>
+      <p:nvGrpSpPr>
+        <p:cNvPr id="1" name="">
+          <a:extLst>
+            <a:ext uri="{FF2B5EF4-FFF2-40B4-BE49-F238E27FC236}">
               <a16:creationId xmlns:a16="http://schemas.microsoft.com/office/drawing/2014/main" id="{D61773BB-4398-47E3-EE9F-2F9A36873DAF}"/>
             </a:ext>
           </a:extLst>
@@ -4409,7 +4857,7 @@
             <a:fld id="{319BE468-75AD-472B-90AC-B0CB707E0D7A}" type="slidenum">
               <a:rPr lang="en-US" smtClean="0"/>
               <a:pPr/>
-              <a:t>72</a:t>
+              <a:t>76</a:t>
             </a:fld>
             <a:endParaRPr lang="en-US"/>
           </a:p>
@@ -4428,7 +4876,7 @@
 </p:notes>
 </file>
 
-<file path=ppt/notesSlides/notesSlide42.xml><?xml version="1.0" encoding="utf-8"?>
+<file path=ppt/notesSlides/notesSlide46.xml><?xml version="1.0" encoding="utf-8"?>
 <p:notes xmlns:a="http://schemas.openxmlformats.org/drawingml/2006/main" xmlns:r="http://schemas.openxmlformats.org/officeDocument/2006/relationships" xmlns:p="http://schemas.openxmlformats.org/presentationml/2006/main">
   <p:cSld>
     <p:spTree>
@@ -4520,7 +4968,7 @@
             <a:fld id="{319BE468-75AD-472B-90AC-B0CB707E0D7A}" type="slidenum">
               <a:rPr lang="en-US" smtClean="0"/>
               <a:pPr/>
-              <a:t>73</a:t>
+              <a:t>77</a:t>
             </a:fld>
             <a:endParaRPr lang="en-US"/>
           </a:p>
@@ -4539,7 +4987,7 @@
 </p:notes>
 </file>
 
-<file path=ppt/notesSlides/notesSlide43.xml><?xml version="1.0" encoding="utf-8"?>
+<file path=ppt/notesSlides/notesSlide47.xml><?xml version="1.0" encoding="utf-8"?>
 <p:notes xmlns:a="http://schemas.openxmlformats.org/drawingml/2006/main" xmlns:r="http://schemas.openxmlformats.org/officeDocument/2006/relationships" xmlns:p="http://schemas.openxmlformats.org/presentationml/2006/main">
   <p:cSld>
     <p:spTree>
@@ -4631,7 +5079,7 @@
             <a:fld id="{319BE468-75AD-472B-90AC-B0CB707E0D7A}" type="slidenum">
               <a:rPr lang="en-US" smtClean="0"/>
               <a:pPr/>
-              <a:t>74</a:t>
+              <a:t>78</a:t>
             </a:fld>
             <a:endParaRPr lang="en-US"/>
           </a:p>
@@ -4650,7 +5098,7 @@
 </p:notes>
 </file>
 
-<file path=ppt/notesSlides/notesSlide44.xml><?xml version="1.0" encoding="utf-8"?>
+<file path=ppt/notesSlides/notesSlide48.xml><?xml version="1.0" encoding="utf-8"?>
 <p:notes xmlns:a="http://schemas.openxmlformats.org/drawingml/2006/main" xmlns:r="http://schemas.openxmlformats.org/officeDocument/2006/relationships" xmlns:p="http://schemas.openxmlformats.org/presentationml/2006/main">
   <p:cSld>
     <p:spTree>
@@ -4742,7 +5190,7 @@
             <a:fld id="{319BE468-75AD-472B-90AC-B0CB707E0D7A}" type="slidenum">
               <a:rPr lang="en-US" smtClean="0"/>
               <a:pPr/>
-              <a:t>75</a:t>
+              <a:t>79</a:t>
             </a:fld>
             <a:endParaRPr lang="en-US"/>
           </a:p>
@@ -45491,7 +45939,7 @@
         </p:nvSpPr>
         <p:spPr>
           <a:xfrm>
-            <a:off x="0" y="2828868"/>
+            <a:off x="79513" y="2150441"/>
             <a:ext cx="12192000" cy="1446550"/>
           </a:xfrm>
           <a:prstGeom prst="rect">
@@ -45512,7 +45960,7 @@
                   <a:srgbClr val="FFFF00"/>
                 </a:solidFill>
               </a:rPr>
-              <a:t>loop</a:t>
+              <a:t>Traditional loop</a:t>
             </a:r>
             <a:endParaRPr lang="en-IN" sz="8800" dirty="0"/>
           </a:p>
@@ -45532,7 +45980,7 @@
         </p:nvSpPr>
         <p:spPr>
           <a:xfrm>
-            <a:off x="0" y="4275418"/>
+            <a:off x="0" y="3498849"/>
             <a:ext cx="12192000" cy="646331"/>
           </a:xfrm>
           <a:prstGeom prst="rect">
@@ -45569,7 +46017,7 @@
         </p:nvSpPr>
         <p:spPr>
           <a:xfrm>
-            <a:off x="609658" y="2956342"/>
+            <a:off x="1792727" y="4515937"/>
             <a:ext cx="1329210" cy="769441"/>
           </a:xfrm>
           <a:prstGeom prst="rect">
@@ -45613,7 +46061,7 @@
         </p:nvSpPr>
         <p:spPr>
           <a:xfrm>
-            <a:off x="7771190" y="2535235"/>
+            <a:off x="5195116" y="4406502"/>
             <a:ext cx="1960793" cy="769441"/>
           </a:xfrm>
           <a:prstGeom prst="rect">
@@ -45657,7 +46105,7 @@
         </p:nvSpPr>
         <p:spPr>
           <a:xfrm>
-            <a:off x="8921187" y="5567790"/>
+            <a:off x="8209874" y="4552065"/>
             <a:ext cx="2784737" cy="769441"/>
           </a:xfrm>
           <a:prstGeom prst="rect">
@@ -45689,10 +46137,10 @@
       </p:sp>
       <p:sp>
         <p:nvSpPr>
-          <p:cNvPr id="13" name="TextBox 12">
-            <a:extLst>
-              <a:ext uri="{FF2B5EF4-FFF2-40B4-BE49-F238E27FC236}">
-                <a16:creationId xmlns:a16="http://schemas.microsoft.com/office/drawing/2014/main" id="{A86C8F1C-33C9-9886-73B0-3A89DABA490F}"/>
+          <p:cNvPr id="18" name="TextBox 17">
+            <a:extLst>
+              <a:ext uri="{FF2B5EF4-FFF2-40B4-BE49-F238E27FC236}">
+                <a16:creationId xmlns:a16="http://schemas.microsoft.com/office/drawing/2014/main" id="{8DAC4B43-0C19-BD4C-4A1B-D07822952E13}"/>
               </a:ext>
             </a:extLst>
           </p:cNvPr>
@@ -45701,8 +46149,8 @@
         </p:nvSpPr>
         <p:spPr>
           <a:xfrm>
-            <a:off x="840015" y="5567791"/>
-            <a:ext cx="2047355" cy="769441"/>
+            <a:off x="3423680" y="5500237"/>
+            <a:ext cx="1608133" cy="769441"/>
           </a:xfrm>
           <a:prstGeom prst="rect">
             <a:avLst/>
@@ -45718,14 +46166,20 @@
             <a:r>
               <a:rPr lang="en-US" sz="4400" dirty="0">
                 <a:solidFill>
-                  <a:srgbClr val="92D050"/>
-                </a:solidFill>
-              </a:rPr>
-              <a:t>for-of()</a:t>
+                  <a:schemeClr val="accent3">
+                    <a:lumMod val="20000"/>
+                    <a:lumOff val="80000"/>
+                  </a:schemeClr>
+                </a:solidFill>
+              </a:rPr>
+              <a:t>break</a:t>
             </a:r>
             <a:endParaRPr lang="en-IN" sz="4400" dirty="0">
               <a:solidFill>
-                <a:srgbClr val="92D050"/>
+                <a:schemeClr val="accent3">
+                  <a:lumMod val="20000"/>
+                  <a:lumOff val="80000"/>
+                </a:schemeClr>
               </a:solidFill>
             </a:endParaRPr>
           </a:p>
@@ -45733,10 +46187,10 @@
       </p:sp>
       <p:sp>
         <p:nvSpPr>
-          <p:cNvPr id="14" name="TextBox 13">
-            <a:extLst>
-              <a:ext uri="{FF2B5EF4-FFF2-40B4-BE49-F238E27FC236}">
-                <a16:creationId xmlns:a16="http://schemas.microsoft.com/office/drawing/2014/main" id="{E8D5F71F-BB46-72D2-BDC2-665477172F19}"/>
+          <p:cNvPr id="19" name="TextBox 18">
+            <a:extLst>
+              <a:ext uri="{FF2B5EF4-FFF2-40B4-BE49-F238E27FC236}">
+                <a16:creationId xmlns:a16="http://schemas.microsoft.com/office/drawing/2014/main" id="{8B4FC163-C1F9-3F18-C6FB-9E7DEB32ACBB}"/>
               </a:ext>
             </a:extLst>
           </p:cNvPr>
@@ -45745,8 +46199,8 @@
         </p:nvSpPr>
         <p:spPr>
           <a:xfrm>
-            <a:off x="5224985" y="5567792"/>
-            <a:ext cx="2004075" cy="769441"/>
+            <a:off x="7018682" y="5500238"/>
+            <a:ext cx="2382383" cy="769441"/>
           </a:xfrm>
           <a:prstGeom prst="rect">
             <a:avLst/>
@@ -45762,110 +46216,20 @@
             <a:r>
               <a:rPr lang="en-US" sz="4400" dirty="0">
                 <a:solidFill>
-                  <a:srgbClr val="92D050"/>
-                </a:solidFill>
-              </a:rPr>
-              <a:t>for-in()</a:t>
+                  <a:schemeClr val="accent3">
+                    <a:lumMod val="20000"/>
+                    <a:lumOff val="80000"/>
+                  </a:schemeClr>
+                </a:solidFill>
+              </a:rPr>
+              <a:t>continue</a:t>
             </a:r>
             <a:endParaRPr lang="en-IN" sz="4400" dirty="0">
               <a:solidFill>
-                <a:srgbClr val="92D050"/>
-              </a:solidFill>
-            </a:endParaRPr>
-          </a:p>
-        </p:txBody>
-      </p:sp>
-      <p:sp>
-        <p:nvSpPr>
-          <p:cNvPr id="15" name="TextBox 14">
-            <a:extLst>
-              <a:ext uri="{FF2B5EF4-FFF2-40B4-BE49-F238E27FC236}">
-                <a16:creationId xmlns:a16="http://schemas.microsoft.com/office/drawing/2014/main" id="{2E604847-F810-CC9A-D022-B7976B930737}"/>
-              </a:ext>
-            </a:extLst>
-          </p:cNvPr>
-          <p:cNvSpPr txBox="1"/>
-          <p:nvPr/>
-        </p:nvSpPr>
-        <p:spPr>
-          <a:xfrm>
-            <a:off x="9504152" y="3328898"/>
-            <a:ext cx="2515432" cy="769441"/>
-          </a:xfrm>
-          <a:prstGeom prst="rect">
-            <a:avLst/>
-          </a:prstGeom>
-          <a:noFill/>
-        </p:spPr>
-        <p:txBody>
-          <a:bodyPr wrap="none" rtlCol="0">
-            <a:spAutoFit/>
-          </a:bodyPr>
-          <a:lstStyle/>
-          <a:p>
-            <a:r>
-              <a:rPr lang="en-US" sz="4400" dirty="0" err="1">
-                <a:solidFill>
-                  <a:srgbClr val="92D050"/>
-                </a:solidFill>
-              </a:rPr>
-              <a:t>forEach</a:t>
-            </a:r>
-            <a:r>
-              <a:rPr lang="en-US" sz="4400" dirty="0">
-                <a:solidFill>
-                  <a:srgbClr val="92D050"/>
-                </a:solidFill>
-              </a:rPr>
-              <a:t>()</a:t>
-            </a:r>
-            <a:endParaRPr lang="en-IN" sz="4400" dirty="0">
-              <a:solidFill>
-                <a:srgbClr val="92D050"/>
-              </a:solidFill>
-            </a:endParaRPr>
-          </a:p>
-        </p:txBody>
-      </p:sp>
-      <p:sp>
-        <p:nvSpPr>
-          <p:cNvPr id="16" name="TextBox 15">
-            <a:extLst>
-              <a:ext uri="{FF2B5EF4-FFF2-40B4-BE49-F238E27FC236}">
-                <a16:creationId xmlns:a16="http://schemas.microsoft.com/office/drawing/2014/main" id="{FF0BE2EF-C61B-456A-7A62-2182CD0CFE8D}"/>
-              </a:ext>
-            </a:extLst>
-          </p:cNvPr>
-          <p:cNvSpPr txBox="1"/>
-          <p:nvPr/>
-        </p:nvSpPr>
-        <p:spPr>
-          <a:xfrm>
-            <a:off x="2743750" y="2467905"/>
-            <a:ext cx="1677062" cy="769441"/>
-          </a:xfrm>
-          <a:prstGeom prst="rect">
-            <a:avLst/>
-          </a:prstGeom>
-          <a:noFill/>
-        </p:spPr>
-        <p:txBody>
-          <a:bodyPr wrap="none" rtlCol="0">
-            <a:spAutoFit/>
-          </a:bodyPr>
-          <a:lstStyle/>
-          <a:p>
-            <a:r>
-              <a:rPr lang="en-US" sz="4400" dirty="0">
-                <a:solidFill>
-                  <a:srgbClr val="92D050"/>
-                </a:solidFill>
-              </a:rPr>
-              <a:t>map()</a:t>
-            </a:r>
-            <a:endParaRPr lang="en-IN" sz="4400" dirty="0">
-              <a:solidFill>
-                <a:srgbClr val="92D050"/>
+                <a:schemeClr val="accent3">
+                  <a:lumMod val="20000"/>
+                  <a:lumOff val="80000"/>
+                </a:schemeClr>
               </a:solidFill>
             </a:endParaRPr>
           </a:p>
@@ -46257,12 +46621,20 @@
           <a:p>
             <a:pPr algn="ctr"/>
             <a:r>
+              <a:rPr lang="en-US" sz="8800" dirty="0" err="1">
+                <a:solidFill>
+                  <a:srgbClr val="FFFF00"/>
+                </a:solidFill>
+              </a:rPr>
+              <a:t>forEach</a:t>
+            </a:r>
+            <a:r>
               <a:rPr lang="en-US" sz="8800" dirty="0">
                 <a:solidFill>
                   <a:srgbClr val="FFFF00"/>
                 </a:solidFill>
               </a:rPr>
-              <a:t>Push()</a:t>
+              <a:t>()</a:t>
             </a:r>
             <a:endParaRPr lang="en-IN" sz="8800" dirty="0"/>
           </a:p>
@@ -46299,7 +46671,7 @@
             <a:pPr algn="ctr"/>
             <a:r>
               <a:rPr lang="en-US" sz="3600" dirty="0"/>
-              <a:t>Add an element at the end of array</a:t>
+              <a:t>Returns a new array after loop completion</a:t>
             </a:r>
             <a:endParaRPr lang="en-IN" sz="3600" dirty="0"/>
           </a:p>
@@ -46319,6 +46691,1773 @@
 </file>
 
 <file path=ppt/slides/slide72.xml><?xml version="1.0" encoding="utf-8"?>
+<p:sld xmlns:a="http://schemas.openxmlformats.org/drawingml/2006/main" xmlns:r="http://schemas.openxmlformats.org/officeDocument/2006/relationships" xmlns:p="http://schemas.openxmlformats.org/presentationml/2006/main">
+  <p:cSld>
+    <p:spTree>
+      <p:nvGrpSpPr>
+        <p:cNvPr id="1" name="">
+          <a:extLst>
+            <a:ext uri="{FF2B5EF4-FFF2-40B4-BE49-F238E27FC236}">
+              <a16:creationId xmlns:a16="http://schemas.microsoft.com/office/drawing/2014/main" id="{5C1F9CC1-C213-A300-ADEB-F9BEFF4DC775}"/>
+            </a:ext>
+          </a:extLst>
+        </p:cNvPr>
+        <p:cNvGrpSpPr/>
+        <p:nvPr/>
+      </p:nvGrpSpPr>
+      <p:grpSpPr>
+        <a:xfrm>
+          <a:off x="0" y="0"/>
+          <a:ext cx="0" cy="0"/>
+          <a:chOff x="0" y="0"/>
+          <a:chExt cx="0" cy="0"/>
+        </a:xfrm>
+      </p:grpSpPr>
+      <p:sp>
+        <p:nvSpPr>
+          <p:cNvPr id="10" name="Rectangle 9">
+            <a:extLst>
+              <a:ext uri="{FF2B5EF4-FFF2-40B4-BE49-F238E27FC236}">
+                <a16:creationId xmlns:a16="http://schemas.microsoft.com/office/drawing/2014/main" id="{8BFF20D3-8A3D-5D6D-7681-0975A4F1677F}"/>
+              </a:ext>
+            </a:extLst>
+          </p:cNvPr>
+          <p:cNvSpPr/>
+          <p:nvPr/>
+        </p:nvSpPr>
+        <p:spPr>
+          <a:xfrm>
+            <a:off x="0" y="0"/>
+            <a:ext cx="12192000" cy="6858000"/>
+          </a:xfrm>
+          <a:prstGeom prst="rect">
+            <a:avLst/>
+          </a:prstGeom>
+          <a:solidFill>
+            <a:schemeClr val="bg2">
+              <a:lumMod val="50000"/>
+            </a:schemeClr>
+          </a:solidFill>
+          <a:ln>
+            <a:noFill/>
+          </a:ln>
+        </p:spPr>
+        <p:style>
+          <a:lnRef idx="2">
+            <a:schemeClr val="accent1">
+              <a:shade val="50000"/>
+            </a:schemeClr>
+          </a:lnRef>
+          <a:fillRef idx="1">
+            <a:schemeClr val="accent1"/>
+          </a:fillRef>
+          <a:effectRef idx="0">
+            <a:schemeClr val="accent1"/>
+          </a:effectRef>
+          <a:fontRef idx="minor">
+            <a:schemeClr val="lt1"/>
+          </a:fontRef>
+        </p:style>
+        <p:txBody>
+          <a:bodyPr rtlCol="0" anchor="ctr"/>
+          <a:lstStyle/>
+          <a:p>
+            <a:pPr algn="ctr"/>
+            <a:endParaRPr lang="en-US" dirty="0"/>
+          </a:p>
+        </p:txBody>
+      </p:sp>
+      <p:sp>
+        <p:nvSpPr>
+          <p:cNvPr id="9" name="Explosion: 14 Points 8">
+            <a:extLst>
+              <a:ext uri="{FF2B5EF4-FFF2-40B4-BE49-F238E27FC236}">
+                <a16:creationId xmlns:a16="http://schemas.microsoft.com/office/drawing/2014/main" id="{9E0A7F76-6082-997F-1BB9-28E24EEE4EA6}"/>
+              </a:ext>
+            </a:extLst>
+          </p:cNvPr>
+          <p:cNvSpPr/>
+          <p:nvPr/>
+        </p:nvSpPr>
+        <p:spPr>
+          <a:xfrm>
+            <a:off x="3893709" y="-646043"/>
+            <a:ext cx="3669087" cy="3707684"/>
+          </a:xfrm>
+          <a:prstGeom prst="irregularSeal2">
+            <a:avLst/>
+          </a:prstGeom>
+          <a:solidFill>
+            <a:schemeClr val="bg2">
+              <a:lumMod val="75000"/>
+            </a:schemeClr>
+          </a:solidFill>
+          <a:ln>
+            <a:noFill/>
+          </a:ln>
+        </p:spPr>
+        <p:style>
+          <a:lnRef idx="2">
+            <a:schemeClr val="accent1">
+              <a:shade val="15000"/>
+            </a:schemeClr>
+          </a:lnRef>
+          <a:fillRef idx="1">
+            <a:schemeClr val="accent1"/>
+          </a:fillRef>
+          <a:effectRef idx="0">
+            <a:schemeClr val="accent1"/>
+          </a:effectRef>
+          <a:fontRef idx="minor">
+            <a:schemeClr val="lt1"/>
+          </a:fontRef>
+        </p:style>
+        <p:txBody>
+          <a:bodyPr rtlCol="0" anchor="ctr"/>
+          <a:lstStyle/>
+          <a:p>
+            <a:pPr algn="ctr"/>
+            <a:endParaRPr lang="en-IN"/>
+          </a:p>
+        </p:txBody>
+      </p:sp>
+      <p:sp>
+        <p:nvSpPr>
+          <p:cNvPr id="2" name="Title 1">
+            <a:extLst>
+              <a:ext uri="{FF2B5EF4-FFF2-40B4-BE49-F238E27FC236}">
+                <a16:creationId xmlns:a16="http://schemas.microsoft.com/office/drawing/2014/main" id="{B1EF7F4A-E908-13C2-3696-813C6CF0905E}"/>
+              </a:ext>
+            </a:extLst>
+          </p:cNvPr>
+          <p:cNvSpPr>
+            <a:spLocks noGrp="1"/>
+          </p:cNvSpPr>
+          <p:nvPr>
+            <p:ph type="title"/>
+          </p:nvPr>
+        </p:nvSpPr>
+        <p:spPr>
+          <a:xfrm>
+            <a:off x="0" y="404897"/>
+            <a:ext cx="12192000" cy="2947244"/>
+          </a:xfrm>
+          <a:noFill/>
+        </p:spPr>
+        <p:txBody>
+          <a:bodyPr anchor="ctr">
+            <a:normAutofit/>
+          </a:bodyPr>
+          <a:lstStyle/>
+          <a:p>
+            <a:pPr algn="ctr"/>
+            <a:r>
+              <a:rPr lang="en-US" sz="7200" b="1" dirty="0">
+                <a:solidFill>
+                  <a:schemeClr val="tx1"/>
+                </a:solidFill>
+                <a:latin typeface="Barlow Black" panose="00000A00000000000000" pitchFamily="2" charset="0"/>
+              </a:rPr>
+              <a:t>Chapter – </a:t>
+            </a:r>
+            <a:r>
+              <a:rPr lang="en-US" sz="7200" dirty="0">
+                <a:solidFill>
+                  <a:schemeClr val="tx1"/>
+                </a:solidFill>
+                <a:latin typeface="Bahnschrift SemiLight" pitchFamily="34" charset="0"/>
+              </a:rPr>
+              <a:t>22</a:t>
+            </a:r>
+            <a:br>
+              <a:rPr lang="en-US" sz="7200" b="1" dirty="0">
+                <a:solidFill>
+                  <a:schemeClr val="tx1"/>
+                </a:solidFill>
+                <a:latin typeface="Barlow Black" panose="00000A00000000000000" pitchFamily="2" charset="0"/>
+              </a:rPr>
+            </a:br>
+            <a:endParaRPr lang="en-IN" sz="4800" b="1" dirty="0">
+              <a:solidFill>
+                <a:schemeClr val="accent2">
+                  <a:lumMod val="60000"/>
+                  <a:lumOff val="40000"/>
+                </a:schemeClr>
+              </a:solidFill>
+              <a:latin typeface="Bahnschrift Light Condensed" pitchFamily="34" charset="0"/>
+            </a:endParaRPr>
+          </a:p>
+        </p:txBody>
+      </p:sp>
+      <p:sp>
+        <p:nvSpPr>
+          <p:cNvPr id="7" name="TextBox 6">
+            <a:extLst>
+              <a:ext uri="{FF2B5EF4-FFF2-40B4-BE49-F238E27FC236}">
+                <a16:creationId xmlns:a16="http://schemas.microsoft.com/office/drawing/2014/main" id="{C17253F0-3747-B6A7-8721-44FEE4DCB880}"/>
+              </a:ext>
+            </a:extLst>
+          </p:cNvPr>
+          <p:cNvSpPr txBox="1"/>
+          <p:nvPr/>
+        </p:nvSpPr>
+        <p:spPr>
+          <a:xfrm>
+            <a:off x="241300" y="228600"/>
+            <a:ext cx="2698175" cy="584775"/>
+          </a:xfrm>
+          <a:prstGeom prst="rect">
+            <a:avLst/>
+          </a:prstGeom>
+          <a:noFill/>
+        </p:spPr>
+        <p:txBody>
+          <a:bodyPr wrap="none" rtlCol="0">
+            <a:spAutoFit/>
+          </a:bodyPr>
+          <a:lstStyle/>
+          <a:p>
+            <a:r>
+              <a:rPr lang="en-US" sz="3200" b="1" dirty="0">
+                <a:latin typeface="Barlow Condensed ExtraLight" panose="00000306000000000000" pitchFamily="2" charset="0"/>
+              </a:rPr>
+              <a:t>JavaScript- </a:t>
+            </a:r>
+            <a:r>
+              <a:rPr lang="en-US" sz="3200" b="1" dirty="0">
+                <a:solidFill>
+                  <a:srgbClr val="FFFF00"/>
+                </a:solidFill>
+                <a:latin typeface="Bahnschrift SemiCondensed" panose="020B0502040204020203" pitchFamily="34" charset="0"/>
+              </a:rPr>
+              <a:t>Array</a:t>
+            </a:r>
+          </a:p>
+        </p:txBody>
+      </p:sp>
+      <p:sp>
+        <p:nvSpPr>
+          <p:cNvPr id="6" name="TextBox 5">
+            <a:extLst>
+              <a:ext uri="{FF2B5EF4-FFF2-40B4-BE49-F238E27FC236}">
+                <a16:creationId xmlns:a16="http://schemas.microsoft.com/office/drawing/2014/main" id="{553A8A76-C974-AC70-4D5B-8CC456290732}"/>
+              </a:ext>
+            </a:extLst>
+          </p:cNvPr>
+          <p:cNvSpPr txBox="1"/>
+          <p:nvPr/>
+        </p:nvSpPr>
+        <p:spPr>
+          <a:xfrm>
+            <a:off x="9909313" y="1536494"/>
+            <a:ext cx="2195004" cy="646331"/>
+          </a:xfrm>
+          <a:prstGeom prst="rect">
+            <a:avLst/>
+          </a:prstGeom>
+          <a:noFill/>
+        </p:spPr>
+        <p:txBody>
+          <a:bodyPr wrap="square" rtlCol="0">
+            <a:spAutoFit/>
+          </a:bodyPr>
+          <a:lstStyle/>
+          <a:p>
+            <a:pPr algn="r"/>
+            <a:r>
+              <a:rPr lang="en-US" b="1" dirty="0"/>
+              <a:t>Gautam Kumar </a:t>
+            </a:r>
+            <a:br>
+              <a:rPr lang="en-US" b="1" dirty="0"/>
+            </a:br>
+            <a:r>
+              <a:rPr lang="en-US" b="1" dirty="0">
+                <a:solidFill>
+                  <a:schemeClr val="tx1">
+                    <a:lumMod val="65000"/>
+                  </a:schemeClr>
+                </a:solidFill>
+              </a:rPr>
+              <a:t>- </a:t>
+            </a:r>
+            <a:r>
+              <a:rPr lang="en-US" dirty="0">
+                <a:solidFill>
+                  <a:schemeClr val="tx1">
+                    <a:lumMod val="65000"/>
+                  </a:schemeClr>
+                </a:solidFill>
+              </a:rPr>
+              <a:t>uidhtml.com</a:t>
+            </a:r>
+            <a:endParaRPr lang="en-IN" dirty="0">
+              <a:solidFill>
+                <a:schemeClr val="tx1">
+                  <a:lumMod val="65000"/>
+                </a:schemeClr>
+              </a:solidFill>
+            </a:endParaRPr>
+          </a:p>
+        </p:txBody>
+      </p:sp>
+      <p:pic>
+        <p:nvPicPr>
+          <p:cNvPr id="11" name="Picture 3" descr="K:\github-repo\javascript-tutorials\tutorials\chapter-7-data-conversion\assets\images\javascript-logo.png">
+            <a:extLst>
+              <a:ext uri="{FF2B5EF4-FFF2-40B4-BE49-F238E27FC236}">
+                <a16:creationId xmlns:a16="http://schemas.microsoft.com/office/drawing/2014/main" id="{7A14F9A0-53BC-24F6-3288-1F2F9C622A58}"/>
+              </a:ext>
+            </a:extLst>
+          </p:cNvPr>
+          <p:cNvPicPr>
+            <a:picLocks noChangeAspect="1" noChangeArrowheads="1"/>
+          </p:cNvPicPr>
+          <p:nvPr/>
+        </p:nvPicPr>
+        <p:blipFill>
+          <a:blip r:embed="rId3"/>
+          <a:srcRect/>
+          <a:stretch>
+            <a:fillRect/>
+          </a:stretch>
+        </p:blipFill>
+        <p:spPr bwMode="auto">
+          <a:xfrm>
+            <a:off x="10705134" y="143202"/>
+            <a:ext cx="1314450" cy="1314450"/>
+          </a:xfrm>
+          <a:prstGeom prst="rect">
+            <a:avLst/>
+          </a:prstGeom>
+          <a:noFill/>
+        </p:spPr>
+      </p:pic>
+      <p:sp>
+        <p:nvSpPr>
+          <p:cNvPr id="3" name="TextBox 2">
+            <a:extLst>
+              <a:ext uri="{FF2B5EF4-FFF2-40B4-BE49-F238E27FC236}">
+                <a16:creationId xmlns:a16="http://schemas.microsoft.com/office/drawing/2014/main" id="{A51AA51A-FDCF-BBA2-C0D6-97D21672C9C7}"/>
+              </a:ext>
+            </a:extLst>
+          </p:cNvPr>
+          <p:cNvSpPr txBox="1"/>
+          <p:nvPr/>
+        </p:nvSpPr>
+        <p:spPr>
+          <a:xfrm>
+            <a:off x="0" y="2828868"/>
+            <a:ext cx="12192000" cy="1446550"/>
+          </a:xfrm>
+          <a:prstGeom prst="rect">
+            <a:avLst/>
+          </a:prstGeom>
+          <a:noFill/>
+        </p:spPr>
+        <p:txBody>
+          <a:bodyPr wrap="square" rtlCol="0">
+            <a:spAutoFit/>
+          </a:bodyPr>
+          <a:lstStyle/>
+          <a:p>
+            <a:pPr algn="ctr"/>
+            <a:r>
+              <a:rPr lang="en-US" sz="8800" dirty="0">
+                <a:solidFill>
+                  <a:srgbClr val="FFFF00"/>
+                </a:solidFill>
+              </a:rPr>
+              <a:t>for-of()</a:t>
+            </a:r>
+            <a:endParaRPr lang="en-IN" sz="8800" dirty="0"/>
+          </a:p>
+        </p:txBody>
+      </p:sp>
+      <p:sp>
+        <p:nvSpPr>
+          <p:cNvPr id="4" name="TextBox 3">
+            <a:extLst>
+              <a:ext uri="{FF2B5EF4-FFF2-40B4-BE49-F238E27FC236}">
+                <a16:creationId xmlns:a16="http://schemas.microsoft.com/office/drawing/2014/main" id="{42F19CEE-038D-7DB0-FA95-AD318EA35075}"/>
+              </a:ext>
+            </a:extLst>
+          </p:cNvPr>
+          <p:cNvSpPr txBox="1"/>
+          <p:nvPr/>
+        </p:nvSpPr>
+        <p:spPr>
+          <a:xfrm>
+            <a:off x="0" y="4575783"/>
+            <a:ext cx="12192000" cy="646331"/>
+          </a:xfrm>
+          <a:prstGeom prst="rect">
+            <a:avLst/>
+          </a:prstGeom>
+          <a:noFill/>
+        </p:spPr>
+        <p:txBody>
+          <a:bodyPr wrap="square" rtlCol="0">
+            <a:spAutoFit/>
+          </a:bodyPr>
+          <a:lstStyle/>
+          <a:p>
+            <a:pPr algn="ctr"/>
+            <a:r>
+              <a:rPr lang="en-US" sz="3600" dirty="0"/>
+              <a:t>Returns a new array after loop completion</a:t>
+            </a:r>
+            <a:endParaRPr lang="en-IN" sz="3600" dirty="0"/>
+          </a:p>
+        </p:txBody>
+      </p:sp>
+    </p:spTree>
+    <p:extLst>
+      <p:ext uri="{BB962C8B-B14F-4D97-AF65-F5344CB8AC3E}">
+        <p14:creationId xmlns:p14="http://schemas.microsoft.com/office/powerpoint/2010/main" val="1509348135"/>
+      </p:ext>
+    </p:extLst>
+  </p:cSld>
+  <p:clrMapOvr>
+    <a:masterClrMapping/>
+  </p:clrMapOvr>
+</p:sld>
+</file>
+
+<file path=ppt/slides/slide73.xml><?xml version="1.0" encoding="utf-8"?>
+<p:sld xmlns:a="http://schemas.openxmlformats.org/drawingml/2006/main" xmlns:r="http://schemas.openxmlformats.org/officeDocument/2006/relationships" xmlns:p="http://schemas.openxmlformats.org/presentationml/2006/main">
+  <p:cSld>
+    <p:spTree>
+      <p:nvGrpSpPr>
+        <p:cNvPr id="1" name="">
+          <a:extLst>
+            <a:ext uri="{FF2B5EF4-FFF2-40B4-BE49-F238E27FC236}">
+              <a16:creationId xmlns:a16="http://schemas.microsoft.com/office/drawing/2014/main" id="{5BBA91B5-A14A-9A69-8B6E-0A5B74A87796}"/>
+            </a:ext>
+          </a:extLst>
+        </p:cNvPr>
+        <p:cNvGrpSpPr/>
+        <p:nvPr/>
+      </p:nvGrpSpPr>
+      <p:grpSpPr>
+        <a:xfrm>
+          <a:off x="0" y="0"/>
+          <a:ext cx="0" cy="0"/>
+          <a:chOff x="0" y="0"/>
+          <a:chExt cx="0" cy="0"/>
+        </a:xfrm>
+      </p:grpSpPr>
+      <p:sp>
+        <p:nvSpPr>
+          <p:cNvPr id="10" name="Rectangle 9">
+            <a:extLst>
+              <a:ext uri="{FF2B5EF4-FFF2-40B4-BE49-F238E27FC236}">
+                <a16:creationId xmlns:a16="http://schemas.microsoft.com/office/drawing/2014/main" id="{7346D918-0A91-509F-4718-5B19B615D46F}"/>
+              </a:ext>
+            </a:extLst>
+          </p:cNvPr>
+          <p:cNvSpPr/>
+          <p:nvPr/>
+        </p:nvSpPr>
+        <p:spPr>
+          <a:xfrm>
+            <a:off x="0" y="0"/>
+            <a:ext cx="12192000" cy="6858000"/>
+          </a:xfrm>
+          <a:prstGeom prst="rect">
+            <a:avLst/>
+          </a:prstGeom>
+          <a:solidFill>
+            <a:schemeClr val="bg2">
+              <a:lumMod val="50000"/>
+            </a:schemeClr>
+          </a:solidFill>
+          <a:ln>
+            <a:noFill/>
+          </a:ln>
+        </p:spPr>
+        <p:style>
+          <a:lnRef idx="2">
+            <a:schemeClr val="accent1">
+              <a:shade val="50000"/>
+            </a:schemeClr>
+          </a:lnRef>
+          <a:fillRef idx="1">
+            <a:schemeClr val="accent1"/>
+          </a:fillRef>
+          <a:effectRef idx="0">
+            <a:schemeClr val="accent1"/>
+          </a:effectRef>
+          <a:fontRef idx="minor">
+            <a:schemeClr val="lt1"/>
+          </a:fontRef>
+        </p:style>
+        <p:txBody>
+          <a:bodyPr rtlCol="0" anchor="ctr"/>
+          <a:lstStyle/>
+          <a:p>
+            <a:pPr algn="ctr"/>
+            <a:endParaRPr lang="en-US" dirty="0"/>
+          </a:p>
+        </p:txBody>
+      </p:sp>
+      <p:sp>
+        <p:nvSpPr>
+          <p:cNvPr id="9" name="Explosion: 14 Points 8">
+            <a:extLst>
+              <a:ext uri="{FF2B5EF4-FFF2-40B4-BE49-F238E27FC236}">
+                <a16:creationId xmlns:a16="http://schemas.microsoft.com/office/drawing/2014/main" id="{D5790120-E59F-1712-064D-306DE072EB6D}"/>
+              </a:ext>
+            </a:extLst>
+          </p:cNvPr>
+          <p:cNvSpPr/>
+          <p:nvPr/>
+        </p:nvSpPr>
+        <p:spPr>
+          <a:xfrm>
+            <a:off x="3893709" y="-646043"/>
+            <a:ext cx="3669087" cy="3707684"/>
+          </a:xfrm>
+          <a:prstGeom prst="irregularSeal2">
+            <a:avLst/>
+          </a:prstGeom>
+          <a:solidFill>
+            <a:schemeClr val="bg2">
+              <a:lumMod val="75000"/>
+            </a:schemeClr>
+          </a:solidFill>
+          <a:ln>
+            <a:noFill/>
+          </a:ln>
+        </p:spPr>
+        <p:style>
+          <a:lnRef idx="2">
+            <a:schemeClr val="accent1">
+              <a:shade val="15000"/>
+            </a:schemeClr>
+          </a:lnRef>
+          <a:fillRef idx="1">
+            <a:schemeClr val="accent1"/>
+          </a:fillRef>
+          <a:effectRef idx="0">
+            <a:schemeClr val="accent1"/>
+          </a:effectRef>
+          <a:fontRef idx="minor">
+            <a:schemeClr val="lt1"/>
+          </a:fontRef>
+        </p:style>
+        <p:txBody>
+          <a:bodyPr rtlCol="0" anchor="ctr"/>
+          <a:lstStyle/>
+          <a:p>
+            <a:pPr algn="ctr"/>
+            <a:endParaRPr lang="en-IN"/>
+          </a:p>
+        </p:txBody>
+      </p:sp>
+      <p:sp>
+        <p:nvSpPr>
+          <p:cNvPr id="2" name="Title 1">
+            <a:extLst>
+              <a:ext uri="{FF2B5EF4-FFF2-40B4-BE49-F238E27FC236}">
+                <a16:creationId xmlns:a16="http://schemas.microsoft.com/office/drawing/2014/main" id="{DFF21ECB-FC43-8B22-28A2-8BB68A62CC42}"/>
+              </a:ext>
+            </a:extLst>
+          </p:cNvPr>
+          <p:cNvSpPr>
+            <a:spLocks noGrp="1"/>
+          </p:cNvSpPr>
+          <p:nvPr>
+            <p:ph type="title"/>
+          </p:nvPr>
+        </p:nvSpPr>
+        <p:spPr>
+          <a:xfrm>
+            <a:off x="0" y="404897"/>
+            <a:ext cx="12192000" cy="2947244"/>
+          </a:xfrm>
+          <a:noFill/>
+        </p:spPr>
+        <p:txBody>
+          <a:bodyPr anchor="ctr">
+            <a:normAutofit/>
+          </a:bodyPr>
+          <a:lstStyle/>
+          <a:p>
+            <a:pPr algn="ctr"/>
+            <a:r>
+              <a:rPr lang="en-US" sz="7200" b="1" dirty="0">
+                <a:solidFill>
+                  <a:schemeClr val="tx1"/>
+                </a:solidFill>
+                <a:latin typeface="Barlow Black" panose="00000A00000000000000" pitchFamily="2" charset="0"/>
+              </a:rPr>
+              <a:t>Chapter – </a:t>
+            </a:r>
+            <a:r>
+              <a:rPr lang="en-US" sz="7200" dirty="0">
+                <a:solidFill>
+                  <a:schemeClr val="tx1"/>
+                </a:solidFill>
+                <a:latin typeface="Bahnschrift SemiLight" pitchFamily="34" charset="0"/>
+              </a:rPr>
+              <a:t>23</a:t>
+            </a:r>
+            <a:br>
+              <a:rPr lang="en-US" sz="7200" b="1" dirty="0">
+                <a:solidFill>
+                  <a:schemeClr val="tx1"/>
+                </a:solidFill>
+                <a:latin typeface="Barlow Black" panose="00000A00000000000000" pitchFamily="2" charset="0"/>
+              </a:rPr>
+            </a:br>
+            <a:endParaRPr lang="en-IN" sz="4800" b="1" dirty="0">
+              <a:solidFill>
+                <a:schemeClr val="accent2">
+                  <a:lumMod val="60000"/>
+                  <a:lumOff val="40000"/>
+                </a:schemeClr>
+              </a:solidFill>
+              <a:latin typeface="Bahnschrift Light Condensed" pitchFamily="34" charset="0"/>
+            </a:endParaRPr>
+          </a:p>
+        </p:txBody>
+      </p:sp>
+      <p:sp>
+        <p:nvSpPr>
+          <p:cNvPr id="7" name="TextBox 6">
+            <a:extLst>
+              <a:ext uri="{FF2B5EF4-FFF2-40B4-BE49-F238E27FC236}">
+                <a16:creationId xmlns:a16="http://schemas.microsoft.com/office/drawing/2014/main" id="{59BB491E-E176-FFA9-1AA3-5D0867E3CC07}"/>
+              </a:ext>
+            </a:extLst>
+          </p:cNvPr>
+          <p:cNvSpPr txBox="1"/>
+          <p:nvPr/>
+        </p:nvSpPr>
+        <p:spPr>
+          <a:xfrm>
+            <a:off x="241300" y="228600"/>
+            <a:ext cx="2698175" cy="584775"/>
+          </a:xfrm>
+          <a:prstGeom prst="rect">
+            <a:avLst/>
+          </a:prstGeom>
+          <a:noFill/>
+        </p:spPr>
+        <p:txBody>
+          <a:bodyPr wrap="none" rtlCol="0">
+            <a:spAutoFit/>
+          </a:bodyPr>
+          <a:lstStyle/>
+          <a:p>
+            <a:r>
+              <a:rPr lang="en-US" sz="3200" b="1" dirty="0">
+                <a:latin typeface="Barlow Condensed ExtraLight" panose="00000306000000000000" pitchFamily="2" charset="0"/>
+              </a:rPr>
+              <a:t>JavaScript- </a:t>
+            </a:r>
+            <a:r>
+              <a:rPr lang="en-US" sz="3200" b="1" dirty="0">
+                <a:solidFill>
+                  <a:srgbClr val="FFFF00"/>
+                </a:solidFill>
+                <a:latin typeface="Bahnschrift SemiCondensed" panose="020B0502040204020203" pitchFamily="34" charset="0"/>
+              </a:rPr>
+              <a:t>Array</a:t>
+            </a:r>
+          </a:p>
+        </p:txBody>
+      </p:sp>
+      <p:sp>
+        <p:nvSpPr>
+          <p:cNvPr id="6" name="TextBox 5">
+            <a:extLst>
+              <a:ext uri="{FF2B5EF4-FFF2-40B4-BE49-F238E27FC236}">
+                <a16:creationId xmlns:a16="http://schemas.microsoft.com/office/drawing/2014/main" id="{948265D6-90D7-9622-405A-14E48A031C9B}"/>
+              </a:ext>
+            </a:extLst>
+          </p:cNvPr>
+          <p:cNvSpPr txBox="1"/>
+          <p:nvPr/>
+        </p:nvSpPr>
+        <p:spPr>
+          <a:xfrm>
+            <a:off x="9909313" y="1536494"/>
+            <a:ext cx="2195004" cy="646331"/>
+          </a:xfrm>
+          <a:prstGeom prst="rect">
+            <a:avLst/>
+          </a:prstGeom>
+          <a:noFill/>
+        </p:spPr>
+        <p:txBody>
+          <a:bodyPr wrap="square" rtlCol="0">
+            <a:spAutoFit/>
+          </a:bodyPr>
+          <a:lstStyle/>
+          <a:p>
+            <a:pPr algn="r"/>
+            <a:r>
+              <a:rPr lang="en-US" b="1" dirty="0"/>
+              <a:t>Gautam Kumar </a:t>
+            </a:r>
+            <a:br>
+              <a:rPr lang="en-US" b="1" dirty="0"/>
+            </a:br>
+            <a:r>
+              <a:rPr lang="en-US" b="1" dirty="0">
+                <a:solidFill>
+                  <a:schemeClr val="tx1">
+                    <a:lumMod val="65000"/>
+                  </a:schemeClr>
+                </a:solidFill>
+              </a:rPr>
+              <a:t>- </a:t>
+            </a:r>
+            <a:r>
+              <a:rPr lang="en-US" dirty="0">
+                <a:solidFill>
+                  <a:schemeClr val="tx1">
+                    <a:lumMod val="65000"/>
+                  </a:schemeClr>
+                </a:solidFill>
+              </a:rPr>
+              <a:t>uidhtml.com</a:t>
+            </a:r>
+            <a:endParaRPr lang="en-IN" dirty="0">
+              <a:solidFill>
+                <a:schemeClr val="tx1">
+                  <a:lumMod val="65000"/>
+                </a:schemeClr>
+              </a:solidFill>
+            </a:endParaRPr>
+          </a:p>
+        </p:txBody>
+      </p:sp>
+      <p:pic>
+        <p:nvPicPr>
+          <p:cNvPr id="11" name="Picture 3" descr="K:\github-repo\javascript-tutorials\tutorials\chapter-7-data-conversion\assets\images\javascript-logo.png">
+            <a:extLst>
+              <a:ext uri="{FF2B5EF4-FFF2-40B4-BE49-F238E27FC236}">
+                <a16:creationId xmlns:a16="http://schemas.microsoft.com/office/drawing/2014/main" id="{F07AF87D-0F26-4649-D5F9-7AD6358B4789}"/>
+              </a:ext>
+            </a:extLst>
+          </p:cNvPr>
+          <p:cNvPicPr>
+            <a:picLocks noChangeAspect="1" noChangeArrowheads="1"/>
+          </p:cNvPicPr>
+          <p:nvPr/>
+        </p:nvPicPr>
+        <p:blipFill>
+          <a:blip r:embed="rId3"/>
+          <a:srcRect/>
+          <a:stretch>
+            <a:fillRect/>
+          </a:stretch>
+        </p:blipFill>
+        <p:spPr bwMode="auto">
+          <a:xfrm>
+            <a:off x="10705134" y="143202"/>
+            <a:ext cx="1314450" cy="1314450"/>
+          </a:xfrm>
+          <a:prstGeom prst="rect">
+            <a:avLst/>
+          </a:prstGeom>
+          <a:noFill/>
+        </p:spPr>
+      </p:pic>
+      <p:sp>
+        <p:nvSpPr>
+          <p:cNvPr id="3" name="TextBox 2">
+            <a:extLst>
+              <a:ext uri="{FF2B5EF4-FFF2-40B4-BE49-F238E27FC236}">
+                <a16:creationId xmlns:a16="http://schemas.microsoft.com/office/drawing/2014/main" id="{4E9F73DF-08F9-C003-6149-040FBF501A0A}"/>
+              </a:ext>
+            </a:extLst>
+          </p:cNvPr>
+          <p:cNvSpPr txBox="1"/>
+          <p:nvPr/>
+        </p:nvSpPr>
+        <p:spPr>
+          <a:xfrm>
+            <a:off x="0" y="2828868"/>
+            <a:ext cx="12192000" cy="2123658"/>
+          </a:xfrm>
+          <a:prstGeom prst="rect">
+            <a:avLst/>
+          </a:prstGeom>
+          <a:noFill/>
+        </p:spPr>
+        <p:txBody>
+          <a:bodyPr wrap="square" rtlCol="0">
+            <a:spAutoFit/>
+          </a:bodyPr>
+          <a:lstStyle/>
+          <a:p>
+            <a:pPr algn="ctr"/>
+            <a:r>
+              <a:rPr lang="en-US" sz="8800" dirty="0">
+                <a:solidFill>
+                  <a:srgbClr val="FFFF00"/>
+                </a:solidFill>
+              </a:rPr>
+              <a:t>When to use</a:t>
+            </a:r>
+            <a:br>
+              <a:rPr lang="en-US" sz="4400" dirty="0">
+                <a:solidFill>
+                  <a:srgbClr val="FFFF00"/>
+                </a:solidFill>
+              </a:rPr>
+            </a:br>
+            <a:r>
+              <a:rPr lang="en-US" sz="4400" dirty="0">
+                <a:solidFill>
+                  <a:srgbClr val="FFFF00"/>
+                </a:solidFill>
+              </a:rPr>
+              <a:t>for(), </a:t>
+            </a:r>
+            <a:r>
+              <a:rPr lang="en-US" sz="4400" dirty="0" err="1">
+                <a:solidFill>
+                  <a:srgbClr val="FFFF00"/>
+                </a:solidFill>
+              </a:rPr>
+              <a:t>forEach</a:t>
+            </a:r>
+            <a:r>
+              <a:rPr lang="en-US" sz="4400" dirty="0">
+                <a:solidFill>
+                  <a:srgbClr val="FFFF00"/>
+                </a:solidFill>
+              </a:rPr>
+              <a:t>() and for-of() ? And why?</a:t>
+            </a:r>
+            <a:endParaRPr lang="en-IN" sz="4400" dirty="0"/>
+          </a:p>
+        </p:txBody>
+      </p:sp>
+      <p:sp>
+        <p:nvSpPr>
+          <p:cNvPr id="4" name="TextBox 3">
+            <a:extLst>
+              <a:ext uri="{FF2B5EF4-FFF2-40B4-BE49-F238E27FC236}">
+                <a16:creationId xmlns:a16="http://schemas.microsoft.com/office/drawing/2014/main" id="{7B6B7768-07C0-E8C0-73D9-DA7FE7C5BE4D}"/>
+              </a:ext>
+            </a:extLst>
+          </p:cNvPr>
+          <p:cNvSpPr txBox="1"/>
+          <p:nvPr/>
+        </p:nvSpPr>
+        <p:spPr>
+          <a:xfrm>
+            <a:off x="0" y="5162446"/>
+            <a:ext cx="12192000" cy="646331"/>
+          </a:xfrm>
+          <a:prstGeom prst="rect">
+            <a:avLst/>
+          </a:prstGeom>
+          <a:noFill/>
+        </p:spPr>
+        <p:txBody>
+          <a:bodyPr wrap="square" rtlCol="0">
+            <a:spAutoFit/>
+          </a:bodyPr>
+          <a:lstStyle/>
+          <a:p>
+            <a:pPr algn="ctr"/>
+            <a:r>
+              <a:rPr lang="en-US" sz="3600" dirty="0"/>
+              <a:t>Advantages and disadvantages</a:t>
+            </a:r>
+            <a:endParaRPr lang="en-IN" sz="3600" dirty="0"/>
+          </a:p>
+        </p:txBody>
+      </p:sp>
+    </p:spTree>
+    <p:extLst>
+      <p:ext uri="{BB962C8B-B14F-4D97-AF65-F5344CB8AC3E}">
+        <p14:creationId xmlns:p14="http://schemas.microsoft.com/office/powerpoint/2010/main" val="2886925765"/>
+      </p:ext>
+    </p:extLst>
+  </p:cSld>
+  <p:clrMapOvr>
+    <a:masterClrMapping/>
+  </p:clrMapOvr>
+</p:sld>
+</file>
+
+<file path=ppt/slides/slide74.xml><?xml version="1.0" encoding="utf-8"?>
+<p:sld xmlns:a="http://schemas.openxmlformats.org/drawingml/2006/main" xmlns:r="http://schemas.openxmlformats.org/officeDocument/2006/relationships" xmlns:p="http://schemas.openxmlformats.org/presentationml/2006/main">
+  <p:cSld>
+    <p:spTree>
+      <p:nvGrpSpPr>
+        <p:cNvPr id="1" name="">
+          <a:extLst>
+            <a:ext uri="{FF2B5EF4-FFF2-40B4-BE49-F238E27FC236}">
+              <a16:creationId xmlns:a16="http://schemas.microsoft.com/office/drawing/2014/main" id="{B2E458BC-717E-3F97-F936-139902C789AA}"/>
+            </a:ext>
+          </a:extLst>
+        </p:cNvPr>
+        <p:cNvGrpSpPr/>
+        <p:nvPr/>
+      </p:nvGrpSpPr>
+      <p:grpSpPr>
+        <a:xfrm>
+          <a:off x="0" y="0"/>
+          <a:ext cx="0" cy="0"/>
+          <a:chOff x="0" y="0"/>
+          <a:chExt cx="0" cy="0"/>
+        </a:xfrm>
+      </p:grpSpPr>
+      <p:sp>
+        <p:nvSpPr>
+          <p:cNvPr id="10" name="Rectangle 9">
+            <a:extLst>
+              <a:ext uri="{FF2B5EF4-FFF2-40B4-BE49-F238E27FC236}">
+                <a16:creationId xmlns:a16="http://schemas.microsoft.com/office/drawing/2014/main" id="{545F47AD-33A0-78B7-94A0-26AEA8202EDF}"/>
+              </a:ext>
+            </a:extLst>
+          </p:cNvPr>
+          <p:cNvSpPr/>
+          <p:nvPr/>
+        </p:nvSpPr>
+        <p:spPr>
+          <a:xfrm>
+            <a:off x="0" y="0"/>
+            <a:ext cx="12192000" cy="6858000"/>
+          </a:xfrm>
+          <a:prstGeom prst="rect">
+            <a:avLst/>
+          </a:prstGeom>
+          <a:solidFill>
+            <a:schemeClr val="bg2">
+              <a:lumMod val="50000"/>
+            </a:schemeClr>
+          </a:solidFill>
+          <a:ln>
+            <a:noFill/>
+          </a:ln>
+        </p:spPr>
+        <p:style>
+          <a:lnRef idx="2">
+            <a:schemeClr val="accent1">
+              <a:shade val="50000"/>
+            </a:schemeClr>
+          </a:lnRef>
+          <a:fillRef idx="1">
+            <a:schemeClr val="accent1"/>
+          </a:fillRef>
+          <a:effectRef idx="0">
+            <a:schemeClr val="accent1"/>
+          </a:effectRef>
+          <a:fontRef idx="minor">
+            <a:schemeClr val="lt1"/>
+          </a:fontRef>
+        </p:style>
+        <p:txBody>
+          <a:bodyPr rtlCol="0" anchor="ctr"/>
+          <a:lstStyle/>
+          <a:p>
+            <a:pPr algn="ctr"/>
+            <a:endParaRPr lang="en-US" dirty="0"/>
+          </a:p>
+        </p:txBody>
+      </p:sp>
+      <p:sp>
+        <p:nvSpPr>
+          <p:cNvPr id="9" name="Explosion: 14 Points 8">
+            <a:extLst>
+              <a:ext uri="{FF2B5EF4-FFF2-40B4-BE49-F238E27FC236}">
+                <a16:creationId xmlns:a16="http://schemas.microsoft.com/office/drawing/2014/main" id="{683AC2EC-EADB-261C-7CB3-91983BD88AE8}"/>
+              </a:ext>
+            </a:extLst>
+          </p:cNvPr>
+          <p:cNvSpPr/>
+          <p:nvPr/>
+        </p:nvSpPr>
+        <p:spPr>
+          <a:xfrm>
+            <a:off x="3893709" y="-646043"/>
+            <a:ext cx="3669087" cy="3707684"/>
+          </a:xfrm>
+          <a:prstGeom prst="irregularSeal2">
+            <a:avLst/>
+          </a:prstGeom>
+          <a:solidFill>
+            <a:schemeClr val="bg2">
+              <a:lumMod val="75000"/>
+            </a:schemeClr>
+          </a:solidFill>
+          <a:ln>
+            <a:noFill/>
+          </a:ln>
+        </p:spPr>
+        <p:style>
+          <a:lnRef idx="2">
+            <a:schemeClr val="accent1">
+              <a:shade val="15000"/>
+            </a:schemeClr>
+          </a:lnRef>
+          <a:fillRef idx="1">
+            <a:schemeClr val="accent1"/>
+          </a:fillRef>
+          <a:effectRef idx="0">
+            <a:schemeClr val="accent1"/>
+          </a:effectRef>
+          <a:fontRef idx="minor">
+            <a:schemeClr val="lt1"/>
+          </a:fontRef>
+        </p:style>
+        <p:txBody>
+          <a:bodyPr rtlCol="0" anchor="ctr"/>
+          <a:lstStyle/>
+          <a:p>
+            <a:pPr algn="ctr"/>
+            <a:endParaRPr lang="en-IN"/>
+          </a:p>
+        </p:txBody>
+      </p:sp>
+      <p:sp>
+        <p:nvSpPr>
+          <p:cNvPr id="2" name="Title 1">
+            <a:extLst>
+              <a:ext uri="{FF2B5EF4-FFF2-40B4-BE49-F238E27FC236}">
+                <a16:creationId xmlns:a16="http://schemas.microsoft.com/office/drawing/2014/main" id="{1FB99491-A935-C3D7-758E-418C00C2D020}"/>
+              </a:ext>
+            </a:extLst>
+          </p:cNvPr>
+          <p:cNvSpPr>
+            <a:spLocks noGrp="1"/>
+          </p:cNvSpPr>
+          <p:nvPr>
+            <p:ph type="title"/>
+          </p:nvPr>
+        </p:nvSpPr>
+        <p:spPr>
+          <a:xfrm>
+            <a:off x="0" y="404897"/>
+            <a:ext cx="12192000" cy="2947244"/>
+          </a:xfrm>
+          <a:noFill/>
+        </p:spPr>
+        <p:txBody>
+          <a:bodyPr anchor="ctr">
+            <a:normAutofit/>
+          </a:bodyPr>
+          <a:lstStyle/>
+          <a:p>
+            <a:pPr algn="ctr"/>
+            <a:r>
+              <a:rPr lang="en-US" sz="7200" b="1" dirty="0">
+                <a:solidFill>
+                  <a:schemeClr val="tx1"/>
+                </a:solidFill>
+                <a:latin typeface="Barlow Black" panose="00000A00000000000000" pitchFamily="2" charset="0"/>
+              </a:rPr>
+              <a:t>Chapter – </a:t>
+            </a:r>
+            <a:r>
+              <a:rPr lang="en-US" sz="7200" dirty="0">
+                <a:solidFill>
+                  <a:schemeClr val="tx1"/>
+                </a:solidFill>
+                <a:latin typeface="Bahnschrift SemiLight" pitchFamily="34" charset="0"/>
+              </a:rPr>
+              <a:t>21</a:t>
+            </a:r>
+            <a:br>
+              <a:rPr lang="en-US" sz="7200" b="1" dirty="0">
+                <a:solidFill>
+                  <a:schemeClr val="tx1"/>
+                </a:solidFill>
+                <a:latin typeface="Barlow Black" panose="00000A00000000000000" pitchFamily="2" charset="0"/>
+              </a:rPr>
+            </a:br>
+            <a:endParaRPr lang="en-IN" sz="4800" b="1" dirty="0">
+              <a:solidFill>
+                <a:schemeClr val="accent2">
+                  <a:lumMod val="60000"/>
+                  <a:lumOff val="40000"/>
+                </a:schemeClr>
+              </a:solidFill>
+              <a:latin typeface="Bahnschrift Light Condensed" pitchFamily="34" charset="0"/>
+            </a:endParaRPr>
+          </a:p>
+        </p:txBody>
+      </p:sp>
+      <p:sp>
+        <p:nvSpPr>
+          <p:cNvPr id="7" name="TextBox 6">
+            <a:extLst>
+              <a:ext uri="{FF2B5EF4-FFF2-40B4-BE49-F238E27FC236}">
+                <a16:creationId xmlns:a16="http://schemas.microsoft.com/office/drawing/2014/main" id="{640427C0-FEB7-22BB-2EA8-EEB7C88410BF}"/>
+              </a:ext>
+            </a:extLst>
+          </p:cNvPr>
+          <p:cNvSpPr txBox="1"/>
+          <p:nvPr/>
+        </p:nvSpPr>
+        <p:spPr>
+          <a:xfrm>
+            <a:off x="241300" y="228600"/>
+            <a:ext cx="2698175" cy="584775"/>
+          </a:xfrm>
+          <a:prstGeom prst="rect">
+            <a:avLst/>
+          </a:prstGeom>
+          <a:noFill/>
+        </p:spPr>
+        <p:txBody>
+          <a:bodyPr wrap="none" rtlCol="0">
+            <a:spAutoFit/>
+          </a:bodyPr>
+          <a:lstStyle/>
+          <a:p>
+            <a:r>
+              <a:rPr lang="en-US" sz="3200" b="1" dirty="0">
+                <a:latin typeface="Barlow Condensed ExtraLight" panose="00000306000000000000" pitchFamily="2" charset="0"/>
+              </a:rPr>
+              <a:t>JavaScript- </a:t>
+            </a:r>
+            <a:r>
+              <a:rPr lang="en-US" sz="3200" b="1" dirty="0">
+                <a:solidFill>
+                  <a:srgbClr val="FFFF00"/>
+                </a:solidFill>
+                <a:latin typeface="Bahnschrift SemiCondensed" panose="020B0502040204020203" pitchFamily="34" charset="0"/>
+              </a:rPr>
+              <a:t>Array</a:t>
+            </a:r>
+          </a:p>
+        </p:txBody>
+      </p:sp>
+      <p:sp>
+        <p:nvSpPr>
+          <p:cNvPr id="6" name="TextBox 5">
+            <a:extLst>
+              <a:ext uri="{FF2B5EF4-FFF2-40B4-BE49-F238E27FC236}">
+                <a16:creationId xmlns:a16="http://schemas.microsoft.com/office/drawing/2014/main" id="{2CBEA432-9C0A-3346-51DC-C52A06E373A5}"/>
+              </a:ext>
+            </a:extLst>
+          </p:cNvPr>
+          <p:cNvSpPr txBox="1"/>
+          <p:nvPr/>
+        </p:nvSpPr>
+        <p:spPr>
+          <a:xfrm>
+            <a:off x="9909313" y="1536494"/>
+            <a:ext cx="2195004" cy="646331"/>
+          </a:xfrm>
+          <a:prstGeom prst="rect">
+            <a:avLst/>
+          </a:prstGeom>
+          <a:noFill/>
+        </p:spPr>
+        <p:txBody>
+          <a:bodyPr wrap="square" rtlCol="0">
+            <a:spAutoFit/>
+          </a:bodyPr>
+          <a:lstStyle/>
+          <a:p>
+            <a:pPr algn="r"/>
+            <a:r>
+              <a:rPr lang="en-US" b="1" dirty="0"/>
+              <a:t>Gautam Kumar </a:t>
+            </a:r>
+            <a:br>
+              <a:rPr lang="en-US" b="1" dirty="0"/>
+            </a:br>
+            <a:r>
+              <a:rPr lang="en-US" b="1" dirty="0">
+                <a:solidFill>
+                  <a:schemeClr val="tx1">
+                    <a:lumMod val="65000"/>
+                  </a:schemeClr>
+                </a:solidFill>
+              </a:rPr>
+              <a:t>- </a:t>
+            </a:r>
+            <a:r>
+              <a:rPr lang="en-US" dirty="0">
+                <a:solidFill>
+                  <a:schemeClr val="tx1">
+                    <a:lumMod val="65000"/>
+                  </a:schemeClr>
+                </a:solidFill>
+              </a:rPr>
+              <a:t>uidhtml.com</a:t>
+            </a:r>
+            <a:endParaRPr lang="en-IN" dirty="0">
+              <a:solidFill>
+                <a:schemeClr val="tx1">
+                  <a:lumMod val="65000"/>
+                </a:schemeClr>
+              </a:solidFill>
+            </a:endParaRPr>
+          </a:p>
+        </p:txBody>
+      </p:sp>
+      <p:pic>
+        <p:nvPicPr>
+          <p:cNvPr id="11" name="Picture 3" descr="K:\github-repo\javascript-tutorials\tutorials\chapter-7-data-conversion\assets\images\javascript-logo.png">
+            <a:extLst>
+              <a:ext uri="{FF2B5EF4-FFF2-40B4-BE49-F238E27FC236}">
+                <a16:creationId xmlns:a16="http://schemas.microsoft.com/office/drawing/2014/main" id="{EF8531E1-8C45-EA0C-079E-C785B580EBCB}"/>
+              </a:ext>
+            </a:extLst>
+          </p:cNvPr>
+          <p:cNvPicPr>
+            <a:picLocks noChangeAspect="1" noChangeArrowheads="1"/>
+          </p:cNvPicPr>
+          <p:nvPr/>
+        </p:nvPicPr>
+        <p:blipFill>
+          <a:blip r:embed="rId3"/>
+          <a:srcRect/>
+          <a:stretch>
+            <a:fillRect/>
+          </a:stretch>
+        </p:blipFill>
+        <p:spPr bwMode="auto">
+          <a:xfrm>
+            <a:off x="10705134" y="143202"/>
+            <a:ext cx="1314450" cy="1314450"/>
+          </a:xfrm>
+          <a:prstGeom prst="rect">
+            <a:avLst/>
+          </a:prstGeom>
+          <a:noFill/>
+        </p:spPr>
+      </p:pic>
+      <p:sp>
+        <p:nvSpPr>
+          <p:cNvPr id="3" name="TextBox 2">
+            <a:extLst>
+              <a:ext uri="{FF2B5EF4-FFF2-40B4-BE49-F238E27FC236}">
+                <a16:creationId xmlns:a16="http://schemas.microsoft.com/office/drawing/2014/main" id="{FE0CFF09-13EA-EF79-BCA0-5C8D9E455F9A}"/>
+              </a:ext>
+            </a:extLst>
+          </p:cNvPr>
+          <p:cNvSpPr txBox="1"/>
+          <p:nvPr/>
+        </p:nvSpPr>
+        <p:spPr>
+          <a:xfrm>
+            <a:off x="0" y="2828868"/>
+            <a:ext cx="12192000" cy="1446550"/>
+          </a:xfrm>
+          <a:prstGeom prst="rect">
+            <a:avLst/>
+          </a:prstGeom>
+          <a:noFill/>
+        </p:spPr>
+        <p:txBody>
+          <a:bodyPr wrap="square" rtlCol="0">
+            <a:spAutoFit/>
+          </a:bodyPr>
+          <a:lstStyle/>
+          <a:p>
+            <a:pPr algn="ctr"/>
+            <a:r>
+              <a:rPr lang="en-US" sz="8800" dirty="0">
+                <a:solidFill>
+                  <a:srgbClr val="FFFF00"/>
+                </a:solidFill>
+              </a:rPr>
+              <a:t>map()</a:t>
+            </a:r>
+            <a:endParaRPr lang="en-IN" sz="8800" dirty="0"/>
+          </a:p>
+        </p:txBody>
+      </p:sp>
+      <p:sp>
+        <p:nvSpPr>
+          <p:cNvPr id="4" name="TextBox 3">
+            <a:extLst>
+              <a:ext uri="{FF2B5EF4-FFF2-40B4-BE49-F238E27FC236}">
+                <a16:creationId xmlns:a16="http://schemas.microsoft.com/office/drawing/2014/main" id="{F38A18B2-9D78-75F5-87BB-3BD5996381EA}"/>
+              </a:ext>
+            </a:extLst>
+          </p:cNvPr>
+          <p:cNvSpPr txBox="1"/>
+          <p:nvPr/>
+        </p:nvSpPr>
+        <p:spPr>
+          <a:xfrm>
+            <a:off x="0" y="4575783"/>
+            <a:ext cx="12192000" cy="646331"/>
+          </a:xfrm>
+          <a:prstGeom prst="rect">
+            <a:avLst/>
+          </a:prstGeom>
+          <a:noFill/>
+        </p:spPr>
+        <p:txBody>
+          <a:bodyPr wrap="square" rtlCol="0">
+            <a:spAutoFit/>
+          </a:bodyPr>
+          <a:lstStyle/>
+          <a:p>
+            <a:pPr algn="ctr"/>
+            <a:r>
+              <a:rPr lang="en-US" sz="3600" dirty="0"/>
+              <a:t>Returns a new array after loop completion</a:t>
+            </a:r>
+            <a:endParaRPr lang="en-IN" sz="3600" dirty="0"/>
+          </a:p>
+        </p:txBody>
+      </p:sp>
+    </p:spTree>
+    <p:extLst>
+      <p:ext uri="{BB962C8B-B14F-4D97-AF65-F5344CB8AC3E}">
+        <p14:creationId xmlns:p14="http://schemas.microsoft.com/office/powerpoint/2010/main" val="3462606748"/>
+      </p:ext>
+    </p:extLst>
+  </p:cSld>
+  <p:clrMapOvr>
+    <a:masterClrMapping/>
+  </p:clrMapOvr>
+</p:sld>
+</file>
+
+<file path=ppt/slides/slide75.xml><?xml version="1.0" encoding="utf-8"?>
+<p:sld xmlns:a="http://schemas.openxmlformats.org/drawingml/2006/main" xmlns:r="http://schemas.openxmlformats.org/officeDocument/2006/relationships" xmlns:p="http://schemas.openxmlformats.org/presentationml/2006/main">
+  <p:cSld>
+    <p:spTree>
+      <p:nvGrpSpPr>
+        <p:cNvPr id="1" name="">
+          <a:extLst>
+            <a:ext uri="{FF2B5EF4-FFF2-40B4-BE49-F238E27FC236}">
+              <a16:creationId xmlns:a16="http://schemas.microsoft.com/office/drawing/2014/main" id="{F43A0963-A2EF-A455-EFBE-D630C5989145}"/>
+            </a:ext>
+          </a:extLst>
+        </p:cNvPr>
+        <p:cNvGrpSpPr/>
+        <p:nvPr/>
+      </p:nvGrpSpPr>
+      <p:grpSpPr>
+        <a:xfrm>
+          <a:off x="0" y="0"/>
+          <a:ext cx="0" cy="0"/>
+          <a:chOff x="0" y="0"/>
+          <a:chExt cx="0" cy="0"/>
+        </a:xfrm>
+      </p:grpSpPr>
+      <p:sp>
+        <p:nvSpPr>
+          <p:cNvPr id="10" name="Rectangle 9">
+            <a:extLst>
+              <a:ext uri="{FF2B5EF4-FFF2-40B4-BE49-F238E27FC236}">
+                <a16:creationId xmlns:a16="http://schemas.microsoft.com/office/drawing/2014/main" id="{B62942F8-D479-D991-17EB-6D64C7C3D644}"/>
+              </a:ext>
+            </a:extLst>
+          </p:cNvPr>
+          <p:cNvSpPr/>
+          <p:nvPr/>
+        </p:nvSpPr>
+        <p:spPr>
+          <a:xfrm>
+            <a:off x="0" y="0"/>
+            <a:ext cx="12192000" cy="6858000"/>
+          </a:xfrm>
+          <a:prstGeom prst="rect">
+            <a:avLst/>
+          </a:prstGeom>
+          <a:solidFill>
+            <a:schemeClr val="bg2">
+              <a:lumMod val="50000"/>
+            </a:schemeClr>
+          </a:solidFill>
+          <a:ln>
+            <a:noFill/>
+          </a:ln>
+        </p:spPr>
+        <p:style>
+          <a:lnRef idx="2">
+            <a:schemeClr val="accent1">
+              <a:shade val="50000"/>
+            </a:schemeClr>
+          </a:lnRef>
+          <a:fillRef idx="1">
+            <a:schemeClr val="accent1"/>
+          </a:fillRef>
+          <a:effectRef idx="0">
+            <a:schemeClr val="accent1"/>
+          </a:effectRef>
+          <a:fontRef idx="minor">
+            <a:schemeClr val="lt1"/>
+          </a:fontRef>
+        </p:style>
+        <p:txBody>
+          <a:bodyPr rtlCol="0" anchor="ctr"/>
+          <a:lstStyle/>
+          <a:p>
+            <a:pPr algn="ctr"/>
+            <a:endParaRPr lang="en-US" dirty="0"/>
+          </a:p>
+        </p:txBody>
+      </p:sp>
+      <p:sp>
+        <p:nvSpPr>
+          <p:cNvPr id="9" name="Explosion: 14 Points 8">
+            <a:extLst>
+              <a:ext uri="{FF2B5EF4-FFF2-40B4-BE49-F238E27FC236}">
+                <a16:creationId xmlns:a16="http://schemas.microsoft.com/office/drawing/2014/main" id="{E8894949-6923-ED64-B070-F050523AF15A}"/>
+              </a:ext>
+            </a:extLst>
+          </p:cNvPr>
+          <p:cNvSpPr/>
+          <p:nvPr/>
+        </p:nvSpPr>
+        <p:spPr>
+          <a:xfrm>
+            <a:off x="3893709" y="-646043"/>
+            <a:ext cx="3669087" cy="3707684"/>
+          </a:xfrm>
+          <a:prstGeom prst="irregularSeal2">
+            <a:avLst/>
+          </a:prstGeom>
+          <a:solidFill>
+            <a:schemeClr val="bg2">
+              <a:lumMod val="75000"/>
+            </a:schemeClr>
+          </a:solidFill>
+          <a:ln>
+            <a:noFill/>
+          </a:ln>
+        </p:spPr>
+        <p:style>
+          <a:lnRef idx="2">
+            <a:schemeClr val="accent1">
+              <a:shade val="15000"/>
+            </a:schemeClr>
+          </a:lnRef>
+          <a:fillRef idx="1">
+            <a:schemeClr val="accent1"/>
+          </a:fillRef>
+          <a:effectRef idx="0">
+            <a:schemeClr val="accent1"/>
+          </a:effectRef>
+          <a:fontRef idx="minor">
+            <a:schemeClr val="lt1"/>
+          </a:fontRef>
+        </p:style>
+        <p:txBody>
+          <a:bodyPr rtlCol="0" anchor="ctr"/>
+          <a:lstStyle/>
+          <a:p>
+            <a:pPr algn="ctr"/>
+            <a:endParaRPr lang="en-IN"/>
+          </a:p>
+        </p:txBody>
+      </p:sp>
+      <p:sp>
+        <p:nvSpPr>
+          <p:cNvPr id="2" name="Title 1">
+            <a:extLst>
+              <a:ext uri="{FF2B5EF4-FFF2-40B4-BE49-F238E27FC236}">
+                <a16:creationId xmlns:a16="http://schemas.microsoft.com/office/drawing/2014/main" id="{986B25A1-A9E0-4C9E-CB0A-E3DE13584C53}"/>
+              </a:ext>
+            </a:extLst>
+          </p:cNvPr>
+          <p:cNvSpPr>
+            <a:spLocks noGrp="1"/>
+          </p:cNvSpPr>
+          <p:nvPr>
+            <p:ph type="title"/>
+          </p:nvPr>
+        </p:nvSpPr>
+        <p:spPr>
+          <a:xfrm>
+            <a:off x="0" y="404897"/>
+            <a:ext cx="12192000" cy="2947244"/>
+          </a:xfrm>
+          <a:noFill/>
+        </p:spPr>
+        <p:txBody>
+          <a:bodyPr anchor="ctr">
+            <a:normAutofit/>
+          </a:bodyPr>
+          <a:lstStyle/>
+          <a:p>
+            <a:pPr algn="ctr"/>
+            <a:r>
+              <a:rPr lang="en-US" sz="7200" b="1" dirty="0">
+                <a:solidFill>
+                  <a:schemeClr val="tx1"/>
+                </a:solidFill>
+                <a:latin typeface="Barlow Black" panose="00000A00000000000000" pitchFamily="2" charset="0"/>
+              </a:rPr>
+              <a:t>Chapter – </a:t>
+            </a:r>
+            <a:r>
+              <a:rPr lang="en-US" sz="7200" dirty="0">
+                <a:solidFill>
+                  <a:schemeClr val="tx1"/>
+                </a:solidFill>
+                <a:latin typeface="Bahnschrift SemiLight" pitchFamily="34" charset="0"/>
+              </a:rPr>
+              <a:t>21</a:t>
+            </a:r>
+            <a:br>
+              <a:rPr lang="en-US" sz="7200" b="1" dirty="0">
+                <a:solidFill>
+                  <a:schemeClr val="tx1"/>
+                </a:solidFill>
+                <a:latin typeface="Barlow Black" panose="00000A00000000000000" pitchFamily="2" charset="0"/>
+              </a:rPr>
+            </a:br>
+            <a:endParaRPr lang="en-IN" sz="4800" b="1" dirty="0">
+              <a:solidFill>
+                <a:schemeClr val="accent2">
+                  <a:lumMod val="60000"/>
+                  <a:lumOff val="40000"/>
+                </a:schemeClr>
+              </a:solidFill>
+              <a:latin typeface="Bahnschrift Light Condensed" pitchFamily="34" charset="0"/>
+            </a:endParaRPr>
+          </a:p>
+        </p:txBody>
+      </p:sp>
+      <p:sp>
+        <p:nvSpPr>
+          <p:cNvPr id="7" name="TextBox 6">
+            <a:extLst>
+              <a:ext uri="{FF2B5EF4-FFF2-40B4-BE49-F238E27FC236}">
+                <a16:creationId xmlns:a16="http://schemas.microsoft.com/office/drawing/2014/main" id="{BD0062E6-A3F2-A2E0-BB7E-8C5187F141FB}"/>
+              </a:ext>
+            </a:extLst>
+          </p:cNvPr>
+          <p:cNvSpPr txBox="1"/>
+          <p:nvPr/>
+        </p:nvSpPr>
+        <p:spPr>
+          <a:xfrm>
+            <a:off x="241300" y="228600"/>
+            <a:ext cx="2698175" cy="584775"/>
+          </a:xfrm>
+          <a:prstGeom prst="rect">
+            <a:avLst/>
+          </a:prstGeom>
+          <a:noFill/>
+        </p:spPr>
+        <p:txBody>
+          <a:bodyPr wrap="none" rtlCol="0">
+            <a:spAutoFit/>
+          </a:bodyPr>
+          <a:lstStyle/>
+          <a:p>
+            <a:r>
+              <a:rPr lang="en-US" sz="3200" b="1" dirty="0">
+                <a:latin typeface="Barlow Condensed ExtraLight" panose="00000306000000000000" pitchFamily="2" charset="0"/>
+              </a:rPr>
+              <a:t>JavaScript- </a:t>
+            </a:r>
+            <a:r>
+              <a:rPr lang="en-US" sz="3200" b="1" dirty="0">
+                <a:solidFill>
+                  <a:srgbClr val="FFFF00"/>
+                </a:solidFill>
+                <a:latin typeface="Bahnschrift SemiCondensed" panose="020B0502040204020203" pitchFamily="34" charset="0"/>
+              </a:rPr>
+              <a:t>Array</a:t>
+            </a:r>
+          </a:p>
+        </p:txBody>
+      </p:sp>
+      <p:sp>
+        <p:nvSpPr>
+          <p:cNvPr id="6" name="TextBox 5">
+            <a:extLst>
+              <a:ext uri="{FF2B5EF4-FFF2-40B4-BE49-F238E27FC236}">
+                <a16:creationId xmlns:a16="http://schemas.microsoft.com/office/drawing/2014/main" id="{E6B90513-B3C0-4881-3271-65BD2980EDB4}"/>
+              </a:ext>
+            </a:extLst>
+          </p:cNvPr>
+          <p:cNvSpPr txBox="1"/>
+          <p:nvPr/>
+        </p:nvSpPr>
+        <p:spPr>
+          <a:xfrm>
+            <a:off x="9909313" y="1536494"/>
+            <a:ext cx="2195004" cy="646331"/>
+          </a:xfrm>
+          <a:prstGeom prst="rect">
+            <a:avLst/>
+          </a:prstGeom>
+          <a:noFill/>
+        </p:spPr>
+        <p:txBody>
+          <a:bodyPr wrap="square" rtlCol="0">
+            <a:spAutoFit/>
+          </a:bodyPr>
+          <a:lstStyle/>
+          <a:p>
+            <a:pPr algn="r"/>
+            <a:r>
+              <a:rPr lang="en-US" b="1" dirty="0"/>
+              <a:t>Gautam Kumar </a:t>
+            </a:r>
+            <a:br>
+              <a:rPr lang="en-US" b="1" dirty="0"/>
+            </a:br>
+            <a:r>
+              <a:rPr lang="en-US" b="1" dirty="0">
+                <a:solidFill>
+                  <a:schemeClr val="tx1">
+                    <a:lumMod val="65000"/>
+                  </a:schemeClr>
+                </a:solidFill>
+              </a:rPr>
+              <a:t>- </a:t>
+            </a:r>
+            <a:r>
+              <a:rPr lang="en-US" dirty="0">
+                <a:solidFill>
+                  <a:schemeClr val="tx1">
+                    <a:lumMod val="65000"/>
+                  </a:schemeClr>
+                </a:solidFill>
+              </a:rPr>
+              <a:t>uidhtml.com</a:t>
+            </a:r>
+            <a:endParaRPr lang="en-IN" dirty="0">
+              <a:solidFill>
+                <a:schemeClr val="tx1">
+                  <a:lumMod val="65000"/>
+                </a:schemeClr>
+              </a:solidFill>
+            </a:endParaRPr>
+          </a:p>
+        </p:txBody>
+      </p:sp>
+      <p:pic>
+        <p:nvPicPr>
+          <p:cNvPr id="11" name="Picture 3" descr="K:\github-repo\javascript-tutorials\tutorials\chapter-7-data-conversion\assets\images\javascript-logo.png">
+            <a:extLst>
+              <a:ext uri="{FF2B5EF4-FFF2-40B4-BE49-F238E27FC236}">
+                <a16:creationId xmlns:a16="http://schemas.microsoft.com/office/drawing/2014/main" id="{3AB573A2-69FB-C690-19E3-6B8AC2F67A69}"/>
+              </a:ext>
+            </a:extLst>
+          </p:cNvPr>
+          <p:cNvPicPr>
+            <a:picLocks noChangeAspect="1" noChangeArrowheads="1"/>
+          </p:cNvPicPr>
+          <p:nvPr/>
+        </p:nvPicPr>
+        <p:blipFill>
+          <a:blip r:embed="rId3"/>
+          <a:srcRect/>
+          <a:stretch>
+            <a:fillRect/>
+          </a:stretch>
+        </p:blipFill>
+        <p:spPr bwMode="auto">
+          <a:xfrm>
+            <a:off x="10705134" y="143202"/>
+            <a:ext cx="1314450" cy="1314450"/>
+          </a:xfrm>
+          <a:prstGeom prst="rect">
+            <a:avLst/>
+          </a:prstGeom>
+          <a:noFill/>
+        </p:spPr>
+      </p:pic>
+      <p:sp>
+        <p:nvSpPr>
+          <p:cNvPr id="3" name="TextBox 2">
+            <a:extLst>
+              <a:ext uri="{FF2B5EF4-FFF2-40B4-BE49-F238E27FC236}">
+                <a16:creationId xmlns:a16="http://schemas.microsoft.com/office/drawing/2014/main" id="{5C177AD7-29E4-41B2-70BC-F53E6D0C0890}"/>
+              </a:ext>
+            </a:extLst>
+          </p:cNvPr>
+          <p:cNvSpPr txBox="1"/>
+          <p:nvPr/>
+        </p:nvSpPr>
+        <p:spPr>
+          <a:xfrm>
+            <a:off x="0" y="2828868"/>
+            <a:ext cx="12192000" cy="1446550"/>
+          </a:xfrm>
+          <a:prstGeom prst="rect">
+            <a:avLst/>
+          </a:prstGeom>
+          <a:noFill/>
+        </p:spPr>
+        <p:txBody>
+          <a:bodyPr wrap="square" rtlCol="0">
+            <a:spAutoFit/>
+          </a:bodyPr>
+          <a:lstStyle/>
+          <a:p>
+            <a:pPr algn="ctr"/>
+            <a:r>
+              <a:rPr lang="en-US" sz="8800" dirty="0">
+                <a:solidFill>
+                  <a:srgbClr val="FFFF00"/>
+                </a:solidFill>
+              </a:rPr>
+              <a:t>Push()</a:t>
+            </a:r>
+            <a:endParaRPr lang="en-IN" sz="8800" dirty="0"/>
+          </a:p>
+        </p:txBody>
+      </p:sp>
+      <p:sp>
+        <p:nvSpPr>
+          <p:cNvPr id="4" name="TextBox 3">
+            <a:extLst>
+              <a:ext uri="{FF2B5EF4-FFF2-40B4-BE49-F238E27FC236}">
+                <a16:creationId xmlns:a16="http://schemas.microsoft.com/office/drawing/2014/main" id="{A7704300-36D4-2B28-7983-3B1768B40F89}"/>
+              </a:ext>
+            </a:extLst>
+          </p:cNvPr>
+          <p:cNvSpPr txBox="1"/>
+          <p:nvPr/>
+        </p:nvSpPr>
+        <p:spPr>
+          <a:xfrm>
+            <a:off x="0" y="4575783"/>
+            <a:ext cx="12192000" cy="646331"/>
+          </a:xfrm>
+          <a:prstGeom prst="rect">
+            <a:avLst/>
+          </a:prstGeom>
+          <a:noFill/>
+        </p:spPr>
+        <p:txBody>
+          <a:bodyPr wrap="square" rtlCol="0">
+            <a:spAutoFit/>
+          </a:bodyPr>
+          <a:lstStyle/>
+          <a:p>
+            <a:pPr algn="ctr"/>
+            <a:r>
+              <a:rPr lang="en-US" sz="3600" dirty="0"/>
+              <a:t>Add an element at the end of array</a:t>
+            </a:r>
+            <a:endParaRPr lang="en-IN" sz="3600" dirty="0"/>
+          </a:p>
+        </p:txBody>
+      </p:sp>
+    </p:spTree>
+    <p:extLst>
+      <p:ext uri="{BB962C8B-B14F-4D97-AF65-F5344CB8AC3E}">
+        <p14:creationId xmlns:p14="http://schemas.microsoft.com/office/powerpoint/2010/main" val="1072574044"/>
+      </p:ext>
+    </p:extLst>
+  </p:cSld>
+  <p:clrMapOvr>
+    <a:masterClrMapping/>
+  </p:clrMapOvr>
+</p:sld>
+</file>
+
+<file path=ppt/slides/slide76.xml><?xml version="1.0" encoding="utf-8"?>
 <p:sld xmlns:a="http://schemas.openxmlformats.org/drawingml/2006/main" xmlns:r="http://schemas.openxmlformats.org/officeDocument/2006/relationships" xmlns:p="http://schemas.openxmlformats.org/presentationml/2006/main">
   <p:cSld>
     <p:spTree>
@@ -46752,7 +48891,7 @@
 </p:sld>
 </file>
 
-<file path=ppt/slides/slide73.xml><?xml version="1.0" encoding="utf-8"?>
+<file path=ppt/slides/slide77.xml><?xml version="1.0" encoding="utf-8"?>
 <p:sld xmlns:a="http://schemas.openxmlformats.org/drawingml/2006/main" xmlns:r="http://schemas.openxmlformats.org/officeDocument/2006/relationships" xmlns:p="http://schemas.openxmlformats.org/presentationml/2006/main">
   <p:cSld>
     <p:spTree>
@@ -47193,7 +49332,7 @@
 </p:sld>
 </file>
 
-<file path=ppt/slides/slide74.xml><?xml version="1.0" encoding="utf-8"?>
+<file path=ppt/slides/slide78.xml><?xml version="1.0" encoding="utf-8"?>
 <p:sld xmlns:a="http://schemas.openxmlformats.org/drawingml/2006/main" xmlns:r="http://schemas.openxmlformats.org/officeDocument/2006/relationships" xmlns:p="http://schemas.openxmlformats.org/presentationml/2006/main">
   <p:cSld>
     <p:spTree>
@@ -47631,7 +49770,7 @@
 </p:sld>
 </file>
 
-<file path=ppt/slides/slide75.xml><?xml version="1.0" encoding="utf-8"?>
+<file path=ppt/slides/slide79.xml><?xml version="1.0" encoding="utf-8"?>
 <p:sld xmlns:a="http://schemas.openxmlformats.org/drawingml/2006/main" xmlns:r="http://schemas.openxmlformats.org/officeDocument/2006/relationships" xmlns:p="http://schemas.openxmlformats.org/presentationml/2006/main">
   <p:cSld>
     <p:spTree>

</xml_diff>

<commit_message>
Added chapter 27 and 28
</commit_message>
<xml_diff>
--- a/Javascript Tutorials.pptx
+++ b/Javascript Tutorials.pptx
@@ -294,7 +294,7 @@
             <a:fld id="{792F6C33-F1A2-419B-BA2F-6679E9D9EF00}" type="datetimeFigureOut">
               <a:rPr lang="en-US" smtClean="0"/>
               <a:pPr/>
-              <a:t>10/17/2025</a:t>
+              <a:t>10/30/2025</a:t>
             </a:fld>
             <a:endParaRPr lang="en-US"/>
           </a:p>
@@ -7273,7 +7273,7 @@
             <a:fld id="{48A87A34-81AB-432B-8DAE-1953F412C126}" type="datetimeFigureOut">
               <a:rPr lang="en-US" smtClean="0"/>
               <a:pPr/>
-              <a:t>10/17/2025</a:t>
+              <a:t>10/30/2025</a:t>
             </a:fld>
             <a:endParaRPr lang="en-US" dirty="0"/>
           </a:p>
@@ -7526,7 +7526,7 @@
             <a:fld id="{48A87A34-81AB-432B-8DAE-1953F412C126}" type="datetimeFigureOut">
               <a:rPr lang="en-US" smtClean="0"/>
               <a:pPr/>
-              <a:t>10/17/2025</a:t>
+              <a:t>10/30/2025</a:t>
             </a:fld>
             <a:endParaRPr lang="en-US" dirty="0"/>
           </a:p>
@@ -7842,7 +7842,7 @@
             <a:fld id="{48A87A34-81AB-432B-8DAE-1953F412C126}" type="datetimeFigureOut">
               <a:rPr lang="en-US" smtClean="0"/>
               <a:pPr/>
-              <a:t>10/17/2025</a:t>
+              <a:t>10/30/2025</a:t>
             </a:fld>
             <a:endParaRPr lang="en-US" dirty="0"/>
           </a:p>
@@ -8171,7 +8171,7 @@
             <a:fld id="{48A87A34-81AB-432B-8DAE-1953F412C126}" type="datetimeFigureOut">
               <a:rPr lang="en-US" smtClean="0"/>
               <a:pPr/>
-              <a:t>10/17/2025</a:t>
+              <a:t>10/30/2025</a:t>
             </a:fld>
             <a:endParaRPr lang="en-US" dirty="0"/>
           </a:p>
@@ -8487,7 +8487,7 @@
             <a:fld id="{48A87A34-81AB-432B-8DAE-1953F412C126}" type="datetimeFigureOut">
               <a:rPr lang="en-US" smtClean="0"/>
               <a:pPr/>
-              <a:t>10/17/2025</a:t>
+              <a:t>10/30/2025</a:t>
             </a:fld>
             <a:endParaRPr lang="en-US" dirty="0"/>
           </a:p>
@@ -8876,7 +8876,7 @@
             <a:fld id="{48A87A34-81AB-432B-8DAE-1953F412C126}" type="datetimeFigureOut">
               <a:rPr lang="en-US" smtClean="0"/>
               <a:pPr/>
-              <a:t>10/17/2025</a:t>
+              <a:t>10/30/2025</a:t>
             </a:fld>
             <a:endParaRPr lang="en-US" dirty="0"/>
           </a:p>
@@ -9048,7 +9048,7 @@
             <a:fld id="{48A87A34-81AB-432B-8DAE-1953F412C126}" type="datetimeFigureOut">
               <a:rPr lang="en-US" smtClean="0"/>
               <a:pPr/>
-              <a:t>10/17/2025</a:t>
+              <a:t>10/30/2025</a:t>
             </a:fld>
             <a:endParaRPr lang="en-US" dirty="0"/>
           </a:p>
@@ -9230,7 +9230,7 @@
             <a:fld id="{48A87A34-81AB-432B-8DAE-1953F412C126}" type="datetimeFigureOut">
               <a:rPr lang="en-US" smtClean="0"/>
               <a:pPr/>
-              <a:t>10/17/2025</a:t>
+              <a:t>10/30/2025</a:t>
             </a:fld>
             <a:endParaRPr lang="en-US" dirty="0"/>
           </a:p>
@@ -9408,7 +9408,7 @@
             <a:fld id="{48A87A34-81AB-432B-8DAE-1953F412C126}" type="datetimeFigureOut">
               <a:rPr lang="en-US" smtClean="0"/>
               <a:pPr/>
-              <a:t>10/17/2025</a:t>
+              <a:t>10/30/2025</a:t>
             </a:fld>
             <a:endParaRPr lang="en-US" dirty="0"/>
           </a:p>
@@ -9657,7 +9657,7 @@
             <a:fld id="{48A87A34-81AB-432B-8DAE-1953F412C126}" type="datetimeFigureOut">
               <a:rPr lang="en-US" smtClean="0"/>
               <a:pPr/>
-              <a:t>10/17/2025</a:t>
+              <a:t>10/30/2025</a:t>
             </a:fld>
             <a:endParaRPr lang="en-US" dirty="0"/>
           </a:p>
@@ -9891,7 +9891,7 @@
             <a:fld id="{48A87A34-81AB-432B-8DAE-1953F412C126}" type="datetimeFigureOut">
               <a:rPr lang="en-US" smtClean="0"/>
               <a:pPr/>
-              <a:t>10/17/2025</a:t>
+              <a:t>10/30/2025</a:t>
             </a:fld>
             <a:endParaRPr lang="en-US" dirty="0"/>
           </a:p>
@@ -10267,7 +10267,7 @@
             <a:fld id="{48A87A34-81AB-432B-8DAE-1953F412C126}" type="datetimeFigureOut">
               <a:rPr lang="en-US" smtClean="0"/>
               <a:pPr/>
-              <a:t>10/17/2025</a:t>
+              <a:t>10/30/2025</a:t>
             </a:fld>
             <a:endParaRPr lang="en-US" dirty="0"/>
           </a:p>
@@ -10392,7 +10392,7 @@
             <a:fld id="{48A87A34-81AB-432B-8DAE-1953F412C126}" type="datetimeFigureOut">
               <a:rPr lang="en-US" smtClean="0"/>
               <a:pPr/>
-              <a:t>10/17/2025</a:t>
+              <a:t>10/30/2025</a:t>
             </a:fld>
             <a:endParaRPr lang="en-US" dirty="0"/>
           </a:p>
@@ -10489,7 +10489,7 @@
             <a:fld id="{48A87A34-81AB-432B-8DAE-1953F412C126}" type="datetimeFigureOut">
               <a:rPr lang="en-US" smtClean="0"/>
               <a:pPr/>
-              <a:t>10/17/2025</a:t>
+              <a:t>10/30/2025</a:t>
             </a:fld>
             <a:endParaRPr lang="en-US" dirty="0"/>
           </a:p>
@@ -10746,7 +10746,7 @@
             <a:fld id="{48A87A34-81AB-432B-8DAE-1953F412C126}" type="datetimeFigureOut">
               <a:rPr lang="en-US" smtClean="0"/>
               <a:pPr/>
-              <a:t>10/17/2025</a:t>
+              <a:t>10/30/2025</a:t>
             </a:fld>
             <a:endParaRPr lang="en-US" dirty="0"/>
           </a:p>
@@ -11011,7 +11011,7 @@
             <a:fld id="{48A87A34-81AB-432B-8DAE-1953F412C126}" type="datetimeFigureOut">
               <a:rPr lang="en-US" smtClean="0"/>
               <a:pPr/>
-              <a:t>10/17/2025</a:t>
+              <a:t>10/30/2025</a:t>
             </a:fld>
             <a:endParaRPr lang="en-US" dirty="0"/>
           </a:p>
@@ -11758,7 +11758,7 @@
             <a:fld id="{48A87A34-81AB-432B-8DAE-1953F412C126}" type="datetimeFigureOut">
               <a:rPr lang="en-US" smtClean="0"/>
               <a:pPr/>
-              <a:t>10/17/2025</a:t>
+              <a:t>10/30/2025</a:t>
             </a:fld>
             <a:endParaRPr lang="en-US" dirty="0"/>
           </a:p>
@@ -51841,7 +51841,7 @@
             <a:pPr algn="ctr"/>
             <a:r>
               <a:rPr lang="en-US" sz="3600" dirty="0"/>
-              <a:t>Returns a new array based on a specific condition</a:t>
+              <a:t>Returns a new array from a different type of argument</a:t>
             </a:r>
             <a:endParaRPr lang="en-IN" sz="3600" dirty="0"/>
           </a:p>
@@ -51876,6 +51876,12 @@
           <a:lstStyle/>
           <a:p>
             <a:pPr algn="ctr"/>
+            <a:r>
+              <a:rPr lang="en-US" sz="5400" dirty="0">
+                <a:latin typeface="Barlow SemiBold" panose="00000700000000000000" pitchFamily="2" charset="0"/>
+              </a:rPr>
+              <a:t>(ES6) </a:t>
+            </a:r>
             <a:r>
               <a:rPr lang="en-US" sz="5400" dirty="0">
                 <a:solidFill>
@@ -52366,7 +52372,25 @@
                 </a:solidFill>
                 <a:latin typeface="Barlow ExtraBold" panose="00000900000000000000" pitchFamily="2" charset="0"/>
               </a:rPr>
-              <a:t>.from()</a:t>
+              <a:t>.from() </a:t>
+            </a:r>
+            <a:r>
+              <a:rPr lang="en-US" sz="8800" dirty="0">
+                <a:solidFill>
+                  <a:srgbClr val="FFFF00"/>
+                </a:solidFill>
+                <a:latin typeface="Bahnschrift Light" panose="020B0502040204020203" pitchFamily="34" charset="0"/>
+              </a:rPr>
+              <a:t>vs</a:t>
+            </a:r>
+            <a:r>
+              <a:rPr lang="en-US" sz="8800" dirty="0">
+                <a:solidFill>
+                  <a:srgbClr val="FFFF00"/>
+                </a:solidFill>
+                <a:latin typeface="Barlow ExtraBold" panose="00000900000000000000" pitchFamily="2" charset="0"/>
+              </a:rPr>
+              <a:t> (…) spread</a:t>
             </a:r>
             <a:endParaRPr lang="en-IN" sz="8800" dirty="0">
               <a:latin typeface="Barlow ExtraBold" panose="00000900000000000000" pitchFamily="2" charset="0"/>
@@ -52761,7 +52785,7 @@
             <a:pPr algn="ctr"/>
             <a:r>
               <a:rPr lang="en-US" sz="3600" dirty="0"/>
-              <a:t>Accessing elements within an array using </a:t>
+              <a:t>Accessing an element within an array using </a:t>
             </a:r>
             <a:br>
               <a:rPr lang="en-US" sz="3600" dirty="0"/>
@@ -52812,7 +52836,7 @@
                 </a:solidFill>
                 <a:latin typeface="Barlow ExtraLight" panose="00000300000000000000" pitchFamily="2" charset="0"/>
               </a:rPr>
-              <a:t>Array method</a:t>
+              <a:t>method</a:t>
             </a:r>
             <a:br>
               <a:rPr lang="en-US" sz="8800" dirty="0">
@@ -52829,7 +52853,43 @@
                 </a:solidFill>
                 <a:latin typeface="Barlow ExtraBold" panose="00000900000000000000" pitchFamily="2" charset="0"/>
               </a:rPr>
-              <a:t>.at()</a:t>
+              <a:t>.at() </a:t>
+            </a:r>
+            <a:r>
+              <a:rPr lang="en-US" sz="8800" dirty="0">
+                <a:solidFill>
+                  <a:srgbClr val="FFFF00"/>
+                </a:solidFill>
+                <a:latin typeface="Bahnschrift Light" panose="020B0502040204020203" pitchFamily="34" charset="0"/>
+              </a:rPr>
+              <a:t>vs</a:t>
+            </a:r>
+            <a:r>
+              <a:rPr lang="en-US" sz="8800" dirty="0">
+                <a:solidFill>
+                  <a:srgbClr val="FFFF00"/>
+                </a:solidFill>
+                <a:latin typeface="Barlow ExtraBold" panose="00000900000000000000" pitchFamily="2" charset="0"/>
+              </a:rPr>
+              <a:t> </a:t>
+            </a:r>
+            <a:r>
+              <a:rPr lang="en-US" sz="8800" dirty="0" err="1">
+                <a:solidFill>
+                  <a:srgbClr val="FFFF00"/>
+                </a:solidFill>
+                <a:latin typeface="Barlow ExtraBold" panose="00000900000000000000" pitchFamily="2" charset="0"/>
+              </a:rPr>
+              <a:t>codePointAt</a:t>
+            </a:r>
+            <a:r>
+              <a:rPr lang="en-US" sz="8800" dirty="0">
+                <a:solidFill>
+                  <a:srgbClr val="FFFF00"/>
+                </a:solidFill>
+                <a:latin typeface="Barlow ExtraBold" panose="00000900000000000000" pitchFamily="2" charset="0"/>
+              </a:rPr>
+              <a:t>()</a:t>
             </a:r>
             <a:endParaRPr lang="en-IN" sz="8800" dirty="0">
               <a:latin typeface="Barlow ExtraBold" panose="00000900000000000000" pitchFamily="2" charset="0"/>

</xml_diff>

<commit_message>
Added till chapter 32
</commit_message>
<xml_diff>
--- a/Javascript Tutorials.pptx
+++ b/Javascript Tutorials.pptx
@@ -5,7 +5,7 @@
     <p:sldMasterId id="2147483686" r:id="rId1"/>
   </p:sldMasterIdLst>
   <p:notesMasterIdLst>
-    <p:notesMasterId r:id="rId86"/>
+    <p:notesMasterId r:id="rId88"/>
   </p:notesMasterIdLst>
   <p:sldIdLst>
     <p:sldId id="256" r:id="rId2"/>
@@ -91,7 +91,9 @@
     <p:sldId id="344" r:id="rId82"/>
     <p:sldId id="329" r:id="rId83"/>
     <p:sldId id="336" r:id="rId84"/>
-    <p:sldId id="348" r:id="rId85"/>
+    <p:sldId id="350" r:id="rId85"/>
+    <p:sldId id="349" r:id="rId86"/>
+    <p:sldId id="348" r:id="rId87"/>
   </p:sldIdLst>
   <p:sldSz cx="12192000" cy="6858000"/>
   <p:notesSz cx="6858000" cy="9144000"/>
@@ -292,7 +294,7 @@
             <a:fld id="{792F6C33-F1A2-419B-BA2F-6679E9D9EF00}" type="datetimeFigureOut">
               <a:rPr lang="en-US" smtClean="0"/>
               <a:pPr/>
-              <a:t>11/3/2025</a:t>
+              <a:t>11/5/2025</a:t>
             </a:fld>
             <a:endParaRPr lang="en-US"/>
           </a:p>
@@ -5777,6 +5779,228 @@
         <p:cNvPr id="1" name="">
           <a:extLst>
             <a:ext uri="{FF2B5EF4-FFF2-40B4-BE49-F238E27FC236}">
+              <a16:creationId xmlns:a16="http://schemas.microsoft.com/office/drawing/2014/main" id="{40BA77EB-C7BD-F7AF-CA32-CD3057C3E036}"/>
+            </a:ext>
+          </a:extLst>
+        </p:cNvPr>
+        <p:cNvGrpSpPr/>
+        <p:nvPr/>
+      </p:nvGrpSpPr>
+      <p:grpSpPr>
+        <a:xfrm>
+          <a:off x="0" y="0"/>
+          <a:ext cx="0" cy="0"/>
+          <a:chOff x="0" y="0"/>
+          <a:chExt cx="0" cy="0"/>
+        </a:xfrm>
+      </p:grpSpPr>
+      <p:sp>
+        <p:nvSpPr>
+          <p:cNvPr id="2" name="Slide Image Placeholder 1">
+            <a:extLst>
+              <a:ext uri="{FF2B5EF4-FFF2-40B4-BE49-F238E27FC236}">
+                <a16:creationId xmlns:a16="http://schemas.microsoft.com/office/drawing/2014/main" id="{20B2F03F-0B10-436D-E53E-5A353F0918A8}"/>
+              </a:ext>
+            </a:extLst>
+          </p:cNvPr>
+          <p:cNvSpPr>
+            <a:spLocks noGrp="1" noRot="1" noChangeAspect="1"/>
+          </p:cNvSpPr>
+          <p:nvPr>
+            <p:ph type="sldImg"/>
+          </p:nvPr>
+        </p:nvSpPr>
+        <p:spPr/>
+      </p:sp>
+      <p:sp>
+        <p:nvSpPr>
+          <p:cNvPr id="3" name="Notes Placeholder 2">
+            <a:extLst>
+              <a:ext uri="{FF2B5EF4-FFF2-40B4-BE49-F238E27FC236}">
+                <a16:creationId xmlns:a16="http://schemas.microsoft.com/office/drawing/2014/main" id="{D2EEF1A2-BA05-CE4A-2D93-9D7C5C21CEA7}"/>
+              </a:ext>
+            </a:extLst>
+          </p:cNvPr>
+          <p:cNvSpPr>
+            <a:spLocks noGrp="1"/>
+          </p:cNvSpPr>
+          <p:nvPr>
+            <p:ph type="body" idx="1"/>
+          </p:nvPr>
+        </p:nvSpPr>
+        <p:spPr/>
+        <p:txBody>
+          <a:bodyPr>
+            <a:normAutofit/>
+          </a:bodyPr>
+          <a:lstStyle/>
+          <a:p>
+            <a:endParaRPr lang="en-US" dirty="0"/>
+          </a:p>
+        </p:txBody>
+      </p:sp>
+      <p:sp>
+        <p:nvSpPr>
+          <p:cNvPr id="4" name="Slide Number Placeholder 3">
+            <a:extLst>
+              <a:ext uri="{FF2B5EF4-FFF2-40B4-BE49-F238E27FC236}">
+                <a16:creationId xmlns:a16="http://schemas.microsoft.com/office/drawing/2014/main" id="{25FAFEC5-4760-6197-739B-4DAA665B857A}"/>
+              </a:ext>
+            </a:extLst>
+          </p:cNvPr>
+          <p:cNvSpPr>
+            <a:spLocks noGrp="1"/>
+          </p:cNvSpPr>
+          <p:nvPr>
+            <p:ph type="sldNum" sz="quarter" idx="10"/>
+          </p:nvPr>
+        </p:nvSpPr>
+        <p:spPr/>
+        <p:txBody>
+          <a:bodyPr/>
+          <a:lstStyle/>
+          <a:p>
+            <a:fld id="{319BE468-75AD-472B-90AC-B0CB707E0D7A}" type="slidenum">
+              <a:rPr lang="en-US" smtClean="0"/>
+              <a:pPr/>
+              <a:t>84</a:t>
+            </a:fld>
+            <a:endParaRPr lang="en-US"/>
+          </a:p>
+        </p:txBody>
+      </p:sp>
+    </p:spTree>
+    <p:extLst>
+      <p:ext uri="{BB962C8B-B14F-4D97-AF65-F5344CB8AC3E}">
+        <p14:creationId xmlns:p14="http://schemas.microsoft.com/office/powerpoint/2010/main" val="779620195"/>
+      </p:ext>
+    </p:extLst>
+  </p:cSld>
+  <p:clrMapOvr>
+    <a:masterClrMapping/>
+  </p:clrMapOvr>
+</p:notes>
+</file>
+
+<file path=ppt/notesSlides/notesSlide54.xml><?xml version="1.0" encoding="utf-8"?>
+<p:notes xmlns:a="http://schemas.openxmlformats.org/drawingml/2006/main" xmlns:r="http://schemas.openxmlformats.org/officeDocument/2006/relationships" xmlns:p="http://schemas.openxmlformats.org/presentationml/2006/main">
+  <p:cSld>
+    <p:spTree>
+      <p:nvGrpSpPr>
+        <p:cNvPr id="1" name="">
+          <a:extLst>
+            <a:ext uri="{FF2B5EF4-FFF2-40B4-BE49-F238E27FC236}">
+              <a16:creationId xmlns:a16="http://schemas.microsoft.com/office/drawing/2014/main" id="{DBA872E2-14FF-3C62-7593-F7DCFC40F716}"/>
+            </a:ext>
+          </a:extLst>
+        </p:cNvPr>
+        <p:cNvGrpSpPr/>
+        <p:nvPr/>
+      </p:nvGrpSpPr>
+      <p:grpSpPr>
+        <a:xfrm>
+          <a:off x="0" y="0"/>
+          <a:ext cx="0" cy="0"/>
+          <a:chOff x="0" y="0"/>
+          <a:chExt cx="0" cy="0"/>
+        </a:xfrm>
+      </p:grpSpPr>
+      <p:sp>
+        <p:nvSpPr>
+          <p:cNvPr id="2" name="Slide Image Placeholder 1">
+            <a:extLst>
+              <a:ext uri="{FF2B5EF4-FFF2-40B4-BE49-F238E27FC236}">
+                <a16:creationId xmlns:a16="http://schemas.microsoft.com/office/drawing/2014/main" id="{2A500998-F21D-1719-11A0-436E5E5FE265}"/>
+              </a:ext>
+            </a:extLst>
+          </p:cNvPr>
+          <p:cNvSpPr>
+            <a:spLocks noGrp="1" noRot="1" noChangeAspect="1"/>
+          </p:cNvSpPr>
+          <p:nvPr>
+            <p:ph type="sldImg"/>
+          </p:nvPr>
+        </p:nvSpPr>
+        <p:spPr/>
+      </p:sp>
+      <p:sp>
+        <p:nvSpPr>
+          <p:cNvPr id="3" name="Notes Placeholder 2">
+            <a:extLst>
+              <a:ext uri="{FF2B5EF4-FFF2-40B4-BE49-F238E27FC236}">
+                <a16:creationId xmlns:a16="http://schemas.microsoft.com/office/drawing/2014/main" id="{35124FC6-BE33-A4C3-8BA8-2FC2AA9558DE}"/>
+              </a:ext>
+            </a:extLst>
+          </p:cNvPr>
+          <p:cNvSpPr>
+            <a:spLocks noGrp="1"/>
+          </p:cNvSpPr>
+          <p:nvPr>
+            <p:ph type="body" idx="1"/>
+          </p:nvPr>
+        </p:nvSpPr>
+        <p:spPr/>
+        <p:txBody>
+          <a:bodyPr>
+            <a:normAutofit/>
+          </a:bodyPr>
+          <a:lstStyle/>
+          <a:p>
+            <a:endParaRPr lang="en-US" dirty="0"/>
+          </a:p>
+        </p:txBody>
+      </p:sp>
+      <p:sp>
+        <p:nvSpPr>
+          <p:cNvPr id="4" name="Slide Number Placeholder 3">
+            <a:extLst>
+              <a:ext uri="{FF2B5EF4-FFF2-40B4-BE49-F238E27FC236}">
+                <a16:creationId xmlns:a16="http://schemas.microsoft.com/office/drawing/2014/main" id="{38187CAC-E62C-C505-04DB-FBAD3DB3B5EB}"/>
+              </a:ext>
+            </a:extLst>
+          </p:cNvPr>
+          <p:cNvSpPr>
+            <a:spLocks noGrp="1"/>
+          </p:cNvSpPr>
+          <p:nvPr>
+            <p:ph type="sldNum" sz="quarter" idx="10"/>
+          </p:nvPr>
+        </p:nvSpPr>
+        <p:spPr/>
+        <p:txBody>
+          <a:bodyPr/>
+          <a:lstStyle/>
+          <a:p>
+            <a:fld id="{319BE468-75AD-472B-90AC-B0CB707E0D7A}" type="slidenum">
+              <a:rPr lang="en-US" smtClean="0"/>
+              <a:pPr/>
+              <a:t>85</a:t>
+            </a:fld>
+            <a:endParaRPr lang="en-US"/>
+          </a:p>
+        </p:txBody>
+      </p:sp>
+    </p:spTree>
+    <p:extLst>
+      <p:ext uri="{BB962C8B-B14F-4D97-AF65-F5344CB8AC3E}">
+        <p14:creationId xmlns:p14="http://schemas.microsoft.com/office/powerpoint/2010/main" val="2321297833"/>
+      </p:ext>
+    </p:extLst>
+  </p:cSld>
+  <p:clrMapOvr>
+    <a:masterClrMapping/>
+  </p:clrMapOvr>
+</p:notes>
+</file>
+
+<file path=ppt/notesSlides/notesSlide55.xml><?xml version="1.0" encoding="utf-8"?>
+<p:notes xmlns:a="http://schemas.openxmlformats.org/drawingml/2006/main" xmlns:r="http://schemas.openxmlformats.org/officeDocument/2006/relationships" xmlns:p="http://schemas.openxmlformats.org/presentationml/2006/main">
+  <p:cSld>
+    <p:spTree>
+      <p:nvGrpSpPr>
+        <p:cNvPr id="1" name="">
+          <a:extLst>
+            <a:ext uri="{FF2B5EF4-FFF2-40B4-BE49-F238E27FC236}">
               <a16:creationId xmlns:a16="http://schemas.microsoft.com/office/drawing/2014/main" id="{826981DE-5BA8-9F0D-67A7-4D2BFDA85AEF}"/>
             </a:ext>
           </a:extLst>
@@ -5861,7 +6085,7 @@
             <a:fld id="{319BE468-75AD-472B-90AC-B0CB707E0D7A}" type="slidenum">
               <a:rPr lang="en-US" smtClean="0"/>
               <a:pPr/>
-              <a:t>84</a:t>
+              <a:t>86</a:t>
             </a:fld>
             <a:endParaRPr lang="en-US"/>
           </a:p>
@@ -7049,7 +7273,7 @@
             <a:fld id="{48A87A34-81AB-432B-8DAE-1953F412C126}" type="datetimeFigureOut">
               <a:rPr lang="en-US" smtClean="0"/>
               <a:pPr/>
-              <a:t>11/3/2025</a:t>
+              <a:t>11/5/2025</a:t>
             </a:fld>
             <a:endParaRPr lang="en-US" dirty="0"/>
           </a:p>
@@ -7302,7 +7526,7 @@
             <a:fld id="{48A87A34-81AB-432B-8DAE-1953F412C126}" type="datetimeFigureOut">
               <a:rPr lang="en-US" smtClean="0"/>
               <a:pPr/>
-              <a:t>11/3/2025</a:t>
+              <a:t>11/5/2025</a:t>
             </a:fld>
             <a:endParaRPr lang="en-US" dirty="0"/>
           </a:p>
@@ -7618,7 +7842,7 @@
             <a:fld id="{48A87A34-81AB-432B-8DAE-1953F412C126}" type="datetimeFigureOut">
               <a:rPr lang="en-US" smtClean="0"/>
               <a:pPr/>
-              <a:t>11/3/2025</a:t>
+              <a:t>11/5/2025</a:t>
             </a:fld>
             <a:endParaRPr lang="en-US" dirty="0"/>
           </a:p>
@@ -7947,7 +8171,7 @@
             <a:fld id="{48A87A34-81AB-432B-8DAE-1953F412C126}" type="datetimeFigureOut">
               <a:rPr lang="en-US" smtClean="0"/>
               <a:pPr/>
-              <a:t>11/3/2025</a:t>
+              <a:t>11/5/2025</a:t>
             </a:fld>
             <a:endParaRPr lang="en-US" dirty="0"/>
           </a:p>
@@ -8263,7 +8487,7 @@
             <a:fld id="{48A87A34-81AB-432B-8DAE-1953F412C126}" type="datetimeFigureOut">
               <a:rPr lang="en-US" smtClean="0"/>
               <a:pPr/>
-              <a:t>11/3/2025</a:t>
+              <a:t>11/5/2025</a:t>
             </a:fld>
             <a:endParaRPr lang="en-US" dirty="0"/>
           </a:p>
@@ -8652,7 +8876,7 @@
             <a:fld id="{48A87A34-81AB-432B-8DAE-1953F412C126}" type="datetimeFigureOut">
               <a:rPr lang="en-US" smtClean="0"/>
               <a:pPr/>
-              <a:t>11/3/2025</a:t>
+              <a:t>11/5/2025</a:t>
             </a:fld>
             <a:endParaRPr lang="en-US" dirty="0"/>
           </a:p>
@@ -8824,7 +9048,7 @@
             <a:fld id="{48A87A34-81AB-432B-8DAE-1953F412C126}" type="datetimeFigureOut">
               <a:rPr lang="en-US" smtClean="0"/>
               <a:pPr/>
-              <a:t>11/3/2025</a:t>
+              <a:t>11/5/2025</a:t>
             </a:fld>
             <a:endParaRPr lang="en-US" dirty="0"/>
           </a:p>
@@ -9006,7 +9230,7 @@
             <a:fld id="{48A87A34-81AB-432B-8DAE-1953F412C126}" type="datetimeFigureOut">
               <a:rPr lang="en-US" smtClean="0"/>
               <a:pPr/>
-              <a:t>11/3/2025</a:t>
+              <a:t>11/5/2025</a:t>
             </a:fld>
             <a:endParaRPr lang="en-US" dirty="0"/>
           </a:p>
@@ -9184,7 +9408,7 @@
             <a:fld id="{48A87A34-81AB-432B-8DAE-1953F412C126}" type="datetimeFigureOut">
               <a:rPr lang="en-US" smtClean="0"/>
               <a:pPr/>
-              <a:t>11/3/2025</a:t>
+              <a:t>11/5/2025</a:t>
             </a:fld>
             <a:endParaRPr lang="en-US" dirty="0"/>
           </a:p>
@@ -9433,7 +9657,7 @@
             <a:fld id="{48A87A34-81AB-432B-8DAE-1953F412C126}" type="datetimeFigureOut">
               <a:rPr lang="en-US" smtClean="0"/>
               <a:pPr/>
-              <a:t>11/3/2025</a:t>
+              <a:t>11/5/2025</a:t>
             </a:fld>
             <a:endParaRPr lang="en-US" dirty="0"/>
           </a:p>
@@ -9667,7 +9891,7 @@
             <a:fld id="{48A87A34-81AB-432B-8DAE-1953F412C126}" type="datetimeFigureOut">
               <a:rPr lang="en-US" smtClean="0"/>
               <a:pPr/>
-              <a:t>11/3/2025</a:t>
+              <a:t>11/5/2025</a:t>
             </a:fld>
             <a:endParaRPr lang="en-US" dirty="0"/>
           </a:p>
@@ -10043,7 +10267,7 @@
             <a:fld id="{48A87A34-81AB-432B-8DAE-1953F412C126}" type="datetimeFigureOut">
               <a:rPr lang="en-US" smtClean="0"/>
               <a:pPr/>
-              <a:t>11/3/2025</a:t>
+              <a:t>11/5/2025</a:t>
             </a:fld>
             <a:endParaRPr lang="en-US" dirty="0"/>
           </a:p>
@@ -10168,7 +10392,7 @@
             <a:fld id="{48A87A34-81AB-432B-8DAE-1953F412C126}" type="datetimeFigureOut">
               <a:rPr lang="en-US" smtClean="0"/>
               <a:pPr/>
-              <a:t>11/3/2025</a:t>
+              <a:t>11/5/2025</a:t>
             </a:fld>
             <a:endParaRPr lang="en-US" dirty="0"/>
           </a:p>
@@ -10265,7 +10489,7 @@
             <a:fld id="{48A87A34-81AB-432B-8DAE-1953F412C126}" type="datetimeFigureOut">
               <a:rPr lang="en-US" smtClean="0"/>
               <a:pPr/>
-              <a:t>11/3/2025</a:t>
+              <a:t>11/5/2025</a:t>
             </a:fld>
             <a:endParaRPr lang="en-US" dirty="0"/>
           </a:p>
@@ -10522,7 +10746,7 @@
             <a:fld id="{48A87A34-81AB-432B-8DAE-1953F412C126}" type="datetimeFigureOut">
               <a:rPr lang="en-US" smtClean="0"/>
               <a:pPr/>
-              <a:t>11/3/2025</a:t>
+              <a:t>11/5/2025</a:t>
             </a:fld>
             <a:endParaRPr lang="en-US" dirty="0"/>
           </a:p>
@@ -10787,7 +11011,7 @@
             <a:fld id="{48A87A34-81AB-432B-8DAE-1953F412C126}" type="datetimeFigureOut">
               <a:rPr lang="en-US" smtClean="0"/>
               <a:pPr/>
-              <a:t>11/3/2025</a:t>
+              <a:t>11/5/2025</a:t>
             </a:fld>
             <a:endParaRPr lang="en-US" dirty="0"/>
           </a:p>
@@ -11534,7 +11758,7 @@
             <a:fld id="{48A87A34-81AB-432B-8DAE-1953F412C126}" type="datetimeFigureOut">
               <a:rPr lang="en-US" smtClean="0"/>
               <a:pPr/>
-              <a:t>11/3/2025</a:t>
+              <a:t>11/5/2025</a:t>
             </a:fld>
             <a:endParaRPr lang="en-US" dirty="0"/>
           </a:p>
@@ -52810,7 +53034,7 @@
         </p:nvSpPr>
         <p:spPr>
           <a:xfrm>
-            <a:off x="0" y="404897"/>
+            <a:off x="0" y="31443"/>
             <a:ext cx="12192000" cy="2947244"/>
           </a:xfrm>
           <a:noFill/>
@@ -53018,8 +53242,8 @@
         </p:nvSpPr>
         <p:spPr>
           <a:xfrm>
-            <a:off x="0" y="2859410"/>
-            <a:ext cx="12192000" cy="2277547"/>
+            <a:off x="0" y="1478657"/>
+            <a:ext cx="12192000" cy="4801314"/>
           </a:xfrm>
           <a:prstGeom prst="rect">
             <a:avLst/>
@@ -53032,9 +53256,13 @@
           </a:bodyPr>
           <a:lstStyle/>
           <a:p>
-            <a:pPr algn="ctr"/>
-            <a:r>
-              <a:rPr lang="en-US" sz="5400" dirty="0">
+            <a:pPr algn="ctr">
+              <a:lnSpc>
+                <a:spcPts val="12000"/>
+              </a:lnSpc>
+            </a:pPr>
+            <a:r>
+              <a:rPr lang="en-US" sz="6600" dirty="0">
                 <a:solidFill>
                   <a:schemeClr val="tx1">
                     <a:lumMod val="95000"/>
@@ -53053,33 +53281,32 @@
               </a:rPr>
             </a:br>
             <a:r>
-              <a:rPr lang="en-US" sz="8800" dirty="0">
+              <a:rPr lang="en-US" sz="12000" dirty="0">
                 <a:solidFill>
                   <a:srgbClr val="FFFF00"/>
                 </a:solidFill>
                 <a:latin typeface="Barlow ExtraBold" panose="00000900000000000000" pitchFamily="2" charset="0"/>
               </a:rPr>
-              <a:t>.map() </a:t>
-            </a:r>
-            <a:r>
-              <a:rPr lang="en-US" sz="8800" dirty="0">
+              <a:t>.map() &amp; </a:t>
+            </a:r>
+            <a:br>
+              <a:rPr lang="en-US" sz="12000" dirty="0">
                 <a:solidFill>
                   <a:srgbClr val="FFFF00"/>
                 </a:solidFill>
-                <a:latin typeface="Bahnschrift Light" panose="020B0502040204020203" pitchFamily="34" charset="0"/>
-              </a:rPr>
-              <a:t>vs</a:t>
-            </a:r>
-            <a:r>
-              <a:rPr lang="en-US" sz="8800" dirty="0">
+                <a:latin typeface="Barlow ExtraBold" panose="00000900000000000000" pitchFamily="2" charset="0"/>
+              </a:rPr>
+            </a:br>
+            <a:r>
+              <a:rPr lang="en-US" sz="12000" dirty="0">
                 <a:solidFill>
                   <a:srgbClr val="FFFF00"/>
                 </a:solidFill>
                 <a:latin typeface="Barlow ExtraBold" panose="00000900000000000000" pitchFamily="2" charset="0"/>
               </a:rPr>
-              <a:t> .filter()</a:t>
-            </a:r>
-            <a:endParaRPr lang="en-IN" sz="8800" dirty="0">
+              <a:t>custom map()</a:t>
+            </a:r>
+            <a:endParaRPr lang="en-IN" sz="12000" dirty="0">
               <a:latin typeface="Barlow ExtraBold" panose="00000900000000000000" pitchFamily="2" charset="0"/>
             </a:endParaRPr>
           </a:p>
@@ -53099,6 +53326,868 @@
 </file>
 
 <file path=ppt/slides/slide84.xml><?xml version="1.0" encoding="utf-8"?>
+<p:sld xmlns:a="http://schemas.openxmlformats.org/drawingml/2006/main" xmlns:r="http://schemas.openxmlformats.org/officeDocument/2006/relationships" xmlns:p="http://schemas.openxmlformats.org/presentationml/2006/main">
+  <p:cSld>
+    <p:spTree>
+      <p:nvGrpSpPr>
+        <p:cNvPr id="1" name="">
+          <a:extLst>
+            <a:ext uri="{FF2B5EF4-FFF2-40B4-BE49-F238E27FC236}">
+              <a16:creationId xmlns:a16="http://schemas.microsoft.com/office/drawing/2014/main" id="{77FA081C-3B91-33CD-D7AF-1E22A085ED28}"/>
+            </a:ext>
+          </a:extLst>
+        </p:cNvPr>
+        <p:cNvGrpSpPr/>
+        <p:nvPr/>
+      </p:nvGrpSpPr>
+      <p:grpSpPr>
+        <a:xfrm>
+          <a:off x="0" y="0"/>
+          <a:ext cx="0" cy="0"/>
+          <a:chOff x="0" y="0"/>
+          <a:chExt cx="0" cy="0"/>
+        </a:xfrm>
+      </p:grpSpPr>
+      <p:sp>
+        <p:nvSpPr>
+          <p:cNvPr id="10" name="Rectangle 9">
+            <a:extLst>
+              <a:ext uri="{FF2B5EF4-FFF2-40B4-BE49-F238E27FC236}">
+                <a16:creationId xmlns:a16="http://schemas.microsoft.com/office/drawing/2014/main" id="{D302768C-91B8-8ACD-520D-04DB8AEBF149}"/>
+              </a:ext>
+            </a:extLst>
+          </p:cNvPr>
+          <p:cNvSpPr/>
+          <p:nvPr/>
+        </p:nvSpPr>
+        <p:spPr>
+          <a:xfrm>
+            <a:off x="0" y="0"/>
+            <a:ext cx="12192000" cy="6858000"/>
+          </a:xfrm>
+          <a:prstGeom prst="rect">
+            <a:avLst/>
+          </a:prstGeom>
+          <a:solidFill>
+            <a:schemeClr val="bg2">
+              <a:lumMod val="50000"/>
+            </a:schemeClr>
+          </a:solidFill>
+          <a:ln>
+            <a:noFill/>
+          </a:ln>
+        </p:spPr>
+        <p:style>
+          <a:lnRef idx="2">
+            <a:schemeClr val="accent1">
+              <a:shade val="50000"/>
+            </a:schemeClr>
+          </a:lnRef>
+          <a:fillRef idx="1">
+            <a:schemeClr val="accent1"/>
+          </a:fillRef>
+          <a:effectRef idx="0">
+            <a:schemeClr val="accent1"/>
+          </a:effectRef>
+          <a:fontRef idx="minor">
+            <a:schemeClr val="lt1"/>
+          </a:fontRef>
+        </p:style>
+        <p:txBody>
+          <a:bodyPr rtlCol="0" anchor="ctr"/>
+          <a:lstStyle/>
+          <a:p>
+            <a:pPr algn="ctr"/>
+            <a:endParaRPr lang="en-US" dirty="0"/>
+          </a:p>
+        </p:txBody>
+      </p:sp>
+      <p:sp>
+        <p:nvSpPr>
+          <p:cNvPr id="9" name="Explosion: 14 Points 8">
+            <a:extLst>
+              <a:ext uri="{FF2B5EF4-FFF2-40B4-BE49-F238E27FC236}">
+                <a16:creationId xmlns:a16="http://schemas.microsoft.com/office/drawing/2014/main" id="{1D86226B-0AFC-8C4F-EE58-B87CF84E5CD0}"/>
+              </a:ext>
+            </a:extLst>
+          </p:cNvPr>
+          <p:cNvSpPr/>
+          <p:nvPr/>
+        </p:nvSpPr>
+        <p:spPr>
+          <a:xfrm>
+            <a:off x="4261456" y="638510"/>
+            <a:ext cx="3669087" cy="3707684"/>
+          </a:xfrm>
+          <a:prstGeom prst="irregularSeal2">
+            <a:avLst/>
+          </a:prstGeom>
+          <a:solidFill>
+            <a:schemeClr val="bg2">
+              <a:lumMod val="75000"/>
+            </a:schemeClr>
+          </a:solidFill>
+          <a:ln>
+            <a:noFill/>
+          </a:ln>
+        </p:spPr>
+        <p:style>
+          <a:lnRef idx="2">
+            <a:schemeClr val="accent1">
+              <a:shade val="15000"/>
+            </a:schemeClr>
+          </a:lnRef>
+          <a:fillRef idx="1">
+            <a:schemeClr val="accent1"/>
+          </a:fillRef>
+          <a:effectRef idx="0">
+            <a:schemeClr val="accent1"/>
+          </a:effectRef>
+          <a:fontRef idx="minor">
+            <a:schemeClr val="lt1"/>
+          </a:fontRef>
+        </p:style>
+        <p:txBody>
+          <a:bodyPr rtlCol="0" anchor="ctr"/>
+          <a:lstStyle/>
+          <a:p>
+            <a:pPr algn="ctr"/>
+            <a:endParaRPr lang="en-IN"/>
+          </a:p>
+        </p:txBody>
+      </p:sp>
+      <p:sp>
+        <p:nvSpPr>
+          <p:cNvPr id="2" name="Title 1">
+            <a:extLst>
+              <a:ext uri="{FF2B5EF4-FFF2-40B4-BE49-F238E27FC236}">
+                <a16:creationId xmlns:a16="http://schemas.microsoft.com/office/drawing/2014/main" id="{6DF5116F-C4CA-A198-6FBE-1D90D7227709}"/>
+              </a:ext>
+            </a:extLst>
+          </p:cNvPr>
+          <p:cNvSpPr>
+            <a:spLocks noGrp="1"/>
+          </p:cNvSpPr>
+          <p:nvPr>
+            <p:ph type="title"/>
+          </p:nvPr>
+        </p:nvSpPr>
+        <p:spPr>
+          <a:xfrm>
+            <a:off x="0" y="1207799"/>
+            <a:ext cx="12192000" cy="2947244"/>
+          </a:xfrm>
+          <a:noFill/>
+        </p:spPr>
+        <p:txBody>
+          <a:bodyPr anchor="ctr">
+            <a:normAutofit/>
+          </a:bodyPr>
+          <a:lstStyle/>
+          <a:p>
+            <a:pPr algn="ctr"/>
+            <a:r>
+              <a:rPr lang="en-US" sz="7200" b="1" dirty="0">
+                <a:solidFill>
+                  <a:schemeClr val="tx1"/>
+                </a:solidFill>
+                <a:latin typeface="Barlow Black" panose="00000A00000000000000" pitchFamily="2" charset="0"/>
+              </a:rPr>
+              <a:t>Chapter – </a:t>
+            </a:r>
+            <a:r>
+              <a:rPr lang="en-US" sz="7200" dirty="0">
+                <a:solidFill>
+                  <a:schemeClr val="tx1"/>
+                </a:solidFill>
+                <a:latin typeface="Bahnschrift SemiLight" pitchFamily="34" charset="0"/>
+              </a:rPr>
+              <a:t>31</a:t>
+            </a:r>
+            <a:br>
+              <a:rPr lang="en-US" sz="7200" b="1" dirty="0">
+                <a:solidFill>
+                  <a:schemeClr val="tx1"/>
+                </a:solidFill>
+                <a:latin typeface="Barlow Black" panose="00000A00000000000000" pitchFamily="2" charset="0"/>
+              </a:rPr>
+            </a:br>
+            <a:endParaRPr lang="en-IN" sz="4800" b="1" dirty="0">
+              <a:solidFill>
+                <a:schemeClr val="accent2">
+                  <a:lumMod val="60000"/>
+                  <a:lumOff val="40000"/>
+                </a:schemeClr>
+              </a:solidFill>
+              <a:latin typeface="Bahnschrift Light Condensed" pitchFamily="34" charset="0"/>
+            </a:endParaRPr>
+          </a:p>
+        </p:txBody>
+      </p:sp>
+      <p:sp>
+        <p:nvSpPr>
+          <p:cNvPr id="7" name="TextBox 6">
+            <a:extLst>
+              <a:ext uri="{FF2B5EF4-FFF2-40B4-BE49-F238E27FC236}">
+                <a16:creationId xmlns:a16="http://schemas.microsoft.com/office/drawing/2014/main" id="{2527086F-8CFA-E990-720F-E69BC5349E56}"/>
+              </a:ext>
+            </a:extLst>
+          </p:cNvPr>
+          <p:cNvSpPr txBox="1"/>
+          <p:nvPr/>
+        </p:nvSpPr>
+        <p:spPr>
+          <a:xfrm>
+            <a:off x="241300" y="228600"/>
+            <a:ext cx="5363969" cy="1107996"/>
+          </a:xfrm>
+          <a:prstGeom prst="rect">
+            <a:avLst/>
+          </a:prstGeom>
+          <a:noFill/>
+        </p:spPr>
+        <p:txBody>
+          <a:bodyPr wrap="none" rtlCol="0">
+            <a:spAutoFit/>
+          </a:bodyPr>
+          <a:lstStyle/>
+          <a:p>
+            <a:r>
+              <a:rPr lang="en-US" sz="6600" b="1" dirty="0">
+                <a:latin typeface="Barlow Condensed ExtraLight" panose="00000306000000000000" pitchFamily="2" charset="0"/>
+              </a:rPr>
+              <a:t>JavaScript- </a:t>
+            </a:r>
+            <a:r>
+              <a:rPr lang="en-US" sz="6600" b="1" dirty="0">
+                <a:solidFill>
+                  <a:srgbClr val="FFFF00"/>
+                </a:solidFill>
+                <a:latin typeface="Bahnschrift SemiCondensed" panose="020B0502040204020203" pitchFamily="34" charset="0"/>
+              </a:rPr>
+              <a:t>Array</a:t>
+            </a:r>
+          </a:p>
+        </p:txBody>
+      </p:sp>
+      <p:sp>
+        <p:nvSpPr>
+          <p:cNvPr id="6" name="TextBox 5">
+            <a:extLst>
+              <a:ext uri="{FF2B5EF4-FFF2-40B4-BE49-F238E27FC236}">
+                <a16:creationId xmlns:a16="http://schemas.microsoft.com/office/drawing/2014/main" id="{E9226D5B-CA08-8934-EA8D-724E555D440F}"/>
+              </a:ext>
+            </a:extLst>
+          </p:cNvPr>
+          <p:cNvSpPr txBox="1"/>
+          <p:nvPr/>
+        </p:nvSpPr>
+        <p:spPr>
+          <a:xfrm>
+            <a:off x="9909313" y="1536494"/>
+            <a:ext cx="2195004" cy="646331"/>
+          </a:xfrm>
+          <a:prstGeom prst="rect">
+            <a:avLst/>
+          </a:prstGeom>
+          <a:noFill/>
+        </p:spPr>
+        <p:txBody>
+          <a:bodyPr wrap="square" rtlCol="0">
+            <a:spAutoFit/>
+          </a:bodyPr>
+          <a:lstStyle/>
+          <a:p>
+            <a:pPr algn="r"/>
+            <a:r>
+              <a:rPr lang="en-US" b="1" dirty="0"/>
+              <a:t>Gautam Kumar </a:t>
+            </a:r>
+            <a:br>
+              <a:rPr lang="en-US" b="1" dirty="0"/>
+            </a:br>
+            <a:r>
+              <a:rPr lang="en-US" b="1" dirty="0">
+                <a:solidFill>
+                  <a:schemeClr val="tx1">
+                    <a:lumMod val="65000"/>
+                  </a:schemeClr>
+                </a:solidFill>
+              </a:rPr>
+              <a:t>- </a:t>
+            </a:r>
+            <a:r>
+              <a:rPr lang="en-US" dirty="0">
+                <a:solidFill>
+                  <a:schemeClr val="tx1">
+                    <a:lumMod val="65000"/>
+                  </a:schemeClr>
+                </a:solidFill>
+              </a:rPr>
+              <a:t>uidhtml.com</a:t>
+            </a:r>
+            <a:endParaRPr lang="en-IN" dirty="0">
+              <a:solidFill>
+                <a:schemeClr val="tx1">
+                  <a:lumMod val="65000"/>
+                </a:schemeClr>
+              </a:solidFill>
+            </a:endParaRPr>
+          </a:p>
+        </p:txBody>
+      </p:sp>
+      <p:pic>
+        <p:nvPicPr>
+          <p:cNvPr id="11" name="Picture 3" descr="K:\github-repo\javascript-tutorials\tutorials\chapter-7-data-conversion\assets\images\javascript-logo.png">
+            <a:extLst>
+              <a:ext uri="{FF2B5EF4-FFF2-40B4-BE49-F238E27FC236}">
+                <a16:creationId xmlns:a16="http://schemas.microsoft.com/office/drawing/2014/main" id="{25219E61-26AC-B454-5829-BA567E7735CB}"/>
+              </a:ext>
+            </a:extLst>
+          </p:cNvPr>
+          <p:cNvPicPr>
+            <a:picLocks noChangeAspect="1" noChangeArrowheads="1"/>
+          </p:cNvPicPr>
+          <p:nvPr/>
+        </p:nvPicPr>
+        <p:blipFill>
+          <a:blip r:embed="rId3"/>
+          <a:srcRect/>
+          <a:stretch>
+            <a:fillRect/>
+          </a:stretch>
+        </p:blipFill>
+        <p:spPr bwMode="auto">
+          <a:xfrm>
+            <a:off x="10705134" y="143202"/>
+            <a:ext cx="1314450" cy="1314450"/>
+          </a:xfrm>
+          <a:prstGeom prst="rect">
+            <a:avLst/>
+          </a:prstGeom>
+          <a:noFill/>
+        </p:spPr>
+      </p:pic>
+      <p:sp>
+        <p:nvSpPr>
+          <p:cNvPr id="5" name="TextBox 4">
+            <a:extLst>
+              <a:ext uri="{FF2B5EF4-FFF2-40B4-BE49-F238E27FC236}">
+                <a16:creationId xmlns:a16="http://schemas.microsoft.com/office/drawing/2014/main" id="{19E5A51E-A5B0-55E5-9AD8-EABD9415F456}"/>
+              </a:ext>
+            </a:extLst>
+          </p:cNvPr>
+          <p:cNvSpPr txBox="1"/>
+          <p:nvPr/>
+        </p:nvSpPr>
+        <p:spPr>
+          <a:xfrm>
+            <a:off x="0" y="2967016"/>
+            <a:ext cx="12192000" cy="3416320"/>
+          </a:xfrm>
+          <a:prstGeom prst="rect">
+            <a:avLst/>
+          </a:prstGeom>
+          <a:noFill/>
+        </p:spPr>
+        <p:txBody>
+          <a:bodyPr wrap="square" rtlCol="0">
+            <a:spAutoFit/>
+          </a:bodyPr>
+          <a:lstStyle/>
+          <a:p>
+            <a:pPr algn="ctr"/>
+            <a:r>
+              <a:rPr lang="en-US" sz="6600" dirty="0">
+                <a:solidFill>
+                  <a:schemeClr val="tx1">
+                    <a:lumMod val="95000"/>
+                  </a:schemeClr>
+                </a:solidFill>
+                <a:latin typeface="Barlow ExtraLight" panose="00000300000000000000" pitchFamily="2" charset="0"/>
+              </a:rPr>
+              <a:t>Array method</a:t>
+            </a:r>
+            <a:br>
+              <a:rPr lang="en-US" sz="8800" dirty="0">
+                <a:solidFill>
+                  <a:srgbClr val="FFFF00"/>
+                </a:solidFill>
+                <a:latin typeface="Barlow ExtraBold" panose="00000900000000000000" pitchFamily="2" charset="0"/>
+              </a:rPr>
+            </a:br>
+            <a:r>
+              <a:rPr lang="en-US" sz="15000" dirty="0">
+                <a:solidFill>
+                  <a:srgbClr val="FFFF00"/>
+                </a:solidFill>
+                <a:latin typeface="Barlow ExtraBold" panose="00000900000000000000" pitchFamily="2" charset="0"/>
+              </a:rPr>
+              <a:t>[].filter()</a:t>
+            </a:r>
+            <a:endParaRPr lang="en-IN" sz="15000" dirty="0">
+              <a:latin typeface="Barlow ExtraBold" panose="00000900000000000000" pitchFamily="2" charset="0"/>
+            </a:endParaRPr>
+          </a:p>
+        </p:txBody>
+      </p:sp>
+    </p:spTree>
+    <p:extLst>
+      <p:ext uri="{BB962C8B-B14F-4D97-AF65-F5344CB8AC3E}">
+        <p14:creationId xmlns:p14="http://schemas.microsoft.com/office/powerpoint/2010/main" val="3166541285"/>
+      </p:ext>
+    </p:extLst>
+  </p:cSld>
+  <p:clrMapOvr>
+    <a:masterClrMapping/>
+  </p:clrMapOvr>
+</p:sld>
+</file>
+
+<file path=ppt/slides/slide85.xml><?xml version="1.0" encoding="utf-8"?>
+<p:sld xmlns:a="http://schemas.openxmlformats.org/drawingml/2006/main" xmlns:r="http://schemas.openxmlformats.org/officeDocument/2006/relationships" xmlns:p="http://schemas.openxmlformats.org/presentationml/2006/main">
+  <p:cSld>
+    <p:spTree>
+      <p:nvGrpSpPr>
+        <p:cNvPr id="1" name="">
+          <a:extLst>
+            <a:ext uri="{FF2B5EF4-FFF2-40B4-BE49-F238E27FC236}">
+              <a16:creationId xmlns:a16="http://schemas.microsoft.com/office/drawing/2014/main" id="{4F2B1D4B-5CA7-52B2-6972-266CCC173AAD}"/>
+            </a:ext>
+          </a:extLst>
+        </p:cNvPr>
+        <p:cNvGrpSpPr/>
+        <p:nvPr/>
+      </p:nvGrpSpPr>
+      <p:grpSpPr>
+        <a:xfrm>
+          <a:off x="0" y="0"/>
+          <a:ext cx="0" cy="0"/>
+          <a:chOff x="0" y="0"/>
+          <a:chExt cx="0" cy="0"/>
+        </a:xfrm>
+      </p:grpSpPr>
+      <p:sp>
+        <p:nvSpPr>
+          <p:cNvPr id="10" name="Rectangle 9">
+            <a:extLst>
+              <a:ext uri="{FF2B5EF4-FFF2-40B4-BE49-F238E27FC236}">
+                <a16:creationId xmlns:a16="http://schemas.microsoft.com/office/drawing/2014/main" id="{5F5D14DE-5772-AA4D-D6DE-9685F1FE9B53}"/>
+              </a:ext>
+            </a:extLst>
+          </p:cNvPr>
+          <p:cNvSpPr/>
+          <p:nvPr/>
+        </p:nvSpPr>
+        <p:spPr>
+          <a:xfrm>
+            <a:off x="0" y="0"/>
+            <a:ext cx="12192000" cy="6858000"/>
+          </a:xfrm>
+          <a:prstGeom prst="rect">
+            <a:avLst/>
+          </a:prstGeom>
+          <a:solidFill>
+            <a:schemeClr val="bg2">
+              <a:lumMod val="50000"/>
+            </a:schemeClr>
+          </a:solidFill>
+          <a:ln>
+            <a:noFill/>
+          </a:ln>
+        </p:spPr>
+        <p:style>
+          <a:lnRef idx="2">
+            <a:schemeClr val="accent1">
+              <a:shade val="50000"/>
+            </a:schemeClr>
+          </a:lnRef>
+          <a:fillRef idx="1">
+            <a:schemeClr val="accent1"/>
+          </a:fillRef>
+          <a:effectRef idx="0">
+            <a:schemeClr val="accent1"/>
+          </a:effectRef>
+          <a:fontRef idx="minor">
+            <a:schemeClr val="lt1"/>
+          </a:fontRef>
+        </p:style>
+        <p:txBody>
+          <a:bodyPr rtlCol="0" anchor="ctr"/>
+          <a:lstStyle/>
+          <a:p>
+            <a:pPr algn="ctr"/>
+            <a:endParaRPr lang="en-US" dirty="0"/>
+          </a:p>
+        </p:txBody>
+      </p:sp>
+      <p:sp>
+        <p:nvSpPr>
+          <p:cNvPr id="9" name="Explosion: 14 Points 8">
+            <a:extLst>
+              <a:ext uri="{FF2B5EF4-FFF2-40B4-BE49-F238E27FC236}">
+                <a16:creationId xmlns:a16="http://schemas.microsoft.com/office/drawing/2014/main" id="{E24F1C6A-C17A-60EB-C6A2-E70E83E2006E}"/>
+              </a:ext>
+            </a:extLst>
+          </p:cNvPr>
+          <p:cNvSpPr/>
+          <p:nvPr/>
+        </p:nvSpPr>
+        <p:spPr>
+          <a:xfrm>
+            <a:off x="4012025" y="366827"/>
+            <a:ext cx="3669087" cy="3707684"/>
+          </a:xfrm>
+          <a:prstGeom prst="irregularSeal2">
+            <a:avLst/>
+          </a:prstGeom>
+          <a:solidFill>
+            <a:schemeClr val="bg2">
+              <a:lumMod val="75000"/>
+            </a:schemeClr>
+          </a:solidFill>
+          <a:ln>
+            <a:noFill/>
+          </a:ln>
+        </p:spPr>
+        <p:style>
+          <a:lnRef idx="2">
+            <a:schemeClr val="accent1">
+              <a:shade val="15000"/>
+            </a:schemeClr>
+          </a:lnRef>
+          <a:fillRef idx="1">
+            <a:schemeClr val="accent1"/>
+          </a:fillRef>
+          <a:effectRef idx="0">
+            <a:schemeClr val="accent1"/>
+          </a:effectRef>
+          <a:fontRef idx="minor">
+            <a:schemeClr val="lt1"/>
+          </a:fontRef>
+        </p:style>
+        <p:txBody>
+          <a:bodyPr rtlCol="0" anchor="ctr"/>
+          <a:lstStyle/>
+          <a:p>
+            <a:pPr algn="ctr"/>
+            <a:endParaRPr lang="en-IN"/>
+          </a:p>
+        </p:txBody>
+      </p:sp>
+      <p:sp>
+        <p:nvSpPr>
+          <p:cNvPr id="2" name="Title 1">
+            <a:extLst>
+              <a:ext uri="{FF2B5EF4-FFF2-40B4-BE49-F238E27FC236}">
+                <a16:creationId xmlns:a16="http://schemas.microsoft.com/office/drawing/2014/main" id="{4D3CDCD0-4EB8-A1BF-927A-31888D1CB43B}"/>
+              </a:ext>
+            </a:extLst>
+          </p:cNvPr>
+          <p:cNvSpPr>
+            <a:spLocks noGrp="1"/>
+          </p:cNvSpPr>
+          <p:nvPr>
+            <p:ph type="title"/>
+          </p:nvPr>
+        </p:nvSpPr>
+        <p:spPr>
+          <a:xfrm>
+            <a:off x="0" y="1330095"/>
+            <a:ext cx="12192000" cy="1608284"/>
+          </a:xfrm>
+          <a:noFill/>
+        </p:spPr>
+        <p:txBody>
+          <a:bodyPr anchor="ctr">
+            <a:normAutofit/>
+          </a:bodyPr>
+          <a:lstStyle/>
+          <a:p>
+            <a:pPr algn="ctr"/>
+            <a:r>
+              <a:rPr lang="en-US" sz="7200" b="1" dirty="0">
+                <a:solidFill>
+                  <a:schemeClr val="tx1"/>
+                </a:solidFill>
+                <a:latin typeface="Barlow Black" panose="00000A00000000000000" pitchFamily="2" charset="0"/>
+              </a:rPr>
+              <a:t>Chapter – </a:t>
+            </a:r>
+            <a:r>
+              <a:rPr lang="en-US" sz="7200" dirty="0">
+                <a:solidFill>
+                  <a:schemeClr val="tx1"/>
+                </a:solidFill>
+                <a:latin typeface="Bahnschrift SemiLight" pitchFamily="34" charset="0"/>
+              </a:rPr>
+              <a:t>32</a:t>
+            </a:r>
+            <a:endParaRPr lang="en-IN" sz="4800" b="1" dirty="0">
+              <a:solidFill>
+                <a:schemeClr val="accent2">
+                  <a:lumMod val="60000"/>
+                  <a:lumOff val="40000"/>
+                </a:schemeClr>
+              </a:solidFill>
+              <a:latin typeface="Bahnschrift Light Condensed" pitchFamily="34" charset="0"/>
+            </a:endParaRPr>
+          </a:p>
+        </p:txBody>
+      </p:sp>
+      <p:sp>
+        <p:nvSpPr>
+          <p:cNvPr id="7" name="TextBox 6">
+            <a:extLst>
+              <a:ext uri="{FF2B5EF4-FFF2-40B4-BE49-F238E27FC236}">
+                <a16:creationId xmlns:a16="http://schemas.microsoft.com/office/drawing/2014/main" id="{FF910A4A-73AE-CBCC-3F3C-B503C9E6DCF9}"/>
+              </a:ext>
+            </a:extLst>
+          </p:cNvPr>
+          <p:cNvSpPr txBox="1"/>
+          <p:nvPr/>
+        </p:nvSpPr>
+        <p:spPr>
+          <a:xfrm>
+            <a:off x="241300" y="228600"/>
+            <a:ext cx="5363969" cy="1107996"/>
+          </a:xfrm>
+          <a:prstGeom prst="rect">
+            <a:avLst/>
+          </a:prstGeom>
+          <a:noFill/>
+        </p:spPr>
+        <p:txBody>
+          <a:bodyPr wrap="none" rtlCol="0">
+            <a:spAutoFit/>
+          </a:bodyPr>
+          <a:lstStyle/>
+          <a:p>
+            <a:r>
+              <a:rPr lang="en-US" sz="6600" b="1" dirty="0">
+                <a:latin typeface="Barlow Condensed ExtraLight" panose="00000306000000000000" pitchFamily="2" charset="0"/>
+              </a:rPr>
+              <a:t>JavaScript- </a:t>
+            </a:r>
+            <a:r>
+              <a:rPr lang="en-US" sz="6600" b="1" dirty="0">
+                <a:solidFill>
+                  <a:srgbClr val="FFFF00"/>
+                </a:solidFill>
+                <a:latin typeface="Bahnschrift SemiCondensed" panose="020B0502040204020203" pitchFamily="34" charset="0"/>
+              </a:rPr>
+              <a:t>Array</a:t>
+            </a:r>
+          </a:p>
+        </p:txBody>
+      </p:sp>
+      <p:sp>
+        <p:nvSpPr>
+          <p:cNvPr id="6" name="TextBox 5">
+            <a:extLst>
+              <a:ext uri="{FF2B5EF4-FFF2-40B4-BE49-F238E27FC236}">
+                <a16:creationId xmlns:a16="http://schemas.microsoft.com/office/drawing/2014/main" id="{1B73DBA3-6256-19F6-161D-67200C78151B}"/>
+              </a:ext>
+            </a:extLst>
+          </p:cNvPr>
+          <p:cNvSpPr txBox="1"/>
+          <p:nvPr/>
+        </p:nvSpPr>
+        <p:spPr>
+          <a:xfrm>
+            <a:off x="9909313" y="1536494"/>
+            <a:ext cx="2195004" cy="646331"/>
+          </a:xfrm>
+          <a:prstGeom prst="rect">
+            <a:avLst/>
+          </a:prstGeom>
+          <a:noFill/>
+        </p:spPr>
+        <p:txBody>
+          <a:bodyPr wrap="square" rtlCol="0">
+            <a:spAutoFit/>
+          </a:bodyPr>
+          <a:lstStyle/>
+          <a:p>
+            <a:pPr algn="r"/>
+            <a:r>
+              <a:rPr lang="en-US" b="1" dirty="0"/>
+              <a:t>Gautam Kumar </a:t>
+            </a:r>
+            <a:br>
+              <a:rPr lang="en-US" b="1" dirty="0"/>
+            </a:br>
+            <a:r>
+              <a:rPr lang="en-US" b="1" dirty="0">
+                <a:solidFill>
+                  <a:schemeClr val="tx1">
+                    <a:lumMod val="65000"/>
+                  </a:schemeClr>
+                </a:solidFill>
+              </a:rPr>
+              <a:t>- </a:t>
+            </a:r>
+            <a:r>
+              <a:rPr lang="en-US" dirty="0">
+                <a:solidFill>
+                  <a:schemeClr val="tx1">
+                    <a:lumMod val="65000"/>
+                  </a:schemeClr>
+                </a:solidFill>
+              </a:rPr>
+              <a:t>uidhtml.com</a:t>
+            </a:r>
+            <a:endParaRPr lang="en-IN" dirty="0">
+              <a:solidFill>
+                <a:schemeClr val="tx1">
+                  <a:lumMod val="65000"/>
+                </a:schemeClr>
+              </a:solidFill>
+            </a:endParaRPr>
+          </a:p>
+        </p:txBody>
+      </p:sp>
+      <p:pic>
+        <p:nvPicPr>
+          <p:cNvPr id="11" name="Picture 3" descr="K:\github-repo\javascript-tutorials\tutorials\chapter-7-data-conversion\assets\images\javascript-logo.png">
+            <a:extLst>
+              <a:ext uri="{FF2B5EF4-FFF2-40B4-BE49-F238E27FC236}">
+                <a16:creationId xmlns:a16="http://schemas.microsoft.com/office/drawing/2014/main" id="{FFD02706-973E-DC84-DD89-A8EDC6820E96}"/>
+              </a:ext>
+            </a:extLst>
+          </p:cNvPr>
+          <p:cNvPicPr>
+            <a:picLocks noChangeAspect="1" noChangeArrowheads="1"/>
+          </p:cNvPicPr>
+          <p:nvPr/>
+        </p:nvPicPr>
+        <p:blipFill>
+          <a:blip r:embed="rId3"/>
+          <a:srcRect/>
+          <a:stretch>
+            <a:fillRect/>
+          </a:stretch>
+        </p:blipFill>
+        <p:spPr bwMode="auto">
+          <a:xfrm>
+            <a:off x="10705134" y="143202"/>
+            <a:ext cx="1314450" cy="1314450"/>
+          </a:xfrm>
+          <a:prstGeom prst="rect">
+            <a:avLst/>
+          </a:prstGeom>
+          <a:noFill/>
+        </p:spPr>
+      </p:pic>
+      <p:sp>
+        <p:nvSpPr>
+          <p:cNvPr id="5" name="TextBox 4">
+            <a:extLst>
+              <a:ext uri="{FF2B5EF4-FFF2-40B4-BE49-F238E27FC236}">
+                <a16:creationId xmlns:a16="http://schemas.microsoft.com/office/drawing/2014/main" id="{301C4E92-6535-CBE6-71A5-E3741EADF518}"/>
+              </a:ext>
+            </a:extLst>
+          </p:cNvPr>
+          <p:cNvSpPr txBox="1"/>
+          <p:nvPr/>
+        </p:nvSpPr>
+        <p:spPr>
+          <a:xfrm>
+            <a:off x="0" y="2859410"/>
+            <a:ext cx="12192000" cy="3893374"/>
+          </a:xfrm>
+          <a:prstGeom prst="rect">
+            <a:avLst/>
+          </a:prstGeom>
+          <a:noFill/>
+        </p:spPr>
+        <p:txBody>
+          <a:bodyPr wrap="square" rtlCol="0">
+            <a:spAutoFit/>
+          </a:bodyPr>
+          <a:lstStyle/>
+          <a:p>
+            <a:pPr algn="ctr"/>
+            <a:r>
+              <a:rPr lang="en-US" sz="5400" dirty="0">
+                <a:solidFill>
+                  <a:schemeClr val="tx1">
+                    <a:lumMod val="95000"/>
+                  </a:schemeClr>
+                </a:solidFill>
+                <a:latin typeface="Barlow ExtraLight" panose="00000300000000000000" pitchFamily="2" charset="0"/>
+              </a:rPr>
+              <a:t>Array method</a:t>
+            </a:r>
+            <a:br>
+              <a:rPr lang="en-US" sz="8800" dirty="0">
+                <a:solidFill>
+                  <a:srgbClr val="FFFF00"/>
+                </a:solidFill>
+                <a:latin typeface="Barlow ExtraBold" panose="00000900000000000000" pitchFamily="2" charset="0"/>
+              </a:rPr>
+            </a:br>
+            <a:r>
+              <a:rPr lang="en-US" sz="10500" dirty="0">
+                <a:solidFill>
+                  <a:srgbClr val="FFFF00"/>
+                </a:solidFill>
+                <a:latin typeface="Barlow ExtraBold" panose="00000900000000000000" pitchFamily="2" charset="0"/>
+              </a:rPr>
+              <a:t>.map() </a:t>
+            </a:r>
+            <a:r>
+              <a:rPr lang="en-US" sz="10500" dirty="0">
+                <a:solidFill>
+                  <a:srgbClr val="FFFF00"/>
+                </a:solidFill>
+                <a:latin typeface="Bahnschrift Light" panose="020B0502040204020203" pitchFamily="34" charset="0"/>
+              </a:rPr>
+              <a:t>vs</a:t>
+            </a:r>
+            <a:r>
+              <a:rPr lang="en-US" sz="10500" dirty="0">
+                <a:solidFill>
+                  <a:srgbClr val="FFFF00"/>
+                </a:solidFill>
+                <a:latin typeface="Barlow ExtraBold" panose="00000900000000000000" pitchFamily="2" charset="0"/>
+              </a:rPr>
+              <a:t> .filter()</a:t>
+            </a:r>
+            <a:br>
+              <a:rPr lang="en-US" sz="8800" dirty="0">
+                <a:solidFill>
+                  <a:srgbClr val="FFFF00"/>
+                </a:solidFill>
+                <a:latin typeface="Barlow ExtraBold" panose="00000900000000000000" pitchFamily="2" charset="0"/>
+              </a:rPr>
+            </a:br>
+            <a:r>
+              <a:rPr lang="en-US" sz="8800" dirty="0">
+                <a:latin typeface="Bahnschrift Light" panose="020B0502040204020203" pitchFamily="34" charset="0"/>
+              </a:rPr>
+              <a:t>Real world example</a:t>
+            </a:r>
+            <a:endParaRPr lang="en-IN" sz="8800" dirty="0">
+              <a:latin typeface="Bahnschrift Light" panose="020B0502040204020203" pitchFamily="34" charset="0"/>
+            </a:endParaRPr>
+          </a:p>
+        </p:txBody>
+      </p:sp>
+    </p:spTree>
+    <p:extLst>
+      <p:ext uri="{BB962C8B-B14F-4D97-AF65-F5344CB8AC3E}">
+        <p14:creationId xmlns:p14="http://schemas.microsoft.com/office/powerpoint/2010/main" val="2839071550"/>
+      </p:ext>
+    </p:extLst>
+  </p:cSld>
+  <p:clrMapOvr>
+    <a:masterClrMapping/>
+  </p:clrMapOvr>
+</p:sld>
+</file>
+
+<file path=ppt/slides/slide86.xml><?xml version="1.0" encoding="utf-8"?>
 <p:sld xmlns:a="http://schemas.openxmlformats.org/drawingml/2006/main" xmlns:r="http://schemas.openxmlformats.org/officeDocument/2006/relationships" xmlns:p="http://schemas.openxmlformats.org/presentationml/2006/main">
   <p:cSld>
     <p:spTree>

</xml_diff>

<commit_message>
Added chapter till 33
</commit_message>
<xml_diff>
--- a/Javascript Tutorials.pptx
+++ b/Javascript Tutorials.pptx
@@ -5,7 +5,7 @@
     <p:sldMasterId id="2147483686" r:id="rId1"/>
   </p:sldMasterIdLst>
   <p:notesMasterIdLst>
-    <p:notesMasterId r:id="rId88"/>
+    <p:notesMasterId r:id="rId89"/>
   </p:notesMasterIdLst>
   <p:sldIdLst>
     <p:sldId id="256" r:id="rId2"/>
@@ -93,7 +93,8 @@
     <p:sldId id="336" r:id="rId84"/>
     <p:sldId id="350" r:id="rId85"/>
     <p:sldId id="349" r:id="rId86"/>
-    <p:sldId id="348" r:id="rId87"/>
+    <p:sldId id="351" r:id="rId87"/>
+    <p:sldId id="348" r:id="rId88"/>
   </p:sldIdLst>
   <p:sldSz cx="12192000" cy="6858000"/>
   <p:notesSz cx="6858000" cy="9144000"/>
@@ -294,7 +295,7 @@
             <a:fld id="{792F6C33-F1A2-419B-BA2F-6679E9D9EF00}" type="datetimeFigureOut">
               <a:rPr lang="en-US" smtClean="0"/>
               <a:pPr/>
-              <a:t>11/5/2025</a:t>
+              <a:t>11/7/2025</a:t>
             </a:fld>
             <a:endParaRPr lang="en-US"/>
           </a:p>
@@ -6001,6 +6002,117 @@
         <p:cNvPr id="1" name="">
           <a:extLst>
             <a:ext uri="{FF2B5EF4-FFF2-40B4-BE49-F238E27FC236}">
+              <a16:creationId xmlns:a16="http://schemas.microsoft.com/office/drawing/2014/main" id="{9D1FE522-9308-B158-F22F-22309FD9E917}"/>
+            </a:ext>
+          </a:extLst>
+        </p:cNvPr>
+        <p:cNvGrpSpPr/>
+        <p:nvPr/>
+      </p:nvGrpSpPr>
+      <p:grpSpPr>
+        <a:xfrm>
+          <a:off x="0" y="0"/>
+          <a:ext cx="0" cy="0"/>
+          <a:chOff x="0" y="0"/>
+          <a:chExt cx="0" cy="0"/>
+        </a:xfrm>
+      </p:grpSpPr>
+      <p:sp>
+        <p:nvSpPr>
+          <p:cNvPr id="2" name="Slide Image Placeholder 1">
+            <a:extLst>
+              <a:ext uri="{FF2B5EF4-FFF2-40B4-BE49-F238E27FC236}">
+                <a16:creationId xmlns:a16="http://schemas.microsoft.com/office/drawing/2014/main" id="{BDF4A29A-C767-8D61-FCC8-C18F706143C4}"/>
+              </a:ext>
+            </a:extLst>
+          </p:cNvPr>
+          <p:cNvSpPr>
+            <a:spLocks noGrp="1" noRot="1" noChangeAspect="1"/>
+          </p:cNvSpPr>
+          <p:nvPr>
+            <p:ph type="sldImg"/>
+          </p:nvPr>
+        </p:nvSpPr>
+        <p:spPr/>
+      </p:sp>
+      <p:sp>
+        <p:nvSpPr>
+          <p:cNvPr id="3" name="Notes Placeholder 2">
+            <a:extLst>
+              <a:ext uri="{FF2B5EF4-FFF2-40B4-BE49-F238E27FC236}">
+                <a16:creationId xmlns:a16="http://schemas.microsoft.com/office/drawing/2014/main" id="{1AAFDF50-4F8D-5DD9-1E6B-2C0140EE8148}"/>
+              </a:ext>
+            </a:extLst>
+          </p:cNvPr>
+          <p:cNvSpPr>
+            <a:spLocks noGrp="1"/>
+          </p:cNvSpPr>
+          <p:nvPr>
+            <p:ph type="body" idx="1"/>
+          </p:nvPr>
+        </p:nvSpPr>
+        <p:spPr/>
+        <p:txBody>
+          <a:bodyPr>
+            <a:normAutofit/>
+          </a:bodyPr>
+          <a:lstStyle/>
+          <a:p>
+            <a:endParaRPr lang="en-US" dirty="0"/>
+          </a:p>
+        </p:txBody>
+      </p:sp>
+      <p:sp>
+        <p:nvSpPr>
+          <p:cNvPr id="4" name="Slide Number Placeholder 3">
+            <a:extLst>
+              <a:ext uri="{FF2B5EF4-FFF2-40B4-BE49-F238E27FC236}">
+                <a16:creationId xmlns:a16="http://schemas.microsoft.com/office/drawing/2014/main" id="{6D3814DE-3234-641C-8FC8-AFFB270948D0}"/>
+              </a:ext>
+            </a:extLst>
+          </p:cNvPr>
+          <p:cNvSpPr>
+            <a:spLocks noGrp="1"/>
+          </p:cNvSpPr>
+          <p:nvPr>
+            <p:ph type="sldNum" sz="quarter" idx="10"/>
+          </p:nvPr>
+        </p:nvSpPr>
+        <p:spPr/>
+        <p:txBody>
+          <a:bodyPr/>
+          <a:lstStyle/>
+          <a:p>
+            <a:fld id="{319BE468-75AD-472B-90AC-B0CB707E0D7A}" type="slidenum">
+              <a:rPr lang="en-US" smtClean="0"/>
+              <a:pPr/>
+              <a:t>86</a:t>
+            </a:fld>
+            <a:endParaRPr lang="en-US"/>
+          </a:p>
+        </p:txBody>
+      </p:sp>
+    </p:spTree>
+    <p:extLst>
+      <p:ext uri="{BB962C8B-B14F-4D97-AF65-F5344CB8AC3E}">
+        <p14:creationId xmlns:p14="http://schemas.microsoft.com/office/powerpoint/2010/main" val="1388118068"/>
+      </p:ext>
+    </p:extLst>
+  </p:cSld>
+  <p:clrMapOvr>
+    <a:masterClrMapping/>
+  </p:clrMapOvr>
+</p:notes>
+</file>
+
+<file path=ppt/notesSlides/notesSlide56.xml><?xml version="1.0" encoding="utf-8"?>
+<p:notes xmlns:a="http://schemas.openxmlformats.org/drawingml/2006/main" xmlns:r="http://schemas.openxmlformats.org/officeDocument/2006/relationships" xmlns:p="http://schemas.openxmlformats.org/presentationml/2006/main">
+  <p:cSld>
+    <p:spTree>
+      <p:nvGrpSpPr>
+        <p:cNvPr id="1" name="">
+          <a:extLst>
+            <a:ext uri="{FF2B5EF4-FFF2-40B4-BE49-F238E27FC236}">
               <a16:creationId xmlns:a16="http://schemas.microsoft.com/office/drawing/2014/main" id="{826981DE-5BA8-9F0D-67A7-4D2BFDA85AEF}"/>
             </a:ext>
           </a:extLst>
@@ -6085,7 +6197,7 @@
             <a:fld id="{319BE468-75AD-472B-90AC-B0CB707E0D7A}" type="slidenum">
               <a:rPr lang="en-US" smtClean="0"/>
               <a:pPr/>
-              <a:t>86</a:t>
+              <a:t>87</a:t>
             </a:fld>
             <a:endParaRPr lang="en-US"/>
           </a:p>
@@ -7273,7 +7385,7 @@
             <a:fld id="{48A87A34-81AB-432B-8DAE-1953F412C126}" type="datetimeFigureOut">
               <a:rPr lang="en-US" smtClean="0"/>
               <a:pPr/>
-              <a:t>11/5/2025</a:t>
+              <a:t>11/7/2025</a:t>
             </a:fld>
             <a:endParaRPr lang="en-US" dirty="0"/>
           </a:p>
@@ -7526,7 +7638,7 @@
             <a:fld id="{48A87A34-81AB-432B-8DAE-1953F412C126}" type="datetimeFigureOut">
               <a:rPr lang="en-US" smtClean="0"/>
               <a:pPr/>
-              <a:t>11/5/2025</a:t>
+              <a:t>11/7/2025</a:t>
             </a:fld>
             <a:endParaRPr lang="en-US" dirty="0"/>
           </a:p>
@@ -7842,7 +7954,7 @@
             <a:fld id="{48A87A34-81AB-432B-8DAE-1953F412C126}" type="datetimeFigureOut">
               <a:rPr lang="en-US" smtClean="0"/>
               <a:pPr/>
-              <a:t>11/5/2025</a:t>
+              <a:t>11/7/2025</a:t>
             </a:fld>
             <a:endParaRPr lang="en-US" dirty="0"/>
           </a:p>
@@ -8171,7 +8283,7 @@
             <a:fld id="{48A87A34-81AB-432B-8DAE-1953F412C126}" type="datetimeFigureOut">
               <a:rPr lang="en-US" smtClean="0"/>
               <a:pPr/>
-              <a:t>11/5/2025</a:t>
+              <a:t>11/7/2025</a:t>
             </a:fld>
             <a:endParaRPr lang="en-US" dirty="0"/>
           </a:p>
@@ -8487,7 +8599,7 @@
             <a:fld id="{48A87A34-81AB-432B-8DAE-1953F412C126}" type="datetimeFigureOut">
               <a:rPr lang="en-US" smtClean="0"/>
               <a:pPr/>
-              <a:t>11/5/2025</a:t>
+              <a:t>11/7/2025</a:t>
             </a:fld>
             <a:endParaRPr lang="en-US" dirty="0"/>
           </a:p>
@@ -8876,7 +8988,7 @@
             <a:fld id="{48A87A34-81AB-432B-8DAE-1953F412C126}" type="datetimeFigureOut">
               <a:rPr lang="en-US" smtClean="0"/>
               <a:pPr/>
-              <a:t>11/5/2025</a:t>
+              <a:t>11/7/2025</a:t>
             </a:fld>
             <a:endParaRPr lang="en-US" dirty="0"/>
           </a:p>
@@ -9048,7 +9160,7 @@
             <a:fld id="{48A87A34-81AB-432B-8DAE-1953F412C126}" type="datetimeFigureOut">
               <a:rPr lang="en-US" smtClean="0"/>
               <a:pPr/>
-              <a:t>11/5/2025</a:t>
+              <a:t>11/7/2025</a:t>
             </a:fld>
             <a:endParaRPr lang="en-US" dirty="0"/>
           </a:p>
@@ -9230,7 +9342,7 @@
             <a:fld id="{48A87A34-81AB-432B-8DAE-1953F412C126}" type="datetimeFigureOut">
               <a:rPr lang="en-US" smtClean="0"/>
               <a:pPr/>
-              <a:t>11/5/2025</a:t>
+              <a:t>11/7/2025</a:t>
             </a:fld>
             <a:endParaRPr lang="en-US" dirty="0"/>
           </a:p>
@@ -9408,7 +9520,7 @@
             <a:fld id="{48A87A34-81AB-432B-8DAE-1953F412C126}" type="datetimeFigureOut">
               <a:rPr lang="en-US" smtClean="0"/>
               <a:pPr/>
-              <a:t>11/5/2025</a:t>
+              <a:t>11/7/2025</a:t>
             </a:fld>
             <a:endParaRPr lang="en-US" dirty="0"/>
           </a:p>
@@ -9657,7 +9769,7 @@
             <a:fld id="{48A87A34-81AB-432B-8DAE-1953F412C126}" type="datetimeFigureOut">
               <a:rPr lang="en-US" smtClean="0"/>
               <a:pPr/>
-              <a:t>11/5/2025</a:t>
+              <a:t>11/7/2025</a:t>
             </a:fld>
             <a:endParaRPr lang="en-US" dirty="0"/>
           </a:p>
@@ -9891,7 +10003,7 @@
             <a:fld id="{48A87A34-81AB-432B-8DAE-1953F412C126}" type="datetimeFigureOut">
               <a:rPr lang="en-US" smtClean="0"/>
               <a:pPr/>
-              <a:t>11/5/2025</a:t>
+              <a:t>11/7/2025</a:t>
             </a:fld>
             <a:endParaRPr lang="en-US" dirty="0"/>
           </a:p>
@@ -10267,7 +10379,7 @@
             <a:fld id="{48A87A34-81AB-432B-8DAE-1953F412C126}" type="datetimeFigureOut">
               <a:rPr lang="en-US" smtClean="0"/>
               <a:pPr/>
-              <a:t>11/5/2025</a:t>
+              <a:t>11/7/2025</a:t>
             </a:fld>
             <a:endParaRPr lang="en-US" dirty="0"/>
           </a:p>
@@ -10392,7 +10504,7 @@
             <a:fld id="{48A87A34-81AB-432B-8DAE-1953F412C126}" type="datetimeFigureOut">
               <a:rPr lang="en-US" smtClean="0"/>
               <a:pPr/>
-              <a:t>11/5/2025</a:t>
+              <a:t>11/7/2025</a:t>
             </a:fld>
             <a:endParaRPr lang="en-US" dirty="0"/>
           </a:p>
@@ -10489,7 +10601,7 @@
             <a:fld id="{48A87A34-81AB-432B-8DAE-1953F412C126}" type="datetimeFigureOut">
               <a:rPr lang="en-US" smtClean="0"/>
               <a:pPr/>
-              <a:t>11/5/2025</a:t>
+              <a:t>11/7/2025</a:t>
             </a:fld>
             <a:endParaRPr lang="en-US" dirty="0"/>
           </a:p>
@@ -10746,7 +10858,7 @@
             <a:fld id="{48A87A34-81AB-432B-8DAE-1953F412C126}" type="datetimeFigureOut">
               <a:rPr lang="en-US" smtClean="0"/>
               <a:pPr/>
-              <a:t>11/5/2025</a:t>
+              <a:t>11/7/2025</a:t>
             </a:fld>
             <a:endParaRPr lang="en-US" dirty="0"/>
           </a:p>
@@ -11011,7 +11123,7 @@
             <a:fld id="{48A87A34-81AB-432B-8DAE-1953F412C126}" type="datetimeFigureOut">
               <a:rPr lang="en-US" smtClean="0"/>
               <a:pPr/>
-              <a:t>11/5/2025</a:t>
+              <a:t>11/7/2025</a:t>
             </a:fld>
             <a:endParaRPr lang="en-US" dirty="0"/>
           </a:p>
@@ -11758,7 +11870,7 @@
             <a:fld id="{48A87A34-81AB-432B-8DAE-1953F412C126}" type="datetimeFigureOut">
               <a:rPr lang="en-US" smtClean="0"/>
               <a:pPr/>
-              <a:t>11/5/2025</a:t>
+              <a:t>11/7/2025</a:t>
             </a:fld>
             <a:endParaRPr lang="en-US" dirty="0"/>
           </a:p>
@@ -54188,6 +54300,477 @@
 </file>
 
 <file path=ppt/slides/slide86.xml><?xml version="1.0" encoding="utf-8"?>
+<p:sld xmlns:a="http://schemas.openxmlformats.org/drawingml/2006/main" xmlns:r="http://schemas.openxmlformats.org/officeDocument/2006/relationships" xmlns:p="http://schemas.openxmlformats.org/presentationml/2006/main">
+  <p:cSld>
+    <p:spTree>
+      <p:nvGrpSpPr>
+        <p:cNvPr id="1" name="">
+          <a:extLst>
+            <a:ext uri="{FF2B5EF4-FFF2-40B4-BE49-F238E27FC236}">
+              <a16:creationId xmlns:a16="http://schemas.microsoft.com/office/drawing/2014/main" id="{9052DF60-880B-AFC7-333F-D92EC3319F2F}"/>
+            </a:ext>
+          </a:extLst>
+        </p:cNvPr>
+        <p:cNvGrpSpPr/>
+        <p:nvPr/>
+      </p:nvGrpSpPr>
+      <p:grpSpPr>
+        <a:xfrm>
+          <a:off x="0" y="0"/>
+          <a:ext cx="0" cy="0"/>
+          <a:chOff x="0" y="0"/>
+          <a:chExt cx="0" cy="0"/>
+        </a:xfrm>
+      </p:grpSpPr>
+      <p:sp>
+        <p:nvSpPr>
+          <p:cNvPr id="10" name="Rectangle 9">
+            <a:extLst>
+              <a:ext uri="{FF2B5EF4-FFF2-40B4-BE49-F238E27FC236}">
+                <a16:creationId xmlns:a16="http://schemas.microsoft.com/office/drawing/2014/main" id="{6EFECC9C-477D-1B4B-7F8E-60AB2D135BA0}"/>
+              </a:ext>
+            </a:extLst>
+          </p:cNvPr>
+          <p:cNvSpPr/>
+          <p:nvPr/>
+        </p:nvSpPr>
+        <p:spPr>
+          <a:xfrm>
+            <a:off x="0" y="0"/>
+            <a:ext cx="12192000" cy="6858000"/>
+          </a:xfrm>
+          <a:prstGeom prst="rect">
+            <a:avLst/>
+          </a:prstGeom>
+          <a:solidFill>
+            <a:schemeClr val="bg2">
+              <a:lumMod val="50000"/>
+            </a:schemeClr>
+          </a:solidFill>
+          <a:ln>
+            <a:noFill/>
+          </a:ln>
+        </p:spPr>
+        <p:style>
+          <a:lnRef idx="2">
+            <a:schemeClr val="accent1">
+              <a:shade val="50000"/>
+            </a:schemeClr>
+          </a:lnRef>
+          <a:fillRef idx="1">
+            <a:schemeClr val="accent1"/>
+          </a:fillRef>
+          <a:effectRef idx="0">
+            <a:schemeClr val="accent1"/>
+          </a:effectRef>
+          <a:fontRef idx="minor">
+            <a:schemeClr val="lt1"/>
+          </a:fontRef>
+        </p:style>
+        <p:txBody>
+          <a:bodyPr rtlCol="0" anchor="ctr"/>
+          <a:lstStyle/>
+          <a:p>
+            <a:pPr algn="ctr"/>
+            <a:endParaRPr lang="en-US" dirty="0"/>
+          </a:p>
+        </p:txBody>
+      </p:sp>
+      <p:sp>
+        <p:nvSpPr>
+          <p:cNvPr id="9" name="Explosion: 14 Points 8">
+            <a:extLst>
+              <a:ext uri="{FF2B5EF4-FFF2-40B4-BE49-F238E27FC236}">
+                <a16:creationId xmlns:a16="http://schemas.microsoft.com/office/drawing/2014/main" id="{1A5B6834-510C-5A02-6E0C-E9E80EDA2E1A}"/>
+              </a:ext>
+            </a:extLst>
+          </p:cNvPr>
+          <p:cNvSpPr/>
+          <p:nvPr/>
+        </p:nvSpPr>
+        <p:spPr>
+          <a:xfrm>
+            <a:off x="4012025" y="366827"/>
+            <a:ext cx="3669087" cy="3707684"/>
+          </a:xfrm>
+          <a:prstGeom prst="irregularSeal2">
+            <a:avLst/>
+          </a:prstGeom>
+          <a:solidFill>
+            <a:schemeClr val="bg2">
+              <a:lumMod val="75000"/>
+            </a:schemeClr>
+          </a:solidFill>
+          <a:ln>
+            <a:noFill/>
+          </a:ln>
+        </p:spPr>
+        <p:style>
+          <a:lnRef idx="2">
+            <a:schemeClr val="accent1">
+              <a:shade val="15000"/>
+            </a:schemeClr>
+          </a:lnRef>
+          <a:fillRef idx="1">
+            <a:schemeClr val="accent1"/>
+          </a:fillRef>
+          <a:effectRef idx="0">
+            <a:schemeClr val="accent1"/>
+          </a:effectRef>
+          <a:fontRef idx="minor">
+            <a:schemeClr val="lt1"/>
+          </a:fontRef>
+        </p:style>
+        <p:txBody>
+          <a:bodyPr rtlCol="0" anchor="ctr"/>
+          <a:lstStyle/>
+          <a:p>
+            <a:pPr algn="ctr"/>
+            <a:endParaRPr lang="en-IN"/>
+          </a:p>
+        </p:txBody>
+      </p:sp>
+      <p:sp>
+        <p:nvSpPr>
+          <p:cNvPr id="2" name="Title 1">
+            <a:extLst>
+              <a:ext uri="{FF2B5EF4-FFF2-40B4-BE49-F238E27FC236}">
+                <a16:creationId xmlns:a16="http://schemas.microsoft.com/office/drawing/2014/main" id="{FB6BCD5B-C120-F714-DC73-CE50DF4A644B}"/>
+              </a:ext>
+            </a:extLst>
+          </p:cNvPr>
+          <p:cNvSpPr>
+            <a:spLocks noGrp="1"/>
+          </p:cNvSpPr>
+          <p:nvPr>
+            <p:ph type="title"/>
+          </p:nvPr>
+        </p:nvSpPr>
+        <p:spPr>
+          <a:xfrm>
+            <a:off x="0" y="1137376"/>
+            <a:ext cx="12192000" cy="1608284"/>
+          </a:xfrm>
+          <a:noFill/>
+        </p:spPr>
+        <p:txBody>
+          <a:bodyPr anchor="ctr">
+            <a:normAutofit/>
+          </a:bodyPr>
+          <a:lstStyle/>
+          <a:p>
+            <a:pPr algn="ctr"/>
+            <a:r>
+              <a:rPr lang="en-US" sz="7200" b="1" dirty="0">
+                <a:solidFill>
+                  <a:schemeClr val="tx1"/>
+                </a:solidFill>
+                <a:latin typeface="Barlow Black" panose="00000A00000000000000" pitchFamily="2" charset="0"/>
+              </a:rPr>
+              <a:t>Chapter – </a:t>
+            </a:r>
+            <a:r>
+              <a:rPr lang="en-US" sz="7200" dirty="0">
+                <a:solidFill>
+                  <a:schemeClr val="tx1"/>
+                </a:solidFill>
+                <a:latin typeface="Bahnschrift SemiLight" pitchFamily="34" charset="0"/>
+              </a:rPr>
+              <a:t>33</a:t>
+            </a:r>
+            <a:endParaRPr lang="en-IN" sz="4800" b="1" dirty="0">
+              <a:solidFill>
+                <a:schemeClr val="accent2">
+                  <a:lumMod val="60000"/>
+                  <a:lumOff val="40000"/>
+                </a:schemeClr>
+              </a:solidFill>
+              <a:latin typeface="Bahnschrift Light Condensed" pitchFamily="34" charset="0"/>
+            </a:endParaRPr>
+          </a:p>
+        </p:txBody>
+      </p:sp>
+      <p:sp>
+        <p:nvSpPr>
+          <p:cNvPr id="7" name="TextBox 6">
+            <a:extLst>
+              <a:ext uri="{FF2B5EF4-FFF2-40B4-BE49-F238E27FC236}">
+                <a16:creationId xmlns:a16="http://schemas.microsoft.com/office/drawing/2014/main" id="{4357721D-B11D-CE5B-6597-5A27A02F4C61}"/>
+              </a:ext>
+            </a:extLst>
+          </p:cNvPr>
+          <p:cNvSpPr txBox="1"/>
+          <p:nvPr/>
+        </p:nvSpPr>
+        <p:spPr>
+          <a:xfrm>
+            <a:off x="241300" y="228600"/>
+            <a:ext cx="5363969" cy="1107996"/>
+          </a:xfrm>
+          <a:prstGeom prst="rect">
+            <a:avLst/>
+          </a:prstGeom>
+          <a:noFill/>
+        </p:spPr>
+        <p:txBody>
+          <a:bodyPr wrap="none" rtlCol="0">
+            <a:spAutoFit/>
+          </a:bodyPr>
+          <a:lstStyle/>
+          <a:p>
+            <a:r>
+              <a:rPr lang="en-US" sz="6600" b="1" dirty="0">
+                <a:latin typeface="Barlow Condensed ExtraLight" panose="00000306000000000000" pitchFamily="2" charset="0"/>
+              </a:rPr>
+              <a:t>JavaScript- </a:t>
+            </a:r>
+            <a:r>
+              <a:rPr lang="en-US" sz="6600" b="1" dirty="0">
+                <a:solidFill>
+                  <a:srgbClr val="FFFF00"/>
+                </a:solidFill>
+                <a:latin typeface="Bahnschrift SemiCondensed" panose="020B0502040204020203" pitchFamily="34" charset="0"/>
+              </a:rPr>
+              <a:t>Array</a:t>
+            </a:r>
+          </a:p>
+        </p:txBody>
+      </p:sp>
+      <p:sp>
+        <p:nvSpPr>
+          <p:cNvPr id="6" name="TextBox 5">
+            <a:extLst>
+              <a:ext uri="{FF2B5EF4-FFF2-40B4-BE49-F238E27FC236}">
+                <a16:creationId xmlns:a16="http://schemas.microsoft.com/office/drawing/2014/main" id="{368B60D0-DDDD-AC56-5985-8A72238D981F}"/>
+              </a:ext>
+            </a:extLst>
+          </p:cNvPr>
+          <p:cNvSpPr txBox="1"/>
+          <p:nvPr/>
+        </p:nvSpPr>
+        <p:spPr>
+          <a:xfrm>
+            <a:off x="9909313" y="1536494"/>
+            <a:ext cx="2195004" cy="646331"/>
+          </a:xfrm>
+          <a:prstGeom prst="rect">
+            <a:avLst/>
+          </a:prstGeom>
+          <a:noFill/>
+        </p:spPr>
+        <p:txBody>
+          <a:bodyPr wrap="square" rtlCol="0">
+            <a:spAutoFit/>
+          </a:bodyPr>
+          <a:lstStyle/>
+          <a:p>
+            <a:pPr algn="r"/>
+            <a:r>
+              <a:rPr lang="en-US" b="1" dirty="0"/>
+              <a:t>Gautam Kumar </a:t>
+            </a:r>
+            <a:br>
+              <a:rPr lang="en-US" b="1" dirty="0"/>
+            </a:br>
+            <a:r>
+              <a:rPr lang="en-US" b="1" dirty="0">
+                <a:solidFill>
+                  <a:schemeClr val="tx1">
+                    <a:lumMod val="65000"/>
+                  </a:schemeClr>
+                </a:solidFill>
+              </a:rPr>
+              <a:t>- </a:t>
+            </a:r>
+            <a:r>
+              <a:rPr lang="en-US" dirty="0">
+                <a:solidFill>
+                  <a:schemeClr val="tx1">
+                    <a:lumMod val="65000"/>
+                  </a:schemeClr>
+                </a:solidFill>
+              </a:rPr>
+              <a:t>uidhtml.com</a:t>
+            </a:r>
+            <a:endParaRPr lang="en-IN" dirty="0">
+              <a:solidFill>
+                <a:schemeClr val="tx1">
+                  <a:lumMod val="65000"/>
+                </a:schemeClr>
+              </a:solidFill>
+            </a:endParaRPr>
+          </a:p>
+        </p:txBody>
+      </p:sp>
+      <p:pic>
+        <p:nvPicPr>
+          <p:cNvPr id="11" name="Picture 3" descr="K:\github-repo\javascript-tutorials\tutorials\chapter-7-data-conversion\assets\images\javascript-logo.png">
+            <a:extLst>
+              <a:ext uri="{FF2B5EF4-FFF2-40B4-BE49-F238E27FC236}">
+                <a16:creationId xmlns:a16="http://schemas.microsoft.com/office/drawing/2014/main" id="{995B950B-5152-A9BA-84EE-2CC4A7A27B19}"/>
+              </a:ext>
+            </a:extLst>
+          </p:cNvPr>
+          <p:cNvPicPr>
+            <a:picLocks noChangeAspect="1" noChangeArrowheads="1"/>
+          </p:cNvPicPr>
+          <p:nvPr/>
+        </p:nvPicPr>
+        <p:blipFill>
+          <a:blip r:embed="rId3"/>
+          <a:srcRect/>
+          <a:stretch>
+            <a:fillRect/>
+          </a:stretch>
+        </p:blipFill>
+        <p:spPr bwMode="auto">
+          <a:xfrm>
+            <a:off x="10705134" y="143202"/>
+            <a:ext cx="1314450" cy="1314450"/>
+          </a:xfrm>
+          <a:prstGeom prst="rect">
+            <a:avLst/>
+          </a:prstGeom>
+          <a:noFill/>
+        </p:spPr>
+      </p:pic>
+      <p:sp>
+        <p:nvSpPr>
+          <p:cNvPr id="5" name="TextBox 4">
+            <a:extLst>
+              <a:ext uri="{FF2B5EF4-FFF2-40B4-BE49-F238E27FC236}">
+                <a16:creationId xmlns:a16="http://schemas.microsoft.com/office/drawing/2014/main" id="{C5897737-D322-6504-DA63-C24FF2B0E58C}"/>
+              </a:ext>
+            </a:extLst>
+          </p:cNvPr>
+          <p:cNvSpPr txBox="1"/>
+          <p:nvPr/>
+        </p:nvSpPr>
+        <p:spPr>
+          <a:xfrm>
+            <a:off x="0" y="2275704"/>
+            <a:ext cx="12192000" cy="4720523"/>
+          </a:xfrm>
+          <a:prstGeom prst="rect">
+            <a:avLst/>
+          </a:prstGeom>
+          <a:noFill/>
+        </p:spPr>
+        <p:txBody>
+          <a:bodyPr wrap="square" rtlCol="0">
+            <a:spAutoFit/>
+          </a:bodyPr>
+          <a:lstStyle/>
+          <a:p>
+            <a:pPr algn="ctr">
+              <a:lnSpc>
+                <a:spcPts val="12000"/>
+              </a:lnSpc>
+            </a:pPr>
+            <a:r>
+              <a:rPr lang="en-US" sz="10500" dirty="0">
+                <a:solidFill>
+                  <a:srgbClr val="FFFF00"/>
+                </a:solidFill>
+                <a:latin typeface="Barlow ExtraBold" panose="00000900000000000000" pitchFamily="2" charset="0"/>
+              </a:rPr>
+              <a:t>.reduce()</a:t>
+            </a:r>
+            <a:br>
+              <a:rPr lang="en-US" sz="10500" dirty="0">
+                <a:solidFill>
+                  <a:srgbClr val="FFFF00"/>
+                </a:solidFill>
+                <a:latin typeface="Barlow ExtraBold" panose="00000900000000000000" pitchFamily="2" charset="0"/>
+              </a:rPr>
+            </a:br>
+            <a:r>
+              <a:rPr lang="en-US" sz="7200" dirty="0">
+                <a:latin typeface="Barlow Condensed SemiBold" panose="00000706000000000000" pitchFamily="2" charset="0"/>
+              </a:rPr>
+              <a:t>It’s so simple and easy</a:t>
+            </a:r>
+            <a:br>
+              <a:rPr lang="en-US" sz="8800" dirty="0">
+                <a:solidFill>
+                  <a:srgbClr val="FFFF00"/>
+                </a:solidFill>
+                <a:latin typeface="Barlow ExtraBold" panose="00000900000000000000" pitchFamily="2" charset="0"/>
+              </a:rPr>
+            </a:br>
+            <a:r>
+              <a:rPr lang="en-US" sz="9600" dirty="0">
+                <a:latin typeface="Bahnschrift Condensed" panose="020B0502040204020203" pitchFamily="34" charset="0"/>
+              </a:rPr>
+              <a:t>Real world examples</a:t>
+            </a:r>
+            <a:endParaRPr lang="en-IN" sz="9600" dirty="0">
+              <a:latin typeface="Bahnschrift Condensed" panose="020B0502040204020203" pitchFamily="34" charset="0"/>
+            </a:endParaRPr>
+          </a:p>
+        </p:txBody>
+      </p:sp>
+      <p:sp>
+        <p:nvSpPr>
+          <p:cNvPr id="3" name="TextBox 2">
+            <a:extLst>
+              <a:ext uri="{FF2B5EF4-FFF2-40B4-BE49-F238E27FC236}">
+                <a16:creationId xmlns:a16="http://schemas.microsoft.com/office/drawing/2014/main" id="{31C2B73B-8CA3-B6A3-C01B-9BE6893269D2}"/>
+              </a:ext>
+            </a:extLst>
+          </p:cNvPr>
+          <p:cNvSpPr txBox="1"/>
+          <p:nvPr/>
+        </p:nvSpPr>
+        <p:spPr>
+          <a:xfrm>
+            <a:off x="536045" y="4242148"/>
+            <a:ext cx="1229824" cy="3170099"/>
+          </a:xfrm>
+          <a:prstGeom prst="rect">
+            <a:avLst/>
+          </a:prstGeom>
+          <a:noFill/>
+        </p:spPr>
+        <p:txBody>
+          <a:bodyPr wrap="none" rtlCol="0">
+            <a:spAutoFit/>
+          </a:bodyPr>
+          <a:lstStyle/>
+          <a:p>
+            <a:r>
+              <a:rPr lang="en-US" sz="20000" b="1" dirty="0">
+                <a:solidFill>
+                  <a:srgbClr val="FFFF00"/>
+                </a:solidFill>
+                <a:latin typeface="Bahnschrift Condensed" panose="020B0502040204020203" pitchFamily="34" charset="0"/>
+                <a:ea typeface="ADLaM Display" panose="02010000000000000000" pitchFamily="2" charset="0"/>
+                <a:cs typeface="ADLaM Display" panose="02010000000000000000" pitchFamily="2" charset="0"/>
+              </a:rPr>
+              <a:t>5</a:t>
+            </a:r>
+            <a:endParaRPr lang="en-IN" sz="20000" dirty="0">
+              <a:solidFill>
+                <a:srgbClr val="FFFF00"/>
+              </a:solidFill>
+            </a:endParaRPr>
+          </a:p>
+        </p:txBody>
+      </p:sp>
+    </p:spTree>
+    <p:extLst>
+      <p:ext uri="{BB962C8B-B14F-4D97-AF65-F5344CB8AC3E}">
+        <p14:creationId xmlns:p14="http://schemas.microsoft.com/office/powerpoint/2010/main" val="1489973878"/>
+      </p:ext>
+    </p:extLst>
+  </p:cSld>
+  <p:clrMapOvr>
+    <a:masterClrMapping/>
+  </p:clrMapOvr>
+</p:sld>
+</file>
+
+<file path=ppt/slides/slide87.xml><?xml version="1.0" encoding="utf-8"?>
 <p:sld xmlns:a="http://schemas.openxmlformats.org/drawingml/2006/main" xmlns:r="http://schemas.openxmlformats.org/officeDocument/2006/relationships" xmlns:p="http://schemas.openxmlformats.org/presentationml/2006/main">
   <p:cSld>
     <p:spTree>

</xml_diff>